<commit_message>
Completed my part of the presentation
</commit_message>
<xml_diff>
--- a/presentation/8598 Domino and JS.pptx
+++ b/presentation/8598 Domino and JS.pptx
@@ -5,21 +5,35 @@
     <p:sldMasterId id="2147483870" r:id="rId1"/>
   </p:sldMasterIdLst>
   <p:notesMasterIdLst>
-    <p:notesMasterId r:id="rId11"/>
+    <p:notesMasterId r:id="rId25"/>
   </p:notesMasterIdLst>
   <p:handoutMasterIdLst>
-    <p:handoutMasterId r:id="rId12"/>
+    <p:handoutMasterId r:id="rId26"/>
   </p:handoutMasterIdLst>
   <p:sldIdLst>
     <p:sldId id="256" r:id="rId2"/>
     <p:sldId id="257" r:id="rId3"/>
     <p:sldId id="258" r:id="rId4"/>
-    <p:sldId id="263" r:id="rId5"/>
-    <p:sldId id="259" r:id="rId6"/>
-    <p:sldId id="260" r:id="rId7"/>
-    <p:sldId id="261" r:id="rId8"/>
-    <p:sldId id="262" r:id="rId9"/>
-    <p:sldId id="264" r:id="rId10"/>
+    <p:sldId id="272" r:id="rId5"/>
+    <p:sldId id="273" r:id="rId6"/>
+    <p:sldId id="263" r:id="rId7"/>
+    <p:sldId id="259" r:id="rId8"/>
+    <p:sldId id="260" r:id="rId9"/>
+    <p:sldId id="261" r:id="rId10"/>
+    <p:sldId id="262" r:id="rId11"/>
+    <p:sldId id="271" r:id="rId12"/>
+    <p:sldId id="264" r:id="rId13"/>
+    <p:sldId id="267" r:id="rId14"/>
+    <p:sldId id="268" r:id="rId15"/>
+    <p:sldId id="269" r:id="rId16"/>
+    <p:sldId id="270" r:id="rId17"/>
+    <p:sldId id="265" r:id="rId18"/>
+    <p:sldId id="266" r:id="rId19"/>
+    <p:sldId id="274" r:id="rId20"/>
+    <p:sldId id="275" r:id="rId21"/>
+    <p:sldId id="276" r:id="rId22"/>
+    <p:sldId id="277" r:id="rId23"/>
+    <p:sldId id="278" r:id="rId24"/>
   </p:sldIdLst>
   <p:sldSz cx="12192000" cy="6858000"/>
   <p:notesSz cx="6858000" cy="9144000"/>
@@ -234,7 +248,7 @@
           <a:p>
             <a:fld id="{790E51D3-653E-462A-88BF-90B852BBE668}" type="datetimeFigureOut">
               <a:rPr lang="en-GB" smtClean="0"/>
-              <a:t>09/02/2018</a:t>
+              <a:t>12/02/2018</a:t>
             </a:fld>
             <a:endParaRPr lang="en-GB"/>
           </a:p>
@@ -411,7 +425,7 @@
           <a:p>
             <a:fld id="{60164965-4043-4174-93BC-54F5E5CCBD1D}" type="datetimeFigureOut">
               <a:rPr lang="en-US" smtClean="0"/>
-              <a:t>2/9/2018</a:t>
+              <a:t>2/12/2018</a:t>
             </a:fld>
             <a:endParaRPr lang="en-US"/>
           </a:p>
@@ -3844,6 +3858,1305 @@
     <p:extLst>
       <p:ext uri="{BB962C8B-B14F-4D97-AF65-F5344CB8AC3E}">
         <p14:creationId xmlns:p14="http://schemas.microsoft.com/office/powerpoint/2010/main" val="3806928581"/>
+      </p:ext>
+    </p:extLst>
+  </p:cSld>
+  <p:clrMapOvr>
+    <a:masterClrMapping/>
+  </p:clrMapOvr>
+</p:sld>
+</file>
+
+<file path=ppt/slides/slide10.xml><?xml version="1.0" encoding="utf-8"?>
+<p:sld xmlns:a="http://schemas.openxmlformats.org/drawingml/2006/main" xmlns:r="http://schemas.openxmlformats.org/officeDocument/2006/relationships" xmlns:p="http://schemas.openxmlformats.org/presentationml/2006/main">
+  <p:cSld>
+    <p:spTree>
+      <p:nvGrpSpPr>
+        <p:cNvPr id="1" name=""/>
+        <p:cNvGrpSpPr/>
+        <p:nvPr/>
+      </p:nvGrpSpPr>
+      <p:grpSpPr>
+        <a:xfrm>
+          <a:off x="0" y="0"/>
+          <a:ext cx="0" cy="0"/>
+          <a:chOff x="0" y="0"/>
+          <a:chExt cx="0" cy="0"/>
+        </a:xfrm>
+      </p:grpSpPr>
+      <p:sp>
+        <p:nvSpPr>
+          <p:cNvPr id="2" name="Title 1">
+            <a:extLst>
+              <a:ext uri="{FF2B5EF4-FFF2-40B4-BE49-F238E27FC236}">
+                <a16:creationId xmlns:a16="http://schemas.microsoft.com/office/drawing/2014/main" id="{F2C9DEE5-D2B3-4CEE-A43B-3B37F019C675}"/>
+              </a:ext>
+            </a:extLst>
+          </p:cNvPr>
+          <p:cNvSpPr>
+            <a:spLocks noGrp="1"/>
+          </p:cNvSpPr>
+          <p:nvPr>
+            <p:ph type="title"/>
+          </p:nvPr>
+        </p:nvSpPr>
+        <p:spPr/>
+        <p:txBody>
+          <a:bodyPr/>
+          <a:lstStyle/>
+          <a:p>
+            <a:r>
+              <a:rPr lang="en-GB" dirty="0"/>
+              <a:t>Change your thinking</a:t>
+            </a:r>
+          </a:p>
+        </p:txBody>
+      </p:sp>
+      <p:sp>
+        <p:nvSpPr>
+          <p:cNvPr id="3" name="Content Placeholder 2">
+            <a:extLst>
+              <a:ext uri="{FF2B5EF4-FFF2-40B4-BE49-F238E27FC236}">
+                <a16:creationId xmlns:a16="http://schemas.microsoft.com/office/drawing/2014/main" id="{62381E6A-3237-46F9-BEBB-AB78EC7DF951}"/>
+              </a:ext>
+            </a:extLst>
+          </p:cNvPr>
+          <p:cNvSpPr>
+            <a:spLocks noGrp="1"/>
+          </p:cNvSpPr>
+          <p:nvPr>
+            <p:ph idx="1"/>
+          </p:nvPr>
+        </p:nvSpPr>
+        <p:spPr/>
+        <p:txBody>
+          <a:bodyPr/>
+          <a:lstStyle/>
+          <a:p>
+            <a:r>
+              <a:rPr lang="en-GB" dirty="0"/>
+              <a:t>Pros</a:t>
+            </a:r>
+          </a:p>
+          <a:p>
+            <a:pPr marL="342900" indent="-342900">
+              <a:buFontTx/>
+              <a:buChar char="-"/>
+            </a:pPr>
+            <a:r>
+              <a:rPr lang="en-GB" dirty="0"/>
+              <a:t>Greater flexibility</a:t>
+            </a:r>
+          </a:p>
+          <a:p>
+            <a:pPr marL="342900" indent="-342900">
+              <a:buFontTx/>
+              <a:buChar char="-"/>
+            </a:pPr>
+            <a:r>
+              <a:rPr lang="en-GB" dirty="0"/>
+              <a:t>Best of breed</a:t>
+            </a:r>
+          </a:p>
+          <a:p>
+            <a:pPr marL="342900" indent="-342900">
+              <a:buFontTx/>
+              <a:buChar char="-"/>
+            </a:pPr>
+            <a:r>
+              <a:rPr lang="en-GB" dirty="0"/>
+              <a:t>Increased standardisation</a:t>
+            </a:r>
+          </a:p>
+          <a:p>
+            <a:pPr marL="342900" indent="-342900">
+              <a:buFontTx/>
+              <a:buChar char="-"/>
+            </a:pPr>
+            <a:endParaRPr lang="en-GB" dirty="0"/>
+          </a:p>
+          <a:p>
+            <a:r>
+              <a:rPr lang="en-GB" dirty="0"/>
+              <a:t>Cons</a:t>
+            </a:r>
+          </a:p>
+          <a:p>
+            <a:pPr marL="342900" indent="-342900">
+              <a:buFontTx/>
+              <a:buChar char="-"/>
+            </a:pPr>
+            <a:r>
+              <a:rPr lang="en-GB" dirty="0"/>
+              <a:t>Code for failure</a:t>
+            </a:r>
+          </a:p>
+          <a:p>
+            <a:pPr marL="342900" indent="-342900">
+              <a:buFontTx/>
+              <a:buChar char="-"/>
+            </a:pPr>
+            <a:r>
+              <a:rPr lang="en-GB" dirty="0"/>
+              <a:t>Step outside comfort zone</a:t>
+            </a:r>
+          </a:p>
+          <a:p>
+            <a:pPr marL="342900" indent="-342900">
+              <a:buFontTx/>
+              <a:buChar char="-"/>
+            </a:pPr>
+            <a:r>
+              <a:rPr lang="en-GB" dirty="0"/>
+              <a:t>Integration points</a:t>
+            </a:r>
+          </a:p>
+        </p:txBody>
+      </p:sp>
+    </p:spTree>
+    <p:extLst>
+      <p:ext uri="{BB962C8B-B14F-4D97-AF65-F5344CB8AC3E}">
+        <p14:creationId xmlns:p14="http://schemas.microsoft.com/office/powerpoint/2010/main" val="258918636"/>
+      </p:ext>
+    </p:extLst>
+  </p:cSld>
+  <p:clrMapOvr>
+    <a:masterClrMapping/>
+  </p:clrMapOvr>
+</p:sld>
+</file>
+
+<file path=ppt/slides/slide11.xml><?xml version="1.0" encoding="utf-8"?>
+<p:sld xmlns:a="http://schemas.openxmlformats.org/drawingml/2006/main" xmlns:r="http://schemas.openxmlformats.org/officeDocument/2006/relationships" xmlns:p="http://schemas.openxmlformats.org/presentationml/2006/main">
+  <p:cSld>
+    <p:spTree>
+      <p:nvGrpSpPr>
+        <p:cNvPr id="1" name=""/>
+        <p:cNvGrpSpPr/>
+        <p:nvPr/>
+      </p:nvGrpSpPr>
+      <p:grpSpPr>
+        <a:xfrm>
+          <a:off x="0" y="0"/>
+          <a:ext cx="0" cy="0"/>
+          <a:chOff x="0" y="0"/>
+          <a:chExt cx="0" cy="0"/>
+        </a:xfrm>
+      </p:grpSpPr>
+      <p:sp>
+        <p:nvSpPr>
+          <p:cNvPr id="4" name="Title 3">
+            <a:extLst>
+              <a:ext uri="{FF2B5EF4-FFF2-40B4-BE49-F238E27FC236}">
+                <a16:creationId xmlns:a16="http://schemas.microsoft.com/office/drawing/2014/main" id="{642A4954-D8E0-4C0D-B4A7-23E696B306FD}"/>
+              </a:ext>
+            </a:extLst>
+          </p:cNvPr>
+          <p:cNvSpPr>
+            <a:spLocks noGrp="1"/>
+          </p:cNvSpPr>
+          <p:nvPr>
+            <p:ph type="ctrTitle"/>
+          </p:nvPr>
+        </p:nvSpPr>
+        <p:spPr/>
+        <p:txBody>
+          <a:bodyPr>
+            <a:normAutofit fontScale="90000"/>
+          </a:bodyPr>
+          <a:lstStyle/>
+          <a:p>
+            <a:r>
+              <a:rPr lang="en-GB" dirty="0"/>
+              <a:t>Domino as datastore – REST Access</a:t>
+            </a:r>
+          </a:p>
+        </p:txBody>
+      </p:sp>
+    </p:spTree>
+    <p:extLst>
+      <p:ext uri="{BB962C8B-B14F-4D97-AF65-F5344CB8AC3E}">
+        <p14:creationId xmlns:p14="http://schemas.microsoft.com/office/powerpoint/2010/main" val="1219390215"/>
+      </p:ext>
+    </p:extLst>
+  </p:cSld>
+  <p:clrMapOvr>
+    <a:masterClrMapping/>
+  </p:clrMapOvr>
+</p:sld>
+</file>
+
+<file path=ppt/slides/slide12.xml><?xml version="1.0" encoding="utf-8"?>
+<p:sld xmlns:a="http://schemas.openxmlformats.org/drawingml/2006/main" xmlns:r="http://schemas.openxmlformats.org/officeDocument/2006/relationships" xmlns:p="http://schemas.openxmlformats.org/presentationml/2006/main">
+  <p:cSld>
+    <p:spTree>
+      <p:nvGrpSpPr>
+        <p:cNvPr id="1" name=""/>
+        <p:cNvGrpSpPr/>
+        <p:nvPr/>
+      </p:nvGrpSpPr>
+      <p:grpSpPr>
+        <a:xfrm>
+          <a:off x="0" y="0"/>
+          <a:ext cx="0" cy="0"/>
+          <a:chOff x="0" y="0"/>
+          <a:chExt cx="0" cy="0"/>
+        </a:xfrm>
+      </p:grpSpPr>
+      <p:sp>
+        <p:nvSpPr>
+          <p:cNvPr id="2" name="Title 1">
+            <a:extLst>
+              <a:ext uri="{FF2B5EF4-FFF2-40B4-BE49-F238E27FC236}">
+                <a16:creationId xmlns:a16="http://schemas.microsoft.com/office/drawing/2014/main" id="{1A530216-0158-4426-8CAF-8D17A505629F}"/>
+              </a:ext>
+            </a:extLst>
+          </p:cNvPr>
+          <p:cNvSpPr>
+            <a:spLocks noGrp="1"/>
+          </p:cNvSpPr>
+          <p:nvPr>
+            <p:ph type="title"/>
+          </p:nvPr>
+        </p:nvSpPr>
+        <p:spPr/>
+        <p:txBody>
+          <a:bodyPr/>
+          <a:lstStyle/>
+          <a:p>
+            <a:r>
+              <a:rPr lang="en-GB" dirty="0"/>
+              <a:t>Domino rest options</a:t>
+            </a:r>
+          </a:p>
+        </p:txBody>
+      </p:sp>
+      <p:sp>
+        <p:nvSpPr>
+          <p:cNvPr id="3" name="Content Placeholder 2">
+            <a:extLst>
+              <a:ext uri="{FF2B5EF4-FFF2-40B4-BE49-F238E27FC236}">
+                <a16:creationId xmlns:a16="http://schemas.microsoft.com/office/drawing/2014/main" id="{117770BD-8CC0-4139-A505-25D8CA68B2CB}"/>
+              </a:ext>
+            </a:extLst>
+          </p:cNvPr>
+          <p:cNvSpPr>
+            <a:spLocks noGrp="1"/>
+          </p:cNvSpPr>
+          <p:nvPr>
+            <p:ph idx="1"/>
+          </p:nvPr>
+        </p:nvSpPr>
+        <p:spPr>
+          <a:xfrm>
+            <a:off x="266699" y="1933349"/>
+            <a:ext cx="8229601" cy="4421991"/>
+          </a:xfrm>
+        </p:spPr>
+        <p:txBody>
+          <a:bodyPr/>
+          <a:lstStyle/>
+          <a:p>
+            <a:r>
+              <a:rPr lang="en-GB" dirty="0"/>
+              <a:t>DAS</a:t>
+            </a:r>
+          </a:p>
+          <a:p>
+            <a:r>
+              <a:rPr lang="en-GB" dirty="0"/>
+              <a:t>	validation / visibility concerns</a:t>
+            </a:r>
+          </a:p>
+          <a:p>
+            <a:r>
+              <a:rPr lang="en-GB" dirty="0" err="1"/>
+              <a:t>XAgents</a:t>
+            </a:r>
+            <a:endParaRPr lang="en-GB" dirty="0"/>
+          </a:p>
+          <a:p>
+            <a:r>
+              <a:rPr lang="en-GB" dirty="0">
+                <a:latin typeface="Courier New" panose="02070309020205020404" pitchFamily="49" charset="0"/>
+                <a:cs typeface="Courier New" panose="02070309020205020404" pitchFamily="49" charset="0"/>
+              </a:rPr>
+              <a:t>	</a:t>
+            </a:r>
+            <a:r>
+              <a:rPr lang="en-GB" dirty="0" err="1">
+                <a:latin typeface="Courier New" panose="02070309020205020404" pitchFamily="49" charset="0"/>
+                <a:cs typeface="Courier New" panose="02070309020205020404" pitchFamily="49" charset="0"/>
+              </a:rPr>
+              <a:t>viewState</a:t>
+            </a:r>
+            <a:r>
+              <a:rPr lang="en-GB" dirty="0">
+                <a:latin typeface="Courier New" panose="02070309020205020404" pitchFamily="49" charset="0"/>
+                <a:cs typeface="Courier New" panose="02070309020205020404" pitchFamily="49" charset="0"/>
+              </a:rPr>
+              <a:t>=“</a:t>
+            </a:r>
+            <a:r>
+              <a:rPr lang="en-GB" dirty="0" err="1">
+                <a:latin typeface="Courier New" panose="02070309020205020404" pitchFamily="49" charset="0"/>
+                <a:cs typeface="Courier New" panose="02070309020205020404" pitchFamily="49" charset="0"/>
+              </a:rPr>
+              <a:t>nostate</a:t>
+            </a:r>
+            <a:r>
+              <a:rPr lang="en-GB" dirty="0">
+                <a:latin typeface="Courier New" panose="02070309020205020404" pitchFamily="49" charset="0"/>
+                <a:cs typeface="Courier New" panose="02070309020205020404" pitchFamily="49" charset="0"/>
+              </a:rPr>
+              <a:t>”</a:t>
+            </a:r>
+          </a:p>
+          <a:p>
+            <a:r>
+              <a:rPr lang="en-GB" dirty="0" err="1"/>
+              <a:t>SmartNSF</a:t>
+            </a:r>
+            <a:endParaRPr lang="en-GB" dirty="0"/>
+          </a:p>
+          <a:p>
+            <a:r>
+              <a:rPr lang="en-GB" dirty="0"/>
+              <a:t>	written using Domain Specific Language</a:t>
+            </a:r>
+          </a:p>
+          <a:p>
+            <a:r>
+              <a:rPr lang="en-GB" dirty="0"/>
+              <a:t>ODA Starter Servlet</a:t>
+            </a:r>
+          </a:p>
+          <a:p>
+            <a:r>
+              <a:rPr lang="en-GB" dirty="0"/>
+              <a:t>	develop in Eclipse, local Domino server</a:t>
+            </a:r>
+          </a:p>
+          <a:p>
+            <a:r>
+              <a:rPr lang="en-GB" dirty="0" err="1"/>
+              <a:t>Darwino</a:t>
+            </a:r>
+            <a:r>
+              <a:rPr lang="en-GB" dirty="0"/>
+              <a:t> Microservices</a:t>
+            </a:r>
+          </a:p>
+        </p:txBody>
+      </p:sp>
+    </p:spTree>
+    <p:extLst>
+      <p:ext uri="{BB962C8B-B14F-4D97-AF65-F5344CB8AC3E}">
+        <p14:creationId xmlns:p14="http://schemas.microsoft.com/office/powerpoint/2010/main" val="2249062884"/>
+      </p:ext>
+    </p:extLst>
+  </p:cSld>
+  <p:clrMapOvr>
+    <a:masterClrMapping/>
+  </p:clrMapOvr>
+</p:sld>
+</file>
+
+<file path=ppt/slides/slide13.xml><?xml version="1.0" encoding="utf-8"?>
+<p:sld xmlns:a="http://schemas.openxmlformats.org/drawingml/2006/main" xmlns:r="http://schemas.openxmlformats.org/officeDocument/2006/relationships" xmlns:p="http://schemas.openxmlformats.org/presentationml/2006/main">
+  <p:cSld>
+    <p:spTree>
+      <p:nvGrpSpPr>
+        <p:cNvPr id="1" name=""/>
+        <p:cNvGrpSpPr/>
+        <p:nvPr/>
+      </p:nvGrpSpPr>
+      <p:grpSpPr>
+        <a:xfrm>
+          <a:off x="0" y="0"/>
+          <a:ext cx="0" cy="0"/>
+          <a:chOff x="0" y="0"/>
+          <a:chExt cx="0" cy="0"/>
+        </a:xfrm>
+      </p:grpSpPr>
+      <p:sp>
+        <p:nvSpPr>
+          <p:cNvPr id="2" name="Title 1">
+            <a:extLst>
+              <a:ext uri="{FF2B5EF4-FFF2-40B4-BE49-F238E27FC236}">
+                <a16:creationId xmlns:a16="http://schemas.microsoft.com/office/drawing/2014/main" id="{DA325B3B-EB04-4DFE-AF62-DA7694510789}"/>
+              </a:ext>
+            </a:extLst>
+          </p:cNvPr>
+          <p:cNvSpPr>
+            <a:spLocks noGrp="1"/>
+          </p:cNvSpPr>
+          <p:nvPr>
+            <p:ph type="title"/>
+          </p:nvPr>
+        </p:nvSpPr>
+        <p:spPr/>
+        <p:txBody>
+          <a:bodyPr/>
+          <a:lstStyle/>
+          <a:p>
+            <a:r>
+              <a:rPr lang="en-GB" dirty="0"/>
+              <a:t>considerations</a:t>
+            </a:r>
+          </a:p>
+        </p:txBody>
+      </p:sp>
+      <p:sp>
+        <p:nvSpPr>
+          <p:cNvPr id="3" name="Content Placeholder 2">
+            <a:extLst>
+              <a:ext uri="{FF2B5EF4-FFF2-40B4-BE49-F238E27FC236}">
+                <a16:creationId xmlns:a16="http://schemas.microsoft.com/office/drawing/2014/main" id="{7348DDCC-5EBE-4C1F-B496-7D6BA1B7A59F}"/>
+              </a:ext>
+            </a:extLst>
+          </p:cNvPr>
+          <p:cNvSpPr>
+            <a:spLocks noGrp="1"/>
+          </p:cNvSpPr>
+          <p:nvPr>
+            <p:ph idx="1"/>
+          </p:nvPr>
+        </p:nvSpPr>
+        <p:spPr/>
+        <p:txBody>
+          <a:bodyPr/>
+          <a:lstStyle/>
+          <a:p>
+            <a:r>
+              <a:rPr lang="en-GB" dirty="0"/>
+              <a:t>Code for failure and “bad data” – ON BOTH SIDES</a:t>
+            </a:r>
+          </a:p>
+          <a:p>
+            <a:pPr marL="342900" indent="-342900">
+              <a:buFontTx/>
+              <a:buChar char="-"/>
+            </a:pPr>
+            <a:r>
+              <a:rPr lang="en-GB" dirty="0"/>
+              <a:t>Missing parameters</a:t>
+            </a:r>
+          </a:p>
+          <a:p>
+            <a:pPr marL="342900" indent="-342900">
+              <a:buFontTx/>
+              <a:buChar char="-"/>
+            </a:pPr>
+            <a:r>
+              <a:rPr lang="en-GB" dirty="0"/>
+              <a:t>Invalid </a:t>
+            </a:r>
+            <a:r>
+              <a:rPr lang="en-GB" dirty="0" err="1"/>
+              <a:t>enums</a:t>
+            </a:r>
+            <a:endParaRPr lang="en-GB" dirty="0"/>
+          </a:p>
+          <a:p>
+            <a:pPr marL="342900" indent="-342900">
+              <a:buFontTx/>
+              <a:buChar char="-"/>
+            </a:pPr>
+            <a:endParaRPr lang="en-GB" dirty="0"/>
+          </a:p>
+          <a:p>
+            <a:r>
+              <a:rPr lang="en-GB" dirty="0"/>
+              <a:t>Be careful what you expose</a:t>
+            </a:r>
+          </a:p>
+          <a:p>
+            <a:pPr marL="342900" indent="-342900">
+              <a:buFontTx/>
+              <a:buChar char="-"/>
+            </a:pPr>
+            <a:r>
+              <a:rPr lang="en-GB" dirty="0"/>
+              <a:t>Should your “status” field be editable</a:t>
+            </a:r>
+          </a:p>
+          <a:p>
+            <a:pPr marL="342900" indent="-342900">
+              <a:buFontTx/>
+              <a:buChar char="-"/>
+            </a:pPr>
+            <a:r>
+              <a:rPr lang="en-GB" dirty="0"/>
+              <a:t>Or just set via workflow methods</a:t>
+            </a:r>
+          </a:p>
+        </p:txBody>
+      </p:sp>
+    </p:spTree>
+    <p:extLst>
+      <p:ext uri="{BB962C8B-B14F-4D97-AF65-F5344CB8AC3E}">
+        <p14:creationId xmlns:p14="http://schemas.microsoft.com/office/powerpoint/2010/main" val="776067444"/>
+      </p:ext>
+    </p:extLst>
+  </p:cSld>
+  <p:clrMapOvr>
+    <a:masterClrMapping/>
+  </p:clrMapOvr>
+</p:sld>
+</file>
+
+<file path=ppt/slides/slide14.xml><?xml version="1.0" encoding="utf-8"?>
+<p:sld xmlns:a="http://schemas.openxmlformats.org/drawingml/2006/main" xmlns:r="http://schemas.openxmlformats.org/officeDocument/2006/relationships" xmlns:p="http://schemas.openxmlformats.org/presentationml/2006/main">
+  <p:cSld>
+    <p:spTree>
+      <p:nvGrpSpPr>
+        <p:cNvPr id="1" name=""/>
+        <p:cNvGrpSpPr/>
+        <p:nvPr/>
+      </p:nvGrpSpPr>
+      <p:grpSpPr>
+        <a:xfrm>
+          <a:off x="0" y="0"/>
+          <a:ext cx="0" cy="0"/>
+          <a:chOff x="0" y="0"/>
+          <a:chExt cx="0" cy="0"/>
+        </a:xfrm>
+      </p:grpSpPr>
+      <p:sp>
+        <p:nvSpPr>
+          <p:cNvPr id="2" name="Title 1">
+            <a:extLst>
+              <a:ext uri="{FF2B5EF4-FFF2-40B4-BE49-F238E27FC236}">
+                <a16:creationId xmlns:a16="http://schemas.microsoft.com/office/drawing/2014/main" id="{11F888B0-6184-4E49-BE67-5D21583FAA29}"/>
+              </a:ext>
+            </a:extLst>
+          </p:cNvPr>
+          <p:cNvSpPr>
+            <a:spLocks noGrp="1"/>
+          </p:cNvSpPr>
+          <p:nvPr>
+            <p:ph type="title"/>
+          </p:nvPr>
+        </p:nvSpPr>
+        <p:spPr/>
+        <p:txBody>
+          <a:bodyPr/>
+          <a:lstStyle/>
+          <a:p>
+            <a:r>
+              <a:rPr lang="en-GB" dirty="0"/>
+              <a:t>documentation</a:t>
+            </a:r>
+          </a:p>
+        </p:txBody>
+      </p:sp>
+      <p:sp>
+        <p:nvSpPr>
+          <p:cNvPr id="3" name="Content Placeholder 2">
+            <a:extLst>
+              <a:ext uri="{FF2B5EF4-FFF2-40B4-BE49-F238E27FC236}">
+                <a16:creationId xmlns:a16="http://schemas.microsoft.com/office/drawing/2014/main" id="{5D0BF05F-CB19-4169-8628-60F81EFBE59E}"/>
+              </a:ext>
+            </a:extLst>
+          </p:cNvPr>
+          <p:cNvSpPr>
+            <a:spLocks noGrp="1"/>
+          </p:cNvSpPr>
+          <p:nvPr>
+            <p:ph idx="1"/>
+          </p:nvPr>
+        </p:nvSpPr>
+        <p:spPr/>
+        <p:txBody>
+          <a:bodyPr/>
+          <a:lstStyle/>
+          <a:p>
+            <a:r>
+              <a:rPr lang="en-GB" dirty="0"/>
+              <a:t>Swagger / Open API Specification is standard</a:t>
+            </a:r>
+          </a:p>
+          <a:p>
+            <a:r>
+              <a:rPr lang="en-GB" dirty="0"/>
+              <a:t>Swagger Editor </a:t>
+            </a:r>
+            <a:r>
+              <a:rPr lang="en-GB" dirty="0">
+                <a:hlinkClick r:id="rId2"/>
+              </a:rPr>
+              <a:t>online</a:t>
+            </a:r>
+            <a:r>
+              <a:rPr lang="en-GB" dirty="0"/>
+              <a:t>, local node.js app or Docker</a:t>
+            </a:r>
+          </a:p>
+          <a:p>
+            <a:r>
+              <a:rPr lang="en-GB" dirty="0" err="1">
+                <a:hlinkClick r:id="rId3"/>
+              </a:rPr>
+              <a:t>OpenAPI</a:t>
+            </a:r>
+            <a:r>
+              <a:rPr lang="en-GB" dirty="0">
+                <a:hlinkClick r:id="rId3"/>
+              </a:rPr>
+              <a:t> 3.0</a:t>
+            </a:r>
+            <a:r>
+              <a:rPr lang="en-GB" dirty="0"/>
+              <a:t> released July 2017</a:t>
+            </a:r>
+          </a:p>
+          <a:p>
+            <a:r>
+              <a:rPr lang="en-GB" dirty="0"/>
+              <a:t>	Samples not yet updated</a:t>
+            </a:r>
+          </a:p>
+          <a:p>
+            <a:r>
+              <a:rPr lang="en-GB" dirty="0">
+                <a:hlinkClick r:id="rId4"/>
+              </a:rPr>
+              <a:t>Swagger 2.0</a:t>
+            </a:r>
+            <a:r>
+              <a:rPr lang="en-GB" dirty="0"/>
+              <a:t> has many examples</a:t>
+            </a:r>
+          </a:p>
+          <a:p>
+            <a:r>
+              <a:rPr lang="en-GB" dirty="0">
+                <a:hlinkClick r:id="rId5"/>
+              </a:rPr>
+              <a:t>Swagger Hub</a:t>
+            </a:r>
+            <a:r>
+              <a:rPr lang="en-GB" dirty="0"/>
+              <a:t> or tools like </a:t>
+            </a:r>
+            <a:r>
+              <a:rPr lang="en-GB" dirty="0" err="1">
+                <a:hlinkClick r:id="rId6"/>
+              </a:rPr>
+              <a:t>Mermade</a:t>
+            </a:r>
+            <a:r>
+              <a:rPr lang="en-GB" dirty="0"/>
+              <a:t> will convert</a:t>
+            </a:r>
+          </a:p>
+          <a:p>
+            <a:r>
+              <a:rPr lang="en-GB" dirty="0">
+                <a:hlinkClick r:id="rId7"/>
+              </a:rPr>
+              <a:t>Swagger UI</a:t>
+            </a:r>
+            <a:r>
+              <a:rPr lang="en-GB" dirty="0"/>
+              <a:t> allows testing against actual server</a:t>
+            </a:r>
+          </a:p>
+          <a:p>
+            <a:r>
+              <a:rPr lang="en-GB" dirty="0">
+                <a:hlinkClick r:id="rId8"/>
+              </a:rPr>
+              <a:t>Swagger mock server</a:t>
+            </a:r>
+            <a:r>
+              <a:rPr lang="en-GB" dirty="0"/>
+              <a:t> can be created</a:t>
+            </a:r>
+          </a:p>
+        </p:txBody>
+      </p:sp>
+    </p:spTree>
+    <p:extLst>
+      <p:ext uri="{BB962C8B-B14F-4D97-AF65-F5344CB8AC3E}">
+        <p14:creationId xmlns:p14="http://schemas.microsoft.com/office/powerpoint/2010/main" val="3390775355"/>
+      </p:ext>
+    </p:extLst>
+  </p:cSld>
+  <p:clrMapOvr>
+    <a:masterClrMapping/>
+  </p:clrMapOvr>
+</p:sld>
+</file>
+
+<file path=ppt/slides/slide15.xml><?xml version="1.0" encoding="utf-8"?>
+<p:sld xmlns:a="http://schemas.openxmlformats.org/drawingml/2006/main" xmlns:r="http://schemas.openxmlformats.org/officeDocument/2006/relationships" xmlns:p="http://schemas.openxmlformats.org/presentationml/2006/main">
+  <p:cSld>
+    <p:spTree>
+      <p:nvGrpSpPr>
+        <p:cNvPr id="1" name=""/>
+        <p:cNvGrpSpPr/>
+        <p:nvPr/>
+      </p:nvGrpSpPr>
+      <p:grpSpPr>
+        <a:xfrm>
+          <a:off x="0" y="0"/>
+          <a:ext cx="0" cy="0"/>
+          <a:chOff x="0" y="0"/>
+          <a:chExt cx="0" cy="0"/>
+        </a:xfrm>
+      </p:grpSpPr>
+      <p:sp>
+        <p:nvSpPr>
+          <p:cNvPr id="2" name="Title 1">
+            <a:extLst>
+              <a:ext uri="{FF2B5EF4-FFF2-40B4-BE49-F238E27FC236}">
+                <a16:creationId xmlns:a16="http://schemas.microsoft.com/office/drawing/2014/main" id="{05AAFF9C-9D60-456C-9619-912E3CFE5A22}"/>
+              </a:ext>
+            </a:extLst>
+          </p:cNvPr>
+          <p:cNvSpPr>
+            <a:spLocks noGrp="1"/>
+          </p:cNvSpPr>
+          <p:nvPr>
+            <p:ph type="title"/>
+          </p:nvPr>
+        </p:nvSpPr>
+        <p:spPr/>
+        <p:txBody>
+          <a:bodyPr/>
+          <a:lstStyle/>
+          <a:p>
+            <a:r>
+              <a:rPr lang="en-GB" sz="4400" dirty="0"/>
+              <a:t>Creating a swagger definition</a:t>
+            </a:r>
+            <a:endParaRPr lang="en-GB" dirty="0"/>
+          </a:p>
+        </p:txBody>
+      </p:sp>
+      <p:sp>
+        <p:nvSpPr>
+          <p:cNvPr id="3" name="Content Placeholder 2">
+            <a:extLst>
+              <a:ext uri="{FF2B5EF4-FFF2-40B4-BE49-F238E27FC236}">
+                <a16:creationId xmlns:a16="http://schemas.microsoft.com/office/drawing/2014/main" id="{C94BB55B-6C89-4F4B-A953-BD358C4216B6}"/>
+              </a:ext>
+            </a:extLst>
+          </p:cNvPr>
+          <p:cNvSpPr>
+            <a:spLocks noGrp="1"/>
+          </p:cNvSpPr>
+          <p:nvPr>
+            <p:ph idx="1"/>
+          </p:nvPr>
+        </p:nvSpPr>
+        <p:spPr/>
+        <p:txBody>
+          <a:bodyPr/>
+          <a:lstStyle/>
+          <a:p>
+            <a:r>
+              <a:rPr lang="en-GB" dirty="0"/>
+              <a:t>Write as YAML or JSON</a:t>
+            </a:r>
+          </a:p>
+          <a:p>
+            <a:pPr marL="901700" indent="-901700"/>
+            <a:r>
+              <a:rPr lang="en-GB" dirty="0"/>
+              <a:t>	YAML – no quotes around strings, no commas, no curly braces</a:t>
+            </a:r>
+          </a:p>
+          <a:p>
+            <a:r>
+              <a:rPr lang="en-GB" dirty="0" err="1"/>
+              <a:t>operationIds</a:t>
+            </a:r>
+            <a:r>
+              <a:rPr lang="en-GB" dirty="0"/>
+              <a:t> can be added</a:t>
+            </a:r>
+          </a:p>
+          <a:p>
+            <a:r>
+              <a:rPr lang="en-GB" dirty="0"/>
+              <a:t>	If used, required on all for that path</a:t>
+            </a:r>
+          </a:p>
+          <a:p>
+            <a:r>
+              <a:rPr lang="en-GB" dirty="0"/>
+              <a:t>Use </a:t>
+            </a:r>
+            <a:r>
+              <a:rPr lang="en-GB" dirty="0" err="1"/>
+              <a:t>enums</a:t>
+            </a:r>
+            <a:r>
+              <a:rPr lang="en-GB" dirty="0"/>
+              <a:t> for options</a:t>
+            </a:r>
+          </a:p>
+          <a:p>
+            <a:r>
+              <a:rPr lang="en-GB" dirty="0" err="1"/>
+              <a:t>OpenAPI</a:t>
+            </a:r>
+            <a:r>
+              <a:rPr lang="en-GB" dirty="0"/>
+              <a:t> 3.0 allows examples, but </a:t>
+            </a:r>
+            <a:r>
+              <a:rPr lang="en-GB" b="1" dirty="0"/>
+              <a:t>clarify and add value</a:t>
+            </a:r>
+          </a:p>
+          <a:p>
+            <a:r>
+              <a:rPr lang="en-GB" dirty="0"/>
+              <a:t>“Framework for good documentation”, does not guarantee good documentation</a:t>
+            </a:r>
+            <a:endParaRPr lang="en-GB" b="1" dirty="0"/>
+          </a:p>
+          <a:p>
+            <a:endParaRPr lang="en-GB" dirty="0"/>
+          </a:p>
+        </p:txBody>
+      </p:sp>
+    </p:spTree>
+    <p:extLst>
+      <p:ext uri="{BB962C8B-B14F-4D97-AF65-F5344CB8AC3E}">
+        <p14:creationId xmlns:p14="http://schemas.microsoft.com/office/powerpoint/2010/main" val="3409692770"/>
+      </p:ext>
+    </p:extLst>
+  </p:cSld>
+  <p:clrMapOvr>
+    <a:masterClrMapping/>
+  </p:clrMapOvr>
+</p:sld>
+</file>
+
+<file path=ppt/slides/slide16.xml><?xml version="1.0" encoding="utf-8"?>
+<p:sld xmlns:a="http://schemas.openxmlformats.org/drawingml/2006/main" xmlns:r="http://schemas.openxmlformats.org/officeDocument/2006/relationships" xmlns:p="http://schemas.openxmlformats.org/presentationml/2006/main">
+  <p:cSld>
+    <p:spTree>
+      <p:nvGrpSpPr>
+        <p:cNvPr id="1" name=""/>
+        <p:cNvGrpSpPr/>
+        <p:nvPr/>
+      </p:nvGrpSpPr>
+      <p:grpSpPr>
+        <a:xfrm>
+          <a:off x="0" y="0"/>
+          <a:ext cx="0" cy="0"/>
+          <a:chOff x="0" y="0"/>
+          <a:chExt cx="0" cy="0"/>
+        </a:xfrm>
+      </p:grpSpPr>
+      <p:sp>
+        <p:nvSpPr>
+          <p:cNvPr id="2" name="Title 1">
+            <a:extLst>
+              <a:ext uri="{FF2B5EF4-FFF2-40B4-BE49-F238E27FC236}">
+                <a16:creationId xmlns:a16="http://schemas.microsoft.com/office/drawing/2014/main" id="{701EB0D4-BE51-4EB9-95BA-1387E3008DA7}"/>
+              </a:ext>
+            </a:extLst>
+          </p:cNvPr>
+          <p:cNvSpPr>
+            <a:spLocks noGrp="1"/>
+          </p:cNvSpPr>
+          <p:nvPr>
+            <p:ph type="title"/>
+          </p:nvPr>
+        </p:nvSpPr>
+        <p:spPr/>
+        <p:txBody>
+          <a:bodyPr/>
+          <a:lstStyle/>
+          <a:p>
+            <a:r>
+              <a:rPr lang="en-GB" dirty="0"/>
+              <a:t>testing</a:t>
+            </a:r>
+          </a:p>
+        </p:txBody>
+      </p:sp>
+      <p:sp>
+        <p:nvSpPr>
+          <p:cNvPr id="3" name="Content Placeholder 2">
+            <a:extLst>
+              <a:ext uri="{FF2B5EF4-FFF2-40B4-BE49-F238E27FC236}">
+                <a16:creationId xmlns:a16="http://schemas.microsoft.com/office/drawing/2014/main" id="{090C2521-717E-412B-B21A-03628179FB11}"/>
+              </a:ext>
+            </a:extLst>
+          </p:cNvPr>
+          <p:cNvSpPr>
+            <a:spLocks noGrp="1"/>
+          </p:cNvSpPr>
+          <p:nvPr>
+            <p:ph idx="1"/>
+          </p:nvPr>
+        </p:nvSpPr>
+        <p:spPr/>
+        <p:txBody>
+          <a:bodyPr/>
+          <a:lstStyle/>
+          <a:p>
+            <a:r>
+              <a:rPr lang="en-GB" dirty="0"/>
+              <a:t>Various REST service tools are available</a:t>
+            </a:r>
+          </a:p>
+          <a:p>
+            <a:pPr marL="342900" indent="-342900">
+              <a:buFontTx/>
+              <a:buChar char="-"/>
+            </a:pPr>
+            <a:r>
+              <a:rPr lang="en-GB" dirty="0"/>
+              <a:t>Postman (Electron desktop app)</a:t>
+            </a:r>
+          </a:p>
+          <a:p>
+            <a:pPr marL="342900" indent="-342900">
+              <a:buFontTx/>
+              <a:buChar char="-"/>
+            </a:pPr>
+            <a:r>
+              <a:rPr lang="en-GB" dirty="0" err="1"/>
+              <a:t>RestClient</a:t>
+            </a:r>
+            <a:r>
+              <a:rPr lang="en-GB" dirty="0"/>
+              <a:t> plugin for Firefox</a:t>
+            </a:r>
+          </a:p>
+        </p:txBody>
+      </p:sp>
+    </p:spTree>
+    <p:extLst>
+      <p:ext uri="{BB962C8B-B14F-4D97-AF65-F5344CB8AC3E}">
+        <p14:creationId xmlns:p14="http://schemas.microsoft.com/office/powerpoint/2010/main" val="1453544228"/>
+      </p:ext>
+    </p:extLst>
+  </p:cSld>
+  <p:clrMapOvr>
+    <a:masterClrMapping/>
+  </p:clrMapOvr>
+</p:sld>
+</file>
+
+<file path=ppt/slides/slide17.xml><?xml version="1.0" encoding="utf-8"?>
+<p:sld xmlns:a="http://schemas.openxmlformats.org/drawingml/2006/main" xmlns:r="http://schemas.openxmlformats.org/officeDocument/2006/relationships" xmlns:p="http://schemas.openxmlformats.org/presentationml/2006/main">
+  <p:cSld>
+    <p:spTree>
+      <p:nvGrpSpPr>
+        <p:cNvPr id="1" name=""/>
+        <p:cNvGrpSpPr/>
+        <p:nvPr/>
+      </p:nvGrpSpPr>
+      <p:grpSpPr>
+        <a:xfrm>
+          <a:off x="0" y="0"/>
+          <a:ext cx="0" cy="0"/>
+          <a:chOff x="0" y="0"/>
+          <a:chExt cx="0" cy="0"/>
+        </a:xfrm>
+      </p:grpSpPr>
+      <p:sp>
+        <p:nvSpPr>
+          <p:cNvPr id="2" name="Title 1">
+            <a:extLst>
+              <a:ext uri="{FF2B5EF4-FFF2-40B4-BE49-F238E27FC236}">
+                <a16:creationId xmlns:a16="http://schemas.microsoft.com/office/drawing/2014/main" id="{BDDECFA5-674E-480C-9B09-ECB6EAFBCFD0}"/>
+              </a:ext>
+            </a:extLst>
+          </p:cNvPr>
+          <p:cNvSpPr>
+            <a:spLocks noGrp="1"/>
+          </p:cNvSpPr>
+          <p:nvPr>
+            <p:ph type="title"/>
+          </p:nvPr>
+        </p:nvSpPr>
+        <p:spPr/>
+        <p:txBody>
+          <a:bodyPr/>
+          <a:lstStyle/>
+          <a:p>
+            <a:r>
+              <a:rPr lang="en-GB" dirty="0"/>
+              <a:t>HTTP status codes</a:t>
+            </a:r>
+          </a:p>
+        </p:txBody>
+      </p:sp>
+      <p:sp>
+        <p:nvSpPr>
+          <p:cNvPr id="3" name="Content Placeholder 2">
+            <a:extLst>
+              <a:ext uri="{FF2B5EF4-FFF2-40B4-BE49-F238E27FC236}">
+                <a16:creationId xmlns:a16="http://schemas.microsoft.com/office/drawing/2014/main" id="{7E62BE25-35A8-46F0-8E50-33C5CC9893D2}"/>
+              </a:ext>
+            </a:extLst>
+          </p:cNvPr>
+          <p:cNvSpPr>
+            <a:spLocks noGrp="1"/>
+          </p:cNvSpPr>
+          <p:nvPr>
+            <p:ph idx="1"/>
+          </p:nvPr>
+        </p:nvSpPr>
+        <p:spPr/>
+        <p:txBody>
+          <a:bodyPr/>
+          <a:lstStyle/>
+          <a:p>
+            <a:r>
+              <a:rPr lang="en-GB" dirty="0"/>
+              <a:t>1xx – Received and understood, stand by…</a:t>
+            </a:r>
+          </a:p>
+          <a:p>
+            <a:r>
+              <a:rPr lang="en-GB" dirty="0"/>
+              <a:t>2xx – Received, understood and accepted</a:t>
+            </a:r>
+          </a:p>
+          <a:p>
+            <a:r>
+              <a:rPr lang="en-GB" dirty="0"/>
+              <a:t>3xx – Redirecting</a:t>
+            </a:r>
+          </a:p>
+          <a:p>
+            <a:r>
+              <a:rPr lang="en-GB" dirty="0"/>
+              <a:t>4xx – You did something wrong!</a:t>
+            </a:r>
+          </a:p>
+          <a:p>
+            <a:r>
+              <a:rPr lang="en-GB" dirty="0"/>
+              <a:t>5xx – We did something wrong!</a:t>
+            </a:r>
+          </a:p>
+          <a:p>
+            <a:endParaRPr lang="en-GB" dirty="0"/>
+          </a:p>
+          <a:p>
+            <a:r>
+              <a:rPr lang="en-GB" dirty="0"/>
+              <a:t>See </a:t>
+            </a:r>
+            <a:r>
+              <a:rPr lang="en-GB" dirty="0">
+                <a:hlinkClick r:id="rId2"/>
+              </a:rPr>
+              <a:t>Wikipedia</a:t>
+            </a:r>
+            <a:endParaRPr lang="en-GB" dirty="0"/>
+          </a:p>
+        </p:txBody>
+      </p:sp>
+    </p:spTree>
+    <p:extLst>
+      <p:ext uri="{BB962C8B-B14F-4D97-AF65-F5344CB8AC3E}">
+        <p14:creationId xmlns:p14="http://schemas.microsoft.com/office/powerpoint/2010/main" val="2800926257"/>
+      </p:ext>
+    </p:extLst>
+  </p:cSld>
+  <p:clrMapOvr>
+    <a:masterClrMapping/>
+  </p:clrMapOvr>
+</p:sld>
+</file>
+
+<file path=ppt/slides/slide18.xml><?xml version="1.0" encoding="utf-8"?>
+<p:sld xmlns:a="http://schemas.openxmlformats.org/drawingml/2006/main" xmlns:r="http://schemas.openxmlformats.org/officeDocument/2006/relationships" xmlns:p="http://schemas.openxmlformats.org/presentationml/2006/main">
+  <p:cSld>
+    <p:spTree>
+      <p:nvGrpSpPr>
+        <p:cNvPr id="1" name=""/>
+        <p:cNvGrpSpPr/>
+        <p:nvPr/>
+      </p:nvGrpSpPr>
+      <p:grpSpPr>
+        <a:xfrm>
+          <a:off x="0" y="0"/>
+          <a:ext cx="0" cy="0"/>
+          <a:chOff x="0" y="0"/>
+          <a:chExt cx="0" cy="0"/>
+        </a:xfrm>
+      </p:grpSpPr>
+      <p:sp>
+        <p:nvSpPr>
+          <p:cNvPr id="2" name="Title 1">
+            <a:extLst>
+              <a:ext uri="{FF2B5EF4-FFF2-40B4-BE49-F238E27FC236}">
+                <a16:creationId xmlns:a16="http://schemas.microsoft.com/office/drawing/2014/main" id="{28D4950E-C911-48D5-B236-0A6C79E2A3E6}"/>
+              </a:ext>
+            </a:extLst>
+          </p:cNvPr>
+          <p:cNvSpPr>
+            <a:spLocks noGrp="1"/>
+          </p:cNvSpPr>
+          <p:nvPr>
+            <p:ph type="title"/>
+          </p:nvPr>
+        </p:nvSpPr>
+        <p:spPr/>
+        <p:txBody>
+          <a:bodyPr/>
+          <a:lstStyle/>
+          <a:p>
+            <a:r>
+              <a:rPr lang="en-GB" dirty="0"/>
+              <a:t>http status codes</a:t>
+            </a:r>
+          </a:p>
+        </p:txBody>
+      </p:sp>
+      <p:sp>
+        <p:nvSpPr>
+          <p:cNvPr id="3" name="Content Placeholder 2">
+            <a:extLst>
+              <a:ext uri="{FF2B5EF4-FFF2-40B4-BE49-F238E27FC236}">
+                <a16:creationId xmlns:a16="http://schemas.microsoft.com/office/drawing/2014/main" id="{D2C3A57F-87ED-48C2-9CAC-38FA5FE319DC}"/>
+              </a:ext>
+            </a:extLst>
+          </p:cNvPr>
+          <p:cNvSpPr>
+            <a:spLocks noGrp="1"/>
+          </p:cNvSpPr>
+          <p:nvPr>
+            <p:ph idx="1"/>
+          </p:nvPr>
+        </p:nvSpPr>
+        <p:spPr/>
+        <p:txBody>
+          <a:bodyPr/>
+          <a:lstStyle/>
+          <a:p>
+            <a:r>
+              <a:rPr lang="en-GB" dirty="0"/>
+              <a:t>200 – OK</a:t>
+            </a:r>
+          </a:p>
+          <a:p>
+            <a:r>
+              <a:rPr lang="en-GB" dirty="0"/>
+              <a:t>202 – Accepted for processing</a:t>
+            </a:r>
+          </a:p>
+          <a:p>
+            <a:r>
+              <a:rPr lang="en-GB" dirty="0"/>
+              <a:t>302 – URL found but server is redirecting</a:t>
+            </a:r>
+          </a:p>
+          <a:p>
+            <a:r>
+              <a:rPr lang="en-GB" dirty="0"/>
+              <a:t>400 – Bad request</a:t>
+            </a:r>
+          </a:p>
+          <a:p>
+            <a:r>
+              <a:rPr lang="en-GB" dirty="0"/>
+              <a:t>401 – Unauthorised</a:t>
+            </a:r>
+          </a:p>
+          <a:p>
+            <a:r>
+              <a:rPr lang="en-GB" dirty="0"/>
+              <a:t>403 – Forbidden</a:t>
+            </a:r>
+          </a:p>
+          <a:p>
+            <a:r>
+              <a:rPr lang="en-GB" dirty="0"/>
+              <a:t>404 – Not found</a:t>
+            </a:r>
+          </a:p>
+          <a:p>
+            <a:r>
+              <a:rPr lang="en-GB" dirty="0"/>
+              <a:t>405 – Method not allowed</a:t>
+            </a:r>
+          </a:p>
+          <a:p>
+            <a:r>
+              <a:rPr lang="en-GB" dirty="0"/>
+              <a:t>500 – Internal server error</a:t>
+            </a:r>
+          </a:p>
+        </p:txBody>
+      </p:sp>
+    </p:spTree>
+    <p:extLst>
+      <p:ext uri="{BB962C8B-B14F-4D97-AF65-F5344CB8AC3E}">
+        <p14:creationId xmlns:p14="http://schemas.microsoft.com/office/powerpoint/2010/main" val="397643937"/>
+      </p:ext>
+    </p:extLst>
+  </p:cSld>
+  <p:clrMapOvr>
+    <a:masterClrMapping/>
+  </p:clrMapOvr>
+</p:sld>
+</file>
+
+<file path=ppt/slides/slide19.xml><?xml version="1.0" encoding="utf-8"?>
+<p:sld xmlns:a="http://schemas.openxmlformats.org/drawingml/2006/main" xmlns:r="http://schemas.openxmlformats.org/officeDocument/2006/relationships" xmlns:p="http://schemas.openxmlformats.org/presentationml/2006/main">
+  <p:cSld>
+    <p:spTree>
+      <p:nvGrpSpPr>
+        <p:cNvPr id="1" name=""/>
+        <p:cNvGrpSpPr/>
+        <p:nvPr/>
+      </p:nvGrpSpPr>
+      <p:grpSpPr>
+        <a:xfrm>
+          <a:off x="0" y="0"/>
+          <a:ext cx="0" cy="0"/>
+          <a:chOff x="0" y="0"/>
+          <a:chExt cx="0" cy="0"/>
+        </a:xfrm>
+      </p:grpSpPr>
+      <p:sp>
+        <p:nvSpPr>
+          <p:cNvPr id="4" name="Title 3">
+            <a:extLst>
+              <a:ext uri="{FF2B5EF4-FFF2-40B4-BE49-F238E27FC236}">
+                <a16:creationId xmlns:a16="http://schemas.microsoft.com/office/drawing/2014/main" id="{380905A8-B705-4037-8A33-724430522F63}"/>
+              </a:ext>
+            </a:extLst>
+          </p:cNvPr>
+          <p:cNvSpPr>
+            <a:spLocks noGrp="1"/>
+          </p:cNvSpPr>
+          <p:nvPr>
+            <p:ph type="ctrTitle"/>
+          </p:nvPr>
+        </p:nvSpPr>
+        <p:spPr/>
+        <p:txBody>
+          <a:bodyPr/>
+          <a:lstStyle/>
+          <a:p>
+            <a:r>
+              <a:rPr lang="en-GB" dirty="0"/>
+              <a:t>What about scheduled tasks?</a:t>
+            </a:r>
+          </a:p>
+        </p:txBody>
+      </p:sp>
+    </p:spTree>
+    <p:extLst>
+      <p:ext uri="{BB962C8B-B14F-4D97-AF65-F5344CB8AC3E}">
+        <p14:creationId xmlns:p14="http://schemas.microsoft.com/office/powerpoint/2010/main" val="508418059"/>
       </p:ext>
     </p:extLst>
   </p:cSld>
@@ -4647,6 +5960,526 @@
 </p:sld>
 </file>
 
+<file path=ppt/slides/slide20.xml><?xml version="1.0" encoding="utf-8"?>
+<p:sld xmlns:a="http://schemas.openxmlformats.org/drawingml/2006/main" xmlns:r="http://schemas.openxmlformats.org/officeDocument/2006/relationships" xmlns:p="http://schemas.openxmlformats.org/presentationml/2006/main">
+  <p:cSld>
+    <p:spTree>
+      <p:nvGrpSpPr>
+        <p:cNvPr id="1" name=""/>
+        <p:cNvGrpSpPr/>
+        <p:nvPr/>
+      </p:nvGrpSpPr>
+      <p:grpSpPr>
+        <a:xfrm>
+          <a:off x="0" y="0"/>
+          <a:ext cx="0" cy="0"/>
+          <a:chOff x="0" y="0"/>
+          <a:chExt cx="0" cy="0"/>
+        </a:xfrm>
+      </p:grpSpPr>
+      <p:sp>
+        <p:nvSpPr>
+          <p:cNvPr id="4" name="Title 3">
+            <a:extLst>
+              <a:ext uri="{FF2B5EF4-FFF2-40B4-BE49-F238E27FC236}">
+                <a16:creationId xmlns:a16="http://schemas.microsoft.com/office/drawing/2014/main" id="{5F661A78-1620-4819-8674-16466DDEA36A}"/>
+              </a:ext>
+            </a:extLst>
+          </p:cNvPr>
+          <p:cNvSpPr>
+            <a:spLocks noGrp="1"/>
+          </p:cNvSpPr>
+          <p:nvPr>
+            <p:ph type="title"/>
+          </p:nvPr>
+        </p:nvSpPr>
+        <p:spPr/>
+        <p:txBody>
+          <a:bodyPr/>
+          <a:lstStyle/>
+          <a:p>
+            <a:r>
+              <a:rPr lang="en-GB" dirty="0"/>
+              <a:t>Scheduled tasks</a:t>
+            </a:r>
+          </a:p>
+        </p:txBody>
+      </p:sp>
+      <p:sp>
+        <p:nvSpPr>
+          <p:cNvPr id="5" name="Content Placeholder 4">
+            <a:extLst>
+              <a:ext uri="{FF2B5EF4-FFF2-40B4-BE49-F238E27FC236}">
+                <a16:creationId xmlns:a16="http://schemas.microsoft.com/office/drawing/2014/main" id="{D8951B21-ADD7-4D86-B572-B18845D6A0F7}"/>
+              </a:ext>
+            </a:extLst>
+          </p:cNvPr>
+          <p:cNvSpPr>
+            <a:spLocks noGrp="1"/>
+          </p:cNvSpPr>
+          <p:nvPr>
+            <p:ph idx="1"/>
+          </p:nvPr>
+        </p:nvSpPr>
+        <p:spPr/>
+        <p:txBody>
+          <a:bodyPr/>
+          <a:lstStyle/>
+          <a:p>
+            <a:r>
+              <a:rPr lang="en-GB" dirty="0"/>
+              <a:t>Agents</a:t>
+            </a:r>
+          </a:p>
+          <a:p>
+            <a:r>
+              <a:rPr lang="en-GB" dirty="0"/>
+              <a:t>	NSF only, language constraints</a:t>
+            </a:r>
+          </a:p>
+          <a:p>
+            <a:r>
+              <a:rPr lang="en-GB" dirty="0"/>
+              <a:t>DOTS</a:t>
+            </a:r>
+          </a:p>
+          <a:p>
+            <a:r>
+              <a:rPr lang="en-GB" dirty="0"/>
+              <a:t>	Server only, deployment constraints</a:t>
+            </a:r>
+          </a:p>
+          <a:p>
+            <a:endParaRPr lang="en-GB" dirty="0"/>
+          </a:p>
+          <a:p>
+            <a:pPr algn="ctr"/>
+            <a:r>
+              <a:rPr lang="en-GB" dirty="0"/>
+              <a:t>How about a different approach?</a:t>
+            </a:r>
+          </a:p>
+        </p:txBody>
+      </p:sp>
+    </p:spTree>
+    <p:extLst>
+      <p:ext uri="{BB962C8B-B14F-4D97-AF65-F5344CB8AC3E}">
+        <p14:creationId xmlns:p14="http://schemas.microsoft.com/office/powerpoint/2010/main" val="1206375528"/>
+      </p:ext>
+    </p:extLst>
+  </p:cSld>
+  <p:clrMapOvr>
+    <a:masterClrMapping/>
+  </p:clrMapOvr>
+</p:sld>
+</file>
+
+<file path=ppt/slides/slide21.xml><?xml version="1.0" encoding="utf-8"?>
+<p:sld xmlns:a="http://schemas.openxmlformats.org/drawingml/2006/main" xmlns:r="http://schemas.openxmlformats.org/officeDocument/2006/relationships" xmlns:p="http://schemas.openxmlformats.org/presentationml/2006/main">
+  <p:cSld>
+    <p:spTree>
+      <p:nvGrpSpPr>
+        <p:cNvPr id="1" name=""/>
+        <p:cNvGrpSpPr/>
+        <p:nvPr/>
+      </p:nvGrpSpPr>
+      <p:grpSpPr>
+        <a:xfrm>
+          <a:off x="0" y="0"/>
+          <a:ext cx="0" cy="0"/>
+          <a:chOff x="0" y="0"/>
+          <a:chExt cx="0" cy="0"/>
+        </a:xfrm>
+      </p:grpSpPr>
+      <p:sp>
+        <p:nvSpPr>
+          <p:cNvPr id="2" name="Title 1">
+            <a:extLst>
+              <a:ext uri="{FF2B5EF4-FFF2-40B4-BE49-F238E27FC236}">
+                <a16:creationId xmlns:a16="http://schemas.microsoft.com/office/drawing/2014/main" id="{004A5E56-F513-4A94-A58F-4235E160341C}"/>
+              </a:ext>
+            </a:extLst>
+          </p:cNvPr>
+          <p:cNvSpPr>
+            <a:spLocks noGrp="1"/>
+          </p:cNvSpPr>
+          <p:nvPr>
+            <p:ph type="title"/>
+          </p:nvPr>
+        </p:nvSpPr>
+        <p:spPr/>
+        <p:txBody>
+          <a:bodyPr/>
+          <a:lstStyle/>
+          <a:p>
+            <a:r>
+              <a:rPr lang="en-GB" dirty="0"/>
+              <a:t>Rest + node-red = flexibility</a:t>
+            </a:r>
+          </a:p>
+        </p:txBody>
+      </p:sp>
+      <p:sp>
+        <p:nvSpPr>
+          <p:cNvPr id="3" name="Content Placeholder 2">
+            <a:extLst>
+              <a:ext uri="{FF2B5EF4-FFF2-40B4-BE49-F238E27FC236}">
+                <a16:creationId xmlns:a16="http://schemas.microsoft.com/office/drawing/2014/main" id="{3FAAA951-B22E-4803-A2C0-9CF1E7E33F9E}"/>
+              </a:ext>
+            </a:extLst>
+          </p:cNvPr>
+          <p:cNvSpPr>
+            <a:spLocks noGrp="1"/>
+          </p:cNvSpPr>
+          <p:nvPr>
+            <p:ph idx="1"/>
+          </p:nvPr>
+        </p:nvSpPr>
+        <p:spPr/>
+        <p:txBody>
+          <a:bodyPr/>
+          <a:lstStyle/>
+          <a:p>
+            <a:r>
+              <a:rPr lang="en-GB" dirty="0"/>
+              <a:t>REST</a:t>
+            </a:r>
+          </a:p>
+          <a:p>
+            <a:r>
+              <a:rPr lang="en-GB" dirty="0"/>
+              <a:t>	</a:t>
+            </a:r>
+            <a:r>
+              <a:rPr lang="en-GB" dirty="0" err="1"/>
+              <a:t>XAgent</a:t>
+            </a:r>
+            <a:r>
+              <a:rPr lang="en-GB" dirty="0"/>
+              <a:t> / </a:t>
+            </a:r>
+            <a:r>
+              <a:rPr lang="en-GB" dirty="0" err="1"/>
+              <a:t>SmartNSF</a:t>
+            </a:r>
+            <a:r>
+              <a:rPr lang="en-GB" dirty="0"/>
+              <a:t> / REST endpoint</a:t>
+            </a:r>
+          </a:p>
+          <a:p>
+            <a:r>
+              <a:rPr lang="en-GB" dirty="0"/>
+              <a:t>	Use </a:t>
+            </a:r>
+            <a:r>
+              <a:rPr lang="en-GB" dirty="0" err="1"/>
+              <a:t>Xots</a:t>
+            </a:r>
+            <a:r>
+              <a:rPr lang="en-GB" dirty="0"/>
+              <a:t> for background processing</a:t>
+            </a:r>
+          </a:p>
+          <a:p>
+            <a:r>
+              <a:rPr lang="en-GB" dirty="0"/>
+              <a:t>	Utility methods added to ODA to boilerplate</a:t>
+            </a:r>
+          </a:p>
+          <a:p>
+            <a:r>
+              <a:rPr lang="en-GB" dirty="0"/>
+              <a:t>Node-RED</a:t>
+            </a:r>
+          </a:p>
+          <a:p>
+            <a:r>
+              <a:rPr lang="en-GB" dirty="0"/>
+              <a:t>	Scheduling and flows</a:t>
+            </a:r>
+          </a:p>
+          <a:p>
+            <a:pPr marL="901700" indent="-901700"/>
+            <a:r>
+              <a:rPr lang="en-GB" dirty="0"/>
+              <a:t>	Other schedulers would work, as long as they can call a REST service</a:t>
+            </a:r>
+          </a:p>
+        </p:txBody>
+      </p:sp>
+    </p:spTree>
+    <p:extLst>
+      <p:ext uri="{BB962C8B-B14F-4D97-AF65-F5344CB8AC3E}">
+        <p14:creationId xmlns:p14="http://schemas.microsoft.com/office/powerpoint/2010/main" val="3690183967"/>
+      </p:ext>
+    </p:extLst>
+  </p:cSld>
+  <p:clrMapOvr>
+    <a:masterClrMapping/>
+  </p:clrMapOvr>
+</p:sld>
+</file>
+
+<file path=ppt/slides/slide22.xml><?xml version="1.0" encoding="utf-8"?>
+<p:sld xmlns:a="http://schemas.openxmlformats.org/drawingml/2006/main" xmlns:r="http://schemas.openxmlformats.org/officeDocument/2006/relationships" xmlns:p="http://schemas.openxmlformats.org/presentationml/2006/main">
+  <p:cSld>
+    <p:spTree>
+      <p:nvGrpSpPr>
+        <p:cNvPr id="1" name=""/>
+        <p:cNvGrpSpPr/>
+        <p:nvPr/>
+      </p:nvGrpSpPr>
+      <p:grpSpPr>
+        <a:xfrm>
+          <a:off x="0" y="0"/>
+          <a:ext cx="0" cy="0"/>
+          <a:chOff x="0" y="0"/>
+          <a:chExt cx="0" cy="0"/>
+        </a:xfrm>
+      </p:grpSpPr>
+      <p:sp>
+        <p:nvSpPr>
+          <p:cNvPr id="2" name="Title 1">
+            <a:extLst>
+              <a:ext uri="{FF2B5EF4-FFF2-40B4-BE49-F238E27FC236}">
+                <a16:creationId xmlns:a16="http://schemas.microsoft.com/office/drawing/2014/main" id="{C6E669E2-BE11-4459-8C18-5C4763A43502}"/>
+              </a:ext>
+            </a:extLst>
+          </p:cNvPr>
+          <p:cNvSpPr>
+            <a:spLocks noGrp="1"/>
+          </p:cNvSpPr>
+          <p:nvPr>
+            <p:ph type="title"/>
+          </p:nvPr>
+        </p:nvSpPr>
+        <p:spPr/>
+        <p:txBody>
+          <a:bodyPr/>
+          <a:lstStyle/>
+          <a:p>
+            <a:r>
+              <a:rPr lang="en-GB" dirty="0"/>
+              <a:t>Node-red</a:t>
+            </a:r>
+          </a:p>
+        </p:txBody>
+      </p:sp>
+      <p:sp>
+        <p:nvSpPr>
+          <p:cNvPr id="3" name="Content Placeholder 2">
+            <a:extLst>
+              <a:ext uri="{FF2B5EF4-FFF2-40B4-BE49-F238E27FC236}">
+                <a16:creationId xmlns:a16="http://schemas.microsoft.com/office/drawing/2014/main" id="{04E0A162-6297-49FF-BA4C-61E31142ED8B}"/>
+              </a:ext>
+            </a:extLst>
+          </p:cNvPr>
+          <p:cNvSpPr>
+            <a:spLocks noGrp="1"/>
+          </p:cNvSpPr>
+          <p:nvPr>
+            <p:ph idx="1"/>
+          </p:nvPr>
+        </p:nvSpPr>
+        <p:spPr>
+          <a:xfrm>
+            <a:off x="266699" y="1933349"/>
+            <a:ext cx="8293101" cy="4421991"/>
+          </a:xfrm>
+        </p:spPr>
+        <p:txBody>
+          <a:bodyPr/>
+          <a:lstStyle/>
+          <a:p>
+            <a:r>
+              <a:rPr lang="en-GB" dirty="0"/>
+              <a:t>Available on IBM Cloud, local node.js app or Docker</a:t>
+            </a:r>
+          </a:p>
+          <a:p>
+            <a:pPr marL="901700" indent="-901700"/>
+            <a:r>
+              <a:rPr lang="en-GB" dirty="0"/>
+              <a:t>	Docker containers not aware of host’s “localhost” or other containers</a:t>
+            </a:r>
+          </a:p>
+          <a:p>
+            <a:r>
+              <a:rPr lang="en-GB" dirty="0"/>
+              <a:t>Schedule tasks via Inject node (or Big Timer)</a:t>
+            </a:r>
+          </a:p>
+          <a:p>
+            <a:r>
+              <a:rPr lang="en-GB" dirty="0"/>
+              <a:t>Basic authentication can be set</a:t>
+            </a:r>
+          </a:p>
+          <a:p>
+            <a:r>
+              <a:rPr lang="en-GB" dirty="0"/>
+              <a:t>Flows can be imported / exported as JSON </a:t>
+            </a:r>
+          </a:p>
+        </p:txBody>
+      </p:sp>
+    </p:spTree>
+    <p:extLst>
+      <p:ext uri="{BB962C8B-B14F-4D97-AF65-F5344CB8AC3E}">
+        <p14:creationId xmlns:p14="http://schemas.microsoft.com/office/powerpoint/2010/main" val="1913848587"/>
+      </p:ext>
+    </p:extLst>
+  </p:cSld>
+  <p:clrMapOvr>
+    <a:masterClrMapping/>
+  </p:clrMapOvr>
+</p:sld>
+</file>
+
+<file path=ppt/slides/slide23.xml><?xml version="1.0" encoding="utf-8"?>
+<p:sld xmlns:a="http://schemas.openxmlformats.org/drawingml/2006/main" xmlns:r="http://schemas.openxmlformats.org/officeDocument/2006/relationships" xmlns:p="http://schemas.openxmlformats.org/presentationml/2006/main">
+  <p:cSld>
+    <p:spTree>
+      <p:nvGrpSpPr>
+        <p:cNvPr id="1" name=""/>
+        <p:cNvGrpSpPr/>
+        <p:nvPr/>
+      </p:nvGrpSpPr>
+      <p:grpSpPr>
+        <a:xfrm>
+          <a:off x="0" y="0"/>
+          <a:ext cx="0" cy="0"/>
+          <a:chOff x="0" y="0"/>
+          <a:chExt cx="0" cy="0"/>
+        </a:xfrm>
+      </p:grpSpPr>
+      <p:sp>
+        <p:nvSpPr>
+          <p:cNvPr id="2" name="Title 1">
+            <a:extLst>
+              <a:ext uri="{FF2B5EF4-FFF2-40B4-BE49-F238E27FC236}">
+                <a16:creationId xmlns:a16="http://schemas.microsoft.com/office/drawing/2014/main" id="{BAD95756-30F2-4F38-B406-1C6C78CB70D0}"/>
+              </a:ext>
+            </a:extLst>
+          </p:cNvPr>
+          <p:cNvSpPr>
+            <a:spLocks noGrp="1"/>
+          </p:cNvSpPr>
+          <p:nvPr>
+            <p:ph type="title"/>
+          </p:nvPr>
+        </p:nvSpPr>
+        <p:spPr/>
+        <p:txBody>
+          <a:bodyPr/>
+          <a:lstStyle/>
+          <a:p>
+            <a:r>
+              <a:rPr lang="en-GB" dirty="0"/>
+              <a:t>Integrating private / public</a:t>
+            </a:r>
+          </a:p>
+        </p:txBody>
+      </p:sp>
+      <p:sp>
+        <p:nvSpPr>
+          <p:cNvPr id="3" name="Content Placeholder 2">
+            <a:extLst>
+              <a:ext uri="{FF2B5EF4-FFF2-40B4-BE49-F238E27FC236}">
+                <a16:creationId xmlns:a16="http://schemas.microsoft.com/office/drawing/2014/main" id="{FC80F034-E016-44D5-B815-A5E0F3FD05FE}"/>
+              </a:ext>
+            </a:extLst>
+          </p:cNvPr>
+          <p:cNvSpPr>
+            <a:spLocks noGrp="1"/>
+          </p:cNvSpPr>
+          <p:nvPr>
+            <p:ph idx="1"/>
+          </p:nvPr>
+        </p:nvSpPr>
+        <p:spPr/>
+        <p:txBody>
+          <a:bodyPr/>
+          <a:lstStyle/>
+          <a:p>
+            <a:r>
+              <a:rPr lang="en-GB" dirty="0"/>
+              <a:t>“Private” needs to be made “public”</a:t>
+            </a:r>
+          </a:p>
+          <a:p>
+            <a:r>
+              <a:rPr lang="en-GB" dirty="0" err="1">
+                <a:hlinkClick r:id="rId2"/>
+              </a:rPr>
+              <a:t>ngrok</a:t>
+            </a:r>
+            <a:r>
+              <a:rPr lang="en-GB" dirty="0"/>
+              <a:t> provides secure tunnels</a:t>
+            </a:r>
+          </a:p>
+          <a:p>
+            <a:r>
+              <a:rPr lang="en-GB" dirty="0" err="1">
+                <a:hlinkClick r:id="rId3"/>
+              </a:rPr>
+              <a:t>cmder</a:t>
+            </a:r>
+            <a:r>
+              <a:rPr lang="en-GB" dirty="0"/>
+              <a:t> is good console emulator for Windows</a:t>
+            </a:r>
+          </a:p>
+          <a:p>
+            <a:endParaRPr lang="en-GB" dirty="0"/>
+          </a:p>
+        </p:txBody>
+      </p:sp>
+      <p:pic>
+        <p:nvPicPr>
+          <p:cNvPr id="4" name="Picture 3">
+            <a:extLst>
+              <a:ext uri="{FF2B5EF4-FFF2-40B4-BE49-F238E27FC236}">
+                <a16:creationId xmlns:a16="http://schemas.microsoft.com/office/drawing/2014/main" id="{98A35C8F-A351-43A9-9D73-DA5810CA9FAE}"/>
+              </a:ext>
+            </a:extLst>
+          </p:cNvPr>
+          <p:cNvPicPr>
+            <a:picLocks noChangeAspect="1"/>
+          </p:cNvPicPr>
+          <p:nvPr/>
+        </p:nvPicPr>
+        <p:blipFill>
+          <a:blip r:embed="rId4"/>
+          <a:stretch>
+            <a:fillRect/>
+          </a:stretch>
+        </p:blipFill>
+        <p:spPr>
+          <a:xfrm>
+            <a:off x="2070100" y="3272333"/>
+            <a:ext cx="5073263" cy="2794668"/>
+          </a:xfrm>
+          <a:prstGeom prst="rect">
+            <a:avLst/>
+          </a:prstGeom>
+        </p:spPr>
+      </p:pic>
+    </p:spTree>
+    <p:extLst>
+      <p:ext uri="{BB962C8B-B14F-4D97-AF65-F5344CB8AC3E}">
+        <p14:creationId xmlns:p14="http://schemas.microsoft.com/office/powerpoint/2010/main" val="2859864890"/>
+      </p:ext>
+    </p:extLst>
+  </p:cSld>
+  <p:clrMapOvr>
+    <a:masterClrMapping/>
+  </p:clrMapOvr>
+</p:sld>
+</file>
+
 <file path=ppt/slides/slide3.xml><?xml version="1.0" encoding="utf-8"?>
 <p:sld xmlns:a="http://schemas.openxmlformats.org/drawingml/2006/main" xmlns:r="http://schemas.openxmlformats.org/officeDocument/2006/relationships" xmlns:p="http://schemas.openxmlformats.org/presentationml/2006/main">
   <p:cSld>
@@ -4757,7 +6590,7 @@
           <p:cNvPr id="2" name="Title 1">
             <a:extLst>
               <a:ext uri="{FF2B5EF4-FFF2-40B4-BE49-F238E27FC236}">
-                <a16:creationId xmlns:a16="http://schemas.microsoft.com/office/drawing/2014/main" id="{E1DDDE7C-1B23-4060-B7B2-FCFE31AB72AB}"/>
+                <a16:creationId xmlns:a16="http://schemas.microsoft.com/office/drawing/2014/main" id="{A09F69C7-34E6-46C1-A796-5324FEEDDB23}"/>
               </a:ext>
             </a:extLst>
           </p:cNvPr>
@@ -4775,7 +6608,7 @@
           <a:p>
             <a:r>
               <a:rPr lang="en-GB" dirty="0"/>
-              <a:t>This session?</a:t>
+              <a:t>agenda</a:t>
             </a:r>
           </a:p>
         </p:txBody>
@@ -4785,7 +6618,7 @@
           <p:cNvPr id="3" name="Content Placeholder 2">
             <a:extLst>
               <a:ext uri="{FF2B5EF4-FFF2-40B4-BE49-F238E27FC236}">
-                <a16:creationId xmlns:a16="http://schemas.microsoft.com/office/drawing/2014/main" id="{3BA306DB-D732-4579-8793-4C543104252D}"/>
+                <a16:creationId xmlns:a16="http://schemas.microsoft.com/office/drawing/2014/main" id="{34A64C34-4AE8-4780-98A0-96EAF2F11DE7}"/>
               </a:ext>
             </a:extLst>
           </p:cNvPr>
@@ -4800,12 +6633,6 @@
         <p:txBody>
           <a:bodyPr/>
           <a:lstStyle/>
-          <a:p>
-            <a:r>
-              <a:rPr lang="en-GB" dirty="0"/>
-              <a:t>IS NOT:</a:t>
-            </a:r>
-          </a:p>
           <a:p>
             <a:pPr marL="342900" indent="-342900">
               <a:buFontTx/>
@@ -4813,7 +6640,27 @@
             </a:pPr>
             <a:r>
               <a:rPr lang="en-GB" dirty="0"/>
-              <a:t>How to write your app using XYZ JavaScript framework and package it in the NSF</a:t>
+              <a:t>Introduction</a:t>
+            </a:r>
+          </a:p>
+          <a:p>
+            <a:pPr marL="342900" indent="-342900">
+              <a:buFontTx/>
+              <a:buChar char="-"/>
+            </a:pPr>
+            <a:r>
+              <a:rPr lang="en-GB" dirty="0"/>
+              <a:t>Domino as datastore, REST access</a:t>
+            </a:r>
+          </a:p>
+          <a:p>
+            <a:pPr marL="342900" indent="-342900">
+              <a:buFontTx/>
+              <a:buChar char="-"/>
+            </a:pPr>
+            <a:r>
+              <a:rPr lang="en-GB" dirty="0"/>
+              <a:t>What about scheduled tasks?</a:t>
             </a:r>
           </a:p>
           <a:p>
@@ -4823,54 +6670,12 @@
             </a:pPr>
             <a:endParaRPr lang="en-GB" dirty="0"/>
           </a:p>
-          <a:p>
-            <a:r>
-              <a:rPr lang="en-GB" dirty="0"/>
-              <a:t>IS:</a:t>
-            </a:r>
-          </a:p>
-          <a:p>
-            <a:pPr marL="342900" indent="-342900">
-              <a:buFontTx/>
-              <a:buChar char="-"/>
-            </a:pPr>
-            <a:r>
-              <a:rPr lang="en-GB" dirty="0"/>
-              <a:t>How to develop and include Domino as the datastore for a microservices architecture</a:t>
-            </a:r>
-          </a:p>
-          <a:p>
-            <a:pPr marL="342900" indent="-342900">
-              <a:buFontTx/>
-              <a:buChar char="-"/>
-            </a:pPr>
-            <a:r>
-              <a:rPr lang="en-GB" dirty="0"/>
-              <a:t>Tools / technologies to use</a:t>
-            </a:r>
-          </a:p>
-          <a:p>
-            <a:pPr marL="342900" indent="-342900">
-              <a:buFontTx/>
-              <a:buChar char="-"/>
-            </a:pPr>
-            <a:r>
-              <a:rPr lang="en-GB" dirty="0"/>
-              <a:t>Thinking approaches required</a:t>
-            </a:r>
-          </a:p>
-          <a:p>
-            <a:endParaRPr lang="en-GB" dirty="0"/>
-          </a:p>
-          <a:p>
-            <a:endParaRPr lang="en-GB" dirty="0"/>
-          </a:p>
         </p:txBody>
       </p:sp>
     </p:spTree>
     <p:extLst>
       <p:ext uri="{BB962C8B-B14F-4D97-AF65-F5344CB8AC3E}">
-        <p14:creationId xmlns:p14="http://schemas.microsoft.com/office/powerpoint/2010/main" val="462971716"/>
+        <p14:creationId xmlns:p14="http://schemas.microsoft.com/office/powerpoint/2010/main" val="1903350721"/>
       </p:ext>
     </p:extLst>
   </p:cSld>
@@ -4899,10 +6704,10 @@
       </p:grpSpPr>
       <p:sp>
         <p:nvSpPr>
-          <p:cNvPr id="2" name="Title 1">
+          <p:cNvPr id="4" name="Title 3">
             <a:extLst>
               <a:ext uri="{FF2B5EF4-FFF2-40B4-BE49-F238E27FC236}">
-                <a16:creationId xmlns:a16="http://schemas.microsoft.com/office/drawing/2014/main" id="{54E323D5-60FE-441D-93FC-A4A17CCDB230}"/>
+                <a16:creationId xmlns:a16="http://schemas.microsoft.com/office/drawing/2014/main" id="{D691CD7C-405A-4343-A99A-F7317A35A1A1}"/>
               </a:ext>
             </a:extLst>
           </p:cNvPr>
@@ -4910,7 +6715,7 @@
             <a:spLocks noGrp="1"/>
           </p:cNvSpPr>
           <p:nvPr>
-            <p:ph type="title"/>
+            <p:ph type="ctrTitle"/>
           </p:nvPr>
         </p:nvSpPr>
         <p:spPr/>
@@ -4919,101 +6724,8 @@
           <a:lstStyle/>
           <a:p>
             <a:r>
-              <a:rPr lang="en-GB" dirty="0">
-                <a:hlinkClick r:id="rId2"/>
-              </a:rPr>
-              <a:t>Domino the monolith?</a:t>
-            </a:r>
-            <a:endParaRPr lang="en-GB" dirty="0"/>
-          </a:p>
-        </p:txBody>
-      </p:sp>
-      <p:sp>
-        <p:nvSpPr>
-          <p:cNvPr id="3" name="Content Placeholder 2">
-            <a:extLst>
-              <a:ext uri="{FF2B5EF4-FFF2-40B4-BE49-F238E27FC236}">
-                <a16:creationId xmlns:a16="http://schemas.microsoft.com/office/drawing/2014/main" id="{488741F8-A1AA-4D80-A45A-3154A7B10A7B}"/>
-              </a:ext>
-            </a:extLst>
-          </p:cNvPr>
-          <p:cNvSpPr>
-            <a:spLocks noGrp="1"/>
-          </p:cNvSpPr>
-          <p:nvPr>
-            <p:ph idx="1"/>
-          </p:nvPr>
-        </p:nvSpPr>
-        <p:spPr/>
-        <p:txBody>
-          <a:bodyPr>
-            <a:normAutofit/>
-          </a:bodyPr>
-          <a:lstStyle/>
-          <a:p>
-            <a:r>
-              <a:rPr lang="en-GB" dirty="0"/>
-              <a:t>Domino for Directory Management</a:t>
-            </a:r>
-          </a:p>
-          <a:p>
-            <a:r>
-              <a:rPr lang="en-GB" dirty="0"/>
-              <a:t>Domino TLS</a:t>
-            </a:r>
-          </a:p>
-          <a:p>
-            <a:r>
-              <a:rPr lang="en-GB" dirty="0"/>
-              <a:t>Domino HTTP Server / Port 1352</a:t>
-            </a:r>
-          </a:p>
-          <a:p>
-            <a:r>
-              <a:rPr lang="en-GB" dirty="0"/>
-              <a:t>NoSQL Data Store (NSF)</a:t>
-            </a:r>
-          </a:p>
-          <a:p>
-            <a:r>
-              <a:rPr lang="en-GB" dirty="0"/>
-              <a:t>Domino APIs for workflow (LS / SSJS / Java) </a:t>
-            </a:r>
-          </a:p>
-          <a:p>
-            <a:r>
-              <a:rPr lang="en-GB" dirty="0" err="1"/>
-              <a:t>nupdate</a:t>
-            </a:r>
-            <a:r>
-              <a:rPr lang="en-GB" dirty="0"/>
-              <a:t> for indexing</a:t>
-            </a:r>
-          </a:p>
-          <a:p>
-            <a:r>
-              <a:rPr lang="en-GB" dirty="0"/>
-              <a:t>Domino replication / clustering</a:t>
-            </a:r>
-          </a:p>
-          <a:p>
-            <a:r>
-              <a:rPr lang="en-GB" dirty="0"/>
-              <a:t>Standard templates for auditing (</a:t>
-            </a:r>
-            <a:r>
-              <a:rPr lang="en-GB" dirty="0" err="1"/>
-              <a:t>log.nsf</a:t>
-            </a:r>
-            <a:r>
-              <a:rPr lang="en-GB" dirty="0"/>
-              <a:t> etc)</a:t>
-            </a:r>
-          </a:p>
-          <a:p>
-            <a:r>
-              <a:rPr lang="en-GB" dirty="0"/>
-              <a:t>Domino SMTP for mail routing</a:t>
+              <a:rPr lang="en-GB" dirty="0"/>
+              <a:t>introduction</a:t>
             </a:r>
           </a:p>
         </p:txBody>
@@ -5021,7 +6733,7 @@
     </p:spTree>
     <p:extLst>
       <p:ext uri="{BB962C8B-B14F-4D97-AF65-F5344CB8AC3E}">
-        <p14:creationId xmlns:p14="http://schemas.microsoft.com/office/powerpoint/2010/main" val="1273417768"/>
+        <p14:creationId xmlns:p14="http://schemas.microsoft.com/office/powerpoint/2010/main" val="1059764422"/>
       </p:ext>
     </p:extLst>
   </p:cSld>
@@ -5053,7 +6765,7 @@
           <p:cNvPr id="2" name="Title 1">
             <a:extLst>
               <a:ext uri="{FF2B5EF4-FFF2-40B4-BE49-F238E27FC236}">
-                <a16:creationId xmlns:a16="http://schemas.microsoft.com/office/drawing/2014/main" id="{E50706F6-B240-469D-9907-F8E98ECB792C}"/>
+                <a16:creationId xmlns:a16="http://schemas.microsoft.com/office/drawing/2014/main" id="{E1DDDE7C-1B23-4060-B7B2-FCFE31AB72AB}"/>
               </a:ext>
             </a:extLst>
           </p:cNvPr>
@@ -5071,7 +6783,7 @@
           <a:p>
             <a:r>
               <a:rPr lang="en-GB" dirty="0"/>
-              <a:t>The reality</a:t>
+              <a:t>This session?</a:t>
             </a:r>
           </a:p>
         </p:txBody>
@@ -5081,7 +6793,7 @@
           <p:cNvPr id="3" name="Content Placeholder 2">
             <a:extLst>
               <a:ext uri="{FF2B5EF4-FFF2-40B4-BE49-F238E27FC236}">
-                <a16:creationId xmlns:a16="http://schemas.microsoft.com/office/drawing/2014/main" id="{82E6E5A4-30F9-4680-9CE7-B82002E233A9}"/>
+                <a16:creationId xmlns:a16="http://schemas.microsoft.com/office/drawing/2014/main" id="{3BA306DB-D732-4579-8793-4C543104252D}"/>
               </a:ext>
             </a:extLst>
           </p:cNvPr>
@@ -5099,79 +6811,74 @@
           <a:p>
             <a:r>
               <a:rPr lang="en-GB" dirty="0"/>
-              <a:t>LDAP for Directory Management</a:t>
-            </a:r>
-          </a:p>
-          <a:p>
-            <a:r>
-              <a:rPr lang="en-GB" dirty="0" err="1">
-                <a:hlinkClick r:id="rId2"/>
-              </a:rPr>
-              <a:t>nginx</a:t>
-            </a:r>
-            <a:r>
-              <a:rPr lang="en-GB" dirty="0"/>
-              <a:t> / IBM HTTP Server</a:t>
-            </a:r>
-          </a:p>
-          <a:p>
-            <a:r>
-              <a:rPr lang="en-GB" dirty="0"/>
-              <a:t>ODBC / JDBC / LEI / agents processing flat files</a:t>
-            </a:r>
-          </a:p>
-          <a:p>
-            <a:r>
-              <a:rPr lang="en-GB" dirty="0"/>
-              <a:t>Web Services / agents to connect externally</a:t>
-            </a:r>
-          </a:p>
-          <a:p>
-            <a:r>
-              <a:rPr lang="en-GB" dirty="0"/>
-              <a:t>Lotus Workflow for workflow</a:t>
-            </a:r>
-          </a:p>
-          <a:p>
-            <a:r>
-              <a:rPr lang="en-GB" dirty="0"/>
-              <a:t>Third-party tools for better auditing (incl. </a:t>
-            </a:r>
-            <a:r>
-              <a:rPr lang="en-GB" dirty="0" err="1"/>
-              <a:t>OpenLog</a:t>
-            </a:r>
-            <a:r>
-              <a:rPr lang="en-GB" dirty="0"/>
-              <a:t>)</a:t>
-            </a:r>
-          </a:p>
-          <a:p>
-            <a:r>
-              <a:rPr lang="en-GB" dirty="0"/>
-              <a:t>Export to data warehouse / </a:t>
-            </a:r>
-            <a:r>
-              <a:rPr lang="en-GB" dirty="0" err="1"/>
-              <a:t>NotesSQL</a:t>
-            </a:r>
-            <a:r>
-              <a:rPr lang="en-GB" dirty="0"/>
-              <a:t> for reporting</a:t>
-            </a:r>
-          </a:p>
-          <a:p>
-            <a:r>
-              <a:rPr lang="en-GB" dirty="0"/>
-              <a:t>Mail routing via non-Domino SMTP server</a:t>
-            </a:r>
+              <a:t>IS NOT:</a:t>
+            </a:r>
+          </a:p>
+          <a:p>
+            <a:pPr marL="342900" indent="-342900">
+              <a:buFontTx/>
+              <a:buChar char="-"/>
+            </a:pPr>
+            <a:r>
+              <a:rPr lang="en-GB" dirty="0"/>
+              <a:t>How to write your app using XYZ JavaScript framework and package it in the NSF</a:t>
+            </a:r>
+          </a:p>
+          <a:p>
+            <a:pPr marL="342900" indent="-342900">
+              <a:buFontTx/>
+              <a:buChar char="-"/>
+            </a:pPr>
+            <a:endParaRPr lang="en-GB" dirty="0"/>
+          </a:p>
+          <a:p>
+            <a:r>
+              <a:rPr lang="en-GB" dirty="0"/>
+              <a:t>IS:</a:t>
+            </a:r>
+          </a:p>
+          <a:p>
+            <a:pPr marL="342900" indent="-342900">
+              <a:buFontTx/>
+              <a:buChar char="-"/>
+            </a:pPr>
+            <a:r>
+              <a:rPr lang="en-GB" dirty="0"/>
+              <a:t>How to develop and include Domino as the datastore for a microservices architecture</a:t>
+            </a:r>
+          </a:p>
+          <a:p>
+            <a:pPr marL="342900" indent="-342900">
+              <a:buFontTx/>
+              <a:buChar char="-"/>
+            </a:pPr>
+            <a:r>
+              <a:rPr lang="en-GB" dirty="0"/>
+              <a:t>Tools / technologies to use</a:t>
+            </a:r>
+          </a:p>
+          <a:p>
+            <a:pPr marL="342900" indent="-342900">
+              <a:buFontTx/>
+              <a:buChar char="-"/>
+            </a:pPr>
+            <a:r>
+              <a:rPr lang="en-GB" dirty="0"/>
+              <a:t>Thinking approaches required</a:t>
+            </a:r>
+          </a:p>
+          <a:p>
+            <a:endParaRPr lang="en-GB" dirty="0"/>
+          </a:p>
+          <a:p>
+            <a:endParaRPr lang="en-GB" dirty="0"/>
           </a:p>
         </p:txBody>
       </p:sp>
     </p:spTree>
     <p:extLst>
       <p:ext uri="{BB962C8B-B14F-4D97-AF65-F5344CB8AC3E}">
-        <p14:creationId xmlns:p14="http://schemas.microsoft.com/office/powerpoint/2010/main" val="428847485"/>
+        <p14:creationId xmlns:p14="http://schemas.microsoft.com/office/powerpoint/2010/main" val="462971716"/>
       </p:ext>
     </p:extLst>
   </p:cSld>
@@ -5203,7 +6910,7 @@
           <p:cNvPr id="2" name="Title 1">
             <a:extLst>
               <a:ext uri="{FF2B5EF4-FFF2-40B4-BE49-F238E27FC236}">
-                <a16:creationId xmlns:a16="http://schemas.microsoft.com/office/drawing/2014/main" id="{95C7771E-874B-4266-989A-A1D42B4A6FBD}"/>
+                <a16:creationId xmlns:a16="http://schemas.microsoft.com/office/drawing/2014/main" id="{54E323D5-60FE-441D-93FC-A4A17CCDB230}"/>
               </a:ext>
             </a:extLst>
           </p:cNvPr>
@@ -5214,53 +6921,18 @@
             <p:ph type="title"/>
           </p:nvPr>
         </p:nvSpPr>
-        <p:spPr>
-          <a:xfrm>
-            <a:off x="266699" y="243465"/>
-            <a:ext cx="11404601" cy="1293028"/>
-          </a:xfrm>
-        </p:spPr>
+        <p:spPr/>
         <p:txBody>
           <a:bodyPr/>
           <a:lstStyle/>
           <a:p>
             <a:r>
-              <a:rPr lang="en-GB" sz="4000" dirty="0" err="1"/>
-              <a:t>Mutato</a:t>
-            </a:r>
-            <a:r>
-              <a:rPr lang="en-GB" sz="4000" dirty="0"/>
-              <a:t> </a:t>
-            </a:r>
-            <a:r>
-              <a:rPr lang="en-GB" sz="4000" dirty="0" err="1"/>
-              <a:t>nomine</a:t>
-            </a:r>
-            <a:r>
-              <a:rPr lang="en-GB" sz="4000" dirty="0"/>
-              <a:t> de </a:t>
-            </a:r>
-            <a:r>
-              <a:rPr lang="en-GB" sz="4000" dirty="0" err="1"/>
-              <a:t>te</a:t>
-            </a:r>
-            <a:r>
-              <a:rPr lang="en-GB" sz="4000" dirty="0"/>
-              <a:t> </a:t>
-            </a:r>
-            <a:r>
-              <a:rPr lang="en-GB" sz="4000" dirty="0" err="1"/>
-              <a:t>fabula</a:t>
-            </a:r>
-            <a:r>
-              <a:rPr lang="en-GB" sz="4000" dirty="0"/>
-              <a:t> </a:t>
-            </a:r>
-            <a:r>
-              <a:rPr lang="en-GB" sz="4000" dirty="0" err="1"/>
-              <a:t>narratur</a:t>
-            </a:r>
-            <a:endParaRPr lang="en-GB" sz="5400" dirty="0"/>
+              <a:rPr lang="en-GB" dirty="0">
+                <a:hlinkClick r:id="rId2"/>
+              </a:rPr>
+              <a:t>Domino the monolith?</a:t>
+            </a:r>
+            <a:endParaRPr lang="en-GB" dirty="0"/>
           </a:p>
         </p:txBody>
       </p:sp>
@@ -5269,7 +6941,7 @@
           <p:cNvPr id="3" name="Content Placeholder 2">
             <a:extLst>
               <a:ext uri="{FF2B5EF4-FFF2-40B4-BE49-F238E27FC236}">
-                <a16:creationId xmlns:a16="http://schemas.microsoft.com/office/drawing/2014/main" id="{56D320B4-4B47-4331-8696-978083ABB006}"/>
+                <a16:creationId xmlns:a16="http://schemas.microsoft.com/office/drawing/2014/main" id="{488741F8-A1AA-4D80-A45A-3154A7B10A7B}"/>
               </a:ext>
             </a:extLst>
           </p:cNvPr>
@@ -5282,45 +6954,74 @@
         </p:nvSpPr>
         <p:spPr/>
         <p:txBody>
-          <a:bodyPr/>
+          <a:bodyPr>
+            <a:normAutofit/>
+          </a:bodyPr>
           <a:lstStyle/>
           <a:p>
             <a:r>
               <a:rPr lang="en-GB" dirty="0"/>
-              <a:t>Domino has always been in the microservices game</a:t>
-            </a:r>
-          </a:p>
-          <a:p>
-            <a:endParaRPr lang="en-GB" dirty="0"/>
-          </a:p>
-          <a:p>
-            <a:pPr marL="342900" indent="-342900">
-              <a:buFontTx/>
-              <a:buChar char="-"/>
-            </a:pPr>
-            <a:r>
-              <a:rPr lang="en-GB" dirty="0"/>
-              <a:t>Custom workflow around ERP processes</a:t>
-            </a:r>
-          </a:p>
-          <a:p>
-            <a:pPr marL="342900" indent="-342900">
-              <a:buFontTx/>
-              <a:buChar char="-"/>
-            </a:pPr>
-            <a:r>
-              <a:rPr lang="en-GB" dirty="0"/>
-              <a:t>Custom integration for multiple non-Domino systems</a:t>
-            </a:r>
-          </a:p>
-          <a:p>
-            <a:pPr marL="342900" indent="-342900">
-              <a:buFontTx/>
-              <a:buChar char="-"/>
-            </a:pPr>
-            <a:r>
-              <a:rPr lang="en-GB" dirty="0"/>
-              <a:t>Configuration pulled from external systems</a:t>
+              <a:t>Domino for Directory Management</a:t>
+            </a:r>
+          </a:p>
+          <a:p>
+            <a:r>
+              <a:rPr lang="en-GB" dirty="0"/>
+              <a:t>Domino TLS</a:t>
+            </a:r>
+          </a:p>
+          <a:p>
+            <a:r>
+              <a:rPr lang="en-GB" dirty="0"/>
+              <a:t>Domino HTTP Server / Port 1352</a:t>
+            </a:r>
+          </a:p>
+          <a:p>
+            <a:r>
+              <a:rPr lang="en-GB" dirty="0"/>
+              <a:t>NoSQL Data Store (NSF)</a:t>
+            </a:r>
+          </a:p>
+          <a:p>
+            <a:r>
+              <a:rPr lang="en-GB" dirty="0"/>
+              <a:t>Domino APIs for workflow (LS / SSJS / Java) </a:t>
+            </a:r>
+          </a:p>
+          <a:p>
+            <a:r>
+              <a:rPr lang="en-GB" dirty="0" err="1"/>
+              <a:t>nupdate</a:t>
+            </a:r>
+            <a:r>
+              <a:rPr lang="en-GB" dirty="0"/>
+              <a:t> for indexing</a:t>
+            </a:r>
+          </a:p>
+          <a:p>
+            <a:r>
+              <a:rPr lang="en-GB" dirty="0"/>
+              <a:t>Domino replication / clustering</a:t>
+            </a:r>
+          </a:p>
+          <a:p>
+            <a:r>
+              <a:rPr lang="en-GB" dirty="0"/>
+              <a:t>Standard templates for auditing (</a:t>
+            </a:r>
+            <a:r>
+              <a:rPr lang="en-GB" dirty="0" err="1"/>
+              <a:t>log.nsf</a:t>
+            </a:r>
+            <a:r>
+              <a:rPr lang="en-GB" dirty="0"/>
+              <a:t> etc)</a:t>
+            </a:r>
+          </a:p>
+          <a:p>
+            <a:r>
+              <a:rPr lang="en-GB" dirty="0"/>
+              <a:t>Domino SMTP for mail routing</a:t>
             </a:r>
           </a:p>
         </p:txBody>
@@ -5328,7 +7029,7 @@
     </p:spTree>
     <p:extLst>
       <p:ext uri="{BB962C8B-B14F-4D97-AF65-F5344CB8AC3E}">
-        <p14:creationId xmlns:p14="http://schemas.microsoft.com/office/powerpoint/2010/main" val="3126869749"/>
+        <p14:creationId xmlns:p14="http://schemas.microsoft.com/office/powerpoint/2010/main" val="1273417768"/>
       </p:ext>
     </p:extLst>
   </p:cSld>
@@ -5360,7 +7061,7 @@
           <p:cNvPr id="2" name="Title 1">
             <a:extLst>
               <a:ext uri="{FF2B5EF4-FFF2-40B4-BE49-F238E27FC236}">
-                <a16:creationId xmlns:a16="http://schemas.microsoft.com/office/drawing/2014/main" id="{F2C9DEE5-D2B3-4CEE-A43B-3B37F019C675}"/>
+                <a16:creationId xmlns:a16="http://schemas.microsoft.com/office/drawing/2014/main" id="{E50706F6-B240-469D-9907-F8E98ECB792C}"/>
               </a:ext>
             </a:extLst>
           </p:cNvPr>
@@ -5378,7 +7079,7 @@
           <a:p>
             <a:r>
               <a:rPr lang="en-GB" dirty="0"/>
-              <a:t>Change your thinking</a:t>
+              <a:t>The reality</a:t>
             </a:r>
           </a:p>
         </p:txBody>
@@ -5388,7 +7089,7 @@
           <p:cNvPr id="3" name="Content Placeholder 2">
             <a:extLst>
               <a:ext uri="{FF2B5EF4-FFF2-40B4-BE49-F238E27FC236}">
-                <a16:creationId xmlns:a16="http://schemas.microsoft.com/office/drawing/2014/main" id="{62381E6A-3237-46F9-BEBB-AB78EC7DF951}"/>
+                <a16:creationId xmlns:a16="http://schemas.microsoft.com/office/drawing/2014/main" id="{82E6E5A4-30F9-4680-9CE7-B82002E233A9}"/>
               </a:ext>
             </a:extLst>
           </p:cNvPr>
@@ -5406,80 +7107,71 @@
           <a:p>
             <a:r>
               <a:rPr lang="en-GB" dirty="0"/>
-              <a:t>Pros</a:t>
-            </a:r>
-          </a:p>
-          <a:p>
-            <a:pPr marL="342900" indent="-342900">
-              <a:buFontTx/>
-              <a:buChar char="-"/>
-            </a:pPr>
-            <a:r>
-              <a:rPr lang="en-GB" dirty="0"/>
-              <a:t>Greater flexibility</a:t>
-            </a:r>
-          </a:p>
-          <a:p>
-            <a:pPr marL="342900" indent="-342900">
-              <a:buFontTx/>
-              <a:buChar char="-"/>
-            </a:pPr>
-            <a:r>
-              <a:rPr lang="en-GB" dirty="0"/>
-              <a:t>Best of breed</a:t>
-            </a:r>
-          </a:p>
-          <a:p>
-            <a:pPr marL="342900" indent="-342900">
-              <a:buFontTx/>
-              <a:buChar char="-"/>
-            </a:pPr>
-            <a:r>
-              <a:rPr lang="en-GB" dirty="0"/>
-              <a:t>Increased standardisation</a:t>
-            </a:r>
-          </a:p>
-          <a:p>
-            <a:pPr marL="342900" indent="-342900">
-              <a:buFontTx/>
-              <a:buChar char="-"/>
-            </a:pPr>
-            <a:endParaRPr lang="en-GB" dirty="0"/>
-          </a:p>
-          <a:p>
-            <a:r>
-              <a:rPr lang="en-GB" dirty="0"/>
-              <a:t>Cons</a:t>
-            </a:r>
-          </a:p>
-          <a:p>
-            <a:pPr marL="342900" indent="-342900">
-              <a:buFontTx/>
-              <a:buChar char="-"/>
-            </a:pPr>
-            <a:r>
-              <a:rPr lang="en-GB" dirty="0"/>
-              <a:t>Code for failure</a:t>
-            </a:r>
-          </a:p>
-          <a:p>
-            <a:pPr marL="342900" indent="-342900">
-              <a:buFontTx/>
-              <a:buChar char="-"/>
-            </a:pPr>
-            <a:r>
-              <a:rPr lang="en-GB" dirty="0"/>
-              <a:t>Step outside comfort zone</a:t>
-            </a:r>
-          </a:p>
-          <a:p>
-            <a:pPr marL="342900" indent="-342900">
-              <a:buFontTx/>
-              <a:buChar char="-"/>
-            </a:pPr>
-            <a:r>
-              <a:rPr lang="en-GB" dirty="0"/>
-              <a:t>Integration points</a:t>
+              <a:t>LDAP for Directory Management</a:t>
+            </a:r>
+          </a:p>
+          <a:p>
+            <a:r>
+              <a:rPr lang="en-GB" dirty="0" err="1">
+                <a:hlinkClick r:id="rId2"/>
+              </a:rPr>
+              <a:t>nginx</a:t>
+            </a:r>
+            <a:r>
+              <a:rPr lang="en-GB" dirty="0"/>
+              <a:t> / IBM HTTP Server</a:t>
+            </a:r>
+          </a:p>
+          <a:p>
+            <a:r>
+              <a:rPr lang="en-GB" dirty="0"/>
+              <a:t>ODBC / JDBC / LEI / agents processing flat files</a:t>
+            </a:r>
+          </a:p>
+          <a:p>
+            <a:r>
+              <a:rPr lang="en-GB" dirty="0"/>
+              <a:t>Web Services / agents to connect externally</a:t>
+            </a:r>
+          </a:p>
+          <a:p>
+            <a:r>
+              <a:rPr lang="en-GB" dirty="0"/>
+              <a:t>Lotus Workflow for workflow</a:t>
+            </a:r>
+          </a:p>
+          <a:p>
+            <a:r>
+              <a:rPr lang="en-GB" dirty="0"/>
+              <a:t>Third-party tools for better auditing (incl. </a:t>
+            </a:r>
+            <a:r>
+              <a:rPr lang="en-GB" dirty="0" err="1"/>
+              <a:t>OpenLog</a:t>
+            </a:r>
+            <a:r>
+              <a:rPr lang="en-GB" dirty="0"/>
+              <a:t>)</a:t>
+            </a:r>
+          </a:p>
+          <a:p>
+            <a:r>
+              <a:rPr lang="en-GB" dirty="0"/>
+              <a:t>Export to data warehouse / </a:t>
+            </a:r>
+            <a:r>
+              <a:rPr lang="en-GB" dirty="0" err="1"/>
+              <a:t>NotesSQL</a:t>
+            </a:r>
+            <a:r>
+              <a:rPr lang="en-GB" dirty="0"/>
+              <a:t> for reporting</a:t>
+            </a:r>
+          </a:p>
+          <a:p>
+            <a:r>
+              <a:rPr lang="en-GB" dirty="0"/>
+              <a:t>Mail routing via non-Domino SMTP server</a:t>
             </a:r>
           </a:p>
         </p:txBody>
@@ -5487,7 +7179,7 @@
     </p:spTree>
     <p:extLst>
       <p:ext uri="{BB962C8B-B14F-4D97-AF65-F5344CB8AC3E}">
-        <p14:creationId xmlns:p14="http://schemas.microsoft.com/office/powerpoint/2010/main" val="258918636"/>
+        <p14:creationId xmlns:p14="http://schemas.microsoft.com/office/powerpoint/2010/main" val="428847485"/>
       </p:ext>
     </p:extLst>
   </p:cSld>
@@ -5519,7 +7211,7 @@
           <p:cNvPr id="2" name="Title 1">
             <a:extLst>
               <a:ext uri="{FF2B5EF4-FFF2-40B4-BE49-F238E27FC236}">
-                <a16:creationId xmlns:a16="http://schemas.microsoft.com/office/drawing/2014/main" id="{1A530216-0158-4426-8CAF-8D17A505629F}"/>
+                <a16:creationId xmlns:a16="http://schemas.microsoft.com/office/drawing/2014/main" id="{95C7771E-874B-4266-989A-A1D42B4A6FBD}"/>
               </a:ext>
             </a:extLst>
           </p:cNvPr>
@@ -5530,15 +7222,53 @@
             <p:ph type="title"/>
           </p:nvPr>
         </p:nvSpPr>
-        <p:spPr/>
+        <p:spPr>
+          <a:xfrm>
+            <a:off x="266699" y="243465"/>
+            <a:ext cx="11404601" cy="1293028"/>
+          </a:xfrm>
+        </p:spPr>
         <p:txBody>
           <a:bodyPr/>
           <a:lstStyle/>
           <a:p>
             <a:r>
-              <a:rPr lang="en-GB" dirty="0"/>
-              <a:t>Domino rest options</a:t>
-            </a:r>
+              <a:rPr lang="en-GB" sz="4000" dirty="0" err="1"/>
+              <a:t>Mutato</a:t>
+            </a:r>
+            <a:r>
+              <a:rPr lang="en-GB" sz="4000" dirty="0"/>
+              <a:t> </a:t>
+            </a:r>
+            <a:r>
+              <a:rPr lang="en-GB" sz="4000" dirty="0" err="1"/>
+              <a:t>nomine</a:t>
+            </a:r>
+            <a:r>
+              <a:rPr lang="en-GB" sz="4000" dirty="0"/>
+              <a:t> de </a:t>
+            </a:r>
+            <a:r>
+              <a:rPr lang="en-GB" sz="4000" dirty="0" err="1"/>
+              <a:t>te</a:t>
+            </a:r>
+            <a:r>
+              <a:rPr lang="en-GB" sz="4000" dirty="0"/>
+              <a:t> </a:t>
+            </a:r>
+            <a:r>
+              <a:rPr lang="en-GB" sz="4000" dirty="0" err="1"/>
+              <a:t>fabula</a:t>
+            </a:r>
+            <a:r>
+              <a:rPr lang="en-GB" sz="4000" dirty="0"/>
+              <a:t> </a:t>
+            </a:r>
+            <a:r>
+              <a:rPr lang="en-GB" sz="4000" dirty="0" err="1"/>
+              <a:t>narratur</a:t>
+            </a:r>
+            <a:endParaRPr lang="en-GB" sz="5400" dirty="0"/>
           </a:p>
         </p:txBody>
       </p:sp>
@@ -5547,7 +7277,7 @@
           <p:cNvPr id="3" name="Content Placeholder 2">
             <a:extLst>
               <a:ext uri="{FF2B5EF4-FFF2-40B4-BE49-F238E27FC236}">
-                <a16:creationId xmlns:a16="http://schemas.microsoft.com/office/drawing/2014/main" id="{117770BD-8CC0-4139-A505-25D8CA68B2CB}"/>
+                <a16:creationId xmlns:a16="http://schemas.microsoft.com/office/drawing/2014/main" id="{56D320B4-4B47-4331-8696-978083ABB006}"/>
               </a:ext>
             </a:extLst>
           </p:cNvPr>
@@ -5558,104 +7288,47 @@
             <p:ph idx="1"/>
           </p:nvPr>
         </p:nvSpPr>
-        <p:spPr>
-          <a:xfrm>
-            <a:off x="266699" y="1933349"/>
-            <a:ext cx="8229601" cy="4421991"/>
-          </a:xfrm>
-        </p:spPr>
+        <p:spPr/>
         <p:txBody>
           <a:bodyPr/>
           <a:lstStyle/>
           <a:p>
             <a:r>
               <a:rPr lang="en-GB" dirty="0"/>
-              <a:t>DAS</a:t>
-            </a:r>
-          </a:p>
-          <a:p>
-            <a:r>
-              <a:rPr lang="en-GB" dirty="0"/>
-              <a:t>	validation / visibility concerns</a:t>
-            </a:r>
-          </a:p>
-          <a:p>
-            <a:r>
-              <a:rPr lang="en-GB" dirty="0" err="1"/>
-              <a:t>XAgents</a:t>
-            </a:r>
+              <a:t>Domino has always been in the microservices game</a:t>
+            </a:r>
+          </a:p>
+          <a:p>
             <a:endParaRPr lang="en-GB" dirty="0"/>
           </a:p>
           <a:p>
-            <a:r>
-              <a:rPr lang="en-GB" dirty="0">
-                <a:latin typeface="Courier New" panose="02070309020205020404" pitchFamily="49" charset="0"/>
-                <a:cs typeface="Courier New" panose="02070309020205020404" pitchFamily="49" charset="0"/>
-              </a:rPr>
-              <a:t>	</a:t>
-            </a:r>
-            <a:r>
-              <a:rPr lang="en-GB" dirty="0" err="1">
-                <a:latin typeface="Courier New" panose="02070309020205020404" pitchFamily="49" charset="0"/>
-                <a:cs typeface="Courier New" panose="02070309020205020404" pitchFamily="49" charset="0"/>
-              </a:rPr>
-              <a:t>viewState</a:t>
-            </a:r>
-            <a:r>
-              <a:rPr lang="en-GB" dirty="0">
-                <a:latin typeface="Courier New" panose="02070309020205020404" pitchFamily="49" charset="0"/>
-                <a:cs typeface="Courier New" panose="02070309020205020404" pitchFamily="49" charset="0"/>
-              </a:rPr>
-              <a:t>=“</a:t>
-            </a:r>
-            <a:r>
-              <a:rPr lang="en-GB" dirty="0" err="1">
-                <a:latin typeface="Courier New" panose="02070309020205020404" pitchFamily="49" charset="0"/>
-                <a:cs typeface="Courier New" panose="02070309020205020404" pitchFamily="49" charset="0"/>
-              </a:rPr>
-              <a:t>nostate</a:t>
-            </a:r>
-            <a:r>
-              <a:rPr lang="en-GB" dirty="0">
-                <a:latin typeface="Courier New" panose="02070309020205020404" pitchFamily="49" charset="0"/>
-                <a:cs typeface="Courier New" panose="02070309020205020404" pitchFamily="49" charset="0"/>
-              </a:rPr>
-              <a:t>”</a:t>
-            </a:r>
-          </a:p>
-          <a:p>
-            <a:r>
-              <a:rPr lang="en-GB" dirty="0" err="1"/>
-              <a:t>SmartNSF</a:t>
-            </a:r>
-            <a:endParaRPr lang="en-GB" dirty="0"/>
-          </a:p>
-          <a:p>
-            <a:r>
-              <a:rPr lang="en-GB" dirty="0"/>
-              <a:t>	written using Domain Specific Language</a:t>
-            </a:r>
-          </a:p>
-          <a:p>
-            <a:r>
-              <a:rPr lang="en-GB" dirty="0"/>
-              <a:t>ODA Starter Servlet</a:t>
-            </a:r>
-          </a:p>
-          <a:p>
-            <a:r>
-              <a:rPr lang="en-GB" dirty="0"/>
-              <a:t>	develop in Eclipse, local Domino server</a:t>
-            </a:r>
-          </a:p>
-          <a:p>
-            <a:r>
-              <a:rPr lang="en-GB" dirty="0" err="1"/>
-              <a:t>Darwino</a:t>
-            </a:r>
-            <a:r>
-              <a:rPr lang="en-GB" dirty="0"/>
-              <a:t> Microservices</a:t>
+            <a:pPr marL="342900" indent="-342900">
+              <a:buFontTx/>
+              <a:buChar char="-"/>
+            </a:pPr>
+            <a:r>
+              <a:rPr lang="en-GB" dirty="0"/>
+              <a:t>Custom workflow around ERP processes</a:t>
+            </a:r>
+          </a:p>
+          <a:p>
+            <a:pPr marL="342900" indent="-342900">
+              <a:buFontTx/>
+              <a:buChar char="-"/>
+            </a:pPr>
+            <a:r>
+              <a:rPr lang="en-GB" dirty="0"/>
+              <a:t>Custom integration for multiple non-Domino systems</a:t>
+            </a:r>
+          </a:p>
+          <a:p>
+            <a:pPr marL="342900" indent="-342900">
+              <a:buFontTx/>
+              <a:buChar char="-"/>
+            </a:pPr>
+            <a:r>
+              <a:rPr lang="en-GB" dirty="0"/>
+              <a:t>Configuration pulled from external systems</a:t>
             </a:r>
           </a:p>
         </p:txBody>
@@ -5663,7 +7336,7 @@
     </p:spTree>
     <p:extLst>
       <p:ext uri="{BB962C8B-B14F-4D97-AF65-F5344CB8AC3E}">
-        <p14:creationId xmlns:p14="http://schemas.microsoft.com/office/powerpoint/2010/main" val="2249062884"/>
+        <p14:creationId xmlns:p14="http://schemas.microsoft.com/office/powerpoint/2010/main" val="3126869749"/>
       </p:ext>
     </p:extLst>
   </p:cSld>

</xml_diff>

<commit_message>
Updated additional slides on longer dev, API first, secuuring endpoints
</commit_message>
<xml_diff>
--- a/presentation/8598 Domino and JS.pptx
+++ b/presentation/8598 Domino and JS.pptx
@@ -5,10 +5,10 @@
     <p:sldMasterId id="2147483870" r:id="rId1"/>
   </p:sldMasterIdLst>
   <p:notesMasterIdLst>
-    <p:notesMasterId r:id="rId25"/>
+    <p:notesMasterId r:id="rId26"/>
   </p:notesMasterIdLst>
   <p:handoutMasterIdLst>
-    <p:handoutMasterId r:id="rId26"/>
+    <p:handoutMasterId r:id="rId27"/>
   </p:handoutMasterIdLst>
   <p:sldIdLst>
     <p:sldId id="256" r:id="rId2"/>
@@ -24,16 +24,17 @@
     <p:sldId id="271" r:id="rId12"/>
     <p:sldId id="264" r:id="rId13"/>
     <p:sldId id="267" r:id="rId14"/>
-    <p:sldId id="268" r:id="rId15"/>
-    <p:sldId id="269" r:id="rId16"/>
-    <p:sldId id="270" r:id="rId17"/>
-    <p:sldId id="265" r:id="rId18"/>
-    <p:sldId id="266" r:id="rId19"/>
-    <p:sldId id="274" r:id="rId20"/>
-    <p:sldId id="275" r:id="rId21"/>
-    <p:sldId id="276" r:id="rId22"/>
-    <p:sldId id="277" r:id="rId23"/>
-    <p:sldId id="278" r:id="rId24"/>
+    <p:sldId id="279" r:id="rId15"/>
+    <p:sldId id="268" r:id="rId16"/>
+    <p:sldId id="269" r:id="rId17"/>
+    <p:sldId id="270" r:id="rId18"/>
+    <p:sldId id="265" r:id="rId19"/>
+    <p:sldId id="266" r:id="rId20"/>
+    <p:sldId id="274" r:id="rId21"/>
+    <p:sldId id="275" r:id="rId22"/>
+    <p:sldId id="276" r:id="rId23"/>
+    <p:sldId id="277" r:id="rId24"/>
+    <p:sldId id="278" r:id="rId25"/>
   </p:sldIdLst>
   <p:sldSz cx="12192000" cy="6858000"/>
   <p:notesSz cx="6858000" cy="9144000"/>
@@ -248,7 +249,7 @@
           <a:p>
             <a:fld id="{790E51D3-653E-462A-88BF-90B852BBE668}" type="datetimeFigureOut">
               <a:rPr lang="en-GB" smtClean="0"/>
-              <a:t>12/02/2018</a:t>
+              <a:t>14/02/2018</a:t>
             </a:fld>
             <a:endParaRPr lang="en-GB"/>
           </a:p>
@@ -425,7 +426,7 @@
           <a:p>
             <a:fld id="{60164965-4043-4174-93BC-54F5E5CCBD1D}" type="datetimeFigureOut">
               <a:rPr lang="en-US" smtClean="0"/>
-              <a:t>2/12/2018</a:t>
+              <a:t>2/14/2018</a:t>
             </a:fld>
             <a:endParaRPr lang="en-US"/>
           </a:p>
@@ -4323,14 +4324,19 @@
             <p:ph idx="1"/>
           </p:nvPr>
         </p:nvSpPr>
-        <p:spPr/>
+        <p:spPr>
+          <a:xfrm>
+            <a:off x="266699" y="1933349"/>
+            <a:ext cx="8509001" cy="4421991"/>
+          </a:xfrm>
+        </p:spPr>
         <p:txBody>
           <a:bodyPr/>
           <a:lstStyle/>
           <a:p>
             <a:r>
               <a:rPr lang="en-GB" dirty="0"/>
-              <a:t>Code for failure and “bad data” – ON BOTH SIDES</a:t>
+              <a:t>API-first approach means</a:t>
             </a:r>
           </a:p>
           <a:p>
@@ -4340,7 +4346,15 @@
             </a:pPr>
             <a:r>
               <a:rPr lang="en-GB" dirty="0"/>
-              <a:t>Missing parameters</a:t>
+              <a:t>Longer </a:t>
+            </a:r>
+            <a:r>
+              <a:rPr lang="en-GB" i="1" dirty="0"/>
+              <a:t>initial</a:t>
+            </a:r>
+            <a:r>
+              <a:rPr lang="en-GB" dirty="0"/>
+              <a:t> development lifecycle</a:t>
             </a:r>
           </a:p>
           <a:p>
@@ -4350,13 +4364,28 @@
             </a:pPr>
             <a:r>
               <a:rPr lang="en-GB" dirty="0"/>
-              <a:t>Invalid </a:t>
-            </a:r>
-            <a:r>
-              <a:rPr lang="en-GB" dirty="0" err="1"/>
-              <a:t>enums</a:t>
-            </a:r>
-            <a:endParaRPr lang="en-GB" dirty="0"/>
+              <a:t>Increased portability</a:t>
+            </a:r>
+          </a:p>
+          <a:p>
+            <a:pPr marL="342900" indent="-342900">
+              <a:buFontTx/>
+              <a:buChar char="-"/>
+            </a:pPr>
+            <a:r>
+              <a:rPr lang="en-GB" dirty="0"/>
+              <a:t>Better separation between database and interface</a:t>
+            </a:r>
+          </a:p>
+          <a:p>
+            <a:pPr marL="342900" indent="-342900">
+              <a:buFontTx/>
+              <a:buChar char="-"/>
+            </a:pPr>
+            <a:r>
+              <a:rPr lang="en-GB" dirty="0"/>
+              <a:t>Easier extensibility into other systems</a:t>
+            </a:r>
           </a:p>
           <a:p>
             <a:pPr marL="342900" indent="-342900">
@@ -4368,7 +4397,7 @@
           <a:p>
             <a:r>
               <a:rPr lang="en-GB" dirty="0"/>
-              <a:t>Be careful what you expose</a:t>
+              <a:t>Code for failure and “bad data” – ON BOTH SIDES</a:t>
             </a:r>
           </a:p>
           <a:p>
@@ -4378,7 +4407,7 @@
             </a:pPr>
             <a:r>
               <a:rPr lang="en-GB" dirty="0"/>
-              <a:t>Should your “status” field be editable</a:t>
+              <a:t>Missing parameters</a:t>
             </a:r>
           </a:p>
           <a:p>
@@ -4388,8 +4417,13 @@
             </a:pPr>
             <a:r>
               <a:rPr lang="en-GB" dirty="0"/>
-              <a:t>Or just set via workflow methods</a:t>
-            </a:r>
+              <a:t>Invalid </a:t>
+            </a:r>
+            <a:r>
+              <a:rPr lang="en-GB" dirty="0" err="1"/>
+              <a:t>enums</a:t>
+            </a:r>
+            <a:endParaRPr lang="en-GB" dirty="0"/>
           </a:p>
         </p:txBody>
       </p:sp>
@@ -4428,7 +4462,7 @@
           <p:cNvPr id="2" name="Title 1">
             <a:extLst>
               <a:ext uri="{FF2B5EF4-FFF2-40B4-BE49-F238E27FC236}">
-                <a16:creationId xmlns:a16="http://schemas.microsoft.com/office/drawing/2014/main" id="{11F888B0-6184-4E49-BE67-5D21583FAA29}"/>
+                <a16:creationId xmlns:a16="http://schemas.microsoft.com/office/drawing/2014/main" id="{DA325B3B-EB04-4DFE-AF62-DA7694510789}"/>
               </a:ext>
             </a:extLst>
           </p:cNvPr>
@@ -4446,7 +4480,7 @@
           <a:p>
             <a:r>
               <a:rPr lang="en-GB" dirty="0"/>
-              <a:t>documentation</a:t>
+              <a:t>considerations</a:t>
             </a:r>
           </a:p>
         </p:txBody>
@@ -4456,7 +4490,7 @@
           <p:cNvPr id="3" name="Content Placeholder 2">
             <a:extLst>
               <a:ext uri="{FF2B5EF4-FFF2-40B4-BE49-F238E27FC236}">
-                <a16:creationId xmlns:a16="http://schemas.microsoft.com/office/drawing/2014/main" id="{5D0BF05F-CB19-4169-8628-60F81EFBE59E}"/>
+                <a16:creationId xmlns:a16="http://schemas.microsoft.com/office/drawing/2014/main" id="{7348DDCC-5EBE-4C1F-B496-7D6BA1B7A59F}"/>
               </a:ext>
             </a:extLst>
           </p:cNvPr>
@@ -4474,105 +4508,84 @@
           <a:p>
             <a:r>
               <a:rPr lang="en-GB" dirty="0"/>
-              <a:t>Swagger / Open API Specification is standard</a:t>
-            </a:r>
-          </a:p>
-          <a:p>
-            <a:r>
-              <a:rPr lang="en-GB" dirty="0"/>
-              <a:t>Swagger Editor </a:t>
-            </a:r>
-            <a:r>
-              <a:rPr lang="en-GB" dirty="0">
-                <a:hlinkClick r:id="rId2"/>
-              </a:rPr>
-              <a:t>online</a:t>
-            </a:r>
-            <a:r>
-              <a:rPr lang="en-GB" dirty="0"/>
-              <a:t>, local node.js app or Docker</a:t>
-            </a:r>
-          </a:p>
-          <a:p>
-            <a:r>
-              <a:rPr lang="en-GB" dirty="0" err="1">
-                <a:hlinkClick r:id="rId3"/>
-              </a:rPr>
-              <a:t>OpenAPI</a:t>
-            </a:r>
-            <a:r>
-              <a:rPr lang="en-GB" dirty="0">
-                <a:hlinkClick r:id="rId3"/>
-              </a:rPr>
-              <a:t> 3.0</a:t>
-            </a:r>
-            <a:r>
-              <a:rPr lang="en-GB" dirty="0"/>
-              <a:t> released July 2017</a:t>
-            </a:r>
-          </a:p>
-          <a:p>
-            <a:r>
-              <a:rPr lang="en-GB" dirty="0"/>
-              <a:t>	Samples not yet updated</a:t>
-            </a:r>
-          </a:p>
-          <a:p>
-            <a:r>
-              <a:rPr lang="en-GB" dirty="0">
-                <a:hlinkClick r:id="rId4"/>
-              </a:rPr>
-              <a:t>Swagger 2.0</a:t>
-            </a:r>
-            <a:r>
-              <a:rPr lang="en-GB" dirty="0"/>
-              <a:t> has many examples</a:t>
-            </a:r>
-          </a:p>
-          <a:p>
-            <a:r>
-              <a:rPr lang="en-GB" dirty="0">
-                <a:hlinkClick r:id="rId5"/>
-              </a:rPr>
-              <a:t>Swagger Hub</a:t>
-            </a:r>
-            <a:r>
-              <a:rPr lang="en-GB" dirty="0"/>
-              <a:t> or tools like </a:t>
-            </a:r>
-            <a:r>
-              <a:rPr lang="en-GB" dirty="0" err="1">
-                <a:hlinkClick r:id="rId6"/>
-              </a:rPr>
-              <a:t>Mermade</a:t>
-            </a:r>
-            <a:r>
-              <a:rPr lang="en-GB" dirty="0"/>
-              <a:t> will convert</a:t>
-            </a:r>
-          </a:p>
-          <a:p>
-            <a:r>
-              <a:rPr lang="en-GB" dirty="0">
-                <a:hlinkClick r:id="rId7"/>
-              </a:rPr>
-              <a:t>Swagger UI</a:t>
-            </a:r>
-            <a:r>
-              <a:rPr lang="en-GB" dirty="0"/>
-              <a:t> allows testing against actual server</a:t>
-            </a:r>
-          </a:p>
-          <a:p>
-            <a:r>
-              <a:rPr lang="en-GB" dirty="0">
-                <a:hlinkClick r:id="rId8"/>
-              </a:rPr>
-              <a:t>Swagger mock server</a:t>
-            </a:r>
-            <a:r>
-              <a:rPr lang="en-GB" dirty="0"/>
-              <a:t> can be created</a:t>
+              <a:t>Security considerations</a:t>
+            </a:r>
+          </a:p>
+          <a:p>
+            <a:pPr marL="342900" indent="-342900">
+              <a:buFontTx/>
+              <a:buChar char="-"/>
+            </a:pPr>
+            <a:r>
+              <a:rPr lang="en-GB" dirty="0"/>
+              <a:t>How to restrict access to apps: API key, OAuth?</a:t>
+            </a:r>
+          </a:p>
+          <a:p>
+            <a:pPr marL="342900" indent="-342900">
+              <a:buFontTx/>
+              <a:buChar char="-"/>
+            </a:pPr>
+            <a:r>
+              <a:rPr lang="en-GB" dirty="0"/>
+              <a:t>Use header / query </a:t>
+            </a:r>
+            <a:r>
+              <a:rPr lang="en-GB" dirty="0" err="1"/>
+              <a:t>params</a:t>
+            </a:r>
+            <a:r>
+              <a:rPr lang="en-GB" dirty="0"/>
+              <a:t> correctly</a:t>
+            </a:r>
+          </a:p>
+          <a:p>
+            <a:pPr marL="342900" indent="-342900">
+              <a:buFontTx/>
+              <a:buChar char="-"/>
+            </a:pPr>
+            <a:r>
+              <a:rPr lang="en-GB" dirty="0"/>
+              <a:t>Secure e.g. scheduled endpoints differently</a:t>
+            </a:r>
+          </a:p>
+          <a:p>
+            <a:pPr marL="342900" indent="-342900">
+              <a:buFontTx/>
+              <a:buChar char="-"/>
+            </a:pPr>
+            <a:r>
+              <a:rPr lang="en-GB" dirty="0"/>
+              <a:t>Additional logging of transactions?</a:t>
+            </a:r>
+          </a:p>
+          <a:p>
+            <a:endParaRPr lang="en-GB" dirty="0"/>
+          </a:p>
+          <a:p>
+            <a:r>
+              <a:rPr lang="en-GB" dirty="0"/>
+              <a:t>Be careful what you expose</a:t>
+            </a:r>
+          </a:p>
+          <a:p>
+            <a:pPr marL="342900" indent="-342900">
+              <a:buFontTx/>
+              <a:buChar char="-"/>
+            </a:pPr>
+            <a:r>
+              <a:rPr lang="en-GB" dirty="0"/>
+              <a:t>Should your “status” field be editable</a:t>
+            </a:r>
+          </a:p>
+          <a:p>
+            <a:pPr marL="342900" indent="-342900">
+              <a:buFontTx/>
+              <a:buChar char="-"/>
+            </a:pPr>
+            <a:r>
+              <a:rPr lang="en-GB" dirty="0"/>
+              <a:t>Or just set via workflow methods</a:t>
             </a:r>
           </a:p>
         </p:txBody>
@@ -4580,7 +4593,7 @@
     </p:spTree>
     <p:extLst>
       <p:ext uri="{BB962C8B-B14F-4D97-AF65-F5344CB8AC3E}">
-        <p14:creationId xmlns:p14="http://schemas.microsoft.com/office/powerpoint/2010/main" val="3390775355"/>
+        <p14:creationId xmlns:p14="http://schemas.microsoft.com/office/powerpoint/2010/main" val="3630630439"/>
       </p:ext>
     </p:extLst>
   </p:cSld>
@@ -4612,7 +4625,7 @@
           <p:cNvPr id="2" name="Title 1">
             <a:extLst>
               <a:ext uri="{FF2B5EF4-FFF2-40B4-BE49-F238E27FC236}">
-                <a16:creationId xmlns:a16="http://schemas.microsoft.com/office/drawing/2014/main" id="{05AAFF9C-9D60-456C-9619-912E3CFE5A22}"/>
+                <a16:creationId xmlns:a16="http://schemas.microsoft.com/office/drawing/2014/main" id="{11F888B0-6184-4E49-BE67-5D21583FAA29}"/>
               </a:ext>
             </a:extLst>
           </p:cNvPr>
@@ -4629,10 +4642,9 @@
           <a:lstStyle/>
           <a:p>
             <a:r>
-              <a:rPr lang="en-GB" sz="4400" dirty="0"/>
-              <a:t>Creating a swagger definition</a:t>
-            </a:r>
-            <a:endParaRPr lang="en-GB" dirty="0"/>
+              <a:rPr lang="en-GB" dirty="0"/>
+              <a:t>documentation</a:t>
+            </a:r>
           </a:p>
         </p:txBody>
       </p:sp>
@@ -4641,7 +4653,7 @@
           <p:cNvPr id="3" name="Content Placeholder 2">
             <a:extLst>
               <a:ext uri="{FF2B5EF4-FFF2-40B4-BE49-F238E27FC236}">
-                <a16:creationId xmlns:a16="http://schemas.microsoft.com/office/drawing/2014/main" id="{C94BB55B-6C89-4F4B-A953-BD358C4216B6}"/>
+                <a16:creationId xmlns:a16="http://schemas.microsoft.com/office/drawing/2014/main" id="{5D0BF05F-CB19-4169-8628-60F81EFBE59E}"/>
               </a:ext>
             </a:extLst>
           </p:cNvPr>
@@ -4659,76 +4671,113 @@
           <a:p>
             <a:r>
               <a:rPr lang="en-GB" dirty="0"/>
-              <a:t>Write as YAML or JSON</a:t>
-            </a:r>
-          </a:p>
-          <a:p>
-            <a:pPr marL="901700" indent="-901700"/>
-            <a:r>
-              <a:rPr lang="en-GB" dirty="0"/>
-              <a:t>	YAML – no quotes around strings, no commas, no curly braces</a:t>
-            </a:r>
-          </a:p>
-          <a:p>
-            <a:r>
-              <a:rPr lang="en-GB" dirty="0" err="1"/>
-              <a:t>operationIds</a:t>
-            </a:r>
-            <a:r>
-              <a:rPr lang="en-GB" dirty="0"/>
-              <a:t> can be added</a:t>
-            </a:r>
-          </a:p>
-          <a:p>
-            <a:r>
-              <a:rPr lang="en-GB" dirty="0"/>
-              <a:t>	If used, required on all for that path</a:t>
-            </a:r>
-          </a:p>
-          <a:p>
-            <a:r>
-              <a:rPr lang="en-GB" dirty="0"/>
-              <a:t>Use </a:t>
-            </a:r>
-            <a:r>
-              <a:rPr lang="en-GB" dirty="0" err="1"/>
-              <a:t>enums</a:t>
-            </a:r>
-            <a:r>
-              <a:rPr lang="en-GB" dirty="0"/>
-              <a:t> for options</a:t>
-            </a:r>
-          </a:p>
-          <a:p>
-            <a:r>
-              <a:rPr lang="en-GB" dirty="0" err="1"/>
+              <a:t>Swagger / Open API Specification is standard</a:t>
+            </a:r>
+          </a:p>
+          <a:p>
+            <a:r>
+              <a:rPr lang="en-GB" dirty="0"/>
+              <a:t>Swagger Editor </a:t>
+            </a:r>
+            <a:r>
+              <a:rPr lang="en-GB" dirty="0">
+                <a:hlinkClick r:id="rId2"/>
+              </a:rPr>
+              <a:t>online</a:t>
+            </a:r>
+            <a:r>
+              <a:rPr lang="en-GB" dirty="0"/>
+              <a:t>, local node.js app or Docker</a:t>
+            </a:r>
+          </a:p>
+          <a:p>
+            <a:r>
+              <a:rPr lang="en-GB" dirty="0" err="1">
+                <a:hlinkClick r:id="rId3"/>
+              </a:rPr>
               <a:t>OpenAPI</a:t>
             </a:r>
             <a:r>
-              <a:rPr lang="en-GB" dirty="0"/>
-              <a:t> 3.0 allows examples, but </a:t>
-            </a:r>
-            <a:r>
-              <a:rPr lang="en-GB" b="1" dirty="0"/>
-              <a:t>clarify and add value</a:t>
-            </a:r>
-          </a:p>
-          <a:p>
-            <a:r>
-              <a:rPr lang="en-GB" dirty="0"/>
-              <a:t>“Framework for good documentation”, does not guarantee good documentation</a:t>
-            </a:r>
-            <a:endParaRPr lang="en-GB" b="1" dirty="0"/>
-          </a:p>
-          <a:p>
-            <a:endParaRPr lang="en-GB" dirty="0"/>
+              <a:rPr lang="en-GB" dirty="0">
+                <a:hlinkClick r:id="rId3"/>
+              </a:rPr>
+              <a:t> 3.0</a:t>
+            </a:r>
+            <a:r>
+              <a:rPr lang="en-GB" dirty="0"/>
+              <a:t> released July 2017</a:t>
+            </a:r>
+          </a:p>
+          <a:p>
+            <a:r>
+              <a:rPr lang="en-GB" dirty="0"/>
+              <a:t>	Samples not yet updated</a:t>
+            </a:r>
+          </a:p>
+          <a:p>
+            <a:r>
+              <a:rPr lang="en-GB" dirty="0">
+                <a:hlinkClick r:id="rId4"/>
+              </a:rPr>
+              <a:t>Swagger 2.0</a:t>
+            </a:r>
+            <a:r>
+              <a:rPr lang="en-GB" dirty="0"/>
+              <a:t> has many examples</a:t>
+            </a:r>
+          </a:p>
+          <a:p>
+            <a:r>
+              <a:rPr lang="en-GB" dirty="0">
+                <a:hlinkClick r:id="rId5"/>
+              </a:rPr>
+              <a:t>Swagger Hub</a:t>
+            </a:r>
+            <a:r>
+              <a:rPr lang="en-GB" dirty="0"/>
+              <a:t> or tools like </a:t>
+            </a:r>
+            <a:r>
+              <a:rPr lang="en-GB" dirty="0" err="1">
+                <a:hlinkClick r:id="rId6"/>
+              </a:rPr>
+              <a:t>Mermade</a:t>
+            </a:r>
+            <a:r>
+              <a:rPr lang="en-GB" dirty="0"/>
+              <a:t> will convert</a:t>
+            </a:r>
+          </a:p>
+          <a:p>
+            <a:r>
+              <a:rPr lang="en-GB" dirty="0">
+                <a:hlinkClick r:id="rId7"/>
+              </a:rPr>
+              <a:t>Swagger UI</a:t>
+            </a:r>
+            <a:r>
+              <a:rPr lang="en-GB" dirty="0"/>
+              <a:t> allows testing against actual server</a:t>
+            </a:r>
+          </a:p>
+          <a:p>
+            <a:r>
+              <a:rPr lang="en-GB" dirty="0">
+                <a:hlinkClick r:id="rId8"/>
+              </a:rPr>
+              <a:t>Swagger mock server</a:t>
+            </a:r>
+            <a:r>
+              <a:rPr lang="en-GB" dirty="0"/>
+              <a:t> can be created</a:t>
+            </a:r>
           </a:p>
         </p:txBody>
       </p:sp>
     </p:spTree>
     <p:extLst>
       <p:ext uri="{BB962C8B-B14F-4D97-AF65-F5344CB8AC3E}">
-        <p14:creationId xmlns:p14="http://schemas.microsoft.com/office/powerpoint/2010/main" val="3409692770"/>
+        <p14:creationId xmlns:p14="http://schemas.microsoft.com/office/powerpoint/2010/main" val="3390775355"/>
       </p:ext>
     </p:extLst>
   </p:cSld>
@@ -4760,7 +4809,7 @@
           <p:cNvPr id="2" name="Title 1">
             <a:extLst>
               <a:ext uri="{FF2B5EF4-FFF2-40B4-BE49-F238E27FC236}">
-                <a16:creationId xmlns:a16="http://schemas.microsoft.com/office/drawing/2014/main" id="{701EB0D4-BE51-4EB9-95BA-1387E3008DA7}"/>
+                <a16:creationId xmlns:a16="http://schemas.microsoft.com/office/drawing/2014/main" id="{05AAFF9C-9D60-456C-9619-912E3CFE5A22}"/>
               </a:ext>
             </a:extLst>
           </p:cNvPr>
@@ -4777,9 +4826,10 @@
           <a:lstStyle/>
           <a:p>
             <a:r>
-              <a:rPr lang="en-GB" dirty="0"/>
-              <a:t>testing</a:t>
-            </a:r>
+              <a:rPr lang="en-GB" sz="4400" dirty="0"/>
+              <a:t>Creating a swagger definition</a:t>
+            </a:r>
+            <a:endParaRPr lang="en-GB" dirty="0"/>
           </a:p>
         </p:txBody>
       </p:sp>
@@ -4788,7 +4838,7 @@
           <p:cNvPr id="3" name="Content Placeholder 2">
             <a:extLst>
               <a:ext uri="{FF2B5EF4-FFF2-40B4-BE49-F238E27FC236}">
-                <a16:creationId xmlns:a16="http://schemas.microsoft.com/office/drawing/2014/main" id="{090C2521-717E-412B-B21A-03628179FB11}"/>
+                <a16:creationId xmlns:a16="http://schemas.microsoft.com/office/drawing/2014/main" id="{C94BB55B-6C89-4F4B-A953-BD358C4216B6}"/>
               </a:ext>
             </a:extLst>
           </p:cNvPr>
@@ -4806,39 +4856,76 @@
           <a:p>
             <a:r>
               <a:rPr lang="en-GB" dirty="0"/>
-              <a:t>Various REST service tools are available</a:t>
-            </a:r>
-          </a:p>
-          <a:p>
-            <a:pPr marL="342900" indent="-342900">
-              <a:buFontTx/>
-              <a:buChar char="-"/>
-            </a:pPr>
-            <a:r>
-              <a:rPr lang="en-GB" dirty="0"/>
-              <a:t>Postman (Electron desktop app)</a:t>
-            </a:r>
-          </a:p>
-          <a:p>
-            <a:pPr marL="342900" indent="-342900">
-              <a:buFontTx/>
-              <a:buChar char="-"/>
-            </a:pPr>
+              <a:t>Write as YAML or JSON</a:t>
+            </a:r>
+          </a:p>
+          <a:p>
+            <a:pPr marL="901700" indent="-901700"/>
+            <a:r>
+              <a:rPr lang="en-GB" dirty="0"/>
+              <a:t>	YAML – no quotes around strings, no commas, no curly braces</a:t>
+            </a:r>
+          </a:p>
+          <a:p>
             <a:r>
               <a:rPr lang="en-GB" dirty="0" err="1"/>
-              <a:t>RestClient</a:t>
-            </a:r>
-            <a:r>
-              <a:rPr lang="en-GB" dirty="0"/>
-              <a:t> plugin for Firefox</a:t>
-            </a:r>
+              <a:t>operationIds</a:t>
+            </a:r>
+            <a:r>
+              <a:rPr lang="en-GB" dirty="0"/>
+              <a:t> can be added</a:t>
+            </a:r>
+          </a:p>
+          <a:p>
+            <a:r>
+              <a:rPr lang="en-GB" dirty="0"/>
+              <a:t>	If used, required on all for that path</a:t>
+            </a:r>
+          </a:p>
+          <a:p>
+            <a:r>
+              <a:rPr lang="en-GB" dirty="0"/>
+              <a:t>Use </a:t>
+            </a:r>
+            <a:r>
+              <a:rPr lang="en-GB" dirty="0" err="1"/>
+              <a:t>enums</a:t>
+            </a:r>
+            <a:r>
+              <a:rPr lang="en-GB" dirty="0"/>
+              <a:t> for options</a:t>
+            </a:r>
+          </a:p>
+          <a:p>
+            <a:r>
+              <a:rPr lang="en-GB" dirty="0" err="1"/>
+              <a:t>OpenAPI</a:t>
+            </a:r>
+            <a:r>
+              <a:rPr lang="en-GB" dirty="0"/>
+              <a:t> 3.0 allows examples, but </a:t>
+            </a:r>
+            <a:r>
+              <a:rPr lang="en-GB" b="1" dirty="0"/>
+              <a:t>clarify and add value</a:t>
+            </a:r>
+          </a:p>
+          <a:p>
+            <a:r>
+              <a:rPr lang="en-GB" dirty="0"/>
+              <a:t>“Framework for good documentation”, does not guarantee good documentation</a:t>
+            </a:r>
+            <a:endParaRPr lang="en-GB" b="1" dirty="0"/>
+          </a:p>
+          <a:p>
+            <a:endParaRPr lang="en-GB" dirty="0"/>
           </a:p>
         </p:txBody>
       </p:sp>
     </p:spTree>
     <p:extLst>
       <p:ext uri="{BB962C8B-B14F-4D97-AF65-F5344CB8AC3E}">
-        <p14:creationId xmlns:p14="http://schemas.microsoft.com/office/powerpoint/2010/main" val="1453544228"/>
+        <p14:creationId xmlns:p14="http://schemas.microsoft.com/office/powerpoint/2010/main" val="3409692770"/>
       </p:ext>
     </p:extLst>
   </p:cSld>
@@ -4870,7 +4957,7 @@
           <p:cNvPr id="2" name="Title 1">
             <a:extLst>
               <a:ext uri="{FF2B5EF4-FFF2-40B4-BE49-F238E27FC236}">
-                <a16:creationId xmlns:a16="http://schemas.microsoft.com/office/drawing/2014/main" id="{BDDECFA5-674E-480C-9B09-ECB6EAFBCFD0}"/>
+                <a16:creationId xmlns:a16="http://schemas.microsoft.com/office/drawing/2014/main" id="{701EB0D4-BE51-4EB9-95BA-1387E3008DA7}"/>
               </a:ext>
             </a:extLst>
           </p:cNvPr>
@@ -4888,7 +4975,7 @@
           <a:p>
             <a:r>
               <a:rPr lang="en-GB" dirty="0"/>
-              <a:t>HTTP status codes</a:t>
+              <a:t>testing</a:t>
             </a:r>
           </a:p>
         </p:txBody>
@@ -4898,7 +4985,7 @@
           <p:cNvPr id="3" name="Content Placeholder 2">
             <a:extLst>
               <a:ext uri="{FF2B5EF4-FFF2-40B4-BE49-F238E27FC236}">
-                <a16:creationId xmlns:a16="http://schemas.microsoft.com/office/drawing/2014/main" id="{7E62BE25-35A8-46F0-8E50-33C5CC9893D2}"/>
+                <a16:creationId xmlns:a16="http://schemas.microsoft.com/office/drawing/2014/main" id="{090C2521-717E-412B-B21A-03628179FB11}"/>
               </a:ext>
             </a:extLst>
           </p:cNvPr>
@@ -4916,55 +5003,39 @@
           <a:p>
             <a:r>
               <a:rPr lang="en-GB" dirty="0"/>
-              <a:t>1xx – Received and understood, stand by…</a:t>
-            </a:r>
-          </a:p>
-          <a:p>
-            <a:r>
-              <a:rPr lang="en-GB" dirty="0"/>
-              <a:t>2xx – Received, understood and accepted</a:t>
-            </a:r>
-          </a:p>
-          <a:p>
-            <a:r>
-              <a:rPr lang="en-GB" dirty="0"/>
-              <a:t>3xx – Redirecting</a:t>
-            </a:r>
-          </a:p>
-          <a:p>
-            <a:r>
-              <a:rPr lang="en-GB" dirty="0"/>
-              <a:t>4xx – You did something wrong!</a:t>
-            </a:r>
-          </a:p>
-          <a:p>
-            <a:r>
-              <a:rPr lang="en-GB" dirty="0"/>
-              <a:t>5xx – We did something wrong!</a:t>
-            </a:r>
-          </a:p>
-          <a:p>
-            <a:endParaRPr lang="en-GB" dirty="0"/>
-          </a:p>
-          <a:p>
-            <a:r>
-              <a:rPr lang="en-GB" dirty="0"/>
-              <a:t>See </a:t>
-            </a:r>
-            <a:r>
-              <a:rPr lang="en-GB" dirty="0">
-                <a:hlinkClick r:id="rId2"/>
-              </a:rPr>
-              <a:t>Wikipedia</a:t>
-            </a:r>
-            <a:endParaRPr lang="en-GB" dirty="0"/>
+              <a:t>Various REST service tools are available</a:t>
+            </a:r>
+          </a:p>
+          <a:p>
+            <a:pPr marL="342900" indent="-342900">
+              <a:buFontTx/>
+              <a:buChar char="-"/>
+            </a:pPr>
+            <a:r>
+              <a:rPr lang="en-GB" dirty="0"/>
+              <a:t>Postman (Electron desktop app)</a:t>
+            </a:r>
+          </a:p>
+          <a:p>
+            <a:pPr marL="342900" indent="-342900">
+              <a:buFontTx/>
+              <a:buChar char="-"/>
+            </a:pPr>
+            <a:r>
+              <a:rPr lang="en-GB" dirty="0" err="1"/>
+              <a:t>RestClient</a:t>
+            </a:r>
+            <a:r>
+              <a:rPr lang="en-GB" dirty="0"/>
+              <a:t> plugin for Firefox</a:t>
+            </a:r>
           </a:p>
         </p:txBody>
       </p:sp>
     </p:spTree>
     <p:extLst>
       <p:ext uri="{BB962C8B-B14F-4D97-AF65-F5344CB8AC3E}">
-        <p14:creationId xmlns:p14="http://schemas.microsoft.com/office/powerpoint/2010/main" val="2800926257"/>
+        <p14:creationId xmlns:p14="http://schemas.microsoft.com/office/powerpoint/2010/main" val="1453544228"/>
       </p:ext>
     </p:extLst>
   </p:cSld>
@@ -4996,7 +5067,7 @@
           <p:cNvPr id="2" name="Title 1">
             <a:extLst>
               <a:ext uri="{FF2B5EF4-FFF2-40B4-BE49-F238E27FC236}">
-                <a16:creationId xmlns:a16="http://schemas.microsoft.com/office/drawing/2014/main" id="{28D4950E-C911-48D5-B236-0A6C79E2A3E6}"/>
+                <a16:creationId xmlns:a16="http://schemas.microsoft.com/office/drawing/2014/main" id="{BDDECFA5-674E-480C-9B09-ECB6EAFBCFD0}"/>
               </a:ext>
             </a:extLst>
           </p:cNvPr>
@@ -5014,7 +5085,7 @@
           <a:p>
             <a:r>
               <a:rPr lang="en-GB" dirty="0"/>
-              <a:t>http status codes</a:t>
+              <a:t>HTTP status codes</a:t>
             </a:r>
           </a:p>
         </p:txBody>
@@ -5024,7 +5095,7 @@
           <p:cNvPr id="3" name="Content Placeholder 2">
             <a:extLst>
               <a:ext uri="{FF2B5EF4-FFF2-40B4-BE49-F238E27FC236}">
-                <a16:creationId xmlns:a16="http://schemas.microsoft.com/office/drawing/2014/main" id="{D2C3A57F-87ED-48C2-9CAC-38FA5FE319DC}"/>
+                <a16:creationId xmlns:a16="http://schemas.microsoft.com/office/drawing/2014/main" id="{7E62BE25-35A8-46F0-8E50-33C5CC9893D2}"/>
               </a:ext>
             </a:extLst>
           </p:cNvPr>
@@ -5042,63 +5113,55 @@
           <a:p>
             <a:r>
               <a:rPr lang="en-GB" dirty="0"/>
-              <a:t>200 – OK</a:t>
-            </a:r>
-          </a:p>
-          <a:p>
-            <a:r>
-              <a:rPr lang="en-GB" dirty="0"/>
-              <a:t>202 – Accepted for processing</a:t>
-            </a:r>
-          </a:p>
-          <a:p>
-            <a:r>
-              <a:rPr lang="en-GB" dirty="0"/>
-              <a:t>302 – URL found but server is redirecting</a:t>
-            </a:r>
-          </a:p>
-          <a:p>
-            <a:r>
-              <a:rPr lang="en-GB" dirty="0"/>
-              <a:t>400 – Bad request</a:t>
-            </a:r>
-          </a:p>
-          <a:p>
-            <a:r>
-              <a:rPr lang="en-GB" dirty="0"/>
-              <a:t>401 – Unauthorised</a:t>
-            </a:r>
-          </a:p>
-          <a:p>
-            <a:r>
-              <a:rPr lang="en-GB" dirty="0"/>
-              <a:t>403 – Forbidden</a:t>
-            </a:r>
-          </a:p>
-          <a:p>
-            <a:r>
-              <a:rPr lang="en-GB" dirty="0"/>
-              <a:t>404 – Not found</a:t>
-            </a:r>
-          </a:p>
-          <a:p>
-            <a:r>
-              <a:rPr lang="en-GB" dirty="0"/>
-              <a:t>405 – Method not allowed</a:t>
-            </a:r>
-          </a:p>
-          <a:p>
-            <a:r>
-              <a:rPr lang="en-GB" dirty="0"/>
-              <a:t>500 – Internal server error</a:t>
-            </a:r>
+              <a:t>1xx – Received and understood, stand by…</a:t>
+            </a:r>
+          </a:p>
+          <a:p>
+            <a:r>
+              <a:rPr lang="en-GB" dirty="0"/>
+              <a:t>2xx – Received, understood and accepted</a:t>
+            </a:r>
+          </a:p>
+          <a:p>
+            <a:r>
+              <a:rPr lang="en-GB" dirty="0"/>
+              <a:t>3xx – Redirecting</a:t>
+            </a:r>
+          </a:p>
+          <a:p>
+            <a:r>
+              <a:rPr lang="en-GB" dirty="0"/>
+              <a:t>4xx – You did something wrong!</a:t>
+            </a:r>
+          </a:p>
+          <a:p>
+            <a:r>
+              <a:rPr lang="en-GB" dirty="0"/>
+              <a:t>5xx – We did something wrong!</a:t>
+            </a:r>
+          </a:p>
+          <a:p>
+            <a:endParaRPr lang="en-GB" dirty="0"/>
+          </a:p>
+          <a:p>
+            <a:r>
+              <a:rPr lang="en-GB" dirty="0"/>
+              <a:t>See </a:t>
+            </a:r>
+            <a:r>
+              <a:rPr lang="en-GB" dirty="0">
+                <a:hlinkClick r:id="rId2"/>
+              </a:rPr>
+              <a:t>Wikipedia</a:t>
+            </a:r>
+            <a:endParaRPr lang="en-GB" dirty="0"/>
           </a:p>
         </p:txBody>
       </p:sp>
     </p:spTree>
     <p:extLst>
       <p:ext uri="{BB962C8B-B14F-4D97-AF65-F5344CB8AC3E}">
-        <p14:creationId xmlns:p14="http://schemas.microsoft.com/office/powerpoint/2010/main" val="397643937"/>
+        <p14:creationId xmlns:p14="http://schemas.microsoft.com/office/powerpoint/2010/main" val="2800926257"/>
       </p:ext>
     </p:extLst>
   </p:cSld>
@@ -5127,10 +5190,10 @@
       </p:grpSpPr>
       <p:sp>
         <p:nvSpPr>
-          <p:cNvPr id="4" name="Title 3">
+          <p:cNvPr id="2" name="Title 1">
             <a:extLst>
               <a:ext uri="{FF2B5EF4-FFF2-40B4-BE49-F238E27FC236}">
-                <a16:creationId xmlns:a16="http://schemas.microsoft.com/office/drawing/2014/main" id="{380905A8-B705-4037-8A33-724430522F63}"/>
+                <a16:creationId xmlns:a16="http://schemas.microsoft.com/office/drawing/2014/main" id="{28D4950E-C911-48D5-B236-0A6C79E2A3E6}"/>
               </a:ext>
             </a:extLst>
           </p:cNvPr>
@@ -5138,7 +5201,7 @@
             <a:spLocks noGrp="1"/>
           </p:cNvSpPr>
           <p:nvPr>
-            <p:ph type="ctrTitle"/>
+            <p:ph type="title"/>
           </p:nvPr>
         </p:nvSpPr>
         <p:spPr/>
@@ -5148,7 +5211,83 @@
           <a:p>
             <a:r>
               <a:rPr lang="en-GB" dirty="0"/>
-              <a:t>What about scheduled tasks?</a:t>
+              <a:t>http status codes</a:t>
+            </a:r>
+          </a:p>
+        </p:txBody>
+      </p:sp>
+      <p:sp>
+        <p:nvSpPr>
+          <p:cNvPr id="3" name="Content Placeholder 2">
+            <a:extLst>
+              <a:ext uri="{FF2B5EF4-FFF2-40B4-BE49-F238E27FC236}">
+                <a16:creationId xmlns:a16="http://schemas.microsoft.com/office/drawing/2014/main" id="{D2C3A57F-87ED-48C2-9CAC-38FA5FE319DC}"/>
+              </a:ext>
+            </a:extLst>
+          </p:cNvPr>
+          <p:cNvSpPr>
+            <a:spLocks noGrp="1"/>
+          </p:cNvSpPr>
+          <p:nvPr>
+            <p:ph idx="1"/>
+          </p:nvPr>
+        </p:nvSpPr>
+        <p:spPr/>
+        <p:txBody>
+          <a:bodyPr/>
+          <a:lstStyle/>
+          <a:p>
+            <a:r>
+              <a:rPr lang="en-GB" dirty="0"/>
+              <a:t>200 – OK</a:t>
+            </a:r>
+          </a:p>
+          <a:p>
+            <a:r>
+              <a:rPr lang="en-GB" dirty="0"/>
+              <a:t>202 – Accepted for processing</a:t>
+            </a:r>
+          </a:p>
+          <a:p>
+            <a:r>
+              <a:rPr lang="en-GB" dirty="0"/>
+              <a:t>302 – URL found but server is redirecting</a:t>
+            </a:r>
+          </a:p>
+          <a:p>
+            <a:r>
+              <a:rPr lang="en-GB" dirty="0"/>
+              <a:t>400 – Bad request</a:t>
+            </a:r>
+          </a:p>
+          <a:p>
+            <a:r>
+              <a:rPr lang="en-GB" dirty="0"/>
+              <a:t>401 – Unauthorised</a:t>
+            </a:r>
+          </a:p>
+          <a:p>
+            <a:r>
+              <a:rPr lang="en-GB" dirty="0"/>
+              <a:t>403 – Forbidden</a:t>
+            </a:r>
+          </a:p>
+          <a:p>
+            <a:r>
+              <a:rPr lang="en-GB" dirty="0"/>
+              <a:t>404 – Not found</a:t>
+            </a:r>
+          </a:p>
+          <a:p>
+            <a:r>
+              <a:rPr lang="en-GB" dirty="0"/>
+              <a:t>405 – Method not allowed</a:t>
+            </a:r>
+          </a:p>
+          <a:p>
+            <a:r>
+              <a:rPr lang="en-GB" dirty="0"/>
+              <a:t>500 – Internal server error</a:t>
             </a:r>
           </a:p>
         </p:txBody>
@@ -5156,7 +5295,7 @@
     </p:spTree>
     <p:extLst>
       <p:ext uri="{BB962C8B-B14F-4D97-AF65-F5344CB8AC3E}">
-        <p14:creationId xmlns:p14="http://schemas.microsoft.com/office/powerpoint/2010/main" val="508418059"/>
+        <p14:creationId xmlns:p14="http://schemas.microsoft.com/office/powerpoint/2010/main" val="397643937"/>
       </p:ext>
     </p:extLst>
   </p:cSld>
@@ -5982,7 +6121,7 @@
           <p:cNvPr id="4" name="Title 3">
             <a:extLst>
               <a:ext uri="{FF2B5EF4-FFF2-40B4-BE49-F238E27FC236}">
-                <a16:creationId xmlns:a16="http://schemas.microsoft.com/office/drawing/2014/main" id="{5F661A78-1620-4819-8674-16466DDEA36A}"/>
+                <a16:creationId xmlns:a16="http://schemas.microsoft.com/office/drawing/2014/main" id="{380905A8-B705-4037-8A33-724430522F63}"/>
               </a:ext>
             </a:extLst>
           </p:cNvPr>
@@ -5990,7 +6129,7 @@
             <a:spLocks noGrp="1"/>
           </p:cNvSpPr>
           <p:nvPr>
-            <p:ph type="title"/>
+            <p:ph type="ctrTitle"/>
           </p:nvPr>
         </p:nvSpPr>
         <p:spPr/>
@@ -6000,63 +6139,7 @@
           <a:p>
             <a:r>
               <a:rPr lang="en-GB" dirty="0"/>
-              <a:t>Scheduled tasks</a:t>
-            </a:r>
-          </a:p>
-        </p:txBody>
-      </p:sp>
-      <p:sp>
-        <p:nvSpPr>
-          <p:cNvPr id="5" name="Content Placeholder 4">
-            <a:extLst>
-              <a:ext uri="{FF2B5EF4-FFF2-40B4-BE49-F238E27FC236}">
-                <a16:creationId xmlns:a16="http://schemas.microsoft.com/office/drawing/2014/main" id="{D8951B21-ADD7-4D86-B572-B18845D6A0F7}"/>
-              </a:ext>
-            </a:extLst>
-          </p:cNvPr>
-          <p:cNvSpPr>
-            <a:spLocks noGrp="1"/>
-          </p:cNvSpPr>
-          <p:nvPr>
-            <p:ph idx="1"/>
-          </p:nvPr>
-        </p:nvSpPr>
-        <p:spPr/>
-        <p:txBody>
-          <a:bodyPr/>
-          <a:lstStyle/>
-          <a:p>
-            <a:r>
-              <a:rPr lang="en-GB" dirty="0"/>
-              <a:t>Agents</a:t>
-            </a:r>
-          </a:p>
-          <a:p>
-            <a:r>
-              <a:rPr lang="en-GB" dirty="0"/>
-              <a:t>	NSF only, language constraints</a:t>
-            </a:r>
-          </a:p>
-          <a:p>
-            <a:r>
-              <a:rPr lang="en-GB" dirty="0"/>
-              <a:t>DOTS</a:t>
-            </a:r>
-          </a:p>
-          <a:p>
-            <a:r>
-              <a:rPr lang="en-GB" dirty="0"/>
-              <a:t>	Server only, deployment constraints</a:t>
-            </a:r>
-          </a:p>
-          <a:p>
-            <a:endParaRPr lang="en-GB" dirty="0"/>
-          </a:p>
-          <a:p>
-            <a:pPr algn="ctr"/>
-            <a:r>
-              <a:rPr lang="en-GB" dirty="0"/>
-              <a:t>How about a different approach?</a:t>
+              <a:t>What about scheduled tasks?</a:t>
             </a:r>
           </a:p>
         </p:txBody>
@@ -6064,7 +6147,7 @@
     </p:spTree>
     <p:extLst>
       <p:ext uri="{BB962C8B-B14F-4D97-AF65-F5344CB8AC3E}">
-        <p14:creationId xmlns:p14="http://schemas.microsoft.com/office/powerpoint/2010/main" val="1206375528"/>
+        <p14:creationId xmlns:p14="http://schemas.microsoft.com/office/powerpoint/2010/main" val="508418059"/>
       </p:ext>
     </p:extLst>
   </p:cSld>
@@ -6093,10 +6176,10 @@
       </p:grpSpPr>
       <p:sp>
         <p:nvSpPr>
-          <p:cNvPr id="2" name="Title 1">
+          <p:cNvPr id="4" name="Title 3">
             <a:extLst>
               <a:ext uri="{FF2B5EF4-FFF2-40B4-BE49-F238E27FC236}">
-                <a16:creationId xmlns:a16="http://schemas.microsoft.com/office/drawing/2014/main" id="{004A5E56-F513-4A94-A58F-4235E160341C}"/>
+                <a16:creationId xmlns:a16="http://schemas.microsoft.com/office/drawing/2014/main" id="{5F661A78-1620-4819-8674-16466DDEA36A}"/>
               </a:ext>
             </a:extLst>
           </p:cNvPr>
@@ -6114,17 +6197,17 @@
           <a:p>
             <a:r>
               <a:rPr lang="en-GB" dirty="0"/>
-              <a:t>Rest + node-red = flexibility</a:t>
-            </a:r>
-          </a:p>
-        </p:txBody>
-      </p:sp>
-      <p:sp>
-        <p:nvSpPr>
-          <p:cNvPr id="3" name="Content Placeholder 2">
+              <a:t>Scheduled tasks</a:t>
+            </a:r>
+          </a:p>
+        </p:txBody>
+      </p:sp>
+      <p:sp>
+        <p:nvSpPr>
+          <p:cNvPr id="5" name="Content Placeholder 4">
             <a:extLst>
               <a:ext uri="{FF2B5EF4-FFF2-40B4-BE49-F238E27FC236}">
-                <a16:creationId xmlns:a16="http://schemas.microsoft.com/office/drawing/2014/main" id="{3FAAA951-B22E-4803-A2C0-9CF1E7E33F9E}"/>
+                <a16:creationId xmlns:a16="http://schemas.microsoft.com/office/drawing/2014/main" id="{D8951B21-ADD7-4D86-B572-B18845D6A0F7}"/>
               </a:ext>
             </a:extLst>
           </p:cNvPr>
@@ -6142,68 +6225,35 @@
           <a:p>
             <a:r>
               <a:rPr lang="en-GB" dirty="0"/>
-              <a:t>REST</a:t>
-            </a:r>
-          </a:p>
-          <a:p>
-            <a:r>
-              <a:rPr lang="en-GB" dirty="0"/>
-              <a:t>	</a:t>
-            </a:r>
-            <a:r>
-              <a:rPr lang="en-GB" dirty="0" err="1"/>
-              <a:t>XAgent</a:t>
-            </a:r>
-            <a:r>
-              <a:rPr lang="en-GB" dirty="0"/>
-              <a:t> / </a:t>
-            </a:r>
-            <a:r>
-              <a:rPr lang="en-GB" dirty="0" err="1"/>
-              <a:t>SmartNSF</a:t>
-            </a:r>
-            <a:r>
-              <a:rPr lang="en-GB" dirty="0"/>
-              <a:t> / REST endpoint</a:t>
-            </a:r>
-          </a:p>
-          <a:p>
-            <a:r>
-              <a:rPr lang="en-GB" dirty="0"/>
-              <a:t>	Use </a:t>
-            </a:r>
-            <a:r>
-              <a:rPr lang="en-GB" dirty="0" err="1"/>
-              <a:t>Xots</a:t>
-            </a:r>
-            <a:r>
-              <a:rPr lang="en-GB" dirty="0"/>
-              <a:t> for background processing</a:t>
-            </a:r>
-          </a:p>
-          <a:p>
-            <a:r>
-              <a:rPr lang="en-GB" dirty="0"/>
-              <a:t>	Utility methods added to ODA to boilerplate</a:t>
-            </a:r>
-          </a:p>
-          <a:p>
-            <a:r>
-              <a:rPr lang="en-GB" dirty="0"/>
-              <a:t>Node-RED</a:t>
-            </a:r>
-          </a:p>
-          <a:p>
-            <a:r>
-              <a:rPr lang="en-GB" dirty="0"/>
-              <a:t>	Scheduling and flows</a:t>
-            </a:r>
-          </a:p>
-          <a:p>
-            <a:pPr marL="901700" indent="-901700"/>
-            <a:r>
-              <a:rPr lang="en-GB" dirty="0"/>
-              <a:t>	Other schedulers would work, as long as they can call a REST service</a:t>
+              <a:t>Agents</a:t>
+            </a:r>
+          </a:p>
+          <a:p>
+            <a:r>
+              <a:rPr lang="en-GB" dirty="0"/>
+              <a:t>	NSF only, language constraints</a:t>
+            </a:r>
+          </a:p>
+          <a:p>
+            <a:r>
+              <a:rPr lang="en-GB" dirty="0"/>
+              <a:t>DOTS</a:t>
+            </a:r>
+          </a:p>
+          <a:p>
+            <a:r>
+              <a:rPr lang="en-GB" dirty="0"/>
+              <a:t>	Server only, deployment constraints</a:t>
+            </a:r>
+          </a:p>
+          <a:p>
+            <a:endParaRPr lang="en-GB" dirty="0"/>
+          </a:p>
+          <a:p>
+            <a:pPr algn="ctr"/>
+            <a:r>
+              <a:rPr lang="en-GB" dirty="0"/>
+              <a:t>How about a different approach?</a:t>
             </a:r>
           </a:p>
         </p:txBody>
@@ -6211,7 +6261,7 @@
     </p:spTree>
     <p:extLst>
       <p:ext uri="{BB962C8B-B14F-4D97-AF65-F5344CB8AC3E}">
-        <p14:creationId xmlns:p14="http://schemas.microsoft.com/office/powerpoint/2010/main" val="3690183967"/>
+        <p14:creationId xmlns:p14="http://schemas.microsoft.com/office/powerpoint/2010/main" val="1206375528"/>
       </p:ext>
     </p:extLst>
   </p:cSld>
@@ -6243,6 +6293,153 @@
           <p:cNvPr id="2" name="Title 1">
             <a:extLst>
               <a:ext uri="{FF2B5EF4-FFF2-40B4-BE49-F238E27FC236}">
+                <a16:creationId xmlns:a16="http://schemas.microsoft.com/office/drawing/2014/main" id="{004A5E56-F513-4A94-A58F-4235E160341C}"/>
+              </a:ext>
+            </a:extLst>
+          </p:cNvPr>
+          <p:cNvSpPr>
+            <a:spLocks noGrp="1"/>
+          </p:cNvSpPr>
+          <p:nvPr>
+            <p:ph type="title"/>
+          </p:nvPr>
+        </p:nvSpPr>
+        <p:spPr/>
+        <p:txBody>
+          <a:bodyPr/>
+          <a:lstStyle/>
+          <a:p>
+            <a:r>
+              <a:rPr lang="en-GB" dirty="0"/>
+              <a:t>Rest + node-red = flexibility</a:t>
+            </a:r>
+          </a:p>
+        </p:txBody>
+      </p:sp>
+      <p:sp>
+        <p:nvSpPr>
+          <p:cNvPr id="3" name="Content Placeholder 2">
+            <a:extLst>
+              <a:ext uri="{FF2B5EF4-FFF2-40B4-BE49-F238E27FC236}">
+                <a16:creationId xmlns:a16="http://schemas.microsoft.com/office/drawing/2014/main" id="{3FAAA951-B22E-4803-A2C0-9CF1E7E33F9E}"/>
+              </a:ext>
+            </a:extLst>
+          </p:cNvPr>
+          <p:cNvSpPr>
+            <a:spLocks noGrp="1"/>
+          </p:cNvSpPr>
+          <p:nvPr>
+            <p:ph idx="1"/>
+          </p:nvPr>
+        </p:nvSpPr>
+        <p:spPr/>
+        <p:txBody>
+          <a:bodyPr/>
+          <a:lstStyle/>
+          <a:p>
+            <a:r>
+              <a:rPr lang="en-GB" dirty="0"/>
+              <a:t>REST</a:t>
+            </a:r>
+          </a:p>
+          <a:p>
+            <a:r>
+              <a:rPr lang="en-GB" dirty="0"/>
+              <a:t>	</a:t>
+            </a:r>
+            <a:r>
+              <a:rPr lang="en-GB" dirty="0" err="1"/>
+              <a:t>XAgent</a:t>
+            </a:r>
+            <a:r>
+              <a:rPr lang="en-GB" dirty="0"/>
+              <a:t> / </a:t>
+            </a:r>
+            <a:r>
+              <a:rPr lang="en-GB" dirty="0" err="1"/>
+              <a:t>SmartNSF</a:t>
+            </a:r>
+            <a:r>
+              <a:rPr lang="en-GB" dirty="0"/>
+              <a:t> / REST endpoint</a:t>
+            </a:r>
+          </a:p>
+          <a:p>
+            <a:r>
+              <a:rPr lang="en-GB" dirty="0"/>
+              <a:t>	Use </a:t>
+            </a:r>
+            <a:r>
+              <a:rPr lang="en-GB" dirty="0" err="1"/>
+              <a:t>Xots</a:t>
+            </a:r>
+            <a:r>
+              <a:rPr lang="en-GB" dirty="0"/>
+              <a:t> for background processing</a:t>
+            </a:r>
+          </a:p>
+          <a:p>
+            <a:r>
+              <a:rPr lang="en-GB" dirty="0"/>
+              <a:t>	Utility methods added to ODA to boilerplate</a:t>
+            </a:r>
+          </a:p>
+          <a:p>
+            <a:r>
+              <a:rPr lang="en-GB" dirty="0"/>
+              <a:t>Node-RED</a:t>
+            </a:r>
+          </a:p>
+          <a:p>
+            <a:r>
+              <a:rPr lang="en-GB" dirty="0"/>
+              <a:t>	Scheduling and flows</a:t>
+            </a:r>
+          </a:p>
+          <a:p>
+            <a:pPr marL="901700" indent="-901700"/>
+            <a:r>
+              <a:rPr lang="en-GB" dirty="0"/>
+              <a:t>	Other schedulers would work, as long as they can call a REST service</a:t>
+            </a:r>
+          </a:p>
+        </p:txBody>
+      </p:sp>
+    </p:spTree>
+    <p:extLst>
+      <p:ext uri="{BB962C8B-B14F-4D97-AF65-F5344CB8AC3E}">
+        <p14:creationId xmlns:p14="http://schemas.microsoft.com/office/powerpoint/2010/main" val="3690183967"/>
+      </p:ext>
+    </p:extLst>
+  </p:cSld>
+  <p:clrMapOvr>
+    <a:masterClrMapping/>
+  </p:clrMapOvr>
+</p:sld>
+</file>
+
+<file path=ppt/slides/slide23.xml><?xml version="1.0" encoding="utf-8"?>
+<p:sld xmlns:a="http://schemas.openxmlformats.org/drawingml/2006/main" xmlns:r="http://schemas.openxmlformats.org/officeDocument/2006/relationships" xmlns:p="http://schemas.openxmlformats.org/presentationml/2006/main">
+  <p:cSld>
+    <p:spTree>
+      <p:nvGrpSpPr>
+        <p:cNvPr id="1" name=""/>
+        <p:cNvGrpSpPr/>
+        <p:nvPr/>
+      </p:nvGrpSpPr>
+      <p:grpSpPr>
+        <a:xfrm>
+          <a:off x="0" y="0"/>
+          <a:ext cx="0" cy="0"/>
+          <a:chOff x="0" y="0"/>
+          <a:chExt cx="0" cy="0"/>
+        </a:xfrm>
+      </p:grpSpPr>
+      <p:sp>
+        <p:nvSpPr>
+          <p:cNvPr id="2" name="Title 1">
+            <a:extLst>
+              <a:ext uri="{FF2B5EF4-FFF2-40B4-BE49-F238E27FC236}">
                 <a16:creationId xmlns:a16="http://schemas.microsoft.com/office/drawing/2014/main" id="{C6E669E2-BE11-4459-8C18-5C4763A43502}"/>
               </a:ext>
             </a:extLst>
@@ -6337,7 +6534,7 @@
 </p:sld>
 </file>
 
-<file path=ppt/slides/slide23.xml><?xml version="1.0" encoding="utf-8"?>
+<file path=ppt/slides/slide24.xml><?xml version="1.0" encoding="utf-8"?>
 <p:sld xmlns:a="http://schemas.openxmlformats.org/drawingml/2006/main" xmlns:r="http://schemas.openxmlformats.org/officeDocument/2006/relationships" xmlns:p="http://schemas.openxmlformats.org/presentationml/2006/main">
   <p:cSld>
     <p:spTree>

</xml_diff>

<commit_message>
- Added my details to the Presentation
</commit_message>
<xml_diff>
--- a/presentation/8598 Domino and JS.pptx
+++ b/presentation/8598 Domino and JS.pptx
@@ -1,6 +1,6 @@
 
 <file path=ppt/presentation.xml><?xml version="1.0" encoding="utf-8"?>
-<p:presentation xmlns:a="http://schemas.openxmlformats.org/drawingml/2006/main" xmlns:r="http://schemas.openxmlformats.org/officeDocument/2006/relationships" xmlns:p="http://schemas.openxmlformats.org/presentationml/2006/main" autoCompressPictures="0">
+<p:presentation xmlns:a="http://schemas.openxmlformats.org/drawingml/2006/main" xmlns:r="http://schemas.openxmlformats.org/officeDocument/2006/relationships" xmlns:p="http://schemas.openxmlformats.org/presentationml/2006/main" saveSubsetFonts="1" autoCompressPictures="0">
   <p:sldMasterIdLst>
     <p:sldMasterId id="2147483870" r:id="rId1"/>
   </p:sldMasterIdLst>
@@ -13,7 +13,7 @@
   <p:sldIdLst>
     <p:sldId id="256" r:id="rId2"/>
     <p:sldId id="257" r:id="rId3"/>
-    <p:sldId id="258" r:id="rId4"/>
+    <p:sldId id="280" r:id="rId4"/>
     <p:sldId id="272" r:id="rId5"/>
     <p:sldId id="273" r:id="rId6"/>
     <p:sldId id="263" r:id="rId7"/>
@@ -182,7 +182,7 @@
           <p:cNvPr id="2" name="Header Placeholder 1">
             <a:extLst>
               <a:ext uri="{FF2B5EF4-FFF2-40B4-BE49-F238E27FC236}">
-                <a16:creationId xmlns:a16="http://schemas.microsoft.com/office/drawing/2014/main" id="{BB178A4F-544B-43AC-BD15-7B2CEA5C04AA}"/>
+                <a16:creationId xmlns:a16="http://schemas.microsoft.com/office/drawing/2014/main" xmlns="" id="{BB178A4F-544B-43AC-BD15-7B2CEA5C04AA}"/>
               </a:ext>
             </a:extLst>
           </p:cNvPr>
@@ -219,7 +219,7 @@
           <p:cNvPr id="3" name="Date Placeholder 2">
             <a:extLst>
               <a:ext uri="{FF2B5EF4-FFF2-40B4-BE49-F238E27FC236}">
-                <a16:creationId xmlns:a16="http://schemas.microsoft.com/office/drawing/2014/main" id="{624BA4BC-130D-4F1D-9EA5-9BBC4F794AEE}"/>
+                <a16:creationId xmlns:a16="http://schemas.microsoft.com/office/drawing/2014/main" xmlns="" id="{624BA4BC-130D-4F1D-9EA5-9BBC4F794AEE}"/>
               </a:ext>
             </a:extLst>
           </p:cNvPr>
@@ -249,7 +249,7 @@
           <a:p>
             <a:fld id="{790E51D3-653E-462A-88BF-90B852BBE668}" type="datetimeFigureOut">
               <a:rPr lang="en-GB" smtClean="0"/>
-              <a:t>14/02/2018</a:t>
+              <a:t>18/02/2018</a:t>
             </a:fld>
             <a:endParaRPr lang="en-GB"/>
           </a:p>
@@ -260,7 +260,7 @@
           <p:cNvPr id="4" name="Footer Placeholder 3">
             <a:extLst>
               <a:ext uri="{FF2B5EF4-FFF2-40B4-BE49-F238E27FC236}">
-                <a16:creationId xmlns:a16="http://schemas.microsoft.com/office/drawing/2014/main" id="{FD7B5433-BC26-406D-9018-BBA13894431D}"/>
+                <a16:creationId xmlns:a16="http://schemas.microsoft.com/office/drawing/2014/main" xmlns="" id="{FD7B5433-BC26-406D-9018-BBA13894431D}"/>
               </a:ext>
             </a:extLst>
           </p:cNvPr>
@@ -297,7 +297,7 @@
           <p:cNvPr id="5" name="Slide Number Placeholder 4">
             <a:extLst>
               <a:ext uri="{FF2B5EF4-FFF2-40B4-BE49-F238E27FC236}">
-                <a16:creationId xmlns:a16="http://schemas.microsoft.com/office/drawing/2014/main" id="{3D83B6B0-F723-4CC7-BE1F-88AD9F01DE11}"/>
+                <a16:creationId xmlns:a16="http://schemas.microsoft.com/office/drawing/2014/main" xmlns="" id="{3D83B6B0-F723-4CC7-BE1F-88AD9F01DE11}"/>
               </a:ext>
             </a:extLst>
           </p:cNvPr>
@@ -426,7 +426,7 @@
           <a:p>
             <a:fld id="{60164965-4043-4174-93BC-54F5E5CCBD1D}" type="datetimeFigureOut">
               <a:rPr lang="en-US" smtClean="0"/>
-              <a:t>2/14/2018</a:t>
+              <a:t>2/18/18</a:t>
             </a:fld>
             <a:endParaRPr lang="en-US"/>
           </a:p>
@@ -777,6 +777,90 @@
 </p:notes>
 </file>
 
+<file path=ppt/notesSlides/notesSlide2.xml><?xml version="1.0" encoding="utf-8"?>
+<p:notes xmlns:a="http://schemas.openxmlformats.org/drawingml/2006/main" xmlns:r="http://schemas.openxmlformats.org/officeDocument/2006/relationships" xmlns:p="http://schemas.openxmlformats.org/presentationml/2006/main">
+  <p:cSld>
+    <p:spTree>
+      <p:nvGrpSpPr>
+        <p:cNvPr id="1" name=""/>
+        <p:cNvGrpSpPr/>
+        <p:nvPr/>
+      </p:nvGrpSpPr>
+      <p:grpSpPr>
+        <a:xfrm>
+          <a:off x="0" y="0"/>
+          <a:ext cx="0" cy="0"/>
+          <a:chOff x="0" y="0"/>
+          <a:chExt cx="0" cy="0"/>
+        </a:xfrm>
+      </p:grpSpPr>
+      <p:sp>
+        <p:nvSpPr>
+          <p:cNvPr id="2" name="Slide Image Placeholder 1"/>
+          <p:cNvSpPr>
+            <a:spLocks noGrp="1" noRot="1" noChangeAspect="1"/>
+          </p:cNvSpPr>
+          <p:nvPr>
+            <p:ph type="sldImg"/>
+          </p:nvPr>
+        </p:nvSpPr>
+        <p:spPr/>
+      </p:sp>
+      <p:sp>
+        <p:nvSpPr>
+          <p:cNvPr id="3" name="Notes Placeholder 2"/>
+          <p:cNvSpPr>
+            <a:spLocks noGrp="1"/>
+          </p:cNvSpPr>
+          <p:nvPr>
+            <p:ph type="body" idx="1"/>
+          </p:nvPr>
+        </p:nvSpPr>
+        <p:spPr/>
+        <p:txBody>
+          <a:bodyPr/>
+          <a:lstStyle/>
+          <a:p>
+            <a:endParaRPr lang="en-US" dirty="0"/>
+          </a:p>
+        </p:txBody>
+      </p:sp>
+      <p:sp>
+        <p:nvSpPr>
+          <p:cNvPr id="4" name="Slide Number Placeholder 3"/>
+          <p:cNvSpPr>
+            <a:spLocks noGrp="1"/>
+          </p:cNvSpPr>
+          <p:nvPr>
+            <p:ph type="sldNum" sz="quarter" idx="10"/>
+          </p:nvPr>
+        </p:nvSpPr>
+        <p:spPr/>
+        <p:txBody>
+          <a:bodyPr/>
+          <a:lstStyle/>
+          <a:p>
+            <a:fld id="{7F3C5AE6-245A-4892-87E4-2DDCA6560455}" type="slidenum">
+              <a:rPr lang="en-US" smtClean="0"/>
+              <a:t>3</a:t>
+            </a:fld>
+            <a:endParaRPr lang="en-US"/>
+          </a:p>
+        </p:txBody>
+      </p:sp>
+    </p:spTree>
+    <p:extLst>
+      <p:ext uri="{BB962C8B-B14F-4D97-AF65-F5344CB8AC3E}">
+        <p14:creationId xmlns:p14="http://schemas.microsoft.com/office/powerpoint/2010/main" val="994056311"/>
+      </p:ext>
+    </p:extLst>
+  </p:cSld>
+  <p:clrMapOvr>
+    <a:masterClrMapping/>
+  </p:clrMapOvr>
+</p:notes>
+</file>
+
 <file path=ppt/slideLayouts/slideLayout1.xml><?xml version="1.0" encoding="utf-8"?>
 <p:sldLayout xmlns:a="http://schemas.openxmlformats.org/drawingml/2006/main" xmlns:r="http://schemas.openxmlformats.org/officeDocument/2006/relationships" xmlns:p="http://schemas.openxmlformats.org/presentationml/2006/main" type="title" preserve="1">
   <p:cSld name="Title Slide Main">
@@ -3312,7 +3396,7 @@
           <p:cNvPr id="10" name="Picture 9">
             <a:extLst>
               <a:ext uri="{FF2B5EF4-FFF2-40B4-BE49-F238E27FC236}">
-                <a16:creationId xmlns:a16="http://schemas.microsoft.com/office/drawing/2014/main" id="{F35D7D39-F3E0-46F3-9F14-221C7C0B4774}"/>
+                <a16:creationId xmlns:a16="http://schemas.microsoft.com/office/drawing/2014/main" xmlns="" id="{F35D7D39-F3E0-46F3-9F14-221C7C0B4774}"/>
               </a:ext>
             </a:extLst>
           </p:cNvPr>
@@ -3347,7 +3431,7 @@
           <p:cNvPr id="7" name="Picture 6">
             <a:extLst>
               <a:ext uri="{FF2B5EF4-FFF2-40B4-BE49-F238E27FC236}">
-                <a16:creationId xmlns:a16="http://schemas.microsoft.com/office/drawing/2014/main" id="{C66C50A9-C8A1-4CCC-A063-A7A687E70B85}"/>
+                <a16:creationId xmlns:a16="http://schemas.microsoft.com/office/drawing/2014/main" xmlns="" id="{C66C50A9-C8A1-4CCC-A063-A7A687E70B85}"/>
               </a:ext>
             </a:extLst>
           </p:cNvPr>
@@ -3383,7 +3467,7 @@
           <p:cNvPr id="8" name="Picture 7">
             <a:extLst>
               <a:ext uri="{FF2B5EF4-FFF2-40B4-BE49-F238E27FC236}">
-                <a16:creationId xmlns:a16="http://schemas.microsoft.com/office/drawing/2014/main" id="{5DDDF644-1535-4938-B3E9-4A0BA2870803}"/>
+                <a16:creationId xmlns:a16="http://schemas.microsoft.com/office/drawing/2014/main" xmlns="" id="{5DDDF644-1535-4938-B3E9-4A0BA2870803}"/>
               </a:ext>
             </a:extLst>
           </p:cNvPr>
@@ -3738,7 +3822,7 @@
           <p:cNvPr id="4" name="Title 3">
             <a:extLst>
               <a:ext uri="{FF2B5EF4-FFF2-40B4-BE49-F238E27FC236}">
-                <a16:creationId xmlns:a16="http://schemas.microsoft.com/office/drawing/2014/main" id="{BC59490B-2FA7-421D-8F31-CF5208FB072E}"/>
+                <a16:creationId xmlns:a16="http://schemas.microsoft.com/office/drawing/2014/main" xmlns="" id="{BC59490B-2FA7-421D-8F31-CF5208FB072E}"/>
               </a:ext>
             </a:extLst>
           </p:cNvPr>
@@ -3798,13 +3882,10 @@
               <a:t>John Jardin, </a:t>
             </a:r>
             <a:r>
-              <a:rPr lang="en-US" dirty="0" err="1"/>
-              <a:t>Ukuvuma</a:t>
-            </a:r>
-            <a:r>
-              <a:rPr lang="en-US" dirty="0"/>
-              <a:t> Solutions</a:t>
-            </a:r>
+              <a:rPr lang="en-US" dirty="0" smtClean="0"/>
+              <a:t>Agilit-e</a:t>
+            </a:r>
+            <a:endParaRPr lang="en-US" dirty="0"/>
           </a:p>
         </p:txBody>
       </p:sp>
@@ -3813,7 +3894,7 @@
           <p:cNvPr id="1028" name="Picture 4" descr="C:\Users\withersp\AppData\Local\SNAGHTML24b362b0.PNG">
             <a:extLst>
               <a:ext uri="{FF2B5EF4-FFF2-40B4-BE49-F238E27FC236}">
-                <a16:creationId xmlns:a16="http://schemas.microsoft.com/office/drawing/2014/main" id="{12E16609-9DD1-43D3-91F4-84B15254DA93}"/>
+                <a16:creationId xmlns:a16="http://schemas.microsoft.com/office/drawing/2014/main" xmlns="" id="{12E16609-9DD1-43D3-91F4-84B15254DA93}"/>
               </a:ext>
             </a:extLst>
           </p:cNvPr>
@@ -3865,6 +3946,13 @@
   <p:clrMapOvr>
     <a:masterClrMapping/>
   </p:clrMapOvr>
+  <p:timing>
+    <p:tnLst>
+      <p:par>
+        <p:cTn id="1" dur="indefinite" restart="never" nodeType="tmRoot"/>
+      </p:par>
+    </p:tnLst>
+  </p:timing>
 </p:sld>
 </file>
 
@@ -3890,7 +3978,7 @@
           <p:cNvPr id="2" name="Title 1">
             <a:extLst>
               <a:ext uri="{FF2B5EF4-FFF2-40B4-BE49-F238E27FC236}">
-                <a16:creationId xmlns:a16="http://schemas.microsoft.com/office/drawing/2014/main" id="{F2C9DEE5-D2B3-4CEE-A43B-3B37F019C675}"/>
+                <a16:creationId xmlns:a16="http://schemas.microsoft.com/office/drawing/2014/main" xmlns="" id="{F2C9DEE5-D2B3-4CEE-A43B-3B37F019C675}"/>
               </a:ext>
             </a:extLst>
           </p:cNvPr>
@@ -3918,7 +4006,7 @@
           <p:cNvPr id="3" name="Content Placeholder 2">
             <a:extLst>
               <a:ext uri="{FF2B5EF4-FFF2-40B4-BE49-F238E27FC236}">
-                <a16:creationId xmlns:a16="http://schemas.microsoft.com/office/drawing/2014/main" id="{62381E6A-3237-46F9-BEBB-AB78EC7DF951}"/>
+                <a16:creationId xmlns:a16="http://schemas.microsoft.com/office/drawing/2014/main" xmlns="" id="{62381E6A-3237-46F9-BEBB-AB78EC7DF951}"/>
               </a:ext>
             </a:extLst>
           </p:cNvPr>
@@ -4049,7 +4137,7 @@
           <p:cNvPr id="4" name="Title 3">
             <a:extLst>
               <a:ext uri="{FF2B5EF4-FFF2-40B4-BE49-F238E27FC236}">
-                <a16:creationId xmlns:a16="http://schemas.microsoft.com/office/drawing/2014/main" id="{642A4954-D8E0-4C0D-B4A7-23E696B306FD}"/>
+                <a16:creationId xmlns:a16="http://schemas.microsoft.com/office/drawing/2014/main" xmlns="" id="{642A4954-D8E0-4C0D-B4A7-23E696B306FD}"/>
               </a:ext>
             </a:extLst>
           </p:cNvPr>
@@ -4109,7 +4197,7 @@
           <p:cNvPr id="2" name="Title 1">
             <a:extLst>
               <a:ext uri="{FF2B5EF4-FFF2-40B4-BE49-F238E27FC236}">
-                <a16:creationId xmlns:a16="http://schemas.microsoft.com/office/drawing/2014/main" id="{1A530216-0158-4426-8CAF-8D17A505629F}"/>
+                <a16:creationId xmlns:a16="http://schemas.microsoft.com/office/drawing/2014/main" xmlns="" id="{1A530216-0158-4426-8CAF-8D17A505629F}"/>
               </a:ext>
             </a:extLst>
           </p:cNvPr>
@@ -4137,7 +4225,7 @@
           <p:cNvPr id="3" name="Content Placeholder 2">
             <a:extLst>
               <a:ext uri="{FF2B5EF4-FFF2-40B4-BE49-F238E27FC236}">
-                <a16:creationId xmlns:a16="http://schemas.microsoft.com/office/drawing/2014/main" id="{117770BD-8CC0-4139-A505-25D8CA68B2CB}"/>
+                <a16:creationId xmlns:a16="http://schemas.microsoft.com/office/drawing/2014/main" xmlns="" id="{117770BD-8CC0-4139-A505-25D8CA68B2CB}"/>
               </a:ext>
             </a:extLst>
           </p:cNvPr>
@@ -4285,7 +4373,7 @@
           <p:cNvPr id="2" name="Title 1">
             <a:extLst>
               <a:ext uri="{FF2B5EF4-FFF2-40B4-BE49-F238E27FC236}">
-                <a16:creationId xmlns:a16="http://schemas.microsoft.com/office/drawing/2014/main" id="{DA325B3B-EB04-4DFE-AF62-DA7694510789}"/>
+                <a16:creationId xmlns:a16="http://schemas.microsoft.com/office/drawing/2014/main" xmlns="" id="{DA325B3B-EB04-4DFE-AF62-DA7694510789}"/>
               </a:ext>
             </a:extLst>
           </p:cNvPr>
@@ -4313,7 +4401,7 @@
           <p:cNvPr id="3" name="Content Placeholder 2">
             <a:extLst>
               <a:ext uri="{FF2B5EF4-FFF2-40B4-BE49-F238E27FC236}">
-                <a16:creationId xmlns:a16="http://schemas.microsoft.com/office/drawing/2014/main" id="{7348DDCC-5EBE-4C1F-B496-7D6BA1B7A59F}"/>
+                <a16:creationId xmlns:a16="http://schemas.microsoft.com/office/drawing/2014/main" xmlns="" id="{7348DDCC-5EBE-4C1F-B496-7D6BA1B7A59F}"/>
               </a:ext>
             </a:extLst>
           </p:cNvPr>
@@ -4462,7 +4550,7 @@
           <p:cNvPr id="2" name="Title 1">
             <a:extLst>
               <a:ext uri="{FF2B5EF4-FFF2-40B4-BE49-F238E27FC236}">
-                <a16:creationId xmlns:a16="http://schemas.microsoft.com/office/drawing/2014/main" id="{DA325B3B-EB04-4DFE-AF62-DA7694510789}"/>
+                <a16:creationId xmlns:a16="http://schemas.microsoft.com/office/drawing/2014/main" xmlns="" id="{DA325B3B-EB04-4DFE-AF62-DA7694510789}"/>
               </a:ext>
             </a:extLst>
           </p:cNvPr>
@@ -4490,7 +4578,7 @@
           <p:cNvPr id="3" name="Content Placeholder 2">
             <a:extLst>
               <a:ext uri="{FF2B5EF4-FFF2-40B4-BE49-F238E27FC236}">
-                <a16:creationId xmlns:a16="http://schemas.microsoft.com/office/drawing/2014/main" id="{7348DDCC-5EBE-4C1F-B496-7D6BA1B7A59F}"/>
+                <a16:creationId xmlns:a16="http://schemas.microsoft.com/office/drawing/2014/main" xmlns="" id="{7348DDCC-5EBE-4C1F-B496-7D6BA1B7A59F}"/>
               </a:ext>
             </a:extLst>
           </p:cNvPr>
@@ -4625,7 +4713,7 @@
           <p:cNvPr id="2" name="Title 1">
             <a:extLst>
               <a:ext uri="{FF2B5EF4-FFF2-40B4-BE49-F238E27FC236}">
-                <a16:creationId xmlns:a16="http://schemas.microsoft.com/office/drawing/2014/main" id="{11F888B0-6184-4E49-BE67-5D21583FAA29}"/>
+                <a16:creationId xmlns:a16="http://schemas.microsoft.com/office/drawing/2014/main" xmlns="" id="{11F888B0-6184-4E49-BE67-5D21583FAA29}"/>
               </a:ext>
             </a:extLst>
           </p:cNvPr>
@@ -4653,7 +4741,7 @@
           <p:cNvPr id="3" name="Content Placeholder 2">
             <a:extLst>
               <a:ext uri="{FF2B5EF4-FFF2-40B4-BE49-F238E27FC236}">
-                <a16:creationId xmlns:a16="http://schemas.microsoft.com/office/drawing/2014/main" id="{5D0BF05F-CB19-4169-8628-60F81EFBE59E}"/>
+                <a16:creationId xmlns:a16="http://schemas.microsoft.com/office/drawing/2014/main" xmlns="" id="{5D0BF05F-CB19-4169-8628-60F81EFBE59E}"/>
               </a:ext>
             </a:extLst>
           </p:cNvPr>
@@ -4809,7 +4897,7 @@
           <p:cNvPr id="2" name="Title 1">
             <a:extLst>
               <a:ext uri="{FF2B5EF4-FFF2-40B4-BE49-F238E27FC236}">
-                <a16:creationId xmlns:a16="http://schemas.microsoft.com/office/drawing/2014/main" id="{05AAFF9C-9D60-456C-9619-912E3CFE5A22}"/>
+                <a16:creationId xmlns:a16="http://schemas.microsoft.com/office/drawing/2014/main" xmlns="" id="{05AAFF9C-9D60-456C-9619-912E3CFE5A22}"/>
               </a:ext>
             </a:extLst>
           </p:cNvPr>
@@ -4838,7 +4926,7 @@
           <p:cNvPr id="3" name="Content Placeholder 2">
             <a:extLst>
               <a:ext uri="{FF2B5EF4-FFF2-40B4-BE49-F238E27FC236}">
-                <a16:creationId xmlns:a16="http://schemas.microsoft.com/office/drawing/2014/main" id="{C94BB55B-6C89-4F4B-A953-BD358C4216B6}"/>
+                <a16:creationId xmlns:a16="http://schemas.microsoft.com/office/drawing/2014/main" xmlns="" id="{C94BB55B-6C89-4F4B-A953-BD358C4216B6}"/>
               </a:ext>
             </a:extLst>
           </p:cNvPr>
@@ -4957,7 +5045,7 @@
           <p:cNvPr id="2" name="Title 1">
             <a:extLst>
               <a:ext uri="{FF2B5EF4-FFF2-40B4-BE49-F238E27FC236}">
-                <a16:creationId xmlns:a16="http://schemas.microsoft.com/office/drawing/2014/main" id="{701EB0D4-BE51-4EB9-95BA-1387E3008DA7}"/>
+                <a16:creationId xmlns:a16="http://schemas.microsoft.com/office/drawing/2014/main" xmlns="" id="{701EB0D4-BE51-4EB9-95BA-1387E3008DA7}"/>
               </a:ext>
             </a:extLst>
           </p:cNvPr>
@@ -4985,7 +5073,7 @@
           <p:cNvPr id="3" name="Content Placeholder 2">
             <a:extLst>
               <a:ext uri="{FF2B5EF4-FFF2-40B4-BE49-F238E27FC236}">
-                <a16:creationId xmlns:a16="http://schemas.microsoft.com/office/drawing/2014/main" id="{090C2521-717E-412B-B21A-03628179FB11}"/>
+                <a16:creationId xmlns:a16="http://schemas.microsoft.com/office/drawing/2014/main" xmlns="" id="{090C2521-717E-412B-B21A-03628179FB11}"/>
               </a:ext>
             </a:extLst>
           </p:cNvPr>
@@ -5067,7 +5155,7 @@
           <p:cNvPr id="2" name="Title 1">
             <a:extLst>
               <a:ext uri="{FF2B5EF4-FFF2-40B4-BE49-F238E27FC236}">
-                <a16:creationId xmlns:a16="http://schemas.microsoft.com/office/drawing/2014/main" id="{BDDECFA5-674E-480C-9B09-ECB6EAFBCFD0}"/>
+                <a16:creationId xmlns:a16="http://schemas.microsoft.com/office/drawing/2014/main" xmlns="" id="{BDDECFA5-674E-480C-9B09-ECB6EAFBCFD0}"/>
               </a:ext>
             </a:extLst>
           </p:cNvPr>
@@ -5095,7 +5183,7 @@
           <p:cNvPr id="3" name="Content Placeholder 2">
             <a:extLst>
               <a:ext uri="{FF2B5EF4-FFF2-40B4-BE49-F238E27FC236}">
-                <a16:creationId xmlns:a16="http://schemas.microsoft.com/office/drawing/2014/main" id="{7E62BE25-35A8-46F0-8E50-33C5CC9893D2}"/>
+                <a16:creationId xmlns:a16="http://schemas.microsoft.com/office/drawing/2014/main" xmlns="" id="{7E62BE25-35A8-46F0-8E50-33C5CC9893D2}"/>
               </a:ext>
             </a:extLst>
           </p:cNvPr>
@@ -5193,7 +5281,7 @@
           <p:cNvPr id="2" name="Title 1">
             <a:extLst>
               <a:ext uri="{FF2B5EF4-FFF2-40B4-BE49-F238E27FC236}">
-                <a16:creationId xmlns:a16="http://schemas.microsoft.com/office/drawing/2014/main" id="{28D4950E-C911-48D5-B236-0A6C79E2A3E6}"/>
+                <a16:creationId xmlns:a16="http://schemas.microsoft.com/office/drawing/2014/main" xmlns="" id="{28D4950E-C911-48D5-B236-0A6C79E2A3E6}"/>
               </a:ext>
             </a:extLst>
           </p:cNvPr>
@@ -5221,7 +5309,7 @@
           <p:cNvPr id="3" name="Content Placeholder 2">
             <a:extLst>
               <a:ext uri="{FF2B5EF4-FFF2-40B4-BE49-F238E27FC236}">
-                <a16:creationId xmlns:a16="http://schemas.microsoft.com/office/drawing/2014/main" id="{D2C3A57F-87ED-48C2-9CAC-38FA5FE319DC}"/>
+                <a16:creationId xmlns:a16="http://schemas.microsoft.com/office/drawing/2014/main" xmlns="" id="{D2C3A57F-87ED-48C2-9CAC-38FA5FE319DC}"/>
               </a:ext>
             </a:extLst>
           </p:cNvPr>
@@ -5327,7 +5415,7 @@
           <p:cNvPr id="4" name="Title 3">
             <a:extLst>
               <a:ext uri="{FF2B5EF4-FFF2-40B4-BE49-F238E27FC236}">
-                <a16:creationId xmlns:a16="http://schemas.microsoft.com/office/drawing/2014/main" id="{242D3F1F-5602-49F4-A125-78B334E5873C}"/>
+                <a16:creationId xmlns:a16="http://schemas.microsoft.com/office/drawing/2014/main" xmlns="" id="{242D3F1F-5602-49F4-A125-78B334E5873C}"/>
               </a:ext>
             </a:extLst>
           </p:cNvPr>
@@ -5359,7 +5447,7 @@
           <p:cNvPr id="5" name="Content Placeholder 4">
             <a:extLst>
               <a:ext uri="{FF2B5EF4-FFF2-40B4-BE49-F238E27FC236}">
-                <a16:creationId xmlns:a16="http://schemas.microsoft.com/office/drawing/2014/main" id="{C13B6473-AA5C-4554-9024-49310ACBC255}"/>
+                <a16:creationId xmlns:a16="http://schemas.microsoft.com/office/drawing/2014/main" xmlns="" id="{C13B6473-AA5C-4554-9024-49310ACBC255}"/>
               </a:ext>
             </a:extLst>
           </p:cNvPr>
@@ -5419,7 +5507,7 @@
           <p:cNvPr id="9" name="Arrow: Right 8">
             <a:extLst>
               <a:ext uri="{FF2B5EF4-FFF2-40B4-BE49-F238E27FC236}">
-                <a16:creationId xmlns:a16="http://schemas.microsoft.com/office/drawing/2014/main" id="{9D07E98F-A5EC-4BA5-B706-FA5F0ED79C9A}"/>
+                <a16:creationId xmlns:a16="http://schemas.microsoft.com/office/drawing/2014/main" xmlns="" id="{9D07E98F-A5EC-4BA5-B706-FA5F0ED79C9A}"/>
               </a:ext>
             </a:extLst>
           </p:cNvPr>
@@ -5489,7 +5577,7 @@
           <p:cNvPr id="10" name="Group 9">
             <a:extLst>
               <a:ext uri="{FF2B5EF4-FFF2-40B4-BE49-F238E27FC236}">
-                <a16:creationId xmlns:a16="http://schemas.microsoft.com/office/drawing/2014/main" id="{AF0A7D2A-1ED2-4864-A5F4-0D140FB92B9B}"/>
+                <a16:creationId xmlns:a16="http://schemas.microsoft.com/office/drawing/2014/main" xmlns="" id="{AF0A7D2A-1ED2-4864-A5F4-0D140FB92B9B}"/>
               </a:ext>
             </a:extLst>
           </p:cNvPr>
@@ -5515,7 +5603,7 @@
             <p:cNvPr id="20" name="Rectangle: Rounded Corners 19">
               <a:extLst>
                 <a:ext uri="{FF2B5EF4-FFF2-40B4-BE49-F238E27FC236}">
-                  <a16:creationId xmlns:a16="http://schemas.microsoft.com/office/drawing/2014/main" id="{42194522-2AE0-45FA-94D1-5C3A1A519BCC}"/>
+                  <a16:creationId xmlns:a16="http://schemas.microsoft.com/office/drawing/2014/main" xmlns="" id="{42194522-2AE0-45FA-94D1-5C3A1A519BCC}"/>
                 </a:ext>
               </a:extLst>
             </p:cNvPr>
@@ -5569,7 +5657,7 @@
             <p:cNvPr id="21" name="Rectangle: Rounded Corners 5">
               <a:extLst>
                 <a:ext uri="{FF2B5EF4-FFF2-40B4-BE49-F238E27FC236}">
-                  <a16:creationId xmlns:a16="http://schemas.microsoft.com/office/drawing/2014/main" id="{861A16B5-D4B4-4670-A45F-34D508101688}"/>
+                  <a16:creationId xmlns:a16="http://schemas.microsoft.com/office/drawing/2014/main" xmlns="" id="{861A16B5-D4B4-4670-A45F-34D508101688}"/>
                 </a:ext>
               </a:extLst>
             </p:cNvPr>
@@ -5631,7 +5719,7 @@
           <p:cNvPr id="11" name="Group 10">
             <a:extLst>
               <a:ext uri="{FF2B5EF4-FFF2-40B4-BE49-F238E27FC236}">
-                <a16:creationId xmlns:a16="http://schemas.microsoft.com/office/drawing/2014/main" id="{CBB29DE9-20E8-453E-8816-D198CD4251AF}"/>
+                <a16:creationId xmlns:a16="http://schemas.microsoft.com/office/drawing/2014/main" xmlns="" id="{CBB29DE9-20E8-453E-8816-D198CD4251AF}"/>
               </a:ext>
             </a:extLst>
           </p:cNvPr>
@@ -5657,7 +5745,7 @@
             <p:cNvPr id="18" name="Rectangle: Rounded Corners 17">
               <a:extLst>
                 <a:ext uri="{FF2B5EF4-FFF2-40B4-BE49-F238E27FC236}">
-                  <a16:creationId xmlns:a16="http://schemas.microsoft.com/office/drawing/2014/main" id="{C417FA2E-811C-440B-B6DE-DDE93137815A}"/>
+                  <a16:creationId xmlns:a16="http://schemas.microsoft.com/office/drawing/2014/main" xmlns="" id="{C417FA2E-811C-440B-B6DE-DDE93137815A}"/>
                 </a:ext>
               </a:extLst>
             </p:cNvPr>
@@ -5711,7 +5799,7 @@
             <p:cNvPr id="19" name="Rectangle: Rounded Corners 7">
               <a:extLst>
                 <a:ext uri="{FF2B5EF4-FFF2-40B4-BE49-F238E27FC236}">
-                  <a16:creationId xmlns:a16="http://schemas.microsoft.com/office/drawing/2014/main" id="{110F1258-6F73-42E9-B344-03EE53497FAB}"/>
+                  <a16:creationId xmlns:a16="http://schemas.microsoft.com/office/drawing/2014/main" xmlns="" id="{110F1258-6F73-42E9-B344-03EE53497FAB}"/>
                 </a:ext>
               </a:extLst>
             </p:cNvPr>
@@ -5777,7 +5865,7 @@
           <p:cNvPr id="12" name="Group 11">
             <a:extLst>
               <a:ext uri="{FF2B5EF4-FFF2-40B4-BE49-F238E27FC236}">
-                <a16:creationId xmlns:a16="http://schemas.microsoft.com/office/drawing/2014/main" id="{836C9D76-D131-4697-87D2-EAE3576FADB0}"/>
+                <a16:creationId xmlns:a16="http://schemas.microsoft.com/office/drawing/2014/main" xmlns="" id="{836C9D76-D131-4697-87D2-EAE3576FADB0}"/>
               </a:ext>
             </a:extLst>
           </p:cNvPr>
@@ -5803,7 +5891,7 @@
             <p:cNvPr id="16" name="Rectangle: Rounded Corners 15">
               <a:extLst>
                 <a:ext uri="{FF2B5EF4-FFF2-40B4-BE49-F238E27FC236}">
-                  <a16:creationId xmlns:a16="http://schemas.microsoft.com/office/drawing/2014/main" id="{07C25609-83FE-48AD-A91A-9D291B9844E8}"/>
+                  <a16:creationId xmlns:a16="http://schemas.microsoft.com/office/drawing/2014/main" xmlns="" id="{07C25609-83FE-48AD-A91A-9D291B9844E8}"/>
                 </a:ext>
               </a:extLst>
             </p:cNvPr>
@@ -5857,7 +5945,7 @@
             <p:cNvPr id="17" name="Rectangle: Rounded Corners 9">
               <a:extLst>
                 <a:ext uri="{FF2B5EF4-FFF2-40B4-BE49-F238E27FC236}">
-                  <a16:creationId xmlns:a16="http://schemas.microsoft.com/office/drawing/2014/main" id="{1C28D283-4C25-428A-B342-E8B990D73AFB}"/>
+                  <a16:creationId xmlns:a16="http://schemas.microsoft.com/office/drawing/2014/main" xmlns="" id="{1C28D283-4C25-428A-B342-E8B990D73AFB}"/>
                 </a:ext>
               </a:extLst>
             </p:cNvPr>
@@ -5919,7 +6007,7 @@
           <p:cNvPr id="13" name="Group 12">
             <a:extLst>
               <a:ext uri="{FF2B5EF4-FFF2-40B4-BE49-F238E27FC236}">
-                <a16:creationId xmlns:a16="http://schemas.microsoft.com/office/drawing/2014/main" id="{950B76FC-5A2D-4D73-9FA6-A4F0765716C1}"/>
+                <a16:creationId xmlns:a16="http://schemas.microsoft.com/office/drawing/2014/main" xmlns="" id="{950B76FC-5A2D-4D73-9FA6-A4F0765716C1}"/>
               </a:ext>
             </a:extLst>
           </p:cNvPr>
@@ -5945,7 +6033,7 @@
             <p:cNvPr id="14" name="Rectangle: Rounded Corners 13">
               <a:extLst>
                 <a:ext uri="{FF2B5EF4-FFF2-40B4-BE49-F238E27FC236}">
-                  <a16:creationId xmlns:a16="http://schemas.microsoft.com/office/drawing/2014/main" id="{F40D22CD-D3F7-4AA7-A9E4-AB0C7FA72C8C}"/>
+                  <a16:creationId xmlns:a16="http://schemas.microsoft.com/office/drawing/2014/main" xmlns="" id="{F40D22CD-D3F7-4AA7-A9E4-AB0C7FA72C8C}"/>
                 </a:ext>
               </a:extLst>
             </p:cNvPr>
@@ -5999,7 +6087,7 @@
             <p:cNvPr id="15" name="Rectangle: Rounded Corners 11">
               <a:extLst>
                 <a:ext uri="{FF2B5EF4-FFF2-40B4-BE49-F238E27FC236}">
-                  <a16:creationId xmlns:a16="http://schemas.microsoft.com/office/drawing/2014/main" id="{A2368F2E-FBBE-4C6A-BD1D-1811DB8E0402}"/>
+                  <a16:creationId xmlns:a16="http://schemas.microsoft.com/office/drawing/2014/main" xmlns="" id="{A2368F2E-FBBE-4C6A-BD1D-1811DB8E0402}"/>
                 </a:ext>
               </a:extLst>
             </p:cNvPr>
@@ -6061,7 +6149,7 @@
           <p:cNvPr id="3" name="Picture 2">
             <a:extLst>
               <a:ext uri="{FF2B5EF4-FFF2-40B4-BE49-F238E27FC236}">
-                <a16:creationId xmlns:a16="http://schemas.microsoft.com/office/drawing/2014/main" id="{94760CA3-AC51-4954-84AD-413C7C605AAB}"/>
+                <a16:creationId xmlns:a16="http://schemas.microsoft.com/office/drawing/2014/main" xmlns="" id="{94760CA3-AC51-4954-84AD-413C7C605AAB}"/>
               </a:ext>
             </a:extLst>
           </p:cNvPr>
@@ -6096,6 +6184,13 @@
   <p:clrMapOvr>
     <a:masterClrMapping/>
   </p:clrMapOvr>
+  <p:timing>
+    <p:tnLst>
+      <p:par>
+        <p:cTn id="1" dur="indefinite" restart="never" nodeType="tmRoot"/>
+      </p:par>
+    </p:tnLst>
+  </p:timing>
 </p:sld>
 </file>
 
@@ -6121,7 +6216,7 @@
           <p:cNvPr id="4" name="Title 3">
             <a:extLst>
               <a:ext uri="{FF2B5EF4-FFF2-40B4-BE49-F238E27FC236}">
-                <a16:creationId xmlns:a16="http://schemas.microsoft.com/office/drawing/2014/main" id="{380905A8-B705-4037-8A33-724430522F63}"/>
+                <a16:creationId xmlns:a16="http://schemas.microsoft.com/office/drawing/2014/main" xmlns="" id="{380905A8-B705-4037-8A33-724430522F63}"/>
               </a:ext>
             </a:extLst>
           </p:cNvPr>
@@ -6154,6 +6249,13 @@
   <p:clrMapOvr>
     <a:masterClrMapping/>
   </p:clrMapOvr>
+  <p:timing>
+    <p:tnLst>
+      <p:par>
+        <p:cTn id="1" dur="indefinite" restart="never" nodeType="tmRoot"/>
+      </p:par>
+    </p:tnLst>
+  </p:timing>
 </p:sld>
 </file>
 
@@ -6179,7 +6281,7 @@
           <p:cNvPr id="4" name="Title 3">
             <a:extLst>
               <a:ext uri="{FF2B5EF4-FFF2-40B4-BE49-F238E27FC236}">
-                <a16:creationId xmlns:a16="http://schemas.microsoft.com/office/drawing/2014/main" id="{5F661A78-1620-4819-8674-16466DDEA36A}"/>
+                <a16:creationId xmlns:a16="http://schemas.microsoft.com/office/drawing/2014/main" xmlns="" id="{5F661A78-1620-4819-8674-16466DDEA36A}"/>
               </a:ext>
             </a:extLst>
           </p:cNvPr>
@@ -6207,7 +6309,7 @@
           <p:cNvPr id="5" name="Content Placeholder 4">
             <a:extLst>
               <a:ext uri="{FF2B5EF4-FFF2-40B4-BE49-F238E27FC236}">
-                <a16:creationId xmlns:a16="http://schemas.microsoft.com/office/drawing/2014/main" id="{D8951B21-ADD7-4D86-B572-B18845D6A0F7}"/>
+                <a16:creationId xmlns:a16="http://schemas.microsoft.com/office/drawing/2014/main" xmlns="" id="{D8951B21-ADD7-4D86-B572-B18845D6A0F7}"/>
               </a:ext>
             </a:extLst>
           </p:cNvPr>
@@ -6293,7 +6395,7 @@
           <p:cNvPr id="2" name="Title 1">
             <a:extLst>
               <a:ext uri="{FF2B5EF4-FFF2-40B4-BE49-F238E27FC236}">
-                <a16:creationId xmlns:a16="http://schemas.microsoft.com/office/drawing/2014/main" id="{004A5E56-F513-4A94-A58F-4235E160341C}"/>
+                <a16:creationId xmlns:a16="http://schemas.microsoft.com/office/drawing/2014/main" xmlns="" id="{004A5E56-F513-4A94-A58F-4235E160341C}"/>
               </a:ext>
             </a:extLst>
           </p:cNvPr>
@@ -6321,7 +6423,7 @@
           <p:cNvPr id="3" name="Content Placeholder 2">
             <a:extLst>
               <a:ext uri="{FF2B5EF4-FFF2-40B4-BE49-F238E27FC236}">
-                <a16:creationId xmlns:a16="http://schemas.microsoft.com/office/drawing/2014/main" id="{3FAAA951-B22E-4803-A2C0-9CF1E7E33F9E}"/>
+                <a16:creationId xmlns:a16="http://schemas.microsoft.com/office/drawing/2014/main" xmlns="" id="{3FAAA951-B22E-4803-A2C0-9CF1E7E33F9E}"/>
               </a:ext>
             </a:extLst>
           </p:cNvPr>
@@ -6440,7 +6542,7 @@
           <p:cNvPr id="2" name="Title 1">
             <a:extLst>
               <a:ext uri="{FF2B5EF4-FFF2-40B4-BE49-F238E27FC236}">
-                <a16:creationId xmlns:a16="http://schemas.microsoft.com/office/drawing/2014/main" id="{C6E669E2-BE11-4459-8C18-5C4763A43502}"/>
+                <a16:creationId xmlns:a16="http://schemas.microsoft.com/office/drawing/2014/main" xmlns="" id="{C6E669E2-BE11-4459-8C18-5C4763A43502}"/>
               </a:ext>
             </a:extLst>
           </p:cNvPr>
@@ -6468,7 +6570,7 @@
           <p:cNvPr id="3" name="Content Placeholder 2">
             <a:extLst>
               <a:ext uri="{FF2B5EF4-FFF2-40B4-BE49-F238E27FC236}">
-                <a16:creationId xmlns:a16="http://schemas.microsoft.com/office/drawing/2014/main" id="{04E0A162-6297-49FF-BA4C-61E31142ED8B}"/>
+                <a16:creationId xmlns:a16="http://schemas.microsoft.com/office/drawing/2014/main" xmlns="" id="{04E0A162-6297-49FF-BA4C-61E31142ED8B}"/>
               </a:ext>
             </a:extLst>
           </p:cNvPr>
@@ -6556,7 +6658,7 @@
           <p:cNvPr id="2" name="Title 1">
             <a:extLst>
               <a:ext uri="{FF2B5EF4-FFF2-40B4-BE49-F238E27FC236}">
-                <a16:creationId xmlns:a16="http://schemas.microsoft.com/office/drawing/2014/main" id="{BAD95756-30F2-4F38-B406-1C6C78CB70D0}"/>
+                <a16:creationId xmlns:a16="http://schemas.microsoft.com/office/drawing/2014/main" xmlns="" id="{BAD95756-30F2-4F38-B406-1C6C78CB70D0}"/>
               </a:ext>
             </a:extLst>
           </p:cNvPr>
@@ -6584,7 +6686,7 @@
           <p:cNvPr id="3" name="Content Placeholder 2">
             <a:extLst>
               <a:ext uri="{FF2B5EF4-FFF2-40B4-BE49-F238E27FC236}">
-                <a16:creationId xmlns:a16="http://schemas.microsoft.com/office/drawing/2014/main" id="{FC80F034-E016-44D5-B815-A5E0F3FD05FE}"/>
+                <a16:creationId xmlns:a16="http://schemas.microsoft.com/office/drawing/2014/main" xmlns="" id="{FC80F034-E016-44D5-B815-A5E0F3FD05FE}"/>
               </a:ext>
             </a:extLst>
           </p:cNvPr>
@@ -6639,7 +6741,7 @@
           <p:cNvPr id="4" name="Picture 3">
             <a:extLst>
               <a:ext uri="{FF2B5EF4-FFF2-40B4-BE49-F238E27FC236}">
-                <a16:creationId xmlns:a16="http://schemas.microsoft.com/office/drawing/2014/main" id="{98A35C8F-A351-43A9-9D73-DA5810CA9FAE}"/>
+                <a16:creationId xmlns:a16="http://schemas.microsoft.com/office/drawing/2014/main" xmlns="" id="{98A35C8F-A351-43A9-9D73-DA5810CA9FAE}"/>
               </a:ext>
             </a:extLst>
           </p:cNvPr>
@@ -6674,6 +6776,13 @@
   <p:clrMapOvr>
     <a:masterClrMapping/>
   </p:clrMapOvr>
+  <p:timing>
+    <p:tnLst>
+      <p:par>
+        <p:cTn id="1" dur="indefinite" restart="never" nodeType="tmRoot"/>
+      </p:par>
+    </p:tnLst>
+  </p:timing>
 </p:sld>
 </file>
 
@@ -6696,10 +6805,10 @@
       </p:grpSpPr>
       <p:sp>
         <p:nvSpPr>
-          <p:cNvPr id="2" name="Title 1">
+          <p:cNvPr id="4" name="Title 3">
             <a:extLst>
               <a:ext uri="{FF2B5EF4-FFF2-40B4-BE49-F238E27FC236}">
-                <a16:creationId xmlns:a16="http://schemas.microsoft.com/office/drawing/2014/main" id="{70405047-9B08-4BD1-A171-5599D78F9FA1}"/>
+                <a16:creationId xmlns:a16="http://schemas.microsoft.com/office/drawing/2014/main" xmlns="" id="{242D3F1F-5602-49F4-A125-78B334E5873C}"/>
               </a:ext>
             </a:extLst>
           </p:cNvPr>
@@ -6716,12 +6825,8 @@
           <a:lstStyle/>
           <a:p>
             <a:r>
-              <a:rPr lang="en-GB" dirty="0"/>
-              <a:t>John </a:t>
-            </a:r>
-            <a:r>
-              <a:rPr lang="en-GB" dirty="0" err="1"/>
-              <a:t>jardin</a:t>
+              <a:rPr lang="en-GB" dirty="0" smtClean="0"/>
+              <a:t>John Jardin</a:t>
             </a:r>
             <a:endParaRPr lang="en-GB" dirty="0"/>
           </a:p>
@@ -6729,10 +6834,10 @@
       </p:sp>
       <p:sp>
         <p:nvSpPr>
-          <p:cNvPr id="3" name="Content Placeholder 2">
+          <p:cNvPr id="5" name="Content Placeholder 4">
             <a:extLst>
               <a:ext uri="{FF2B5EF4-FFF2-40B4-BE49-F238E27FC236}">
-                <a16:creationId xmlns:a16="http://schemas.microsoft.com/office/drawing/2014/main" id="{E16DE62A-637D-41F1-BBA8-521FB5BFB458}"/>
+                <a16:creationId xmlns:a16="http://schemas.microsoft.com/office/drawing/2014/main" xmlns="" id="{C13B6473-AA5C-4554-9024-49310ACBC255}"/>
               </a:ext>
             </a:extLst>
           </p:cNvPr>
@@ -6743,25 +6848,757 @@
             <p:ph idx="1"/>
           </p:nvPr>
         </p:nvSpPr>
-        <p:spPr/>
+        <p:spPr>
+          <a:xfrm>
+            <a:off x="266699" y="1933349"/>
+            <a:ext cx="8025247" cy="4421991"/>
+          </a:xfrm>
+        </p:spPr>
         <p:txBody>
           <a:bodyPr/>
           <a:lstStyle/>
           <a:p>
-            <a:endParaRPr lang="en-GB"/>
-          </a:p>
-        </p:txBody>
-      </p:sp>
+            <a:r>
+              <a:rPr lang="en-GB" dirty="0" smtClean="0"/>
+              <a:t>CTO, Ukuvuma Solutions and Agilit-e</a:t>
+            </a:r>
+            <a:endParaRPr lang="en-GB" dirty="0"/>
+          </a:p>
+          <a:p>
+            <a:r>
+              <a:rPr lang="en-GB" dirty="0" smtClean="0"/>
+              <a:t>IBM Champion (Cloud and ICS)</a:t>
+            </a:r>
+            <a:endParaRPr lang="en-GB" dirty="0"/>
+          </a:p>
+          <a:p>
+            <a:r>
+              <a:rPr lang="en-GB" dirty="0" smtClean="0"/>
+              <a:t>@</a:t>
+            </a:r>
+            <a:r>
+              <a:rPr lang="en-GB" dirty="0" smtClean="0"/>
+              <a:t>JohnJardinCodes</a:t>
+            </a:r>
+          </a:p>
+        </p:txBody>
+      </p:sp>
+      <p:sp>
+        <p:nvSpPr>
+          <p:cNvPr id="9" name="Arrow: Right 8">
+            <a:extLst>
+              <a:ext uri="{FF2B5EF4-FFF2-40B4-BE49-F238E27FC236}">
+                <a16:creationId xmlns:a16="http://schemas.microsoft.com/office/drawing/2014/main" xmlns="" id="{9D07E98F-A5EC-4BA5-B706-FA5F0ED79C9A}"/>
+              </a:ext>
+            </a:extLst>
+          </p:cNvPr>
+          <p:cNvSpPr/>
+          <p:nvPr/>
+        </p:nvSpPr>
+        <p:spPr>
+          <a:xfrm>
+            <a:off x="1114623" y="3784600"/>
+            <a:ext cx="6863954" cy="2088231"/>
+          </a:xfrm>
+          <a:prstGeom prst="rightArrow">
+            <a:avLst/>
+          </a:prstGeom>
+          <a:scene3d>
+            <a:camera prst="orthographicFront"/>
+            <a:lightRig rig="threePt" dir="t">
+              <a:rot lat="0" lon="0" rev="7500000"/>
+            </a:lightRig>
+          </a:scene3d>
+          <a:sp3d z="-152400" extrusionH="63500" prstMaterial="matte">
+            <a:bevelT w="144450" h="6350" prst="relaxedInset"/>
+            <a:contourClr>
+              <a:schemeClr val="bg1"/>
+            </a:contourClr>
+          </a:sp3d>
+        </p:spPr>
+        <p:style>
+          <a:lnRef idx="0">
+            <a:schemeClr val="accent1">
+              <a:hueOff val="0"/>
+              <a:satOff val="0"/>
+              <a:lumOff val="0"/>
+              <a:alphaOff val="0"/>
+            </a:schemeClr>
+          </a:lnRef>
+          <a:fillRef idx="3">
+            <a:schemeClr val="accent1">
+              <a:tint val="40000"/>
+              <a:hueOff val="0"/>
+              <a:satOff val="0"/>
+              <a:lumOff val="0"/>
+              <a:alphaOff val="0"/>
+            </a:schemeClr>
+          </a:fillRef>
+          <a:effectRef idx="0">
+            <a:schemeClr val="accent1">
+              <a:tint val="40000"/>
+              <a:hueOff val="0"/>
+              <a:satOff val="0"/>
+              <a:lumOff val="0"/>
+              <a:alphaOff val="0"/>
+            </a:schemeClr>
+          </a:effectRef>
+          <a:fontRef idx="minor">
+            <a:schemeClr val="dk1">
+              <a:hueOff val="0"/>
+              <a:satOff val="0"/>
+              <a:lumOff val="0"/>
+              <a:alphaOff val="0"/>
+            </a:schemeClr>
+          </a:fontRef>
+        </p:style>
+      </p:sp>
+      <p:grpSp>
+        <p:nvGrpSpPr>
+          <p:cNvPr id="10" name="Group 9">
+            <a:extLst>
+              <a:ext uri="{FF2B5EF4-FFF2-40B4-BE49-F238E27FC236}">
+                <a16:creationId xmlns:a16="http://schemas.microsoft.com/office/drawing/2014/main" xmlns="" id="{AF0A7D2A-1ED2-4864-A5F4-0D140FB92B9B}"/>
+              </a:ext>
+            </a:extLst>
+          </p:cNvPr>
+          <p:cNvGrpSpPr/>
+          <p:nvPr/>
+        </p:nvGrpSpPr>
+        <p:grpSpPr>
+          <a:xfrm>
+            <a:off x="511198" y="4411069"/>
+            <a:ext cx="1925287" cy="835292"/>
+            <a:chOff x="2217" y="626469"/>
+            <a:chExt cx="1925287" cy="835292"/>
+          </a:xfrm>
+          <a:scene3d>
+            <a:camera prst="orthographicFront"/>
+            <a:lightRig rig="threePt" dir="t">
+              <a:rot lat="0" lon="0" rev="7500000"/>
+            </a:lightRig>
+          </a:scene3d>
+        </p:grpSpPr>
+        <p:sp>
+          <p:nvSpPr>
+            <p:cNvPr id="20" name="Rectangle: Rounded Corners 19">
+              <a:extLst>
+                <a:ext uri="{FF2B5EF4-FFF2-40B4-BE49-F238E27FC236}">
+                  <a16:creationId xmlns:a16="http://schemas.microsoft.com/office/drawing/2014/main" xmlns="" id="{42194522-2AE0-45FA-94D1-5C3A1A519BCC}"/>
+                </a:ext>
+              </a:extLst>
+            </p:cNvPr>
+            <p:cNvSpPr/>
+            <p:nvPr/>
+          </p:nvSpPr>
+          <p:spPr>
+            <a:xfrm>
+              <a:off x="2217" y="626469"/>
+              <a:ext cx="1925287" cy="835292"/>
+            </a:xfrm>
+            <a:prstGeom prst="roundRect">
+              <a:avLst/>
+            </a:prstGeom>
+            <a:sp3d prstMaterial="plastic">
+              <a:bevelT w="127000" h="25400" prst="relaxedInset"/>
+            </a:sp3d>
+          </p:spPr>
+          <p:style>
+            <a:lnRef idx="0">
+              <a:schemeClr val="lt1">
+                <a:hueOff val="0"/>
+                <a:satOff val="0"/>
+                <a:lumOff val="0"/>
+                <a:alphaOff val="0"/>
+              </a:schemeClr>
+            </a:lnRef>
+            <a:fillRef idx="3">
+              <a:schemeClr val="accent1">
+                <a:hueOff val="0"/>
+                <a:satOff val="0"/>
+                <a:lumOff val="0"/>
+                <a:alphaOff val="0"/>
+              </a:schemeClr>
+            </a:fillRef>
+            <a:effectRef idx="2">
+              <a:schemeClr val="accent1">
+                <a:hueOff val="0"/>
+                <a:satOff val="0"/>
+                <a:lumOff val="0"/>
+                <a:alphaOff val="0"/>
+              </a:schemeClr>
+            </a:effectRef>
+            <a:fontRef idx="minor">
+              <a:schemeClr val="lt1"/>
+            </a:fontRef>
+          </p:style>
+        </p:sp>
+        <p:sp>
+          <p:nvSpPr>
+            <p:cNvPr id="21" name="Rectangle: Rounded Corners 5">
+              <a:extLst>
+                <a:ext uri="{FF2B5EF4-FFF2-40B4-BE49-F238E27FC236}">
+                  <a16:creationId xmlns:a16="http://schemas.microsoft.com/office/drawing/2014/main" xmlns="" id="{861A16B5-D4B4-4670-A45F-34D508101688}"/>
+                </a:ext>
+              </a:extLst>
+            </p:cNvPr>
+            <p:cNvSpPr txBox="1"/>
+            <p:nvPr/>
+          </p:nvSpPr>
+          <p:spPr>
+            <a:xfrm>
+              <a:off x="42993" y="667245"/>
+              <a:ext cx="1843735" cy="753740"/>
+            </a:xfrm>
+            <a:prstGeom prst="rect">
+              <a:avLst/>
+            </a:prstGeom>
+            <a:sp3d/>
+          </p:spPr>
+          <p:style>
+            <a:lnRef idx="0">
+              <a:scrgbClr r="0" g="0" b="0"/>
+            </a:lnRef>
+            <a:fillRef idx="0">
+              <a:scrgbClr r="0" g="0" b="0"/>
+            </a:fillRef>
+            <a:effectRef idx="0">
+              <a:scrgbClr r="0" g="0" b="0"/>
+            </a:effectRef>
+            <a:fontRef idx="minor">
+              <a:schemeClr val="lt1"/>
+            </a:fontRef>
+          </p:style>
+          <p:txBody>
+            <a:bodyPr spcFirstLastPara="0" vert="horz" wrap="square" lIns="64770" tIns="64770" rIns="64770" bIns="64770" numCol="1" spcCol="1270" anchor="ctr" anchorCtr="0">
+              <a:noAutofit/>
+            </a:bodyPr>
+            <a:lstStyle/>
+            <a:p>
+              <a:pPr marL="0" lvl="0" indent="0" algn="ctr" defTabSz="755650">
+                <a:lnSpc>
+                  <a:spcPct val="90000"/>
+                </a:lnSpc>
+                <a:spcBef>
+                  <a:spcPct val="0"/>
+                </a:spcBef>
+                <a:spcAft>
+                  <a:spcPct val="35000"/>
+                </a:spcAft>
+                <a:buNone/>
+              </a:pPr>
+              <a:r>
+                <a:rPr lang="en-US" sz="1700" kern="1200" dirty="0" smtClean="0"/>
+                <a:t>Integration &amp; Cloud Architect</a:t>
+              </a:r>
+              <a:endParaRPr lang="en-US" sz="1700" kern="1200" dirty="0"/>
+            </a:p>
+          </p:txBody>
+        </p:sp>
+      </p:grpSp>
+      <p:grpSp>
+        <p:nvGrpSpPr>
+          <p:cNvPr id="11" name="Group 10">
+            <a:extLst>
+              <a:ext uri="{FF2B5EF4-FFF2-40B4-BE49-F238E27FC236}">
+                <a16:creationId xmlns:a16="http://schemas.microsoft.com/office/drawing/2014/main" xmlns="" id="{CBB29DE9-20E8-453E-8816-D198CD4251AF}"/>
+              </a:ext>
+            </a:extLst>
+          </p:cNvPr>
+          <p:cNvGrpSpPr/>
+          <p:nvPr/>
+        </p:nvGrpSpPr>
+        <p:grpSpPr>
+          <a:xfrm>
+            <a:off x="2559704" y="4411069"/>
+            <a:ext cx="1925287" cy="835292"/>
+            <a:chOff x="2050723" y="626469"/>
+            <a:chExt cx="1925287" cy="835292"/>
+          </a:xfrm>
+          <a:scene3d>
+            <a:camera prst="orthographicFront"/>
+            <a:lightRig rig="threePt" dir="t">
+              <a:rot lat="0" lon="0" rev="7500000"/>
+            </a:lightRig>
+          </a:scene3d>
+        </p:grpSpPr>
+        <p:sp>
+          <p:nvSpPr>
+            <p:cNvPr id="18" name="Rectangle: Rounded Corners 17">
+              <a:extLst>
+                <a:ext uri="{FF2B5EF4-FFF2-40B4-BE49-F238E27FC236}">
+                  <a16:creationId xmlns:a16="http://schemas.microsoft.com/office/drawing/2014/main" xmlns="" id="{C417FA2E-811C-440B-B6DE-DDE93137815A}"/>
+                </a:ext>
+              </a:extLst>
+            </p:cNvPr>
+            <p:cNvSpPr/>
+            <p:nvPr/>
+          </p:nvSpPr>
+          <p:spPr>
+            <a:xfrm>
+              <a:off x="2050723" y="626469"/>
+              <a:ext cx="1925287" cy="835292"/>
+            </a:xfrm>
+            <a:prstGeom prst="roundRect">
+              <a:avLst/>
+            </a:prstGeom>
+            <a:sp3d prstMaterial="plastic">
+              <a:bevelT w="127000" h="25400" prst="relaxedInset"/>
+            </a:sp3d>
+          </p:spPr>
+          <p:style>
+            <a:lnRef idx="0">
+              <a:schemeClr val="lt1">
+                <a:hueOff val="0"/>
+                <a:satOff val="0"/>
+                <a:lumOff val="0"/>
+                <a:alphaOff val="0"/>
+              </a:schemeClr>
+            </a:lnRef>
+            <a:fillRef idx="3">
+              <a:schemeClr val="accent1">
+                <a:hueOff val="0"/>
+                <a:satOff val="0"/>
+                <a:lumOff val="0"/>
+                <a:alphaOff val="0"/>
+              </a:schemeClr>
+            </a:fillRef>
+            <a:effectRef idx="2">
+              <a:schemeClr val="accent1">
+                <a:hueOff val="0"/>
+                <a:satOff val="0"/>
+                <a:lumOff val="0"/>
+                <a:alphaOff val="0"/>
+              </a:schemeClr>
+            </a:effectRef>
+            <a:fontRef idx="minor">
+              <a:schemeClr val="lt1"/>
+            </a:fontRef>
+          </p:style>
+        </p:sp>
+        <p:sp>
+          <p:nvSpPr>
+            <p:cNvPr id="19" name="Rectangle: Rounded Corners 7">
+              <a:extLst>
+                <a:ext uri="{FF2B5EF4-FFF2-40B4-BE49-F238E27FC236}">
+                  <a16:creationId xmlns:a16="http://schemas.microsoft.com/office/drawing/2014/main" xmlns="" id="{110F1258-6F73-42E9-B344-03EE53497FAB}"/>
+                </a:ext>
+              </a:extLst>
+            </p:cNvPr>
+            <p:cNvSpPr txBox="1"/>
+            <p:nvPr/>
+          </p:nvSpPr>
+          <p:spPr>
+            <a:xfrm>
+              <a:off x="2091499" y="667245"/>
+              <a:ext cx="1843735" cy="753740"/>
+            </a:xfrm>
+            <a:prstGeom prst="rect">
+              <a:avLst/>
+            </a:prstGeom>
+            <a:sp3d/>
+          </p:spPr>
+          <p:style>
+            <a:lnRef idx="0">
+              <a:scrgbClr r="0" g="0" b="0"/>
+            </a:lnRef>
+            <a:fillRef idx="0">
+              <a:scrgbClr r="0" g="0" b="0"/>
+            </a:fillRef>
+            <a:effectRef idx="0">
+              <a:scrgbClr r="0" g="0" b="0"/>
+            </a:effectRef>
+            <a:fontRef idx="minor">
+              <a:schemeClr val="lt1"/>
+            </a:fontRef>
+          </p:style>
+          <p:txBody>
+            <a:bodyPr spcFirstLastPara="0" vert="horz" wrap="square" lIns="64770" tIns="64770" rIns="64770" bIns="64770" numCol="1" spcCol="1270" anchor="ctr" anchorCtr="0">
+              <a:noAutofit/>
+            </a:bodyPr>
+            <a:lstStyle/>
+            <a:p>
+              <a:pPr marL="0" lvl="0" indent="0" algn="ctr" defTabSz="755650">
+                <a:lnSpc>
+                  <a:spcPct val="90000"/>
+                </a:lnSpc>
+                <a:spcBef>
+                  <a:spcPct val="0"/>
+                </a:spcBef>
+                <a:spcAft>
+                  <a:spcPct val="35000"/>
+                </a:spcAft>
+                <a:buNone/>
+              </a:pPr>
+              <a:r>
+                <a:rPr lang="en-US" sz="1700" kern="1200" dirty="0" err="1"/>
+                <a:t>XPages</a:t>
+              </a:r>
+              <a:r>
+                <a:rPr lang="en-US" sz="1700" kern="1200" dirty="0"/>
+                <a:t> Developer</a:t>
+              </a:r>
+            </a:p>
+          </p:txBody>
+        </p:sp>
+      </p:grpSp>
+      <p:grpSp>
+        <p:nvGrpSpPr>
+          <p:cNvPr id="12" name="Group 11">
+            <a:extLst>
+              <a:ext uri="{FF2B5EF4-FFF2-40B4-BE49-F238E27FC236}">
+                <a16:creationId xmlns:a16="http://schemas.microsoft.com/office/drawing/2014/main" xmlns="" id="{836C9D76-D131-4697-87D2-EAE3576FADB0}"/>
+              </a:ext>
+            </a:extLst>
+          </p:cNvPr>
+          <p:cNvGrpSpPr/>
+          <p:nvPr/>
+        </p:nvGrpSpPr>
+        <p:grpSpPr>
+          <a:xfrm>
+            <a:off x="4608210" y="4411069"/>
+            <a:ext cx="1925287" cy="835292"/>
+            <a:chOff x="4099229" y="626469"/>
+            <a:chExt cx="1925287" cy="835292"/>
+          </a:xfrm>
+          <a:scene3d>
+            <a:camera prst="orthographicFront"/>
+            <a:lightRig rig="threePt" dir="t">
+              <a:rot lat="0" lon="0" rev="7500000"/>
+            </a:lightRig>
+          </a:scene3d>
+        </p:grpSpPr>
+        <p:sp>
+          <p:nvSpPr>
+            <p:cNvPr id="16" name="Rectangle: Rounded Corners 15">
+              <a:extLst>
+                <a:ext uri="{FF2B5EF4-FFF2-40B4-BE49-F238E27FC236}">
+                  <a16:creationId xmlns:a16="http://schemas.microsoft.com/office/drawing/2014/main" xmlns="" id="{07C25609-83FE-48AD-A91A-9D291B9844E8}"/>
+                </a:ext>
+              </a:extLst>
+            </p:cNvPr>
+            <p:cNvSpPr/>
+            <p:nvPr/>
+          </p:nvSpPr>
+          <p:spPr>
+            <a:xfrm>
+              <a:off x="4099229" y="626469"/>
+              <a:ext cx="1925287" cy="835292"/>
+            </a:xfrm>
+            <a:prstGeom prst="roundRect">
+              <a:avLst/>
+            </a:prstGeom>
+            <a:sp3d prstMaterial="plastic">
+              <a:bevelT w="127000" h="25400" prst="relaxedInset"/>
+            </a:sp3d>
+          </p:spPr>
+          <p:style>
+            <a:lnRef idx="0">
+              <a:schemeClr val="lt1">
+                <a:hueOff val="0"/>
+                <a:satOff val="0"/>
+                <a:lumOff val="0"/>
+                <a:alphaOff val="0"/>
+              </a:schemeClr>
+            </a:lnRef>
+            <a:fillRef idx="3">
+              <a:schemeClr val="accent1">
+                <a:hueOff val="0"/>
+                <a:satOff val="0"/>
+                <a:lumOff val="0"/>
+                <a:alphaOff val="0"/>
+              </a:schemeClr>
+            </a:fillRef>
+            <a:effectRef idx="2">
+              <a:schemeClr val="accent1">
+                <a:hueOff val="0"/>
+                <a:satOff val="0"/>
+                <a:lumOff val="0"/>
+                <a:alphaOff val="0"/>
+              </a:schemeClr>
+            </a:effectRef>
+            <a:fontRef idx="minor">
+              <a:schemeClr val="lt1"/>
+            </a:fontRef>
+          </p:style>
+        </p:sp>
+        <p:sp>
+          <p:nvSpPr>
+            <p:cNvPr id="17" name="Rectangle: Rounded Corners 9">
+              <a:extLst>
+                <a:ext uri="{FF2B5EF4-FFF2-40B4-BE49-F238E27FC236}">
+                  <a16:creationId xmlns:a16="http://schemas.microsoft.com/office/drawing/2014/main" xmlns="" id="{1C28D283-4C25-428A-B342-E8B990D73AFB}"/>
+                </a:ext>
+              </a:extLst>
+            </p:cNvPr>
+            <p:cNvSpPr txBox="1"/>
+            <p:nvPr/>
+          </p:nvSpPr>
+          <p:spPr>
+            <a:xfrm>
+              <a:off x="4140005" y="667245"/>
+              <a:ext cx="1843735" cy="753740"/>
+            </a:xfrm>
+            <a:prstGeom prst="rect">
+              <a:avLst/>
+            </a:prstGeom>
+            <a:sp3d/>
+          </p:spPr>
+          <p:style>
+            <a:lnRef idx="0">
+              <a:scrgbClr r="0" g="0" b="0"/>
+            </a:lnRef>
+            <a:fillRef idx="0">
+              <a:scrgbClr r="0" g="0" b="0"/>
+            </a:fillRef>
+            <a:effectRef idx="0">
+              <a:scrgbClr r="0" g="0" b="0"/>
+            </a:effectRef>
+            <a:fontRef idx="minor">
+              <a:schemeClr val="lt1"/>
+            </a:fontRef>
+          </p:style>
+          <p:txBody>
+            <a:bodyPr spcFirstLastPara="0" vert="horz" wrap="square" lIns="64770" tIns="64770" rIns="64770" bIns="64770" numCol="1" spcCol="1270" anchor="ctr" anchorCtr="0">
+              <a:noAutofit/>
+            </a:bodyPr>
+            <a:lstStyle/>
+            <a:p>
+              <a:pPr marL="0" lvl="0" indent="0" algn="ctr" defTabSz="755650">
+                <a:lnSpc>
+                  <a:spcPct val="90000"/>
+                </a:lnSpc>
+                <a:spcBef>
+                  <a:spcPct val="0"/>
+                </a:spcBef>
+                <a:spcAft>
+                  <a:spcPct val="35000"/>
+                </a:spcAft>
+                <a:buNone/>
+              </a:pPr>
+              <a:r>
+                <a:rPr lang="en-US" sz="1700" kern="1200" dirty="0" smtClean="0"/>
+                <a:t>DevOps Engineer</a:t>
+              </a:r>
+              <a:endParaRPr lang="en-US" sz="1700" kern="1200" dirty="0"/>
+            </a:p>
+          </p:txBody>
+        </p:sp>
+      </p:grpSp>
+      <p:grpSp>
+        <p:nvGrpSpPr>
+          <p:cNvPr id="13" name="Group 12">
+            <a:extLst>
+              <a:ext uri="{FF2B5EF4-FFF2-40B4-BE49-F238E27FC236}">
+                <a16:creationId xmlns:a16="http://schemas.microsoft.com/office/drawing/2014/main" xmlns="" id="{950B76FC-5A2D-4D73-9FA6-A4F0765716C1}"/>
+              </a:ext>
+            </a:extLst>
+          </p:cNvPr>
+          <p:cNvGrpSpPr/>
+          <p:nvPr/>
+        </p:nvGrpSpPr>
+        <p:grpSpPr>
+          <a:xfrm>
+            <a:off x="6656715" y="4411069"/>
+            <a:ext cx="1925287" cy="835292"/>
+            <a:chOff x="6147734" y="626469"/>
+            <a:chExt cx="1925287" cy="835292"/>
+          </a:xfrm>
+          <a:scene3d>
+            <a:camera prst="orthographicFront"/>
+            <a:lightRig rig="threePt" dir="t">
+              <a:rot lat="0" lon="0" rev="7500000"/>
+            </a:lightRig>
+          </a:scene3d>
+        </p:grpSpPr>
+        <p:sp>
+          <p:nvSpPr>
+            <p:cNvPr id="14" name="Rectangle: Rounded Corners 13">
+              <a:extLst>
+                <a:ext uri="{FF2B5EF4-FFF2-40B4-BE49-F238E27FC236}">
+                  <a16:creationId xmlns:a16="http://schemas.microsoft.com/office/drawing/2014/main" xmlns="" id="{F40D22CD-D3F7-4AA7-A9E4-AB0C7FA72C8C}"/>
+                </a:ext>
+              </a:extLst>
+            </p:cNvPr>
+            <p:cNvSpPr/>
+            <p:nvPr/>
+          </p:nvSpPr>
+          <p:spPr>
+            <a:xfrm>
+              <a:off x="6147734" y="626469"/>
+              <a:ext cx="1925287" cy="835292"/>
+            </a:xfrm>
+            <a:prstGeom prst="roundRect">
+              <a:avLst/>
+            </a:prstGeom>
+            <a:sp3d prstMaterial="plastic">
+              <a:bevelT w="127000" h="25400" prst="relaxedInset"/>
+            </a:sp3d>
+          </p:spPr>
+          <p:style>
+            <a:lnRef idx="0">
+              <a:schemeClr val="lt1">
+                <a:hueOff val="0"/>
+                <a:satOff val="0"/>
+                <a:lumOff val="0"/>
+                <a:alphaOff val="0"/>
+              </a:schemeClr>
+            </a:lnRef>
+            <a:fillRef idx="3">
+              <a:schemeClr val="accent1">
+                <a:hueOff val="0"/>
+                <a:satOff val="0"/>
+                <a:lumOff val="0"/>
+                <a:alphaOff val="0"/>
+              </a:schemeClr>
+            </a:fillRef>
+            <a:effectRef idx="2">
+              <a:schemeClr val="accent1">
+                <a:hueOff val="0"/>
+                <a:satOff val="0"/>
+                <a:lumOff val="0"/>
+                <a:alphaOff val="0"/>
+              </a:schemeClr>
+            </a:effectRef>
+            <a:fontRef idx="minor">
+              <a:schemeClr val="lt1"/>
+            </a:fontRef>
+          </p:style>
+        </p:sp>
+        <p:sp>
+          <p:nvSpPr>
+            <p:cNvPr id="15" name="Rectangle: Rounded Corners 11">
+              <a:extLst>
+                <a:ext uri="{FF2B5EF4-FFF2-40B4-BE49-F238E27FC236}">
+                  <a16:creationId xmlns:a16="http://schemas.microsoft.com/office/drawing/2014/main" xmlns="" id="{A2368F2E-FBBE-4C6A-BD1D-1811DB8E0402}"/>
+                </a:ext>
+              </a:extLst>
+            </p:cNvPr>
+            <p:cNvSpPr txBox="1"/>
+            <p:nvPr/>
+          </p:nvSpPr>
+          <p:spPr>
+            <a:xfrm>
+              <a:off x="6188510" y="667245"/>
+              <a:ext cx="1843735" cy="753740"/>
+            </a:xfrm>
+            <a:prstGeom prst="rect">
+              <a:avLst/>
+            </a:prstGeom>
+            <a:sp3d/>
+          </p:spPr>
+          <p:style>
+            <a:lnRef idx="0">
+              <a:scrgbClr r="0" g="0" b="0"/>
+            </a:lnRef>
+            <a:fillRef idx="0">
+              <a:scrgbClr r="0" g="0" b="0"/>
+            </a:fillRef>
+            <a:effectRef idx="0">
+              <a:scrgbClr r="0" g="0" b="0"/>
+            </a:effectRef>
+            <a:fontRef idx="minor">
+              <a:schemeClr val="lt1"/>
+            </a:fontRef>
+          </p:style>
+          <p:txBody>
+            <a:bodyPr spcFirstLastPara="0" vert="horz" wrap="square" lIns="64770" tIns="64770" rIns="64770" bIns="64770" numCol="1" spcCol="1270" anchor="ctr" anchorCtr="0">
+              <a:noAutofit/>
+            </a:bodyPr>
+            <a:lstStyle/>
+            <a:p>
+              <a:pPr marL="0" lvl="0" indent="0" algn="ctr" defTabSz="755650">
+                <a:lnSpc>
+                  <a:spcPct val="90000"/>
+                </a:lnSpc>
+                <a:spcBef>
+                  <a:spcPct val="0"/>
+                </a:spcBef>
+                <a:spcAft>
+                  <a:spcPct val="35000"/>
+                </a:spcAft>
+                <a:buNone/>
+              </a:pPr>
+              <a:r>
+                <a:rPr lang="en-US" sz="1700" kern="1200" dirty="0" smtClean="0"/>
+                <a:t>AI Programming</a:t>
+              </a:r>
+              <a:endParaRPr lang="en-US" sz="1700" kern="1200" dirty="0"/>
+            </a:p>
+          </p:txBody>
+        </p:sp>
+      </p:grpSp>
+      <p:pic>
+        <p:nvPicPr>
+          <p:cNvPr id="22" name="Picture 2"/>
+          <p:cNvPicPr>
+            <a:picLocks noChangeAspect="1"/>
+          </p:cNvPicPr>
+          <p:nvPr/>
+        </p:nvPicPr>
+        <p:blipFill>
+          <a:blip r:embed="rId3">
+            <a:extLst>
+              <a:ext uri="{28A0092B-C50C-407E-A947-70E740481C1C}">
+                <a14:useLocalDpi xmlns:a14="http://schemas.microsoft.com/office/drawing/2010/main" val="0"/>
+              </a:ext>
+            </a:extLst>
+          </a:blip>
+          <a:srcRect/>
+          <a:stretch>
+            <a:fillRect/>
+          </a:stretch>
+        </p:blipFill>
+        <p:spPr bwMode="auto">
+          <a:xfrm>
+            <a:off x="8705220" y="1852785"/>
+            <a:ext cx="3352800" cy="3352800"/>
+          </a:xfrm>
+          <a:prstGeom prst="rect">
+            <a:avLst/>
+          </a:prstGeom>
+          <a:noFill/>
+          <a:ln>
+            <a:noFill/>
+          </a:ln>
+          <a:extLst>
+            <a:ext uri="{909E8E84-426E-40DD-AFC4-6F175D3DCCD1}">
+              <a14:hiddenFill xmlns:a14="http://schemas.microsoft.com/office/drawing/2010/main">
+                <a:solidFill>
+                  <a:srgbClr val="FFFFFF"/>
+                </a:solidFill>
+              </a14:hiddenFill>
+            </a:ext>
+            <a:ext uri="{91240B29-F687-4F45-9708-019B960494DF}">
+              <a14:hiddenLine xmlns:a14="http://schemas.microsoft.com/office/drawing/2010/main" w="9525">
+                <a:solidFill>
+                  <a:srgbClr val="000000"/>
+                </a:solidFill>
+                <a:miter lim="800000"/>
+                <a:headEnd/>
+                <a:tailEnd/>
+              </a14:hiddenLine>
+            </a:ext>
+          </a:extLst>
+        </p:spPr>
+      </p:pic>
     </p:spTree>
     <p:extLst>
       <p:ext uri="{BB962C8B-B14F-4D97-AF65-F5344CB8AC3E}">
-        <p14:creationId xmlns:p14="http://schemas.microsoft.com/office/powerpoint/2010/main" val="3467915431"/>
+        <p14:creationId xmlns:p14="http://schemas.microsoft.com/office/powerpoint/2010/main" val="236601249"/>
       </p:ext>
     </p:extLst>
   </p:cSld>
   <p:clrMapOvr>
     <a:masterClrMapping/>
   </p:clrMapOvr>
+  <p:timing>
+    <p:tnLst>
+      <p:par>
+        <p:cTn id="1" dur="indefinite" restart="never" nodeType="tmRoot"/>
+      </p:par>
+    </p:tnLst>
+  </p:timing>
 </p:sld>
 </file>
 
@@ -6787,7 +7624,7 @@
           <p:cNvPr id="2" name="Title 1">
             <a:extLst>
               <a:ext uri="{FF2B5EF4-FFF2-40B4-BE49-F238E27FC236}">
-                <a16:creationId xmlns:a16="http://schemas.microsoft.com/office/drawing/2014/main" id="{A09F69C7-34E6-46C1-A796-5324FEEDDB23}"/>
+                <a16:creationId xmlns:a16="http://schemas.microsoft.com/office/drawing/2014/main" xmlns="" id="{A09F69C7-34E6-46C1-A796-5324FEEDDB23}"/>
               </a:ext>
             </a:extLst>
           </p:cNvPr>
@@ -6815,7 +7652,7 @@
           <p:cNvPr id="3" name="Content Placeholder 2">
             <a:extLst>
               <a:ext uri="{FF2B5EF4-FFF2-40B4-BE49-F238E27FC236}">
-                <a16:creationId xmlns:a16="http://schemas.microsoft.com/office/drawing/2014/main" id="{34A64C34-4AE8-4780-98A0-96EAF2F11DE7}"/>
+                <a16:creationId xmlns:a16="http://schemas.microsoft.com/office/drawing/2014/main" xmlns="" id="{34A64C34-4AE8-4780-98A0-96EAF2F11DE7}"/>
               </a:ext>
             </a:extLst>
           </p:cNvPr>
@@ -6836,7 +7673,7 @@
               <a:buChar char="-"/>
             </a:pPr>
             <a:r>
-              <a:rPr lang="en-GB" dirty="0"/>
+              <a:rPr lang="en-GB" dirty="0" smtClean="0"/>
               <a:t>Introduction</a:t>
             </a:r>
           </a:p>
@@ -6846,8 +7683,12 @@
               <a:buChar char="-"/>
             </a:pPr>
             <a:r>
-              <a:rPr lang="en-GB" dirty="0"/>
-              <a:t>Domino as datastore, REST access</a:t>
+              <a:rPr lang="en-GB" dirty="0" smtClean="0"/>
+              <a:t>Domino </a:t>
+            </a:r>
+            <a:r>
+              <a:rPr lang="en-GB" dirty="0"/>
+              <a:t>as datastore, REST access</a:t>
             </a:r>
           </a:p>
           <a:p>
@@ -6857,8 +7698,23 @@
             </a:pPr>
             <a:r>
               <a:rPr lang="en-GB" dirty="0"/>
-              <a:t>What about scheduled tasks?</a:t>
-            </a:r>
+              <a:t>What about scheduled tasks</a:t>
+            </a:r>
+            <a:r>
+              <a:rPr lang="en-GB" dirty="0" smtClean="0"/>
+              <a:t>?</a:t>
+            </a:r>
+          </a:p>
+          <a:p>
+            <a:pPr marL="342900" indent="-342900">
+              <a:buFontTx/>
+              <a:buChar char="-"/>
+            </a:pPr>
+            <a:r>
+              <a:rPr lang="en-GB" dirty="0" smtClean="0"/>
+              <a:t>Microservices and Containerization</a:t>
+            </a:r>
+            <a:endParaRPr lang="en-GB" dirty="0"/>
           </a:p>
           <a:p>
             <a:pPr marL="342900" indent="-342900">
@@ -6879,6 +7735,13 @@
   <p:clrMapOvr>
     <a:masterClrMapping/>
   </p:clrMapOvr>
+  <p:timing>
+    <p:tnLst>
+      <p:par>
+        <p:cTn id="1" dur="indefinite" restart="never" nodeType="tmRoot"/>
+      </p:par>
+    </p:tnLst>
+  </p:timing>
 </p:sld>
 </file>
 
@@ -6904,7 +7767,7 @@
           <p:cNvPr id="4" name="Title 3">
             <a:extLst>
               <a:ext uri="{FF2B5EF4-FFF2-40B4-BE49-F238E27FC236}">
-                <a16:creationId xmlns:a16="http://schemas.microsoft.com/office/drawing/2014/main" id="{D691CD7C-405A-4343-A99A-F7317A35A1A1}"/>
+                <a16:creationId xmlns:a16="http://schemas.microsoft.com/office/drawing/2014/main" xmlns="" id="{D691CD7C-405A-4343-A99A-F7317A35A1A1}"/>
               </a:ext>
             </a:extLst>
           </p:cNvPr>
@@ -6937,6 +7800,13 @@
   <p:clrMapOvr>
     <a:masterClrMapping/>
   </p:clrMapOvr>
+  <p:timing>
+    <p:tnLst>
+      <p:par>
+        <p:cTn id="1" dur="indefinite" restart="never" nodeType="tmRoot"/>
+      </p:par>
+    </p:tnLst>
+  </p:timing>
 </p:sld>
 </file>
 
@@ -6962,7 +7832,7 @@
           <p:cNvPr id="2" name="Title 1">
             <a:extLst>
               <a:ext uri="{FF2B5EF4-FFF2-40B4-BE49-F238E27FC236}">
-                <a16:creationId xmlns:a16="http://schemas.microsoft.com/office/drawing/2014/main" id="{E1DDDE7C-1B23-4060-B7B2-FCFE31AB72AB}"/>
+                <a16:creationId xmlns:a16="http://schemas.microsoft.com/office/drawing/2014/main" xmlns="" id="{E1DDDE7C-1B23-4060-B7B2-FCFE31AB72AB}"/>
               </a:ext>
             </a:extLst>
           </p:cNvPr>
@@ -6990,7 +7860,7 @@
           <p:cNvPr id="3" name="Content Placeholder 2">
             <a:extLst>
               <a:ext uri="{FF2B5EF4-FFF2-40B4-BE49-F238E27FC236}">
-                <a16:creationId xmlns:a16="http://schemas.microsoft.com/office/drawing/2014/main" id="{3BA306DB-D732-4579-8793-4C543104252D}"/>
+                <a16:creationId xmlns:a16="http://schemas.microsoft.com/office/drawing/2014/main" xmlns="" id="{3BA306DB-D732-4579-8793-4C543104252D}"/>
               </a:ext>
             </a:extLst>
           </p:cNvPr>
@@ -7082,6 +7952,13 @@
   <p:clrMapOvr>
     <a:masterClrMapping/>
   </p:clrMapOvr>
+  <p:timing>
+    <p:tnLst>
+      <p:par>
+        <p:cTn id="1" dur="indefinite" restart="never" nodeType="tmRoot"/>
+      </p:par>
+    </p:tnLst>
+  </p:timing>
 </p:sld>
 </file>
 
@@ -7107,7 +7984,7 @@
           <p:cNvPr id="2" name="Title 1">
             <a:extLst>
               <a:ext uri="{FF2B5EF4-FFF2-40B4-BE49-F238E27FC236}">
-                <a16:creationId xmlns:a16="http://schemas.microsoft.com/office/drawing/2014/main" id="{54E323D5-60FE-441D-93FC-A4A17CCDB230}"/>
+                <a16:creationId xmlns:a16="http://schemas.microsoft.com/office/drawing/2014/main" xmlns="" id="{54E323D5-60FE-441D-93FC-A4A17CCDB230}"/>
               </a:ext>
             </a:extLst>
           </p:cNvPr>
@@ -7138,7 +8015,7 @@
           <p:cNvPr id="3" name="Content Placeholder 2">
             <a:extLst>
               <a:ext uri="{FF2B5EF4-FFF2-40B4-BE49-F238E27FC236}">
-                <a16:creationId xmlns:a16="http://schemas.microsoft.com/office/drawing/2014/main" id="{488741F8-A1AA-4D80-A45A-3154A7B10A7B}"/>
+                <a16:creationId xmlns:a16="http://schemas.microsoft.com/office/drawing/2014/main" xmlns="" id="{488741F8-A1AA-4D80-A45A-3154A7B10A7B}"/>
               </a:ext>
             </a:extLst>
           </p:cNvPr>
@@ -7233,6 +8110,13 @@
   <p:clrMapOvr>
     <a:masterClrMapping/>
   </p:clrMapOvr>
+  <p:timing>
+    <p:tnLst>
+      <p:par>
+        <p:cTn id="1" dur="indefinite" restart="never" nodeType="tmRoot"/>
+      </p:par>
+    </p:tnLst>
+  </p:timing>
 </p:sld>
 </file>
 
@@ -7258,7 +8142,7 @@
           <p:cNvPr id="2" name="Title 1">
             <a:extLst>
               <a:ext uri="{FF2B5EF4-FFF2-40B4-BE49-F238E27FC236}">
-                <a16:creationId xmlns:a16="http://schemas.microsoft.com/office/drawing/2014/main" id="{E50706F6-B240-469D-9907-F8E98ECB792C}"/>
+                <a16:creationId xmlns:a16="http://schemas.microsoft.com/office/drawing/2014/main" xmlns="" id="{E50706F6-B240-469D-9907-F8E98ECB792C}"/>
               </a:ext>
             </a:extLst>
           </p:cNvPr>
@@ -7286,7 +8170,7 @@
           <p:cNvPr id="3" name="Content Placeholder 2">
             <a:extLst>
               <a:ext uri="{FF2B5EF4-FFF2-40B4-BE49-F238E27FC236}">
-                <a16:creationId xmlns:a16="http://schemas.microsoft.com/office/drawing/2014/main" id="{82E6E5A4-30F9-4680-9CE7-B82002E233A9}"/>
+                <a16:creationId xmlns:a16="http://schemas.microsoft.com/office/drawing/2014/main" xmlns="" id="{82E6E5A4-30F9-4680-9CE7-B82002E233A9}"/>
               </a:ext>
             </a:extLst>
           </p:cNvPr>
@@ -7408,7 +8292,7 @@
           <p:cNvPr id="2" name="Title 1">
             <a:extLst>
               <a:ext uri="{FF2B5EF4-FFF2-40B4-BE49-F238E27FC236}">
-                <a16:creationId xmlns:a16="http://schemas.microsoft.com/office/drawing/2014/main" id="{95C7771E-874B-4266-989A-A1D42B4A6FBD}"/>
+                <a16:creationId xmlns:a16="http://schemas.microsoft.com/office/drawing/2014/main" xmlns="" id="{95C7771E-874B-4266-989A-A1D42B4A6FBD}"/>
               </a:ext>
             </a:extLst>
           </p:cNvPr>
@@ -7474,7 +8358,7 @@
           <p:cNvPr id="3" name="Content Placeholder 2">
             <a:extLst>
               <a:ext uri="{FF2B5EF4-FFF2-40B4-BE49-F238E27FC236}">
-                <a16:creationId xmlns:a16="http://schemas.microsoft.com/office/drawing/2014/main" id="{56D320B4-4B47-4331-8696-978083ABB006}"/>
+                <a16:creationId xmlns:a16="http://schemas.microsoft.com/office/drawing/2014/main" xmlns="" id="{56D320B4-4B47-4331-8696-978083ABB006}"/>
               </a:ext>
             </a:extLst>
           </p:cNvPr>

</xml_diff>

<commit_message>
Updated Master to include Aglit-e Logo. Updated John Jardin Page
</commit_message>
<xml_diff>
--- a/presentation/8598 Domino and JS.pptx
+++ b/presentation/8598 Domino and JS.pptx
@@ -182,7 +182,7 @@
           <p:cNvPr id="2" name="Header Placeholder 1">
             <a:extLst>
               <a:ext uri="{FF2B5EF4-FFF2-40B4-BE49-F238E27FC236}">
-                <a16:creationId xmlns:a16="http://schemas.microsoft.com/office/drawing/2014/main" xmlns="" id="{BB178A4F-544B-43AC-BD15-7B2CEA5C04AA}"/>
+                <a16:creationId xmlns="" xmlns:a16="http://schemas.microsoft.com/office/drawing/2014/main" id="{BB178A4F-544B-43AC-BD15-7B2CEA5C04AA}"/>
               </a:ext>
             </a:extLst>
           </p:cNvPr>
@@ -219,7 +219,7 @@
           <p:cNvPr id="3" name="Date Placeholder 2">
             <a:extLst>
               <a:ext uri="{FF2B5EF4-FFF2-40B4-BE49-F238E27FC236}">
-                <a16:creationId xmlns:a16="http://schemas.microsoft.com/office/drawing/2014/main" xmlns="" id="{624BA4BC-130D-4F1D-9EA5-9BBC4F794AEE}"/>
+                <a16:creationId xmlns="" xmlns:a16="http://schemas.microsoft.com/office/drawing/2014/main" id="{624BA4BC-130D-4F1D-9EA5-9BBC4F794AEE}"/>
               </a:ext>
             </a:extLst>
           </p:cNvPr>
@@ -249,7 +249,7 @@
           <a:p>
             <a:fld id="{790E51D3-653E-462A-88BF-90B852BBE668}" type="datetimeFigureOut">
               <a:rPr lang="en-GB" smtClean="0"/>
-              <a:t>18/02/2018</a:t>
+              <a:t>19/02/2018</a:t>
             </a:fld>
             <a:endParaRPr lang="en-GB"/>
           </a:p>
@@ -260,7 +260,7 @@
           <p:cNvPr id="4" name="Footer Placeholder 3">
             <a:extLst>
               <a:ext uri="{FF2B5EF4-FFF2-40B4-BE49-F238E27FC236}">
-                <a16:creationId xmlns:a16="http://schemas.microsoft.com/office/drawing/2014/main" xmlns="" id="{FD7B5433-BC26-406D-9018-BBA13894431D}"/>
+                <a16:creationId xmlns="" xmlns:a16="http://schemas.microsoft.com/office/drawing/2014/main" id="{FD7B5433-BC26-406D-9018-BBA13894431D}"/>
               </a:ext>
             </a:extLst>
           </p:cNvPr>
@@ -297,7 +297,7 @@
           <p:cNvPr id="5" name="Slide Number Placeholder 4">
             <a:extLst>
               <a:ext uri="{FF2B5EF4-FFF2-40B4-BE49-F238E27FC236}">
-                <a16:creationId xmlns:a16="http://schemas.microsoft.com/office/drawing/2014/main" xmlns="" id="{3D83B6B0-F723-4CC7-BE1F-88AD9F01DE11}"/>
+                <a16:creationId xmlns="" xmlns:a16="http://schemas.microsoft.com/office/drawing/2014/main" id="{3D83B6B0-F723-4CC7-BE1F-88AD9F01DE11}"/>
               </a:ext>
             </a:extLst>
           </p:cNvPr>
@@ -426,7 +426,7 @@
           <a:p>
             <a:fld id="{60164965-4043-4174-93BC-54F5E5CCBD1D}" type="datetimeFigureOut">
               <a:rPr lang="en-US" smtClean="0"/>
-              <a:t>2/18/18</a:t>
+              <a:t>2/19/18</a:t>
             </a:fld>
             <a:endParaRPr lang="en-US"/>
           </a:p>
@@ -861,6 +861,90 @@
 </p:notes>
 </file>
 
+<file path=ppt/notesSlides/notesSlide3.xml><?xml version="1.0" encoding="utf-8"?>
+<p:notes xmlns:a="http://schemas.openxmlformats.org/drawingml/2006/main" xmlns:r="http://schemas.openxmlformats.org/officeDocument/2006/relationships" xmlns:p="http://schemas.openxmlformats.org/presentationml/2006/main">
+  <p:cSld>
+    <p:spTree>
+      <p:nvGrpSpPr>
+        <p:cNvPr id="1" name=""/>
+        <p:cNvGrpSpPr/>
+        <p:nvPr/>
+      </p:nvGrpSpPr>
+      <p:grpSpPr>
+        <a:xfrm>
+          <a:off x="0" y="0"/>
+          <a:ext cx="0" cy="0"/>
+          <a:chOff x="0" y="0"/>
+          <a:chExt cx="0" cy="0"/>
+        </a:xfrm>
+      </p:grpSpPr>
+      <p:sp>
+        <p:nvSpPr>
+          <p:cNvPr id="2" name="Slide Image Placeholder 1"/>
+          <p:cNvSpPr>
+            <a:spLocks noGrp="1" noRot="1" noChangeAspect="1"/>
+          </p:cNvSpPr>
+          <p:nvPr>
+            <p:ph type="sldImg"/>
+          </p:nvPr>
+        </p:nvSpPr>
+        <p:spPr/>
+      </p:sp>
+      <p:sp>
+        <p:nvSpPr>
+          <p:cNvPr id="3" name="Notes Placeholder 2"/>
+          <p:cNvSpPr>
+            <a:spLocks noGrp="1"/>
+          </p:cNvSpPr>
+          <p:nvPr>
+            <p:ph type="body" idx="1"/>
+          </p:nvPr>
+        </p:nvSpPr>
+        <p:spPr/>
+        <p:txBody>
+          <a:bodyPr/>
+          <a:lstStyle/>
+          <a:p>
+            <a:endParaRPr lang="en-US" dirty="0"/>
+          </a:p>
+        </p:txBody>
+      </p:sp>
+      <p:sp>
+        <p:nvSpPr>
+          <p:cNvPr id="4" name="Slide Number Placeholder 3"/>
+          <p:cNvSpPr>
+            <a:spLocks noGrp="1"/>
+          </p:cNvSpPr>
+          <p:nvPr>
+            <p:ph type="sldNum" sz="quarter" idx="10"/>
+          </p:nvPr>
+        </p:nvSpPr>
+        <p:spPr/>
+        <p:txBody>
+          <a:bodyPr/>
+          <a:lstStyle/>
+          <a:p>
+            <a:fld id="{7F3C5AE6-245A-4892-87E4-2DDCA6560455}" type="slidenum">
+              <a:rPr lang="en-US" smtClean="0"/>
+              <a:t>6</a:t>
+            </a:fld>
+            <a:endParaRPr lang="en-US"/>
+          </a:p>
+        </p:txBody>
+      </p:sp>
+    </p:spTree>
+    <p:extLst>
+      <p:ext uri="{BB962C8B-B14F-4D97-AF65-F5344CB8AC3E}">
+        <p14:creationId xmlns:p14="http://schemas.microsoft.com/office/powerpoint/2010/main" val="959733305"/>
+      </p:ext>
+    </p:extLst>
+  </p:cSld>
+  <p:clrMapOvr>
+    <a:masterClrMapping/>
+  </p:clrMapOvr>
+</p:notes>
+</file>
+
 <file path=ppt/slideLayouts/slideLayout1.xml><?xml version="1.0" encoding="utf-8"?>
 <p:sldLayout xmlns:a="http://schemas.openxmlformats.org/drawingml/2006/main" xmlns:r="http://schemas.openxmlformats.org/officeDocument/2006/relationships" xmlns:p="http://schemas.openxmlformats.org/presentationml/2006/main" type="title" preserve="1">
   <p:cSld name="Title Slide Main">
@@ -1020,6 +1104,36 @@
           </a:p>
         </p:txBody>
       </p:sp>
+      <p:pic>
+        <p:nvPicPr>
+          <p:cNvPr id="5" name="Picture 4"/>
+          <p:cNvPicPr>
+            <a:picLocks noChangeAspect="1"/>
+          </p:cNvPicPr>
+          <p:nvPr userDrawn="1"/>
+        </p:nvPicPr>
+        <p:blipFill>
+          <a:blip r:embed="rId2">
+            <a:extLst>
+              <a:ext uri="{28A0092B-C50C-407E-A947-70E740481C1C}">
+                <a14:useLocalDpi xmlns:a14="http://schemas.microsoft.com/office/drawing/2010/main" val="0"/>
+              </a:ext>
+            </a:extLst>
+          </a:blip>
+          <a:stretch>
+            <a:fillRect/>
+          </a:stretch>
+        </p:blipFill>
+        <p:spPr>
+          <a:xfrm>
+            <a:off x="2788511" y="6006739"/>
+            <a:ext cx="1588193" cy="697201"/>
+          </a:xfrm>
+          <a:prstGeom prst="rect">
+            <a:avLst/>
+          </a:prstGeom>
+        </p:spPr>
+      </p:pic>
     </p:spTree>
     <p:extLst>
       <p:ext uri="{BB962C8B-B14F-4D97-AF65-F5344CB8AC3E}">
@@ -3396,7 +3510,7 @@
           <p:cNvPr id="10" name="Picture 9">
             <a:extLst>
               <a:ext uri="{FF2B5EF4-FFF2-40B4-BE49-F238E27FC236}">
-                <a16:creationId xmlns:a16="http://schemas.microsoft.com/office/drawing/2014/main" xmlns="" id="{F35D7D39-F3E0-46F3-9F14-221C7C0B4774}"/>
+                <a16:creationId xmlns="" xmlns:a16="http://schemas.microsoft.com/office/drawing/2014/main" id="{F35D7D39-F3E0-46F3-9F14-221C7C0B4774}"/>
               </a:ext>
             </a:extLst>
           </p:cNvPr>
@@ -3431,7 +3545,7 @@
           <p:cNvPr id="7" name="Picture 6">
             <a:extLst>
               <a:ext uri="{FF2B5EF4-FFF2-40B4-BE49-F238E27FC236}">
-                <a16:creationId xmlns:a16="http://schemas.microsoft.com/office/drawing/2014/main" xmlns="" id="{C66C50A9-C8A1-4CCC-A063-A7A687E70B85}"/>
+                <a16:creationId xmlns="" xmlns:a16="http://schemas.microsoft.com/office/drawing/2014/main" id="{C66C50A9-C8A1-4CCC-A063-A7A687E70B85}"/>
               </a:ext>
             </a:extLst>
           </p:cNvPr>
@@ -3467,7 +3581,7 @@
           <p:cNvPr id="8" name="Picture 7">
             <a:extLst>
               <a:ext uri="{FF2B5EF4-FFF2-40B4-BE49-F238E27FC236}">
-                <a16:creationId xmlns:a16="http://schemas.microsoft.com/office/drawing/2014/main" xmlns="" id="{5DDDF644-1535-4938-B3E9-4A0BA2870803}"/>
+                <a16:creationId xmlns="" xmlns:a16="http://schemas.microsoft.com/office/drawing/2014/main" id="{5DDDF644-1535-4938-B3E9-4A0BA2870803}"/>
               </a:ext>
             </a:extLst>
           </p:cNvPr>
@@ -3490,6 +3604,36 @@
           <a:xfrm>
             <a:off x="294601" y="6196517"/>
             <a:ext cx="1851699" cy="510165"/>
+          </a:xfrm>
+          <a:prstGeom prst="rect">
+            <a:avLst/>
+          </a:prstGeom>
+        </p:spPr>
+      </p:pic>
+      <p:pic>
+        <p:nvPicPr>
+          <p:cNvPr id="9" name="Picture 8"/>
+          <p:cNvPicPr>
+            <a:picLocks noChangeAspect="1"/>
+          </p:cNvPicPr>
+          <p:nvPr userDrawn="1"/>
+        </p:nvPicPr>
+        <p:blipFill>
+          <a:blip r:embed="rId15">
+            <a:extLst>
+              <a:ext uri="{28A0092B-C50C-407E-A947-70E740481C1C}">
+                <a14:useLocalDpi xmlns:a14="http://schemas.microsoft.com/office/drawing/2010/main" val="0"/>
+              </a:ext>
+            </a:extLst>
+          </a:blip>
+          <a:stretch>
+            <a:fillRect/>
+          </a:stretch>
+        </p:blipFill>
+        <p:spPr>
+          <a:xfrm>
+            <a:off x="2906221" y="6006739"/>
+            <a:ext cx="1588193" cy="697201"/>
           </a:xfrm>
           <a:prstGeom prst="rect">
             <a:avLst/>
@@ -3822,7 +3966,7 @@
           <p:cNvPr id="4" name="Title 3">
             <a:extLst>
               <a:ext uri="{FF2B5EF4-FFF2-40B4-BE49-F238E27FC236}">
-                <a16:creationId xmlns:a16="http://schemas.microsoft.com/office/drawing/2014/main" xmlns="" id="{BC59490B-2FA7-421D-8F31-CF5208FB072E}"/>
+                <a16:creationId xmlns="" xmlns:a16="http://schemas.microsoft.com/office/drawing/2014/main" id="{BC59490B-2FA7-421D-8F31-CF5208FB072E}"/>
               </a:ext>
             </a:extLst>
           </p:cNvPr>
@@ -3894,7 +4038,7 @@
           <p:cNvPr id="1028" name="Picture 4" descr="C:\Users\withersp\AppData\Local\SNAGHTML24b362b0.PNG">
             <a:extLst>
               <a:ext uri="{FF2B5EF4-FFF2-40B4-BE49-F238E27FC236}">
-                <a16:creationId xmlns:a16="http://schemas.microsoft.com/office/drawing/2014/main" xmlns="" id="{12E16609-9DD1-43D3-91F4-84B15254DA93}"/>
+                <a16:creationId xmlns="" xmlns:a16="http://schemas.microsoft.com/office/drawing/2014/main" id="{12E16609-9DD1-43D3-91F4-84B15254DA93}"/>
               </a:ext>
             </a:extLst>
           </p:cNvPr>
@@ -3978,7 +4122,7 @@
           <p:cNvPr id="2" name="Title 1">
             <a:extLst>
               <a:ext uri="{FF2B5EF4-FFF2-40B4-BE49-F238E27FC236}">
-                <a16:creationId xmlns:a16="http://schemas.microsoft.com/office/drawing/2014/main" xmlns="" id="{F2C9DEE5-D2B3-4CEE-A43B-3B37F019C675}"/>
+                <a16:creationId xmlns="" xmlns:a16="http://schemas.microsoft.com/office/drawing/2014/main" id="{F2C9DEE5-D2B3-4CEE-A43B-3B37F019C675}"/>
               </a:ext>
             </a:extLst>
           </p:cNvPr>
@@ -4006,7 +4150,7 @@
           <p:cNvPr id="3" name="Content Placeholder 2">
             <a:extLst>
               <a:ext uri="{FF2B5EF4-FFF2-40B4-BE49-F238E27FC236}">
-                <a16:creationId xmlns:a16="http://schemas.microsoft.com/office/drawing/2014/main" xmlns="" id="{62381E6A-3237-46F9-BEBB-AB78EC7DF951}"/>
+                <a16:creationId xmlns="" xmlns:a16="http://schemas.microsoft.com/office/drawing/2014/main" id="{62381E6A-3237-46F9-BEBB-AB78EC7DF951}"/>
               </a:ext>
             </a:extLst>
           </p:cNvPr>
@@ -4137,7 +4281,7 @@
           <p:cNvPr id="4" name="Title 3">
             <a:extLst>
               <a:ext uri="{FF2B5EF4-FFF2-40B4-BE49-F238E27FC236}">
-                <a16:creationId xmlns:a16="http://schemas.microsoft.com/office/drawing/2014/main" xmlns="" id="{642A4954-D8E0-4C0D-B4A7-23E696B306FD}"/>
+                <a16:creationId xmlns="" xmlns:a16="http://schemas.microsoft.com/office/drawing/2014/main" id="{642A4954-D8E0-4C0D-B4A7-23E696B306FD}"/>
               </a:ext>
             </a:extLst>
           </p:cNvPr>
@@ -4197,7 +4341,7 @@
           <p:cNvPr id="2" name="Title 1">
             <a:extLst>
               <a:ext uri="{FF2B5EF4-FFF2-40B4-BE49-F238E27FC236}">
-                <a16:creationId xmlns:a16="http://schemas.microsoft.com/office/drawing/2014/main" xmlns="" id="{1A530216-0158-4426-8CAF-8D17A505629F}"/>
+                <a16:creationId xmlns="" xmlns:a16="http://schemas.microsoft.com/office/drawing/2014/main" id="{1A530216-0158-4426-8CAF-8D17A505629F}"/>
               </a:ext>
             </a:extLst>
           </p:cNvPr>
@@ -4225,7 +4369,7 @@
           <p:cNvPr id="3" name="Content Placeholder 2">
             <a:extLst>
               <a:ext uri="{FF2B5EF4-FFF2-40B4-BE49-F238E27FC236}">
-                <a16:creationId xmlns:a16="http://schemas.microsoft.com/office/drawing/2014/main" xmlns="" id="{117770BD-8CC0-4139-A505-25D8CA68B2CB}"/>
+                <a16:creationId xmlns="" xmlns:a16="http://schemas.microsoft.com/office/drawing/2014/main" id="{117770BD-8CC0-4139-A505-25D8CA68B2CB}"/>
               </a:ext>
             </a:extLst>
           </p:cNvPr>
@@ -4373,7 +4517,7 @@
           <p:cNvPr id="2" name="Title 1">
             <a:extLst>
               <a:ext uri="{FF2B5EF4-FFF2-40B4-BE49-F238E27FC236}">
-                <a16:creationId xmlns:a16="http://schemas.microsoft.com/office/drawing/2014/main" xmlns="" id="{DA325B3B-EB04-4DFE-AF62-DA7694510789}"/>
+                <a16:creationId xmlns="" xmlns:a16="http://schemas.microsoft.com/office/drawing/2014/main" id="{DA325B3B-EB04-4DFE-AF62-DA7694510789}"/>
               </a:ext>
             </a:extLst>
           </p:cNvPr>
@@ -4401,7 +4545,7 @@
           <p:cNvPr id="3" name="Content Placeholder 2">
             <a:extLst>
               <a:ext uri="{FF2B5EF4-FFF2-40B4-BE49-F238E27FC236}">
-                <a16:creationId xmlns:a16="http://schemas.microsoft.com/office/drawing/2014/main" xmlns="" id="{7348DDCC-5EBE-4C1F-B496-7D6BA1B7A59F}"/>
+                <a16:creationId xmlns="" xmlns:a16="http://schemas.microsoft.com/office/drawing/2014/main" id="{7348DDCC-5EBE-4C1F-B496-7D6BA1B7A59F}"/>
               </a:ext>
             </a:extLst>
           </p:cNvPr>
@@ -4550,7 +4694,7 @@
           <p:cNvPr id="2" name="Title 1">
             <a:extLst>
               <a:ext uri="{FF2B5EF4-FFF2-40B4-BE49-F238E27FC236}">
-                <a16:creationId xmlns:a16="http://schemas.microsoft.com/office/drawing/2014/main" xmlns="" id="{DA325B3B-EB04-4DFE-AF62-DA7694510789}"/>
+                <a16:creationId xmlns="" xmlns:a16="http://schemas.microsoft.com/office/drawing/2014/main" id="{DA325B3B-EB04-4DFE-AF62-DA7694510789}"/>
               </a:ext>
             </a:extLst>
           </p:cNvPr>
@@ -4578,7 +4722,7 @@
           <p:cNvPr id="3" name="Content Placeholder 2">
             <a:extLst>
               <a:ext uri="{FF2B5EF4-FFF2-40B4-BE49-F238E27FC236}">
-                <a16:creationId xmlns:a16="http://schemas.microsoft.com/office/drawing/2014/main" xmlns="" id="{7348DDCC-5EBE-4C1F-B496-7D6BA1B7A59F}"/>
+                <a16:creationId xmlns="" xmlns:a16="http://schemas.microsoft.com/office/drawing/2014/main" id="{7348DDCC-5EBE-4C1F-B496-7D6BA1B7A59F}"/>
               </a:ext>
             </a:extLst>
           </p:cNvPr>
@@ -4713,7 +4857,7 @@
           <p:cNvPr id="2" name="Title 1">
             <a:extLst>
               <a:ext uri="{FF2B5EF4-FFF2-40B4-BE49-F238E27FC236}">
-                <a16:creationId xmlns:a16="http://schemas.microsoft.com/office/drawing/2014/main" xmlns="" id="{11F888B0-6184-4E49-BE67-5D21583FAA29}"/>
+                <a16:creationId xmlns="" xmlns:a16="http://schemas.microsoft.com/office/drawing/2014/main" id="{11F888B0-6184-4E49-BE67-5D21583FAA29}"/>
               </a:ext>
             </a:extLst>
           </p:cNvPr>
@@ -4741,7 +4885,7 @@
           <p:cNvPr id="3" name="Content Placeholder 2">
             <a:extLst>
               <a:ext uri="{FF2B5EF4-FFF2-40B4-BE49-F238E27FC236}">
-                <a16:creationId xmlns:a16="http://schemas.microsoft.com/office/drawing/2014/main" xmlns="" id="{5D0BF05F-CB19-4169-8628-60F81EFBE59E}"/>
+                <a16:creationId xmlns="" xmlns:a16="http://schemas.microsoft.com/office/drawing/2014/main" id="{5D0BF05F-CB19-4169-8628-60F81EFBE59E}"/>
               </a:ext>
             </a:extLst>
           </p:cNvPr>
@@ -4897,7 +5041,7 @@
           <p:cNvPr id="2" name="Title 1">
             <a:extLst>
               <a:ext uri="{FF2B5EF4-FFF2-40B4-BE49-F238E27FC236}">
-                <a16:creationId xmlns:a16="http://schemas.microsoft.com/office/drawing/2014/main" xmlns="" id="{05AAFF9C-9D60-456C-9619-912E3CFE5A22}"/>
+                <a16:creationId xmlns="" xmlns:a16="http://schemas.microsoft.com/office/drawing/2014/main" id="{05AAFF9C-9D60-456C-9619-912E3CFE5A22}"/>
               </a:ext>
             </a:extLst>
           </p:cNvPr>
@@ -4926,7 +5070,7 @@
           <p:cNvPr id="3" name="Content Placeholder 2">
             <a:extLst>
               <a:ext uri="{FF2B5EF4-FFF2-40B4-BE49-F238E27FC236}">
-                <a16:creationId xmlns:a16="http://schemas.microsoft.com/office/drawing/2014/main" xmlns="" id="{C94BB55B-6C89-4F4B-A953-BD358C4216B6}"/>
+                <a16:creationId xmlns="" xmlns:a16="http://schemas.microsoft.com/office/drawing/2014/main" id="{C94BB55B-6C89-4F4B-A953-BD358C4216B6}"/>
               </a:ext>
             </a:extLst>
           </p:cNvPr>
@@ -5045,7 +5189,7 @@
           <p:cNvPr id="2" name="Title 1">
             <a:extLst>
               <a:ext uri="{FF2B5EF4-FFF2-40B4-BE49-F238E27FC236}">
-                <a16:creationId xmlns:a16="http://schemas.microsoft.com/office/drawing/2014/main" xmlns="" id="{701EB0D4-BE51-4EB9-95BA-1387E3008DA7}"/>
+                <a16:creationId xmlns="" xmlns:a16="http://schemas.microsoft.com/office/drawing/2014/main" id="{701EB0D4-BE51-4EB9-95BA-1387E3008DA7}"/>
               </a:ext>
             </a:extLst>
           </p:cNvPr>
@@ -5073,7 +5217,7 @@
           <p:cNvPr id="3" name="Content Placeholder 2">
             <a:extLst>
               <a:ext uri="{FF2B5EF4-FFF2-40B4-BE49-F238E27FC236}">
-                <a16:creationId xmlns:a16="http://schemas.microsoft.com/office/drawing/2014/main" xmlns="" id="{090C2521-717E-412B-B21A-03628179FB11}"/>
+                <a16:creationId xmlns="" xmlns:a16="http://schemas.microsoft.com/office/drawing/2014/main" id="{090C2521-717E-412B-B21A-03628179FB11}"/>
               </a:ext>
             </a:extLst>
           </p:cNvPr>
@@ -5155,7 +5299,7 @@
           <p:cNvPr id="2" name="Title 1">
             <a:extLst>
               <a:ext uri="{FF2B5EF4-FFF2-40B4-BE49-F238E27FC236}">
-                <a16:creationId xmlns:a16="http://schemas.microsoft.com/office/drawing/2014/main" xmlns="" id="{BDDECFA5-674E-480C-9B09-ECB6EAFBCFD0}"/>
+                <a16:creationId xmlns="" xmlns:a16="http://schemas.microsoft.com/office/drawing/2014/main" id="{BDDECFA5-674E-480C-9B09-ECB6EAFBCFD0}"/>
               </a:ext>
             </a:extLst>
           </p:cNvPr>
@@ -5183,7 +5327,7 @@
           <p:cNvPr id="3" name="Content Placeholder 2">
             <a:extLst>
               <a:ext uri="{FF2B5EF4-FFF2-40B4-BE49-F238E27FC236}">
-                <a16:creationId xmlns:a16="http://schemas.microsoft.com/office/drawing/2014/main" xmlns="" id="{7E62BE25-35A8-46F0-8E50-33C5CC9893D2}"/>
+                <a16:creationId xmlns="" xmlns:a16="http://schemas.microsoft.com/office/drawing/2014/main" id="{7E62BE25-35A8-46F0-8E50-33C5CC9893D2}"/>
               </a:ext>
             </a:extLst>
           </p:cNvPr>
@@ -5281,7 +5425,7 @@
           <p:cNvPr id="2" name="Title 1">
             <a:extLst>
               <a:ext uri="{FF2B5EF4-FFF2-40B4-BE49-F238E27FC236}">
-                <a16:creationId xmlns:a16="http://schemas.microsoft.com/office/drawing/2014/main" xmlns="" id="{28D4950E-C911-48D5-B236-0A6C79E2A3E6}"/>
+                <a16:creationId xmlns="" xmlns:a16="http://schemas.microsoft.com/office/drawing/2014/main" id="{28D4950E-C911-48D5-B236-0A6C79E2A3E6}"/>
               </a:ext>
             </a:extLst>
           </p:cNvPr>
@@ -5309,7 +5453,7 @@
           <p:cNvPr id="3" name="Content Placeholder 2">
             <a:extLst>
               <a:ext uri="{FF2B5EF4-FFF2-40B4-BE49-F238E27FC236}">
-                <a16:creationId xmlns:a16="http://schemas.microsoft.com/office/drawing/2014/main" xmlns="" id="{D2C3A57F-87ED-48C2-9CAC-38FA5FE319DC}"/>
+                <a16:creationId xmlns="" xmlns:a16="http://schemas.microsoft.com/office/drawing/2014/main" id="{D2C3A57F-87ED-48C2-9CAC-38FA5FE319DC}"/>
               </a:ext>
             </a:extLst>
           </p:cNvPr>
@@ -5415,7 +5559,7 @@
           <p:cNvPr id="4" name="Title 3">
             <a:extLst>
               <a:ext uri="{FF2B5EF4-FFF2-40B4-BE49-F238E27FC236}">
-                <a16:creationId xmlns:a16="http://schemas.microsoft.com/office/drawing/2014/main" xmlns="" id="{242D3F1F-5602-49F4-A125-78B334E5873C}"/>
+                <a16:creationId xmlns="" xmlns:a16="http://schemas.microsoft.com/office/drawing/2014/main" id="{242D3F1F-5602-49F4-A125-78B334E5873C}"/>
               </a:ext>
             </a:extLst>
           </p:cNvPr>
@@ -5447,7 +5591,7 @@
           <p:cNvPr id="5" name="Content Placeholder 4">
             <a:extLst>
               <a:ext uri="{FF2B5EF4-FFF2-40B4-BE49-F238E27FC236}">
-                <a16:creationId xmlns:a16="http://schemas.microsoft.com/office/drawing/2014/main" xmlns="" id="{C13B6473-AA5C-4554-9024-49310ACBC255}"/>
+                <a16:creationId xmlns="" xmlns:a16="http://schemas.microsoft.com/office/drawing/2014/main" id="{C13B6473-AA5C-4554-9024-49310ACBC255}"/>
               </a:ext>
             </a:extLst>
           </p:cNvPr>
@@ -5507,7 +5651,7 @@
           <p:cNvPr id="9" name="Arrow: Right 8">
             <a:extLst>
               <a:ext uri="{FF2B5EF4-FFF2-40B4-BE49-F238E27FC236}">
-                <a16:creationId xmlns:a16="http://schemas.microsoft.com/office/drawing/2014/main" xmlns="" id="{9D07E98F-A5EC-4BA5-B706-FA5F0ED79C9A}"/>
+                <a16:creationId xmlns="" xmlns:a16="http://schemas.microsoft.com/office/drawing/2014/main" id="{9D07E98F-A5EC-4BA5-B706-FA5F0ED79C9A}"/>
               </a:ext>
             </a:extLst>
           </p:cNvPr>
@@ -5577,7 +5721,7 @@
           <p:cNvPr id="10" name="Group 9">
             <a:extLst>
               <a:ext uri="{FF2B5EF4-FFF2-40B4-BE49-F238E27FC236}">
-                <a16:creationId xmlns:a16="http://schemas.microsoft.com/office/drawing/2014/main" xmlns="" id="{AF0A7D2A-1ED2-4864-A5F4-0D140FB92B9B}"/>
+                <a16:creationId xmlns="" xmlns:a16="http://schemas.microsoft.com/office/drawing/2014/main" id="{AF0A7D2A-1ED2-4864-A5F4-0D140FB92B9B}"/>
               </a:ext>
             </a:extLst>
           </p:cNvPr>
@@ -5603,7 +5747,7 @@
             <p:cNvPr id="20" name="Rectangle: Rounded Corners 19">
               <a:extLst>
                 <a:ext uri="{FF2B5EF4-FFF2-40B4-BE49-F238E27FC236}">
-                  <a16:creationId xmlns:a16="http://schemas.microsoft.com/office/drawing/2014/main" xmlns="" id="{42194522-2AE0-45FA-94D1-5C3A1A519BCC}"/>
+                  <a16:creationId xmlns="" xmlns:a16="http://schemas.microsoft.com/office/drawing/2014/main" id="{42194522-2AE0-45FA-94D1-5C3A1A519BCC}"/>
                 </a:ext>
               </a:extLst>
             </p:cNvPr>
@@ -5657,7 +5801,7 @@
             <p:cNvPr id="21" name="Rectangle: Rounded Corners 5">
               <a:extLst>
                 <a:ext uri="{FF2B5EF4-FFF2-40B4-BE49-F238E27FC236}">
-                  <a16:creationId xmlns:a16="http://schemas.microsoft.com/office/drawing/2014/main" xmlns="" id="{861A16B5-D4B4-4670-A45F-34D508101688}"/>
+                  <a16:creationId xmlns="" xmlns:a16="http://schemas.microsoft.com/office/drawing/2014/main" id="{861A16B5-D4B4-4670-A45F-34D508101688}"/>
                 </a:ext>
               </a:extLst>
             </p:cNvPr>
@@ -5719,7 +5863,7 @@
           <p:cNvPr id="11" name="Group 10">
             <a:extLst>
               <a:ext uri="{FF2B5EF4-FFF2-40B4-BE49-F238E27FC236}">
-                <a16:creationId xmlns:a16="http://schemas.microsoft.com/office/drawing/2014/main" xmlns="" id="{CBB29DE9-20E8-453E-8816-D198CD4251AF}"/>
+                <a16:creationId xmlns="" xmlns:a16="http://schemas.microsoft.com/office/drawing/2014/main" id="{CBB29DE9-20E8-453E-8816-D198CD4251AF}"/>
               </a:ext>
             </a:extLst>
           </p:cNvPr>
@@ -5745,7 +5889,7 @@
             <p:cNvPr id="18" name="Rectangle: Rounded Corners 17">
               <a:extLst>
                 <a:ext uri="{FF2B5EF4-FFF2-40B4-BE49-F238E27FC236}">
-                  <a16:creationId xmlns:a16="http://schemas.microsoft.com/office/drawing/2014/main" xmlns="" id="{C417FA2E-811C-440B-B6DE-DDE93137815A}"/>
+                  <a16:creationId xmlns="" xmlns:a16="http://schemas.microsoft.com/office/drawing/2014/main" id="{C417FA2E-811C-440B-B6DE-DDE93137815A}"/>
                 </a:ext>
               </a:extLst>
             </p:cNvPr>
@@ -5799,7 +5943,7 @@
             <p:cNvPr id="19" name="Rectangle: Rounded Corners 7">
               <a:extLst>
                 <a:ext uri="{FF2B5EF4-FFF2-40B4-BE49-F238E27FC236}">
-                  <a16:creationId xmlns:a16="http://schemas.microsoft.com/office/drawing/2014/main" xmlns="" id="{110F1258-6F73-42E9-B344-03EE53497FAB}"/>
+                  <a16:creationId xmlns="" xmlns:a16="http://schemas.microsoft.com/office/drawing/2014/main" id="{110F1258-6F73-42E9-B344-03EE53497FAB}"/>
                 </a:ext>
               </a:extLst>
             </p:cNvPr>
@@ -5865,7 +6009,7 @@
           <p:cNvPr id="12" name="Group 11">
             <a:extLst>
               <a:ext uri="{FF2B5EF4-FFF2-40B4-BE49-F238E27FC236}">
-                <a16:creationId xmlns:a16="http://schemas.microsoft.com/office/drawing/2014/main" xmlns="" id="{836C9D76-D131-4697-87D2-EAE3576FADB0}"/>
+                <a16:creationId xmlns="" xmlns:a16="http://schemas.microsoft.com/office/drawing/2014/main" id="{836C9D76-D131-4697-87D2-EAE3576FADB0}"/>
               </a:ext>
             </a:extLst>
           </p:cNvPr>
@@ -5891,7 +6035,7 @@
             <p:cNvPr id="16" name="Rectangle: Rounded Corners 15">
               <a:extLst>
                 <a:ext uri="{FF2B5EF4-FFF2-40B4-BE49-F238E27FC236}">
-                  <a16:creationId xmlns:a16="http://schemas.microsoft.com/office/drawing/2014/main" xmlns="" id="{07C25609-83FE-48AD-A91A-9D291B9844E8}"/>
+                  <a16:creationId xmlns="" xmlns:a16="http://schemas.microsoft.com/office/drawing/2014/main" id="{07C25609-83FE-48AD-A91A-9D291B9844E8}"/>
                 </a:ext>
               </a:extLst>
             </p:cNvPr>
@@ -5945,7 +6089,7 @@
             <p:cNvPr id="17" name="Rectangle: Rounded Corners 9">
               <a:extLst>
                 <a:ext uri="{FF2B5EF4-FFF2-40B4-BE49-F238E27FC236}">
-                  <a16:creationId xmlns:a16="http://schemas.microsoft.com/office/drawing/2014/main" xmlns="" id="{1C28D283-4C25-428A-B342-E8B990D73AFB}"/>
+                  <a16:creationId xmlns="" xmlns:a16="http://schemas.microsoft.com/office/drawing/2014/main" id="{1C28D283-4C25-428A-B342-E8B990D73AFB}"/>
                 </a:ext>
               </a:extLst>
             </p:cNvPr>
@@ -6007,7 +6151,7 @@
           <p:cNvPr id="13" name="Group 12">
             <a:extLst>
               <a:ext uri="{FF2B5EF4-FFF2-40B4-BE49-F238E27FC236}">
-                <a16:creationId xmlns:a16="http://schemas.microsoft.com/office/drawing/2014/main" xmlns="" id="{950B76FC-5A2D-4D73-9FA6-A4F0765716C1}"/>
+                <a16:creationId xmlns="" xmlns:a16="http://schemas.microsoft.com/office/drawing/2014/main" id="{950B76FC-5A2D-4D73-9FA6-A4F0765716C1}"/>
               </a:ext>
             </a:extLst>
           </p:cNvPr>
@@ -6033,7 +6177,7 @@
             <p:cNvPr id="14" name="Rectangle: Rounded Corners 13">
               <a:extLst>
                 <a:ext uri="{FF2B5EF4-FFF2-40B4-BE49-F238E27FC236}">
-                  <a16:creationId xmlns:a16="http://schemas.microsoft.com/office/drawing/2014/main" xmlns="" id="{F40D22CD-D3F7-4AA7-A9E4-AB0C7FA72C8C}"/>
+                  <a16:creationId xmlns="" xmlns:a16="http://schemas.microsoft.com/office/drawing/2014/main" id="{F40D22CD-D3F7-4AA7-A9E4-AB0C7FA72C8C}"/>
                 </a:ext>
               </a:extLst>
             </p:cNvPr>
@@ -6087,7 +6231,7 @@
             <p:cNvPr id="15" name="Rectangle: Rounded Corners 11">
               <a:extLst>
                 <a:ext uri="{FF2B5EF4-FFF2-40B4-BE49-F238E27FC236}">
-                  <a16:creationId xmlns:a16="http://schemas.microsoft.com/office/drawing/2014/main" xmlns="" id="{A2368F2E-FBBE-4C6A-BD1D-1811DB8E0402}"/>
+                  <a16:creationId xmlns="" xmlns:a16="http://schemas.microsoft.com/office/drawing/2014/main" id="{A2368F2E-FBBE-4C6A-BD1D-1811DB8E0402}"/>
                 </a:ext>
               </a:extLst>
             </p:cNvPr>
@@ -6149,7 +6293,7 @@
           <p:cNvPr id="3" name="Picture 2">
             <a:extLst>
               <a:ext uri="{FF2B5EF4-FFF2-40B4-BE49-F238E27FC236}">
-                <a16:creationId xmlns:a16="http://schemas.microsoft.com/office/drawing/2014/main" xmlns="" id="{94760CA3-AC51-4954-84AD-413C7C605AAB}"/>
+                <a16:creationId xmlns="" xmlns:a16="http://schemas.microsoft.com/office/drawing/2014/main" id="{94760CA3-AC51-4954-84AD-413C7C605AAB}"/>
               </a:ext>
             </a:extLst>
           </p:cNvPr>
@@ -6216,7 +6360,7 @@
           <p:cNvPr id="4" name="Title 3">
             <a:extLst>
               <a:ext uri="{FF2B5EF4-FFF2-40B4-BE49-F238E27FC236}">
-                <a16:creationId xmlns:a16="http://schemas.microsoft.com/office/drawing/2014/main" xmlns="" id="{380905A8-B705-4037-8A33-724430522F63}"/>
+                <a16:creationId xmlns="" xmlns:a16="http://schemas.microsoft.com/office/drawing/2014/main" id="{380905A8-B705-4037-8A33-724430522F63}"/>
               </a:ext>
             </a:extLst>
           </p:cNvPr>
@@ -6281,7 +6425,7 @@
           <p:cNvPr id="4" name="Title 3">
             <a:extLst>
               <a:ext uri="{FF2B5EF4-FFF2-40B4-BE49-F238E27FC236}">
-                <a16:creationId xmlns:a16="http://schemas.microsoft.com/office/drawing/2014/main" xmlns="" id="{5F661A78-1620-4819-8674-16466DDEA36A}"/>
+                <a16:creationId xmlns="" xmlns:a16="http://schemas.microsoft.com/office/drawing/2014/main" id="{5F661A78-1620-4819-8674-16466DDEA36A}"/>
               </a:ext>
             </a:extLst>
           </p:cNvPr>
@@ -6309,7 +6453,7 @@
           <p:cNvPr id="5" name="Content Placeholder 4">
             <a:extLst>
               <a:ext uri="{FF2B5EF4-FFF2-40B4-BE49-F238E27FC236}">
-                <a16:creationId xmlns:a16="http://schemas.microsoft.com/office/drawing/2014/main" xmlns="" id="{D8951B21-ADD7-4D86-B572-B18845D6A0F7}"/>
+                <a16:creationId xmlns="" xmlns:a16="http://schemas.microsoft.com/office/drawing/2014/main" id="{D8951B21-ADD7-4D86-B572-B18845D6A0F7}"/>
               </a:ext>
             </a:extLst>
           </p:cNvPr>
@@ -6395,7 +6539,7 @@
           <p:cNvPr id="2" name="Title 1">
             <a:extLst>
               <a:ext uri="{FF2B5EF4-FFF2-40B4-BE49-F238E27FC236}">
-                <a16:creationId xmlns:a16="http://schemas.microsoft.com/office/drawing/2014/main" xmlns="" id="{004A5E56-F513-4A94-A58F-4235E160341C}"/>
+                <a16:creationId xmlns="" xmlns:a16="http://schemas.microsoft.com/office/drawing/2014/main" id="{004A5E56-F513-4A94-A58F-4235E160341C}"/>
               </a:ext>
             </a:extLst>
           </p:cNvPr>
@@ -6423,7 +6567,7 @@
           <p:cNvPr id="3" name="Content Placeholder 2">
             <a:extLst>
               <a:ext uri="{FF2B5EF4-FFF2-40B4-BE49-F238E27FC236}">
-                <a16:creationId xmlns:a16="http://schemas.microsoft.com/office/drawing/2014/main" xmlns="" id="{3FAAA951-B22E-4803-A2C0-9CF1E7E33F9E}"/>
+                <a16:creationId xmlns="" xmlns:a16="http://schemas.microsoft.com/office/drawing/2014/main" id="{3FAAA951-B22E-4803-A2C0-9CF1E7E33F9E}"/>
               </a:ext>
             </a:extLst>
           </p:cNvPr>
@@ -6542,7 +6686,7 @@
           <p:cNvPr id="2" name="Title 1">
             <a:extLst>
               <a:ext uri="{FF2B5EF4-FFF2-40B4-BE49-F238E27FC236}">
-                <a16:creationId xmlns:a16="http://schemas.microsoft.com/office/drawing/2014/main" xmlns="" id="{C6E669E2-BE11-4459-8C18-5C4763A43502}"/>
+                <a16:creationId xmlns="" xmlns:a16="http://schemas.microsoft.com/office/drawing/2014/main" id="{C6E669E2-BE11-4459-8C18-5C4763A43502}"/>
               </a:ext>
             </a:extLst>
           </p:cNvPr>
@@ -6570,7 +6714,7 @@
           <p:cNvPr id="3" name="Content Placeholder 2">
             <a:extLst>
               <a:ext uri="{FF2B5EF4-FFF2-40B4-BE49-F238E27FC236}">
-                <a16:creationId xmlns:a16="http://schemas.microsoft.com/office/drawing/2014/main" xmlns="" id="{04E0A162-6297-49FF-BA4C-61E31142ED8B}"/>
+                <a16:creationId xmlns="" xmlns:a16="http://schemas.microsoft.com/office/drawing/2014/main" id="{04E0A162-6297-49FF-BA4C-61E31142ED8B}"/>
               </a:ext>
             </a:extLst>
           </p:cNvPr>
@@ -6658,7 +6802,7 @@
           <p:cNvPr id="2" name="Title 1">
             <a:extLst>
               <a:ext uri="{FF2B5EF4-FFF2-40B4-BE49-F238E27FC236}">
-                <a16:creationId xmlns:a16="http://schemas.microsoft.com/office/drawing/2014/main" xmlns="" id="{BAD95756-30F2-4F38-B406-1C6C78CB70D0}"/>
+                <a16:creationId xmlns="" xmlns:a16="http://schemas.microsoft.com/office/drawing/2014/main" id="{BAD95756-30F2-4F38-B406-1C6C78CB70D0}"/>
               </a:ext>
             </a:extLst>
           </p:cNvPr>
@@ -6686,7 +6830,7 @@
           <p:cNvPr id="3" name="Content Placeholder 2">
             <a:extLst>
               <a:ext uri="{FF2B5EF4-FFF2-40B4-BE49-F238E27FC236}">
-                <a16:creationId xmlns:a16="http://schemas.microsoft.com/office/drawing/2014/main" xmlns="" id="{FC80F034-E016-44D5-B815-A5E0F3FD05FE}"/>
+                <a16:creationId xmlns="" xmlns:a16="http://schemas.microsoft.com/office/drawing/2014/main" id="{FC80F034-E016-44D5-B815-A5E0F3FD05FE}"/>
               </a:ext>
             </a:extLst>
           </p:cNvPr>
@@ -6741,7 +6885,7 @@
           <p:cNvPr id="4" name="Picture 3">
             <a:extLst>
               <a:ext uri="{FF2B5EF4-FFF2-40B4-BE49-F238E27FC236}">
-                <a16:creationId xmlns:a16="http://schemas.microsoft.com/office/drawing/2014/main" xmlns="" id="{98A35C8F-A351-43A9-9D73-DA5810CA9FAE}"/>
+                <a16:creationId xmlns="" xmlns:a16="http://schemas.microsoft.com/office/drawing/2014/main" id="{98A35C8F-A351-43A9-9D73-DA5810CA9FAE}"/>
               </a:ext>
             </a:extLst>
           </p:cNvPr>
@@ -6808,7 +6952,7 @@
           <p:cNvPr id="4" name="Title 3">
             <a:extLst>
               <a:ext uri="{FF2B5EF4-FFF2-40B4-BE49-F238E27FC236}">
-                <a16:creationId xmlns:a16="http://schemas.microsoft.com/office/drawing/2014/main" xmlns="" id="{242D3F1F-5602-49F4-A125-78B334E5873C}"/>
+                <a16:creationId xmlns="" xmlns:a16="http://schemas.microsoft.com/office/drawing/2014/main" id="{242D3F1F-5602-49F4-A125-78B334E5873C}"/>
               </a:ext>
             </a:extLst>
           </p:cNvPr>
@@ -6837,7 +6981,7 @@
           <p:cNvPr id="5" name="Content Placeholder 4">
             <a:extLst>
               <a:ext uri="{FF2B5EF4-FFF2-40B4-BE49-F238E27FC236}">
-                <a16:creationId xmlns:a16="http://schemas.microsoft.com/office/drawing/2014/main" xmlns="" id="{C13B6473-AA5C-4554-9024-49310ACBC255}"/>
+                <a16:creationId xmlns="" xmlns:a16="http://schemas.microsoft.com/office/drawing/2014/main" id="{C13B6473-AA5C-4554-9024-49310ACBC255}"/>
               </a:ext>
             </a:extLst>
           </p:cNvPr>
@@ -6860,7 +7004,11 @@
           <a:p>
             <a:r>
               <a:rPr lang="en-GB" dirty="0" smtClean="0"/>
-              <a:t>CTO, Ukuvuma Solutions and Agilit-e</a:t>
+              <a:t>CTO, </a:t>
+            </a:r>
+            <a:r>
+              <a:rPr lang="en-GB" dirty="0" smtClean="0"/>
+              <a:t>Agilit-e</a:t>
             </a:r>
             <a:endParaRPr lang="en-GB" dirty="0"/>
           </a:p>
@@ -6874,11 +7022,7 @@
           <a:p>
             <a:r>
               <a:rPr lang="en-GB" dirty="0" smtClean="0"/>
-              <a:t>@</a:t>
-            </a:r>
-            <a:r>
-              <a:rPr lang="en-GB" dirty="0" smtClean="0"/>
-              <a:t>JohnJardinCodes</a:t>
+              <a:t>@JohnJardinCodes</a:t>
             </a:r>
           </a:p>
         </p:txBody>
@@ -6888,7 +7032,7 @@
           <p:cNvPr id="9" name="Arrow: Right 8">
             <a:extLst>
               <a:ext uri="{FF2B5EF4-FFF2-40B4-BE49-F238E27FC236}">
-                <a16:creationId xmlns:a16="http://schemas.microsoft.com/office/drawing/2014/main" xmlns="" id="{9D07E98F-A5EC-4BA5-B706-FA5F0ED79C9A}"/>
+                <a16:creationId xmlns="" xmlns:a16="http://schemas.microsoft.com/office/drawing/2014/main" id="{9D07E98F-A5EC-4BA5-B706-FA5F0ED79C9A}"/>
               </a:ext>
             </a:extLst>
           </p:cNvPr>
@@ -6958,7 +7102,7 @@
           <p:cNvPr id="10" name="Group 9">
             <a:extLst>
               <a:ext uri="{FF2B5EF4-FFF2-40B4-BE49-F238E27FC236}">
-                <a16:creationId xmlns:a16="http://schemas.microsoft.com/office/drawing/2014/main" xmlns="" id="{AF0A7D2A-1ED2-4864-A5F4-0D140FB92B9B}"/>
+                <a16:creationId xmlns="" xmlns:a16="http://schemas.microsoft.com/office/drawing/2014/main" id="{AF0A7D2A-1ED2-4864-A5F4-0D140FB92B9B}"/>
               </a:ext>
             </a:extLst>
           </p:cNvPr>
@@ -6984,7 +7128,7 @@
             <p:cNvPr id="20" name="Rectangle: Rounded Corners 19">
               <a:extLst>
                 <a:ext uri="{FF2B5EF4-FFF2-40B4-BE49-F238E27FC236}">
-                  <a16:creationId xmlns:a16="http://schemas.microsoft.com/office/drawing/2014/main" xmlns="" id="{42194522-2AE0-45FA-94D1-5C3A1A519BCC}"/>
+                  <a16:creationId xmlns="" xmlns:a16="http://schemas.microsoft.com/office/drawing/2014/main" id="{42194522-2AE0-45FA-94D1-5C3A1A519BCC}"/>
                 </a:ext>
               </a:extLst>
             </p:cNvPr>
@@ -7038,7 +7182,7 @@
             <p:cNvPr id="21" name="Rectangle: Rounded Corners 5">
               <a:extLst>
                 <a:ext uri="{FF2B5EF4-FFF2-40B4-BE49-F238E27FC236}">
-                  <a16:creationId xmlns:a16="http://schemas.microsoft.com/office/drawing/2014/main" xmlns="" id="{861A16B5-D4B4-4670-A45F-34D508101688}"/>
+                  <a16:creationId xmlns="" xmlns:a16="http://schemas.microsoft.com/office/drawing/2014/main" id="{861A16B5-D4B4-4670-A45F-34D508101688}"/>
                 </a:ext>
               </a:extLst>
             </p:cNvPr>
@@ -7101,7 +7245,7 @@
           <p:cNvPr id="11" name="Group 10">
             <a:extLst>
               <a:ext uri="{FF2B5EF4-FFF2-40B4-BE49-F238E27FC236}">
-                <a16:creationId xmlns:a16="http://schemas.microsoft.com/office/drawing/2014/main" xmlns="" id="{CBB29DE9-20E8-453E-8816-D198CD4251AF}"/>
+                <a16:creationId xmlns="" xmlns:a16="http://schemas.microsoft.com/office/drawing/2014/main" id="{CBB29DE9-20E8-453E-8816-D198CD4251AF}"/>
               </a:ext>
             </a:extLst>
           </p:cNvPr>
@@ -7127,7 +7271,7 @@
             <p:cNvPr id="18" name="Rectangle: Rounded Corners 17">
               <a:extLst>
                 <a:ext uri="{FF2B5EF4-FFF2-40B4-BE49-F238E27FC236}">
-                  <a16:creationId xmlns:a16="http://schemas.microsoft.com/office/drawing/2014/main" xmlns="" id="{C417FA2E-811C-440B-B6DE-DDE93137815A}"/>
+                  <a16:creationId xmlns="" xmlns:a16="http://schemas.microsoft.com/office/drawing/2014/main" id="{C417FA2E-811C-440B-B6DE-DDE93137815A}"/>
                 </a:ext>
               </a:extLst>
             </p:cNvPr>
@@ -7181,7 +7325,7 @@
             <p:cNvPr id="19" name="Rectangle: Rounded Corners 7">
               <a:extLst>
                 <a:ext uri="{FF2B5EF4-FFF2-40B4-BE49-F238E27FC236}">
-                  <a16:creationId xmlns:a16="http://schemas.microsoft.com/office/drawing/2014/main" xmlns="" id="{110F1258-6F73-42E9-B344-03EE53497FAB}"/>
+                  <a16:creationId xmlns="" xmlns:a16="http://schemas.microsoft.com/office/drawing/2014/main" id="{110F1258-6F73-42E9-B344-03EE53497FAB}"/>
                 </a:ext>
               </a:extLst>
             </p:cNvPr>
@@ -7247,7 +7391,7 @@
           <p:cNvPr id="12" name="Group 11">
             <a:extLst>
               <a:ext uri="{FF2B5EF4-FFF2-40B4-BE49-F238E27FC236}">
-                <a16:creationId xmlns:a16="http://schemas.microsoft.com/office/drawing/2014/main" xmlns="" id="{836C9D76-D131-4697-87D2-EAE3576FADB0}"/>
+                <a16:creationId xmlns="" xmlns:a16="http://schemas.microsoft.com/office/drawing/2014/main" id="{836C9D76-D131-4697-87D2-EAE3576FADB0}"/>
               </a:ext>
             </a:extLst>
           </p:cNvPr>
@@ -7273,7 +7417,7 @@
             <p:cNvPr id="16" name="Rectangle: Rounded Corners 15">
               <a:extLst>
                 <a:ext uri="{FF2B5EF4-FFF2-40B4-BE49-F238E27FC236}">
-                  <a16:creationId xmlns:a16="http://schemas.microsoft.com/office/drawing/2014/main" xmlns="" id="{07C25609-83FE-48AD-A91A-9D291B9844E8}"/>
+                  <a16:creationId xmlns="" xmlns:a16="http://schemas.microsoft.com/office/drawing/2014/main" id="{07C25609-83FE-48AD-A91A-9D291B9844E8}"/>
                 </a:ext>
               </a:extLst>
             </p:cNvPr>
@@ -7327,7 +7471,7 @@
             <p:cNvPr id="17" name="Rectangle: Rounded Corners 9">
               <a:extLst>
                 <a:ext uri="{FF2B5EF4-FFF2-40B4-BE49-F238E27FC236}">
-                  <a16:creationId xmlns:a16="http://schemas.microsoft.com/office/drawing/2014/main" xmlns="" id="{1C28D283-4C25-428A-B342-E8B990D73AFB}"/>
+                  <a16:creationId xmlns="" xmlns:a16="http://schemas.microsoft.com/office/drawing/2014/main" id="{1C28D283-4C25-428A-B342-E8B990D73AFB}"/>
                 </a:ext>
               </a:extLst>
             </p:cNvPr>
@@ -7390,7 +7534,7 @@
           <p:cNvPr id="13" name="Group 12">
             <a:extLst>
               <a:ext uri="{FF2B5EF4-FFF2-40B4-BE49-F238E27FC236}">
-                <a16:creationId xmlns:a16="http://schemas.microsoft.com/office/drawing/2014/main" xmlns="" id="{950B76FC-5A2D-4D73-9FA6-A4F0765716C1}"/>
+                <a16:creationId xmlns="" xmlns:a16="http://schemas.microsoft.com/office/drawing/2014/main" id="{950B76FC-5A2D-4D73-9FA6-A4F0765716C1}"/>
               </a:ext>
             </a:extLst>
           </p:cNvPr>
@@ -7416,7 +7560,7 @@
             <p:cNvPr id="14" name="Rectangle: Rounded Corners 13">
               <a:extLst>
                 <a:ext uri="{FF2B5EF4-FFF2-40B4-BE49-F238E27FC236}">
-                  <a16:creationId xmlns:a16="http://schemas.microsoft.com/office/drawing/2014/main" xmlns="" id="{F40D22CD-D3F7-4AA7-A9E4-AB0C7FA72C8C}"/>
+                  <a16:creationId xmlns="" xmlns:a16="http://schemas.microsoft.com/office/drawing/2014/main" id="{F40D22CD-D3F7-4AA7-A9E4-AB0C7FA72C8C}"/>
                 </a:ext>
               </a:extLst>
             </p:cNvPr>
@@ -7470,7 +7614,7 @@
             <p:cNvPr id="15" name="Rectangle: Rounded Corners 11">
               <a:extLst>
                 <a:ext uri="{FF2B5EF4-FFF2-40B4-BE49-F238E27FC236}">
-                  <a16:creationId xmlns:a16="http://schemas.microsoft.com/office/drawing/2014/main" xmlns="" id="{A2368F2E-FBBE-4C6A-BD1D-1811DB8E0402}"/>
+                  <a16:creationId xmlns="" xmlns:a16="http://schemas.microsoft.com/office/drawing/2014/main" id="{A2368F2E-FBBE-4C6A-BD1D-1811DB8E0402}"/>
                 </a:ext>
               </a:extLst>
             </p:cNvPr>
@@ -7624,7 +7768,7 @@
           <p:cNvPr id="2" name="Title 1">
             <a:extLst>
               <a:ext uri="{FF2B5EF4-FFF2-40B4-BE49-F238E27FC236}">
-                <a16:creationId xmlns:a16="http://schemas.microsoft.com/office/drawing/2014/main" xmlns="" id="{A09F69C7-34E6-46C1-A796-5324FEEDDB23}"/>
+                <a16:creationId xmlns="" xmlns:a16="http://schemas.microsoft.com/office/drawing/2014/main" id="{A09F69C7-34E6-46C1-A796-5324FEEDDB23}"/>
               </a:ext>
             </a:extLst>
           </p:cNvPr>
@@ -7652,7 +7796,7 @@
           <p:cNvPr id="3" name="Content Placeholder 2">
             <a:extLst>
               <a:ext uri="{FF2B5EF4-FFF2-40B4-BE49-F238E27FC236}">
-                <a16:creationId xmlns:a16="http://schemas.microsoft.com/office/drawing/2014/main" xmlns="" id="{34A64C34-4AE8-4780-98A0-96EAF2F11DE7}"/>
+                <a16:creationId xmlns="" xmlns:a16="http://schemas.microsoft.com/office/drawing/2014/main" id="{34A64C34-4AE8-4780-98A0-96EAF2F11DE7}"/>
               </a:ext>
             </a:extLst>
           </p:cNvPr>
@@ -7767,7 +7911,7 @@
           <p:cNvPr id="4" name="Title 3">
             <a:extLst>
               <a:ext uri="{FF2B5EF4-FFF2-40B4-BE49-F238E27FC236}">
-                <a16:creationId xmlns:a16="http://schemas.microsoft.com/office/drawing/2014/main" xmlns="" id="{D691CD7C-405A-4343-A99A-F7317A35A1A1}"/>
+                <a16:creationId xmlns="" xmlns:a16="http://schemas.microsoft.com/office/drawing/2014/main" id="{D691CD7C-405A-4343-A99A-F7317A35A1A1}"/>
               </a:ext>
             </a:extLst>
           </p:cNvPr>
@@ -7832,7 +7976,7 @@
           <p:cNvPr id="2" name="Title 1">
             <a:extLst>
               <a:ext uri="{FF2B5EF4-FFF2-40B4-BE49-F238E27FC236}">
-                <a16:creationId xmlns:a16="http://schemas.microsoft.com/office/drawing/2014/main" xmlns="" id="{E1DDDE7C-1B23-4060-B7B2-FCFE31AB72AB}"/>
+                <a16:creationId xmlns="" xmlns:a16="http://schemas.microsoft.com/office/drawing/2014/main" id="{E1DDDE7C-1B23-4060-B7B2-FCFE31AB72AB}"/>
               </a:ext>
             </a:extLst>
           </p:cNvPr>
@@ -7860,7 +8004,7 @@
           <p:cNvPr id="3" name="Content Placeholder 2">
             <a:extLst>
               <a:ext uri="{FF2B5EF4-FFF2-40B4-BE49-F238E27FC236}">
-                <a16:creationId xmlns:a16="http://schemas.microsoft.com/office/drawing/2014/main" xmlns="" id="{3BA306DB-D732-4579-8793-4C543104252D}"/>
+                <a16:creationId xmlns="" xmlns:a16="http://schemas.microsoft.com/office/drawing/2014/main" id="{3BA306DB-D732-4579-8793-4C543104252D}"/>
               </a:ext>
             </a:extLst>
           </p:cNvPr>
@@ -7984,7 +8128,7 @@
           <p:cNvPr id="2" name="Title 1">
             <a:extLst>
               <a:ext uri="{FF2B5EF4-FFF2-40B4-BE49-F238E27FC236}">
-                <a16:creationId xmlns:a16="http://schemas.microsoft.com/office/drawing/2014/main" xmlns="" id="{54E323D5-60FE-441D-93FC-A4A17CCDB230}"/>
+                <a16:creationId xmlns="" xmlns:a16="http://schemas.microsoft.com/office/drawing/2014/main" id="{54E323D5-60FE-441D-93FC-A4A17CCDB230}"/>
               </a:ext>
             </a:extLst>
           </p:cNvPr>
@@ -8015,7 +8159,7 @@
           <p:cNvPr id="3" name="Content Placeholder 2">
             <a:extLst>
               <a:ext uri="{FF2B5EF4-FFF2-40B4-BE49-F238E27FC236}">
-                <a16:creationId xmlns:a16="http://schemas.microsoft.com/office/drawing/2014/main" xmlns="" id="{488741F8-A1AA-4D80-A45A-3154A7B10A7B}"/>
+                <a16:creationId xmlns="" xmlns:a16="http://schemas.microsoft.com/office/drawing/2014/main" id="{488741F8-A1AA-4D80-A45A-3154A7B10A7B}"/>
               </a:ext>
             </a:extLst>
           </p:cNvPr>
@@ -8142,7 +8286,7 @@
           <p:cNvPr id="2" name="Title 1">
             <a:extLst>
               <a:ext uri="{FF2B5EF4-FFF2-40B4-BE49-F238E27FC236}">
-                <a16:creationId xmlns:a16="http://schemas.microsoft.com/office/drawing/2014/main" xmlns="" id="{E50706F6-B240-469D-9907-F8E98ECB792C}"/>
+                <a16:creationId xmlns="" xmlns:a16="http://schemas.microsoft.com/office/drawing/2014/main" id="{E50706F6-B240-469D-9907-F8E98ECB792C}"/>
               </a:ext>
             </a:extLst>
           </p:cNvPr>
@@ -8170,7 +8314,7 @@
           <p:cNvPr id="3" name="Content Placeholder 2">
             <a:extLst>
               <a:ext uri="{FF2B5EF4-FFF2-40B4-BE49-F238E27FC236}">
-                <a16:creationId xmlns:a16="http://schemas.microsoft.com/office/drawing/2014/main" xmlns="" id="{82E6E5A4-30F9-4680-9CE7-B82002E233A9}"/>
+                <a16:creationId xmlns="" xmlns:a16="http://schemas.microsoft.com/office/drawing/2014/main" id="{82E6E5A4-30F9-4680-9CE7-B82002E233A9}"/>
               </a:ext>
             </a:extLst>
           </p:cNvPr>
@@ -8292,7 +8436,7 @@
           <p:cNvPr id="2" name="Title 1">
             <a:extLst>
               <a:ext uri="{FF2B5EF4-FFF2-40B4-BE49-F238E27FC236}">
-                <a16:creationId xmlns:a16="http://schemas.microsoft.com/office/drawing/2014/main" xmlns="" id="{95C7771E-874B-4266-989A-A1D42B4A6FBD}"/>
+                <a16:creationId xmlns="" xmlns:a16="http://schemas.microsoft.com/office/drawing/2014/main" id="{95C7771E-874B-4266-989A-A1D42B4A6FBD}"/>
               </a:ext>
             </a:extLst>
           </p:cNvPr>
@@ -8358,7 +8502,7 @@
           <p:cNvPr id="3" name="Content Placeholder 2">
             <a:extLst>
               <a:ext uri="{FF2B5EF4-FFF2-40B4-BE49-F238E27FC236}">
-                <a16:creationId xmlns:a16="http://schemas.microsoft.com/office/drawing/2014/main" xmlns="" id="{56D320B4-4B47-4331-8696-978083ABB006}"/>
+                <a16:creationId xmlns="" xmlns:a16="http://schemas.microsoft.com/office/drawing/2014/main" id="{56D320B4-4B47-4331-8696-978083ABB006}"/>
               </a:ext>
             </a:extLst>
           </p:cNvPr>

</xml_diff>

<commit_message>
Minor updates based on Skype Call
</commit_message>
<xml_diff>
--- a/presentation/8598 Domino and JS.pptx
+++ b/presentation/8598 Domino and JS.pptx
@@ -5,10 +5,10 @@
     <p:sldMasterId id="2147483870" r:id="rId1"/>
   </p:sldMasterIdLst>
   <p:notesMasterIdLst>
-    <p:notesMasterId r:id="rId26"/>
+    <p:notesMasterId r:id="rId27"/>
   </p:notesMasterIdLst>
   <p:handoutMasterIdLst>
-    <p:handoutMasterId r:id="rId27"/>
+    <p:handoutMasterId r:id="rId28"/>
   </p:handoutMasterIdLst>
   <p:sldIdLst>
     <p:sldId id="256" r:id="rId2"/>
@@ -28,13 +28,14 @@
     <p:sldId id="268" r:id="rId16"/>
     <p:sldId id="269" r:id="rId17"/>
     <p:sldId id="270" r:id="rId18"/>
-    <p:sldId id="265" r:id="rId19"/>
-    <p:sldId id="266" r:id="rId20"/>
-    <p:sldId id="274" r:id="rId21"/>
-    <p:sldId id="275" r:id="rId22"/>
-    <p:sldId id="276" r:id="rId23"/>
-    <p:sldId id="277" r:id="rId24"/>
-    <p:sldId id="278" r:id="rId25"/>
+    <p:sldId id="266" r:id="rId19"/>
+    <p:sldId id="265" r:id="rId20"/>
+    <p:sldId id="281" r:id="rId21"/>
+    <p:sldId id="274" r:id="rId22"/>
+    <p:sldId id="275" r:id="rId23"/>
+    <p:sldId id="276" r:id="rId24"/>
+    <p:sldId id="277" r:id="rId25"/>
+    <p:sldId id="278" r:id="rId26"/>
   </p:sldIdLst>
   <p:sldSz cx="12192000" cy="6858000"/>
   <p:notesSz cx="6858000" cy="9144000"/>
@@ -182,7 +183,7 @@
           <p:cNvPr id="2" name="Header Placeholder 1">
             <a:extLst>
               <a:ext uri="{FF2B5EF4-FFF2-40B4-BE49-F238E27FC236}">
-                <a16:creationId xmlns="" xmlns:a16="http://schemas.microsoft.com/office/drawing/2014/main" id="{BB178A4F-544B-43AC-BD15-7B2CEA5C04AA}"/>
+                <a16:creationId xmlns:a16="http://schemas.microsoft.com/office/drawing/2014/main" xmlns="" id="{BB178A4F-544B-43AC-BD15-7B2CEA5C04AA}"/>
               </a:ext>
             </a:extLst>
           </p:cNvPr>
@@ -219,7 +220,7 @@
           <p:cNvPr id="3" name="Date Placeholder 2">
             <a:extLst>
               <a:ext uri="{FF2B5EF4-FFF2-40B4-BE49-F238E27FC236}">
-                <a16:creationId xmlns="" xmlns:a16="http://schemas.microsoft.com/office/drawing/2014/main" id="{624BA4BC-130D-4F1D-9EA5-9BBC4F794AEE}"/>
+                <a16:creationId xmlns:a16="http://schemas.microsoft.com/office/drawing/2014/main" xmlns="" id="{624BA4BC-130D-4F1D-9EA5-9BBC4F794AEE}"/>
               </a:ext>
             </a:extLst>
           </p:cNvPr>
@@ -260,7 +261,7 @@
           <p:cNvPr id="4" name="Footer Placeholder 3">
             <a:extLst>
               <a:ext uri="{FF2B5EF4-FFF2-40B4-BE49-F238E27FC236}">
-                <a16:creationId xmlns="" xmlns:a16="http://schemas.microsoft.com/office/drawing/2014/main" id="{FD7B5433-BC26-406D-9018-BBA13894431D}"/>
+                <a16:creationId xmlns:a16="http://schemas.microsoft.com/office/drawing/2014/main" xmlns="" id="{FD7B5433-BC26-406D-9018-BBA13894431D}"/>
               </a:ext>
             </a:extLst>
           </p:cNvPr>
@@ -297,7 +298,7 @@
           <p:cNvPr id="5" name="Slide Number Placeholder 4">
             <a:extLst>
               <a:ext uri="{FF2B5EF4-FFF2-40B4-BE49-F238E27FC236}">
-                <a16:creationId xmlns="" xmlns:a16="http://schemas.microsoft.com/office/drawing/2014/main" id="{3D83B6B0-F723-4CC7-BE1F-88AD9F01DE11}"/>
+                <a16:creationId xmlns:a16="http://schemas.microsoft.com/office/drawing/2014/main" xmlns="" id="{3D83B6B0-F723-4CC7-BE1F-88AD9F01DE11}"/>
               </a:ext>
             </a:extLst>
           </p:cNvPr>
@@ -926,6 +927,90 @@
           <a:p>
             <a:fld id="{7F3C5AE6-245A-4892-87E4-2DDCA6560455}" type="slidenum">
               <a:rPr lang="en-US" smtClean="0"/>
+              <a:t>4</a:t>
+            </a:fld>
+            <a:endParaRPr lang="en-US"/>
+          </a:p>
+        </p:txBody>
+      </p:sp>
+    </p:spTree>
+    <p:extLst>
+      <p:ext uri="{BB962C8B-B14F-4D97-AF65-F5344CB8AC3E}">
+        <p14:creationId xmlns:p14="http://schemas.microsoft.com/office/powerpoint/2010/main" val="1640514469"/>
+      </p:ext>
+    </p:extLst>
+  </p:cSld>
+  <p:clrMapOvr>
+    <a:masterClrMapping/>
+  </p:clrMapOvr>
+</p:notes>
+</file>
+
+<file path=ppt/notesSlides/notesSlide4.xml><?xml version="1.0" encoding="utf-8"?>
+<p:notes xmlns:a="http://schemas.openxmlformats.org/drawingml/2006/main" xmlns:r="http://schemas.openxmlformats.org/officeDocument/2006/relationships" xmlns:p="http://schemas.openxmlformats.org/presentationml/2006/main">
+  <p:cSld>
+    <p:spTree>
+      <p:nvGrpSpPr>
+        <p:cNvPr id="1" name=""/>
+        <p:cNvGrpSpPr/>
+        <p:nvPr/>
+      </p:nvGrpSpPr>
+      <p:grpSpPr>
+        <a:xfrm>
+          <a:off x="0" y="0"/>
+          <a:ext cx="0" cy="0"/>
+          <a:chOff x="0" y="0"/>
+          <a:chExt cx="0" cy="0"/>
+        </a:xfrm>
+      </p:grpSpPr>
+      <p:sp>
+        <p:nvSpPr>
+          <p:cNvPr id="2" name="Slide Image Placeholder 1"/>
+          <p:cNvSpPr>
+            <a:spLocks noGrp="1" noRot="1" noChangeAspect="1"/>
+          </p:cNvSpPr>
+          <p:nvPr>
+            <p:ph type="sldImg"/>
+          </p:nvPr>
+        </p:nvSpPr>
+        <p:spPr/>
+      </p:sp>
+      <p:sp>
+        <p:nvSpPr>
+          <p:cNvPr id="3" name="Notes Placeholder 2"/>
+          <p:cNvSpPr>
+            <a:spLocks noGrp="1"/>
+          </p:cNvSpPr>
+          <p:nvPr>
+            <p:ph type="body" idx="1"/>
+          </p:nvPr>
+        </p:nvSpPr>
+        <p:spPr/>
+        <p:txBody>
+          <a:bodyPr/>
+          <a:lstStyle/>
+          <a:p>
+            <a:endParaRPr lang="en-US" dirty="0"/>
+          </a:p>
+        </p:txBody>
+      </p:sp>
+      <p:sp>
+        <p:nvSpPr>
+          <p:cNvPr id="4" name="Slide Number Placeholder 3"/>
+          <p:cNvSpPr>
+            <a:spLocks noGrp="1"/>
+          </p:cNvSpPr>
+          <p:nvPr>
+            <p:ph type="sldNum" sz="quarter" idx="10"/>
+          </p:nvPr>
+        </p:nvSpPr>
+        <p:spPr/>
+        <p:txBody>
+          <a:bodyPr/>
+          <a:lstStyle/>
+          <a:p>
+            <a:fld id="{7F3C5AE6-245A-4892-87E4-2DDCA6560455}" type="slidenum">
+              <a:rPr lang="en-US" smtClean="0"/>
               <a:t>6</a:t>
             </a:fld>
             <a:endParaRPr lang="en-US"/>
@@ -936,6 +1021,258 @@
     <p:extLst>
       <p:ext uri="{BB962C8B-B14F-4D97-AF65-F5344CB8AC3E}">
         <p14:creationId xmlns:p14="http://schemas.microsoft.com/office/powerpoint/2010/main" val="959733305"/>
+      </p:ext>
+    </p:extLst>
+  </p:cSld>
+  <p:clrMapOvr>
+    <a:masterClrMapping/>
+  </p:clrMapOvr>
+</p:notes>
+</file>
+
+<file path=ppt/notesSlides/notesSlide5.xml><?xml version="1.0" encoding="utf-8"?>
+<p:notes xmlns:a="http://schemas.openxmlformats.org/drawingml/2006/main" xmlns:r="http://schemas.openxmlformats.org/officeDocument/2006/relationships" xmlns:p="http://schemas.openxmlformats.org/presentationml/2006/main">
+  <p:cSld>
+    <p:spTree>
+      <p:nvGrpSpPr>
+        <p:cNvPr id="1" name=""/>
+        <p:cNvGrpSpPr/>
+        <p:nvPr/>
+      </p:nvGrpSpPr>
+      <p:grpSpPr>
+        <a:xfrm>
+          <a:off x="0" y="0"/>
+          <a:ext cx="0" cy="0"/>
+          <a:chOff x="0" y="0"/>
+          <a:chExt cx="0" cy="0"/>
+        </a:xfrm>
+      </p:grpSpPr>
+      <p:sp>
+        <p:nvSpPr>
+          <p:cNvPr id="2" name="Slide Image Placeholder 1"/>
+          <p:cNvSpPr>
+            <a:spLocks noGrp="1" noRot="1" noChangeAspect="1"/>
+          </p:cNvSpPr>
+          <p:nvPr>
+            <p:ph type="sldImg"/>
+          </p:nvPr>
+        </p:nvSpPr>
+        <p:spPr/>
+      </p:sp>
+      <p:sp>
+        <p:nvSpPr>
+          <p:cNvPr id="3" name="Notes Placeholder 2"/>
+          <p:cNvSpPr>
+            <a:spLocks noGrp="1"/>
+          </p:cNvSpPr>
+          <p:nvPr>
+            <p:ph type="body" idx="1"/>
+          </p:nvPr>
+        </p:nvSpPr>
+        <p:spPr/>
+        <p:txBody>
+          <a:bodyPr/>
+          <a:lstStyle/>
+          <a:p>
+            <a:endParaRPr lang="en-US" dirty="0"/>
+          </a:p>
+        </p:txBody>
+      </p:sp>
+      <p:sp>
+        <p:nvSpPr>
+          <p:cNvPr id="4" name="Slide Number Placeholder 3"/>
+          <p:cNvSpPr>
+            <a:spLocks noGrp="1"/>
+          </p:cNvSpPr>
+          <p:nvPr>
+            <p:ph type="sldNum" sz="quarter" idx="10"/>
+          </p:nvPr>
+        </p:nvSpPr>
+        <p:spPr/>
+        <p:txBody>
+          <a:bodyPr/>
+          <a:lstStyle/>
+          <a:p>
+            <a:fld id="{7F3C5AE6-245A-4892-87E4-2DDCA6560455}" type="slidenum">
+              <a:rPr lang="en-US" smtClean="0"/>
+              <a:t>8</a:t>
+            </a:fld>
+            <a:endParaRPr lang="en-US"/>
+          </a:p>
+        </p:txBody>
+      </p:sp>
+    </p:spTree>
+    <p:extLst>
+      <p:ext uri="{BB962C8B-B14F-4D97-AF65-F5344CB8AC3E}">
+        <p14:creationId xmlns:p14="http://schemas.microsoft.com/office/powerpoint/2010/main" val="775677643"/>
+      </p:ext>
+    </p:extLst>
+  </p:cSld>
+  <p:clrMapOvr>
+    <a:masterClrMapping/>
+  </p:clrMapOvr>
+</p:notes>
+</file>
+
+<file path=ppt/notesSlides/notesSlide6.xml><?xml version="1.0" encoding="utf-8"?>
+<p:notes xmlns:a="http://schemas.openxmlformats.org/drawingml/2006/main" xmlns:r="http://schemas.openxmlformats.org/officeDocument/2006/relationships" xmlns:p="http://schemas.openxmlformats.org/presentationml/2006/main">
+  <p:cSld>
+    <p:spTree>
+      <p:nvGrpSpPr>
+        <p:cNvPr id="1" name=""/>
+        <p:cNvGrpSpPr/>
+        <p:nvPr/>
+      </p:nvGrpSpPr>
+      <p:grpSpPr>
+        <a:xfrm>
+          <a:off x="0" y="0"/>
+          <a:ext cx="0" cy="0"/>
+          <a:chOff x="0" y="0"/>
+          <a:chExt cx="0" cy="0"/>
+        </a:xfrm>
+      </p:grpSpPr>
+      <p:sp>
+        <p:nvSpPr>
+          <p:cNvPr id="2" name="Slide Image Placeholder 1"/>
+          <p:cNvSpPr>
+            <a:spLocks noGrp="1" noRot="1" noChangeAspect="1"/>
+          </p:cNvSpPr>
+          <p:nvPr>
+            <p:ph type="sldImg"/>
+          </p:nvPr>
+        </p:nvSpPr>
+        <p:spPr/>
+      </p:sp>
+      <p:sp>
+        <p:nvSpPr>
+          <p:cNvPr id="3" name="Notes Placeholder 2"/>
+          <p:cNvSpPr>
+            <a:spLocks noGrp="1"/>
+          </p:cNvSpPr>
+          <p:nvPr>
+            <p:ph type="body" idx="1"/>
+          </p:nvPr>
+        </p:nvSpPr>
+        <p:spPr/>
+        <p:txBody>
+          <a:bodyPr/>
+          <a:lstStyle/>
+          <a:p>
+            <a:endParaRPr lang="en-US" dirty="0"/>
+          </a:p>
+        </p:txBody>
+      </p:sp>
+      <p:sp>
+        <p:nvSpPr>
+          <p:cNvPr id="4" name="Slide Number Placeholder 3"/>
+          <p:cNvSpPr>
+            <a:spLocks noGrp="1"/>
+          </p:cNvSpPr>
+          <p:nvPr>
+            <p:ph type="sldNum" sz="quarter" idx="10"/>
+          </p:nvPr>
+        </p:nvSpPr>
+        <p:spPr/>
+        <p:txBody>
+          <a:bodyPr/>
+          <a:lstStyle/>
+          <a:p>
+            <a:fld id="{7F3C5AE6-245A-4892-87E4-2DDCA6560455}" type="slidenum">
+              <a:rPr lang="en-US" smtClean="0"/>
+              <a:t>23</a:t>
+            </a:fld>
+            <a:endParaRPr lang="en-US"/>
+          </a:p>
+        </p:txBody>
+      </p:sp>
+    </p:spTree>
+    <p:extLst>
+      <p:ext uri="{BB962C8B-B14F-4D97-AF65-F5344CB8AC3E}">
+        <p14:creationId xmlns:p14="http://schemas.microsoft.com/office/powerpoint/2010/main" val="1190420200"/>
+      </p:ext>
+    </p:extLst>
+  </p:cSld>
+  <p:clrMapOvr>
+    <a:masterClrMapping/>
+  </p:clrMapOvr>
+</p:notes>
+</file>
+
+<file path=ppt/notesSlides/notesSlide7.xml><?xml version="1.0" encoding="utf-8"?>
+<p:notes xmlns:a="http://schemas.openxmlformats.org/drawingml/2006/main" xmlns:r="http://schemas.openxmlformats.org/officeDocument/2006/relationships" xmlns:p="http://schemas.openxmlformats.org/presentationml/2006/main">
+  <p:cSld>
+    <p:spTree>
+      <p:nvGrpSpPr>
+        <p:cNvPr id="1" name=""/>
+        <p:cNvGrpSpPr/>
+        <p:nvPr/>
+      </p:nvGrpSpPr>
+      <p:grpSpPr>
+        <a:xfrm>
+          <a:off x="0" y="0"/>
+          <a:ext cx="0" cy="0"/>
+          <a:chOff x="0" y="0"/>
+          <a:chExt cx="0" cy="0"/>
+        </a:xfrm>
+      </p:grpSpPr>
+      <p:sp>
+        <p:nvSpPr>
+          <p:cNvPr id="2" name="Slide Image Placeholder 1"/>
+          <p:cNvSpPr>
+            <a:spLocks noGrp="1" noRot="1" noChangeAspect="1"/>
+          </p:cNvSpPr>
+          <p:nvPr>
+            <p:ph type="sldImg"/>
+          </p:nvPr>
+        </p:nvSpPr>
+        <p:spPr/>
+      </p:sp>
+      <p:sp>
+        <p:nvSpPr>
+          <p:cNvPr id="3" name="Notes Placeholder 2"/>
+          <p:cNvSpPr>
+            <a:spLocks noGrp="1"/>
+          </p:cNvSpPr>
+          <p:nvPr>
+            <p:ph type="body" idx="1"/>
+          </p:nvPr>
+        </p:nvSpPr>
+        <p:spPr/>
+        <p:txBody>
+          <a:bodyPr/>
+          <a:lstStyle/>
+          <a:p>
+            <a:endParaRPr lang="en-US" dirty="0"/>
+          </a:p>
+        </p:txBody>
+      </p:sp>
+      <p:sp>
+        <p:nvSpPr>
+          <p:cNvPr id="4" name="Slide Number Placeholder 3"/>
+          <p:cNvSpPr>
+            <a:spLocks noGrp="1"/>
+          </p:cNvSpPr>
+          <p:nvPr>
+            <p:ph type="sldNum" sz="quarter" idx="10"/>
+          </p:nvPr>
+        </p:nvSpPr>
+        <p:spPr/>
+        <p:txBody>
+          <a:bodyPr/>
+          <a:lstStyle/>
+          <a:p>
+            <a:fld id="{7F3C5AE6-245A-4892-87E4-2DDCA6560455}" type="slidenum">
+              <a:rPr lang="en-US" smtClean="0"/>
+              <a:t>25</a:t>
+            </a:fld>
+            <a:endParaRPr lang="en-US"/>
+          </a:p>
+        </p:txBody>
+      </p:sp>
+    </p:spTree>
+    <p:extLst>
+      <p:ext uri="{BB962C8B-B14F-4D97-AF65-F5344CB8AC3E}">
+        <p14:creationId xmlns:p14="http://schemas.microsoft.com/office/powerpoint/2010/main" val="1954709553"/>
       </p:ext>
     </p:extLst>
   </p:cSld>
@@ -3510,7 +3847,7 @@
           <p:cNvPr id="10" name="Picture 9">
             <a:extLst>
               <a:ext uri="{FF2B5EF4-FFF2-40B4-BE49-F238E27FC236}">
-                <a16:creationId xmlns="" xmlns:a16="http://schemas.microsoft.com/office/drawing/2014/main" id="{F35D7D39-F3E0-46F3-9F14-221C7C0B4774}"/>
+                <a16:creationId xmlns:a16="http://schemas.microsoft.com/office/drawing/2014/main" xmlns="" id="{F35D7D39-F3E0-46F3-9F14-221C7C0B4774}"/>
               </a:ext>
             </a:extLst>
           </p:cNvPr>
@@ -3545,7 +3882,7 @@
           <p:cNvPr id="7" name="Picture 6">
             <a:extLst>
               <a:ext uri="{FF2B5EF4-FFF2-40B4-BE49-F238E27FC236}">
-                <a16:creationId xmlns="" xmlns:a16="http://schemas.microsoft.com/office/drawing/2014/main" id="{C66C50A9-C8A1-4CCC-A063-A7A687E70B85}"/>
+                <a16:creationId xmlns:a16="http://schemas.microsoft.com/office/drawing/2014/main" xmlns="" id="{C66C50A9-C8A1-4CCC-A063-A7A687E70B85}"/>
               </a:ext>
             </a:extLst>
           </p:cNvPr>
@@ -3581,7 +3918,7 @@
           <p:cNvPr id="8" name="Picture 7">
             <a:extLst>
               <a:ext uri="{FF2B5EF4-FFF2-40B4-BE49-F238E27FC236}">
-                <a16:creationId xmlns="" xmlns:a16="http://schemas.microsoft.com/office/drawing/2014/main" id="{5DDDF644-1535-4938-B3E9-4A0BA2870803}"/>
+                <a16:creationId xmlns:a16="http://schemas.microsoft.com/office/drawing/2014/main" xmlns="" id="{5DDDF644-1535-4938-B3E9-4A0BA2870803}"/>
               </a:ext>
             </a:extLst>
           </p:cNvPr>
@@ -3966,7 +4303,7 @@
           <p:cNvPr id="4" name="Title 3">
             <a:extLst>
               <a:ext uri="{FF2B5EF4-FFF2-40B4-BE49-F238E27FC236}">
-                <a16:creationId xmlns="" xmlns:a16="http://schemas.microsoft.com/office/drawing/2014/main" id="{BC59490B-2FA7-421D-8F31-CF5208FB072E}"/>
+                <a16:creationId xmlns:a16="http://schemas.microsoft.com/office/drawing/2014/main" xmlns="" id="{BC59490B-2FA7-421D-8F31-CF5208FB072E}"/>
               </a:ext>
             </a:extLst>
           </p:cNvPr>
@@ -4038,7 +4375,7 @@
           <p:cNvPr id="1028" name="Picture 4" descr="C:\Users\withersp\AppData\Local\SNAGHTML24b362b0.PNG">
             <a:extLst>
               <a:ext uri="{FF2B5EF4-FFF2-40B4-BE49-F238E27FC236}">
-                <a16:creationId xmlns="" xmlns:a16="http://schemas.microsoft.com/office/drawing/2014/main" id="{12E16609-9DD1-43D3-91F4-84B15254DA93}"/>
+                <a16:creationId xmlns:a16="http://schemas.microsoft.com/office/drawing/2014/main" xmlns="" id="{12E16609-9DD1-43D3-91F4-84B15254DA93}"/>
               </a:ext>
             </a:extLst>
           </p:cNvPr>
@@ -4122,7 +4459,7 @@
           <p:cNvPr id="2" name="Title 1">
             <a:extLst>
               <a:ext uri="{FF2B5EF4-FFF2-40B4-BE49-F238E27FC236}">
-                <a16:creationId xmlns="" xmlns:a16="http://schemas.microsoft.com/office/drawing/2014/main" id="{F2C9DEE5-D2B3-4CEE-A43B-3B37F019C675}"/>
+                <a16:creationId xmlns:a16="http://schemas.microsoft.com/office/drawing/2014/main" xmlns="" id="{F2C9DEE5-D2B3-4CEE-A43B-3B37F019C675}"/>
               </a:ext>
             </a:extLst>
           </p:cNvPr>
@@ -4150,7 +4487,7 @@
           <p:cNvPr id="3" name="Content Placeholder 2">
             <a:extLst>
               <a:ext uri="{FF2B5EF4-FFF2-40B4-BE49-F238E27FC236}">
-                <a16:creationId xmlns="" xmlns:a16="http://schemas.microsoft.com/office/drawing/2014/main" id="{62381E6A-3237-46F9-BEBB-AB78EC7DF951}"/>
+                <a16:creationId xmlns:a16="http://schemas.microsoft.com/office/drawing/2014/main" xmlns="" id="{62381E6A-3237-46F9-BEBB-AB78EC7DF951}"/>
               </a:ext>
             </a:extLst>
           </p:cNvPr>
@@ -4281,7 +4618,7 @@
           <p:cNvPr id="4" name="Title 3">
             <a:extLst>
               <a:ext uri="{FF2B5EF4-FFF2-40B4-BE49-F238E27FC236}">
-                <a16:creationId xmlns="" xmlns:a16="http://schemas.microsoft.com/office/drawing/2014/main" id="{642A4954-D8E0-4C0D-B4A7-23E696B306FD}"/>
+                <a16:creationId xmlns:a16="http://schemas.microsoft.com/office/drawing/2014/main" xmlns="" id="{642A4954-D8E0-4C0D-B4A7-23E696B306FD}"/>
               </a:ext>
             </a:extLst>
           </p:cNvPr>
@@ -4341,7 +4678,7 @@
           <p:cNvPr id="2" name="Title 1">
             <a:extLst>
               <a:ext uri="{FF2B5EF4-FFF2-40B4-BE49-F238E27FC236}">
-                <a16:creationId xmlns="" xmlns:a16="http://schemas.microsoft.com/office/drawing/2014/main" id="{1A530216-0158-4426-8CAF-8D17A505629F}"/>
+                <a16:creationId xmlns:a16="http://schemas.microsoft.com/office/drawing/2014/main" xmlns="" id="{1A530216-0158-4426-8CAF-8D17A505629F}"/>
               </a:ext>
             </a:extLst>
           </p:cNvPr>
@@ -4369,7 +4706,7 @@
           <p:cNvPr id="3" name="Content Placeholder 2">
             <a:extLst>
               <a:ext uri="{FF2B5EF4-FFF2-40B4-BE49-F238E27FC236}">
-                <a16:creationId xmlns="" xmlns:a16="http://schemas.microsoft.com/office/drawing/2014/main" id="{117770BD-8CC0-4139-A505-25D8CA68B2CB}"/>
+                <a16:creationId xmlns:a16="http://schemas.microsoft.com/office/drawing/2014/main" xmlns="" id="{117770BD-8CC0-4139-A505-25D8CA68B2CB}"/>
               </a:ext>
             </a:extLst>
           </p:cNvPr>
@@ -4391,9 +4728,10 @@
           <a:lstStyle/>
           <a:p>
             <a:r>
-              <a:rPr lang="en-GB" dirty="0"/>
-              <a:t>DAS</a:t>
-            </a:r>
+              <a:rPr lang="en-GB" dirty="0" smtClean="0"/>
+              <a:t>DAS (Domino Access Services)</a:t>
+            </a:r>
+            <a:endParaRPr lang="en-GB" dirty="0"/>
           </a:p>
           <a:p>
             <a:r>
@@ -4517,7 +4855,7 @@
           <p:cNvPr id="2" name="Title 1">
             <a:extLst>
               <a:ext uri="{FF2B5EF4-FFF2-40B4-BE49-F238E27FC236}">
-                <a16:creationId xmlns="" xmlns:a16="http://schemas.microsoft.com/office/drawing/2014/main" id="{DA325B3B-EB04-4DFE-AF62-DA7694510789}"/>
+                <a16:creationId xmlns:a16="http://schemas.microsoft.com/office/drawing/2014/main" xmlns="" id="{DA325B3B-EB04-4DFE-AF62-DA7694510789}"/>
               </a:ext>
             </a:extLst>
           </p:cNvPr>
@@ -4534,9 +4872,10 @@
           <a:lstStyle/>
           <a:p>
             <a:r>
-              <a:rPr lang="en-GB" dirty="0"/>
-              <a:t>considerations</a:t>
-            </a:r>
+              <a:rPr lang="en-GB" dirty="0" smtClean="0"/>
+              <a:t>REST VS API</a:t>
+            </a:r>
+            <a:endParaRPr lang="en-GB" dirty="0"/>
           </a:p>
         </p:txBody>
       </p:sp>
@@ -4545,7 +4884,7 @@
           <p:cNvPr id="3" name="Content Placeholder 2">
             <a:extLst>
               <a:ext uri="{FF2B5EF4-FFF2-40B4-BE49-F238E27FC236}">
-                <a16:creationId xmlns="" xmlns:a16="http://schemas.microsoft.com/office/drawing/2014/main" id="{7348DDCC-5EBE-4C1F-B496-7D6BA1B7A59F}"/>
+                <a16:creationId xmlns:a16="http://schemas.microsoft.com/office/drawing/2014/main" xmlns="" id="{7348DDCC-5EBE-4C1F-B496-7D6BA1B7A59F}"/>
               </a:ext>
             </a:extLst>
           </p:cNvPr>
@@ -4694,7 +5033,7 @@
           <p:cNvPr id="2" name="Title 1">
             <a:extLst>
               <a:ext uri="{FF2B5EF4-FFF2-40B4-BE49-F238E27FC236}">
-                <a16:creationId xmlns="" xmlns:a16="http://schemas.microsoft.com/office/drawing/2014/main" id="{DA325B3B-EB04-4DFE-AF62-DA7694510789}"/>
+                <a16:creationId xmlns:a16="http://schemas.microsoft.com/office/drawing/2014/main" xmlns="" id="{DA325B3B-EB04-4DFE-AF62-DA7694510789}"/>
               </a:ext>
             </a:extLst>
           </p:cNvPr>
@@ -4711,9 +5050,10 @@
           <a:lstStyle/>
           <a:p>
             <a:r>
-              <a:rPr lang="en-GB" dirty="0"/>
-              <a:t>considerations</a:t>
-            </a:r>
+              <a:rPr lang="en-GB" dirty="0" smtClean="0"/>
+              <a:t>REST VS API CONT.</a:t>
+            </a:r>
+            <a:endParaRPr lang="en-GB" dirty="0"/>
           </a:p>
         </p:txBody>
       </p:sp>
@@ -4722,7 +5062,7 @@
           <p:cNvPr id="3" name="Content Placeholder 2">
             <a:extLst>
               <a:ext uri="{FF2B5EF4-FFF2-40B4-BE49-F238E27FC236}">
-                <a16:creationId xmlns="" xmlns:a16="http://schemas.microsoft.com/office/drawing/2014/main" id="{7348DDCC-5EBE-4C1F-B496-7D6BA1B7A59F}"/>
+                <a16:creationId xmlns:a16="http://schemas.microsoft.com/office/drawing/2014/main" xmlns="" id="{7348DDCC-5EBE-4C1F-B496-7D6BA1B7A59F}"/>
               </a:ext>
             </a:extLst>
           </p:cNvPr>
@@ -4857,7 +5197,7 @@
           <p:cNvPr id="2" name="Title 1">
             <a:extLst>
               <a:ext uri="{FF2B5EF4-FFF2-40B4-BE49-F238E27FC236}">
-                <a16:creationId xmlns="" xmlns:a16="http://schemas.microsoft.com/office/drawing/2014/main" id="{11F888B0-6184-4E49-BE67-5D21583FAA29}"/>
+                <a16:creationId xmlns:a16="http://schemas.microsoft.com/office/drawing/2014/main" xmlns="" id="{11F888B0-6184-4E49-BE67-5D21583FAA29}"/>
               </a:ext>
             </a:extLst>
           </p:cNvPr>
@@ -4885,7 +5225,7 @@
           <p:cNvPr id="3" name="Content Placeholder 2">
             <a:extLst>
               <a:ext uri="{FF2B5EF4-FFF2-40B4-BE49-F238E27FC236}">
-                <a16:creationId xmlns="" xmlns:a16="http://schemas.microsoft.com/office/drawing/2014/main" id="{5D0BF05F-CB19-4169-8628-60F81EFBE59E}"/>
+                <a16:creationId xmlns:a16="http://schemas.microsoft.com/office/drawing/2014/main" xmlns="" id="{5D0BF05F-CB19-4169-8628-60F81EFBE59E}"/>
               </a:ext>
             </a:extLst>
           </p:cNvPr>
@@ -4970,15 +5310,20 @@
               <a:t> or tools like </a:t>
             </a:r>
             <a:r>
-              <a:rPr lang="en-GB" dirty="0" err="1">
+              <a:rPr lang="en-GB" dirty="0">
                 <a:hlinkClick r:id="rId6"/>
               </a:rPr>
               <a:t>Mermade</a:t>
             </a:r>
             <a:r>
               <a:rPr lang="en-GB" dirty="0"/>
-              <a:t> will convert</a:t>
-            </a:r>
+              <a:t> will </a:t>
+            </a:r>
+            <a:r>
+              <a:rPr lang="en-GB" dirty="0" smtClean="0"/>
+              <a:t>convert (between the 2)</a:t>
+            </a:r>
+            <a:endParaRPr lang="en-GB" dirty="0"/>
           </a:p>
           <a:p>
             <a:r>
@@ -5001,8 +5346,13 @@
             </a:r>
             <a:r>
               <a:rPr lang="en-GB" dirty="0"/>
-              <a:t> can be created</a:t>
-            </a:r>
+              <a:t> can be </a:t>
+            </a:r>
+            <a:r>
+              <a:rPr lang="en-GB" dirty="0" smtClean="0"/>
+              <a:t>created (For?)</a:t>
+            </a:r>
+            <a:endParaRPr lang="en-GB" dirty="0"/>
           </a:p>
         </p:txBody>
       </p:sp>
@@ -5041,7 +5391,7 @@
           <p:cNvPr id="2" name="Title 1">
             <a:extLst>
               <a:ext uri="{FF2B5EF4-FFF2-40B4-BE49-F238E27FC236}">
-                <a16:creationId xmlns="" xmlns:a16="http://schemas.microsoft.com/office/drawing/2014/main" id="{05AAFF9C-9D60-456C-9619-912E3CFE5A22}"/>
+                <a16:creationId xmlns:a16="http://schemas.microsoft.com/office/drawing/2014/main" xmlns="" id="{05AAFF9C-9D60-456C-9619-912E3CFE5A22}"/>
               </a:ext>
             </a:extLst>
           </p:cNvPr>
@@ -5070,7 +5420,7 @@
           <p:cNvPr id="3" name="Content Placeholder 2">
             <a:extLst>
               <a:ext uri="{FF2B5EF4-FFF2-40B4-BE49-F238E27FC236}">
-                <a16:creationId xmlns="" xmlns:a16="http://schemas.microsoft.com/office/drawing/2014/main" id="{C94BB55B-6C89-4F4B-A953-BD358C4216B6}"/>
+                <a16:creationId xmlns:a16="http://schemas.microsoft.com/office/drawing/2014/main" xmlns="" id="{C94BB55B-6C89-4F4B-A953-BD358C4216B6}"/>
               </a:ext>
             </a:extLst>
           </p:cNvPr>
@@ -5095,8 +5445,13 @@
             <a:pPr marL="901700" indent="-901700"/>
             <a:r>
               <a:rPr lang="en-GB" dirty="0"/>
-              <a:t>	YAML – no quotes around strings, no commas, no curly braces</a:t>
-            </a:r>
+              <a:t>	YAML – no quotes around strings, no commas, no curly </a:t>
+            </a:r>
+            <a:r>
+              <a:rPr lang="en-GB" dirty="0" smtClean="0"/>
+              <a:t>braces</a:t>
+            </a:r>
+            <a:endParaRPr lang="en-GB" dirty="0"/>
           </a:p>
           <a:p>
             <a:r>
@@ -5189,7 +5544,7 @@
           <p:cNvPr id="2" name="Title 1">
             <a:extLst>
               <a:ext uri="{FF2B5EF4-FFF2-40B4-BE49-F238E27FC236}">
-                <a16:creationId xmlns="" xmlns:a16="http://schemas.microsoft.com/office/drawing/2014/main" id="{701EB0D4-BE51-4EB9-95BA-1387E3008DA7}"/>
+                <a16:creationId xmlns:a16="http://schemas.microsoft.com/office/drawing/2014/main" xmlns="" id="{701EB0D4-BE51-4EB9-95BA-1387E3008DA7}"/>
               </a:ext>
             </a:extLst>
           </p:cNvPr>
@@ -5217,7 +5572,7 @@
           <p:cNvPr id="3" name="Content Placeholder 2">
             <a:extLst>
               <a:ext uri="{FF2B5EF4-FFF2-40B4-BE49-F238E27FC236}">
-                <a16:creationId xmlns="" xmlns:a16="http://schemas.microsoft.com/office/drawing/2014/main" id="{090C2521-717E-412B-B21A-03628179FB11}"/>
+                <a16:creationId xmlns:a16="http://schemas.microsoft.com/office/drawing/2014/main" xmlns="" id="{090C2521-717E-412B-B21A-03628179FB11}"/>
               </a:ext>
             </a:extLst>
           </p:cNvPr>
@@ -5299,7 +5654,7 @@
           <p:cNvPr id="2" name="Title 1">
             <a:extLst>
               <a:ext uri="{FF2B5EF4-FFF2-40B4-BE49-F238E27FC236}">
-                <a16:creationId xmlns="" xmlns:a16="http://schemas.microsoft.com/office/drawing/2014/main" id="{BDDECFA5-674E-480C-9B09-ECB6EAFBCFD0}"/>
+                <a16:creationId xmlns:a16="http://schemas.microsoft.com/office/drawing/2014/main" xmlns="" id="{28D4950E-C911-48D5-B236-0A6C79E2A3E6}"/>
               </a:ext>
             </a:extLst>
           </p:cNvPr>
@@ -5317,8 +5672,13 @@
           <a:p>
             <a:r>
               <a:rPr lang="en-GB" dirty="0"/>
-              <a:t>HTTP status codes</a:t>
-            </a:r>
+              <a:t>http </a:t>
+            </a:r>
+            <a:r>
+              <a:rPr lang="en-GB" dirty="0" smtClean="0"/>
+              <a:t>Request Types</a:t>
+            </a:r>
+            <a:endParaRPr lang="en-GB" dirty="0"/>
           </a:p>
         </p:txBody>
       </p:sp>
@@ -5327,7 +5687,7 @@
           <p:cNvPr id="3" name="Content Placeholder 2">
             <a:extLst>
               <a:ext uri="{FF2B5EF4-FFF2-40B4-BE49-F238E27FC236}">
-                <a16:creationId xmlns="" xmlns:a16="http://schemas.microsoft.com/office/drawing/2014/main" id="{7E62BE25-35A8-46F0-8E50-33C5CC9893D2}"/>
+                <a16:creationId xmlns:a16="http://schemas.microsoft.com/office/drawing/2014/main" xmlns="" id="{D2C3A57F-87ED-48C2-9CAC-38FA5FE319DC}"/>
               </a:ext>
             </a:extLst>
           </p:cNvPr>
@@ -5340,51 +5700,66 @@
         </p:nvSpPr>
         <p:spPr/>
         <p:txBody>
-          <a:bodyPr/>
+          <a:bodyPr>
+            <a:normAutofit/>
+          </a:bodyPr>
           <a:lstStyle/>
           <a:p>
             <a:r>
-              <a:rPr lang="en-GB" dirty="0"/>
-              <a:t>1xx – Received and understood, stand by…</a:t>
-            </a:r>
-          </a:p>
-          <a:p>
-            <a:r>
-              <a:rPr lang="en-GB" dirty="0"/>
-              <a:t>2xx – Received, understood and accepted</a:t>
-            </a:r>
-          </a:p>
-          <a:p>
-            <a:r>
-              <a:rPr lang="en-GB" dirty="0"/>
-              <a:t>3xx – Redirecting</a:t>
-            </a:r>
-          </a:p>
-          <a:p>
-            <a:r>
-              <a:rPr lang="en-GB" dirty="0"/>
-              <a:t>4xx – You did something wrong!</a:t>
-            </a:r>
-          </a:p>
-          <a:p>
-            <a:r>
-              <a:rPr lang="en-GB" dirty="0"/>
-              <a:t>5xx – We did something wrong!</a:t>
-            </a:r>
-          </a:p>
-          <a:p>
+              <a:rPr lang="en-GB" dirty="0" smtClean="0"/>
+              <a:t>GET </a:t>
+            </a:r>
+            <a:r>
+              <a:rPr lang="mr-IN" dirty="0" smtClean="0"/>
+              <a:t>–</a:t>
+            </a:r>
+            <a:r>
+              <a:rPr lang="en-GB" dirty="0" smtClean="0"/>
+              <a:t> No body data allowed (Ready only)</a:t>
+            </a:r>
             <a:endParaRPr lang="en-GB" dirty="0"/>
           </a:p>
           <a:p>
             <a:r>
-              <a:rPr lang="en-GB" dirty="0"/>
-              <a:t>See </a:t>
-            </a:r>
-            <a:r>
-              <a:rPr lang="en-GB" dirty="0">
-                <a:hlinkClick r:id="rId2"/>
-              </a:rPr>
-              <a:t>Wikipedia</a:t>
+              <a:rPr lang="en-GB" dirty="0" smtClean="0"/>
+              <a:t>POST – Submit data (Read/Write)</a:t>
+            </a:r>
+            <a:endParaRPr lang="en-GB" dirty="0"/>
+          </a:p>
+          <a:p>
+            <a:r>
+              <a:rPr lang="en-GB" dirty="0" smtClean="0"/>
+              <a:t>PUT– Replacing entire document </a:t>
+            </a:r>
+            <a:r>
+              <a:rPr lang="en-GB" dirty="0"/>
+              <a:t>d</a:t>
+            </a:r>
+            <a:r>
+              <a:rPr lang="en-GB" dirty="0" smtClean="0"/>
+              <a:t>ata</a:t>
+            </a:r>
+            <a:endParaRPr lang="en-GB" dirty="0"/>
+          </a:p>
+          <a:p>
+            <a:r>
+              <a:rPr lang="en-GB" dirty="0" smtClean="0"/>
+              <a:t>PATCH – Minor update to existing data</a:t>
+            </a:r>
+            <a:endParaRPr lang="en-GB" dirty="0"/>
+          </a:p>
+          <a:p>
+            <a:r>
+              <a:rPr lang="en-GB" dirty="0" smtClean="0"/>
+              <a:t>DELETE – Deleting Records (No body data </a:t>
+            </a:r>
+            <a:r>
+              <a:rPr lang="en-GB" dirty="0" smtClean="0"/>
+              <a:t>al</a:t>
+            </a:r>
+            <a:r>
+              <a:rPr lang="en-GB" dirty="0" smtClean="0"/>
+              <a:t>lowed)</a:t>
             </a:r>
             <a:endParaRPr lang="en-GB" dirty="0"/>
           </a:p>
@@ -5393,7 +5768,7 @@
     </p:spTree>
     <p:extLst>
       <p:ext uri="{BB962C8B-B14F-4D97-AF65-F5344CB8AC3E}">
-        <p14:creationId xmlns:p14="http://schemas.microsoft.com/office/powerpoint/2010/main" val="2800926257"/>
+        <p14:creationId xmlns:p14="http://schemas.microsoft.com/office/powerpoint/2010/main" val="397643937"/>
       </p:ext>
     </p:extLst>
   </p:cSld>
@@ -5425,7 +5800,7 @@
           <p:cNvPr id="2" name="Title 1">
             <a:extLst>
               <a:ext uri="{FF2B5EF4-FFF2-40B4-BE49-F238E27FC236}">
-                <a16:creationId xmlns="" xmlns:a16="http://schemas.microsoft.com/office/drawing/2014/main" id="{28D4950E-C911-48D5-B236-0A6C79E2A3E6}"/>
+                <a16:creationId xmlns:a16="http://schemas.microsoft.com/office/drawing/2014/main" xmlns="" id="{BDDECFA5-674E-480C-9B09-ECB6EAFBCFD0}"/>
               </a:ext>
             </a:extLst>
           </p:cNvPr>
@@ -5443,7 +5818,7 @@
           <a:p>
             <a:r>
               <a:rPr lang="en-GB" dirty="0"/>
-              <a:t>http status codes</a:t>
+              <a:t>HTTP status codes</a:t>
             </a:r>
           </a:p>
         </p:txBody>
@@ -5453,7 +5828,7 @@
           <p:cNvPr id="3" name="Content Placeholder 2">
             <a:extLst>
               <a:ext uri="{FF2B5EF4-FFF2-40B4-BE49-F238E27FC236}">
-                <a16:creationId xmlns="" xmlns:a16="http://schemas.microsoft.com/office/drawing/2014/main" id="{D2C3A57F-87ED-48C2-9CAC-38FA5FE319DC}"/>
+                <a16:creationId xmlns:a16="http://schemas.microsoft.com/office/drawing/2014/main" xmlns="" id="{7E62BE25-35A8-46F0-8E50-33C5CC9893D2}"/>
               </a:ext>
             </a:extLst>
           </p:cNvPr>
@@ -5471,63 +5846,55 @@
           <a:p>
             <a:r>
               <a:rPr lang="en-GB" dirty="0"/>
-              <a:t>200 – OK</a:t>
-            </a:r>
-          </a:p>
-          <a:p>
-            <a:r>
-              <a:rPr lang="en-GB" dirty="0"/>
-              <a:t>202 – Accepted for processing</a:t>
-            </a:r>
-          </a:p>
-          <a:p>
-            <a:r>
-              <a:rPr lang="en-GB" dirty="0"/>
-              <a:t>302 – URL found but server is redirecting</a:t>
-            </a:r>
-          </a:p>
-          <a:p>
-            <a:r>
-              <a:rPr lang="en-GB" dirty="0"/>
-              <a:t>400 – Bad request</a:t>
-            </a:r>
-          </a:p>
-          <a:p>
-            <a:r>
-              <a:rPr lang="en-GB" dirty="0"/>
-              <a:t>401 – Unauthorised</a:t>
-            </a:r>
-          </a:p>
-          <a:p>
-            <a:r>
-              <a:rPr lang="en-GB" dirty="0"/>
-              <a:t>403 – Forbidden</a:t>
-            </a:r>
-          </a:p>
-          <a:p>
-            <a:r>
-              <a:rPr lang="en-GB" dirty="0"/>
-              <a:t>404 – Not found</a:t>
-            </a:r>
-          </a:p>
-          <a:p>
-            <a:r>
-              <a:rPr lang="en-GB" dirty="0"/>
-              <a:t>405 – Method not allowed</a:t>
-            </a:r>
-          </a:p>
-          <a:p>
-            <a:r>
-              <a:rPr lang="en-GB" dirty="0"/>
-              <a:t>500 – Internal server error</a:t>
-            </a:r>
+              <a:t>1xx – Received and understood, stand by…</a:t>
+            </a:r>
+          </a:p>
+          <a:p>
+            <a:r>
+              <a:rPr lang="en-GB" dirty="0"/>
+              <a:t>2xx – Received, understood and accepted</a:t>
+            </a:r>
+          </a:p>
+          <a:p>
+            <a:r>
+              <a:rPr lang="en-GB" dirty="0"/>
+              <a:t>3xx – Redirecting</a:t>
+            </a:r>
+          </a:p>
+          <a:p>
+            <a:r>
+              <a:rPr lang="en-GB" dirty="0"/>
+              <a:t>4xx – You did something wrong!</a:t>
+            </a:r>
+          </a:p>
+          <a:p>
+            <a:r>
+              <a:rPr lang="en-GB" dirty="0"/>
+              <a:t>5xx – We did something wrong!</a:t>
+            </a:r>
+          </a:p>
+          <a:p>
+            <a:endParaRPr lang="en-GB" dirty="0"/>
+          </a:p>
+          <a:p>
+            <a:r>
+              <a:rPr lang="en-GB" dirty="0"/>
+              <a:t>See </a:t>
+            </a:r>
+            <a:r>
+              <a:rPr lang="en-GB" dirty="0">
+                <a:hlinkClick r:id="rId2"/>
+              </a:rPr>
+              <a:t>Wikipedia</a:t>
+            </a:r>
+            <a:endParaRPr lang="en-GB" dirty="0"/>
           </a:p>
         </p:txBody>
       </p:sp>
     </p:spTree>
     <p:extLst>
       <p:ext uri="{BB962C8B-B14F-4D97-AF65-F5344CB8AC3E}">
-        <p14:creationId xmlns:p14="http://schemas.microsoft.com/office/powerpoint/2010/main" val="397643937"/>
+        <p14:creationId xmlns:p14="http://schemas.microsoft.com/office/powerpoint/2010/main" val="2800926257"/>
       </p:ext>
     </p:extLst>
   </p:cSld>
@@ -5559,7 +5926,7 @@
           <p:cNvPr id="4" name="Title 3">
             <a:extLst>
               <a:ext uri="{FF2B5EF4-FFF2-40B4-BE49-F238E27FC236}">
-                <a16:creationId xmlns="" xmlns:a16="http://schemas.microsoft.com/office/drawing/2014/main" id="{242D3F1F-5602-49F4-A125-78B334E5873C}"/>
+                <a16:creationId xmlns:a16="http://schemas.microsoft.com/office/drawing/2014/main" xmlns="" id="{242D3F1F-5602-49F4-A125-78B334E5873C}"/>
               </a:ext>
             </a:extLst>
           </p:cNvPr>
@@ -5591,7 +5958,7 @@
           <p:cNvPr id="5" name="Content Placeholder 4">
             <a:extLst>
               <a:ext uri="{FF2B5EF4-FFF2-40B4-BE49-F238E27FC236}">
-                <a16:creationId xmlns="" xmlns:a16="http://schemas.microsoft.com/office/drawing/2014/main" id="{C13B6473-AA5C-4554-9024-49310ACBC255}"/>
+                <a16:creationId xmlns:a16="http://schemas.microsoft.com/office/drawing/2014/main" xmlns="" id="{C13B6473-AA5C-4554-9024-49310ACBC255}"/>
               </a:ext>
             </a:extLst>
           </p:cNvPr>
@@ -5651,7 +6018,7 @@
           <p:cNvPr id="9" name="Arrow: Right 8">
             <a:extLst>
               <a:ext uri="{FF2B5EF4-FFF2-40B4-BE49-F238E27FC236}">
-                <a16:creationId xmlns="" xmlns:a16="http://schemas.microsoft.com/office/drawing/2014/main" id="{9D07E98F-A5EC-4BA5-B706-FA5F0ED79C9A}"/>
+                <a16:creationId xmlns:a16="http://schemas.microsoft.com/office/drawing/2014/main" xmlns="" id="{9D07E98F-A5EC-4BA5-B706-FA5F0ED79C9A}"/>
               </a:ext>
             </a:extLst>
           </p:cNvPr>
@@ -5721,7 +6088,7 @@
           <p:cNvPr id="10" name="Group 9">
             <a:extLst>
               <a:ext uri="{FF2B5EF4-FFF2-40B4-BE49-F238E27FC236}">
-                <a16:creationId xmlns="" xmlns:a16="http://schemas.microsoft.com/office/drawing/2014/main" id="{AF0A7D2A-1ED2-4864-A5F4-0D140FB92B9B}"/>
+                <a16:creationId xmlns:a16="http://schemas.microsoft.com/office/drawing/2014/main" xmlns="" id="{AF0A7D2A-1ED2-4864-A5F4-0D140FB92B9B}"/>
               </a:ext>
             </a:extLst>
           </p:cNvPr>
@@ -5747,7 +6114,7 @@
             <p:cNvPr id="20" name="Rectangle: Rounded Corners 19">
               <a:extLst>
                 <a:ext uri="{FF2B5EF4-FFF2-40B4-BE49-F238E27FC236}">
-                  <a16:creationId xmlns="" xmlns:a16="http://schemas.microsoft.com/office/drawing/2014/main" id="{42194522-2AE0-45FA-94D1-5C3A1A519BCC}"/>
+                  <a16:creationId xmlns:a16="http://schemas.microsoft.com/office/drawing/2014/main" xmlns="" id="{42194522-2AE0-45FA-94D1-5C3A1A519BCC}"/>
                 </a:ext>
               </a:extLst>
             </p:cNvPr>
@@ -5801,7 +6168,7 @@
             <p:cNvPr id="21" name="Rectangle: Rounded Corners 5">
               <a:extLst>
                 <a:ext uri="{FF2B5EF4-FFF2-40B4-BE49-F238E27FC236}">
-                  <a16:creationId xmlns="" xmlns:a16="http://schemas.microsoft.com/office/drawing/2014/main" id="{861A16B5-D4B4-4670-A45F-34D508101688}"/>
+                  <a16:creationId xmlns:a16="http://schemas.microsoft.com/office/drawing/2014/main" xmlns="" id="{861A16B5-D4B4-4670-A45F-34D508101688}"/>
                 </a:ext>
               </a:extLst>
             </p:cNvPr>
@@ -5863,7 +6230,7 @@
           <p:cNvPr id="11" name="Group 10">
             <a:extLst>
               <a:ext uri="{FF2B5EF4-FFF2-40B4-BE49-F238E27FC236}">
-                <a16:creationId xmlns="" xmlns:a16="http://schemas.microsoft.com/office/drawing/2014/main" id="{CBB29DE9-20E8-453E-8816-D198CD4251AF}"/>
+                <a16:creationId xmlns:a16="http://schemas.microsoft.com/office/drawing/2014/main" xmlns="" id="{CBB29DE9-20E8-453E-8816-D198CD4251AF}"/>
               </a:ext>
             </a:extLst>
           </p:cNvPr>
@@ -5889,7 +6256,7 @@
             <p:cNvPr id="18" name="Rectangle: Rounded Corners 17">
               <a:extLst>
                 <a:ext uri="{FF2B5EF4-FFF2-40B4-BE49-F238E27FC236}">
-                  <a16:creationId xmlns="" xmlns:a16="http://schemas.microsoft.com/office/drawing/2014/main" id="{C417FA2E-811C-440B-B6DE-DDE93137815A}"/>
+                  <a16:creationId xmlns:a16="http://schemas.microsoft.com/office/drawing/2014/main" xmlns="" id="{C417FA2E-811C-440B-B6DE-DDE93137815A}"/>
                 </a:ext>
               </a:extLst>
             </p:cNvPr>
@@ -5943,7 +6310,7 @@
             <p:cNvPr id="19" name="Rectangle: Rounded Corners 7">
               <a:extLst>
                 <a:ext uri="{FF2B5EF4-FFF2-40B4-BE49-F238E27FC236}">
-                  <a16:creationId xmlns="" xmlns:a16="http://schemas.microsoft.com/office/drawing/2014/main" id="{110F1258-6F73-42E9-B344-03EE53497FAB}"/>
+                  <a16:creationId xmlns:a16="http://schemas.microsoft.com/office/drawing/2014/main" xmlns="" id="{110F1258-6F73-42E9-B344-03EE53497FAB}"/>
                 </a:ext>
               </a:extLst>
             </p:cNvPr>
@@ -6009,7 +6376,7 @@
           <p:cNvPr id="12" name="Group 11">
             <a:extLst>
               <a:ext uri="{FF2B5EF4-FFF2-40B4-BE49-F238E27FC236}">
-                <a16:creationId xmlns="" xmlns:a16="http://schemas.microsoft.com/office/drawing/2014/main" id="{836C9D76-D131-4697-87D2-EAE3576FADB0}"/>
+                <a16:creationId xmlns:a16="http://schemas.microsoft.com/office/drawing/2014/main" xmlns="" id="{836C9D76-D131-4697-87D2-EAE3576FADB0}"/>
               </a:ext>
             </a:extLst>
           </p:cNvPr>
@@ -6035,7 +6402,7 @@
             <p:cNvPr id="16" name="Rectangle: Rounded Corners 15">
               <a:extLst>
                 <a:ext uri="{FF2B5EF4-FFF2-40B4-BE49-F238E27FC236}">
-                  <a16:creationId xmlns="" xmlns:a16="http://schemas.microsoft.com/office/drawing/2014/main" id="{07C25609-83FE-48AD-A91A-9D291B9844E8}"/>
+                  <a16:creationId xmlns:a16="http://schemas.microsoft.com/office/drawing/2014/main" xmlns="" id="{07C25609-83FE-48AD-A91A-9D291B9844E8}"/>
                 </a:ext>
               </a:extLst>
             </p:cNvPr>
@@ -6089,7 +6456,7 @@
             <p:cNvPr id="17" name="Rectangle: Rounded Corners 9">
               <a:extLst>
                 <a:ext uri="{FF2B5EF4-FFF2-40B4-BE49-F238E27FC236}">
-                  <a16:creationId xmlns="" xmlns:a16="http://schemas.microsoft.com/office/drawing/2014/main" id="{1C28D283-4C25-428A-B342-E8B990D73AFB}"/>
+                  <a16:creationId xmlns:a16="http://schemas.microsoft.com/office/drawing/2014/main" xmlns="" id="{1C28D283-4C25-428A-B342-E8B990D73AFB}"/>
                 </a:ext>
               </a:extLst>
             </p:cNvPr>
@@ -6151,7 +6518,7 @@
           <p:cNvPr id="13" name="Group 12">
             <a:extLst>
               <a:ext uri="{FF2B5EF4-FFF2-40B4-BE49-F238E27FC236}">
-                <a16:creationId xmlns="" xmlns:a16="http://schemas.microsoft.com/office/drawing/2014/main" id="{950B76FC-5A2D-4D73-9FA6-A4F0765716C1}"/>
+                <a16:creationId xmlns:a16="http://schemas.microsoft.com/office/drawing/2014/main" xmlns="" id="{950B76FC-5A2D-4D73-9FA6-A4F0765716C1}"/>
               </a:ext>
             </a:extLst>
           </p:cNvPr>
@@ -6177,7 +6544,7 @@
             <p:cNvPr id="14" name="Rectangle: Rounded Corners 13">
               <a:extLst>
                 <a:ext uri="{FF2B5EF4-FFF2-40B4-BE49-F238E27FC236}">
-                  <a16:creationId xmlns="" xmlns:a16="http://schemas.microsoft.com/office/drawing/2014/main" id="{F40D22CD-D3F7-4AA7-A9E4-AB0C7FA72C8C}"/>
+                  <a16:creationId xmlns:a16="http://schemas.microsoft.com/office/drawing/2014/main" xmlns="" id="{F40D22CD-D3F7-4AA7-A9E4-AB0C7FA72C8C}"/>
                 </a:ext>
               </a:extLst>
             </p:cNvPr>
@@ -6231,7 +6598,7 @@
             <p:cNvPr id="15" name="Rectangle: Rounded Corners 11">
               <a:extLst>
                 <a:ext uri="{FF2B5EF4-FFF2-40B4-BE49-F238E27FC236}">
-                  <a16:creationId xmlns="" xmlns:a16="http://schemas.microsoft.com/office/drawing/2014/main" id="{A2368F2E-FBBE-4C6A-BD1D-1811DB8E0402}"/>
+                  <a16:creationId xmlns:a16="http://schemas.microsoft.com/office/drawing/2014/main" xmlns="" id="{A2368F2E-FBBE-4C6A-BD1D-1811DB8E0402}"/>
                 </a:ext>
               </a:extLst>
             </p:cNvPr>
@@ -6293,7 +6660,7 @@
           <p:cNvPr id="3" name="Picture 2">
             <a:extLst>
               <a:ext uri="{FF2B5EF4-FFF2-40B4-BE49-F238E27FC236}">
-                <a16:creationId xmlns="" xmlns:a16="http://schemas.microsoft.com/office/drawing/2014/main" id="{94760CA3-AC51-4954-84AD-413C7C605AAB}"/>
+                <a16:creationId xmlns:a16="http://schemas.microsoft.com/office/drawing/2014/main" xmlns="" id="{94760CA3-AC51-4954-84AD-413C7C605AAB}"/>
               </a:ext>
             </a:extLst>
           </p:cNvPr>
@@ -6357,10 +6724,149 @@
       </p:grpSpPr>
       <p:sp>
         <p:nvSpPr>
+          <p:cNvPr id="2" name="Title 1">
+            <a:extLst>
+              <a:ext uri="{FF2B5EF4-FFF2-40B4-BE49-F238E27FC236}">
+                <a16:creationId xmlns:a16="http://schemas.microsoft.com/office/drawing/2014/main" xmlns="" id="{28D4950E-C911-48D5-B236-0A6C79E2A3E6}"/>
+              </a:ext>
+            </a:extLst>
+          </p:cNvPr>
+          <p:cNvSpPr>
+            <a:spLocks noGrp="1"/>
+          </p:cNvSpPr>
+          <p:nvPr>
+            <p:ph type="title"/>
+          </p:nvPr>
+        </p:nvSpPr>
+        <p:spPr/>
+        <p:txBody>
+          <a:bodyPr/>
+          <a:lstStyle/>
+          <a:p>
+            <a:r>
+              <a:rPr lang="en-GB" dirty="0"/>
+              <a:t>http status </a:t>
+            </a:r>
+            <a:r>
+              <a:rPr lang="en-GB" dirty="0" smtClean="0"/>
+              <a:t>codes CONT.</a:t>
+            </a:r>
+            <a:endParaRPr lang="en-GB" dirty="0"/>
+          </a:p>
+        </p:txBody>
+      </p:sp>
+      <p:sp>
+        <p:nvSpPr>
+          <p:cNvPr id="3" name="Content Placeholder 2">
+            <a:extLst>
+              <a:ext uri="{FF2B5EF4-FFF2-40B4-BE49-F238E27FC236}">
+                <a16:creationId xmlns:a16="http://schemas.microsoft.com/office/drawing/2014/main" xmlns="" id="{D2C3A57F-87ED-48C2-9CAC-38FA5FE319DC}"/>
+              </a:ext>
+            </a:extLst>
+          </p:cNvPr>
+          <p:cNvSpPr>
+            <a:spLocks noGrp="1"/>
+          </p:cNvSpPr>
+          <p:nvPr>
+            <p:ph idx="1"/>
+          </p:nvPr>
+        </p:nvSpPr>
+        <p:spPr/>
+        <p:txBody>
+          <a:bodyPr/>
+          <a:lstStyle/>
+          <a:p>
+            <a:r>
+              <a:rPr lang="en-GB" dirty="0"/>
+              <a:t>200 – OK</a:t>
+            </a:r>
+          </a:p>
+          <a:p>
+            <a:r>
+              <a:rPr lang="en-GB" dirty="0"/>
+              <a:t>202 – Accepted for processing</a:t>
+            </a:r>
+          </a:p>
+          <a:p>
+            <a:r>
+              <a:rPr lang="en-GB" dirty="0"/>
+              <a:t>302 – URL found but server is redirecting</a:t>
+            </a:r>
+          </a:p>
+          <a:p>
+            <a:r>
+              <a:rPr lang="en-GB" dirty="0"/>
+              <a:t>400 – Bad request</a:t>
+            </a:r>
+          </a:p>
+          <a:p>
+            <a:r>
+              <a:rPr lang="en-GB" dirty="0"/>
+              <a:t>401 – Unauthorised</a:t>
+            </a:r>
+          </a:p>
+          <a:p>
+            <a:r>
+              <a:rPr lang="en-GB" dirty="0"/>
+              <a:t>403 – Forbidden</a:t>
+            </a:r>
+          </a:p>
+          <a:p>
+            <a:r>
+              <a:rPr lang="en-GB" dirty="0"/>
+              <a:t>404 – Not found</a:t>
+            </a:r>
+          </a:p>
+          <a:p>
+            <a:r>
+              <a:rPr lang="en-GB" dirty="0"/>
+              <a:t>405 – Method not allowed</a:t>
+            </a:r>
+          </a:p>
+          <a:p>
+            <a:r>
+              <a:rPr lang="en-GB" dirty="0"/>
+              <a:t>500 – Internal server error</a:t>
+            </a:r>
+          </a:p>
+        </p:txBody>
+      </p:sp>
+    </p:spTree>
+    <p:extLst>
+      <p:ext uri="{BB962C8B-B14F-4D97-AF65-F5344CB8AC3E}">
+        <p14:creationId xmlns:p14="http://schemas.microsoft.com/office/powerpoint/2010/main" val="1049136580"/>
+      </p:ext>
+    </p:extLst>
+  </p:cSld>
+  <p:clrMapOvr>
+    <a:masterClrMapping/>
+  </p:clrMapOvr>
+</p:sld>
+</file>
+
+<file path=ppt/slides/slide21.xml><?xml version="1.0" encoding="utf-8"?>
+<p:sld xmlns:a="http://schemas.openxmlformats.org/drawingml/2006/main" xmlns:r="http://schemas.openxmlformats.org/officeDocument/2006/relationships" xmlns:p="http://schemas.openxmlformats.org/presentationml/2006/main">
+  <p:cSld>
+    <p:spTree>
+      <p:nvGrpSpPr>
+        <p:cNvPr id="1" name=""/>
+        <p:cNvGrpSpPr/>
+        <p:nvPr/>
+      </p:nvGrpSpPr>
+      <p:grpSpPr>
+        <a:xfrm>
+          <a:off x="0" y="0"/>
+          <a:ext cx="0" cy="0"/>
+          <a:chOff x="0" y="0"/>
+          <a:chExt cx="0" cy="0"/>
+        </a:xfrm>
+      </p:grpSpPr>
+      <p:sp>
+        <p:nvSpPr>
           <p:cNvPr id="4" name="Title 3">
             <a:extLst>
               <a:ext uri="{FF2B5EF4-FFF2-40B4-BE49-F238E27FC236}">
-                <a16:creationId xmlns="" xmlns:a16="http://schemas.microsoft.com/office/drawing/2014/main" id="{380905A8-B705-4037-8A33-724430522F63}"/>
+                <a16:creationId xmlns:a16="http://schemas.microsoft.com/office/drawing/2014/main" xmlns="" id="{380905A8-B705-4037-8A33-724430522F63}"/>
               </a:ext>
             </a:extLst>
           </p:cNvPr>
@@ -6403,120 +6909,6 @@
 </p:sld>
 </file>
 
-<file path=ppt/slides/slide21.xml><?xml version="1.0" encoding="utf-8"?>
-<p:sld xmlns:a="http://schemas.openxmlformats.org/drawingml/2006/main" xmlns:r="http://schemas.openxmlformats.org/officeDocument/2006/relationships" xmlns:p="http://schemas.openxmlformats.org/presentationml/2006/main">
-  <p:cSld>
-    <p:spTree>
-      <p:nvGrpSpPr>
-        <p:cNvPr id="1" name=""/>
-        <p:cNvGrpSpPr/>
-        <p:nvPr/>
-      </p:nvGrpSpPr>
-      <p:grpSpPr>
-        <a:xfrm>
-          <a:off x="0" y="0"/>
-          <a:ext cx="0" cy="0"/>
-          <a:chOff x="0" y="0"/>
-          <a:chExt cx="0" cy="0"/>
-        </a:xfrm>
-      </p:grpSpPr>
-      <p:sp>
-        <p:nvSpPr>
-          <p:cNvPr id="4" name="Title 3">
-            <a:extLst>
-              <a:ext uri="{FF2B5EF4-FFF2-40B4-BE49-F238E27FC236}">
-                <a16:creationId xmlns="" xmlns:a16="http://schemas.microsoft.com/office/drawing/2014/main" id="{5F661A78-1620-4819-8674-16466DDEA36A}"/>
-              </a:ext>
-            </a:extLst>
-          </p:cNvPr>
-          <p:cNvSpPr>
-            <a:spLocks noGrp="1"/>
-          </p:cNvSpPr>
-          <p:nvPr>
-            <p:ph type="title"/>
-          </p:nvPr>
-        </p:nvSpPr>
-        <p:spPr/>
-        <p:txBody>
-          <a:bodyPr/>
-          <a:lstStyle/>
-          <a:p>
-            <a:r>
-              <a:rPr lang="en-GB" dirty="0"/>
-              <a:t>Scheduled tasks</a:t>
-            </a:r>
-          </a:p>
-        </p:txBody>
-      </p:sp>
-      <p:sp>
-        <p:nvSpPr>
-          <p:cNvPr id="5" name="Content Placeholder 4">
-            <a:extLst>
-              <a:ext uri="{FF2B5EF4-FFF2-40B4-BE49-F238E27FC236}">
-                <a16:creationId xmlns="" xmlns:a16="http://schemas.microsoft.com/office/drawing/2014/main" id="{D8951B21-ADD7-4D86-B572-B18845D6A0F7}"/>
-              </a:ext>
-            </a:extLst>
-          </p:cNvPr>
-          <p:cNvSpPr>
-            <a:spLocks noGrp="1"/>
-          </p:cNvSpPr>
-          <p:nvPr>
-            <p:ph idx="1"/>
-          </p:nvPr>
-        </p:nvSpPr>
-        <p:spPr/>
-        <p:txBody>
-          <a:bodyPr/>
-          <a:lstStyle/>
-          <a:p>
-            <a:r>
-              <a:rPr lang="en-GB" dirty="0"/>
-              <a:t>Agents</a:t>
-            </a:r>
-          </a:p>
-          <a:p>
-            <a:r>
-              <a:rPr lang="en-GB" dirty="0"/>
-              <a:t>	NSF only, language constraints</a:t>
-            </a:r>
-          </a:p>
-          <a:p>
-            <a:r>
-              <a:rPr lang="en-GB" dirty="0"/>
-              <a:t>DOTS</a:t>
-            </a:r>
-          </a:p>
-          <a:p>
-            <a:r>
-              <a:rPr lang="en-GB" dirty="0"/>
-              <a:t>	Server only, deployment constraints</a:t>
-            </a:r>
-          </a:p>
-          <a:p>
-            <a:endParaRPr lang="en-GB" dirty="0"/>
-          </a:p>
-          <a:p>
-            <a:pPr algn="ctr"/>
-            <a:r>
-              <a:rPr lang="en-GB" dirty="0"/>
-              <a:t>How about a different approach?</a:t>
-            </a:r>
-          </a:p>
-        </p:txBody>
-      </p:sp>
-    </p:spTree>
-    <p:extLst>
-      <p:ext uri="{BB962C8B-B14F-4D97-AF65-F5344CB8AC3E}">
-        <p14:creationId xmlns:p14="http://schemas.microsoft.com/office/powerpoint/2010/main" val="1206375528"/>
-      </p:ext>
-    </p:extLst>
-  </p:cSld>
-  <p:clrMapOvr>
-    <a:masterClrMapping/>
-  </p:clrMapOvr>
-</p:sld>
-</file>
-
 <file path=ppt/slides/slide22.xml><?xml version="1.0" encoding="utf-8"?>
 <p:sld xmlns:a="http://schemas.openxmlformats.org/drawingml/2006/main" xmlns:r="http://schemas.openxmlformats.org/officeDocument/2006/relationships" xmlns:p="http://schemas.openxmlformats.org/presentationml/2006/main">
   <p:cSld>
@@ -6536,10 +6928,10 @@
       </p:grpSpPr>
       <p:sp>
         <p:nvSpPr>
-          <p:cNvPr id="2" name="Title 1">
+          <p:cNvPr id="4" name="Title 3">
             <a:extLst>
               <a:ext uri="{FF2B5EF4-FFF2-40B4-BE49-F238E27FC236}">
-                <a16:creationId xmlns="" xmlns:a16="http://schemas.microsoft.com/office/drawing/2014/main" id="{004A5E56-F513-4A94-A58F-4235E160341C}"/>
+                <a16:creationId xmlns:a16="http://schemas.microsoft.com/office/drawing/2014/main" xmlns="" id="{5F661A78-1620-4819-8674-16466DDEA36A}"/>
               </a:ext>
             </a:extLst>
           </p:cNvPr>
@@ -6557,17 +6949,17 @@
           <a:p>
             <a:r>
               <a:rPr lang="en-GB" dirty="0"/>
-              <a:t>Rest + node-red = flexibility</a:t>
-            </a:r>
-          </a:p>
-        </p:txBody>
-      </p:sp>
-      <p:sp>
-        <p:nvSpPr>
-          <p:cNvPr id="3" name="Content Placeholder 2">
+              <a:t>Scheduled tasks</a:t>
+            </a:r>
+          </a:p>
+        </p:txBody>
+      </p:sp>
+      <p:sp>
+        <p:nvSpPr>
+          <p:cNvPr id="5" name="Content Placeholder 4">
             <a:extLst>
               <a:ext uri="{FF2B5EF4-FFF2-40B4-BE49-F238E27FC236}">
-                <a16:creationId xmlns="" xmlns:a16="http://schemas.microsoft.com/office/drawing/2014/main" id="{3FAAA951-B22E-4803-A2C0-9CF1E7E33F9E}"/>
+                <a16:creationId xmlns:a16="http://schemas.microsoft.com/office/drawing/2014/main" xmlns="" id="{D8951B21-ADD7-4D86-B572-B18845D6A0F7}"/>
               </a:ext>
             </a:extLst>
           </p:cNvPr>
@@ -6584,69 +6976,42 @@
           <a:lstStyle/>
           <a:p>
             <a:r>
-              <a:rPr lang="en-GB" dirty="0"/>
-              <a:t>REST</a:t>
-            </a:r>
-          </a:p>
-          <a:p>
-            <a:r>
-              <a:rPr lang="en-GB" dirty="0"/>
-              <a:t>	</a:t>
-            </a:r>
-            <a:r>
-              <a:rPr lang="en-GB" dirty="0" err="1"/>
-              <a:t>XAgent</a:t>
-            </a:r>
-            <a:r>
-              <a:rPr lang="en-GB" dirty="0"/>
-              <a:t> / </a:t>
-            </a:r>
-            <a:r>
-              <a:rPr lang="en-GB" dirty="0" err="1"/>
-              <a:t>SmartNSF</a:t>
-            </a:r>
-            <a:r>
-              <a:rPr lang="en-GB" dirty="0"/>
-              <a:t> / REST endpoint</a:t>
-            </a:r>
-          </a:p>
-          <a:p>
-            <a:r>
-              <a:rPr lang="en-GB" dirty="0"/>
-              <a:t>	Use </a:t>
-            </a:r>
-            <a:r>
-              <a:rPr lang="en-GB" dirty="0" err="1"/>
-              <a:t>Xots</a:t>
-            </a:r>
-            <a:r>
-              <a:rPr lang="en-GB" dirty="0"/>
-              <a:t> for background processing</a:t>
-            </a:r>
-          </a:p>
-          <a:p>
-            <a:r>
-              <a:rPr lang="en-GB" dirty="0"/>
-              <a:t>	Utility methods added to ODA to boilerplate</a:t>
-            </a:r>
-          </a:p>
-          <a:p>
-            <a:r>
-              <a:rPr lang="en-GB" dirty="0"/>
-              <a:t>Node-RED</a:t>
-            </a:r>
-          </a:p>
-          <a:p>
-            <a:r>
-              <a:rPr lang="en-GB" dirty="0"/>
-              <a:t>	Scheduling and flows</a:t>
-            </a:r>
-          </a:p>
-          <a:p>
-            <a:pPr marL="901700" indent="-901700"/>
-            <a:r>
-              <a:rPr lang="en-GB" dirty="0"/>
-              <a:t>	Other schedulers would work, as long as they can call a REST service</a:t>
+              <a:rPr lang="en-GB" dirty="0" smtClean="0"/>
+              <a:t>Scheduled Agents</a:t>
+            </a:r>
+            <a:endParaRPr lang="en-GB" dirty="0"/>
+          </a:p>
+          <a:p>
+            <a:r>
+              <a:rPr lang="en-GB" dirty="0"/>
+              <a:t>	NSF only, language </a:t>
+            </a:r>
+            <a:r>
+              <a:rPr lang="en-GB" dirty="0" smtClean="0"/>
+              <a:t>constraints (LS or Painful 	Java)</a:t>
+            </a:r>
+            <a:endParaRPr lang="en-GB" dirty="0"/>
+          </a:p>
+          <a:p>
+            <a:r>
+              <a:rPr lang="en-GB" dirty="0"/>
+              <a:t>DOTS</a:t>
+            </a:r>
+          </a:p>
+          <a:p>
+            <a:r>
+              <a:rPr lang="en-GB" dirty="0"/>
+              <a:t>	Server only, deployment constraints</a:t>
+            </a:r>
+          </a:p>
+          <a:p>
+            <a:endParaRPr lang="en-GB" dirty="0"/>
+          </a:p>
+          <a:p>
+            <a:pPr algn="ctr"/>
+            <a:r>
+              <a:rPr lang="en-GB" b="1" dirty="0"/>
+              <a:t>How about a different approach?</a:t>
             </a:r>
           </a:p>
         </p:txBody>
@@ -6654,7 +7019,7 @@
     </p:spTree>
     <p:extLst>
       <p:ext uri="{BB962C8B-B14F-4D97-AF65-F5344CB8AC3E}">
-        <p14:creationId xmlns:p14="http://schemas.microsoft.com/office/powerpoint/2010/main" val="3690183967"/>
+        <p14:creationId xmlns:p14="http://schemas.microsoft.com/office/powerpoint/2010/main" val="1206375528"/>
       </p:ext>
     </p:extLst>
   </p:cSld>
@@ -6686,7 +7051,7 @@
           <p:cNvPr id="2" name="Title 1">
             <a:extLst>
               <a:ext uri="{FF2B5EF4-FFF2-40B4-BE49-F238E27FC236}">
-                <a16:creationId xmlns="" xmlns:a16="http://schemas.microsoft.com/office/drawing/2014/main" id="{C6E669E2-BE11-4459-8C18-5C4763A43502}"/>
+                <a16:creationId xmlns:a16="http://schemas.microsoft.com/office/drawing/2014/main" xmlns="" id="{004A5E56-F513-4A94-A58F-4235E160341C}"/>
               </a:ext>
             </a:extLst>
           </p:cNvPr>
@@ -6703,8 +7068,12 @@
           <a:lstStyle/>
           <a:p>
             <a:r>
-              <a:rPr lang="en-GB" dirty="0"/>
-              <a:t>Node-red</a:t>
+              <a:rPr lang="en-GB" dirty="0" smtClean="0"/>
+              <a:t>API + </a:t>
+            </a:r>
+            <a:r>
+              <a:rPr lang="en-GB" dirty="0"/>
+              <a:t>node-red = flexibility</a:t>
             </a:r>
           </a:p>
         </p:txBody>
@@ -6714,7 +7083,7 @@
           <p:cNvPr id="3" name="Content Placeholder 2">
             <a:extLst>
               <a:ext uri="{FF2B5EF4-FFF2-40B4-BE49-F238E27FC236}">
-                <a16:creationId xmlns="" xmlns:a16="http://schemas.microsoft.com/office/drawing/2014/main" id="{04E0A162-6297-49FF-BA4C-61E31142ED8B}"/>
+                <a16:creationId xmlns:a16="http://schemas.microsoft.com/office/drawing/2014/main" xmlns="" id="{3FAAA951-B22E-4803-A2C0-9CF1E7E33F9E}"/>
               </a:ext>
             </a:extLst>
           </p:cNvPr>
@@ -6725,52 +7094,99 @@
             <p:ph idx="1"/>
           </p:nvPr>
         </p:nvSpPr>
-        <p:spPr>
-          <a:xfrm>
-            <a:off x="266699" y="1933349"/>
-            <a:ext cx="8293101" cy="4421991"/>
-          </a:xfrm>
-        </p:spPr>
+        <p:spPr/>
         <p:txBody>
           <a:bodyPr/>
           <a:lstStyle/>
           <a:p>
             <a:r>
-              <a:rPr lang="en-GB" dirty="0"/>
-              <a:t>Available on IBM Cloud, local node.js app or Docker</a:t>
-            </a:r>
+              <a:rPr lang="en-GB" dirty="0" smtClean="0"/>
+              <a:t>API</a:t>
+            </a:r>
+            <a:endParaRPr lang="en-GB" dirty="0"/>
+          </a:p>
+          <a:p>
+            <a:r>
+              <a:rPr lang="en-GB" dirty="0"/>
+              <a:t>	XAgent / </a:t>
+            </a:r>
+            <a:r>
+              <a:rPr lang="en-GB" dirty="0" err="1"/>
+              <a:t>SmartNSF</a:t>
+            </a:r>
+            <a:r>
+              <a:rPr lang="en-GB" dirty="0"/>
+              <a:t> / </a:t>
+            </a:r>
+            <a:r>
+              <a:rPr lang="en-GB" dirty="0" smtClean="0"/>
+              <a:t>or REST </a:t>
+            </a:r>
+            <a:r>
+              <a:rPr lang="en-GB" dirty="0"/>
+              <a:t>endpoint</a:t>
+            </a:r>
+          </a:p>
+          <a:p>
+            <a:r>
+              <a:rPr lang="en-GB" dirty="0"/>
+              <a:t>	Use </a:t>
+            </a:r>
+            <a:r>
+              <a:rPr lang="en-GB" dirty="0" err="1"/>
+              <a:t>Xots</a:t>
+            </a:r>
+            <a:r>
+              <a:rPr lang="en-GB" dirty="0"/>
+              <a:t> for background processing</a:t>
+            </a:r>
+          </a:p>
+          <a:p>
+            <a:r>
+              <a:rPr lang="en-GB" dirty="0"/>
+              <a:t>	Utility methods added to ODA to </a:t>
+            </a:r>
+            <a:r>
+              <a:rPr lang="en-GB" dirty="0" smtClean="0"/>
+              <a:t>boilerplate 	code</a:t>
+            </a:r>
+            <a:endParaRPr lang="en-GB" dirty="0"/>
+          </a:p>
+          <a:p>
+            <a:r>
+              <a:rPr lang="en-GB" dirty="0"/>
+              <a:t>Node-RED</a:t>
+            </a:r>
+          </a:p>
+          <a:p>
+            <a:r>
+              <a:rPr lang="en-GB" dirty="0"/>
+              <a:t>	Scheduling </a:t>
+            </a:r>
+            <a:r>
+              <a:rPr lang="en-GB" dirty="0" smtClean="0"/>
+              <a:t>of flows that includes Web APIs</a:t>
+            </a:r>
+            <a:endParaRPr lang="en-GB" dirty="0"/>
           </a:p>
           <a:p>
             <a:pPr marL="901700" indent="-901700"/>
             <a:r>
               <a:rPr lang="en-GB" dirty="0"/>
-              <a:t>	Docker containers not aware of host’s “localhost” or other containers</a:t>
-            </a:r>
-          </a:p>
-          <a:p>
-            <a:r>
-              <a:rPr lang="en-GB" dirty="0"/>
-              <a:t>Schedule tasks via Inject node (or Big Timer)</a:t>
-            </a:r>
-          </a:p>
-          <a:p>
-            <a:r>
-              <a:rPr lang="en-GB" dirty="0"/>
-              <a:t>Basic authentication can be set</a:t>
-            </a:r>
-          </a:p>
-          <a:p>
-            <a:r>
-              <a:rPr lang="en-GB" dirty="0"/>
-              <a:t>Flows can be imported / exported as JSON </a:t>
-            </a:r>
+              <a:t>	Other schedulers would work, as long as they can call a </a:t>
+            </a:r>
+            <a:r>
+              <a:rPr lang="en-GB" dirty="0" smtClean="0"/>
+              <a:t>Web API</a:t>
+            </a:r>
+            <a:endParaRPr lang="en-GB" dirty="0"/>
           </a:p>
         </p:txBody>
       </p:sp>
     </p:spTree>
     <p:extLst>
       <p:ext uri="{BB962C8B-B14F-4D97-AF65-F5344CB8AC3E}">
-        <p14:creationId xmlns:p14="http://schemas.microsoft.com/office/powerpoint/2010/main" val="1913848587"/>
+        <p14:creationId xmlns:p14="http://schemas.microsoft.com/office/powerpoint/2010/main" val="3690183967"/>
       </p:ext>
     </p:extLst>
   </p:cSld>
@@ -6802,7 +7218,7 @@
           <p:cNvPr id="2" name="Title 1">
             <a:extLst>
               <a:ext uri="{FF2B5EF4-FFF2-40B4-BE49-F238E27FC236}">
-                <a16:creationId xmlns="" xmlns:a16="http://schemas.microsoft.com/office/drawing/2014/main" id="{BAD95756-30F2-4F38-B406-1C6C78CB70D0}"/>
+                <a16:creationId xmlns:a16="http://schemas.microsoft.com/office/drawing/2014/main" xmlns="" id="{C6E669E2-BE11-4459-8C18-5C4763A43502}"/>
               </a:ext>
             </a:extLst>
           </p:cNvPr>
@@ -6820,7 +7236,7 @@
           <a:p>
             <a:r>
               <a:rPr lang="en-GB" dirty="0"/>
-              <a:t>Integrating private / public</a:t>
+              <a:t>Node-red</a:t>
             </a:r>
           </a:p>
         </p:txBody>
@@ -6830,7 +7246,7 @@
           <p:cNvPr id="3" name="Content Placeholder 2">
             <a:extLst>
               <a:ext uri="{FF2B5EF4-FFF2-40B4-BE49-F238E27FC236}">
-                <a16:creationId xmlns="" xmlns:a16="http://schemas.microsoft.com/office/drawing/2014/main" id="{FC80F034-E016-44D5-B815-A5E0F3FD05FE}"/>
+                <a16:creationId xmlns:a16="http://schemas.microsoft.com/office/drawing/2014/main" xmlns="" id="{04E0A162-6297-49FF-BA4C-61E31142ED8B}"/>
               </a:ext>
             </a:extLst>
           </p:cNvPr>
@@ -6841,26 +7257,161 @@
             <p:ph idx="1"/>
           </p:nvPr>
         </p:nvSpPr>
-        <p:spPr/>
+        <p:spPr>
+          <a:xfrm>
+            <a:off x="266699" y="1933349"/>
+            <a:ext cx="8293101" cy="4421991"/>
+          </a:xfrm>
+        </p:spPr>
         <p:txBody>
           <a:bodyPr/>
           <a:lstStyle/>
           <a:p>
             <a:r>
+              <a:rPr lang="en-GB" dirty="0" smtClean="0"/>
+              <a:t>An integration tool for wiring together APIs and online services</a:t>
+            </a:r>
+          </a:p>
+          <a:p>
+            <a:r>
+              <a:rPr lang="en-GB" dirty="0" smtClean="0"/>
+              <a:t>Available </a:t>
+            </a:r>
+            <a:r>
+              <a:rPr lang="en-GB" dirty="0"/>
+              <a:t>on IBM Cloud, local node.js app or Docker</a:t>
+            </a:r>
+          </a:p>
+          <a:p>
+            <a:pPr marL="901700" indent="-901700"/>
+            <a:r>
+              <a:rPr lang="en-GB" dirty="0"/>
+              <a:t>	</a:t>
+            </a:r>
+            <a:r>
+              <a:rPr lang="en-GB" dirty="0" smtClean="0"/>
+              <a:t>Note: Docker </a:t>
+            </a:r>
+            <a:r>
+              <a:rPr lang="en-GB" dirty="0"/>
+              <a:t>containers not aware of host’s “localhost” or other </a:t>
+            </a:r>
+            <a:r>
+              <a:rPr lang="en-GB" dirty="0" smtClean="0"/>
+              <a:t>containers</a:t>
+            </a:r>
+          </a:p>
+          <a:p>
+            <a:r>
+              <a:rPr lang="en-GB" dirty="0" smtClean="0"/>
+              <a:t>Schedule tasks via Inject node (or Big Timer)</a:t>
+            </a:r>
+          </a:p>
+          <a:p>
+            <a:r>
+              <a:rPr lang="en-GB" dirty="0" smtClean="0"/>
+              <a:t>Basic </a:t>
+            </a:r>
+            <a:r>
+              <a:rPr lang="en-GB" dirty="0"/>
+              <a:t>authentication can be set</a:t>
+            </a:r>
+          </a:p>
+          <a:p>
+            <a:r>
+              <a:rPr lang="en-GB" dirty="0"/>
+              <a:t>Flows can be imported / exported as </a:t>
+            </a:r>
+            <a:r>
+              <a:rPr lang="en-GB" dirty="0" smtClean="0"/>
+              <a:t>JSON</a:t>
+            </a:r>
+            <a:endParaRPr lang="en-GB" dirty="0"/>
+          </a:p>
+        </p:txBody>
+      </p:sp>
+    </p:spTree>
+    <p:extLst>
+      <p:ext uri="{BB962C8B-B14F-4D97-AF65-F5344CB8AC3E}">
+        <p14:creationId xmlns:p14="http://schemas.microsoft.com/office/powerpoint/2010/main" val="1913848587"/>
+      </p:ext>
+    </p:extLst>
+  </p:cSld>
+  <p:clrMapOvr>
+    <a:masterClrMapping/>
+  </p:clrMapOvr>
+</p:sld>
+</file>
+
+<file path=ppt/slides/slide25.xml><?xml version="1.0" encoding="utf-8"?>
+<p:sld xmlns:a="http://schemas.openxmlformats.org/drawingml/2006/main" xmlns:r="http://schemas.openxmlformats.org/officeDocument/2006/relationships" xmlns:p="http://schemas.openxmlformats.org/presentationml/2006/main">
+  <p:cSld>
+    <p:spTree>
+      <p:nvGrpSpPr>
+        <p:cNvPr id="1" name=""/>
+        <p:cNvGrpSpPr/>
+        <p:nvPr/>
+      </p:nvGrpSpPr>
+      <p:grpSpPr>
+        <a:xfrm>
+          <a:off x="0" y="0"/>
+          <a:ext cx="0" cy="0"/>
+          <a:chOff x="0" y="0"/>
+          <a:chExt cx="0" cy="0"/>
+        </a:xfrm>
+      </p:grpSpPr>
+      <p:sp>
+        <p:nvSpPr>
+          <p:cNvPr id="2" name="Title 1">
+            <a:extLst>
+              <a:ext uri="{FF2B5EF4-FFF2-40B4-BE49-F238E27FC236}">
+                <a16:creationId xmlns:a16="http://schemas.microsoft.com/office/drawing/2014/main" xmlns="" id="{BAD95756-30F2-4F38-B406-1C6C78CB70D0}"/>
+              </a:ext>
+            </a:extLst>
+          </p:cNvPr>
+          <p:cNvSpPr>
+            <a:spLocks noGrp="1"/>
+          </p:cNvSpPr>
+          <p:nvPr>
+            <p:ph type="title"/>
+          </p:nvPr>
+        </p:nvSpPr>
+        <p:spPr/>
+        <p:txBody>
+          <a:bodyPr/>
+          <a:lstStyle/>
+          <a:p>
+            <a:r>
+              <a:rPr lang="en-GB" dirty="0"/>
+              <a:t>Integrating private / public</a:t>
+            </a:r>
+          </a:p>
+        </p:txBody>
+      </p:sp>
+      <p:sp>
+        <p:nvSpPr>
+          <p:cNvPr id="3" name="Content Placeholder 2">
+            <a:extLst>
+              <a:ext uri="{FF2B5EF4-FFF2-40B4-BE49-F238E27FC236}">
+                <a16:creationId xmlns:a16="http://schemas.microsoft.com/office/drawing/2014/main" xmlns="" id="{FC80F034-E016-44D5-B815-A5E0F3FD05FE}"/>
+              </a:ext>
+            </a:extLst>
+          </p:cNvPr>
+          <p:cNvSpPr>
+            <a:spLocks noGrp="1"/>
+          </p:cNvSpPr>
+          <p:nvPr>
+            <p:ph idx="1"/>
+          </p:nvPr>
+        </p:nvSpPr>
+        <p:spPr/>
+        <p:txBody>
+          <a:bodyPr/>
+          <a:lstStyle/>
+          <a:p>
+            <a:r>
               <a:rPr lang="en-GB" dirty="0"/>
               <a:t>“Private” needs to be made “public”</a:t>
-            </a:r>
-          </a:p>
-          <a:p>
-            <a:r>
-              <a:rPr lang="en-GB" dirty="0" err="1">
-                <a:hlinkClick r:id="rId2"/>
-              </a:rPr>
-              <a:t>ngrok</a:t>
-            </a:r>
-            <a:r>
-              <a:rPr lang="en-GB" dirty="0"/>
-              <a:t> provides secure tunnels</a:t>
             </a:r>
           </a:p>
           <a:p>
@@ -6868,11 +7419,31 @@
               <a:rPr lang="en-GB" dirty="0" err="1">
                 <a:hlinkClick r:id="rId3"/>
               </a:rPr>
+              <a:t>ngrok</a:t>
+            </a:r>
+            <a:r>
+              <a:rPr lang="en-GB" dirty="0"/>
+              <a:t> provides secure tunnels</a:t>
+            </a:r>
+          </a:p>
+          <a:p>
+            <a:r>
+              <a:rPr lang="en-GB" dirty="0">
+                <a:hlinkClick r:id="rId4"/>
+              </a:rPr>
               <a:t>cmder</a:t>
             </a:r>
             <a:r>
               <a:rPr lang="en-GB" dirty="0"/>
-              <a:t> is good console emulator for Windows</a:t>
+              <a:t> is </a:t>
+            </a:r>
+            <a:r>
+              <a:rPr lang="en-GB" dirty="0" smtClean="0"/>
+              <a:t>a good </a:t>
+            </a:r>
+            <a:r>
+              <a:rPr lang="en-GB" dirty="0"/>
+              <a:t>console emulator for Windows</a:t>
             </a:r>
           </a:p>
           <a:p>
@@ -6885,7 +7456,7 @@
           <p:cNvPr id="4" name="Picture 3">
             <a:extLst>
               <a:ext uri="{FF2B5EF4-FFF2-40B4-BE49-F238E27FC236}">
-                <a16:creationId xmlns="" xmlns:a16="http://schemas.microsoft.com/office/drawing/2014/main" id="{98A35C8F-A351-43A9-9D73-DA5810CA9FAE}"/>
+                <a16:creationId xmlns:a16="http://schemas.microsoft.com/office/drawing/2014/main" xmlns="" id="{98A35C8F-A351-43A9-9D73-DA5810CA9FAE}"/>
               </a:ext>
             </a:extLst>
           </p:cNvPr>
@@ -6895,7 +7466,7 @@
           <p:nvPr/>
         </p:nvPicPr>
         <p:blipFill>
-          <a:blip r:embed="rId4"/>
+          <a:blip r:embed="rId5"/>
           <a:stretch>
             <a:fillRect/>
           </a:stretch>
@@ -6952,7 +7523,7 @@
           <p:cNvPr id="4" name="Title 3">
             <a:extLst>
               <a:ext uri="{FF2B5EF4-FFF2-40B4-BE49-F238E27FC236}">
-                <a16:creationId xmlns="" xmlns:a16="http://schemas.microsoft.com/office/drawing/2014/main" id="{242D3F1F-5602-49F4-A125-78B334E5873C}"/>
+                <a16:creationId xmlns:a16="http://schemas.microsoft.com/office/drawing/2014/main" xmlns="" id="{242D3F1F-5602-49F4-A125-78B334E5873C}"/>
               </a:ext>
             </a:extLst>
           </p:cNvPr>
@@ -6981,7 +7552,7 @@
           <p:cNvPr id="5" name="Content Placeholder 4">
             <a:extLst>
               <a:ext uri="{FF2B5EF4-FFF2-40B4-BE49-F238E27FC236}">
-                <a16:creationId xmlns="" xmlns:a16="http://schemas.microsoft.com/office/drawing/2014/main" id="{C13B6473-AA5C-4554-9024-49310ACBC255}"/>
+                <a16:creationId xmlns:a16="http://schemas.microsoft.com/office/drawing/2014/main" xmlns="" id="{C13B6473-AA5C-4554-9024-49310ACBC255}"/>
               </a:ext>
             </a:extLst>
           </p:cNvPr>
@@ -7004,11 +7575,7 @@
           <a:p>
             <a:r>
               <a:rPr lang="en-GB" dirty="0" smtClean="0"/>
-              <a:t>CTO, </a:t>
-            </a:r>
-            <a:r>
-              <a:rPr lang="en-GB" dirty="0" smtClean="0"/>
-              <a:t>Agilit-e</a:t>
+              <a:t>CTO, Agilit-e</a:t>
             </a:r>
             <a:endParaRPr lang="en-GB" dirty="0"/>
           </a:p>
@@ -7032,7 +7599,7 @@
           <p:cNvPr id="9" name="Arrow: Right 8">
             <a:extLst>
               <a:ext uri="{FF2B5EF4-FFF2-40B4-BE49-F238E27FC236}">
-                <a16:creationId xmlns="" xmlns:a16="http://schemas.microsoft.com/office/drawing/2014/main" id="{9D07E98F-A5EC-4BA5-B706-FA5F0ED79C9A}"/>
+                <a16:creationId xmlns:a16="http://schemas.microsoft.com/office/drawing/2014/main" xmlns="" id="{9D07E98F-A5EC-4BA5-B706-FA5F0ED79C9A}"/>
               </a:ext>
             </a:extLst>
           </p:cNvPr>
@@ -7102,7 +7669,7 @@
           <p:cNvPr id="10" name="Group 9">
             <a:extLst>
               <a:ext uri="{FF2B5EF4-FFF2-40B4-BE49-F238E27FC236}">
-                <a16:creationId xmlns="" xmlns:a16="http://schemas.microsoft.com/office/drawing/2014/main" id="{AF0A7D2A-1ED2-4864-A5F4-0D140FB92B9B}"/>
+                <a16:creationId xmlns:a16="http://schemas.microsoft.com/office/drawing/2014/main" xmlns="" id="{AF0A7D2A-1ED2-4864-A5F4-0D140FB92B9B}"/>
               </a:ext>
             </a:extLst>
           </p:cNvPr>
@@ -7128,7 +7695,7 @@
             <p:cNvPr id="20" name="Rectangle: Rounded Corners 19">
               <a:extLst>
                 <a:ext uri="{FF2B5EF4-FFF2-40B4-BE49-F238E27FC236}">
-                  <a16:creationId xmlns="" xmlns:a16="http://schemas.microsoft.com/office/drawing/2014/main" id="{42194522-2AE0-45FA-94D1-5C3A1A519BCC}"/>
+                  <a16:creationId xmlns:a16="http://schemas.microsoft.com/office/drawing/2014/main" xmlns="" id="{42194522-2AE0-45FA-94D1-5C3A1A519BCC}"/>
                 </a:ext>
               </a:extLst>
             </p:cNvPr>
@@ -7182,7 +7749,7 @@
             <p:cNvPr id="21" name="Rectangle: Rounded Corners 5">
               <a:extLst>
                 <a:ext uri="{FF2B5EF4-FFF2-40B4-BE49-F238E27FC236}">
-                  <a16:creationId xmlns="" xmlns:a16="http://schemas.microsoft.com/office/drawing/2014/main" id="{861A16B5-D4B4-4670-A45F-34D508101688}"/>
+                  <a16:creationId xmlns:a16="http://schemas.microsoft.com/office/drawing/2014/main" xmlns="" id="{861A16B5-D4B4-4670-A45F-34D508101688}"/>
                 </a:ext>
               </a:extLst>
             </p:cNvPr>
@@ -7245,7 +7812,7 @@
           <p:cNvPr id="11" name="Group 10">
             <a:extLst>
               <a:ext uri="{FF2B5EF4-FFF2-40B4-BE49-F238E27FC236}">
-                <a16:creationId xmlns="" xmlns:a16="http://schemas.microsoft.com/office/drawing/2014/main" id="{CBB29DE9-20E8-453E-8816-D198CD4251AF}"/>
+                <a16:creationId xmlns:a16="http://schemas.microsoft.com/office/drawing/2014/main" xmlns="" id="{CBB29DE9-20E8-453E-8816-D198CD4251AF}"/>
               </a:ext>
             </a:extLst>
           </p:cNvPr>
@@ -7271,7 +7838,7 @@
             <p:cNvPr id="18" name="Rectangle: Rounded Corners 17">
               <a:extLst>
                 <a:ext uri="{FF2B5EF4-FFF2-40B4-BE49-F238E27FC236}">
-                  <a16:creationId xmlns="" xmlns:a16="http://schemas.microsoft.com/office/drawing/2014/main" id="{C417FA2E-811C-440B-B6DE-DDE93137815A}"/>
+                  <a16:creationId xmlns:a16="http://schemas.microsoft.com/office/drawing/2014/main" xmlns="" id="{C417FA2E-811C-440B-B6DE-DDE93137815A}"/>
                 </a:ext>
               </a:extLst>
             </p:cNvPr>
@@ -7325,7 +7892,7 @@
             <p:cNvPr id="19" name="Rectangle: Rounded Corners 7">
               <a:extLst>
                 <a:ext uri="{FF2B5EF4-FFF2-40B4-BE49-F238E27FC236}">
-                  <a16:creationId xmlns="" xmlns:a16="http://schemas.microsoft.com/office/drawing/2014/main" id="{110F1258-6F73-42E9-B344-03EE53497FAB}"/>
+                  <a16:creationId xmlns:a16="http://schemas.microsoft.com/office/drawing/2014/main" xmlns="" id="{110F1258-6F73-42E9-B344-03EE53497FAB}"/>
                 </a:ext>
               </a:extLst>
             </p:cNvPr>
@@ -7391,7 +7958,7 @@
           <p:cNvPr id="12" name="Group 11">
             <a:extLst>
               <a:ext uri="{FF2B5EF4-FFF2-40B4-BE49-F238E27FC236}">
-                <a16:creationId xmlns="" xmlns:a16="http://schemas.microsoft.com/office/drawing/2014/main" id="{836C9D76-D131-4697-87D2-EAE3576FADB0}"/>
+                <a16:creationId xmlns:a16="http://schemas.microsoft.com/office/drawing/2014/main" xmlns="" id="{836C9D76-D131-4697-87D2-EAE3576FADB0}"/>
               </a:ext>
             </a:extLst>
           </p:cNvPr>
@@ -7417,7 +7984,7 @@
             <p:cNvPr id="16" name="Rectangle: Rounded Corners 15">
               <a:extLst>
                 <a:ext uri="{FF2B5EF4-FFF2-40B4-BE49-F238E27FC236}">
-                  <a16:creationId xmlns="" xmlns:a16="http://schemas.microsoft.com/office/drawing/2014/main" id="{07C25609-83FE-48AD-A91A-9D291B9844E8}"/>
+                  <a16:creationId xmlns:a16="http://schemas.microsoft.com/office/drawing/2014/main" xmlns="" id="{07C25609-83FE-48AD-A91A-9D291B9844E8}"/>
                 </a:ext>
               </a:extLst>
             </p:cNvPr>
@@ -7471,7 +8038,7 @@
             <p:cNvPr id="17" name="Rectangle: Rounded Corners 9">
               <a:extLst>
                 <a:ext uri="{FF2B5EF4-FFF2-40B4-BE49-F238E27FC236}">
-                  <a16:creationId xmlns="" xmlns:a16="http://schemas.microsoft.com/office/drawing/2014/main" id="{1C28D283-4C25-428A-B342-E8B990D73AFB}"/>
+                  <a16:creationId xmlns:a16="http://schemas.microsoft.com/office/drawing/2014/main" xmlns="" id="{1C28D283-4C25-428A-B342-E8B990D73AFB}"/>
                 </a:ext>
               </a:extLst>
             </p:cNvPr>
@@ -7534,7 +8101,7 @@
           <p:cNvPr id="13" name="Group 12">
             <a:extLst>
               <a:ext uri="{FF2B5EF4-FFF2-40B4-BE49-F238E27FC236}">
-                <a16:creationId xmlns="" xmlns:a16="http://schemas.microsoft.com/office/drawing/2014/main" id="{950B76FC-5A2D-4D73-9FA6-A4F0765716C1}"/>
+                <a16:creationId xmlns:a16="http://schemas.microsoft.com/office/drawing/2014/main" xmlns="" id="{950B76FC-5A2D-4D73-9FA6-A4F0765716C1}"/>
               </a:ext>
             </a:extLst>
           </p:cNvPr>
@@ -7560,7 +8127,7 @@
             <p:cNvPr id="14" name="Rectangle: Rounded Corners 13">
               <a:extLst>
                 <a:ext uri="{FF2B5EF4-FFF2-40B4-BE49-F238E27FC236}">
-                  <a16:creationId xmlns="" xmlns:a16="http://schemas.microsoft.com/office/drawing/2014/main" id="{F40D22CD-D3F7-4AA7-A9E4-AB0C7FA72C8C}"/>
+                  <a16:creationId xmlns:a16="http://schemas.microsoft.com/office/drawing/2014/main" xmlns="" id="{F40D22CD-D3F7-4AA7-A9E4-AB0C7FA72C8C}"/>
                 </a:ext>
               </a:extLst>
             </p:cNvPr>
@@ -7614,7 +8181,7 @@
             <p:cNvPr id="15" name="Rectangle: Rounded Corners 11">
               <a:extLst>
                 <a:ext uri="{FF2B5EF4-FFF2-40B4-BE49-F238E27FC236}">
-                  <a16:creationId xmlns="" xmlns:a16="http://schemas.microsoft.com/office/drawing/2014/main" id="{A2368F2E-FBBE-4C6A-BD1D-1811DB8E0402}"/>
+                  <a16:creationId xmlns:a16="http://schemas.microsoft.com/office/drawing/2014/main" xmlns="" id="{A2368F2E-FBBE-4C6A-BD1D-1811DB8E0402}"/>
                 </a:ext>
               </a:extLst>
             </p:cNvPr>
@@ -7768,7 +8335,7 @@
           <p:cNvPr id="2" name="Title 1">
             <a:extLst>
               <a:ext uri="{FF2B5EF4-FFF2-40B4-BE49-F238E27FC236}">
-                <a16:creationId xmlns="" xmlns:a16="http://schemas.microsoft.com/office/drawing/2014/main" id="{A09F69C7-34E6-46C1-A796-5324FEEDDB23}"/>
+                <a16:creationId xmlns:a16="http://schemas.microsoft.com/office/drawing/2014/main" xmlns="" id="{A09F69C7-34E6-46C1-A796-5324FEEDDB23}"/>
               </a:ext>
             </a:extLst>
           </p:cNvPr>
@@ -7796,7 +8363,7 @@
           <p:cNvPr id="3" name="Content Placeholder 2">
             <a:extLst>
               <a:ext uri="{FF2B5EF4-FFF2-40B4-BE49-F238E27FC236}">
-                <a16:creationId xmlns="" xmlns:a16="http://schemas.microsoft.com/office/drawing/2014/main" id="{34A64C34-4AE8-4780-98A0-96EAF2F11DE7}"/>
+                <a16:creationId xmlns:a16="http://schemas.microsoft.com/office/drawing/2014/main" xmlns="" id="{34A64C34-4AE8-4780-98A0-96EAF2F11DE7}"/>
               </a:ext>
             </a:extLst>
           </p:cNvPr>
@@ -7856,7 +8423,17 @@
             </a:pPr>
             <a:r>
               <a:rPr lang="en-GB" dirty="0" smtClean="0"/>
-              <a:t>Microservices and Containerization</a:t>
+              <a:t>Microservices For Domino</a:t>
+            </a:r>
+          </a:p>
+          <a:p>
+            <a:pPr marL="342900" indent="-342900">
+              <a:buFontTx/>
+              <a:buChar char="-"/>
+            </a:pPr>
+            <a:r>
+              <a:rPr lang="en-GB" dirty="0" smtClean="0"/>
+              <a:t>Containerization and Clustering</a:t>
             </a:r>
             <a:endParaRPr lang="en-GB" dirty="0"/>
           </a:p>
@@ -7911,7 +8488,7 @@
           <p:cNvPr id="4" name="Title 3">
             <a:extLst>
               <a:ext uri="{FF2B5EF4-FFF2-40B4-BE49-F238E27FC236}">
-                <a16:creationId xmlns="" xmlns:a16="http://schemas.microsoft.com/office/drawing/2014/main" id="{D691CD7C-405A-4343-A99A-F7317A35A1A1}"/>
+                <a16:creationId xmlns:a16="http://schemas.microsoft.com/office/drawing/2014/main" xmlns="" id="{D691CD7C-405A-4343-A99A-F7317A35A1A1}"/>
               </a:ext>
             </a:extLst>
           </p:cNvPr>
@@ -7976,7 +8553,7 @@
           <p:cNvPr id="2" name="Title 1">
             <a:extLst>
               <a:ext uri="{FF2B5EF4-FFF2-40B4-BE49-F238E27FC236}">
-                <a16:creationId xmlns="" xmlns:a16="http://schemas.microsoft.com/office/drawing/2014/main" id="{E1DDDE7C-1B23-4060-B7B2-FCFE31AB72AB}"/>
+                <a16:creationId xmlns:a16="http://schemas.microsoft.com/office/drawing/2014/main" xmlns="" id="{E1DDDE7C-1B23-4060-B7B2-FCFE31AB72AB}"/>
               </a:ext>
             </a:extLst>
           </p:cNvPr>
@@ -8004,7 +8581,7 @@
           <p:cNvPr id="3" name="Content Placeholder 2">
             <a:extLst>
               <a:ext uri="{FF2B5EF4-FFF2-40B4-BE49-F238E27FC236}">
-                <a16:creationId xmlns="" xmlns:a16="http://schemas.microsoft.com/office/drawing/2014/main" id="{3BA306DB-D732-4579-8793-4C543104252D}"/>
+                <a16:creationId xmlns:a16="http://schemas.microsoft.com/office/drawing/2014/main" xmlns="" id="{3BA306DB-D732-4579-8793-4C543104252D}"/>
               </a:ext>
             </a:extLst>
           </p:cNvPr>
@@ -8017,7 +8594,9 @@
         </p:nvSpPr>
         <p:spPr/>
         <p:txBody>
-          <a:bodyPr/>
+          <a:bodyPr>
+            <a:normAutofit fontScale="92500" lnSpcReduction="20000"/>
+          </a:bodyPr>
           <a:lstStyle/>
           <a:p>
             <a:r>
@@ -8032,7 +8611,11 @@
             </a:pPr>
             <a:r>
               <a:rPr lang="en-GB" dirty="0"/>
-              <a:t>How to write your app using XYZ JavaScript framework and package it in the NSF</a:t>
+              <a:t>How to write your app using XYZ JavaScript framework and package it in the </a:t>
+            </a:r>
+            <a:r>
+              <a:rPr lang="en-GB" dirty="0" smtClean="0"/>
+              <a:t>NSF</a:t>
             </a:r>
           </a:p>
           <a:p>
@@ -8040,6 +8623,10 @@
               <a:buFontTx/>
               <a:buChar char="-"/>
             </a:pPr>
+            <a:r>
+              <a:rPr lang="en-GB" dirty="0" smtClean="0"/>
+              <a:t>A first step in ultimately migrating away from a Notes and Domino ecosystem</a:t>
+            </a:r>
             <a:endParaRPr lang="en-GB" dirty="0"/>
           </a:p>
           <a:p>
@@ -8055,8 +8642,25 @@
             </a:pPr>
             <a:r>
               <a:rPr lang="en-GB" dirty="0"/>
-              <a:t>How to develop and include Domino as the datastore for a microservices architecture</a:t>
-            </a:r>
+              <a:t>How to develop and include Domino as the datastore for a microservices </a:t>
+            </a:r>
+            <a:r>
+              <a:rPr lang="en-GB" dirty="0" smtClean="0"/>
+              <a:t>architecture (Notes: Also an API Gateway and Domino is the Master fo</a:t>
+            </a:r>
+            <a:r>
+              <a:rPr lang="en-GB" dirty="0" smtClean="0"/>
+              <a:t>r the </a:t>
+            </a:r>
+            <a:r>
+              <a:rPr lang="en-GB" dirty="0" err="1" smtClean="0"/>
+              <a:t>microservice</a:t>
+            </a:r>
+            <a:r>
+              <a:rPr lang="en-GB" dirty="0" smtClean="0"/>
+              <a:t> environment)</a:t>
+            </a:r>
+            <a:endParaRPr lang="en-GB" dirty="0"/>
           </a:p>
           <a:p>
             <a:pPr marL="342900" indent="-342900">
@@ -8064,8 +8668,8 @@
               <a:buChar char="-"/>
             </a:pPr>
             <a:r>
-              <a:rPr lang="en-GB" dirty="0"/>
-              <a:t>Tools / technologies to use</a:t>
+              <a:rPr lang="en-GB" dirty="0" smtClean="0"/>
+              <a:t>About embracing new Tools and Technologies</a:t>
             </a:r>
           </a:p>
           <a:p>
@@ -8074,9 +8678,18 @@
               <a:buChar char="-"/>
             </a:pPr>
             <a:r>
-              <a:rPr lang="en-GB" dirty="0"/>
-              <a:t>Thinking approaches required</a:t>
-            </a:r>
+              <a:rPr lang="en-GB" dirty="0" smtClean="0"/>
+              <a:t>A </a:t>
+            </a:r>
+            <a:r>
+              <a:rPr lang="en-GB" dirty="0" err="1" smtClean="0"/>
+              <a:t>mindshift</a:t>
+            </a:r>
+            <a:r>
+              <a:rPr lang="en-GB" dirty="0" smtClean="0"/>
+              <a:t> in thinking (Note: Find a nice way to say this)</a:t>
+            </a:r>
+            <a:endParaRPr lang="en-GB" dirty="0"/>
           </a:p>
           <a:p>
             <a:endParaRPr lang="en-GB" dirty="0"/>
@@ -8128,7 +8741,7 @@
           <p:cNvPr id="2" name="Title 1">
             <a:extLst>
               <a:ext uri="{FF2B5EF4-FFF2-40B4-BE49-F238E27FC236}">
-                <a16:creationId xmlns="" xmlns:a16="http://schemas.microsoft.com/office/drawing/2014/main" id="{54E323D5-60FE-441D-93FC-A4A17CCDB230}"/>
+                <a16:creationId xmlns:a16="http://schemas.microsoft.com/office/drawing/2014/main" xmlns="" id="{54E323D5-60FE-441D-93FC-A4A17CCDB230}"/>
               </a:ext>
             </a:extLst>
           </p:cNvPr>
@@ -8159,7 +8772,7 @@
           <p:cNvPr id="3" name="Content Placeholder 2">
             <a:extLst>
               <a:ext uri="{FF2B5EF4-FFF2-40B4-BE49-F238E27FC236}">
-                <a16:creationId xmlns="" xmlns:a16="http://schemas.microsoft.com/office/drawing/2014/main" id="{488741F8-A1AA-4D80-A45A-3154A7B10A7B}"/>
+                <a16:creationId xmlns:a16="http://schemas.microsoft.com/office/drawing/2014/main" xmlns="" id="{488741F8-A1AA-4D80-A45A-3154A7B10A7B}"/>
               </a:ext>
             </a:extLst>
           </p:cNvPr>
@@ -8173,7 +8786,7 @@
         <p:spPr/>
         <p:txBody>
           <a:bodyPr>
-            <a:normAutofit/>
+            <a:normAutofit lnSpcReduction="10000"/>
           </a:bodyPr>
           <a:lstStyle/>
           <a:p>
@@ -8197,13 +8810,36 @@
           <a:p>
             <a:r>
               <a:rPr lang="en-GB" dirty="0"/>
-              <a:t>NoSQL Data Store (NSF)</a:t>
-            </a:r>
-          </a:p>
-          <a:p>
-            <a:r>
-              <a:rPr lang="en-GB" dirty="0"/>
-              <a:t>Domino APIs for workflow (LS / SSJS / Java) </a:t>
+              <a:t>NoSQL Data Store (NSF</a:t>
+            </a:r>
+            <a:r>
+              <a:rPr lang="en-GB" dirty="0" smtClean="0"/>
+              <a:t>)</a:t>
+            </a:r>
+          </a:p>
+          <a:p>
+            <a:r>
+              <a:rPr lang="en-GB" dirty="0" smtClean="0"/>
+              <a:t>UI, MVC and Data (NSF)</a:t>
+            </a:r>
+            <a:endParaRPr lang="en-GB" dirty="0"/>
+          </a:p>
+          <a:p>
+            <a:r>
+              <a:rPr lang="en-GB" dirty="0"/>
+              <a:t>Domino </a:t>
+            </a:r>
+            <a:r>
+              <a:rPr lang="en-GB" dirty="0" smtClean="0"/>
+              <a:t>languages </a:t>
+            </a:r>
+            <a:r>
+              <a:rPr lang="en-GB" dirty="0" smtClean="0"/>
+              <a:t>for </a:t>
+            </a:r>
+            <a:r>
+              <a:rPr lang="en-GB" dirty="0"/>
+              <a:t>workflow (LS / SSJS / Java) </a:t>
             </a:r>
           </a:p>
           <a:p>
@@ -8286,7 +8922,7 @@
           <p:cNvPr id="2" name="Title 1">
             <a:extLst>
               <a:ext uri="{FF2B5EF4-FFF2-40B4-BE49-F238E27FC236}">
-                <a16:creationId xmlns="" xmlns:a16="http://schemas.microsoft.com/office/drawing/2014/main" id="{E50706F6-B240-469D-9907-F8E98ECB792C}"/>
+                <a16:creationId xmlns:a16="http://schemas.microsoft.com/office/drawing/2014/main" xmlns="" id="{E50706F6-B240-469D-9907-F8E98ECB792C}"/>
               </a:ext>
             </a:extLst>
           </p:cNvPr>
@@ -8314,7 +8950,7 @@
           <p:cNvPr id="3" name="Content Placeholder 2">
             <a:extLst>
               <a:ext uri="{FF2B5EF4-FFF2-40B4-BE49-F238E27FC236}">
-                <a16:creationId xmlns="" xmlns:a16="http://schemas.microsoft.com/office/drawing/2014/main" id="{82E6E5A4-30F9-4680-9CE7-B82002E233A9}"/>
+                <a16:creationId xmlns:a16="http://schemas.microsoft.com/office/drawing/2014/main" xmlns="" id="{82E6E5A4-30F9-4680-9CE7-B82002E233A9}"/>
               </a:ext>
             </a:extLst>
           </p:cNvPr>
@@ -8332,25 +8968,46 @@
           <a:p>
             <a:r>
               <a:rPr lang="en-GB" dirty="0"/>
-              <a:t>LDAP for Directory Management</a:t>
-            </a:r>
-          </a:p>
-          <a:p>
-            <a:r>
-              <a:rPr lang="en-GB" dirty="0" err="1">
-                <a:hlinkClick r:id="rId2"/>
+              <a:t>LDAP </a:t>
+            </a:r>
+            <a:r>
+              <a:rPr lang="en-GB" dirty="0" smtClean="0"/>
+              <a:t>as an alternative for </a:t>
+            </a:r>
+            <a:r>
+              <a:rPr lang="en-GB" dirty="0"/>
+              <a:t>Directory Management</a:t>
+            </a:r>
+          </a:p>
+          <a:p>
+            <a:r>
+              <a:rPr lang="en-GB" dirty="0">
+                <a:hlinkClick r:id="rId3"/>
               </a:rPr>
               <a:t>nginx</a:t>
             </a:r>
             <a:r>
               <a:rPr lang="en-GB" dirty="0"/>
-              <a:t> / IBM HTTP Server</a:t>
-            </a:r>
-          </a:p>
-          <a:p>
-            <a:r>
-              <a:rPr lang="en-GB" dirty="0"/>
-              <a:t>ODBC / JDBC / LEI / agents processing flat files</a:t>
+              <a:t> / IBM HTTP </a:t>
+            </a:r>
+            <a:r>
+              <a:rPr lang="en-GB" dirty="0" smtClean="0"/>
+              <a:t>Server on top of Domino</a:t>
+            </a:r>
+            <a:endParaRPr lang="en-GB" dirty="0"/>
+          </a:p>
+          <a:p>
+            <a:r>
+              <a:rPr lang="en-GB" dirty="0"/>
+              <a:t>ODBC / JDBC / LEI / agents </a:t>
+            </a:r>
+            <a:r>
+              <a:rPr lang="en-GB" dirty="0" smtClean="0"/>
+              <a:t>processing </a:t>
+            </a:r>
+            <a:r>
+              <a:rPr lang="en-GB" dirty="0"/>
+              <a:t>flat files</a:t>
             </a:r>
           </a:p>
           <a:p>
@@ -8362,8 +9019,13 @@
           <a:p>
             <a:r>
               <a:rPr lang="en-GB" dirty="0"/>
-              <a:t>Lotus Workflow for workflow</a:t>
-            </a:r>
+              <a:t>Lotus Workflow for </a:t>
+            </a:r>
+            <a:r>
+              <a:rPr lang="en-GB" dirty="0" smtClean="0"/>
+              <a:t>BPM</a:t>
+            </a:r>
+            <a:endParaRPr lang="en-GB" dirty="0"/>
           </a:p>
           <a:p>
             <a:r>
@@ -8436,7 +9098,7 @@
           <p:cNvPr id="2" name="Title 1">
             <a:extLst>
               <a:ext uri="{FF2B5EF4-FFF2-40B4-BE49-F238E27FC236}">
-                <a16:creationId xmlns="" xmlns:a16="http://schemas.microsoft.com/office/drawing/2014/main" id="{95C7771E-874B-4266-989A-A1D42B4A6FBD}"/>
+                <a16:creationId xmlns:a16="http://schemas.microsoft.com/office/drawing/2014/main" xmlns="" id="{95C7771E-874B-4266-989A-A1D42B4A6FBD}"/>
               </a:ext>
             </a:extLst>
           </p:cNvPr>
@@ -8502,7 +9164,7 @@
           <p:cNvPr id="3" name="Content Placeholder 2">
             <a:extLst>
               <a:ext uri="{FF2B5EF4-FFF2-40B4-BE49-F238E27FC236}">
-                <a16:creationId xmlns="" xmlns:a16="http://schemas.microsoft.com/office/drawing/2014/main" id="{56D320B4-4B47-4331-8696-978083ABB006}"/>
+                <a16:creationId xmlns:a16="http://schemas.microsoft.com/office/drawing/2014/main" xmlns="" id="{56D320B4-4B47-4331-8696-978083ABB006}"/>
               </a:ext>
             </a:extLst>
           </p:cNvPr>
@@ -8520,7 +9182,15 @@
           <a:p>
             <a:r>
               <a:rPr lang="en-GB" dirty="0"/>
-              <a:t>Domino has always been in the microservices game</a:t>
+              <a:t>Domino has always been in the </a:t>
+            </a:r>
+            <a:r>
+              <a:rPr lang="en-GB" dirty="0" smtClean="0"/>
+              <a:t>“microservices” </a:t>
+            </a:r>
+            <a:r>
+              <a:rPr lang="en-GB" dirty="0"/>
+              <a:t>game</a:t>
             </a:r>
           </a:p>
           <a:p>

</xml_diff>

<commit_message>
Finalized initial version of my side of the presentation
</commit_message>
<xml_diff>
--- a/presentation/8598 Domino and JS.pptx
+++ b/presentation/8598 Domino and JS.pptx
@@ -5,10 +5,10 @@
     <p:sldMasterId id="2147483870" r:id="rId1"/>
   </p:sldMasterIdLst>
   <p:notesMasterIdLst>
-    <p:notesMasterId r:id="rId27"/>
+    <p:notesMasterId r:id="rId35"/>
   </p:notesMasterIdLst>
   <p:handoutMasterIdLst>
-    <p:handoutMasterId r:id="rId28"/>
+    <p:handoutMasterId r:id="rId36"/>
   </p:handoutMasterIdLst>
   <p:sldIdLst>
     <p:sldId id="256" r:id="rId2"/>
@@ -36,6 +36,14 @@
     <p:sldId id="276" r:id="rId24"/>
     <p:sldId id="277" r:id="rId25"/>
     <p:sldId id="278" r:id="rId26"/>
+    <p:sldId id="282" r:id="rId27"/>
+    <p:sldId id="284" r:id="rId28"/>
+    <p:sldId id="285" r:id="rId29"/>
+    <p:sldId id="286" r:id="rId30"/>
+    <p:sldId id="287" r:id="rId31"/>
+    <p:sldId id="283" r:id="rId32"/>
+    <p:sldId id="288" r:id="rId33"/>
+    <p:sldId id="289" r:id="rId34"/>
   </p:sldIdLst>
   <p:sldSz cx="12192000" cy="6858000"/>
   <p:notesSz cx="6858000" cy="9144000"/>
@@ -183,7 +191,7 @@
           <p:cNvPr id="2" name="Header Placeholder 1">
             <a:extLst>
               <a:ext uri="{FF2B5EF4-FFF2-40B4-BE49-F238E27FC236}">
-                <a16:creationId xmlns:a16="http://schemas.microsoft.com/office/drawing/2014/main" id="{BB178A4F-544B-43AC-BD15-7B2CEA5C04AA}"/>
+                <a16:creationId xmlns:a16="http://schemas.microsoft.com/office/drawing/2014/main" xmlns="" id="{BB178A4F-544B-43AC-BD15-7B2CEA5C04AA}"/>
               </a:ext>
             </a:extLst>
           </p:cNvPr>
@@ -211,7 +219,7 @@
             </a:lvl1pPr>
           </a:lstStyle>
           <a:p>
-            <a:endParaRPr lang="en-GB"/>
+            <a:endParaRPr lang="en-GB" dirty="0"/>
           </a:p>
         </p:txBody>
       </p:sp>
@@ -220,7 +228,7 @@
           <p:cNvPr id="3" name="Date Placeholder 2">
             <a:extLst>
               <a:ext uri="{FF2B5EF4-FFF2-40B4-BE49-F238E27FC236}">
-                <a16:creationId xmlns:a16="http://schemas.microsoft.com/office/drawing/2014/main" id="{624BA4BC-130D-4F1D-9EA5-9BBC4F794AEE}"/>
+                <a16:creationId xmlns:a16="http://schemas.microsoft.com/office/drawing/2014/main" xmlns="" id="{624BA4BC-130D-4F1D-9EA5-9BBC4F794AEE}"/>
               </a:ext>
             </a:extLst>
           </p:cNvPr>
@@ -250,9 +258,9 @@
           <a:p>
             <a:fld id="{790E51D3-653E-462A-88BF-90B852BBE668}" type="datetimeFigureOut">
               <a:rPr lang="en-GB" smtClean="0"/>
-              <a:t>19/02/2018</a:t>
+              <a:t>20/02/2018</a:t>
             </a:fld>
-            <a:endParaRPr lang="en-GB"/>
+            <a:endParaRPr lang="en-GB" dirty="0"/>
           </a:p>
         </p:txBody>
       </p:sp>
@@ -261,7 +269,7 @@
           <p:cNvPr id="4" name="Footer Placeholder 3">
             <a:extLst>
               <a:ext uri="{FF2B5EF4-FFF2-40B4-BE49-F238E27FC236}">
-                <a16:creationId xmlns:a16="http://schemas.microsoft.com/office/drawing/2014/main" id="{FD7B5433-BC26-406D-9018-BBA13894431D}"/>
+                <a16:creationId xmlns:a16="http://schemas.microsoft.com/office/drawing/2014/main" xmlns="" id="{FD7B5433-BC26-406D-9018-BBA13894431D}"/>
               </a:ext>
             </a:extLst>
           </p:cNvPr>
@@ -289,7 +297,7 @@
             </a:lvl1pPr>
           </a:lstStyle>
           <a:p>
-            <a:endParaRPr lang="en-GB"/>
+            <a:endParaRPr lang="en-GB" dirty="0"/>
           </a:p>
         </p:txBody>
       </p:sp>
@@ -298,7 +306,7 @@
           <p:cNvPr id="5" name="Slide Number Placeholder 4">
             <a:extLst>
               <a:ext uri="{FF2B5EF4-FFF2-40B4-BE49-F238E27FC236}">
-                <a16:creationId xmlns:a16="http://schemas.microsoft.com/office/drawing/2014/main" id="{3D83B6B0-F723-4CC7-BE1F-88AD9F01DE11}"/>
+                <a16:creationId xmlns:a16="http://schemas.microsoft.com/office/drawing/2014/main" xmlns="" id="{3D83B6B0-F723-4CC7-BE1F-88AD9F01DE11}"/>
               </a:ext>
             </a:extLst>
           </p:cNvPr>
@@ -330,7 +338,7 @@
               <a:rPr lang="en-GB" smtClean="0"/>
               <a:t>‹#›</a:t>
             </a:fld>
-            <a:endParaRPr lang="en-GB"/>
+            <a:endParaRPr lang="en-GB" dirty="0"/>
           </a:p>
         </p:txBody>
       </p:sp>
@@ -394,7 +402,7 @@
             </a:lvl1pPr>
           </a:lstStyle>
           <a:p>
-            <a:endParaRPr lang="en-US"/>
+            <a:endParaRPr lang="en-US" dirty="0"/>
           </a:p>
         </p:txBody>
       </p:sp>
@@ -427,9 +435,9 @@
           <a:p>
             <a:fld id="{60164965-4043-4174-93BC-54F5E5CCBD1D}" type="datetimeFigureOut">
               <a:rPr lang="en-US" smtClean="0"/>
-              <a:t>2/19/2018</a:t>
+              <a:t>2/20/18</a:t>
             </a:fld>
-            <a:endParaRPr lang="en-US"/>
+            <a:endParaRPr lang="en-US" dirty="0"/>
           </a:p>
         </p:txBody>
       </p:sp>
@@ -462,7 +470,7 @@
           <a:bodyPr vert="horz" lIns="91440" tIns="45720" rIns="91440" bIns="45720" rtlCol="0" anchor="ctr"/>
           <a:lstStyle/>
           <a:p>
-            <a:endParaRPr lang="en-US"/>
+            <a:endParaRPr lang="en-US" dirty="0"/>
           </a:p>
         </p:txBody>
       </p:sp>
@@ -552,7 +560,7 @@
             </a:lvl1pPr>
           </a:lstStyle>
           <a:p>
-            <a:endParaRPr lang="en-US"/>
+            <a:endParaRPr lang="en-US" dirty="0"/>
           </a:p>
         </p:txBody>
       </p:sp>
@@ -587,7 +595,7 @@
               <a:rPr lang="en-US" smtClean="0"/>
               <a:t>‹#›</a:t>
             </a:fld>
-            <a:endParaRPr lang="en-US"/>
+            <a:endParaRPr lang="en-US" dirty="0"/>
           </a:p>
         </p:txBody>
       </p:sp>
@@ -778,6 +786,510 @@
 </p:notes>
 </file>
 
+<file path=ppt/notesSlides/notesSlide10.xml><?xml version="1.0" encoding="utf-8"?>
+<p:notes xmlns:a="http://schemas.openxmlformats.org/drawingml/2006/main" xmlns:r="http://schemas.openxmlformats.org/officeDocument/2006/relationships" xmlns:p="http://schemas.openxmlformats.org/presentationml/2006/main">
+  <p:cSld>
+    <p:spTree>
+      <p:nvGrpSpPr>
+        <p:cNvPr id="1" name=""/>
+        <p:cNvGrpSpPr/>
+        <p:nvPr/>
+      </p:nvGrpSpPr>
+      <p:grpSpPr>
+        <a:xfrm>
+          <a:off x="0" y="0"/>
+          <a:ext cx="0" cy="0"/>
+          <a:chOff x="0" y="0"/>
+          <a:chExt cx="0" cy="0"/>
+        </a:xfrm>
+      </p:grpSpPr>
+      <p:sp>
+        <p:nvSpPr>
+          <p:cNvPr id="2" name="Slide Image Placeholder 1"/>
+          <p:cNvSpPr>
+            <a:spLocks noGrp="1" noRot="1" noChangeAspect="1"/>
+          </p:cNvSpPr>
+          <p:nvPr>
+            <p:ph type="sldImg"/>
+          </p:nvPr>
+        </p:nvSpPr>
+        <p:spPr/>
+      </p:sp>
+      <p:sp>
+        <p:nvSpPr>
+          <p:cNvPr id="3" name="Notes Placeholder 2"/>
+          <p:cNvSpPr>
+            <a:spLocks noGrp="1"/>
+          </p:cNvSpPr>
+          <p:nvPr>
+            <p:ph type="body" idx="1"/>
+          </p:nvPr>
+        </p:nvSpPr>
+        <p:spPr/>
+        <p:txBody>
+          <a:bodyPr/>
+          <a:lstStyle/>
+          <a:p>
+            <a:endParaRPr lang="en-US" dirty="0"/>
+          </a:p>
+        </p:txBody>
+      </p:sp>
+      <p:sp>
+        <p:nvSpPr>
+          <p:cNvPr id="4" name="Slide Number Placeholder 3"/>
+          <p:cNvSpPr>
+            <a:spLocks noGrp="1"/>
+          </p:cNvSpPr>
+          <p:nvPr>
+            <p:ph type="sldNum" sz="quarter" idx="10"/>
+          </p:nvPr>
+        </p:nvSpPr>
+        <p:spPr/>
+        <p:txBody>
+          <a:bodyPr/>
+          <a:lstStyle/>
+          <a:p>
+            <a:fld id="{7F3C5AE6-245A-4892-87E4-2DDCA6560455}" type="slidenum">
+              <a:rPr lang="en-US" smtClean="0"/>
+              <a:t>28</a:t>
+            </a:fld>
+            <a:endParaRPr lang="en-US" dirty="0"/>
+          </a:p>
+        </p:txBody>
+      </p:sp>
+    </p:spTree>
+    <p:extLst>
+      <p:ext uri="{BB962C8B-B14F-4D97-AF65-F5344CB8AC3E}">
+        <p14:creationId xmlns:p14="http://schemas.microsoft.com/office/powerpoint/2010/main" val="57916406"/>
+      </p:ext>
+    </p:extLst>
+  </p:cSld>
+  <p:clrMapOvr>
+    <a:masterClrMapping/>
+  </p:clrMapOvr>
+</p:notes>
+</file>
+
+<file path=ppt/notesSlides/notesSlide11.xml><?xml version="1.0" encoding="utf-8"?>
+<p:notes xmlns:a="http://schemas.openxmlformats.org/drawingml/2006/main" xmlns:r="http://schemas.openxmlformats.org/officeDocument/2006/relationships" xmlns:p="http://schemas.openxmlformats.org/presentationml/2006/main">
+  <p:cSld>
+    <p:spTree>
+      <p:nvGrpSpPr>
+        <p:cNvPr id="1" name=""/>
+        <p:cNvGrpSpPr/>
+        <p:nvPr/>
+      </p:nvGrpSpPr>
+      <p:grpSpPr>
+        <a:xfrm>
+          <a:off x="0" y="0"/>
+          <a:ext cx="0" cy="0"/>
+          <a:chOff x="0" y="0"/>
+          <a:chExt cx="0" cy="0"/>
+        </a:xfrm>
+      </p:grpSpPr>
+      <p:sp>
+        <p:nvSpPr>
+          <p:cNvPr id="2" name="Slide Image Placeholder 1"/>
+          <p:cNvSpPr>
+            <a:spLocks noGrp="1" noRot="1" noChangeAspect="1"/>
+          </p:cNvSpPr>
+          <p:nvPr>
+            <p:ph type="sldImg"/>
+          </p:nvPr>
+        </p:nvSpPr>
+        <p:spPr/>
+      </p:sp>
+      <p:sp>
+        <p:nvSpPr>
+          <p:cNvPr id="3" name="Notes Placeholder 2"/>
+          <p:cNvSpPr>
+            <a:spLocks noGrp="1"/>
+          </p:cNvSpPr>
+          <p:nvPr>
+            <p:ph type="body" idx="1"/>
+          </p:nvPr>
+        </p:nvSpPr>
+        <p:spPr/>
+        <p:txBody>
+          <a:bodyPr/>
+          <a:lstStyle/>
+          <a:p>
+            <a:endParaRPr lang="en-US" dirty="0"/>
+          </a:p>
+        </p:txBody>
+      </p:sp>
+      <p:sp>
+        <p:nvSpPr>
+          <p:cNvPr id="4" name="Slide Number Placeholder 3"/>
+          <p:cNvSpPr>
+            <a:spLocks noGrp="1"/>
+          </p:cNvSpPr>
+          <p:nvPr>
+            <p:ph type="sldNum" sz="quarter" idx="10"/>
+          </p:nvPr>
+        </p:nvSpPr>
+        <p:spPr/>
+        <p:txBody>
+          <a:bodyPr/>
+          <a:lstStyle/>
+          <a:p>
+            <a:fld id="{7F3C5AE6-245A-4892-87E4-2DDCA6560455}" type="slidenum">
+              <a:rPr lang="en-US" smtClean="0"/>
+              <a:t>29</a:t>
+            </a:fld>
+            <a:endParaRPr lang="en-US" dirty="0"/>
+          </a:p>
+        </p:txBody>
+      </p:sp>
+    </p:spTree>
+    <p:extLst>
+      <p:ext uri="{BB962C8B-B14F-4D97-AF65-F5344CB8AC3E}">
+        <p14:creationId xmlns:p14="http://schemas.microsoft.com/office/powerpoint/2010/main" val="455794111"/>
+      </p:ext>
+    </p:extLst>
+  </p:cSld>
+  <p:clrMapOvr>
+    <a:masterClrMapping/>
+  </p:clrMapOvr>
+</p:notes>
+</file>
+
+<file path=ppt/notesSlides/notesSlide12.xml><?xml version="1.0" encoding="utf-8"?>
+<p:notes xmlns:a="http://schemas.openxmlformats.org/drawingml/2006/main" xmlns:r="http://schemas.openxmlformats.org/officeDocument/2006/relationships" xmlns:p="http://schemas.openxmlformats.org/presentationml/2006/main">
+  <p:cSld>
+    <p:spTree>
+      <p:nvGrpSpPr>
+        <p:cNvPr id="1" name=""/>
+        <p:cNvGrpSpPr/>
+        <p:nvPr/>
+      </p:nvGrpSpPr>
+      <p:grpSpPr>
+        <a:xfrm>
+          <a:off x="0" y="0"/>
+          <a:ext cx="0" cy="0"/>
+          <a:chOff x="0" y="0"/>
+          <a:chExt cx="0" cy="0"/>
+        </a:xfrm>
+      </p:grpSpPr>
+      <p:sp>
+        <p:nvSpPr>
+          <p:cNvPr id="2" name="Slide Image Placeholder 1"/>
+          <p:cNvSpPr>
+            <a:spLocks noGrp="1" noRot="1" noChangeAspect="1"/>
+          </p:cNvSpPr>
+          <p:nvPr>
+            <p:ph type="sldImg"/>
+          </p:nvPr>
+        </p:nvSpPr>
+        <p:spPr/>
+      </p:sp>
+      <p:sp>
+        <p:nvSpPr>
+          <p:cNvPr id="3" name="Notes Placeholder 2"/>
+          <p:cNvSpPr>
+            <a:spLocks noGrp="1"/>
+          </p:cNvSpPr>
+          <p:nvPr>
+            <p:ph type="body" idx="1"/>
+          </p:nvPr>
+        </p:nvSpPr>
+        <p:spPr/>
+        <p:txBody>
+          <a:bodyPr/>
+          <a:lstStyle/>
+          <a:p>
+            <a:endParaRPr lang="en-US" dirty="0"/>
+          </a:p>
+        </p:txBody>
+      </p:sp>
+      <p:sp>
+        <p:nvSpPr>
+          <p:cNvPr id="4" name="Slide Number Placeholder 3"/>
+          <p:cNvSpPr>
+            <a:spLocks noGrp="1"/>
+          </p:cNvSpPr>
+          <p:nvPr>
+            <p:ph type="sldNum" sz="quarter" idx="10"/>
+          </p:nvPr>
+        </p:nvSpPr>
+        <p:spPr/>
+        <p:txBody>
+          <a:bodyPr/>
+          <a:lstStyle/>
+          <a:p>
+            <a:fld id="{7F3C5AE6-245A-4892-87E4-2DDCA6560455}" type="slidenum">
+              <a:rPr lang="en-US" smtClean="0"/>
+              <a:t>30</a:t>
+            </a:fld>
+            <a:endParaRPr lang="en-US" dirty="0"/>
+          </a:p>
+        </p:txBody>
+      </p:sp>
+    </p:spTree>
+    <p:extLst>
+      <p:ext uri="{BB962C8B-B14F-4D97-AF65-F5344CB8AC3E}">
+        <p14:creationId xmlns:p14="http://schemas.microsoft.com/office/powerpoint/2010/main" val="925894949"/>
+      </p:ext>
+    </p:extLst>
+  </p:cSld>
+  <p:clrMapOvr>
+    <a:masterClrMapping/>
+  </p:clrMapOvr>
+</p:notes>
+</file>
+
+<file path=ppt/notesSlides/notesSlide13.xml><?xml version="1.0" encoding="utf-8"?>
+<p:notes xmlns:a="http://schemas.openxmlformats.org/drawingml/2006/main" xmlns:r="http://schemas.openxmlformats.org/officeDocument/2006/relationships" xmlns:p="http://schemas.openxmlformats.org/presentationml/2006/main">
+  <p:cSld>
+    <p:spTree>
+      <p:nvGrpSpPr>
+        <p:cNvPr id="1" name=""/>
+        <p:cNvGrpSpPr/>
+        <p:nvPr/>
+      </p:nvGrpSpPr>
+      <p:grpSpPr>
+        <a:xfrm>
+          <a:off x="0" y="0"/>
+          <a:ext cx="0" cy="0"/>
+          <a:chOff x="0" y="0"/>
+          <a:chExt cx="0" cy="0"/>
+        </a:xfrm>
+      </p:grpSpPr>
+      <p:sp>
+        <p:nvSpPr>
+          <p:cNvPr id="2" name="Slide Image Placeholder 1"/>
+          <p:cNvSpPr>
+            <a:spLocks noGrp="1" noRot="1" noChangeAspect="1"/>
+          </p:cNvSpPr>
+          <p:nvPr>
+            <p:ph type="sldImg"/>
+          </p:nvPr>
+        </p:nvSpPr>
+        <p:spPr/>
+      </p:sp>
+      <p:sp>
+        <p:nvSpPr>
+          <p:cNvPr id="3" name="Notes Placeholder 2"/>
+          <p:cNvSpPr>
+            <a:spLocks noGrp="1"/>
+          </p:cNvSpPr>
+          <p:nvPr>
+            <p:ph type="body" idx="1"/>
+          </p:nvPr>
+        </p:nvSpPr>
+        <p:spPr/>
+        <p:txBody>
+          <a:bodyPr/>
+          <a:lstStyle/>
+          <a:p>
+            <a:endParaRPr lang="en-US" dirty="0"/>
+          </a:p>
+        </p:txBody>
+      </p:sp>
+      <p:sp>
+        <p:nvSpPr>
+          <p:cNvPr id="4" name="Slide Number Placeholder 3"/>
+          <p:cNvSpPr>
+            <a:spLocks noGrp="1"/>
+          </p:cNvSpPr>
+          <p:nvPr>
+            <p:ph type="sldNum" sz="quarter" idx="10"/>
+          </p:nvPr>
+        </p:nvSpPr>
+        <p:spPr/>
+        <p:txBody>
+          <a:bodyPr/>
+          <a:lstStyle/>
+          <a:p>
+            <a:fld id="{7F3C5AE6-245A-4892-87E4-2DDCA6560455}" type="slidenum">
+              <a:rPr lang="en-US" smtClean="0"/>
+              <a:t>31</a:t>
+            </a:fld>
+            <a:endParaRPr lang="en-US" dirty="0"/>
+          </a:p>
+        </p:txBody>
+      </p:sp>
+    </p:spTree>
+    <p:extLst>
+      <p:ext uri="{BB962C8B-B14F-4D97-AF65-F5344CB8AC3E}">
+        <p14:creationId xmlns:p14="http://schemas.microsoft.com/office/powerpoint/2010/main" val="1399480663"/>
+      </p:ext>
+    </p:extLst>
+  </p:cSld>
+  <p:clrMapOvr>
+    <a:masterClrMapping/>
+  </p:clrMapOvr>
+</p:notes>
+</file>
+
+<file path=ppt/notesSlides/notesSlide14.xml><?xml version="1.0" encoding="utf-8"?>
+<p:notes xmlns:a="http://schemas.openxmlformats.org/drawingml/2006/main" xmlns:r="http://schemas.openxmlformats.org/officeDocument/2006/relationships" xmlns:p="http://schemas.openxmlformats.org/presentationml/2006/main">
+  <p:cSld>
+    <p:spTree>
+      <p:nvGrpSpPr>
+        <p:cNvPr id="1" name=""/>
+        <p:cNvGrpSpPr/>
+        <p:nvPr/>
+      </p:nvGrpSpPr>
+      <p:grpSpPr>
+        <a:xfrm>
+          <a:off x="0" y="0"/>
+          <a:ext cx="0" cy="0"/>
+          <a:chOff x="0" y="0"/>
+          <a:chExt cx="0" cy="0"/>
+        </a:xfrm>
+      </p:grpSpPr>
+      <p:sp>
+        <p:nvSpPr>
+          <p:cNvPr id="2" name="Slide Image Placeholder 1"/>
+          <p:cNvSpPr>
+            <a:spLocks noGrp="1" noRot="1" noChangeAspect="1"/>
+          </p:cNvSpPr>
+          <p:nvPr>
+            <p:ph type="sldImg"/>
+          </p:nvPr>
+        </p:nvSpPr>
+        <p:spPr/>
+      </p:sp>
+      <p:sp>
+        <p:nvSpPr>
+          <p:cNvPr id="3" name="Notes Placeholder 2"/>
+          <p:cNvSpPr>
+            <a:spLocks noGrp="1"/>
+          </p:cNvSpPr>
+          <p:nvPr>
+            <p:ph type="body" idx="1"/>
+          </p:nvPr>
+        </p:nvSpPr>
+        <p:spPr/>
+        <p:txBody>
+          <a:bodyPr/>
+          <a:lstStyle/>
+          <a:p>
+            <a:endParaRPr lang="en-US" dirty="0"/>
+          </a:p>
+        </p:txBody>
+      </p:sp>
+      <p:sp>
+        <p:nvSpPr>
+          <p:cNvPr id="4" name="Slide Number Placeholder 3"/>
+          <p:cNvSpPr>
+            <a:spLocks noGrp="1"/>
+          </p:cNvSpPr>
+          <p:nvPr>
+            <p:ph type="sldNum" sz="quarter" idx="10"/>
+          </p:nvPr>
+        </p:nvSpPr>
+        <p:spPr/>
+        <p:txBody>
+          <a:bodyPr/>
+          <a:lstStyle/>
+          <a:p>
+            <a:fld id="{7F3C5AE6-245A-4892-87E4-2DDCA6560455}" type="slidenum">
+              <a:rPr lang="en-US" smtClean="0"/>
+              <a:t>32</a:t>
+            </a:fld>
+            <a:endParaRPr lang="en-US" dirty="0"/>
+          </a:p>
+        </p:txBody>
+      </p:sp>
+    </p:spTree>
+    <p:extLst>
+      <p:ext uri="{BB962C8B-B14F-4D97-AF65-F5344CB8AC3E}">
+        <p14:creationId xmlns:p14="http://schemas.microsoft.com/office/powerpoint/2010/main" val="237592745"/>
+      </p:ext>
+    </p:extLst>
+  </p:cSld>
+  <p:clrMapOvr>
+    <a:masterClrMapping/>
+  </p:clrMapOvr>
+</p:notes>
+</file>
+
+<file path=ppt/notesSlides/notesSlide15.xml><?xml version="1.0" encoding="utf-8"?>
+<p:notes xmlns:a="http://schemas.openxmlformats.org/drawingml/2006/main" xmlns:r="http://schemas.openxmlformats.org/officeDocument/2006/relationships" xmlns:p="http://schemas.openxmlformats.org/presentationml/2006/main">
+  <p:cSld>
+    <p:spTree>
+      <p:nvGrpSpPr>
+        <p:cNvPr id="1" name=""/>
+        <p:cNvGrpSpPr/>
+        <p:nvPr/>
+      </p:nvGrpSpPr>
+      <p:grpSpPr>
+        <a:xfrm>
+          <a:off x="0" y="0"/>
+          <a:ext cx="0" cy="0"/>
+          <a:chOff x="0" y="0"/>
+          <a:chExt cx="0" cy="0"/>
+        </a:xfrm>
+      </p:grpSpPr>
+      <p:sp>
+        <p:nvSpPr>
+          <p:cNvPr id="2" name="Slide Image Placeholder 1"/>
+          <p:cNvSpPr>
+            <a:spLocks noGrp="1" noRot="1" noChangeAspect="1"/>
+          </p:cNvSpPr>
+          <p:nvPr>
+            <p:ph type="sldImg"/>
+          </p:nvPr>
+        </p:nvSpPr>
+        <p:spPr/>
+      </p:sp>
+      <p:sp>
+        <p:nvSpPr>
+          <p:cNvPr id="3" name="Notes Placeholder 2"/>
+          <p:cNvSpPr>
+            <a:spLocks noGrp="1"/>
+          </p:cNvSpPr>
+          <p:nvPr>
+            <p:ph type="body" idx="1"/>
+          </p:nvPr>
+        </p:nvSpPr>
+        <p:spPr/>
+        <p:txBody>
+          <a:bodyPr/>
+          <a:lstStyle/>
+          <a:p>
+            <a:endParaRPr lang="en-US" dirty="0"/>
+          </a:p>
+        </p:txBody>
+      </p:sp>
+      <p:sp>
+        <p:nvSpPr>
+          <p:cNvPr id="4" name="Slide Number Placeholder 3"/>
+          <p:cNvSpPr>
+            <a:spLocks noGrp="1"/>
+          </p:cNvSpPr>
+          <p:nvPr>
+            <p:ph type="sldNum" sz="quarter" idx="10"/>
+          </p:nvPr>
+        </p:nvSpPr>
+        <p:spPr/>
+        <p:txBody>
+          <a:bodyPr/>
+          <a:lstStyle/>
+          <a:p>
+            <a:fld id="{7F3C5AE6-245A-4892-87E4-2DDCA6560455}" type="slidenum">
+              <a:rPr lang="en-US" smtClean="0"/>
+              <a:t>33</a:t>
+            </a:fld>
+            <a:endParaRPr lang="en-US" dirty="0"/>
+          </a:p>
+        </p:txBody>
+      </p:sp>
+    </p:spTree>
+    <p:extLst>
+      <p:ext uri="{BB962C8B-B14F-4D97-AF65-F5344CB8AC3E}">
+        <p14:creationId xmlns:p14="http://schemas.microsoft.com/office/powerpoint/2010/main" val="1732915962"/>
+      </p:ext>
+    </p:extLst>
+  </p:cSld>
+  <p:clrMapOvr>
+    <a:masterClrMapping/>
+  </p:clrMapOvr>
+</p:notes>
+</file>
+
 <file path=ppt/notesSlides/notesSlide2.xml><?xml version="1.0" encoding="utf-8"?>
 <p:notes xmlns:a="http://schemas.openxmlformats.org/drawingml/2006/main" xmlns:r="http://schemas.openxmlformats.org/officeDocument/2006/relationships" xmlns:p="http://schemas.openxmlformats.org/presentationml/2006/main">
   <p:cSld>
@@ -845,7 +1357,7 @@
               <a:rPr lang="en-US" smtClean="0"/>
               <a:t>3</a:t>
             </a:fld>
-            <a:endParaRPr lang="en-US"/>
+            <a:endParaRPr lang="en-US" dirty="0"/>
           </a:p>
         </p:txBody>
       </p:sp>
@@ -929,7 +1441,7 @@
               <a:rPr lang="en-US" smtClean="0"/>
               <a:t>4</a:t>
             </a:fld>
-            <a:endParaRPr lang="en-US"/>
+            <a:endParaRPr lang="en-US" dirty="0"/>
           </a:p>
         </p:txBody>
       </p:sp>
@@ -1013,7 +1525,7 @@
               <a:rPr lang="en-US" smtClean="0"/>
               <a:t>6</a:t>
             </a:fld>
-            <a:endParaRPr lang="en-US"/>
+            <a:endParaRPr lang="en-US" dirty="0"/>
           </a:p>
         </p:txBody>
       </p:sp>
@@ -1097,7 +1609,7 @@
               <a:rPr lang="en-US" smtClean="0"/>
               <a:t>8</a:t>
             </a:fld>
-            <a:endParaRPr lang="en-US"/>
+            <a:endParaRPr lang="en-US" dirty="0"/>
           </a:p>
         </p:txBody>
       </p:sp>
@@ -1181,7 +1693,7 @@
               <a:rPr lang="en-US" smtClean="0"/>
               <a:t>23</a:t>
             </a:fld>
-            <a:endParaRPr lang="en-US"/>
+            <a:endParaRPr lang="en-US" dirty="0"/>
           </a:p>
         </p:txBody>
       </p:sp>
@@ -1265,7 +1777,7 @@
               <a:rPr lang="en-US" smtClean="0"/>
               <a:t>25</a:t>
             </a:fld>
-            <a:endParaRPr lang="en-US"/>
+            <a:endParaRPr lang="en-US" dirty="0"/>
           </a:p>
         </p:txBody>
       </p:sp>
@@ -1273,6 +1785,174 @@
     <p:extLst>
       <p:ext uri="{BB962C8B-B14F-4D97-AF65-F5344CB8AC3E}">
         <p14:creationId xmlns:p14="http://schemas.microsoft.com/office/powerpoint/2010/main" val="1954709553"/>
+      </p:ext>
+    </p:extLst>
+  </p:cSld>
+  <p:clrMapOvr>
+    <a:masterClrMapping/>
+  </p:clrMapOvr>
+</p:notes>
+</file>
+
+<file path=ppt/notesSlides/notesSlide8.xml><?xml version="1.0" encoding="utf-8"?>
+<p:notes xmlns:a="http://schemas.openxmlformats.org/drawingml/2006/main" xmlns:r="http://schemas.openxmlformats.org/officeDocument/2006/relationships" xmlns:p="http://schemas.openxmlformats.org/presentationml/2006/main">
+  <p:cSld>
+    <p:spTree>
+      <p:nvGrpSpPr>
+        <p:cNvPr id="1" name=""/>
+        <p:cNvGrpSpPr/>
+        <p:nvPr/>
+      </p:nvGrpSpPr>
+      <p:grpSpPr>
+        <a:xfrm>
+          <a:off x="0" y="0"/>
+          <a:ext cx="0" cy="0"/>
+          <a:chOff x="0" y="0"/>
+          <a:chExt cx="0" cy="0"/>
+        </a:xfrm>
+      </p:grpSpPr>
+      <p:sp>
+        <p:nvSpPr>
+          <p:cNvPr id="2" name="Slide Image Placeholder 1"/>
+          <p:cNvSpPr>
+            <a:spLocks noGrp="1" noRot="1" noChangeAspect="1"/>
+          </p:cNvSpPr>
+          <p:nvPr>
+            <p:ph type="sldImg"/>
+          </p:nvPr>
+        </p:nvSpPr>
+        <p:spPr/>
+      </p:sp>
+      <p:sp>
+        <p:nvSpPr>
+          <p:cNvPr id="3" name="Notes Placeholder 2"/>
+          <p:cNvSpPr>
+            <a:spLocks noGrp="1"/>
+          </p:cNvSpPr>
+          <p:nvPr>
+            <p:ph type="body" idx="1"/>
+          </p:nvPr>
+        </p:nvSpPr>
+        <p:spPr/>
+        <p:txBody>
+          <a:bodyPr/>
+          <a:lstStyle/>
+          <a:p>
+            <a:endParaRPr lang="en-US" dirty="0"/>
+          </a:p>
+        </p:txBody>
+      </p:sp>
+      <p:sp>
+        <p:nvSpPr>
+          <p:cNvPr id="4" name="Slide Number Placeholder 3"/>
+          <p:cNvSpPr>
+            <a:spLocks noGrp="1"/>
+          </p:cNvSpPr>
+          <p:nvPr>
+            <p:ph type="sldNum" sz="quarter" idx="10"/>
+          </p:nvPr>
+        </p:nvSpPr>
+        <p:spPr/>
+        <p:txBody>
+          <a:bodyPr/>
+          <a:lstStyle/>
+          <a:p>
+            <a:fld id="{7F3C5AE6-245A-4892-87E4-2DDCA6560455}" type="slidenum">
+              <a:rPr lang="en-US" smtClean="0"/>
+              <a:t>26</a:t>
+            </a:fld>
+            <a:endParaRPr lang="en-US" dirty="0"/>
+          </a:p>
+        </p:txBody>
+      </p:sp>
+    </p:spTree>
+    <p:extLst>
+      <p:ext uri="{BB962C8B-B14F-4D97-AF65-F5344CB8AC3E}">
+        <p14:creationId xmlns:p14="http://schemas.microsoft.com/office/powerpoint/2010/main" val="109818915"/>
+      </p:ext>
+    </p:extLst>
+  </p:cSld>
+  <p:clrMapOvr>
+    <a:masterClrMapping/>
+  </p:clrMapOvr>
+</p:notes>
+</file>
+
+<file path=ppt/notesSlides/notesSlide9.xml><?xml version="1.0" encoding="utf-8"?>
+<p:notes xmlns:a="http://schemas.openxmlformats.org/drawingml/2006/main" xmlns:r="http://schemas.openxmlformats.org/officeDocument/2006/relationships" xmlns:p="http://schemas.openxmlformats.org/presentationml/2006/main">
+  <p:cSld>
+    <p:spTree>
+      <p:nvGrpSpPr>
+        <p:cNvPr id="1" name=""/>
+        <p:cNvGrpSpPr/>
+        <p:nvPr/>
+      </p:nvGrpSpPr>
+      <p:grpSpPr>
+        <a:xfrm>
+          <a:off x="0" y="0"/>
+          <a:ext cx="0" cy="0"/>
+          <a:chOff x="0" y="0"/>
+          <a:chExt cx="0" cy="0"/>
+        </a:xfrm>
+      </p:grpSpPr>
+      <p:sp>
+        <p:nvSpPr>
+          <p:cNvPr id="2" name="Slide Image Placeholder 1"/>
+          <p:cNvSpPr>
+            <a:spLocks noGrp="1" noRot="1" noChangeAspect="1"/>
+          </p:cNvSpPr>
+          <p:nvPr>
+            <p:ph type="sldImg"/>
+          </p:nvPr>
+        </p:nvSpPr>
+        <p:spPr/>
+      </p:sp>
+      <p:sp>
+        <p:nvSpPr>
+          <p:cNvPr id="3" name="Notes Placeholder 2"/>
+          <p:cNvSpPr>
+            <a:spLocks noGrp="1"/>
+          </p:cNvSpPr>
+          <p:nvPr>
+            <p:ph type="body" idx="1"/>
+          </p:nvPr>
+        </p:nvSpPr>
+        <p:spPr/>
+        <p:txBody>
+          <a:bodyPr/>
+          <a:lstStyle/>
+          <a:p>
+            <a:endParaRPr lang="en-US" dirty="0"/>
+          </a:p>
+        </p:txBody>
+      </p:sp>
+      <p:sp>
+        <p:nvSpPr>
+          <p:cNvPr id="4" name="Slide Number Placeholder 3"/>
+          <p:cNvSpPr>
+            <a:spLocks noGrp="1"/>
+          </p:cNvSpPr>
+          <p:nvPr>
+            <p:ph type="sldNum" sz="quarter" idx="10"/>
+          </p:nvPr>
+        </p:nvSpPr>
+        <p:spPr/>
+        <p:txBody>
+          <a:bodyPr/>
+          <a:lstStyle/>
+          <a:p>
+            <a:fld id="{7F3C5AE6-245A-4892-87E4-2DDCA6560455}" type="slidenum">
+              <a:rPr lang="en-US" smtClean="0"/>
+              <a:t>27</a:t>
+            </a:fld>
+            <a:endParaRPr lang="en-US" dirty="0"/>
+          </a:p>
+        </p:txBody>
+      </p:sp>
+    </p:spTree>
+    <p:extLst>
+      <p:ext uri="{BB962C8B-B14F-4D97-AF65-F5344CB8AC3E}">
+        <p14:creationId xmlns:p14="http://schemas.microsoft.com/office/powerpoint/2010/main" val="1850718169"/>
       </p:ext>
     </p:extLst>
   </p:cSld>
@@ -1441,36 +2121,6 @@
           </a:p>
         </p:txBody>
       </p:sp>
-      <p:pic>
-        <p:nvPicPr>
-          <p:cNvPr id="5" name="Picture 4"/>
-          <p:cNvPicPr>
-            <a:picLocks noChangeAspect="1"/>
-          </p:cNvPicPr>
-          <p:nvPr userDrawn="1"/>
-        </p:nvPicPr>
-        <p:blipFill>
-          <a:blip r:embed="rId2">
-            <a:extLst>
-              <a:ext uri="{28A0092B-C50C-407E-A947-70E740481C1C}">
-                <a14:useLocalDpi xmlns:a14="http://schemas.microsoft.com/office/drawing/2010/main" val="0"/>
-              </a:ext>
-            </a:extLst>
-          </a:blip>
-          <a:stretch>
-            <a:fillRect/>
-          </a:stretch>
-        </p:blipFill>
-        <p:spPr>
-          <a:xfrm>
-            <a:off x="2788511" y="6006739"/>
-            <a:ext cx="1588193" cy="697201"/>
-          </a:xfrm>
-          <a:prstGeom prst="rect">
-            <a:avLst/>
-          </a:prstGeom>
-        </p:spPr>
-      </p:pic>
     </p:spTree>
     <p:extLst>
       <p:ext uri="{BB962C8B-B14F-4D97-AF65-F5344CB8AC3E}">
@@ -3847,7 +4497,7 @@
           <p:cNvPr id="10" name="Picture 9">
             <a:extLst>
               <a:ext uri="{FF2B5EF4-FFF2-40B4-BE49-F238E27FC236}">
-                <a16:creationId xmlns:a16="http://schemas.microsoft.com/office/drawing/2014/main" id="{F35D7D39-F3E0-46F3-9F14-221C7C0B4774}"/>
+                <a16:creationId xmlns:a16="http://schemas.microsoft.com/office/drawing/2014/main" xmlns="" id="{F35D7D39-F3E0-46F3-9F14-221C7C0B4774}"/>
               </a:ext>
             </a:extLst>
           </p:cNvPr>
@@ -3882,7 +4532,7 @@
           <p:cNvPr id="8" name="Picture 7">
             <a:extLst>
               <a:ext uri="{FF2B5EF4-FFF2-40B4-BE49-F238E27FC236}">
-                <a16:creationId xmlns:a16="http://schemas.microsoft.com/office/drawing/2014/main" id="{5DDDF644-1535-4938-B3E9-4A0BA2870803}"/>
+                <a16:creationId xmlns:a16="http://schemas.microsoft.com/office/drawing/2014/main" xmlns="" id="{5DDDF644-1535-4938-B3E9-4A0BA2870803}"/>
               </a:ext>
             </a:extLst>
           </p:cNvPr>
@@ -3943,32 +4593,55 @@
       </p:pic>
       <p:pic>
         <p:nvPicPr>
-          <p:cNvPr id="11" name="Picture 10">
-            <a:extLst>
-              <a:ext uri="{FF2B5EF4-FFF2-40B4-BE49-F238E27FC236}">
-                <a16:creationId xmlns:a16="http://schemas.microsoft.com/office/drawing/2014/main" id="{B76F630F-C590-4C9F-A815-C05DC5651D87}"/>
-              </a:ext>
-            </a:extLst>
-          </p:cNvPr>
+          <p:cNvPr id="12" name="Picture 2"/>
           <p:cNvPicPr>
-            <a:picLocks noChangeAspect="1"/>
+            <a:picLocks noChangeAspect="1" noChangeArrowheads="1"/>
           </p:cNvPicPr>
           <p:nvPr userDrawn="1"/>
         </p:nvPicPr>
         <p:blipFill>
-          <a:blip r:embed="rId15"/>
+          <a:blip r:embed="rId15">
+            <a:extLst>
+              <a:ext uri="{28A0092B-C50C-407E-A947-70E740481C1C}">
+                <a14:useLocalDpi xmlns:a14="http://schemas.microsoft.com/office/drawing/2010/main" val="0"/>
+              </a:ext>
+            </a:extLst>
+          </a:blip>
           <a:stretch>
             <a:fillRect/>
           </a:stretch>
         </p:blipFill>
-        <p:spPr>
+        <p:spPr bwMode="auto">
           <a:xfrm>
-            <a:off x="5709033" y="5985853"/>
-            <a:ext cx="2590474" cy="734612"/>
+            <a:off x="5802948" y="6023263"/>
+            <a:ext cx="2199035" cy="697202"/>
           </a:xfrm>
           <a:prstGeom prst="rect">
             <a:avLst/>
           </a:prstGeom>
+          <a:noFill/>
+          <a:ln>
+            <a:noFill/>
+          </a:ln>
+          <a:extLst>
+            <a:ext uri="{909E8E84-426E-40DD-AFC4-6F175D3DCCD1}">
+              <a14:hiddenFill xmlns:a14="http://schemas.microsoft.com/office/drawing/2010/main">
+                <a:solidFill>
+                  <a:srgbClr val="FFFFFF"/>
+                </a:solidFill>
+              </a14:hiddenFill>
+            </a:ext>
+            <a:ext uri="{91240B29-F687-4F45-9708-019B960494DF}">
+              <a14:hiddenLine xmlns:a14="http://schemas.microsoft.com/office/drawing/2010/main" w="9525">
+                <a:solidFill>
+                  <a:srgbClr val="000000"/>
+                </a:solidFill>
+                <a:miter lim="800000"/>
+                <a:headEnd/>
+                <a:tailEnd/>
+              </a14:hiddenLine>
+            </a:ext>
+          </a:extLst>
         </p:spPr>
       </p:pic>
     </p:spTree>
@@ -4297,7 +4970,7 @@
           <p:cNvPr id="4" name="Title 3">
             <a:extLst>
               <a:ext uri="{FF2B5EF4-FFF2-40B4-BE49-F238E27FC236}">
-                <a16:creationId xmlns:a16="http://schemas.microsoft.com/office/drawing/2014/main" id="{BC59490B-2FA7-421D-8F31-CF5208FB072E}"/>
+                <a16:creationId xmlns:a16="http://schemas.microsoft.com/office/drawing/2014/main" xmlns="" id="{BC59490B-2FA7-421D-8F31-CF5208FB072E}"/>
               </a:ext>
             </a:extLst>
           </p:cNvPr>
@@ -4320,12 +4993,12 @@
               <a:t>8598 Tips and Tricks: Domino and </a:t>
             </a:r>
             <a:r>
-              <a:rPr lang="en-GB" sz="4400" dirty="0" err="1"/>
-              <a:t>Javascript</a:t>
+              <a:rPr lang="en-GB" sz="4400" dirty="0" smtClean="0"/>
+              <a:t>JavaScript </a:t>
             </a:r>
             <a:r>
               <a:rPr lang="en-GB" sz="4400" dirty="0"/>
-              <a:t> development masterclass</a:t>
+              <a:t>development masterclass</a:t>
             </a:r>
             <a:endParaRPr lang="en-GB" dirty="0"/>
           </a:p>
@@ -4364,7 +5037,7 @@
           <p:cNvPr id="2" name="TextBox 1">
             <a:extLst>
               <a:ext uri="{FF2B5EF4-FFF2-40B4-BE49-F238E27FC236}">
-                <a16:creationId xmlns:a16="http://schemas.microsoft.com/office/drawing/2014/main" id="{510528AC-FFDD-4ED9-B123-DAE9A8D298FE}"/>
+                <a16:creationId xmlns:a16="http://schemas.microsoft.com/office/drawing/2014/main" xmlns="" id="{510528AC-FFDD-4ED9-B123-DAE9A8D298FE}"/>
               </a:ext>
             </a:extLst>
           </p:cNvPr>
@@ -4406,7 +5079,7 @@
           <p:cNvPr id="6" name="TextBox 5">
             <a:extLst>
               <a:ext uri="{FF2B5EF4-FFF2-40B4-BE49-F238E27FC236}">
-                <a16:creationId xmlns:a16="http://schemas.microsoft.com/office/drawing/2014/main" id="{8FBB6F0F-E28D-4890-ADF4-E2F8F070A49F}"/>
+                <a16:creationId xmlns:a16="http://schemas.microsoft.com/office/drawing/2014/main" xmlns="" id="{8FBB6F0F-E28D-4890-ADF4-E2F8F070A49F}"/>
               </a:ext>
             </a:extLst>
           </p:cNvPr>
@@ -4478,7 +5151,7 @@
           <p:cNvPr id="2" name="Title 1">
             <a:extLst>
               <a:ext uri="{FF2B5EF4-FFF2-40B4-BE49-F238E27FC236}">
-                <a16:creationId xmlns:a16="http://schemas.microsoft.com/office/drawing/2014/main" id="{F2C9DEE5-D2B3-4CEE-A43B-3B37F019C675}"/>
+                <a16:creationId xmlns:a16="http://schemas.microsoft.com/office/drawing/2014/main" xmlns="" id="{F2C9DEE5-D2B3-4CEE-A43B-3B37F019C675}"/>
               </a:ext>
             </a:extLst>
           </p:cNvPr>
@@ -4506,7 +5179,7 @@
           <p:cNvPr id="3" name="Content Placeholder 2">
             <a:extLst>
               <a:ext uri="{FF2B5EF4-FFF2-40B4-BE49-F238E27FC236}">
-                <a16:creationId xmlns:a16="http://schemas.microsoft.com/office/drawing/2014/main" id="{62381E6A-3237-46F9-BEBB-AB78EC7DF951}"/>
+                <a16:creationId xmlns:a16="http://schemas.microsoft.com/office/drawing/2014/main" xmlns="" id="{62381E6A-3237-46F9-BEBB-AB78EC7DF951}"/>
               </a:ext>
             </a:extLst>
           </p:cNvPr>
@@ -4639,7 +5312,7 @@
           <p:cNvPr id="4" name="Title 3">
             <a:extLst>
               <a:ext uri="{FF2B5EF4-FFF2-40B4-BE49-F238E27FC236}">
-                <a16:creationId xmlns:a16="http://schemas.microsoft.com/office/drawing/2014/main" id="{642A4954-D8E0-4C0D-B4A7-23E696B306FD}"/>
+                <a16:creationId xmlns:a16="http://schemas.microsoft.com/office/drawing/2014/main" xmlns="" id="{642A4954-D8E0-4C0D-B4A7-23E696B306FD}"/>
               </a:ext>
             </a:extLst>
           </p:cNvPr>
@@ -4659,15 +5332,15 @@
           <a:p>
             <a:r>
               <a:rPr lang="en-GB" dirty="0"/>
-              <a:t>Domino as a  datastore and </a:t>
-            </a:r>
-            <a:r>
-              <a:rPr lang="en-GB" dirty="0" err="1"/>
-              <a:t>api</a:t>
-            </a:r>
-            <a:r>
-              <a:rPr lang="en-GB" dirty="0"/>
-              <a:t> gateway</a:t>
+              <a:t>Domino as a  </a:t>
+            </a:r>
+            <a:r>
+              <a:rPr lang="en-GB" dirty="0"/>
+              <a:t>datastore</a:t>
+            </a:r>
+            <a:r>
+              <a:rPr lang="en-GB" dirty="0"/>
+              <a:t> and api gateway</a:t>
             </a:r>
           </a:p>
         </p:txBody>
@@ -4707,7 +5380,7 @@
           <p:cNvPr id="2" name="Title 1">
             <a:extLst>
               <a:ext uri="{FF2B5EF4-FFF2-40B4-BE49-F238E27FC236}">
-                <a16:creationId xmlns:a16="http://schemas.microsoft.com/office/drawing/2014/main" id="{1A530216-0158-4426-8CAF-8D17A505629F}"/>
+                <a16:creationId xmlns:a16="http://schemas.microsoft.com/office/drawing/2014/main" xmlns="" id="{1A530216-0158-4426-8CAF-8D17A505629F}"/>
               </a:ext>
             </a:extLst>
           </p:cNvPr>
@@ -4735,7 +5408,7 @@
           <p:cNvPr id="3" name="Content Placeholder 2">
             <a:extLst>
               <a:ext uri="{FF2B5EF4-FFF2-40B4-BE49-F238E27FC236}">
-                <a16:creationId xmlns:a16="http://schemas.microsoft.com/office/drawing/2014/main" id="{117770BD-8CC0-4139-A505-25D8CA68B2CB}"/>
+                <a16:creationId xmlns:a16="http://schemas.microsoft.com/office/drawing/2014/main" xmlns="" id="{117770BD-8CC0-4139-A505-25D8CA68B2CB}"/>
               </a:ext>
             </a:extLst>
           </p:cNvPr>
@@ -4771,10 +5444,9 @@
           </a:p>
           <a:p>
             <a:r>
-              <a:rPr lang="en-GB" dirty="0" err="1"/>
+              <a:rPr lang="en-GB" dirty="0"/>
               <a:t>XAgents</a:t>
             </a:r>
-            <a:endParaRPr lang="en-GB" dirty="0"/>
           </a:p>
           <a:p>
             <a:r>
@@ -4785,7 +5457,7 @@
               <a:t>	</a:t>
             </a:r>
             <a:r>
-              <a:rPr lang="en-GB" dirty="0" err="1">
+              <a:rPr lang="en-GB" dirty="0">
                 <a:latin typeface="Courier New" panose="02070309020205020404" pitchFamily="49" charset="0"/>
                 <a:cs typeface="Courier New" panose="02070309020205020404" pitchFamily="49" charset="0"/>
               </a:rPr>
@@ -4799,7 +5471,7 @@
               <a:t>=“</a:t>
             </a:r>
             <a:r>
-              <a:rPr lang="en-GB" dirty="0" err="1">
+              <a:rPr lang="en-GB" dirty="0">
                 <a:latin typeface="Courier New" panose="02070309020205020404" pitchFamily="49" charset="0"/>
                 <a:cs typeface="Courier New" panose="02070309020205020404" pitchFamily="49" charset="0"/>
               </a:rPr>
@@ -4815,10 +5487,9 @@
           </a:p>
           <a:p>
             <a:r>
-              <a:rPr lang="en-GB" dirty="0" err="1"/>
+              <a:rPr lang="en-GB" dirty="0"/>
               <a:t>SmartNSF</a:t>
             </a:r>
-            <a:endParaRPr lang="en-GB" dirty="0"/>
           </a:p>
           <a:p>
             <a:r>
@@ -4840,12 +5511,8 @@
           </a:p>
           <a:p>
             <a:r>
-              <a:rPr lang="en-GB" dirty="0" err="1"/>
-              <a:t>Darwino</a:t>
-            </a:r>
-            <a:r>
-              <a:rPr lang="en-GB" dirty="0"/>
-              <a:t> Microservices</a:t>
+              <a:rPr lang="en-GB" dirty="0"/>
+              <a:t>Darwino Microservices</a:t>
             </a:r>
           </a:p>
         </p:txBody>
@@ -4885,7 +5552,7 @@
           <p:cNvPr id="2" name="Title 1">
             <a:extLst>
               <a:ext uri="{FF2B5EF4-FFF2-40B4-BE49-F238E27FC236}">
-                <a16:creationId xmlns:a16="http://schemas.microsoft.com/office/drawing/2014/main" id="{DA325B3B-EB04-4DFE-AF62-DA7694510789}"/>
+                <a16:creationId xmlns:a16="http://schemas.microsoft.com/office/drawing/2014/main" xmlns="" id="{DA325B3B-EB04-4DFE-AF62-DA7694510789}"/>
               </a:ext>
             </a:extLst>
           </p:cNvPr>
@@ -4913,7 +5580,7 @@
           <p:cNvPr id="3" name="Content Placeholder 2">
             <a:extLst>
               <a:ext uri="{FF2B5EF4-FFF2-40B4-BE49-F238E27FC236}">
-                <a16:creationId xmlns:a16="http://schemas.microsoft.com/office/drawing/2014/main" id="{7348DDCC-5EBE-4C1F-B496-7D6BA1B7A59F}"/>
+                <a16:creationId xmlns:a16="http://schemas.microsoft.com/office/drawing/2014/main" xmlns="" id="{7348DDCC-5EBE-4C1F-B496-7D6BA1B7A59F}"/>
               </a:ext>
             </a:extLst>
           </p:cNvPr>
@@ -5019,13 +5686,8 @@
             </a:pPr>
             <a:r>
               <a:rPr lang="en-GB" dirty="0"/>
-              <a:t>Invalid </a:t>
-            </a:r>
-            <a:r>
-              <a:rPr lang="en-GB" dirty="0" err="1"/>
-              <a:t>enums</a:t>
-            </a:r>
-            <a:endParaRPr lang="en-GB" dirty="0"/>
+              <a:t>Invalid enums</a:t>
+            </a:r>
           </a:p>
         </p:txBody>
       </p:sp>
@@ -5064,7 +5726,7 @@
           <p:cNvPr id="2" name="Title 1">
             <a:extLst>
               <a:ext uri="{FF2B5EF4-FFF2-40B4-BE49-F238E27FC236}">
-                <a16:creationId xmlns:a16="http://schemas.microsoft.com/office/drawing/2014/main" id="{DA325B3B-EB04-4DFE-AF62-DA7694510789}"/>
+                <a16:creationId xmlns:a16="http://schemas.microsoft.com/office/drawing/2014/main" xmlns="" id="{DA325B3B-EB04-4DFE-AF62-DA7694510789}"/>
               </a:ext>
             </a:extLst>
           </p:cNvPr>
@@ -5092,7 +5754,7 @@
           <p:cNvPr id="3" name="Content Placeholder 2">
             <a:extLst>
               <a:ext uri="{FF2B5EF4-FFF2-40B4-BE49-F238E27FC236}">
-                <a16:creationId xmlns:a16="http://schemas.microsoft.com/office/drawing/2014/main" id="{7348DDCC-5EBE-4C1F-B496-7D6BA1B7A59F}"/>
+                <a16:creationId xmlns:a16="http://schemas.microsoft.com/office/drawing/2014/main" xmlns="" id="{7348DDCC-5EBE-4C1F-B496-7D6BA1B7A59F}"/>
               </a:ext>
             </a:extLst>
           </p:cNvPr>
@@ -5132,15 +5794,7 @@
             </a:pPr>
             <a:r>
               <a:rPr lang="en-GB" dirty="0"/>
-              <a:t>Use header / query </a:t>
-            </a:r>
-            <a:r>
-              <a:rPr lang="en-GB" dirty="0" err="1"/>
-              <a:t>params</a:t>
-            </a:r>
-            <a:r>
-              <a:rPr lang="en-GB" dirty="0"/>
-              <a:t> correctly</a:t>
+              <a:t>Use header / query params correctly</a:t>
             </a:r>
           </a:p>
           <a:p>
@@ -5229,7 +5883,7 @@
           <p:cNvPr id="2" name="Title 1">
             <a:extLst>
               <a:ext uri="{FF2B5EF4-FFF2-40B4-BE49-F238E27FC236}">
-                <a16:creationId xmlns:a16="http://schemas.microsoft.com/office/drawing/2014/main" id="{11F888B0-6184-4E49-BE67-5D21583FAA29}"/>
+                <a16:creationId xmlns:a16="http://schemas.microsoft.com/office/drawing/2014/main" xmlns="" id="{11F888B0-6184-4E49-BE67-5D21583FAA29}"/>
               </a:ext>
             </a:extLst>
           </p:cNvPr>
@@ -5257,7 +5911,7 @@
           <p:cNvPr id="3" name="Content Placeholder 2">
             <a:extLst>
               <a:ext uri="{FF2B5EF4-FFF2-40B4-BE49-F238E27FC236}">
-                <a16:creationId xmlns:a16="http://schemas.microsoft.com/office/drawing/2014/main" id="{5D0BF05F-CB19-4169-8628-60F81EFBE59E}"/>
+                <a16:creationId xmlns:a16="http://schemas.microsoft.com/office/drawing/2014/main" xmlns="" id="{5D0BF05F-CB19-4169-8628-60F81EFBE59E}"/>
               </a:ext>
             </a:extLst>
           </p:cNvPr>
@@ -5298,16 +5952,10 @@
           </a:p>
           <a:p>
             <a:r>
-              <a:rPr lang="en-GB" dirty="0" err="1">
-                <a:hlinkClick r:id="rId3"/>
-              </a:rPr>
-              <a:t>OpenAPI</a:t>
-            </a:r>
-            <a:r>
               <a:rPr lang="en-GB" dirty="0">
                 <a:hlinkClick r:id="rId3"/>
               </a:rPr>
-              <a:t> 3.0</a:t>
+              <a:t>OpenAPI 3.0</a:t>
             </a:r>
             <a:r>
               <a:rPr lang="en-GB" dirty="0"/>
@@ -5415,7 +6063,7 @@
           <p:cNvPr id="2" name="Title 1">
             <a:extLst>
               <a:ext uri="{FF2B5EF4-FFF2-40B4-BE49-F238E27FC236}">
-                <a16:creationId xmlns:a16="http://schemas.microsoft.com/office/drawing/2014/main" id="{05AAFF9C-9D60-456C-9619-912E3CFE5A22}"/>
+                <a16:creationId xmlns:a16="http://schemas.microsoft.com/office/drawing/2014/main" xmlns="" id="{05AAFF9C-9D60-456C-9619-912E3CFE5A22}"/>
               </a:ext>
             </a:extLst>
           </p:cNvPr>
@@ -5444,7 +6092,7 @@
           <p:cNvPr id="3" name="Content Placeholder 2">
             <a:extLst>
               <a:ext uri="{FF2B5EF4-FFF2-40B4-BE49-F238E27FC236}">
-                <a16:creationId xmlns:a16="http://schemas.microsoft.com/office/drawing/2014/main" id="{C94BB55B-6C89-4F4B-A953-BD358C4216B6}"/>
+                <a16:creationId xmlns:a16="http://schemas.microsoft.com/office/drawing/2014/main" xmlns="" id="{C94BB55B-6C89-4F4B-A953-BD358C4216B6}"/>
               </a:ext>
             </a:extLst>
           </p:cNvPr>
@@ -5476,7 +6124,7 @@
           </a:p>
           <a:p>
             <a:r>
-              <a:rPr lang="en-GB" dirty="0" err="1"/>
+              <a:rPr lang="en-GB" dirty="0"/>
               <a:t>operationIds</a:t>
             </a:r>
             <a:r>
@@ -5493,25 +6141,13 @@
           <a:p>
             <a:r>
               <a:rPr lang="en-GB" dirty="0"/>
-              <a:t>Use </a:t>
-            </a:r>
-            <a:r>
-              <a:rPr lang="en-GB" dirty="0" err="1"/>
-              <a:t>enums</a:t>
-            </a:r>
-            <a:r>
-              <a:rPr lang="en-GB" dirty="0"/>
-              <a:t> for options</a:t>
-            </a:r>
-          </a:p>
-          <a:p>
-            <a:r>
-              <a:rPr lang="en-GB" dirty="0" err="1"/>
-              <a:t>OpenAPI</a:t>
-            </a:r>
-            <a:r>
-              <a:rPr lang="en-GB" dirty="0"/>
-              <a:t> 3.0 allows examples, but </a:t>
+              <a:t>Use enums for options</a:t>
+            </a:r>
+          </a:p>
+          <a:p>
+            <a:r>
+              <a:rPr lang="en-GB" dirty="0"/>
+              <a:t>OpenAPI 3.0 allows examples, but </a:t>
             </a:r>
             <a:r>
               <a:rPr lang="en-GB" b="1" dirty="0"/>
@@ -5565,7 +6201,7 @@
           <p:cNvPr id="2" name="Title 1">
             <a:extLst>
               <a:ext uri="{FF2B5EF4-FFF2-40B4-BE49-F238E27FC236}">
-                <a16:creationId xmlns:a16="http://schemas.microsoft.com/office/drawing/2014/main" id="{701EB0D4-BE51-4EB9-95BA-1387E3008DA7}"/>
+                <a16:creationId xmlns:a16="http://schemas.microsoft.com/office/drawing/2014/main" xmlns="" id="{701EB0D4-BE51-4EB9-95BA-1387E3008DA7}"/>
               </a:ext>
             </a:extLst>
           </p:cNvPr>
@@ -5593,7 +6229,7 @@
           <p:cNvPr id="3" name="Content Placeholder 2">
             <a:extLst>
               <a:ext uri="{FF2B5EF4-FFF2-40B4-BE49-F238E27FC236}">
-                <a16:creationId xmlns:a16="http://schemas.microsoft.com/office/drawing/2014/main" id="{090C2521-717E-412B-B21A-03628179FB11}"/>
+                <a16:creationId xmlns:a16="http://schemas.microsoft.com/office/drawing/2014/main" xmlns="" id="{090C2521-717E-412B-B21A-03628179FB11}"/>
               </a:ext>
             </a:extLst>
           </p:cNvPr>
@@ -5630,7 +6266,7 @@
               <a:buChar char="-"/>
             </a:pPr>
             <a:r>
-              <a:rPr lang="en-GB" dirty="0" err="1"/>
+              <a:rPr lang="en-GB" dirty="0"/>
               <a:t>RestClient</a:t>
             </a:r>
             <a:r>
@@ -5675,7 +6311,7 @@
           <p:cNvPr id="2" name="Title 1">
             <a:extLst>
               <a:ext uri="{FF2B5EF4-FFF2-40B4-BE49-F238E27FC236}">
-                <a16:creationId xmlns:a16="http://schemas.microsoft.com/office/drawing/2014/main" id="{28D4950E-C911-48D5-B236-0A6C79E2A3E6}"/>
+                <a16:creationId xmlns:a16="http://schemas.microsoft.com/office/drawing/2014/main" xmlns="" id="{28D4950E-C911-48D5-B236-0A6C79E2A3E6}"/>
               </a:ext>
             </a:extLst>
           </p:cNvPr>
@@ -5703,7 +6339,7 @@
           <p:cNvPr id="3" name="Content Placeholder 2">
             <a:extLst>
               <a:ext uri="{FF2B5EF4-FFF2-40B4-BE49-F238E27FC236}">
-                <a16:creationId xmlns:a16="http://schemas.microsoft.com/office/drawing/2014/main" id="{D2C3A57F-87ED-48C2-9CAC-38FA5FE319DC}"/>
+                <a16:creationId xmlns:a16="http://schemas.microsoft.com/office/drawing/2014/main" xmlns="" id="{D2C3A57F-87ED-48C2-9CAC-38FA5FE319DC}"/>
               </a:ext>
             </a:extLst>
           </p:cNvPr>
@@ -5795,7 +6431,7 @@
           <p:cNvPr id="2" name="Title 1">
             <a:extLst>
               <a:ext uri="{FF2B5EF4-FFF2-40B4-BE49-F238E27FC236}">
-                <a16:creationId xmlns:a16="http://schemas.microsoft.com/office/drawing/2014/main" id="{BDDECFA5-674E-480C-9B09-ECB6EAFBCFD0}"/>
+                <a16:creationId xmlns:a16="http://schemas.microsoft.com/office/drawing/2014/main" xmlns="" id="{BDDECFA5-674E-480C-9B09-ECB6EAFBCFD0}"/>
               </a:ext>
             </a:extLst>
           </p:cNvPr>
@@ -5823,7 +6459,7 @@
           <p:cNvPr id="3" name="Content Placeholder 2">
             <a:extLst>
               <a:ext uri="{FF2B5EF4-FFF2-40B4-BE49-F238E27FC236}">
-                <a16:creationId xmlns:a16="http://schemas.microsoft.com/office/drawing/2014/main" id="{7E62BE25-35A8-46F0-8E50-33C5CC9893D2}"/>
+                <a16:creationId xmlns:a16="http://schemas.microsoft.com/office/drawing/2014/main" xmlns="" id="{7E62BE25-35A8-46F0-8E50-33C5CC9893D2}"/>
               </a:ext>
             </a:extLst>
           </p:cNvPr>
@@ -5921,7 +6557,7 @@
           <p:cNvPr id="4" name="Title 3">
             <a:extLst>
               <a:ext uri="{FF2B5EF4-FFF2-40B4-BE49-F238E27FC236}">
-                <a16:creationId xmlns:a16="http://schemas.microsoft.com/office/drawing/2014/main" id="{242D3F1F-5602-49F4-A125-78B334E5873C}"/>
+                <a16:creationId xmlns:a16="http://schemas.microsoft.com/office/drawing/2014/main" xmlns="" id="{242D3F1F-5602-49F4-A125-78B334E5873C}"/>
               </a:ext>
             </a:extLst>
           </p:cNvPr>
@@ -5938,12 +6574,8 @@
           <a:lstStyle/>
           <a:p>
             <a:r>
-              <a:rPr lang="en-GB" dirty="0" err="1"/>
-              <a:t>paul</a:t>
-            </a:r>
-            <a:r>
-              <a:rPr lang="en-GB" dirty="0"/>
-              <a:t> Withers</a:t>
+              <a:rPr lang="en-GB" dirty="0"/>
+              <a:t>paul Withers</a:t>
             </a:r>
           </a:p>
         </p:txBody>
@@ -5953,7 +6585,7 @@
           <p:cNvPr id="5" name="Content Placeholder 4">
             <a:extLst>
               <a:ext uri="{FF2B5EF4-FFF2-40B4-BE49-F238E27FC236}">
-                <a16:creationId xmlns:a16="http://schemas.microsoft.com/office/drawing/2014/main" id="{C13B6473-AA5C-4554-9024-49310ACBC255}"/>
+                <a16:creationId xmlns:a16="http://schemas.microsoft.com/office/drawing/2014/main" xmlns="" id="{C13B6473-AA5C-4554-9024-49310ACBC255}"/>
               </a:ext>
             </a:extLst>
           </p:cNvPr>
@@ -5981,12 +6613,8 @@
           </a:p>
           <a:p>
             <a:r>
-              <a:rPr lang="en-GB" dirty="0" err="1"/>
-              <a:t>OpenNTF</a:t>
-            </a:r>
-            <a:r>
-              <a:rPr lang="en-GB" dirty="0"/>
-              <a:t> Board Member</a:t>
+              <a:rPr lang="en-GB" dirty="0"/>
+              <a:t>OpenNTF Board Member</a:t>
             </a:r>
           </a:p>
           <a:p>
@@ -5998,13 +6626,8 @@
           <a:p>
             <a:r>
               <a:rPr lang="en-GB" dirty="0"/>
-              <a:t>@</a:t>
-            </a:r>
-            <a:r>
-              <a:rPr lang="en-GB" dirty="0" err="1"/>
-              <a:t>paulswithers</a:t>
-            </a:r>
-            <a:endParaRPr lang="en-GB" dirty="0"/>
+              <a:t>@paulswithers</a:t>
+            </a:r>
           </a:p>
         </p:txBody>
       </p:sp>
@@ -6013,7 +6636,7 @@
           <p:cNvPr id="9" name="Arrow: Right 8">
             <a:extLst>
               <a:ext uri="{FF2B5EF4-FFF2-40B4-BE49-F238E27FC236}">
-                <a16:creationId xmlns:a16="http://schemas.microsoft.com/office/drawing/2014/main" id="{9D07E98F-A5EC-4BA5-B706-FA5F0ED79C9A}"/>
+                <a16:creationId xmlns:a16="http://schemas.microsoft.com/office/drawing/2014/main" xmlns="" id="{9D07E98F-A5EC-4BA5-B706-FA5F0ED79C9A}"/>
               </a:ext>
             </a:extLst>
           </p:cNvPr>
@@ -6083,7 +6706,7 @@
           <p:cNvPr id="10" name="Group 9">
             <a:extLst>
               <a:ext uri="{FF2B5EF4-FFF2-40B4-BE49-F238E27FC236}">
-                <a16:creationId xmlns:a16="http://schemas.microsoft.com/office/drawing/2014/main" id="{AF0A7D2A-1ED2-4864-A5F4-0D140FB92B9B}"/>
+                <a16:creationId xmlns:a16="http://schemas.microsoft.com/office/drawing/2014/main" xmlns="" id="{AF0A7D2A-1ED2-4864-A5F4-0D140FB92B9B}"/>
               </a:ext>
             </a:extLst>
           </p:cNvPr>
@@ -6109,7 +6732,7 @@
             <p:cNvPr id="20" name="Rectangle: Rounded Corners 19">
               <a:extLst>
                 <a:ext uri="{FF2B5EF4-FFF2-40B4-BE49-F238E27FC236}">
-                  <a16:creationId xmlns:a16="http://schemas.microsoft.com/office/drawing/2014/main" id="{42194522-2AE0-45FA-94D1-5C3A1A519BCC}"/>
+                  <a16:creationId xmlns:a16="http://schemas.microsoft.com/office/drawing/2014/main" xmlns="" id="{42194522-2AE0-45FA-94D1-5C3A1A519BCC}"/>
                 </a:ext>
               </a:extLst>
             </p:cNvPr>
@@ -6163,7 +6786,7 @@
             <p:cNvPr id="21" name="Rectangle: Rounded Corners 5">
               <a:extLst>
                 <a:ext uri="{FF2B5EF4-FFF2-40B4-BE49-F238E27FC236}">
-                  <a16:creationId xmlns:a16="http://schemas.microsoft.com/office/drawing/2014/main" id="{861A16B5-D4B4-4670-A45F-34D508101688}"/>
+                  <a16:creationId xmlns:a16="http://schemas.microsoft.com/office/drawing/2014/main" xmlns="" id="{861A16B5-D4B4-4670-A45F-34D508101688}"/>
                 </a:ext>
               </a:extLst>
             </p:cNvPr>
@@ -6225,7 +6848,7 @@
           <p:cNvPr id="11" name="Group 10">
             <a:extLst>
               <a:ext uri="{FF2B5EF4-FFF2-40B4-BE49-F238E27FC236}">
-                <a16:creationId xmlns:a16="http://schemas.microsoft.com/office/drawing/2014/main" id="{CBB29DE9-20E8-453E-8816-D198CD4251AF}"/>
+                <a16:creationId xmlns:a16="http://schemas.microsoft.com/office/drawing/2014/main" xmlns="" id="{CBB29DE9-20E8-453E-8816-D198CD4251AF}"/>
               </a:ext>
             </a:extLst>
           </p:cNvPr>
@@ -6251,7 +6874,7 @@
             <p:cNvPr id="18" name="Rectangle: Rounded Corners 17">
               <a:extLst>
                 <a:ext uri="{FF2B5EF4-FFF2-40B4-BE49-F238E27FC236}">
-                  <a16:creationId xmlns:a16="http://schemas.microsoft.com/office/drawing/2014/main" id="{C417FA2E-811C-440B-B6DE-DDE93137815A}"/>
+                  <a16:creationId xmlns:a16="http://schemas.microsoft.com/office/drawing/2014/main" xmlns="" id="{C417FA2E-811C-440B-B6DE-DDE93137815A}"/>
                 </a:ext>
               </a:extLst>
             </p:cNvPr>
@@ -6305,7 +6928,7 @@
             <p:cNvPr id="19" name="Rectangle: Rounded Corners 7">
               <a:extLst>
                 <a:ext uri="{FF2B5EF4-FFF2-40B4-BE49-F238E27FC236}">
-                  <a16:creationId xmlns:a16="http://schemas.microsoft.com/office/drawing/2014/main" id="{110F1258-6F73-42E9-B344-03EE53497FAB}"/>
+                  <a16:creationId xmlns:a16="http://schemas.microsoft.com/office/drawing/2014/main" xmlns="" id="{110F1258-6F73-42E9-B344-03EE53497FAB}"/>
                 </a:ext>
               </a:extLst>
             </p:cNvPr>
@@ -6355,12 +6978,8 @@
                 <a:buNone/>
               </a:pPr>
               <a:r>
-                <a:rPr lang="en-US" sz="1700" kern="1200" dirty="0" err="1"/>
-                <a:t>XPages</a:t>
-              </a:r>
-              <a:r>
                 <a:rPr lang="en-US" sz="1700" kern="1200" dirty="0"/>
-                <a:t> Developer</a:t>
+                <a:t>XPages Developer</a:t>
               </a:r>
             </a:p>
           </p:txBody>
@@ -6371,7 +6990,7 @@
           <p:cNvPr id="12" name="Group 11">
             <a:extLst>
               <a:ext uri="{FF2B5EF4-FFF2-40B4-BE49-F238E27FC236}">
-                <a16:creationId xmlns:a16="http://schemas.microsoft.com/office/drawing/2014/main" id="{836C9D76-D131-4697-87D2-EAE3576FADB0}"/>
+                <a16:creationId xmlns:a16="http://schemas.microsoft.com/office/drawing/2014/main" xmlns="" id="{836C9D76-D131-4697-87D2-EAE3576FADB0}"/>
               </a:ext>
             </a:extLst>
           </p:cNvPr>
@@ -6397,7 +7016,7 @@
             <p:cNvPr id="16" name="Rectangle: Rounded Corners 15">
               <a:extLst>
                 <a:ext uri="{FF2B5EF4-FFF2-40B4-BE49-F238E27FC236}">
-                  <a16:creationId xmlns:a16="http://schemas.microsoft.com/office/drawing/2014/main" id="{07C25609-83FE-48AD-A91A-9D291B9844E8}"/>
+                  <a16:creationId xmlns:a16="http://schemas.microsoft.com/office/drawing/2014/main" xmlns="" id="{07C25609-83FE-48AD-A91A-9D291B9844E8}"/>
                 </a:ext>
               </a:extLst>
             </p:cNvPr>
@@ -6451,7 +7070,7 @@
             <p:cNvPr id="17" name="Rectangle: Rounded Corners 9">
               <a:extLst>
                 <a:ext uri="{FF2B5EF4-FFF2-40B4-BE49-F238E27FC236}">
-                  <a16:creationId xmlns:a16="http://schemas.microsoft.com/office/drawing/2014/main" id="{1C28D283-4C25-428A-B342-E8B990D73AFB}"/>
+                  <a16:creationId xmlns:a16="http://schemas.microsoft.com/office/drawing/2014/main" xmlns="" id="{1C28D283-4C25-428A-B342-E8B990D73AFB}"/>
                 </a:ext>
               </a:extLst>
             </p:cNvPr>
@@ -6513,7 +7132,7 @@
           <p:cNvPr id="13" name="Group 12">
             <a:extLst>
               <a:ext uri="{FF2B5EF4-FFF2-40B4-BE49-F238E27FC236}">
-                <a16:creationId xmlns:a16="http://schemas.microsoft.com/office/drawing/2014/main" id="{950B76FC-5A2D-4D73-9FA6-A4F0765716C1}"/>
+                <a16:creationId xmlns:a16="http://schemas.microsoft.com/office/drawing/2014/main" xmlns="" id="{950B76FC-5A2D-4D73-9FA6-A4F0765716C1}"/>
               </a:ext>
             </a:extLst>
           </p:cNvPr>
@@ -6539,7 +7158,7 @@
             <p:cNvPr id="14" name="Rectangle: Rounded Corners 13">
               <a:extLst>
                 <a:ext uri="{FF2B5EF4-FFF2-40B4-BE49-F238E27FC236}">
-                  <a16:creationId xmlns:a16="http://schemas.microsoft.com/office/drawing/2014/main" id="{F40D22CD-D3F7-4AA7-A9E4-AB0C7FA72C8C}"/>
+                  <a16:creationId xmlns:a16="http://schemas.microsoft.com/office/drawing/2014/main" xmlns="" id="{F40D22CD-D3F7-4AA7-A9E4-AB0C7FA72C8C}"/>
                 </a:ext>
               </a:extLst>
             </p:cNvPr>
@@ -6593,7 +7212,7 @@
             <p:cNvPr id="15" name="Rectangle: Rounded Corners 11">
               <a:extLst>
                 <a:ext uri="{FF2B5EF4-FFF2-40B4-BE49-F238E27FC236}">
-                  <a16:creationId xmlns:a16="http://schemas.microsoft.com/office/drawing/2014/main" id="{A2368F2E-FBBE-4C6A-BD1D-1811DB8E0402}"/>
+                  <a16:creationId xmlns:a16="http://schemas.microsoft.com/office/drawing/2014/main" xmlns="" id="{A2368F2E-FBBE-4C6A-BD1D-1811DB8E0402}"/>
                 </a:ext>
               </a:extLst>
             </p:cNvPr>
@@ -6655,7 +7274,7 @@
           <p:cNvPr id="3" name="Picture 2">
             <a:extLst>
               <a:ext uri="{FF2B5EF4-FFF2-40B4-BE49-F238E27FC236}">
-                <a16:creationId xmlns:a16="http://schemas.microsoft.com/office/drawing/2014/main" id="{94760CA3-AC51-4954-84AD-413C7C605AAB}"/>
+                <a16:creationId xmlns:a16="http://schemas.microsoft.com/office/drawing/2014/main" xmlns="" id="{94760CA3-AC51-4954-84AD-413C7C605AAB}"/>
               </a:ext>
             </a:extLst>
           </p:cNvPr>
@@ -6715,7 +7334,7 @@
           <p:cNvPr id="2" name="Title 1">
             <a:extLst>
               <a:ext uri="{FF2B5EF4-FFF2-40B4-BE49-F238E27FC236}">
-                <a16:creationId xmlns:a16="http://schemas.microsoft.com/office/drawing/2014/main" id="{28D4950E-C911-48D5-B236-0A6C79E2A3E6}"/>
+                <a16:creationId xmlns:a16="http://schemas.microsoft.com/office/drawing/2014/main" xmlns="" id="{28D4950E-C911-48D5-B236-0A6C79E2A3E6}"/>
               </a:ext>
             </a:extLst>
           </p:cNvPr>
@@ -6743,7 +7362,7 @@
           <p:cNvPr id="3" name="Content Placeholder 2">
             <a:extLst>
               <a:ext uri="{FF2B5EF4-FFF2-40B4-BE49-F238E27FC236}">
-                <a16:creationId xmlns:a16="http://schemas.microsoft.com/office/drawing/2014/main" id="{D2C3A57F-87ED-48C2-9CAC-38FA5FE319DC}"/>
+                <a16:creationId xmlns:a16="http://schemas.microsoft.com/office/drawing/2014/main" xmlns="" id="{D2C3A57F-87ED-48C2-9CAC-38FA5FE319DC}"/>
               </a:ext>
             </a:extLst>
           </p:cNvPr>
@@ -6851,7 +7470,7 @@
           <p:cNvPr id="4" name="Title 3">
             <a:extLst>
               <a:ext uri="{FF2B5EF4-FFF2-40B4-BE49-F238E27FC236}">
-                <a16:creationId xmlns:a16="http://schemas.microsoft.com/office/drawing/2014/main" id="{380905A8-B705-4037-8A33-724430522F63}"/>
+                <a16:creationId xmlns:a16="http://schemas.microsoft.com/office/drawing/2014/main" xmlns="" id="{380905A8-B705-4037-8A33-724430522F63}"/>
               </a:ext>
             </a:extLst>
           </p:cNvPr>
@@ -6909,7 +7528,7 @@
           <p:cNvPr id="4" name="Title 3">
             <a:extLst>
               <a:ext uri="{FF2B5EF4-FFF2-40B4-BE49-F238E27FC236}">
-                <a16:creationId xmlns:a16="http://schemas.microsoft.com/office/drawing/2014/main" id="{5F661A78-1620-4819-8674-16466DDEA36A}"/>
+                <a16:creationId xmlns:a16="http://schemas.microsoft.com/office/drawing/2014/main" xmlns="" id="{5F661A78-1620-4819-8674-16466DDEA36A}"/>
               </a:ext>
             </a:extLst>
           </p:cNvPr>
@@ -6937,7 +7556,7 @@
           <p:cNvPr id="5" name="Content Placeholder 4">
             <a:extLst>
               <a:ext uri="{FF2B5EF4-FFF2-40B4-BE49-F238E27FC236}">
-                <a16:creationId xmlns:a16="http://schemas.microsoft.com/office/drawing/2014/main" id="{D8951B21-ADD7-4D86-B572-B18845D6A0F7}"/>
+                <a16:creationId xmlns:a16="http://schemas.microsoft.com/office/drawing/2014/main" xmlns="" id="{D8951B21-ADD7-4D86-B572-B18845D6A0F7}"/>
               </a:ext>
             </a:extLst>
           </p:cNvPr>
@@ -7023,7 +7642,7 @@
           <p:cNvPr id="2" name="Title 1">
             <a:extLst>
               <a:ext uri="{FF2B5EF4-FFF2-40B4-BE49-F238E27FC236}">
-                <a16:creationId xmlns:a16="http://schemas.microsoft.com/office/drawing/2014/main" id="{004A5E56-F513-4A94-A58F-4235E160341C}"/>
+                <a16:creationId xmlns:a16="http://schemas.microsoft.com/office/drawing/2014/main" xmlns="" id="{004A5E56-F513-4A94-A58F-4235E160341C}"/>
               </a:ext>
             </a:extLst>
           </p:cNvPr>
@@ -7051,7 +7670,7 @@
           <p:cNvPr id="3" name="Content Placeholder 2">
             <a:extLst>
               <a:ext uri="{FF2B5EF4-FFF2-40B4-BE49-F238E27FC236}">
-                <a16:creationId xmlns:a16="http://schemas.microsoft.com/office/drawing/2014/main" id="{3FAAA951-B22E-4803-A2C0-9CF1E7E33F9E}"/>
+                <a16:creationId xmlns:a16="http://schemas.microsoft.com/office/drawing/2014/main" xmlns="" id="{3FAAA951-B22E-4803-A2C0-9CF1E7E33F9E}"/>
               </a:ext>
             </a:extLst>
           </p:cNvPr>
@@ -7075,29 +7694,13 @@
           <a:p>
             <a:r>
               <a:rPr lang="en-GB" dirty="0"/>
-              <a:t>	XAgent / </a:t>
-            </a:r>
-            <a:r>
-              <a:rPr lang="en-GB" dirty="0" err="1"/>
-              <a:t>SmartNSF</a:t>
-            </a:r>
-            <a:r>
-              <a:rPr lang="en-GB" dirty="0"/>
-              <a:t> / or REST endpoint</a:t>
-            </a:r>
-          </a:p>
-          <a:p>
-            <a:r>
-              <a:rPr lang="en-GB" dirty="0"/>
-              <a:t>	Use </a:t>
-            </a:r>
-            <a:r>
-              <a:rPr lang="en-GB" dirty="0" err="1"/>
-              <a:t>Xots</a:t>
-            </a:r>
-            <a:r>
-              <a:rPr lang="en-GB" dirty="0"/>
-              <a:t> for background processing</a:t>
+              <a:t>	XAgent / SmartNSF / or REST endpoint</a:t>
+            </a:r>
+          </a:p>
+          <a:p>
+            <a:r>
+              <a:rPr lang="en-GB" dirty="0"/>
+              <a:t>	Use Xots for background processing</a:t>
             </a:r>
           </a:p>
           <a:p>
@@ -7162,7 +7765,7 @@
           <p:cNvPr id="2" name="Title 1">
             <a:extLst>
               <a:ext uri="{FF2B5EF4-FFF2-40B4-BE49-F238E27FC236}">
-                <a16:creationId xmlns:a16="http://schemas.microsoft.com/office/drawing/2014/main" id="{C6E669E2-BE11-4459-8C18-5C4763A43502}"/>
+                <a16:creationId xmlns:a16="http://schemas.microsoft.com/office/drawing/2014/main" xmlns="" id="{C6E669E2-BE11-4459-8C18-5C4763A43502}"/>
               </a:ext>
             </a:extLst>
           </p:cNvPr>
@@ -7190,7 +7793,7 @@
           <p:cNvPr id="3" name="Content Placeholder 2">
             <a:extLst>
               <a:ext uri="{FF2B5EF4-FFF2-40B4-BE49-F238E27FC236}">
-                <a16:creationId xmlns:a16="http://schemas.microsoft.com/office/drawing/2014/main" id="{04E0A162-6297-49FF-BA4C-61E31142ED8B}"/>
+                <a16:creationId xmlns:a16="http://schemas.microsoft.com/office/drawing/2014/main" xmlns="" id="{04E0A162-6297-49FF-BA4C-61E31142ED8B}"/>
               </a:ext>
             </a:extLst>
           </p:cNvPr>
@@ -7284,7 +7887,7 @@
           <p:cNvPr id="2" name="Title 1">
             <a:extLst>
               <a:ext uri="{FF2B5EF4-FFF2-40B4-BE49-F238E27FC236}">
-                <a16:creationId xmlns:a16="http://schemas.microsoft.com/office/drawing/2014/main" id="{BAD95756-30F2-4F38-B406-1C6C78CB70D0}"/>
+                <a16:creationId xmlns:a16="http://schemas.microsoft.com/office/drawing/2014/main" xmlns="" id="{BAD95756-30F2-4F38-B406-1C6C78CB70D0}"/>
               </a:ext>
             </a:extLst>
           </p:cNvPr>
@@ -7312,7 +7915,7 @@
           <p:cNvPr id="3" name="Content Placeholder 2">
             <a:extLst>
               <a:ext uri="{FF2B5EF4-FFF2-40B4-BE49-F238E27FC236}">
-                <a16:creationId xmlns:a16="http://schemas.microsoft.com/office/drawing/2014/main" id="{FC80F034-E016-44D5-B815-A5E0F3FD05FE}"/>
+                <a16:creationId xmlns:a16="http://schemas.microsoft.com/office/drawing/2014/main" xmlns="" id="{FC80F034-E016-44D5-B815-A5E0F3FD05FE}"/>
               </a:ext>
             </a:extLst>
           </p:cNvPr>
@@ -7335,13 +7938,13 @@
           </a:p>
           <a:p>
             <a:r>
-              <a:rPr lang="en-GB" dirty="0" err="1">
+              <a:rPr lang="en-GB" dirty="0">
                 <a:hlinkClick r:id="rId3"/>
               </a:rPr>
               <a:t>ngrok</a:t>
             </a:r>
             <a:r>
-              <a:rPr lang="en-GB" dirty="0"/>
+              <a:rPr lang="en-GB"/>
               <a:t> provides secure tunnels</a:t>
             </a:r>
           </a:p>
@@ -7353,7 +7956,7 @@
               <a:t>cmder</a:t>
             </a:r>
             <a:r>
-              <a:rPr lang="en-GB" dirty="0"/>
+              <a:rPr lang="en-GB"/>
               <a:t> is a good console emulator for Windows</a:t>
             </a:r>
           </a:p>
@@ -7367,7 +7970,7 @@
           <p:cNvPr id="4" name="Picture 3">
             <a:extLst>
               <a:ext uri="{FF2B5EF4-FFF2-40B4-BE49-F238E27FC236}">
-                <a16:creationId xmlns:a16="http://schemas.microsoft.com/office/drawing/2014/main" id="{98A35C8F-A351-43A9-9D73-DA5810CA9FAE}"/>
+                <a16:creationId xmlns:a16="http://schemas.microsoft.com/office/drawing/2014/main" xmlns="" id="{98A35C8F-A351-43A9-9D73-DA5810CA9FAE}"/>
               </a:ext>
             </a:extLst>
           </p:cNvPr>
@@ -7405,6 +8008,519 @@
 </p:sld>
 </file>
 
+<file path=ppt/slides/slide26.xml><?xml version="1.0" encoding="utf-8"?>
+<p:sld xmlns:a="http://schemas.openxmlformats.org/drawingml/2006/main" xmlns:r="http://schemas.openxmlformats.org/officeDocument/2006/relationships" xmlns:p="http://schemas.openxmlformats.org/presentationml/2006/main">
+  <p:cSld>
+    <p:spTree>
+      <p:nvGrpSpPr>
+        <p:cNvPr id="1" name=""/>
+        <p:cNvGrpSpPr/>
+        <p:nvPr/>
+      </p:nvGrpSpPr>
+      <p:grpSpPr>
+        <a:xfrm>
+          <a:off x="0" y="0"/>
+          <a:ext cx="0" cy="0"/>
+          <a:chOff x="0" y="0"/>
+          <a:chExt cx="0" cy="0"/>
+        </a:xfrm>
+      </p:grpSpPr>
+      <p:sp>
+        <p:nvSpPr>
+          <p:cNvPr id="4" name="Title 3">
+            <a:extLst>
+              <a:ext uri="{FF2B5EF4-FFF2-40B4-BE49-F238E27FC236}">
+                <a16:creationId xmlns:a16="http://schemas.microsoft.com/office/drawing/2014/main" xmlns="" id="{D691CD7C-405A-4343-A99A-F7317A35A1A1}"/>
+              </a:ext>
+            </a:extLst>
+          </p:cNvPr>
+          <p:cNvSpPr>
+            <a:spLocks noGrp="1"/>
+          </p:cNvSpPr>
+          <p:nvPr>
+            <p:ph type="ctrTitle"/>
+          </p:nvPr>
+        </p:nvSpPr>
+        <p:spPr/>
+        <p:txBody>
+          <a:bodyPr/>
+          <a:lstStyle/>
+          <a:p>
+            <a:r>
+              <a:rPr lang="en-GB" dirty="0" smtClean="0"/>
+              <a:t>Microservices For Domino</a:t>
+            </a:r>
+            <a:endParaRPr lang="en-GB" dirty="0"/>
+          </a:p>
+        </p:txBody>
+      </p:sp>
+    </p:spTree>
+    <p:extLst>
+      <p:ext uri="{BB962C8B-B14F-4D97-AF65-F5344CB8AC3E}">
+        <p14:creationId xmlns:p14="http://schemas.microsoft.com/office/powerpoint/2010/main" val="1883388647"/>
+      </p:ext>
+    </p:extLst>
+  </p:cSld>
+  <p:clrMapOvr>
+    <a:masterClrMapping/>
+  </p:clrMapOvr>
+</p:sld>
+</file>
+
+<file path=ppt/slides/slide27.xml><?xml version="1.0" encoding="utf-8"?>
+<p:sld xmlns:a="http://schemas.openxmlformats.org/drawingml/2006/main" xmlns:r="http://schemas.openxmlformats.org/officeDocument/2006/relationships" xmlns:p="http://schemas.openxmlformats.org/presentationml/2006/main">
+  <p:cSld>
+    <p:spTree>
+      <p:nvGrpSpPr>
+        <p:cNvPr id="1" name=""/>
+        <p:cNvGrpSpPr/>
+        <p:nvPr/>
+      </p:nvGrpSpPr>
+      <p:grpSpPr>
+        <a:xfrm>
+          <a:off x="0" y="0"/>
+          <a:ext cx="0" cy="0"/>
+          <a:chOff x="0" y="0"/>
+          <a:chExt cx="0" cy="0"/>
+        </a:xfrm>
+      </p:grpSpPr>
+      <p:sp>
+        <p:nvSpPr>
+          <p:cNvPr id="2" name="Title 1">
+            <a:extLst>
+              <a:ext uri="{FF2B5EF4-FFF2-40B4-BE49-F238E27FC236}">
+                <a16:creationId xmlns:a16="http://schemas.microsoft.com/office/drawing/2014/main" xmlns="" id="{004A5E56-F513-4A94-A58F-4235E160341C}"/>
+              </a:ext>
+            </a:extLst>
+          </p:cNvPr>
+          <p:cNvSpPr>
+            <a:spLocks noGrp="1"/>
+          </p:cNvSpPr>
+          <p:nvPr>
+            <p:ph type="title"/>
+          </p:nvPr>
+        </p:nvSpPr>
+        <p:spPr/>
+        <p:txBody>
+          <a:bodyPr/>
+          <a:lstStyle/>
+          <a:p>
+            <a:r>
+              <a:rPr lang="en-GB" dirty="0" smtClean="0"/>
+              <a:t>Microservice Patterns</a:t>
+            </a:r>
+            <a:endParaRPr lang="en-GB" dirty="0"/>
+          </a:p>
+        </p:txBody>
+      </p:sp>
+      <p:sp>
+        <p:nvSpPr>
+          <p:cNvPr id="3" name="Content Placeholder 2">
+            <a:extLst>
+              <a:ext uri="{FF2B5EF4-FFF2-40B4-BE49-F238E27FC236}">
+                <a16:creationId xmlns:a16="http://schemas.microsoft.com/office/drawing/2014/main" xmlns="" id="{3FAAA951-B22E-4803-A2C0-9CF1E7E33F9E}"/>
+              </a:ext>
+            </a:extLst>
+          </p:cNvPr>
+          <p:cNvSpPr>
+            <a:spLocks noGrp="1"/>
+          </p:cNvSpPr>
+          <p:nvPr>
+            <p:ph idx="1"/>
+          </p:nvPr>
+        </p:nvSpPr>
+        <p:spPr/>
+        <p:txBody>
+          <a:bodyPr>
+            <a:normAutofit lnSpcReduction="10000"/>
+          </a:bodyPr>
+          <a:lstStyle/>
+          <a:p>
+            <a:pPr marL="342900" indent="-342900">
+              <a:buFont typeface="Arial" charset="0"/>
+              <a:buChar char="•"/>
+            </a:pPr>
+            <a:r>
+              <a:rPr lang="en-GB" dirty="0" smtClean="0"/>
+              <a:t>Micro-Functions</a:t>
+            </a:r>
+            <a:endParaRPr lang="en-GB" dirty="0"/>
+          </a:p>
+          <a:p>
+            <a:pPr marL="342900" indent="-342900">
+              <a:buFont typeface="Arial" charset="0"/>
+              <a:buChar char="•"/>
+            </a:pPr>
+            <a:r>
+              <a:rPr lang="en-GB" dirty="0"/>
+              <a:t>	</a:t>
+            </a:r>
+            <a:r>
+              <a:rPr lang="en-GB" dirty="0" smtClean="0"/>
+              <a:t>Breakdown functions into re-usable/modular 	code blocks</a:t>
+            </a:r>
+            <a:endParaRPr lang="en-GB" dirty="0"/>
+          </a:p>
+          <a:p>
+            <a:pPr marL="342900" indent="-342900">
+              <a:buFont typeface="Arial" charset="0"/>
+              <a:buChar char="•"/>
+            </a:pPr>
+            <a:r>
+              <a:rPr lang="en-GB" dirty="0"/>
+              <a:t>	</a:t>
+            </a:r>
+            <a:r>
+              <a:rPr lang="en-GB" dirty="0" smtClean="0"/>
+              <a:t>Each function should do one thing and do it 	well</a:t>
+            </a:r>
+            <a:endParaRPr lang="en-GB" dirty="0"/>
+          </a:p>
+          <a:p>
+            <a:pPr marL="342900" indent="-342900">
+              <a:buFont typeface="Arial" charset="0"/>
+              <a:buChar char="•"/>
+            </a:pPr>
+            <a:r>
+              <a:rPr lang="en-GB" dirty="0"/>
+              <a:t>	</a:t>
+            </a:r>
+            <a:r>
+              <a:rPr lang="en-GB" dirty="0" smtClean="0"/>
+              <a:t>Simplify and optimize the code within each 	function</a:t>
+            </a:r>
+            <a:endParaRPr lang="en-GB" dirty="0"/>
+          </a:p>
+          <a:p>
+            <a:pPr marL="342900" indent="-342900">
+              <a:buFont typeface="Arial" charset="0"/>
+              <a:buChar char="•"/>
+            </a:pPr>
+            <a:r>
+              <a:rPr lang="en-GB" dirty="0"/>
+              <a:t>	</a:t>
+            </a:r>
+            <a:r>
+              <a:rPr lang="en-GB" dirty="0" smtClean="0"/>
+              <a:t>A function shouldn’t contain more than 80-	100 lines of code</a:t>
+            </a:r>
+            <a:endParaRPr lang="en-GB" dirty="0"/>
+          </a:p>
+          <a:p>
+            <a:pPr marL="901700" indent="-901700">
+              <a:buFont typeface="Arial" charset="0"/>
+              <a:buChar char="•"/>
+            </a:pPr>
+            <a:r>
+              <a:rPr lang="en-GB" dirty="0"/>
+              <a:t>	</a:t>
+            </a:r>
+            <a:r>
+              <a:rPr lang="en-GB" dirty="0" smtClean="0"/>
+              <a:t>Develop ”Pure Functions” whenever possible</a:t>
+            </a:r>
+            <a:endParaRPr lang="en-GB" dirty="0"/>
+          </a:p>
+        </p:txBody>
+      </p:sp>
+    </p:spTree>
+    <p:extLst>
+      <p:ext uri="{BB962C8B-B14F-4D97-AF65-F5344CB8AC3E}">
+        <p14:creationId xmlns:p14="http://schemas.microsoft.com/office/powerpoint/2010/main" val="241729178"/>
+      </p:ext>
+    </p:extLst>
+  </p:cSld>
+  <p:clrMapOvr>
+    <a:masterClrMapping/>
+  </p:clrMapOvr>
+</p:sld>
+</file>
+
+<file path=ppt/slides/slide28.xml><?xml version="1.0" encoding="utf-8"?>
+<p:sld xmlns:a="http://schemas.openxmlformats.org/drawingml/2006/main" xmlns:r="http://schemas.openxmlformats.org/officeDocument/2006/relationships" xmlns:p="http://schemas.openxmlformats.org/presentationml/2006/main">
+  <p:cSld>
+    <p:spTree>
+      <p:nvGrpSpPr>
+        <p:cNvPr id="1" name=""/>
+        <p:cNvGrpSpPr/>
+        <p:nvPr/>
+      </p:nvGrpSpPr>
+      <p:grpSpPr>
+        <a:xfrm>
+          <a:off x="0" y="0"/>
+          <a:ext cx="0" cy="0"/>
+          <a:chOff x="0" y="0"/>
+          <a:chExt cx="0" cy="0"/>
+        </a:xfrm>
+      </p:grpSpPr>
+      <p:sp>
+        <p:nvSpPr>
+          <p:cNvPr id="2" name="Title 1">
+            <a:extLst>
+              <a:ext uri="{FF2B5EF4-FFF2-40B4-BE49-F238E27FC236}">
+                <a16:creationId xmlns:a16="http://schemas.microsoft.com/office/drawing/2014/main" xmlns="" id="{004A5E56-F513-4A94-A58F-4235E160341C}"/>
+              </a:ext>
+            </a:extLst>
+          </p:cNvPr>
+          <p:cNvSpPr>
+            <a:spLocks noGrp="1"/>
+          </p:cNvSpPr>
+          <p:nvPr>
+            <p:ph type="title"/>
+          </p:nvPr>
+        </p:nvSpPr>
+        <p:spPr/>
+        <p:txBody>
+          <a:bodyPr/>
+          <a:lstStyle/>
+          <a:p>
+            <a:r>
+              <a:rPr lang="en-GB" dirty="0" smtClean="0"/>
+              <a:t>Microservice Patterns Cont.</a:t>
+            </a:r>
+            <a:endParaRPr lang="en-GB" dirty="0"/>
+          </a:p>
+        </p:txBody>
+      </p:sp>
+      <p:sp>
+        <p:nvSpPr>
+          <p:cNvPr id="3" name="Content Placeholder 2">
+            <a:extLst>
+              <a:ext uri="{FF2B5EF4-FFF2-40B4-BE49-F238E27FC236}">
+                <a16:creationId xmlns:a16="http://schemas.microsoft.com/office/drawing/2014/main" xmlns="" id="{3FAAA951-B22E-4803-A2C0-9CF1E7E33F9E}"/>
+              </a:ext>
+            </a:extLst>
+          </p:cNvPr>
+          <p:cNvSpPr>
+            <a:spLocks noGrp="1"/>
+          </p:cNvSpPr>
+          <p:nvPr>
+            <p:ph idx="1"/>
+          </p:nvPr>
+        </p:nvSpPr>
+        <p:spPr/>
+        <p:txBody>
+          <a:bodyPr>
+            <a:normAutofit/>
+          </a:bodyPr>
+          <a:lstStyle/>
+          <a:p>
+            <a:pPr marL="342900" indent="-342900">
+              <a:buFont typeface="Arial" charset="0"/>
+              <a:buChar char="•"/>
+            </a:pPr>
+            <a:r>
+              <a:rPr lang="en-GB" dirty="0" smtClean="0"/>
+              <a:t>Micro-Services</a:t>
+            </a:r>
+            <a:endParaRPr lang="en-GB" dirty="0"/>
+          </a:p>
+          <a:p>
+            <a:pPr marL="342900" indent="-342900">
+              <a:buFont typeface="Arial" charset="0"/>
+              <a:buChar char="•"/>
+            </a:pPr>
+            <a:r>
+              <a:rPr lang="en-GB" dirty="0" smtClean="0"/>
+              <a:t>	Define which micro-functions can become 	services to 3</a:t>
+            </a:r>
+            <a:r>
+              <a:rPr lang="en-GB" baseline="30000" dirty="0" smtClean="0"/>
+              <a:t>rd</a:t>
+            </a:r>
+            <a:r>
+              <a:rPr lang="en-GB" dirty="0" smtClean="0"/>
+              <a:t> party platforms and 	applications</a:t>
+            </a:r>
+          </a:p>
+          <a:p>
+            <a:pPr marL="342900" indent="-342900">
+              <a:buFont typeface="Arial" charset="0"/>
+              <a:buChar char="•"/>
+            </a:pPr>
+            <a:r>
+              <a:rPr lang="en-GB" dirty="0"/>
+              <a:t>	</a:t>
+            </a:r>
+            <a:r>
+              <a:rPr lang="en-GB" dirty="0" smtClean="0"/>
+              <a:t>Create API Endpoints that trigger your micro-	functions</a:t>
+            </a:r>
+            <a:endParaRPr lang="en-GB" dirty="0"/>
+          </a:p>
+          <a:p>
+            <a:pPr marL="342900" indent="-342900">
+              <a:buFont typeface="Arial" charset="0"/>
+              <a:buChar char="•"/>
+            </a:pPr>
+            <a:r>
+              <a:rPr lang="en-GB" dirty="0"/>
+              <a:t>	</a:t>
+            </a:r>
+            <a:r>
+              <a:rPr lang="en-GB" dirty="0" smtClean="0"/>
+              <a:t>Ensure a strong security layer for 3</a:t>
+            </a:r>
+            <a:r>
+              <a:rPr lang="en-GB" baseline="30000" dirty="0" smtClean="0"/>
+              <a:t>rd</a:t>
+            </a:r>
+            <a:r>
+              <a:rPr lang="en-GB" dirty="0" smtClean="0"/>
+              <a:t> parties to 	interface with before triggering your services</a:t>
+            </a:r>
+            <a:endParaRPr lang="en-GB" dirty="0"/>
+          </a:p>
+        </p:txBody>
+      </p:sp>
+    </p:spTree>
+    <p:extLst>
+      <p:ext uri="{BB962C8B-B14F-4D97-AF65-F5344CB8AC3E}">
+        <p14:creationId xmlns:p14="http://schemas.microsoft.com/office/powerpoint/2010/main" val="1635627779"/>
+      </p:ext>
+    </p:extLst>
+  </p:cSld>
+  <p:clrMapOvr>
+    <a:masterClrMapping/>
+  </p:clrMapOvr>
+</p:sld>
+</file>
+
+<file path=ppt/slides/slide29.xml><?xml version="1.0" encoding="utf-8"?>
+<p:sld xmlns:a="http://schemas.openxmlformats.org/drawingml/2006/main" xmlns:r="http://schemas.openxmlformats.org/officeDocument/2006/relationships" xmlns:p="http://schemas.openxmlformats.org/presentationml/2006/main">
+  <p:cSld>
+    <p:spTree>
+      <p:nvGrpSpPr>
+        <p:cNvPr id="1" name=""/>
+        <p:cNvGrpSpPr/>
+        <p:nvPr/>
+      </p:nvGrpSpPr>
+      <p:grpSpPr>
+        <a:xfrm>
+          <a:off x="0" y="0"/>
+          <a:ext cx="0" cy="0"/>
+          <a:chOff x="0" y="0"/>
+          <a:chExt cx="0" cy="0"/>
+        </a:xfrm>
+      </p:grpSpPr>
+      <p:sp>
+        <p:nvSpPr>
+          <p:cNvPr id="2" name="Title 1">
+            <a:extLst>
+              <a:ext uri="{FF2B5EF4-FFF2-40B4-BE49-F238E27FC236}">
+                <a16:creationId xmlns:a16="http://schemas.microsoft.com/office/drawing/2014/main" xmlns="" id="{004A5E56-F513-4A94-A58F-4235E160341C}"/>
+              </a:ext>
+            </a:extLst>
+          </p:cNvPr>
+          <p:cNvSpPr>
+            <a:spLocks noGrp="1"/>
+          </p:cNvSpPr>
+          <p:nvPr>
+            <p:ph type="title"/>
+          </p:nvPr>
+        </p:nvSpPr>
+        <p:spPr/>
+        <p:txBody>
+          <a:bodyPr/>
+          <a:lstStyle/>
+          <a:p>
+            <a:r>
+              <a:rPr lang="en-GB" dirty="0" smtClean="0"/>
+              <a:t>A Different Approach</a:t>
+            </a:r>
+            <a:endParaRPr lang="en-GB" dirty="0"/>
+          </a:p>
+        </p:txBody>
+      </p:sp>
+      <p:sp>
+        <p:nvSpPr>
+          <p:cNvPr id="3" name="Content Placeholder 2">
+            <a:extLst>
+              <a:ext uri="{FF2B5EF4-FFF2-40B4-BE49-F238E27FC236}">
+                <a16:creationId xmlns:a16="http://schemas.microsoft.com/office/drawing/2014/main" xmlns="" id="{3FAAA951-B22E-4803-A2C0-9CF1E7E33F9E}"/>
+              </a:ext>
+            </a:extLst>
+          </p:cNvPr>
+          <p:cNvSpPr>
+            <a:spLocks noGrp="1"/>
+          </p:cNvSpPr>
+          <p:nvPr>
+            <p:ph idx="1"/>
+          </p:nvPr>
+        </p:nvSpPr>
+        <p:spPr/>
+        <p:txBody>
+          <a:bodyPr>
+            <a:normAutofit/>
+          </a:bodyPr>
+          <a:lstStyle/>
+          <a:p>
+            <a:pPr marL="342900" indent="-342900">
+              <a:buFont typeface="Arial" charset="0"/>
+              <a:buChar char="•"/>
+            </a:pPr>
+            <a:r>
+              <a:rPr lang="en-GB" dirty="0" smtClean="0"/>
+              <a:t>Don’t build 3</a:t>
+            </a:r>
+            <a:r>
+              <a:rPr lang="en-GB" baseline="30000" dirty="0" smtClean="0"/>
+              <a:t>rd</a:t>
+            </a:r>
+            <a:r>
+              <a:rPr lang="en-GB" dirty="0" smtClean="0"/>
+              <a:t> party technologies into Domino</a:t>
+            </a:r>
+          </a:p>
+          <a:p>
+            <a:pPr marL="342900" indent="-342900">
+              <a:buFont typeface="Arial" charset="0"/>
+              <a:buChar char="•"/>
+            </a:pPr>
+            <a:r>
+              <a:rPr lang="en-GB" dirty="0" smtClean="0"/>
+              <a:t>Have these technologies exist as a sidecar to a Domino environment</a:t>
+            </a:r>
+          </a:p>
+          <a:p>
+            <a:pPr marL="342900" indent="-342900">
+              <a:buFont typeface="Arial" charset="0"/>
+              <a:buChar char="•"/>
+            </a:pPr>
+            <a:r>
+              <a:rPr lang="en-GB" dirty="0" smtClean="0"/>
+              <a:t>Each technology or service existing independently as a container</a:t>
+            </a:r>
+          </a:p>
+          <a:p>
+            <a:pPr marL="342900" indent="-342900">
+              <a:buFont typeface="Arial" charset="0"/>
+              <a:buChar char="•"/>
+            </a:pPr>
+            <a:r>
+              <a:rPr lang="en-GB" dirty="0" smtClean="0"/>
+              <a:t>All communication occurs using APIs</a:t>
+            </a:r>
+            <a:endParaRPr lang="en-GB" dirty="0" smtClean="0"/>
+          </a:p>
+          <a:p>
+            <a:endParaRPr lang="en-GB" dirty="0"/>
+          </a:p>
+        </p:txBody>
+      </p:sp>
+    </p:spTree>
+    <p:extLst>
+      <p:ext uri="{BB962C8B-B14F-4D97-AF65-F5344CB8AC3E}">
+        <p14:creationId xmlns:p14="http://schemas.microsoft.com/office/powerpoint/2010/main" val="1358255903"/>
+      </p:ext>
+    </p:extLst>
+  </p:cSld>
+  <p:clrMapOvr>
+    <a:masterClrMapping/>
+  </p:clrMapOvr>
+</p:sld>
+</file>
+
 <file path=ppt/slides/slide3.xml><?xml version="1.0" encoding="utf-8"?>
 <p:sld xmlns:a="http://schemas.openxmlformats.org/drawingml/2006/main" xmlns:r="http://schemas.openxmlformats.org/officeDocument/2006/relationships" xmlns:p="http://schemas.openxmlformats.org/presentationml/2006/main">
   <p:cSld>
@@ -7427,7 +8543,7 @@
           <p:cNvPr id="4" name="Title 3">
             <a:extLst>
               <a:ext uri="{FF2B5EF4-FFF2-40B4-BE49-F238E27FC236}">
-                <a16:creationId xmlns:a16="http://schemas.microsoft.com/office/drawing/2014/main" id="{242D3F1F-5602-49F4-A125-78B334E5873C}"/>
+                <a16:creationId xmlns:a16="http://schemas.microsoft.com/office/drawing/2014/main" xmlns="" id="{242D3F1F-5602-49F4-A125-78B334E5873C}"/>
               </a:ext>
             </a:extLst>
           </p:cNvPr>
@@ -7455,7 +8571,7 @@
           <p:cNvPr id="5" name="Content Placeholder 4">
             <a:extLst>
               <a:ext uri="{FF2B5EF4-FFF2-40B4-BE49-F238E27FC236}">
-                <a16:creationId xmlns:a16="http://schemas.microsoft.com/office/drawing/2014/main" id="{C13B6473-AA5C-4554-9024-49310ACBC255}"/>
+                <a16:creationId xmlns:a16="http://schemas.microsoft.com/office/drawing/2014/main" xmlns="" id="{C13B6473-AA5C-4554-9024-49310ACBC255}"/>
               </a:ext>
             </a:extLst>
           </p:cNvPr>
@@ -7500,7 +8616,7 @@
           <p:cNvPr id="9" name="Arrow: Right 8">
             <a:extLst>
               <a:ext uri="{FF2B5EF4-FFF2-40B4-BE49-F238E27FC236}">
-                <a16:creationId xmlns:a16="http://schemas.microsoft.com/office/drawing/2014/main" id="{9D07E98F-A5EC-4BA5-B706-FA5F0ED79C9A}"/>
+                <a16:creationId xmlns:a16="http://schemas.microsoft.com/office/drawing/2014/main" xmlns="" id="{9D07E98F-A5EC-4BA5-B706-FA5F0ED79C9A}"/>
               </a:ext>
             </a:extLst>
           </p:cNvPr>
@@ -7570,7 +8686,7 @@
           <p:cNvPr id="10" name="Group 9">
             <a:extLst>
               <a:ext uri="{FF2B5EF4-FFF2-40B4-BE49-F238E27FC236}">
-                <a16:creationId xmlns:a16="http://schemas.microsoft.com/office/drawing/2014/main" id="{AF0A7D2A-1ED2-4864-A5F4-0D140FB92B9B}"/>
+                <a16:creationId xmlns:a16="http://schemas.microsoft.com/office/drawing/2014/main" xmlns="" id="{AF0A7D2A-1ED2-4864-A5F4-0D140FB92B9B}"/>
               </a:ext>
             </a:extLst>
           </p:cNvPr>
@@ -7596,7 +8712,7 @@
             <p:cNvPr id="20" name="Rectangle: Rounded Corners 19">
               <a:extLst>
                 <a:ext uri="{FF2B5EF4-FFF2-40B4-BE49-F238E27FC236}">
-                  <a16:creationId xmlns:a16="http://schemas.microsoft.com/office/drawing/2014/main" id="{42194522-2AE0-45FA-94D1-5C3A1A519BCC}"/>
+                  <a16:creationId xmlns:a16="http://schemas.microsoft.com/office/drawing/2014/main" xmlns="" id="{42194522-2AE0-45FA-94D1-5C3A1A519BCC}"/>
                 </a:ext>
               </a:extLst>
             </p:cNvPr>
@@ -7650,7 +8766,7 @@
             <p:cNvPr id="21" name="Rectangle: Rounded Corners 5">
               <a:extLst>
                 <a:ext uri="{FF2B5EF4-FFF2-40B4-BE49-F238E27FC236}">
-                  <a16:creationId xmlns:a16="http://schemas.microsoft.com/office/drawing/2014/main" id="{861A16B5-D4B4-4670-A45F-34D508101688}"/>
+                  <a16:creationId xmlns:a16="http://schemas.microsoft.com/office/drawing/2014/main" xmlns="" id="{861A16B5-D4B4-4670-A45F-34D508101688}"/>
                 </a:ext>
               </a:extLst>
             </p:cNvPr>
@@ -7712,7 +8828,7 @@
           <p:cNvPr id="11" name="Group 10">
             <a:extLst>
               <a:ext uri="{FF2B5EF4-FFF2-40B4-BE49-F238E27FC236}">
-                <a16:creationId xmlns:a16="http://schemas.microsoft.com/office/drawing/2014/main" id="{CBB29DE9-20E8-453E-8816-D198CD4251AF}"/>
+                <a16:creationId xmlns:a16="http://schemas.microsoft.com/office/drawing/2014/main" xmlns="" id="{CBB29DE9-20E8-453E-8816-D198CD4251AF}"/>
               </a:ext>
             </a:extLst>
           </p:cNvPr>
@@ -7738,7 +8854,7 @@
             <p:cNvPr id="18" name="Rectangle: Rounded Corners 17">
               <a:extLst>
                 <a:ext uri="{FF2B5EF4-FFF2-40B4-BE49-F238E27FC236}">
-                  <a16:creationId xmlns:a16="http://schemas.microsoft.com/office/drawing/2014/main" id="{C417FA2E-811C-440B-B6DE-DDE93137815A}"/>
+                  <a16:creationId xmlns:a16="http://schemas.microsoft.com/office/drawing/2014/main" xmlns="" id="{C417FA2E-811C-440B-B6DE-DDE93137815A}"/>
                 </a:ext>
               </a:extLst>
             </p:cNvPr>
@@ -7792,7 +8908,7 @@
             <p:cNvPr id="19" name="Rectangle: Rounded Corners 7">
               <a:extLst>
                 <a:ext uri="{FF2B5EF4-FFF2-40B4-BE49-F238E27FC236}">
-                  <a16:creationId xmlns:a16="http://schemas.microsoft.com/office/drawing/2014/main" id="{110F1258-6F73-42E9-B344-03EE53497FAB}"/>
+                  <a16:creationId xmlns:a16="http://schemas.microsoft.com/office/drawing/2014/main" xmlns="" id="{110F1258-6F73-42E9-B344-03EE53497FAB}"/>
                 </a:ext>
               </a:extLst>
             </p:cNvPr>
@@ -7842,12 +8958,8 @@
                 <a:buNone/>
               </a:pPr>
               <a:r>
-                <a:rPr lang="en-US" sz="1700" kern="1200" dirty="0" err="1"/>
-                <a:t>XPages</a:t>
-              </a:r>
-              <a:r>
                 <a:rPr lang="en-US" sz="1700" kern="1200" dirty="0"/>
-                <a:t> Developer</a:t>
+                <a:t>XPages Developer</a:t>
               </a:r>
             </a:p>
           </p:txBody>
@@ -7858,7 +8970,7 @@
           <p:cNvPr id="12" name="Group 11">
             <a:extLst>
               <a:ext uri="{FF2B5EF4-FFF2-40B4-BE49-F238E27FC236}">
-                <a16:creationId xmlns:a16="http://schemas.microsoft.com/office/drawing/2014/main" id="{836C9D76-D131-4697-87D2-EAE3576FADB0}"/>
+                <a16:creationId xmlns:a16="http://schemas.microsoft.com/office/drawing/2014/main" xmlns="" id="{836C9D76-D131-4697-87D2-EAE3576FADB0}"/>
               </a:ext>
             </a:extLst>
           </p:cNvPr>
@@ -7884,7 +8996,7 @@
             <p:cNvPr id="16" name="Rectangle: Rounded Corners 15">
               <a:extLst>
                 <a:ext uri="{FF2B5EF4-FFF2-40B4-BE49-F238E27FC236}">
-                  <a16:creationId xmlns:a16="http://schemas.microsoft.com/office/drawing/2014/main" id="{07C25609-83FE-48AD-A91A-9D291B9844E8}"/>
+                  <a16:creationId xmlns:a16="http://schemas.microsoft.com/office/drawing/2014/main" xmlns="" id="{07C25609-83FE-48AD-A91A-9D291B9844E8}"/>
                 </a:ext>
               </a:extLst>
             </p:cNvPr>
@@ -7938,7 +9050,7 @@
             <p:cNvPr id="17" name="Rectangle: Rounded Corners 9">
               <a:extLst>
                 <a:ext uri="{FF2B5EF4-FFF2-40B4-BE49-F238E27FC236}">
-                  <a16:creationId xmlns:a16="http://schemas.microsoft.com/office/drawing/2014/main" id="{1C28D283-4C25-428A-B342-E8B990D73AFB}"/>
+                  <a16:creationId xmlns:a16="http://schemas.microsoft.com/office/drawing/2014/main" xmlns="" id="{1C28D283-4C25-428A-B342-E8B990D73AFB}"/>
                 </a:ext>
               </a:extLst>
             </p:cNvPr>
@@ -8000,7 +9112,7 @@
           <p:cNvPr id="13" name="Group 12">
             <a:extLst>
               <a:ext uri="{FF2B5EF4-FFF2-40B4-BE49-F238E27FC236}">
-                <a16:creationId xmlns:a16="http://schemas.microsoft.com/office/drawing/2014/main" id="{950B76FC-5A2D-4D73-9FA6-A4F0765716C1}"/>
+                <a16:creationId xmlns:a16="http://schemas.microsoft.com/office/drawing/2014/main" xmlns="" id="{950B76FC-5A2D-4D73-9FA6-A4F0765716C1}"/>
               </a:ext>
             </a:extLst>
           </p:cNvPr>
@@ -8026,7 +9138,7 @@
             <p:cNvPr id="14" name="Rectangle: Rounded Corners 13">
               <a:extLst>
                 <a:ext uri="{FF2B5EF4-FFF2-40B4-BE49-F238E27FC236}">
-                  <a16:creationId xmlns:a16="http://schemas.microsoft.com/office/drawing/2014/main" id="{F40D22CD-D3F7-4AA7-A9E4-AB0C7FA72C8C}"/>
+                  <a16:creationId xmlns:a16="http://schemas.microsoft.com/office/drawing/2014/main" xmlns="" id="{F40D22CD-D3F7-4AA7-A9E4-AB0C7FA72C8C}"/>
                 </a:ext>
               </a:extLst>
             </p:cNvPr>
@@ -8080,7 +9192,7 @@
             <p:cNvPr id="15" name="Rectangle: Rounded Corners 11">
               <a:extLst>
                 <a:ext uri="{FF2B5EF4-FFF2-40B4-BE49-F238E27FC236}">
-                  <a16:creationId xmlns:a16="http://schemas.microsoft.com/office/drawing/2014/main" id="{A2368F2E-FBBE-4C6A-BD1D-1811DB8E0402}"/>
+                  <a16:creationId xmlns:a16="http://schemas.microsoft.com/office/drawing/2014/main" xmlns="" id="{A2368F2E-FBBE-4C6A-BD1D-1811DB8E0402}"/>
                 </a:ext>
               </a:extLst>
             </p:cNvPr>
@@ -8204,6 +9316,540 @@
 </p:sld>
 </file>
 
+<file path=ppt/slides/slide30.xml><?xml version="1.0" encoding="utf-8"?>
+<p:sld xmlns:a="http://schemas.openxmlformats.org/drawingml/2006/main" xmlns:r="http://schemas.openxmlformats.org/officeDocument/2006/relationships" xmlns:p="http://schemas.openxmlformats.org/presentationml/2006/main">
+  <p:cSld>
+    <p:spTree>
+      <p:nvGrpSpPr>
+        <p:cNvPr id="1" name=""/>
+        <p:cNvGrpSpPr/>
+        <p:nvPr/>
+      </p:nvGrpSpPr>
+      <p:grpSpPr>
+        <a:xfrm>
+          <a:off x="0" y="0"/>
+          <a:ext cx="0" cy="0"/>
+          <a:chOff x="0" y="0"/>
+          <a:chExt cx="0" cy="0"/>
+        </a:xfrm>
+      </p:grpSpPr>
+      <p:sp>
+        <p:nvSpPr>
+          <p:cNvPr id="2" name="Title 1">
+            <a:extLst>
+              <a:ext uri="{FF2B5EF4-FFF2-40B4-BE49-F238E27FC236}">
+                <a16:creationId xmlns:a16="http://schemas.microsoft.com/office/drawing/2014/main" xmlns="" id="{004A5E56-F513-4A94-A58F-4235E160341C}"/>
+              </a:ext>
+            </a:extLst>
+          </p:cNvPr>
+          <p:cNvSpPr>
+            <a:spLocks noGrp="1"/>
+          </p:cNvSpPr>
+          <p:nvPr>
+            <p:ph type="title"/>
+          </p:nvPr>
+        </p:nvSpPr>
+        <p:spPr/>
+        <p:txBody>
+          <a:bodyPr/>
+          <a:lstStyle/>
+          <a:p>
+            <a:r>
+              <a:rPr lang="en-GB" dirty="0" smtClean="0"/>
+              <a:t>A Different Approach Cont.</a:t>
+            </a:r>
+            <a:endParaRPr lang="en-GB" dirty="0"/>
+          </a:p>
+        </p:txBody>
+      </p:sp>
+      <p:sp>
+        <p:nvSpPr>
+          <p:cNvPr id="3" name="Content Placeholder 2">
+            <a:extLst>
+              <a:ext uri="{FF2B5EF4-FFF2-40B4-BE49-F238E27FC236}">
+                <a16:creationId xmlns:a16="http://schemas.microsoft.com/office/drawing/2014/main" xmlns="" id="{3FAAA951-B22E-4803-A2C0-9CF1E7E33F9E}"/>
+              </a:ext>
+            </a:extLst>
+          </p:cNvPr>
+          <p:cNvSpPr>
+            <a:spLocks noGrp="1"/>
+          </p:cNvSpPr>
+          <p:nvPr>
+            <p:ph idx="1"/>
+          </p:nvPr>
+        </p:nvSpPr>
+        <p:spPr/>
+        <p:txBody>
+          <a:bodyPr>
+            <a:normAutofit lnSpcReduction="10000"/>
+          </a:bodyPr>
+          <a:lstStyle/>
+          <a:p>
+            <a:pPr marL="342900" indent="-342900">
+              <a:buFont typeface="Arial" charset="0"/>
+              <a:buChar char="•"/>
+            </a:pPr>
+            <a:r>
+              <a:rPr lang="en-GB" dirty="0" smtClean="0"/>
+              <a:t>Example 1: ReactJS User Interface</a:t>
+            </a:r>
+            <a:endParaRPr lang="en-GB" dirty="0" smtClean="0"/>
+          </a:p>
+          <a:p>
+            <a:pPr marL="1028700" lvl="1" indent="-342900">
+              <a:buFont typeface="Arial" charset="0"/>
+              <a:buChar char="•"/>
+            </a:pPr>
+            <a:r>
+              <a:rPr lang="en-GB" dirty="0" smtClean="0"/>
+              <a:t>Develop React UI using NodeJS and Webpack</a:t>
+            </a:r>
+          </a:p>
+          <a:p>
+            <a:pPr marL="1028700" lvl="1" indent="-342900">
+              <a:buFont typeface="Arial" charset="0"/>
+              <a:buChar char="•"/>
+            </a:pPr>
+            <a:r>
+              <a:rPr lang="en-GB" dirty="0" smtClean="0"/>
+              <a:t>In Domino, create API Endpoints for all relevant calls or use DAS</a:t>
+            </a:r>
+          </a:p>
+          <a:p>
+            <a:pPr marL="1028700" lvl="1" indent="-342900">
+              <a:buFont typeface="Arial" charset="0"/>
+              <a:buChar char="•"/>
+            </a:pPr>
+            <a:r>
+              <a:rPr lang="en-GB" dirty="0" smtClean="0"/>
+              <a:t>Deploy React App as a standalone container</a:t>
+            </a:r>
+            <a:endParaRPr lang="en-GB" dirty="0" smtClean="0"/>
+          </a:p>
+          <a:p>
+            <a:pPr marL="342900" indent="-342900">
+              <a:buFont typeface="Arial" charset="0"/>
+              <a:buChar char="•"/>
+            </a:pPr>
+            <a:r>
+              <a:rPr lang="en-GB" dirty="0" smtClean="0"/>
+              <a:t>Example 2: Web Socket Server</a:t>
+            </a:r>
+          </a:p>
+          <a:p>
+            <a:pPr marL="1028700" lvl="1" indent="-342900">
+              <a:buFont typeface="Arial" charset="0"/>
+              <a:buChar char="•"/>
+            </a:pPr>
+            <a:r>
+              <a:rPr lang="en-GB" dirty="0" smtClean="0"/>
+              <a:t>Create Web Socket Server using socket.io and NodeJS</a:t>
+            </a:r>
+          </a:p>
+          <a:p>
+            <a:pPr marL="1028700" lvl="1" indent="-342900">
+              <a:buFont typeface="Arial" charset="0"/>
+              <a:buChar char="•"/>
+            </a:pPr>
+            <a:r>
+              <a:rPr lang="en-GB" dirty="0" smtClean="0"/>
+              <a:t>In Domino, include socket.io for client-side communication</a:t>
+            </a:r>
+          </a:p>
+          <a:p>
+            <a:pPr marL="1028700" lvl="1" indent="-342900">
+              <a:buFont typeface="Arial" charset="0"/>
+              <a:buChar char="•"/>
+            </a:pPr>
+            <a:r>
+              <a:rPr lang="en-GB" dirty="0" smtClean="0"/>
+              <a:t>Create Web Socket events for all relevant communication</a:t>
+            </a:r>
+          </a:p>
+          <a:p>
+            <a:pPr marL="1028700" lvl="1" indent="-342900">
+              <a:buFont typeface="Arial" charset="0"/>
+              <a:buChar char="•"/>
+            </a:pPr>
+            <a:r>
+              <a:rPr lang="en-GB" dirty="0" smtClean="0"/>
+              <a:t>Deploy Web Socket Server as standalone container</a:t>
+            </a:r>
+            <a:endParaRPr lang="en-GB" dirty="0" smtClean="0"/>
+          </a:p>
+          <a:p>
+            <a:endParaRPr lang="en-GB" dirty="0"/>
+          </a:p>
+        </p:txBody>
+      </p:sp>
+    </p:spTree>
+    <p:extLst>
+      <p:ext uri="{BB962C8B-B14F-4D97-AF65-F5344CB8AC3E}">
+        <p14:creationId xmlns:p14="http://schemas.microsoft.com/office/powerpoint/2010/main" val="1294269516"/>
+      </p:ext>
+    </p:extLst>
+  </p:cSld>
+  <p:clrMapOvr>
+    <a:masterClrMapping/>
+  </p:clrMapOvr>
+</p:sld>
+</file>
+
+<file path=ppt/slides/slide31.xml><?xml version="1.0" encoding="utf-8"?>
+<p:sld xmlns:a="http://schemas.openxmlformats.org/drawingml/2006/main" xmlns:r="http://schemas.openxmlformats.org/officeDocument/2006/relationships" xmlns:p="http://schemas.openxmlformats.org/presentationml/2006/main">
+  <p:cSld>
+    <p:spTree>
+      <p:nvGrpSpPr>
+        <p:cNvPr id="1" name=""/>
+        <p:cNvGrpSpPr/>
+        <p:nvPr/>
+      </p:nvGrpSpPr>
+      <p:grpSpPr>
+        <a:xfrm>
+          <a:off x="0" y="0"/>
+          <a:ext cx="0" cy="0"/>
+          <a:chOff x="0" y="0"/>
+          <a:chExt cx="0" cy="0"/>
+        </a:xfrm>
+      </p:grpSpPr>
+      <p:sp>
+        <p:nvSpPr>
+          <p:cNvPr id="4" name="Title 3">
+            <a:extLst>
+              <a:ext uri="{FF2B5EF4-FFF2-40B4-BE49-F238E27FC236}">
+                <a16:creationId xmlns:a16="http://schemas.microsoft.com/office/drawing/2014/main" xmlns="" id="{D691CD7C-405A-4343-A99A-F7317A35A1A1}"/>
+              </a:ext>
+            </a:extLst>
+          </p:cNvPr>
+          <p:cNvSpPr>
+            <a:spLocks noGrp="1"/>
+          </p:cNvSpPr>
+          <p:nvPr>
+            <p:ph type="ctrTitle"/>
+          </p:nvPr>
+        </p:nvSpPr>
+        <p:spPr/>
+        <p:txBody>
+          <a:bodyPr/>
+          <a:lstStyle/>
+          <a:p>
+            <a:r>
+              <a:rPr lang="en-GB" dirty="0" smtClean="0"/>
+              <a:t>Container Clustering</a:t>
+            </a:r>
+            <a:endParaRPr lang="en-GB" dirty="0"/>
+          </a:p>
+        </p:txBody>
+      </p:sp>
+    </p:spTree>
+    <p:extLst>
+      <p:ext uri="{BB962C8B-B14F-4D97-AF65-F5344CB8AC3E}">
+        <p14:creationId xmlns:p14="http://schemas.microsoft.com/office/powerpoint/2010/main" val="376630796"/>
+      </p:ext>
+    </p:extLst>
+  </p:cSld>
+  <p:clrMapOvr>
+    <a:masterClrMapping/>
+  </p:clrMapOvr>
+</p:sld>
+</file>
+
+<file path=ppt/slides/slide32.xml><?xml version="1.0" encoding="utf-8"?>
+<p:sld xmlns:a="http://schemas.openxmlformats.org/drawingml/2006/main" xmlns:r="http://schemas.openxmlformats.org/officeDocument/2006/relationships" xmlns:p="http://schemas.openxmlformats.org/presentationml/2006/main">
+  <p:cSld>
+    <p:spTree>
+      <p:nvGrpSpPr>
+        <p:cNvPr id="1" name=""/>
+        <p:cNvGrpSpPr/>
+        <p:nvPr/>
+      </p:nvGrpSpPr>
+      <p:grpSpPr>
+        <a:xfrm>
+          <a:off x="0" y="0"/>
+          <a:ext cx="0" cy="0"/>
+          <a:chOff x="0" y="0"/>
+          <a:chExt cx="0" cy="0"/>
+        </a:xfrm>
+      </p:grpSpPr>
+      <p:sp>
+        <p:nvSpPr>
+          <p:cNvPr id="2" name="Title 1">
+            <a:extLst>
+              <a:ext uri="{FF2B5EF4-FFF2-40B4-BE49-F238E27FC236}">
+                <a16:creationId xmlns:a16="http://schemas.microsoft.com/office/drawing/2014/main" xmlns="" id="{004A5E56-F513-4A94-A58F-4235E160341C}"/>
+              </a:ext>
+            </a:extLst>
+          </p:cNvPr>
+          <p:cNvSpPr>
+            <a:spLocks noGrp="1"/>
+          </p:cNvSpPr>
+          <p:nvPr>
+            <p:ph type="title"/>
+          </p:nvPr>
+        </p:nvSpPr>
+        <p:spPr/>
+        <p:txBody>
+          <a:bodyPr/>
+          <a:lstStyle/>
+          <a:p>
+            <a:r>
+              <a:rPr lang="en-GB" dirty="0" smtClean="0"/>
+              <a:t>Container Clustering</a:t>
+            </a:r>
+            <a:endParaRPr lang="en-GB" dirty="0"/>
+          </a:p>
+        </p:txBody>
+      </p:sp>
+      <p:sp>
+        <p:nvSpPr>
+          <p:cNvPr id="3" name="Content Placeholder 2">
+            <a:extLst>
+              <a:ext uri="{FF2B5EF4-FFF2-40B4-BE49-F238E27FC236}">
+                <a16:creationId xmlns:a16="http://schemas.microsoft.com/office/drawing/2014/main" xmlns="" id="{3FAAA951-B22E-4803-A2C0-9CF1E7E33F9E}"/>
+              </a:ext>
+            </a:extLst>
+          </p:cNvPr>
+          <p:cNvSpPr>
+            <a:spLocks noGrp="1"/>
+          </p:cNvSpPr>
+          <p:nvPr>
+            <p:ph idx="1"/>
+          </p:nvPr>
+        </p:nvSpPr>
+        <p:spPr/>
+        <p:txBody>
+          <a:bodyPr>
+            <a:normAutofit fontScale="92500" lnSpcReduction="10000"/>
+          </a:bodyPr>
+          <a:lstStyle/>
+          <a:p>
+            <a:pPr marL="342900" indent="-342900">
+              <a:buFont typeface="Arial" charset="0"/>
+              <a:buChar char="•"/>
+            </a:pPr>
+            <a:r>
+              <a:rPr lang="en-GB" dirty="0" smtClean="0"/>
+              <a:t>Cluster all relevant containers using Kubernetes</a:t>
+            </a:r>
+          </a:p>
+          <a:p>
+            <a:pPr marL="342900" indent="-342900">
+              <a:buFont typeface="Arial" charset="0"/>
+              <a:buChar char="•"/>
+            </a:pPr>
+            <a:r>
+              <a:rPr lang="en-GB" dirty="0" smtClean="0"/>
+              <a:t>Run Kubernetes as a sidecar to your Domino environment</a:t>
+            </a:r>
+            <a:endParaRPr lang="en-GB" dirty="0" smtClean="0"/>
+          </a:p>
+          <a:p>
+            <a:pPr marL="342900" indent="-342900">
+              <a:buFont typeface="Arial" charset="0"/>
+              <a:buChar char="•"/>
+            </a:pPr>
+            <a:r>
+              <a:rPr lang="en-GB" dirty="0" smtClean="0"/>
+              <a:t>IBM Cloud Private provides enterprise-level container management using Kubernetes</a:t>
+            </a:r>
+          </a:p>
+          <a:p>
+            <a:pPr marL="342900" indent="-342900">
+              <a:buFont typeface="Arial" charset="0"/>
+              <a:buChar char="•"/>
+            </a:pPr>
+            <a:r>
+              <a:rPr lang="en-GB" dirty="0" smtClean="0"/>
+              <a:t>Minikube can be used for development and testing environments (low availability)</a:t>
+            </a:r>
+          </a:p>
+          <a:p>
+            <a:pPr marL="342900" indent="-342900">
+              <a:buFont typeface="Arial" charset="0"/>
+              <a:buChar char="•"/>
+            </a:pPr>
+            <a:r>
+              <a:rPr lang="en-GB" dirty="0" smtClean="0"/>
+              <a:t>Inject new services and containers into cluster as and when needed</a:t>
+            </a:r>
+          </a:p>
+          <a:p>
+            <a:pPr marL="342900" indent="-342900">
+              <a:buFont typeface="Arial" charset="0"/>
+              <a:buChar char="•"/>
+            </a:pPr>
+            <a:r>
+              <a:rPr lang="en-GB" dirty="0" smtClean="0"/>
+              <a:t>Manage integration, security, testing and more with Istio</a:t>
+            </a:r>
+            <a:endParaRPr lang="en-GB" dirty="0"/>
+          </a:p>
+        </p:txBody>
+      </p:sp>
+    </p:spTree>
+    <p:extLst>
+      <p:ext uri="{BB962C8B-B14F-4D97-AF65-F5344CB8AC3E}">
+        <p14:creationId xmlns:p14="http://schemas.microsoft.com/office/powerpoint/2010/main" val="1970659718"/>
+      </p:ext>
+    </p:extLst>
+  </p:cSld>
+  <p:clrMapOvr>
+    <a:masterClrMapping/>
+  </p:clrMapOvr>
+</p:sld>
+</file>
+
+<file path=ppt/slides/slide33.xml><?xml version="1.0" encoding="utf-8"?>
+<p:sld xmlns:a="http://schemas.openxmlformats.org/drawingml/2006/main" xmlns:r="http://schemas.openxmlformats.org/officeDocument/2006/relationships" xmlns:p="http://schemas.openxmlformats.org/presentationml/2006/main">
+  <p:cSld>
+    <p:spTree>
+      <p:nvGrpSpPr>
+        <p:cNvPr id="1" name=""/>
+        <p:cNvGrpSpPr/>
+        <p:nvPr/>
+      </p:nvGrpSpPr>
+      <p:grpSpPr>
+        <a:xfrm>
+          <a:off x="0" y="0"/>
+          <a:ext cx="0" cy="0"/>
+          <a:chOff x="0" y="0"/>
+          <a:chExt cx="0" cy="0"/>
+        </a:xfrm>
+      </p:grpSpPr>
+      <p:sp>
+        <p:nvSpPr>
+          <p:cNvPr id="2" name="Title 1">
+            <a:extLst>
+              <a:ext uri="{FF2B5EF4-FFF2-40B4-BE49-F238E27FC236}">
+                <a16:creationId xmlns:a16="http://schemas.microsoft.com/office/drawing/2014/main" xmlns="" id="{004A5E56-F513-4A94-A58F-4235E160341C}"/>
+              </a:ext>
+            </a:extLst>
+          </p:cNvPr>
+          <p:cNvSpPr>
+            <a:spLocks noGrp="1"/>
+          </p:cNvSpPr>
+          <p:nvPr>
+            <p:ph type="title"/>
+          </p:nvPr>
+        </p:nvSpPr>
+        <p:spPr/>
+        <p:txBody>
+          <a:bodyPr/>
+          <a:lstStyle/>
+          <a:p>
+            <a:r>
+              <a:rPr lang="en-GB" dirty="0" smtClean="0"/>
+              <a:t>Benefits of Container Clustering </a:t>
+            </a:r>
+            <a:endParaRPr lang="en-GB" dirty="0"/>
+          </a:p>
+        </p:txBody>
+      </p:sp>
+      <p:sp>
+        <p:nvSpPr>
+          <p:cNvPr id="3" name="Content Placeholder 2">
+            <a:extLst>
+              <a:ext uri="{FF2B5EF4-FFF2-40B4-BE49-F238E27FC236}">
+                <a16:creationId xmlns:a16="http://schemas.microsoft.com/office/drawing/2014/main" xmlns="" id="{3FAAA951-B22E-4803-A2C0-9CF1E7E33F9E}"/>
+              </a:ext>
+            </a:extLst>
+          </p:cNvPr>
+          <p:cNvSpPr>
+            <a:spLocks noGrp="1"/>
+          </p:cNvSpPr>
+          <p:nvPr>
+            <p:ph idx="1"/>
+          </p:nvPr>
+        </p:nvSpPr>
+        <p:spPr/>
+        <p:txBody>
+          <a:bodyPr>
+            <a:normAutofit/>
+          </a:bodyPr>
+          <a:lstStyle/>
+          <a:p>
+            <a:pPr marL="342900" indent="-342900">
+              <a:buFont typeface="Arial" charset="0"/>
+              <a:buChar char="•"/>
+            </a:pPr>
+            <a:r>
+              <a:rPr lang="en-GB" dirty="0" smtClean="0"/>
+              <a:t>High availability</a:t>
+            </a:r>
+          </a:p>
+          <a:p>
+            <a:pPr marL="342900" indent="-342900">
+              <a:buFont typeface="Arial" charset="0"/>
+              <a:buChar char="•"/>
+            </a:pPr>
+            <a:r>
+              <a:rPr lang="en-GB" dirty="0" smtClean="0"/>
+              <a:t>Seamless disaster recovery</a:t>
+            </a:r>
+          </a:p>
+          <a:p>
+            <a:pPr marL="342900" indent="-342900">
+              <a:buFont typeface="Arial" charset="0"/>
+              <a:buChar char="•"/>
+            </a:pPr>
+            <a:r>
+              <a:rPr lang="en-GB" dirty="0" smtClean="0"/>
+              <a:t>Horizontal and vertical scaling</a:t>
+            </a:r>
+          </a:p>
+          <a:p>
+            <a:pPr marL="342900" indent="-342900">
+              <a:buFont typeface="Arial" charset="0"/>
+              <a:buChar char="•"/>
+            </a:pPr>
+            <a:r>
+              <a:rPr lang="en-GB" dirty="0" smtClean="0"/>
+              <a:t>Continuous delivery</a:t>
+            </a:r>
+          </a:p>
+          <a:p>
+            <a:pPr marL="342900" indent="-342900">
+              <a:buFont typeface="Arial" charset="0"/>
+              <a:buChar char="•"/>
+            </a:pPr>
+            <a:r>
+              <a:rPr lang="en-GB" dirty="0" smtClean="0"/>
+              <a:t>No downtime during updates and upgrades</a:t>
+            </a:r>
+          </a:p>
+          <a:p>
+            <a:pPr marL="342900" indent="-342900">
+              <a:buFont typeface="Arial" charset="0"/>
+              <a:buChar char="•"/>
+            </a:pPr>
+            <a:r>
+              <a:rPr lang="en-GB" dirty="0" smtClean="0"/>
+              <a:t>CPU and Memory can be assigned and managed per container/container group</a:t>
+            </a:r>
+            <a:endParaRPr lang="en-GB" dirty="0" smtClean="0"/>
+          </a:p>
+          <a:p>
+            <a:pPr marL="342900" indent="-342900">
+              <a:buFont typeface="Arial" charset="0"/>
+              <a:buChar char="•"/>
+            </a:pPr>
+            <a:endParaRPr lang="en-GB" dirty="0"/>
+          </a:p>
+        </p:txBody>
+      </p:sp>
+    </p:spTree>
+    <p:extLst>
+      <p:ext uri="{BB962C8B-B14F-4D97-AF65-F5344CB8AC3E}">
+        <p14:creationId xmlns:p14="http://schemas.microsoft.com/office/powerpoint/2010/main" val="1759284094"/>
+      </p:ext>
+    </p:extLst>
+  </p:cSld>
+  <p:clrMapOvr>
+    <a:masterClrMapping/>
+  </p:clrMapOvr>
+</p:sld>
+</file>
+
 <file path=ppt/slides/slide4.xml><?xml version="1.0" encoding="utf-8"?>
 <p:sld xmlns:a="http://schemas.openxmlformats.org/drawingml/2006/main" xmlns:r="http://schemas.openxmlformats.org/officeDocument/2006/relationships" xmlns:p="http://schemas.openxmlformats.org/presentationml/2006/main">
   <p:cSld>
@@ -8226,7 +9872,7 @@
           <p:cNvPr id="2" name="Title 1">
             <a:extLst>
               <a:ext uri="{FF2B5EF4-FFF2-40B4-BE49-F238E27FC236}">
-                <a16:creationId xmlns:a16="http://schemas.microsoft.com/office/drawing/2014/main" id="{A09F69C7-34E6-46C1-A796-5324FEEDDB23}"/>
+                <a16:creationId xmlns:a16="http://schemas.microsoft.com/office/drawing/2014/main" xmlns="" id="{A09F69C7-34E6-46C1-A796-5324FEEDDB23}"/>
               </a:ext>
             </a:extLst>
           </p:cNvPr>
@@ -8254,7 +9900,7 @@
           <p:cNvPr id="3" name="Content Placeholder 2">
             <a:extLst>
               <a:ext uri="{FF2B5EF4-FFF2-40B4-BE49-F238E27FC236}">
-                <a16:creationId xmlns:a16="http://schemas.microsoft.com/office/drawing/2014/main" id="{34A64C34-4AE8-4780-98A0-96EAF2F11DE7}"/>
+                <a16:creationId xmlns:a16="http://schemas.microsoft.com/office/drawing/2014/main" xmlns="" id="{34A64C34-4AE8-4780-98A0-96EAF2F11DE7}"/>
               </a:ext>
             </a:extLst>
           </p:cNvPr>
@@ -8286,7 +9932,15 @@
             </a:pPr>
             <a:r>
               <a:rPr lang="en-GB" dirty="0"/>
-              <a:t>Domino as a datastore and API Gateway</a:t>
+              <a:t>Domino as a </a:t>
+            </a:r>
+            <a:r>
+              <a:rPr lang="en-GB" dirty="0"/>
+              <a:t>datastore</a:t>
+            </a:r>
+            <a:r>
+              <a:rPr lang="en-GB" dirty="0"/>
+              <a:t> and API Gateway</a:t>
             </a:r>
           </a:p>
           <a:p>
@@ -8315,9 +9969,10 @@
               <a:buChar char="-"/>
             </a:pPr>
             <a:r>
-              <a:rPr lang="en-GB" dirty="0"/>
-              <a:t>Containerization and Clustering</a:t>
-            </a:r>
+              <a:rPr lang="en-GB" dirty="0" smtClean="0"/>
+              <a:t>Container Clustering</a:t>
+            </a:r>
+            <a:endParaRPr lang="en-GB" dirty="0"/>
           </a:p>
           <a:p>
             <a:pPr marL="342900" indent="-342900">
@@ -8363,7 +10018,7 @@
           <p:cNvPr id="4" name="Title 3">
             <a:extLst>
               <a:ext uri="{FF2B5EF4-FFF2-40B4-BE49-F238E27FC236}">
-                <a16:creationId xmlns:a16="http://schemas.microsoft.com/office/drawing/2014/main" id="{D691CD7C-405A-4343-A99A-F7317A35A1A1}"/>
+                <a16:creationId xmlns:a16="http://schemas.microsoft.com/office/drawing/2014/main" xmlns="" id="{D691CD7C-405A-4343-A99A-F7317A35A1A1}"/>
               </a:ext>
             </a:extLst>
           </p:cNvPr>
@@ -8421,7 +10076,7 @@
           <p:cNvPr id="2" name="Title 1">
             <a:extLst>
               <a:ext uri="{FF2B5EF4-FFF2-40B4-BE49-F238E27FC236}">
-                <a16:creationId xmlns:a16="http://schemas.microsoft.com/office/drawing/2014/main" id="{E1DDDE7C-1B23-4060-B7B2-FCFE31AB72AB}"/>
+                <a16:creationId xmlns:a16="http://schemas.microsoft.com/office/drawing/2014/main" xmlns="" id="{E1DDDE7C-1B23-4060-B7B2-FCFE31AB72AB}"/>
               </a:ext>
             </a:extLst>
           </p:cNvPr>
@@ -8449,7 +10104,7 @@
           <p:cNvPr id="3" name="Content Placeholder 2">
             <a:extLst>
               <a:ext uri="{FF2B5EF4-FFF2-40B4-BE49-F238E27FC236}">
-                <a16:creationId xmlns:a16="http://schemas.microsoft.com/office/drawing/2014/main" id="{3BA306DB-D732-4579-8793-4C543104252D}"/>
+                <a16:creationId xmlns:a16="http://schemas.microsoft.com/office/drawing/2014/main" xmlns="" id="{3BA306DB-D732-4579-8793-4C543104252D}"/>
               </a:ext>
             </a:extLst>
           </p:cNvPr>
@@ -8505,7 +10160,15 @@
             </a:pPr>
             <a:r>
               <a:rPr lang="en-GB" dirty="0"/>
-              <a:t>About using Domino as the datastore and master API Gateway for a microservices</a:t>
+              <a:t>About using Domino as the </a:t>
+            </a:r>
+            <a:r>
+              <a:rPr lang="en-GB" dirty="0"/>
+              <a:t>datastore</a:t>
+            </a:r>
+            <a:r>
+              <a:rPr lang="en-GB" dirty="0"/>
+              <a:t> and master API Gateway for a microservices</a:t>
             </a:r>
           </a:p>
           <a:p>
@@ -8525,8 +10188,13 @@
             </a:pPr>
             <a:r>
               <a:rPr lang="en-GB" dirty="0"/>
-              <a:t>About a shift in mindset</a:t>
-            </a:r>
+              <a:t>About a shift in </a:t>
+            </a:r>
+            <a:r>
+              <a:rPr lang="en-GB" dirty="0" smtClean="0"/>
+              <a:t>mind-set</a:t>
+            </a:r>
+            <a:endParaRPr lang="en-GB" dirty="0"/>
           </a:p>
           <a:p>
             <a:endParaRPr lang="en-GB" dirty="0"/>
@@ -8571,7 +10239,7 @@
           <p:cNvPr id="2" name="Title 1">
             <a:extLst>
               <a:ext uri="{FF2B5EF4-FFF2-40B4-BE49-F238E27FC236}">
-                <a16:creationId xmlns:a16="http://schemas.microsoft.com/office/drawing/2014/main" id="{54E323D5-60FE-441D-93FC-A4A17CCDB230}"/>
+                <a16:creationId xmlns:a16="http://schemas.microsoft.com/office/drawing/2014/main" xmlns="" id="{54E323D5-60FE-441D-93FC-A4A17CCDB230}"/>
               </a:ext>
             </a:extLst>
           </p:cNvPr>
@@ -8602,7 +10270,7 @@
           <p:cNvPr id="3" name="Content Placeholder 2">
             <a:extLst>
               <a:ext uri="{FF2B5EF4-FFF2-40B4-BE49-F238E27FC236}">
-                <a16:creationId xmlns:a16="http://schemas.microsoft.com/office/drawing/2014/main" id="{488741F8-A1AA-4D80-A45A-3154A7B10A7B}"/>
+                <a16:creationId xmlns:a16="http://schemas.microsoft.com/office/drawing/2014/main" xmlns="" id="{488741F8-A1AA-4D80-A45A-3154A7B10A7B}"/>
               </a:ext>
             </a:extLst>
           </p:cNvPr>
@@ -8657,7 +10325,7 @@
           </a:p>
           <a:p>
             <a:r>
-              <a:rPr lang="en-GB" dirty="0" err="1"/>
+              <a:rPr lang="en-GB" dirty="0"/>
               <a:t>nupdate</a:t>
             </a:r>
             <a:r>
@@ -8682,8 +10350,13 @@
             </a:r>
             <a:r>
               <a:rPr lang="en-GB" dirty="0"/>
-              <a:t> etc)</a:t>
-            </a:r>
+              <a:t> </a:t>
+            </a:r>
+            <a:r>
+              <a:rPr lang="en-GB" dirty="0" smtClean="0"/>
+              <a:t>etc.)</a:t>
+            </a:r>
+            <a:endParaRPr lang="en-GB" dirty="0"/>
           </a:p>
           <a:p>
             <a:r>
@@ -8728,7 +10401,7 @@
           <p:cNvPr id="2" name="Title 1">
             <a:extLst>
               <a:ext uri="{FF2B5EF4-FFF2-40B4-BE49-F238E27FC236}">
-                <a16:creationId xmlns:a16="http://schemas.microsoft.com/office/drawing/2014/main" id="{E50706F6-B240-469D-9907-F8E98ECB792C}"/>
+                <a16:creationId xmlns:a16="http://schemas.microsoft.com/office/drawing/2014/main" xmlns="" id="{E50706F6-B240-469D-9907-F8E98ECB792C}"/>
               </a:ext>
             </a:extLst>
           </p:cNvPr>
@@ -8756,7 +10429,7 @@
           <p:cNvPr id="3" name="Content Placeholder 2">
             <a:extLst>
               <a:ext uri="{FF2B5EF4-FFF2-40B4-BE49-F238E27FC236}">
-                <a16:creationId xmlns:a16="http://schemas.microsoft.com/office/drawing/2014/main" id="{82E6E5A4-30F9-4680-9CE7-B82002E233A9}"/>
+                <a16:creationId xmlns:a16="http://schemas.microsoft.com/office/drawing/2014/main" xmlns="" id="{82E6E5A4-30F9-4680-9CE7-B82002E233A9}"/>
               </a:ext>
             </a:extLst>
           </p:cNvPr>
@@ -8806,15 +10479,7 @@
           <a:p>
             <a:r>
               <a:rPr lang="en-GB" dirty="0"/>
-              <a:t>UI and MVC in an </a:t>
-            </a:r>
-            <a:r>
-              <a:rPr lang="en-GB" dirty="0" err="1"/>
-              <a:t>XPages</a:t>
-            </a:r>
-            <a:r>
-              <a:rPr lang="en-GB" dirty="0"/>
-              <a:t> NSF, data in another NSF</a:t>
+              <a:t>UI and MVC in an XPages NSF, data in another NSF</a:t>
             </a:r>
           </a:p>
           <a:p>
@@ -8829,7 +10494,7 @@
               <a:t>Third-party tools for better auditing (incl. </a:t>
             </a:r>
             <a:r>
-              <a:rPr lang="en-GB" dirty="0" err="1"/>
+              <a:rPr lang="en-GB" dirty="0"/>
               <a:t>OpenLog</a:t>
             </a:r>
             <a:r>
@@ -8843,7 +10508,7 @@
               <a:t>Export to data warehouse / </a:t>
             </a:r>
             <a:r>
-              <a:rPr lang="en-GB" dirty="0" err="1"/>
+              <a:rPr lang="en-GB" dirty="0"/>
               <a:t>NotesSQL</a:t>
             </a:r>
             <a:r>
@@ -8894,7 +10559,7 @@
           <p:cNvPr id="2" name="Title 1">
             <a:extLst>
               <a:ext uri="{FF2B5EF4-FFF2-40B4-BE49-F238E27FC236}">
-                <a16:creationId xmlns:a16="http://schemas.microsoft.com/office/drawing/2014/main" id="{95C7771E-874B-4266-989A-A1D42B4A6FBD}"/>
+                <a16:creationId xmlns:a16="http://schemas.microsoft.com/office/drawing/2014/main" xmlns="" id="{95C7771E-874B-4266-989A-A1D42B4A6FBD}"/>
               </a:ext>
             </a:extLst>
           </p:cNvPr>
@@ -8916,39 +10581,31 @@
           <a:lstStyle/>
           <a:p>
             <a:r>
-              <a:rPr lang="en-GB" sz="4000" dirty="0" err="1"/>
+              <a:rPr lang="en-GB" sz="4000" dirty="0"/>
               <a:t>Mutato</a:t>
+            </a:r>
+            <a:r>
+              <a:rPr lang="en-GB" sz="4000" dirty="0"/>
+              <a:t> nomine de </a:t>
+            </a:r>
+            <a:r>
+              <a:rPr lang="en-GB" sz="4000" dirty="0"/>
+              <a:t>te</a:t>
             </a:r>
             <a:r>
               <a:rPr lang="en-GB" sz="4000" dirty="0"/>
               <a:t> </a:t>
             </a:r>
             <a:r>
-              <a:rPr lang="en-GB" sz="4000" dirty="0" err="1"/>
-              <a:t>nomine</a:t>
-            </a:r>
-            <a:r>
               <a:rPr lang="en-GB" sz="4000" dirty="0"/>
-              <a:t> de </a:t>
-            </a:r>
-            <a:r>
-              <a:rPr lang="en-GB" sz="4000" dirty="0" err="1"/>
-              <a:t>te</a:t>
+              <a:t>fabula</a:t>
             </a:r>
             <a:r>
               <a:rPr lang="en-GB" sz="4000" dirty="0"/>
               <a:t> </a:t>
             </a:r>
             <a:r>
-              <a:rPr lang="en-GB" sz="4000" dirty="0" err="1"/>
-              <a:t>fabula</a:t>
-            </a:r>
-            <a:r>
               <a:rPr lang="en-GB" sz="4000" dirty="0"/>
-              <a:t> </a:t>
-            </a:r>
-            <a:r>
-              <a:rPr lang="en-GB" sz="4000" dirty="0" err="1"/>
               <a:t>narratur</a:t>
             </a:r>
             <a:endParaRPr lang="en-GB" sz="5400" dirty="0"/>
@@ -8960,7 +10617,7 @@
           <p:cNvPr id="3" name="Content Placeholder 2">
             <a:extLst>
               <a:ext uri="{FF2B5EF4-FFF2-40B4-BE49-F238E27FC236}">
-                <a16:creationId xmlns:a16="http://schemas.microsoft.com/office/drawing/2014/main" id="{56D320B4-4B47-4331-8696-978083ABB006}"/>
+                <a16:creationId xmlns:a16="http://schemas.microsoft.com/office/drawing/2014/main" xmlns="" id="{56D320B4-4B47-4331-8696-978083ABB006}"/>
               </a:ext>
             </a:extLst>
           </p:cNvPr>

</xml_diff>

<commit_message>
- Included a ReactJS topic with relevant slides - Provided contact details on last slide
</commit_message>
<xml_diff>
--- a/presentation/8598 Domino and JS.pptx
+++ b/presentation/8598 Domino and JS.pptx
@@ -5,10 +5,10 @@
     <p:sldMasterId id="2147483870" r:id="rId1"/>
   </p:sldMasterIdLst>
   <p:notesMasterIdLst>
-    <p:notesMasterId r:id="rId36"/>
+    <p:notesMasterId r:id="rId39"/>
   </p:notesMasterIdLst>
   <p:handoutMasterIdLst>
-    <p:handoutMasterId r:id="rId37"/>
+    <p:handoutMasterId r:id="rId40"/>
   </p:handoutMasterIdLst>
   <p:sldIdLst>
     <p:sldId id="256" r:id="rId2"/>
@@ -44,7 +44,10 @@
     <p:sldId id="283" r:id="rId32"/>
     <p:sldId id="288" r:id="rId33"/>
     <p:sldId id="289" r:id="rId34"/>
-    <p:sldId id="290" r:id="rId35"/>
+    <p:sldId id="291" r:id="rId35"/>
+    <p:sldId id="292" r:id="rId36"/>
+    <p:sldId id="293" r:id="rId37"/>
+    <p:sldId id="290" r:id="rId38"/>
   </p:sldIdLst>
   <p:sldSz cx="12192000" cy="6858000"/>
   <p:notesSz cx="6858000" cy="9144000"/>
@@ -436,7 +439,7 @@
           <a:p>
             <a:fld id="{60164965-4043-4174-93BC-54F5E5CCBD1D}" type="datetimeFigureOut">
               <a:rPr lang="en-US" smtClean="0"/>
-              <a:t>2/21/2018</a:t>
+              <a:t>2/21/18</a:t>
             </a:fld>
             <a:endParaRPr lang="en-US" dirty="0"/>
           </a:p>
@@ -1282,6 +1285,258 @@
     <p:extLst>
       <p:ext uri="{BB962C8B-B14F-4D97-AF65-F5344CB8AC3E}">
         <p14:creationId xmlns:p14="http://schemas.microsoft.com/office/powerpoint/2010/main" val="1732915962"/>
+      </p:ext>
+    </p:extLst>
+  </p:cSld>
+  <p:clrMapOvr>
+    <a:masterClrMapping/>
+  </p:clrMapOvr>
+</p:notes>
+</file>
+
+<file path=ppt/notesSlides/notesSlide16.xml><?xml version="1.0" encoding="utf-8"?>
+<p:notes xmlns:a="http://schemas.openxmlformats.org/drawingml/2006/main" xmlns:r="http://schemas.openxmlformats.org/officeDocument/2006/relationships" xmlns:p="http://schemas.openxmlformats.org/presentationml/2006/main">
+  <p:cSld>
+    <p:spTree>
+      <p:nvGrpSpPr>
+        <p:cNvPr id="1" name=""/>
+        <p:cNvGrpSpPr/>
+        <p:nvPr/>
+      </p:nvGrpSpPr>
+      <p:grpSpPr>
+        <a:xfrm>
+          <a:off x="0" y="0"/>
+          <a:ext cx="0" cy="0"/>
+          <a:chOff x="0" y="0"/>
+          <a:chExt cx="0" cy="0"/>
+        </a:xfrm>
+      </p:grpSpPr>
+      <p:sp>
+        <p:nvSpPr>
+          <p:cNvPr id="2" name="Slide Image Placeholder 1"/>
+          <p:cNvSpPr>
+            <a:spLocks noGrp="1" noRot="1" noChangeAspect="1"/>
+          </p:cNvSpPr>
+          <p:nvPr>
+            <p:ph type="sldImg"/>
+          </p:nvPr>
+        </p:nvSpPr>
+        <p:spPr/>
+      </p:sp>
+      <p:sp>
+        <p:nvSpPr>
+          <p:cNvPr id="3" name="Notes Placeholder 2"/>
+          <p:cNvSpPr>
+            <a:spLocks noGrp="1"/>
+          </p:cNvSpPr>
+          <p:nvPr>
+            <p:ph type="body" idx="1"/>
+          </p:nvPr>
+        </p:nvSpPr>
+        <p:spPr/>
+        <p:txBody>
+          <a:bodyPr/>
+          <a:lstStyle/>
+          <a:p>
+            <a:endParaRPr lang="en-US" dirty="0"/>
+          </a:p>
+        </p:txBody>
+      </p:sp>
+      <p:sp>
+        <p:nvSpPr>
+          <p:cNvPr id="4" name="Slide Number Placeholder 3"/>
+          <p:cNvSpPr>
+            <a:spLocks noGrp="1"/>
+          </p:cNvSpPr>
+          <p:nvPr>
+            <p:ph type="sldNum" sz="quarter" idx="10"/>
+          </p:nvPr>
+        </p:nvSpPr>
+        <p:spPr/>
+        <p:txBody>
+          <a:bodyPr/>
+          <a:lstStyle/>
+          <a:p>
+            <a:fld id="{7F3C5AE6-245A-4892-87E4-2DDCA6560455}" type="slidenum">
+              <a:rPr lang="en-US" smtClean="0"/>
+              <a:t>34</a:t>
+            </a:fld>
+            <a:endParaRPr lang="en-US" dirty="0"/>
+          </a:p>
+        </p:txBody>
+      </p:sp>
+    </p:spTree>
+    <p:extLst>
+      <p:ext uri="{BB962C8B-B14F-4D97-AF65-F5344CB8AC3E}">
+        <p14:creationId xmlns:p14="http://schemas.microsoft.com/office/powerpoint/2010/main" val="287894058"/>
+      </p:ext>
+    </p:extLst>
+  </p:cSld>
+  <p:clrMapOvr>
+    <a:masterClrMapping/>
+  </p:clrMapOvr>
+</p:notes>
+</file>
+
+<file path=ppt/notesSlides/notesSlide17.xml><?xml version="1.0" encoding="utf-8"?>
+<p:notes xmlns:a="http://schemas.openxmlformats.org/drawingml/2006/main" xmlns:r="http://schemas.openxmlformats.org/officeDocument/2006/relationships" xmlns:p="http://schemas.openxmlformats.org/presentationml/2006/main">
+  <p:cSld>
+    <p:spTree>
+      <p:nvGrpSpPr>
+        <p:cNvPr id="1" name=""/>
+        <p:cNvGrpSpPr/>
+        <p:nvPr/>
+      </p:nvGrpSpPr>
+      <p:grpSpPr>
+        <a:xfrm>
+          <a:off x="0" y="0"/>
+          <a:ext cx="0" cy="0"/>
+          <a:chOff x="0" y="0"/>
+          <a:chExt cx="0" cy="0"/>
+        </a:xfrm>
+      </p:grpSpPr>
+      <p:sp>
+        <p:nvSpPr>
+          <p:cNvPr id="2" name="Slide Image Placeholder 1"/>
+          <p:cNvSpPr>
+            <a:spLocks noGrp="1" noRot="1" noChangeAspect="1"/>
+          </p:cNvSpPr>
+          <p:nvPr>
+            <p:ph type="sldImg"/>
+          </p:nvPr>
+        </p:nvSpPr>
+        <p:spPr/>
+      </p:sp>
+      <p:sp>
+        <p:nvSpPr>
+          <p:cNvPr id="3" name="Notes Placeholder 2"/>
+          <p:cNvSpPr>
+            <a:spLocks noGrp="1"/>
+          </p:cNvSpPr>
+          <p:nvPr>
+            <p:ph type="body" idx="1"/>
+          </p:nvPr>
+        </p:nvSpPr>
+        <p:spPr/>
+        <p:txBody>
+          <a:bodyPr/>
+          <a:lstStyle/>
+          <a:p>
+            <a:endParaRPr lang="en-US" dirty="0"/>
+          </a:p>
+        </p:txBody>
+      </p:sp>
+      <p:sp>
+        <p:nvSpPr>
+          <p:cNvPr id="4" name="Slide Number Placeholder 3"/>
+          <p:cNvSpPr>
+            <a:spLocks noGrp="1"/>
+          </p:cNvSpPr>
+          <p:nvPr>
+            <p:ph type="sldNum" sz="quarter" idx="10"/>
+          </p:nvPr>
+        </p:nvSpPr>
+        <p:spPr/>
+        <p:txBody>
+          <a:bodyPr/>
+          <a:lstStyle/>
+          <a:p>
+            <a:fld id="{7F3C5AE6-245A-4892-87E4-2DDCA6560455}" type="slidenum">
+              <a:rPr lang="en-US" smtClean="0"/>
+              <a:t>35</a:t>
+            </a:fld>
+            <a:endParaRPr lang="en-US" dirty="0"/>
+          </a:p>
+        </p:txBody>
+      </p:sp>
+    </p:spTree>
+    <p:extLst>
+      <p:ext uri="{BB962C8B-B14F-4D97-AF65-F5344CB8AC3E}">
+        <p14:creationId xmlns:p14="http://schemas.microsoft.com/office/powerpoint/2010/main" val="3767014860"/>
+      </p:ext>
+    </p:extLst>
+  </p:cSld>
+  <p:clrMapOvr>
+    <a:masterClrMapping/>
+  </p:clrMapOvr>
+</p:notes>
+</file>
+
+<file path=ppt/notesSlides/notesSlide18.xml><?xml version="1.0" encoding="utf-8"?>
+<p:notes xmlns:a="http://schemas.openxmlformats.org/drawingml/2006/main" xmlns:r="http://schemas.openxmlformats.org/officeDocument/2006/relationships" xmlns:p="http://schemas.openxmlformats.org/presentationml/2006/main">
+  <p:cSld>
+    <p:spTree>
+      <p:nvGrpSpPr>
+        <p:cNvPr id="1" name=""/>
+        <p:cNvGrpSpPr/>
+        <p:nvPr/>
+      </p:nvGrpSpPr>
+      <p:grpSpPr>
+        <a:xfrm>
+          <a:off x="0" y="0"/>
+          <a:ext cx="0" cy="0"/>
+          <a:chOff x="0" y="0"/>
+          <a:chExt cx="0" cy="0"/>
+        </a:xfrm>
+      </p:grpSpPr>
+      <p:sp>
+        <p:nvSpPr>
+          <p:cNvPr id="2" name="Slide Image Placeholder 1"/>
+          <p:cNvSpPr>
+            <a:spLocks noGrp="1" noRot="1" noChangeAspect="1"/>
+          </p:cNvSpPr>
+          <p:nvPr>
+            <p:ph type="sldImg"/>
+          </p:nvPr>
+        </p:nvSpPr>
+        <p:spPr/>
+      </p:sp>
+      <p:sp>
+        <p:nvSpPr>
+          <p:cNvPr id="3" name="Notes Placeholder 2"/>
+          <p:cNvSpPr>
+            <a:spLocks noGrp="1"/>
+          </p:cNvSpPr>
+          <p:nvPr>
+            <p:ph type="body" idx="1"/>
+          </p:nvPr>
+        </p:nvSpPr>
+        <p:spPr/>
+        <p:txBody>
+          <a:bodyPr/>
+          <a:lstStyle/>
+          <a:p>
+            <a:endParaRPr lang="en-US" dirty="0"/>
+          </a:p>
+        </p:txBody>
+      </p:sp>
+      <p:sp>
+        <p:nvSpPr>
+          <p:cNvPr id="4" name="Slide Number Placeholder 3"/>
+          <p:cNvSpPr>
+            <a:spLocks noGrp="1"/>
+          </p:cNvSpPr>
+          <p:nvPr>
+            <p:ph type="sldNum" sz="quarter" idx="10"/>
+          </p:nvPr>
+        </p:nvSpPr>
+        <p:spPr/>
+        <p:txBody>
+          <a:bodyPr/>
+          <a:lstStyle/>
+          <a:p>
+            <a:fld id="{7F3C5AE6-245A-4892-87E4-2DDCA6560455}" type="slidenum">
+              <a:rPr lang="en-US" smtClean="0"/>
+              <a:t>36</a:t>
+            </a:fld>
+            <a:endParaRPr lang="en-US" dirty="0"/>
+          </a:p>
+        </p:txBody>
+      </p:sp>
+    </p:spTree>
+    <p:extLst>
+      <p:ext uri="{BB962C8B-B14F-4D97-AF65-F5344CB8AC3E}">
+        <p14:creationId xmlns:p14="http://schemas.microsoft.com/office/powerpoint/2010/main" val="2450043316"/>
       </p:ext>
     </p:extLst>
   </p:cSld>
@@ -9827,6 +10082,383 @@
           <p:cNvPr id="4" name="Title 3">
             <a:extLst>
               <a:ext uri="{FF2B5EF4-FFF2-40B4-BE49-F238E27FC236}">
+                <a16:creationId xmlns:a16="http://schemas.microsoft.com/office/drawing/2014/main" id="{D691CD7C-405A-4343-A99A-F7317A35A1A1}"/>
+              </a:ext>
+            </a:extLst>
+          </p:cNvPr>
+          <p:cNvSpPr>
+            <a:spLocks noGrp="1"/>
+          </p:cNvSpPr>
+          <p:nvPr>
+            <p:ph type="ctrTitle"/>
+          </p:nvPr>
+        </p:nvSpPr>
+        <p:spPr/>
+        <p:txBody>
+          <a:bodyPr/>
+          <a:lstStyle/>
+          <a:p>
+            <a:r>
+              <a:rPr lang="en-GB" dirty="0"/>
+              <a:t>ReactJS</a:t>
+            </a:r>
+          </a:p>
+        </p:txBody>
+      </p:sp>
+    </p:spTree>
+    <p:extLst>
+      <p:ext uri="{BB962C8B-B14F-4D97-AF65-F5344CB8AC3E}">
+        <p14:creationId xmlns:p14="http://schemas.microsoft.com/office/powerpoint/2010/main" val="2008480614"/>
+      </p:ext>
+    </p:extLst>
+  </p:cSld>
+  <p:clrMapOvr>
+    <a:masterClrMapping/>
+  </p:clrMapOvr>
+</p:sld>
+</file>
+
+<file path=ppt/slides/slide35.xml><?xml version="1.0" encoding="utf-8"?>
+<p:sld xmlns:a="http://schemas.openxmlformats.org/drawingml/2006/main" xmlns:r="http://schemas.openxmlformats.org/officeDocument/2006/relationships" xmlns:p="http://schemas.openxmlformats.org/presentationml/2006/main">
+  <p:cSld>
+    <p:spTree>
+      <p:nvGrpSpPr>
+        <p:cNvPr id="1" name=""/>
+        <p:cNvGrpSpPr/>
+        <p:nvPr/>
+      </p:nvGrpSpPr>
+      <p:grpSpPr>
+        <a:xfrm>
+          <a:off x="0" y="0"/>
+          <a:ext cx="0" cy="0"/>
+          <a:chOff x="0" y="0"/>
+          <a:chExt cx="0" cy="0"/>
+        </a:xfrm>
+      </p:grpSpPr>
+      <p:sp>
+        <p:nvSpPr>
+          <p:cNvPr id="2" name="Title 1">
+            <a:extLst>
+              <a:ext uri="{FF2B5EF4-FFF2-40B4-BE49-F238E27FC236}">
+                <a16:creationId xmlns:a16="http://schemas.microsoft.com/office/drawing/2014/main" id="{004A5E56-F513-4A94-A58F-4235E160341C}"/>
+              </a:ext>
+            </a:extLst>
+          </p:cNvPr>
+          <p:cNvSpPr>
+            <a:spLocks noGrp="1"/>
+          </p:cNvSpPr>
+          <p:nvPr>
+            <p:ph type="title"/>
+          </p:nvPr>
+        </p:nvSpPr>
+        <p:spPr/>
+        <p:txBody>
+          <a:bodyPr/>
+          <a:lstStyle/>
+          <a:p>
+            <a:r>
+              <a:rPr lang="en-GB" dirty="0"/>
+              <a:t>What is </a:t>
+            </a:r>
+            <a:r>
+              <a:rPr lang="en-GB" dirty="0" err="1"/>
+              <a:t>reactJS</a:t>
+            </a:r>
+            <a:endParaRPr lang="en-GB" dirty="0"/>
+          </a:p>
+        </p:txBody>
+      </p:sp>
+      <p:sp>
+        <p:nvSpPr>
+          <p:cNvPr id="3" name="Content Placeholder 2">
+            <a:extLst>
+              <a:ext uri="{FF2B5EF4-FFF2-40B4-BE49-F238E27FC236}">
+                <a16:creationId xmlns:a16="http://schemas.microsoft.com/office/drawing/2014/main" id="{3FAAA951-B22E-4803-A2C0-9CF1E7E33F9E}"/>
+              </a:ext>
+            </a:extLst>
+          </p:cNvPr>
+          <p:cNvSpPr>
+            <a:spLocks noGrp="1"/>
+          </p:cNvSpPr>
+          <p:nvPr>
+            <p:ph idx="1"/>
+          </p:nvPr>
+        </p:nvSpPr>
+        <p:spPr>
+          <a:xfrm>
+            <a:off x="266699" y="1933349"/>
+            <a:ext cx="8121927" cy="4055469"/>
+          </a:xfrm>
+        </p:spPr>
+        <p:txBody>
+          <a:bodyPr>
+            <a:normAutofit/>
+          </a:bodyPr>
+          <a:lstStyle/>
+          <a:p>
+            <a:pPr marL="342900" indent="-342900">
+              <a:buFont typeface="Arial" charset="0"/>
+              <a:buChar char="•"/>
+            </a:pPr>
+            <a:r>
+              <a:rPr lang="en-GB" dirty="0"/>
+              <a:t>A JavaScript library for building user interfaces</a:t>
+            </a:r>
+          </a:p>
+          <a:p>
+            <a:pPr marL="342900" indent="-342900">
+              <a:buFont typeface="Arial" charset="0"/>
+              <a:buChar char="•"/>
+            </a:pPr>
+            <a:r>
+              <a:rPr lang="en-GB" dirty="0"/>
+              <a:t>React is NOT a framework</a:t>
+            </a:r>
+          </a:p>
+          <a:p>
+            <a:pPr marL="342900" indent="-342900">
+              <a:buFont typeface="Arial" charset="0"/>
+              <a:buChar char="•"/>
+            </a:pPr>
+            <a:r>
+              <a:rPr lang="en-GB" dirty="0"/>
+              <a:t>React is the “V” of MVC (Model/View/Controller)</a:t>
+            </a:r>
+          </a:p>
+          <a:p>
+            <a:pPr marL="342900" indent="-342900">
+              <a:buFont typeface="Arial" charset="0"/>
+              <a:buChar char="•"/>
+            </a:pPr>
+            <a:r>
+              <a:rPr lang="en-GB" dirty="0"/>
+              <a:t>HTML is placed in JavaScript classes to create Web Components</a:t>
+            </a:r>
+          </a:p>
+          <a:p>
+            <a:pPr marL="1028700" lvl="1" indent="-342900">
+              <a:buFont typeface="Arial" charset="0"/>
+              <a:buChar char="•"/>
+            </a:pPr>
+            <a:r>
+              <a:rPr lang="en-GB" dirty="0"/>
+              <a:t>This is similar to Custom Controls in XPages</a:t>
+            </a:r>
+          </a:p>
+          <a:p>
+            <a:pPr marL="342900" indent="-342900">
+              <a:buFont typeface="Arial" charset="0"/>
+              <a:buChar char="•"/>
+            </a:pPr>
+            <a:r>
+              <a:rPr lang="en-GB" dirty="0"/>
+              <a:t>React makes use of a Virtual DOM and Diffing</a:t>
+            </a:r>
+          </a:p>
+        </p:txBody>
+      </p:sp>
+    </p:spTree>
+    <p:extLst>
+      <p:ext uri="{BB962C8B-B14F-4D97-AF65-F5344CB8AC3E}">
+        <p14:creationId xmlns:p14="http://schemas.microsoft.com/office/powerpoint/2010/main" val="46941259"/>
+      </p:ext>
+    </p:extLst>
+  </p:cSld>
+  <p:clrMapOvr>
+    <a:masterClrMapping/>
+  </p:clrMapOvr>
+</p:sld>
+</file>
+
+<file path=ppt/slides/slide36.xml><?xml version="1.0" encoding="utf-8"?>
+<p:sld xmlns:a="http://schemas.openxmlformats.org/drawingml/2006/main" xmlns:r="http://schemas.openxmlformats.org/officeDocument/2006/relationships" xmlns:p="http://schemas.openxmlformats.org/presentationml/2006/main">
+  <p:cSld>
+    <p:spTree>
+      <p:nvGrpSpPr>
+        <p:cNvPr id="1" name=""/>
+        <p:cNvGrpSpPr/>
+        <p:nvPr/>
+      </p:nvGrpSpPr>
+      <p:grpSpPr>
+        <a:xfrm>
+          <a:off x="0" y="0"/>
+          <a:ext cx="0" cy="0"/>
+          <a:chOff x="0" y="0"/>
+          <a:chExt cx="0" cy="0"/>
+        </a:xfrm>
+      </p:grpSpPr>
+      <p:sp>
+        <p:nvSpPr>
+          <p:cNvPr id="2" name="Title 1">
+            <a:extLst>
+              <a:ext uri="{FF2B5EF4-FFF2-40B4-BE49-F238E27FC236}">
+                <a16:creationId xmlns:a16="http://schemas.microsoft.com/office/drawing/2014/main" id="{004A5E56-F513-4A94-A58F-4235E160341C}"/>
+              </a:ext>
+            </a:extLst>
+          </p:cNvPr>
+          <p:cNvSpPr>
+            <a:spLocks noGrp="1"/>
+          </p:cNvSpPr>
+          <p:nvPr>
+            <p:ph type="title"/>
+          </p:nvPr>
+        </p:nvSpPr>
+        <p:spPr/>
+        <p:txBody>
+          <a:bodyPr/>
+          <a:lstStyle/>
+          <a:p>
+            <a:r>
+              <a:rPr lang="en-GB" dirty="0"/>
+              <a:t>Platform Agnostic</a:t>
+            </a:r>
+          </a:p>
+        </p:txBody>
+      </p:sp>
+      <p:sp>
+        <p:nvSpPr>
+          <p:cNvPr id="3" name="Content Placeholder 2">
+            <a:extLst>
+              <a:ext uri="{FF2B5EF4-FFF2-40B4-BE49-F238E27FC236}">
+                <a16:creationId xmlns:a16="http://schemas.microsoft.com/office/drawing/2014/main" id="{3FAAA951-B22E-4803-A2C0-9CF1E7E33F9E}"/>
+              </a:ext>
+            </a:extLst>
+          </p:cNvPr>
+          <p:cNvSpPr>
+            <a:spLocks noGrp="1"/>
+          </p:cNvSpPr>
+          <p:nvPr>
+            <p:ph idx="1"/>
+          </p:nvPr>
+        </p:nvSpPr>
+        <p:spPr>
+          <a:xfrm>
+            <a:off x="266699" y="1933349"/>
+            <a:ext cx="8121927" cy="4055469"/>
+          </a:xfrm>
+        </p:spPr>
+        <p:txBody>
+          <a:bodyPr>
+            <a:normAutofit/>
+          </a:bodyPr>
+          <a:lstStyle/>
+          <a:p>
+            <a:pPr marL="342900" indent="-342900">
+              <a:buFont typeface="Arial" charset="0"/>
+              <a:buChar char="•"/>
+            </a:pPr>
+            <a:r>
+              <a:rPr lang="en-GB" dirty="0"/>
+              <a:t>React exists as a platform-agnostic solution</a:t>
+            </a:r>
+          </a:p>
+          <a:p>
+            <a:pPr marL="342900" indent="-342900">
+              <a:buFont typeface="Arial" charset="0"/>
+              <a:buChar char="•"/>
+            </a:pPr>
+            <a:r>
+              <a:rPr lang="en-GB" dirty="0"/>
+              <a:t>Webpack and Babel compile React to a single JS file </a:t>
+            </a:r>
+          </a:p>
+          <a:p>
+            <a:pPr marL="342900" indent="-342900">
+              <a:buFont typeface="Arial" charset="0"/>
+              <a:buChar char="•"/>
+            </a:pPr>
+            <a:r>
+              <a:rPr lang="en-GB" dirty="0"/>
+              <a:t>The ”create-react-app” module provides all required build tools</a:t>
+            </a:r>
+          </a:p>
+          <a:p>
+            <a:pPr marL="342900" indent="-342900">
+              <a:buFont typeface="Arial" charset="0"/>
+              <a:buChar char="•"/>
+            </a:pPr>
+            <a:r>
+              <a:rPr lang="en-GB" dirty="0"/>
+              <a:t>A typical React dev environment:</a:t>
+            </a:r>
+          </a:p>
+          <a:p>
+            <a:pPr marL="1028700" lvl="1" indent="-342900">
+              <a:buFont typeface="Arial" charset="0"/>
+              <a:buChar char="•"/>
+            </a:pPr>
+            <a:r>
+              <a:rPr lang="en-GB" dirty="0"/>
+              <a:t>Atom/VS Code (Editor)</a:t>
+            </a:r>
+          </a:p>
+          <a:p>
+            <a:pPr marL="1028700" lvl="1" indent="-342900">
+              <a:buFont typeface="Arial" charset="0"/>
+              <a:buChar char="•"/>
+            </a:pPr>
+            <a:r>
+              <a:rPr lang="en-GB" dirty="0"/>
+              <a:t>NodeJS</a:t>
+            </a:r>
+          </a:p>
+          <a:p>
+            <a:pPr marL="1028700" lvl="1" indent="-342900">
+              <a:buFont typeface="Arial" charset="0"/>
+              <a:buChar char="•"/>
+            </a:pPr>
+            <a:r>
+              <a:rPr lang="en-GB" dirty="0"/>
+              <a:t>ExpressJS</a:t>
+            </a:r>
+          </a:p>
+          <a:p>
+            <a:pPr marL="1028700" lvl="1" indent="-342900">
+              <a:buFont typeface="Arial" charset="0"/>
+              <a:buChar char="•"/>
+            </a:pPr>
+            <a:r>
+              <a:rPr lang="en-GB" dirty="0"/>
+              <a:t>Webpack</a:t>
+            </a:r>
+          </a:p>
+        </p:txBody>
+      </p:sp>
+    </p:spTree>
+    <p:extLst>
+      <p:ext uri="{BB962C8B-B14F-4D97-AF65-F5344CB8AC3E}">
+        <p14:creationId xmlns:p14="http://schemas.microsoft.com/office/powerpoint/2010/main" val="3971490633"/>
+      </p:ext>
+    </p:extLst>
+  </p:cSld>
+  <p:clrMapOvr>
+    <a:masterClrMapping/>
+  </p:clrMapOvr>
+</p:sld>
+</file>
+
+<file path=ppt/slides/slide37.xml><?xml version="1.0" encoding="utf-8"?>
+<p:sld xmlns:a="http://schemas.openxmlformats.org/drawingml/2006/main" xmlns:r="http://schemas.openxmlformats.org/officeDocument/2006/relationships" xmlns:p="http://schemas.openxmlformats.org/presentationml/2006/main">
+  <p:cSld>
+    <p:spTree>
+      <p:nvGrpSpPr>
+        <p:cNvPr id="1" name=""/>
+        <p:cNvGrpSpPr/>
+        <p:nvPr/>
+      </p:nvGrpSpPr>
+      <p:grpSpPr>
+        <a:xfrm>
+          <a:off x="0" y="0"/>
+          <a:ext cx="0" cy="0"/>
+          <a:chOff x="0" y="0"/>
+          <a:chExt cx="0" cy="0"/>
+        </a:xfrm>
+      </p:grpSpPr>
+      <p:sp>
+        <p:nvSpPr>
+          <p:cNvPr id="4" name="Title 3">
+            <a:extLst>
+              <a:ext uri="{FF2B5EF4-FFF2-40B4-BE49-F238E27FC236}">
                 <a16:creationId xmlns:a16="http://schemas.microsoft.com/office/drawing/2014/main" id="{75876BD9-C5C4-4A60-B61B-447A703671BD}"/>
               </a:ext>
             </a:extLst>
@@ -9868,14 +10500,16 @@
         </p:nvSpPr>
         <p:spPr/>
         <p:txBody>
-          <a:bodyPr/>
+          <a:bodyPr>
+            <a:normAutofit/>
+          </a:bodyPr>
           <a:lstStyle/>
           <a:p>
             <a:pPr marL="0" indent="0">
               <a:buNone/>
             </a:pPr>
             <a:r>
-              <a:rPr lang="en-GB" dirty="0"/>
+              <a:rPr lang="en-GB" sz="2000" dirty="0"/>
               <a:t>Paul Withers</a:t>
             </a:r>
           </a:p>
@@ -9884,7 +10518,7 @@
               <a:buNone/>
             </a:pPr>
             <a:r>
-              <a:rPr lang="en-GB" dirty="0"/>
+              <a:rPr lang="en-GB" sz="2000" dirty="0"/>
               <a:t>Intec Systems Ltd</a:t>
             </a:r>
           </a:p>
@@ -9902,21 +10536,21 @@
               <a:buNone/>
             </a:pPr>
             <a:r>
-              <a:rPr lang="en-GB" dirty="0"/>
+              <a:rPr lang="en-GB" sz="2000" dirty="0"/>
               <a:t>@</a:t>
             </a:r>
             <a:r>
-              <a:rPr lang="en-GB" dirty="0" err="1"/>
+              <a:rPr lang="en-GB" sz="2000" dirty="0" err="1"/>
               <a:t>paulswithers</a:t>
             </a:r>
-            <a:endParaRPr lang="en-GB" dirty="0"/>
+            <a:endParaRPr lang="en-GB" sz="2000" dirty="0"/>
           </a:p>
           <a:p>
             <a:pPr marL="0" indent="0">
               <a:buNone/>
             </a:pPr>
             <a:r>
-              <a:rPr lang="en-GB" dirty="0"/>
+              <a:rPr lang="en-GB" sz="2000" dirty="0"/>
               <a:t>http://watsonwork.me/pwithers@intec.co.uk</a:t>
             </a:r>
           </a:p>
@@ -9938,12 +10572,75 @@
             <p:ph sz="half" idx="2"/>
           </p:nvPr>
         </p:nvSpPr>
-        <p:spPr/>
+        <p:spPr>
+          <a:xfrm>
+            <a:off x="4125191" y="2059477"/>
+            <a:ext cx="4382705" cy="4295863"/>
+          </a:xfrm>
+        </p:spPr>
         <p:txBody>
           <a:bodyPr/>
           <a:lstStyle/>
           <a:p>
-            <a:endParaRPr lang="en-GB"/>
+            <a:pPr marL="0" indent="0">
+              <a:buNone/>
+            </a:pPr>
+            <a:r>
+              <a:rPr lang="en-GB" sz="2000" dirty="0"/>
+              <a:t>John Jardin</a:t>
+            </a:r>
+          </a:p>
+          <a:p>
+            <a:pPr marL="0" indent="0">
+              <a:buNone/>
+            </a:pPr>
+            <a:r>
+              <a:rPr lang="en-GB" sz="2000" dirty="0"/>
+              <a:t>Agilit-e</a:t>
+            </a:r>
+          </a:p>
+          <a:p>
+            <a:pPr marL="0" indent="0">
+              <a:buNone/>
+            </a:pPr>
+            <a:r>
+              <a:rPr lang="en-GB" sz="2000" dirty="0"/>
+              <a:t>Website: https://</a:t>
+            </a:r>
+            <a:r>
+              <a:rPr lang="en-GB" sz="2000" dirty="0" err="1"/>
+              <a:t>www.agilite.io</a:t>
+            </a:r>
+            <a:endParaRPr lang="en-GB" sz="2000" dirty="0"/>
+          </a:p>
+          <a:p>
+            <a:pPr marL="0" indent="0">
+              <a:buNone/>
+            </a:pPr>
+            <a:r>
+              <a:rPr lang="en-GB" sz="2000" dirty="0"/>
+              <a:t>Blog: http://</a:t>
+            </a:r>
+            <a:r>
+              <a:rPr lang="en-GB" sz="2000" dirty="0" err="1"/>
+              <a:t>bleedingcode.com</a:t>
+            </a:r>
+            <a:endParaRPr lang="en-GB" sz="2000" dirty="0"/>
+          </a:p>
+          <a:p>
+            <a:pPr marL="0" indent="0">
+              <a:buNone/>
+            </a:pPr>
+            <a:r>
+              <a:rPr lang="en-GB" sz="2000" dirty="0"/>
+              <a:t>Twitter: @JohnJardinCodes</a:t>
+            </a:r>
+          </a:p>
+          <a:p>
+            <a:pPr marL="0" indent="0">
+              <a:buNone/>
+            </a:pPr>
+            <a:endParaRPr lang="en-GB" dirty="0"/>
           </a:p>
         </p:txBody>
       </p:sp>
@@ -10073,6 +10770,16 @@
             <a:r>
               <a:rPr lang="en-GB" dirty="0"/>
               <a:t>Container Clustering</a:t>
+            </a:r>
+          </a:p>
+          <a:p>
+            <a:pPr marL="342900" indent="-342900">
+              <a:buFontTx/>
+              <a:buChar char="-"/>
+            </a:pPr>
+            <a:r>
+              <a:rPr lang="en-GB" dirty="0"/>
+              <a:t>ReactJS</a:t>
             </a:r>
           </a:p>
           <a:p>

</xml_diff>

<commit_message>
Updates to presentation covering Domino 10 announcements
</commit_message>
<xml_diff>
--- a/presentation/8598 Domino and JS.pptx
+++ b/presentation/8598 Domino and JS.pptx
@@ -262,7 +262,7 @@
           <a:p>
             <a:fld id="{790E51D3-653E-462A-88BF-90B852BBE668}" type="datetimeFigureOut">
               <a:rPr lang="en-GB" smtClean="0"/>
-              <a:t>21/02/2018</a:t>
+              <a:t>01/03/2018</a:t>
             </a:fld>
             <a:endParaRPr lang="en-GB" dirty="0"/>
           </a:p>
@@ -439,7 +439,7 @@
           <a:p>
             <a:fld id="{60164965-4043-4174-93BC-54F5E5CCBD1D}" type="datetimeFigureOut">
               <a:rPr lang="en-US" smtClean="0"/>
-              <a:t>2/21/18</a:t>
+              <a:t>3/1/2018</a:t>
             </a:fld>
             <a:endParaRPr lang="en-US" dirty="0"/>
           </a:p>
@@ -5661,13 +5661,13 @@
         </p:nvSpPr>
         <p:spPr>
           <a:xfrm>
-            <a:off x="266699" y="1933350"/>
-            <a:ext cx="8229601" cy="4064680"/>
+            <a:off x="266699" y="1536493"/>
+            <a:ext cx="8229601" cy="4461537"/>
           </a:xfrm>
         </p:spPr>
         <p:txBody>
           <a:bodyPr>
-            <a:normAutofit fontScale="77500" lnSpcReduction="20000"/>
+            <a:normAutofit fontScale="62500" lnSpcReduction="20000"/>
           </a:bodyPr>
           <a:lstStyle/>
           <a:p>
@@ -5781,8 +5781,30 @@
           </a:p>
           <a:p>
             <a:r>
-              <a:rPr lang="en-GB" dirty="0"/>
-              <a:t>Darwino Microservices</a:t>
+              <a:rPr lang="en-GB" dirty="0" err="1"/>
+              <a:t>Darwino</a:t>
+            </a:r>
+            <a:r>
+              <a:rPr lang="en-GB" dirty="0"/>
+              <a:t> Microservices</a:t>
+            </a:r>
+          </a:p>
+          <a:p>
+            <a:endParaRPr lang="en-GB" dirty="0"/>
+          </a:p>
+          <a:p>
+            <a:pPr algn="ctr"/>
+            <a:r>
+              <a:rPr lang="en-GB" sz="3200" b="1" i="1" dirty="0"/>
+              <a:t>Newsflash: Domino10 brings NodeJS, </a:t>
+            </a:r>
+            <a:r>
+              <a:rPr lang="en-GB" sz="3200" b="1" i="1" dirty="0" err="1"/>
+              <a:t>LoopBack</a:t>
+            </a:r>
+            <a:r>
+              <a:rPr lang="en-GB" sz="3200" b="1" i="1" dirty="0"/>
+              <a:t>, (Node-RED)</a:t>
             </a:r>
           </a:p>
         </p:txBody>
@@ -5869,7 +5891,7 @@
         </p:spPr>
         <p:txBody>
           <a:bodyPr>
-            <a:normAutofit lnSpcReduction="10000"/>
+            <a:normAutofit fontScale="92500" lnSpcReduction="20000"/>
           </a:bodyPr>
           <a:lstStyle/>
           <a:p>
@@ -5885,6 +5907,16 @@
             </a:pPr>
             <a:r>
               <a:rPr lang="en-GB" dirty="0"/>
+              <a:t>More planning up-front</a:t>
+            </a:r>
+          </a:p>
+          <a:p>
+            <a:pPr marL="342900" indent="-342900">
+              <a:buFontTx/>
+              <a:buChar char="-"/>
+            </a:pPr>
+            <a:r>
+              <a:rPr lang="en-GB" dirty="0"/>
               <a:t>Longer </a:t>
             </a:r>
             <a:r>
@@ -5894,6 +5926,19 @@
             <a:r>
               <a:rPr lang="en-GB" dirty="0"/>
               <a:t> development lifecycle</a:t>
+            </a:r>
+          </a:p>
+          <a:p>
+            <a:pPr lvl="1" indent="0">
+              <a:buNone/>
+            </a:pPr>
+            <a:r>
+              <a:rPr lang="en-GB" sz="2600" b="1" dirty="0" err="1"/>
+              <a:t>LoopBack</a:t>
+            </a:r>
+            <a:r>
+              <a:rPr lang="en-GB" sz="2600" b="1" dirty="0"/>
+              <a:t> + NodeJS FTW with Domino 10??</a:t>
             </a:r>
           </a:p>
           <a:p>
@@ -6534,6 +6579,20 @@
             <a:r>
               <a:rPr lang="en-GB" dirty="0"/>
               <a:t>RestClient plugin for Firefox</a:t>
+            </a:r>
+          </a:p>
+          <a:p>
+            <a:pPr marL="342900" indent="-342900">
+              <a:buFontTx/>
+              <a:buChar char="-"/>
+            </a:pPr>
+            <a:r>
+              <a:rPr lang="en-GB" b="1" dirty="0" err="1"/>
+              <a:t>LoopBack</a:t>
+            </a:r>
+            <a:r>
+              <a:rPr lang="en-GB" b="1" dirty="0"/>
+              <a:t> with Domino 10</a:t>
             </a:r>
           </a:p>
         </p:txBody>
@@ -7943,9 +8002,16 @@
             <p:ph idx="1"/>
           </p:nvPr>
         </p:nvSpPr>
-        <p:spPr/>
-        <p:txBody>
-          <a:bodyPr/>
+        <p:spPr>
+          <a:xfrm>
+            <a:off x="266699" y="1933349"/>
+            <a:ext cx="8694421" cy="4055469"/>
+          </a:xfrm>
+        </p:spPr>
+        <p:txBody>
+          <a:bodyPr>
+            <a:normAutofit/>
+          </a:bodyPr>
           <a:lstStyle/>
           <a:p>
             <a:r>
@@ -7974,8 +8040,13 @@
           <a:p>
             <a:r>
               <a:rPr lang="en-GB" dirty="0"/>
-              <a:t>Node-RED</a:t>
-            </a:r>
+              <a:t>Node-RED – </a:t>
+            </a:r>
+            <a:r>
+              <a:rPr lang="en-GB" b="1" dirty="0"/>
+              <a:t>Installable alongside Domino with NodeJS</a:t>
+            </a:r>
+            <a:endParaRPr lang="en-GB" dirty="0"/>
           </a:p>
           <a:p>
             <a:r>
@@ -8098,6 +8169,12 @@
             <a:r>
               <a:rPr lang="en-GB" dirty="0"/>
               <a:t>Schedule tasks via Inject node (or Big Timer)</a:t>
+            </a:r>
+          </a:p>
+          <a:p>
+            <a:r>
+              <a:rPr lang="en-GB" dirty="0"/>
+              <a:t>Additional nodes for e.g. Watson Services</a:t>
             </a:r>
           </a:p>
           <a:p>

</xml_diff>

<commit_message>
- Updates to Presentation
</commit_message>
<xml_diff>
--- a/presentation/8598 Domino and JS.pptx
+++ b/presentation/8598 Domino and JS.pptx
@@ -266,7 +266,7 @@
           <a:p>
             <a:fld id="{790E51D3-653E-462A-88BF-90B852BBE668}" type="datetimeFigureOut">
               <a:rPr lang="en-GB" smtClean="0"/>
-              <a:t>22/03/2018</a:t>
+              <a:t>28/03/2018</a:t>
             </a:fld>
             <a:endParaRPr lang="en-GB" dirty="0"/>
           </a:p>
@@ -443,7 +443,7 @@
           <a:p>
             <a:fld id="{60164965-4043-4174-93BC-54F5E5CCBD1D}" type="datetimeFigureOut">
               <a:rPr lang="en-US" smtClean="0"/>
-              <a:t>3/22/18</a:t>
+              <a:t>3/28/18</a:t>
             </a:fld>
             <a:endParaRPr lang="en-US" dirty="0"/>
           </a:p>
@@ -5249,8 +5249,12 @@
           <a:lstStyle/>
           <a:p>
             <a:r>
+              <a:rPr lang="en-GB" sz="4400"/>
+              <a:t>8598 - </a:t>
+            </a:r>
+            <a:r>
               <a:rPr lang="en-GB" sz="4400" dirty="0"/>
-              <a:t>8598 Tips and Tricks: Domino and JavaScript development masterclass</a:t>
+              <a:t>Tips and Tricks: Domino and JavaScript development masterclass</a:t>
             </a:r>
             <a:endParaRPr lang="en-GB" dirty="0"/>
           </a:p>
@@ -12901,8 +12905,12 @@
           <a:lstStyle/>
           <a:p>
             <a:r>
-              <a:rPr lang="en-GB" dirty="0"/>
-              <a:t>There are similarities to a microservice architecture, just differences of scale</a:t>
+              <a:rPr lang="en-GB" i="1" dirty="0"/>
+              <a:t>Philosophically</a:t>
+            </a:r>
+            <a:r>
+              <a:rPr lang="en-GB" dirty="0"/>
+              <a:t>, there are similarities to a microservice architecture, just differences of scale</a:t>
             </a:r>
           </a:p>
           <a:p>

</xml_diff>

<commit_message>
Changes made for Engage - presentations and markCompleteReopen
</commit_message>
<xml_diff>
--- a/presentation/8598 Domino and JS.pptx
+++ b/presentation/8598 Domino and JS.pptx
@@ -23,33 +23,33 @@
     <p:sldId id="262" r:id="rId11"/>
     <p:sldId id="296" r:id="rId12"/>
     <p:sldId id="295" r:id="rId13"/>
-    <p:sldId id="271" r:id="rId14"/>
-    <p:sldId id="264" r:id="rId15"/>
-    <p:sldId id="267" r:id="rId16"/>
-    <p:sldId id="279" r:id="rId17"/>
-    <p:sldId id="294" r:id="rId18"/>
-    <p:sldId id="268" r:id="rId19"/>
-    <p:sldId id="269" r:id="rId20"/>
-    <p:sldId id="270" r:id="rId21"/>
-    <p:sldId id="266" r:id="rId22"/>
-    <p:sldId id="265" r:id="rId23"/>
-    <p:sldId id="281" r:id="rId24"/>
-    <p:sldId id="274" r:id="rId25"/>
-    <p:sldId id="275" r:id="rId26"/>
-    <p:sldId id="276" r:id="rId27"/>
-    <p:sldId id="277" r:id="rId28"/>
-    <p:sldId id="278" r:id="rId29"/>
-    <p:sldId id="282" r:id="rId30"/>
-    <p:sldId id="284" r:id="rId31"/>
-    <p:sldId id="285" r:id="rId32"/>
-    <p:sldId id="286" r:id="rId33"/>
-    <p:sldId id="287" r:id="rId34"/>
-    <p:sldId id="283" r:id="rId35"/>
-    <p:sldId id="288" r:id="rId36"/>
-    <p:sldId id="289" r:id="rId37"/>
-    <p:sldId id="291" r:id="rId38"/>
-    <p:sldId id="292" r:id="rId39"/>
-    <p:sldId id="293" r:id="rId40"/>
+    <p:sldId id="283" r:id="rId14"/>
+    <p:sldId id="286" r:id="rId15"/>
+    <p:sldId id="287" r:id="rId16"/>
+    <p:sldId id="288" r:id="rId17"/>
+    <p:sldId id="289" r:id="rId18"/>
+    <p:sldId id="291" r:id="rId19"/>
+    <p:sldId id="292" r:id="rId20"/>
+    <p:sldId id="293" r:id="rId21"/>
+    <p:sldId id="271" r:id="rId22"/>
+    <p:sldId id="264" r:id="rId23"/>
+    <p:sldId id="267" r:id="rId24"/>
+    <p:sldId id="279" r:id="rId25"/>
+    <p:sldId id="294" r:id="rId26"/>
+    <p:sldId id="268" r:id="rId27"/>
+    <p:sldId id="269" r:id="rId28"/>
+    <p:sldId id="270" r:id="rId29"/>
+    <p:sldId id="266" r:id="rId30"/>
+    <p:sldId id="265" r:id="rId31"/>
+    <p:sldId id="281" r:id="rId32"/>
+    <p:sldId id="274" r:id="rId33"/>
+    <p:sldId id="275" r:id="rId34"/>
+    <p:sldId id="276" r:id="rId35"/>
+    <p:sldId id="277" r:id="rId36"/>
+    <p:sldId id="278" r:id="rId37"/>
+    <p:sldId id="282" r:id="rId38"/>
+    <p:sldId id="284" r:id="rId39"/>
+    <p:sldId id="285" r:id="rId40"/>
     <p:sldId id="297" r:id="rId41"/>
     <p:sldId id="290" r:id="rId42"/>
   </p:sldIdLst>
@@ -266,7 +266,7 @@
           <a:p>
             <a:fld id="{790E51D3-653E-462A-88BF-90B852BBE668}" type="datetimeFigureOut">
               <a:rPr lang="en-GB" smtClean="0"/>
-              <a:t>28/03/2018</a:t>
+              <a:t>21/05/2018</a:t>
             </a:fld>
             <a:endParaRPr lang="en-GB" dirty="0"/>
           </a:p>
@@ -443,7 +443,7 @@
           <a:p>
             <a:fld id="{60164965-4043-4174-93BC-54F5E5CCBD1D}" type="datetimeFigureOut">
               <a:rPr lang="en-US" smtClean="0"/>
-              <a:t>3/28/18</a:t>
+              <a:t>5/21/2018</a:t>
             </a:fld>
             <a:endParaRPr lang="en-US" dirty="0"/>
           </a:p>
@@ -859,7 +859,7 @@
           <a:p>
             <a:fld id="{7F3C5AE6-245A-4892-87E4-2DDCA6560455}" type="slidenum">
               <a:rPr lang="en-US" smtClean="0"/>
-              <a:t>31</a:t>
+              <a:t>17</a:t>
             </a:fld>
             <a:endParaRPr lang="en-US" dirty="0"/>
           </a:p>
@@ -868,7 +868,7 @@
     </p:spTree>
     <p:extLst>
       <p:ext uri="{BB962C8B-B14F-4D97-AF65-F5344CB8AC3E}">
-        <p14:creationId xmlns:p14="http://schemas.microsoft.com/office/powerpoint/2010/main" val="57916406"/>
+        <p14:creationId xmlns:p14="http://schemas.microsoft.com/office/powerpoint/2010/main" val="1732915962"/>
       </p:ext>
     </p:extLst>
   </p:cSld>
@@ -943,7 +943,7 @@
           <a:p>
             <a:fld id="{7F3C5AE6-245A-4892-87E4-2DDCA6560455}" type="slidenum">
               <a:rPr lang="en-US" smtClean="0"/>
-              <a:t>32</a:t>
+              <a:t>18</a:t>
             </a:fld>
             <a:endParaRPr lang="en-US" dirty="0"/>
           </a:p>
@@ -952,7 +952,7 @@
     </p:spTree>
     <p:extLst>
       <p:ext uri="{BB962C8B-B14F-4D97-AF65-F5344CB8AC3E}">
-        <p14:creationId xmlns:p14="http://schemas.microsoft.com/office/powerpoint/2010/main" val="455794111"/>
+        <p14:creationId xmlns:p14="http://schemas.microsoft.com/office/powerpoint/2010/main" val="287894058"/>
       </p:ext>
     </p:extLst>
   </p:cSld>
@@ -1027,7 +1027,7 @@
           <a:p>
             <a:fld id="{7F3C5AE6-245A-4892-87E4-2DDCA6560455}" type="slidenum">
               <a:rPr lang="en-US" smtClean="0"/>
-              <a:t>33</a:t>
+              <a:t>19</a:t>
             </a:fld>
             <a:endParaRPr lang="en-US" dirty="0"/>
           </a:p>
@@ -1036,7 +1036,7 @@
     </p:spTree>
     <p:extLst>
       <p:ext uri="{BB962C8B-B14F-4D97-AF65-F5344CB8AC3E}">
-        <p14:creationId xmlns:p14="http://schemas.microsoft.com/office/powerpoint/2010/main" val="925894949"/>
+        <p14:creationId xmlns:p14="http://schemas.microsoft.com/office/powerpoint/2010/main" val="3767014860"/>
       </p:ext>
     </p:extLst>
   </p:cSld>
@@ -1111,7 +1111,7 @@
           <a:p>
             <a:fld id="{7F3C5AE6-245A-4892-87E4-2DDCA6560455}" type="slidenum">
               <a:rPr lang="en-US" smtClean="0"/>
-              <a:t>34</a:t>
+              <a:t>20</a:t>
             </a:fld>
             <a:endParaRPr lang="en-US" dirty="0"/>
           </a:p>
@@ -1120,7 +1120,7 @@
     </p:spTree>
     <p:extLst>
       <p:ext uri="{BB962C8B-B14F-4D97-AF65-F5344CB8AC3E}">
-        <p14:creationId xmlns:p14="http://schemas.microsoft.com/office/powerpoint/2010/main" val="1399480663"/>
+        <p14:creationId xmlns:p14="http://schemas.microsoft.com/office/powerpoint/2010/main" val="2450043316"/>
       </p:ext>
     </p:extLst>
   </p:cSld>
@@ -1195,7 +1195,7 @@
           <a:p>
             <a:fld id="{7F3C5AE6-245A-4892-87E4-2DDCA6560455}" type="slidenum">
               <a:rPr lang="en-US" smtClean="0"/>
-              <a:t>35</a:t>
+              <a:t>34</a:t>
             </a:fld>
             <a:endParaRPr lang="en-US" dirty="0"/>
           </a:p>
@@ -1204,7 +1204,7 @@
     </p:spTree>
     <p:extLst>
       <p:ext uri="{BB962C8B-B14F-4D97-AF65-F5344CB8AC3E}">
-        <p14:creationId xmlns:p14="http://schemas.microsoft.com/office/powerpoint/2010/main" val="237592745"/>
+        <p14:creationId xmlns:p14="http://schemas.microsoft.com/office/powerpoint/2010/main" val="1190420200"/>
       </p:ext>
     </p:extLst>
   </p:cSld>
@@ -1288,7 +1288,7 @@
     </p:spTree>
     <p:extLst>
       <p:ext uri="{BB962C8B-B14F-4D97-AF65-F5344CB8AC3E}">
-        <p14:creationId xmlns:p14="http://schemas.microsoft.com/office/powerpoint/2010/main" val="1732915962"/>
+        <p14:creationId xmlns:p14="http://schemas.microsoft.com/office/powerpoint/2010/main" val="1954709553"/>
       </p:ext>
     </p:extLst>
   </p:cSld>
@@ -1372,7 +1372,7 @@
     </p:spTree>
     <p:extLst>
       <p:ext uri="{BB962C8B-B14F-4D97-AF65-F5344CB8AC3E}">
-        <p14:creationId xmlns:p14="http://schemas.microsoft.com/office/powerpoint/2010/main" val="287894058"/>
+        <p14:creationId xmlns:p14="http://schemas.microsoft.com/office/powerpoint/2010/main" val="109818915"/>
       </p:ext>
     </p:extLst>
   </p:cSld>
@@ -1456,7 +1456,7 @@
     </p:spTree>
     <p:extLst>
       <p:ext uri="{BB962C8B-B14F-4D97-AF65-F5344CB8AC3E}">
-        <p14:creationId xmlns:p14="http://schemas.microsoft.com/office/powerpoint/2010/main" val="3767014860"/>
+        <p14:creationId xmlns:p14="http://schemas.microsoft.com/office/powerpoint/2010/main" val="1850718169"/>
       </p:ext>
     </p:extLst>
   </p:cSld>
@@ -1540,7 +1540,7 @@
     </p:spTree>
     <p:extLst>
       <p:ext uri="{BB962C8B-B14F-4D97-AF65-F5344CB8AC3E}">
-        <p14:creationId xmlns:p14="http://schemas.microsoft.com/office/powerpoint/2010/main" val="2450043316"/>
+        <p14:creationId xmlns:p14="http://schemas.microsoft.com/office/powerpoint/2010/main" val="57916406"/>
       </p:ext>
     </p:extLst>
   </p:cSld>
@@ -1951,7 +1951,7 @@
           <a:p>
             <a:fld id="{7F3C5AE6-245A-4892-87E4-2DDCA6560455}" type="slidenum">
               <a:rPr lang="en-US" smtClean="0"/>
-              <a:t>26</a:t>
+              <a:t>13</a:t>
             </a:fld>
             <a:endParaRPr lang="en-US" dirty="0"/>
           </a:p>
@@ -1960,7 +1960,7 @@
     </p:spTree>
     <p:extLst>
       <p:ext uri="{BB962C8B-B14F-4D97-AF65-F5344CB8AC3E}">
-        <p14:creationId xmlns:p14="http://schemas.microsoft.com/office/powerpoint/2010/main" val="1190420200"/>
+        <p14:creationId xmlns:p14="http://schemas.microsoft.com/office/powerpoint/2010/main" val="1399480663"/>
       </p:ext>
     </p:extLst>
   </p:cSld>
@@ -2035,7 +2035,7 @@
           <a:p>
             <a:fld id="{7F3C5AE6-245A-4892-87E4-2DDCA6560455}" type="slidenum">
               <a:rPr lang="en-US" smtClean="0"/>
-              <a:t>28</a:t>
+              <a:t>14</a:t>
             </a:fld>
             <a:endParaRPr lang="en-US" dirty="0"/>
           </a:p>
@@ -2044,7 +2044,7 @@
     </p:spTree>
     <p:extLst>
       <p:ext uri="{BB962C8B-B14F-4D97-AF65-F5344CB8AC3E}">
-        <p14:creationId xmlns:p14="http://schemas.microsoft.com/office/powerpoint/2010/main" val="1954709553"/>
+        <p14:creationId xmlns:p14="http://schemas.microsoft.com/office/powerpoint/2010/main" val="455794111"/>
       </p:ext>
     </p:extLst>
   </p:cSld>
@@ -2119,7 +2119,7 @@
           <a:p>
             <a:fld id="{7F3C5AE6-245A-4892-87E4-2DDCA6560455}" type="slidenum">
               <a:rPr lang="en-US" smtClean="0"/>
-              <a:t>29</a:t>
+              <a:t>15</a:t>
             </a:fld>
             <a:endParaRPr lang="en-US" dirty="0"/>
           </a:p>
@@ -2128,7 +2128,7 @@
     </p:spTree>
     <p:extLst>
       <p:ext uri="{BB962C8B-B14F-4D97-AF65-F5344CB8AC3E}">
-        <p14:creationId xmlns:p14="http://schemas.microsoft.com/office/powerpoint/2010/main" val="109818915"/>
+        <p14:creationId xmlns:p14="http://schemas.microsoft.com/office/powerpoint/2010/main" val="925894949"/>
       </p:ext>
     </p:extLst>
   </p:cSld>
@@ -2203,7 +2203,7 @@
           <a:p>
             <a:fld id="{7F3C5AE6-245A-4892-87E4-2DDCA6560455}" type="slidenum">
               <a:rPr lang="en-US" smtClean="0"/>
-              <a:t>30</a:t>
+              <a:t>16</a:t>
             </a:fld>
             <a:endParaRPr lang="en-US" dirty="0"/>
           </a:p>
@@ -2212,7 +2212,7 @@
     </p:spTree>
     <p:extLst>
       <p:ext uri="{BB962C8B-B14F-4D97-AF65-F5344CB8AC3E}">
-        <p14:creationId xmlns:p14="http://schemas.microsoft.com/office/powerpoint/2010/main" val="1850718169"/>
+        <p14:creationId xmlns:p14="http://schemas.microsoft.com/office/powerpoint/2010/main" val="237592745"/>
       </p:ext>
     </p:extLst>
   </p:cSld>
@@ -5249,10 +5249,6 @@
           <a:lstStyle/>
           <a:p>
             <a:r>
-              <a:rPr lang="en-GB" sz="4400"/>
-              <a:t>8598 - </a:t>
-            </a:r>
-            <a:r>
               <a:rPr lang="en-GB" sz="4400" dirty="0"/>
               <a:t>Tips and Tricks: Domino and JavaScript development masterclass</a:t>
             </a:r>
@@ -5283,7 +5279,7 @@
           <a:p>
             <a:r>
               <a:rPr lang="en-US" dirty="0"/>
-              <a:t>John Jardin, Agilit-e</a:t>
+              <a:t>With thanks to John Jardin, Agilit-e</a:t>
             </a:r>
           </a:p>
         </p:txBody>
@@ -5321,7 +5317,7 @@
                 <a:latin typeface="Arial" panose="020B0604020202020204" pitchFamily="34" charset="0"/>
                 <a:cs typeface="Arial" panose="020B0604020202020204" pitchFamily="34" charset="0"/>
               </a:rPr>
-              <a:t>Think 2018</a:t>
+              <a:t>Engage 2018</a:t>
             </a:r>
             <a:endParaRPr lang="en-GB" dirty="0">
               <a:latin typeface="Arial" panose="020B0604020202020204" pitchFamily="34" charset="0"/>
@@ -5344,8 +5340,8 @@
         </p:nvSpPr>
         <p:spPr>
           <a:xfrm>
-            <a:off x="9437900" y="225136"/>
-            <a:ext cx="1926777" cy="523220"/>
+            <a:off x="9316278" y="225136"/>
+            <a:ext cx="2048399" cy="523220"/>
           </a:xfrm>
           <a:prstGeom prst="rect">
             <a:avLst/>
@@ -5363,7 +5359,14 @@
                 <a:latin typeface="Arial" panose="020B0604020202020204" pitchFamily="34" charset="0"/>
                 <a:cs typeface="Arial" panose="020B0604020202020204" pitchFamily="34" charset="0"/>
               </a:rPr>
-              <a:t>#IBMThink</a:t>
+              <a:t>#</a:t>
+            </a:r>
+            <a:r>
+              <a:rPr lang="en-GB" sz="2800" dirty="0" err="1">
+                <a:latin typeface="Arial" panose="020B0604020202020204" pitchFamily="34" charset="0"/>
+                <a:cs typeface="Arial" panose="020B0604020202020204" pitchFamily="34" charset="0"/>
+              </a:rPr>
+              <a:t>engageug</a:t>
             </a:r>
             <a:endParaRPr lang="en-GB" dirty="0">
               <a:latin typeface="Arial" panose="020B0604020202020204" pitchFamily="34" charset="0"/>
@@ -5591,6 +5594,36 @@
           </a:p>
         </p:txBody>
       </p:sp>
+      <p:pic>
+        <p:nvPicPr>
+          <p:cNvPr id="2" name="Picture 1">
+            <a:extLst>
+              <a:ext uri="{FF2B5EF4-FFF2-40B4-BE49-F238E27FC236}">
+                <a16:creationId xmlns:a16="http://schemas.microsoft.com/office/drawing/2014/main" id="{1BAF24D8-C0E5-495D-BCB1-1DEAA0DC462C}"/>
+              </a:ext>
+            </a:extLst>
+          </p:cNvPr>
+          <p:cNvPicPr>
+            <a:picLocks noChangeAspect="1"/>
+          </p:cNvPicPr>
+          <p:nvPr/>
+        </p:nvPicPr>
+        <p:blipFill>
+          <a:blip r:embed="rId2"/>
+          <a:stretch>
+            <a:fillRect/>
+          </a:stretch>
+        </p:blipFill>
+        <p:spPr>
+          <a:xfrm>
+            <a:off x="743074" y="2261360"/>
+            <a:ext cx="7596872" cy="2196053"/>
+          </a:xfrm>
+          <a:prstGeom prst="rect">
+            <a:avLst/>
+          </a:prstGeom>
+        </p:spPr>
+      </p:pic>
     </p:spTree>
     <p:extLst>
       <p:ext uri="{BB962C8B-B14F-4D97-AF65-F5344CB8AC3E}">
@@ -6636,7 +6669,7 @@
           <p:cNvPr id="4" name="Title 3">
             <a:extLst>
               <a:ext uri="{FF2B5EF4-FFF2-40B4-BE49-F238E27FC236}">
-                <a16:creationId xmlns:a16="http://schemas.microsoft.com/office/drawing/2014/main" id="{642A4954-D8E0-4C0D-B4A7-23E696B306FD}"/>
+                <a16:creationId xmlns:a16="http://schemas.microsoft.com/office/drawing/2014/main" id="{D691CD7C-405A-4343-A99A-F7317A35A1A1}"/>
               </a:ext>
             </a:extLst>
           </p:cNvPr>
@@ -6649,14 +6682,12 @@
         </p:nvSpPr>
         <p:spPr/>
         <p:txBody>
-          <a:bodyPr>
-            <a:normAutofit fontScale="90000"/>
-          </a:bodyPr>
-          <a:lstStyle/>
-          <a:p>
-            <a:r>
-              <a:rPr lang="en-GB" dirty="0"/>
-              <a:t>Domino as a  datastore and api gateway</a:t>
+          <a:bodyPr/>
+          <a:lstStyle/>
+          <a:p>
+            <a:r>
+              <a:rPr lang="en-GB" dirty="0"/>
+              <a:t>Container Clustering</a:t>
             </a:r>
           </a:p>
         </p:txBody>
@@ -6664,7 +6695,7 @@
     </p:spTree>
     <p:extLst>
       <p:ext uri="{BB962C8B-B14F-4D97-AF65-F5344CB8AC3E}">
-        <p14:creationId xmlns:p14="http://schemas.microsoft.com/office/powerpoint/2010/main" val="1219390215"/>
+        <p14:creationId xmlns:p14="http://schemas.microsoft.com/office/powerpoint/2010/main" val="376630796"/>
       </p:ext>
     </p:extLst>
   </p:cSld>
@@ -6696,7 +6727,7 @@
           <p:cNvPr id="2" name="Title 1">
             <a:extLst>
               <a:ext uri="{FF2B5EF4-FFF2-40B4-BE49-F238E27FC236}">
-                <a16:creationId xmlns:a16="http://schemas.microsoft.com/office/drawing/2014/main" id="{1A530216-0158-4426-8CAF-8D17A505629F}"/>
+                <a16:creationId xmlns:a16="http://schemas.microsoft.com/office/drawing/2014/main" id="{004A5E56-F513-4A94-A58F-4235E160341C}"/>
               </a:ext>
             </a:extLst>
           </p:cNvPr>
@@ -6714,7 +6745,7 @@
           <a:p>
             <a:r>
               <a:rPr lang="en-GB" dirty="0"/>
-              <a:t>Domino rest options</a:t>
+              <a:t>A Different Approach</a:t>
             </a:r>
           </a:p>
         </p:txBody>
@@ -6724,7 +6755,7 @@
           <p:cNvPr id="3" name="Content Placeholder 2">
             <a:extLst>
               <a:ext uri="{FF2B5EF4-FFF2-40B4-BE49-F238E27FC236}">
-                <a16:creationId xmlns:a16="http://schemas.microsoft.com/office/drawing/2014/main" id="{117770BD-8CC0-4139-A505-25D8CA68B2CB}"/>
+                <a16:creationId xmlns:a16="http://schemas.microsoft.com/office/drawing/2014/main" id="{3FAAA951-B22E-4803-A2C0-9CF1E7E33F9E}"/>
               </a:ext>
             </a:extLst>
           </p:cNvPr>
@@ -6735,168 +6766,69 @@
             <p:ph idx="1"/>
           </p:nvPr>
         </p:nvSpPr>
-        <p:spPr>
-          <a:xfrm>
-            <a:off x="266699" y="1536493"/>
-            <a:ext cx="8229601" cy="4461537"/>
-          </a:xfrm>
-        </p:spPr>
+        <p:spPr/>
         <p:txBody>
           <a:bodyPr>
-            <a:normAutofit fontScale="62500" lnSpcReduction="20000"/>
+            <a:normAutofit/>
           </a:bodyPr>
           <a:lstStyle/>
           <a:p>
-            <a:r>
-              <a:rPr lang="en-GB" dirty="0"/>
-              <a:t>DAS (Domino Access Services)</a:t>
-            </a:r>
-          </a:p>
-          <a:p>
-            <a:r>
-              <a:rPr lang="en-GB" dirty="0"/>
-              <a:t>	validation / visibility concerns</a:t>
-            </a:r>
-          </a:p>
-          <a:p>
-            <a:r>
-              <a:rPr lang="en-GB" dirty="0"/>
-              <a:t>XAgents</a:t>
-            </a:r>
-          </a:p>
-          <a:p>
-            <a:r>
-              <a:rPr lang="en-GB" dirty="0">
-                <a:latin typeface="Courier New" panose="02070309020205020404" pitchFamily="49" charset="0"/>
-                <a:cs typeface="Courier New" panose="02070309020205020404" pitchFamily="49" charset="0"/>
-              </a:rPr>
-              <a:t>	viewState=“</a:t>
-            </a:r>
-            <a:r>
-              <a:rPr lang="en-GB" dirty="0" err="1">
-                <a:latin typeface="Courier New" panose="02070309020205020404" pitchFamily="49" charset="0"/>
-                <a:cs typeface="Courier New" panose="02070309020205020404" pitchFamily="49" charset="0"/>
-              </a:rPr>
-              <a:t>nostate</a:t>
-            </a:r>
-            <a:r>
-              <a:rPr lang="en-GB" dirty="0">
-                <a:latin typeface="Courier New" panose="02070309020205020404" pitchFamily="49" charset="0"/>
-                <a:cs typeface="Courier New" panose="02070309020205020404" pitchFamily="49" charset="0"/>
-              </a:rPr>
-              <a:t>”</a:t>
-            </a:r>
-          </a:p>
-          <a:p>
-            <a:r>
-              <a:rPr lang="en-GB" dirty="0">
-                <a:latin typeface="Courier New" panose="02070309020205020404" pitchFamily="49" charset="0"/>
-                <a:cs typeface="Courier New" panose="02070309020205020404" pitchFamily="49" charset="0"/>
-              </a:rPr>
-              <a:t>	a</a:t>
-            </a:r>
-            <a:r>
-              <a:rPr lang="en-GB" dirty="0">
-                <a:cs typeface="Courier New" panose="02070309020205020404" pitchFamily="49" charset="0"/>
-              </a:rPr>
-              <a:t>llows caching in </a:t>
-            </a:r>
-            <a:r>
-              <a:rPr lang="en-GB" dirty="0" err="1">
-                <a:cs typeface="Courier New" panose="02070309020205020404" pitchFamily="49" charset="0"/>
-              </a:rPr>
-              <a:t>applicationScope</a:t>
-            </a:r>
-            <a:endParaRPr lang="en-GB" dirty="0">
-              <a:cs typeface="Courier New" panose="02070309020205020404" pitchFamily="49" charset="0"/>
-            </a:endParaRPr>
-          </a:p>
-          <a:p>
-            <a:r>
-              <a:rPr lang="en-GB" dirty="0"/>
-              <a:t>SmartNSF</a:t>
-            </a:r>
-          </a:p>
-          <a:p>
-            <a:r>
-              <a:rPr lang="en-GB" dirty="0"/>
-              <a:t>	written using Domain Specific Language</a:t>
-            </a:r>
-          </a:p>
-          <a:p>
-            <a:r>
-              <a:rPr lang="en-GB" b="1" i="1" dirty="0"/>
-              <a:t>ODA Starter Servlet</a:t>
-            </a:r>
-          </a:p>
-          <a:p>
-            <a:r>
-              <a:rPr lang="en-GB" dirty="0"/>
-              <a:t>	develop in Eclipse, local Domino server</a:t>
-            </a:r>
-          </a:p>
-          <a:p>
-            <a:r>
-              <a:rPr lang="en-GB" dirty="0"/>
-              <a:t>	development and deployment </a:t>
-            </a:r>
-            <a:r>
-              <a:rPr lang="en-GB" b="1" i="1" dirty="0"/>
-              <a:t>without Domino Designer</a:t>
-            </a:r>
+            <a:pPr marL="342900" indent="-342900">
+              <a:buFont typeface="Arial" charset="0"/>
+              <a:buChar char="•"/>
+            </a:pPr>
+            <a:r>
+              <a:rPr lang="en-GB" dirty="0"/>
+              <a:t>Don’t build 3</a:t>
+            </a:r>
+            <a:r>
+              <a:rPr lang="en-GB" baseline="30000" dirty="0"/>
+              <a:t>rd</a:t>
+            </a:r>
+            <a:r>
+              <a:rPr lang="en-GB" dirty="0"/>
+              <a:t> party technologies into Domino</a:t>
+            </a:r>
+          </a:p>
+          <a:p>
+            <a:pPr marL="342900" indent="-342900">
+              <a:buFont typeface="Arial" charset="0"/>
+              <a:buChar char="•"/>
+            </a:pPr>
+            <a:r>
+              <a:rPr lang="en-GB" dirty="0"/>
+              <a:t>Have these technologies exist as a sidecar to a Domino environment</a:t>
+            </a:r>
+          </a:p>
+          <a:p>
+            <a:pPr marL="342900" indent="-342900">
+              <a:buFont typeface="Arial" charset="0"/>
+              <a:buChar char="•"/>
+            </a:pPr>
+            <a:r>
+              <a:rPr lang="en-GB" dirty="0"/>
+              <a:t>Each technology or service existing independently as a container</a:t>
+            </a:r>
+          </a:p>
+          <a:p>
+            <a:pPr marL="342900" indent="-342900">
+              <a:buFont typeface="Arial" charset="0"/>
+              <a:buChar char="•"/>
+            </a:pPr>
+            <a:r>
+              <a:rPr lang="en-GB" dirty="0"/>
+              <a:t>All communication occurs using APIs</a:t>
+            </a:r>
+          </a:p>
+          <a:p>
             <a:endParaRPr lang="en-GB" dirty="0"/>
-          </a:p>
-          <a:p>
-            <a:r>
-              <a:rPr lang="en-GB" dirty="0">
-                <a:cs typeface="Courier New" panose="02070309020205020404" pitchFamily="49" charset="0"/>
-              </a:rPr>
-              <a:t>	allows powerful caching for better performance</a:t>
-            </a:r>
-            <a:endParaRPr lang="en-GB" dirty="0"/>
-          </a:p>
-          <a:p>
-            <a:r>
-              <a:rPr lang="en-GB" dirty="0" err="1"/>
-              <a:t>Darwino</a:t>
-            </a:r>
-            <a:r>
-              <a:rPr lang="en-GB" dirty="0"/>
-              <a:t> Microservices</a:t>
-            </a:r>
-          </a:p>
-          <a:p>
-            <a:endParaRPr lang="en-GB" dirty="0"/>
-          </a:p>
-          <a:p>
-            <a:pPr algn="ctr"/>
-            <a:r>
-              <a:rPr lang="en-GB" sz="3200" b="1" i="1" dirty="0"/>
-              <a:t>Newsflash: Domino10 brings NodeJS, </a:t>
-            </a:r>
-            <a:r>
-              <a:rPr lang="en-GB" sz="3200" b="1" i="1" dirty="0" err="1"/>
-              <a:t>dominoDB</a:t>
-            </a:r>
-            <a:r>
-              <a:rPr lang="en-GB" sz="3200" b="1" i="1" dirty="0"/>
-              <a:t>, </a:t>
-            </a:r>
-            <a:r>
-              <a:rPr lang="en-GB" sz="3200" b="1" i="1" dirty="0" err="1"/>
-              <a:t>LoopBack</a:t>
-            </a:r>
-            <a:r>
-              <a:rPr lang="en-GB" sz="3200" b="1" i="1" dirty="0"/>
-              <a:t>, (Node-RED)</a:t>
-            </a:r>
           </a:p>
         </p:txBody>
       </p:sp>
     </p:spTree>
     <p:extLst>
       <p:ext uri="{BB962C8B-B14F-4D97-AF65-F5344CB8AC3E}">
-        <p14:creationId xmlns:p14="http://schemas.microsoft.com/office/powerpoint/2010/main" val="2249062884"/>
+        <p14:creationId xmlns:p14="http://schemas.microsoft.com/office/powerpoint/2010/main" val="1358255903"/>
       </p:ext>
     </p:extLst>
   </p:cSld>
@@ -6928,7 +6860,7 @@
           <p:cNvPr id="2" name="Title 1">
             <a:extLst>
               <a:ext uri="{FF2B5EF4-FFF2-40B4-BE49-F238E27FC236}">
-                <a16:creationId xmlns:a16="http://schemas.microsoft.com/office/drawing/2014/main" id="{DA325B3B-EB04-4DFE-AF62-DA7694510789}"/>
+                <a16:creationId xmlns:a16="http://schemas.microsoft.com/office/drawing/2014/main" id="{004A5E56-F513-4A94-A58F-4235E160341C}"/>
               </a:ext>
             </a:extLst>
           </p:cNvPr>
@@ -6946,7 +6878,7 @@
           <a:p>
             <a:r>
               <a:rPr lang="en-GB" dirty="0"/>
-              <a:t>REST VS API</a:t>
+              <a:t>A Different Approach Cont.</a:t>
             </a:r>
           </a:p>
         </p:txBody>
@@ -6956,7 +6888,7 @@
           <p:cNvPr id="3" name="Content Placeholder 2">
             <a:extLst>
               <a:ext uri="{FF2B5EF4-FFF2-40B4-BE49-F238E27FC236}">
-                <a16:creationId xmlns:a16="http://schemas.microsoft.com/office/drawing/2014/main" id="{7348DDCC-5EBE-4C1F-B496-7D6BA1B7A59F}"/>
+                <a16:creationId xmlns:a16="http://schemas.microsoft.com/office/drawing/2014/main" id="{3FAAA951-B22E-4803-A2C0-9CF1E7E33F9E}"/>
               </a:ext>
             </a:extLst>
           </p:cNvPr>
@@ -6967,120 +6899,111 @@
             <p:ph idx="1"/>
           </p:nvPr>
         </p:nvSpPr>
-        <p:spPr>
-          <a:xfrm>
-            <a:off x="266699" y="1933349"/>
-            <a:ext cx="8509001" cy="4097337"/>
-          </a:xfrm>
-        </p:spPr>
+        <p:spPr/>
         <p:txBody>
           <a:bodyPr>
-            <a:normAutofit fontScale="92500" lnSpcReduction="10000"/>
+            <a:normAutofit lnSpcReduction="10000"/>
           </a:bodyPr>
           <a:lstStyle/>
           <a:p>
-            <a:r>
-              <a:rPr lang="en-GB" dirty="0"/>
-              <a:t>API-first approach means</a:t>
-            </a:r>
-          </a:p>
-          <a:p>
             <a:pPr marL="342900" indent="-342900">
-              <a:buFontTx/>
-              <a:buChar char="-"/>
+              <a:buFont typeface="Arial" charset="0"/>
+              <a:buChar char="•"/>
             </a:pPr>
             <a:r>
               <a:rPr lang="en-GB" dirty="0"/>
-              <a:t>More planning up-front</a:t>
+              <a:t>Example 1: ReactJS User Interface</a:t>
+            </a:r>
+          </a:p>
+          <a:p>
+            <a:pPr marL="1028700" lvl="1" indent="-342900">
+              <a:buFont typeface="Arial" charset="0"/>
+              <a:buChar char="•"/>
+            </a:pPr>
+            <a:r>
+              <a:rPr lang="en-GB" dirty="0"/>
+              <a:t>Develop React UI using NodeJS and Webpack</a:t>
+            </a:r>
+          </a:p>
+          <a:p>
+            <a:pPr marL="1028700" lvl="1" indent="-342900">
+              <a:buFont typeface="Arial" charset="0"/>
+              <a:buChar char="•"/>
+            </a:pPr>
+            <a:r>
+              <a:rPr lang="en-GB" dirty="0"/>
+              <a:t>In Domino, create API Endpoints for all relevant calls or use DAS</a:t>
+            </a:r>
+          </a:p>
+          <a:p>
+            <a:pPr marL="1028700" lvl="1" indent="-342900">
+              <a:buFont typeface="Arial" charset="0"/>
+              <a:buChar char="•"/>
+            </a:pPr>
+            <a:r>
+              <a:rPr lang="en-GB" dirty="0"/>
+              <a:t>Deploy React App as a standalone container</a:t>
             </a:r>
           </a:p>
           <a:p>
             <a:pPr marL="342900" indent="-342900">
-              <a:buFontTx/>
-              <a:buChar char="-"/>
+              <a:buFont typeface="Arial" charset="0"/>
+              <a:buChar char="•"/>
             </a:pPr>
             <a:r>
               <a:rPr lang="en-GB" dirty="0"/>
-              <a:t>Longer </a:t>
-            </a:r>
-            <a:r>
-              <a:rPr lang="en-GB" i="1" dirty="0"/>
-              <a:t>initial</a:t>
-            </a:r>
-            <a:r>
-              <a:rPr lang="en-GB" dirty="0"/>
-              <a:t> development lifecycle</a:t>
-            </a:r>
-          </a:p>
-          <a:p>
-            <a:pPr marL="342900" indent="-342900">
-              <a:buFontTx/>
-              <a:buChar char="-"/>
+              <a:t>Example 2: Web Socket Server</a:t>
+            </a:r>
+          </a:p>
+          <a:p>
+            <a:pPr marL="1028700" lvl="1" indent="-342900">
+              <a:buFont typeface="Arial" charset="0"/>
+              <a:buChar char="•"/>
             </a:pPr>
             <a:r>
               <a:rPr lang="en-GB" dirty="0"/>
-              <a:t>Increased portability</a:t>
-            </a:r>
-          </a:p>
-          <a:p>
-            <a:pPr marL="342900" indent="-342900">
-              <a:buFontTx/>
-              <a:buChar char="-"/>
+              <a:t>Create Web Socket Server using socket.io and NodeJS</a:t>
+            </a:r>
+          </a:p>
+          <a:p>
+            <a:pPr marL="1028700" lvl="1" indent="-342900">
+              <a:buFont typeface="Arial" charset="0"/>
+              <a:buChar char="•"/>
             </a:pPr>
             <a:r>
               <a:rPr lang="en-GB" dirty="0"/>
-              <a:t>Better separation between database and interface</a:t>
-            </a:r>
-          </a:p>
-          <a:p>
-            <a:pPr marL="342900" indent="-342900">
-              <a:buFontTx/>
-              <a:buChar char="-"/>
+              <a:t>In Domino, include socket.io for client-side communication</a:t>
+            </a:r>
+          </a:p>
+          <a:p>
+            <a:pPr marL="1028700" lvl="1" indent="-342900">
+              <a:buFont typeface="Arial" charset="0"/>
+              <a:buChar char="•"/>
             </a:pPr>
             <a:r>
               <a:rPr lang="en-GB" dirty="0"/>
-              <a:t>Easier extensibility into other systems</a:t>
-            </a:r>
-          </a:p>
-          <a:p>
-            <a:pPr marL="342900" indent="-342900">
-              <a:buFontTx/>
-              <a:buChar char="-"/>
+              <a:t>Create Web Socket events for all relevant communication</a:t>
+            </a:r>
+          </a:p>
+          <a:p>
+            <a:pPr marL="1028700" lvl="1" indent="-342900">
+              <a:buFont typeface="Arial" charset="0"/>
+              <a:buChar char="•"/>
             </a:pPr>
+            <a:r>
+              <a:rPr lang="en-GB" dirty="0"/>
+              <a:t>Deploy Web Socket Server as standalone container</a:t>
+            </a:r>
+          </a:p>
+          <a:p>
             <a:endParaRPr lang="en-GB" dirty="0"/>
-          </a:p>
-          <a:p>
-            <a:r>
-              <a:rPr lang="en-GB" dirty="0"/>
-              <a:t>Code for failure and “bad data” – ON BOTH SIDES</a:t>
-            </a:r>
-          </a:p>
-          <a:p>
-            <a:pPr marL="342900" indent="-342900">
-              <a:buFontTx/>
-              <a:buChar char="-"/>
-            </a:pPr>
-            <a:r>
-              <a:rPr lang="en-GB" dirty="0"/>
-              <a:t>Missing parameters</a:t>
-            </a:r>
-          </a:p>
-          <a:p>
-            <a:pPr marL="342900" indent="-342900">
-              <a:buFontTx/>
-              <a:buChar char="-"/>
-            </a:pPr>
-            <a:r>
-              <a:rPr lang="en-GB" dirty="0"/>
-              <a:t>Invalid enums</a:t>
-            </a:r>
           </a:p>
         </p:txBody>
       </p:sp>
     </p:spTree>
     <p:extLst>
       <p:ext uri="{BB962C8B-B14F-4D97-AF65-F5344CB8AC3E}">
-        <p14:creationId xmlns:p14="http://schemas.microsoft.com/office/powerpoint/2010/main" val="776067444"/>
+        <p14:creationId xmlns:p14="http://schemas.microsoft.com/office/powerpoint/2010/main" val="1294269516"/>
       </p:ext>
     </p:extLst>
   </p:cSld>
@@ -7112,7 +7035,7 @@
           <p:cNvPr id="2" name="Title 1">
             <a:extLst>
               <a:ext uri="{FF2B5EF4-FFF2-40B4-BE49-F238E27FC236}">
-                <a16:creationId xmlns:a16="http://schemas.microsoft.com/office/drawing/2014/main" id="{DA325B3B-EB04-4DFE-AF62-DA7694510789}"/>
+                <a16:creationId xmlns:a16="http://schemas.microsoft.com/office/drawing/2014/main" id="{004A5E56-F513-4A94-A58F-4235E160341C}"/>
               </a:ext>
             </a:extLst>
           </p:cNvPr>
@@ -7130,7 +7053,7 @@
           <a:p>
             <a:r>
               <a:rPr lang="en-GB" dirty="0"/>
-              <a:t>REST VS API CONT.</a:t>
+              <a:t>Container Clustering</a:t>
             </a:r>
           </a:p>
         </p:txBody>
@@ -7140,7 +7063,7 @@
           <p:cNvPr id="3" name="Content Placeholder 2">
             <a:extLst>
               <a:ext uri="{FF2B5EF4-FFF2-40B4-BE49-F238E27FC236}">
-                <a16:creationId xmlns:a16="http://schemas.microsoft.com/office/drawing/2014/main" id="{7348DDCC-5EBE-4C1F-B496-7D6BA1B7A59F}"/>
+                <a16:creationId xmlns:a16="http://schemas.microsoft.com/office/drawing/2014/main" id="{3FAAA951-B22E-4803-A2C0-9CF1E7E33F9E}"/>
               </a:ext>
             </a:extLst>
           </p:cNvPr>
@@ -7154,82 +7077,67 @@
         <p:spPr/>
         <p:txBody>
           <a:bodyPr>
-            <a:normAutofit lnSpcReduction="10000"/>
+            <a:normAutofit fontScale="92500" lnSpcReduction="10000"/>
           </a:bodyPr>
           <a:lstStyle/>
           <a:p>
-            <a:r>
-              <a:rPr lang="en-GB" dirty="0"/>
-              <a:t>Security considerations</a:t>
-            </a:r>
-          </a:p>
-          <a:p>
             <a:pPr marL="342900" indent="-342900">
-              <a:buFontTx/>
-              <a:buChar char="-"/>
+              <a:buFont typeface="Arial" charset="0"/>
+              <a:buChar char="•"/>
             </a:pPr>
             <a:r>
               <a:rPr lang="en-GB" dirty="0"/>
-              <a:t>How to restrict access to apps: API key, OAuth?</a:t>
+              <a:t>Cluster all relevant containers using Kubernetes</a:t>
             </a:r>
           </a:p>
           <a:p>
             <a:pPr marL="342900" indent="-342900">
-              <a:buFontTx/>
-              <a:buChar char="-"/>
+              <a:buFont typeface="Arial" charset="0"/>
+              <a:buChar char="•"/>
             </a:pPr>
             <a:r>
               <a:rPr lang="en-GB" dirty="0"/>
-              <a:t>Use header / query params correctly</a:t>
+              <a:t>Run Kubernetes as a sidecar to your Domino environment</a:t>
             </a:r>
           </a:p>
           <a:p>
             <a:pPr marL="342900" indent="-342900">
-              <a:buFontTx/>
-              <a:buChar char="-"/>
+              <a:buFont typeface="Arial" charset="0"/>
+              <a:buChar char="•"/>
             </a:pPr>
             <a:r>
               <a:rPr lang="en-GB" dirty="0"/>
-              <a:t>Secure e.g. scheduled endpoints differently</a:t>
+              <a:t>IBM Cloud Private provides enterprise-level container management using Kubernetes</a:t>
             </a:r>
           </a:p>
           <a:p>
             <a:pPr marL="342900" indent="-342900">
-              <a:buFontTx/>
-              <a:buChar char="-"/>
+              <a:buFont typeface="Arial" charset="0"/>
+              <a:buChar char="•"/>
             </a:pPr>
             <a:r>
               <a:rPr lang="en-GB" dirty="0"/>
-              <a:t>Additional logging of transactions?</a:t>
-            </a:r>
-          </a:p>
-          <a:p>
-            <a:endParaRPr lang="en-GB" dirty="0"/>
-          </a:p>
-          <a:p>
-            <a:r>
-              <a:rPr lang="en-GB" dirty="0"/>
-              <a:t>Be careful what you expose</a:t>
+              <a:t>Minikube can be used for development and testing environments (low availability)</a:t>
             </a:r>
           </a:p>
           <a:p>
             <a:pPr marL="342900" indent="-342900">
-              <a:buFontTx/>
-              <a:buChar char="-"/>
+              <a:buFont typeface="Arial" charset="0"/>
+              <a:buChar char="•"/>
             </a:pPr>
             <a:r>
               <a:rPr lang="en-GB" dirty="0"/>
-              <a:t>Should your “status” field be editable</a:t>
+              <a:t>Inject new services and containers into cluster as and when needed</a:t>
             </a:r>
           </a:p>
           <a:p>
             <a:pPr marL="342900" indent="-342900">
-              <a:buFontTx/>
-              <a:buChar char="-"/>
+              <a:buFont typeface="Arial" charset="0"/>
+              <a:buChar char="•"/>
             </a:pPr>
             <a:r>
               <a:rPr lang="en-GB" dirty="0"/>
-              <a:t>Or just set via workflow methods</a:t>
+              <a:t>Manage integration, security, testing and more with Istio</a:t>
             </a:r>
           </a:p>
         </p:txBody>
@@ -7237,7 +7145,7 @@
     </p:spTree>
     <p:extLst>
       <p:ext uri="{BB962C8B-B14F-4D97-AF65-F5344CB8AC3E}">
-        <p14:creationId xmlns:p14="http://schemas.microsoft.com/office/powerpoint/2010/main" val="3630630439"/>
+        <p14:creationId xmlns:p14="http://schemas.microsoft.com/office/powerpoint/2010/main" val="1970659718"/>
       </p:ext>
     </p:extLst>
   </p:cSld>
@@ -7269,7 +7177,7 @@
           <p:cNvPr id="2" name="Title 1">
             <a:extLst>
               <a:ext uri="{FF2B5EF4-FFF2-40B4-BE49-F238E27FC236}">
-                <a16:creationId xmlns:a16="http://schemas.microsoft.com/office/drawing/2014/main" id="{C0FEB5B7-C670-424B-B482-EF2362D0EFA4}"/>
+                <a16:creationId xmlns:a16="http://schemas.microsoft.com/office/drawing/2014/main" id="{004A5E56-F513-4A94-A58F-4235E160341C}"/>
               </a:ext>
             </a:extLst>
           </p:cNvPr>
@@ -7287,7 +7195,7 @@
           <a:p>
             <a:r>
               <a:rPr lang="en-GB" dirty="0"/>
-              <a:t>REST PERFORMANCE</a:t>
+              <a:t>Benefits of Container Clustering </a:t>
             </a:r>
           </a:p>
         </p:txBody>
@@ -7297,7 +7205,7 @@
           <p:cNvPr id="3" name="Content Placeholder 2">
             <a:extLst>
               <a:ext uri="{FF2B5EF4-FFF2-40B4-BE49-F238E27FC236}">
-                <a16:creationId xmlns:a16="http://schemas.microsoft.com/office/drawing/2014/main" id="{BD8E8734-736E-4B6A-B60C-D67BA853ACC2}"/>
+                <a16:creationId xmlns:a16="http://schemas.microsoft.com/office/drawing/2014/main" id="{3FAAA951-B22E-4803-A2C0-9CF1E7E33F9E}"/>
               </a:ext>
             </a:extLst>
           </p:cNvPr>
@@ -7310,91 +7218,83 @@
         </p:nvSpPr>
         <p:spPr/>
         <p:txBody>
-          <a:bodyPr/>
-          <a:lstStyle/>
-          <a:p>
-            <a:r>
-              <a:rPr lang="en-GB" dirty="0"/>
-              <a:t>REST = stateless, servlet = state</a:t>
-            </a:r>
-            <a:r>
-              <a:rPr lang="en-GB" i="1" dirty="0"/>
-              <a:t>ful</a:t>
-            </a:r>
-          </a:p>
-          <a:p>
+          <a:bodyPr>
+            <a:normAutofit/>
+          </a:bodyPr>
+          <a:lstStyle/>
+          <a:p>
+            <a:pPr marL="342900" indent="-342900">
+              <a:buFont typeface="Arial" charset="0"/>
+              <a:buChar char="•"/>
+            </a:pPr>
+            <a:r>
+              <a:rPr lang="en-GB" dirty="0"/>
+              <a:t>High availability</a:t>
+            </a:r>
+          </a:p>
+          <a:p>
+            <a:pPr marL="342900" indent="-342900">
+              <a:buFont typeface="Arial" charset="0"/>
+              <a:buChar char="•"/>
+            </a:pPr>
+            <a:r>
+              <a:rPr lang="en-GB" dirty="0"/>
+              <a:t>Seamless disaster recovery</a:t>
+            </a:r>
+          </a:p>
+          <a:p>
+            <a:pPr marL="342900" indent="-342900">
+              <a:buFont typeface="Arial" charset="0"/>
+              <a:buChar char="•"/>
+            </a:pPr>
+            <a:r>
+              <a:rPr lang="en-GB" dirty="0"/>
+              <a:t>Horizontal and vertical scaling</a:t>
+            </a:r>
+          </a:p>
+          <a:p>
+            <a:pPr marL="342900" indent="-342900">
+              <a:buFont typeface="Arial" charset="0"/>
+              <a:buChar char="•"/>
+            </a:pPr>
+            <a:r>
+              <a:rPr lang="en-GB" dirty="0"/>
+              <a:t>Continuous delivery</a:t>
+            </a:r>
+          </a:p>
+          <a:p>
+            <a:pPr marL="342900" indent="-342900">
+              <a:buFont typeface="Arial" charset="0"/>
+              <a:buChar char="•"/>
+            </a:pPr>
+            <a:r>
+              <a:rPr lang="en-GB" dirty="0"/>
+              <a:t>No downtime during updates and upgrades</a:t>
+            </a:r>
+          </a:p>
+          <a:p>
+            <a:pPr marL="342900" indent="-342900">
+              <a:buFont typeface="Arial" charset="0"/>
+              <a:buChar char="•"/>
+            </a:pPr>
+            <a:r>
+              <a:rPr lang="en-GB" dirty="0"/>
+              <a:t>CPU and Memory can be assigned and managed per container/container group</a:t>
+            </a:r>
+          </a:p>
+          <a:p>
+            <a:pPr marL="342900" indent="-342900">
+              <a:buFont typeface="Arial" charset="0"/>
+              <a:buChar char="•"/>
+            </a:pPr>
             <a:endParaRPr lang="en-GB" dirty="0"/>
-          </a:p>
-          <a:p>
-            <a:r>
-              <a:rPr lang="en-GB" dirty="0"/>
-              <a:t>Cache with…</a:t>
-            </a:r>
-          </a:p>
-          <a:p>
-            <a:pPr marL="342900" indent="-342900">
-              <a:buFontTx/>
-              <a:buChar char="-"/>
-            </a:pPr>
-            <a:r>
-              <a:rPr lang="en-GB" dirty="0" err="1"/>
-              <a:t>ConcurrentHashMap</a:t>
-            </a:r>
-            <a:r>
-              <a:rPr lang="en-GB" dirty="0"/>
-              <a:t> (think </a:t>
-            </a:r>
-            <a:r>
-              <a:rPr lang="en-GB" dirty="0" err="1"/>
-              <a:t>applicationScope</a:t>
-            </a:r>
-            <a:r>
-              <a:rPr lang="en-GB" dirty="0"/>
-              <a:t>)</a:t>
-            </a:r>
-          </a:p>
-          <a:p>
-            <a:pPr marL="342900" indent="-342900">
-              <a:buFontTx/>
-              <a:buChar char="-"/>
-            </a:pPr>
-            <a:r>
-              <a:rPr lang="en-GB" dirty="0"/>
-              <a:t>Google Guava Caches (better management)</a:t>
-            </a:r>
-          </a:p>
-          <a:p>
-            <a:pPr marL="342900" indent="-342900">
-              <a:buFontTx/>
-              <a:buChar char="-"/>
-            </a:pPr>
-            <a:r>
-              <a:rPr lang="en-GB" dirty="0"/>
-              <a:t>Cache Server (e.g. </a:t>
-            </a:r>
-            <a:r>
-              <a:rPr lang="en-GB" dirty="0" err="1"/>
-              <a:t>memcache</a:t>
-            </a:r>
-            <a:r>
-              <a:rPr lang="en-GB" dirty="0"/>
-              <a:t>, </a:t>
-            </a:r>
-            <a:r>
-              <a:rPr lang="en-GB" dirty="0" err="1"/>
-              <a:t>Ehcache</a:t>
-            </a:r>
-            <a:r>
-              <a:rPr lang="en-GB"/>
-              <a:t>)</a:t>
-            </a:r>
           </a:p>
         </p:txBody>
       </p:sp>
     </p:spTree>
     <p:extLst>
       <p:ext uri="{BB962C8B-B14F-4D97-AF65-F5344CB8AC3E}">
-        <p14:creationId xmlns:p14="http://schemas.microsoft.com/office/powerpoint/2010/main" val="1520573763"/>
+        <p14:creationId xmlns:p14="http://schemas.microsoft.com/office/powerpoint/2010/main" val="1759284094"/>
       </p:ext>
     </p:extLst>
   </p:cSld>
@@ -7423,10 +7323,10 @@
       </p:grpSpPr>
       <p:sp>
         <p:nvSpPr>
-          <p:cNvPr id="2" name="Title 1">
+          <p:cNvPr id="4" name="Title 3">
             <a:extLst>
               <a:ext uri="{FF2B5EF4-FFF2-40B4-BE49-F238E27FC236}">
-                <a16:creationId xmlns:a16="http://schemas.microsoft.com/office/drawing/2014/main" id="{11F888B0-6184-4E49-BE67-5D21583FAA29}"/>
+                <a16:creationId xmlns:a16="http://schemas.microsoft.com/office/drawing/2014/main" id="{D691CD7C-405A-4343-A99A-F7317A35A1A1}"/>
               </a:ext>
             </a:extLst>
           </p:cNvPr>
@@ -7434,7 +7334,7 @@
             <a:spLocks noGrp="1"/>
           </p:cNvSpPr>
           <p:nvPr>
-            <p:ph type="title"/>
+            <p:ph type="ctrTitle"/>
           </p:nvPr>
         </p:nvSpPr>
         <p:spPr/>
@@ -7444,129 +7344,7 @@
           <a:p>
             <a:r>
               <a:rPr lang="en-GB" dirty="0"/>
-              <a:t>documentation</a:t>
-            </a:r>
-          </a:p>
-        </p:txBody>
-      </p:sp>
-      <p:sp>
-        <p:nvSpPr>
-          <p:cNvPr id="3" name="Content Placeholder 2">
-            <a:extLst>
-              <a:ext uri="{FF2B5EF4-FFF2-40B4-BE49-F238E27FC236}">
-                <a16:creationId xmlns:a16="http://schemas.microsoft.com/office/drawing/2014/main" id="{5D0BF05F-CB19-4169-8628-60F81EFBE59E}"/>
-              </a:ext>
-            </a:extLst>
-          </p:cNvPr>
-          <p:cNvSpPr>
-            <a:spLocks noGrp="1"/>
-          </p:cNvSpPr>
-          <p:nvPr>
-            <p:ph idx="1"/>
-          </p:nvPr>
-        </p:nvSpPr>
-        <p:spPr/>
-        <p:txBody>
-          <a:bodyPr>
-            <a:normAutofit lnSpcReduction="10000"/>
-          </a:bodyPr>
-          <a:lstStyle/>
-          <a:p>
-            <a:r>
-              <a:rPr lang="en-GB" dirty="0"/>
-              <a:t>Swagger / Open API Specification is standard</a:t>
-            </a:r>
-          </a:p>
-          <a:p>
-            <a:r>
-              <a:rPr lang="en-GB" dirty="0"/>
-              <a:t>Swagger Editor </a:t>
-            </a:r>
-            <a:r>
-              <a:rPr lang="en-GB" dirty="0">
-                <a:hlinkClick r:id="rId2"/>
-              </a:rPr>
-              <a:t>online</a:t>
-            </a:r>
-            <a:r>
-              <a:rPr lang="en-GB" dirty="0"/>
-              <a:t>, local node.js app or Docker</a:t>
-            </a:r>
-          </a:p>
-          <a:p>
-            <a:r>
-              <a:rPr lang="en-GB" dirty="0">
-                <a:hlinkClick r:id="rId3"/>
-              </a:rPr>
-              <a:t>OpenAPI 3.0</a:t>
-            </a:r>
-            <a:r>
-              <a:rPr lang="en-GB" dirty="0"/>
-              <a:t> released July 2017</a:t>
-            </a:r>
-          </a:p>
-          <a:p>
-            <a:r>
-              <a:rPr lang="en-GB" dirty="0"/>
-              <a:t>	Samples not yet updated</a:t>
-            </a:r>
-          </a:p>
-          <a:p>
-            <a:r>
-              <a:rPr lang="en-GB" dirty="0">
-                <a:hlinkClick r:id="rId4"/>
-              </a:rPr>
-              <a:t>Swagger 2.0</a:t>
-            </a:r>
-            <a:r>
-              <a:rPr lang="en-GB" dirty="0"/>
-              <a:t> has many examples</a:t>
-            </a:r>
-          </a:p>
-          <a:p>
-            <a:r>
-              <a:rPr lang="en-GB" dirty="0">
-                <a:hlinkClick r:id="rId5"/>
-              </a:rPr>
-              <a:t>Swagger Hub</a:t>
-            </a:r>
-            <a:r>
-              <a:rPr lang="en-GB" dirty="0"/>
-              <a:t> or tools like </a:t>
-            </a:r>
-            <a:r>
-              <a:rPr lang="en-GB" dirty="0">
-                <a:hlinkClick r:id="rId6"/>
-              </a:rPr>
-              <a:t>Mermade</a:t>
-            </a:r>
-            <a:r>
-              <a:rPr lang="en-GB" dirty="0"/>
-              <a:t> will convert (between the 2)</a:t>
-            </a:r>
-          </a:p>
-          <a:p>
-            <a:r>
-              <a:rPr lang="en-GB" dirty="0">
-                <a:hlinkClick r:id="rId7"/>
-              </a:rPr>
-              <a:t>Swagger UI</a:t>
-            </a:r>
-            <a:r>
-              <a:rPr lang="en-GB" dirty="0"/>
-              <a:t> allows testing against actual server</a:t>
-            </a:r>
-          </a:p>
-          <a:p>
-            <a:r>
-              <a:rPr lang="en-GB" dirty="0">
-                <a:hlinkClick r:id="rId8"/>
-              </a:rPr>
-              <a:t>Swagger mock server</a:t>
-            </a:r>
-            <a:r>
-              <a:rPr lang="en-GB" dirty="0"/>
-              <a:t> can be created for UI dev</a:t>
+              <a:t>ReactJS</a:t>
             </a:r>
           </a:p>
         </p:txBody>
@@ -7574,7 +7352,7 @@
     </p:spTree>
     <p:extLst>
       <p:ext uri="{BB962C8B-B14F-4D97-AF65-F5344CB8AC3E}">
-        <p14:creationId xmlns:p14="http://schemas.microsoft.com/office/powerpoint/2010/main" val="3390775355"/>
+        <p14:creationId xmlns:p14="http://schemas.microsoft.com/office/powerpoint/2010/main" val="2008480614"/>
       </p:ext>
     </p:extLst>
   </p:cSld>
@@ -7606,7 +7384,7 @@
           <p:cNvPr id="2" name="Title 1">
             <a:extLst>
               <a:ext uri="{FF2B5EF4-FFF2-40B4-BE49-F238E27FC236}">
-                <a16:creationId xmlns:a16="http://schemas.microsoft.com/office/drawing/2014/main" id="{05AAFF9C-9D60-456C-9619-912E3CFE5A22}"/>
+                <a16:creationId xmlns:a16="http://schemas.microsoft.com/office/drawing/2014/main" id="{004A5E56-F513-4A94-A58F-4235E160341C}"/>
               </a:ext>
             </a:extLst>
           </p:cNvPr>
@@ -7623,8 +7401,12 @@
           <a:lstStyle/>
           <a:p>
             <a:r>
-              <a:rPr lang="en-GB" sz="4400" dirty="0"/>
-              <a:t>Creating a swagger definition</a:t>
+              <a:rPr lang="en-GB" dirty="0"/>
+              <a:t>What is </a:t>
+            </a:r>
+            <a:r>
+              <a:rPr lang="en-GB" dirty="0" err="1"/>
+              <a:t>reactJS</a:t>
             </a:r>
             <a:endParaRPr lang="en-GB" dirty="0"/>
           </a:p>
@@ -7635,7 +7417,7 @@
           <p:cNvPr id="3" name="Content Placeholder 2">
             <a:extLst>
               <a:ext uri="{FF2B5EF4-FFF2-40B4-BE49-F238E27FC236}">
-                <a16:creationId xmlns:a16="http://schemas.microsoft.com/office/drawing/2014/main" id="{C94BB55B-6C89-4F4B-A953-BD358C4216B6}"/>
+                <a16:creationId xmlns:a16="http://schemas.microsoft.com/office/drawing/2014/main" id="{3FAAA951-B22E-4803-A2C0-9CF1E7E33F9E}"/>
               </a:ext>
             </a:extLst>
           </p:cNvPr>
@@ -7646,69 +7428,83 @@
             <p:ph idx="1"/>
           </p:nvPr>
         </p:nvSpPr>
-        <p:spPr/>
+        <p:spPr>
+          <a:xfrm>
+            <a:off x="266699" y="1933349"/>
+            <a:ext cx="8121927" cy="4055469"/>
+          </a:xfrm>
+        </p:spPr>
         <p:txBody>
           <a:bodyPr>
-            <a:normAutofit lnSpcReduction="10000"/>
+            <a:normAutofit/>
           </a:bodyPr>
           <a:lstStyle/>
           <a:p>
-            <a:r>
-              <a:rPr lang="en-GB" dirty="0"/>
-              <a:t>Write as YAML or JSON</a:t>
-            </a:r>
-          </a:p>
-          <a:p>
-            <a:pPr marL="901700" indent="-901700"/>
-            <a:r>
-              <a:rPr lang="en-GB" dirty="0"/>
-              <a:t>	YAML – no quotes around strings, no commas, no curly braces</a:t>
-            </a:r>
-          </a:p>
-          <a:p>
-            <a:r>
-              <a:rPr lang="en-GB" dirty="0"/>
-              <a:t>operationIds can be added</a:t>
-            </a:r>
-          </a:p>
-          <a:p>
-            <a:r>
-              <a:rPr lang="en-GB" dirty="0"/>
-              <a:t>	If used, required on all for that path</a:t>
-            </a:r>
-          </a:p>
-          <a:p>
-            <a:r>
-              <a:rPr lang="en-GB" dirty="0"/>
-              <a:t>Use enums for options</a:t>
-            </a:r>
-          </a:p>
-          <a:p>
-            <a:r>
-              <a:rPr lang="en-GB" dirty="0"/>
-              <a:t>OpenAPI 3.0 allows examples, but </a:t>
-            </a:r>
-            <a:r>
-              <a:rPr lang="en-GB" b="1" dirty="0"/>
-              <a:t>clarify and add value</a:t>
-            </a:r>
-          </a:p>
-          <a:p>
-            <a:r>
-              <a:rPr lang="en-GB" dirty="0"/>
-              <a:t>“Framework for good documentation”, does not guarantee good documentation</a:t>
-            </a:r>
-            <a:endParaRPr lang="en-GB" b="1" dirty="0"/>
-          </a:p>
-          <a:p>
-            <a:endParaRPr lang="en-GB" dirty="0"/>
+            <a:pPr marL="342900" indent="-342900">
+              <a:buFont typeface="Arial" charset="0"/>
+              <a:buChar char="•"/>
+            </a:pPr>
+            <a:r>
+              <a:rPr lang="en-GB" dirty="0"/>
+              <a:t>A JavaScript library for building user interfaces</a:t>
+            </a:r>
+          </a:p>
+          <a:p>
+            <a:pPr marL="342900" indent="-342900">
+              <a:buFont typeface="Arial" charset="0"/>
+              <a:buChar char="•"/>
+            </a:pPr>
+            <a:r>
+              <a:rPr lang="en-GB" dirty="0"/>
+              <a:t>React is NOT a framework</a:t>
+            </a:r>
+          </a:p>
+          <a:p>
+            <a:pPr marL="342900" indent="-342900">
+              <a:buFont typeface="Arial" charset="0"/>
+              <a:buChar char="•"/>
+            </a:pPr>
+            <a:r>
+              <a:rPr lang="en-GB" dirty="0"/>
+              <a:t>React is the “V” of MVC (Model/View/Controller)</a:t>
+            </a:r>
+          </a:p>
+          <a:p>
+            <a:pPr marL="342900" indent="-342900">
+              <a:buFont typeface="Arial" charset="0"/>
+              <a:buChar char="•"/>
+            </a:pPr>
+            <a:r>
+              <a:rPr lang="en-GB" dirty="0"/>
+              <a:t>HTML is placed in JavaScript classes to create Web Components</a:t>
+            </a:r>
+          </a:p>
+          <a:p>
+            <a:pPr marL="1028700" lvl="1" indent="-342900">
+              <a:buFont typeface="Arial" charset="0"/>
+              <a:buChar char="•"/>
+            </a:pPr>
+            <a:r>
+              <a:rPr lang="en-GB" dirty="0"/>
+              <a:t>This is similar to Custom Controls in XPages</a:t>
+            </a:r>
+          </a:p>
+          <a:p>
+            <a:pPr marL="342900" indent="-342900">
+              <a:buFont typeface="Arial" charset="0"/>
+              <a:buChar char="•"/>
+            </a:pPr>
+            <a:r>
+              <a:rPr lang="en-GB" dirty="0"/>
+              <a:t>React makes use of a Virtual DOM and Diffing</a:t>
+            </a:r>
           </a:p>
         </p:txBody>
       </p:sp>
     </p:spTree>
     <p:extLst>
       <p:ext uri="{BB962C8B-B14F-4D97-AF65-F5344CB8AC3E}">
-        <p14:creationId xmlns:p14="http://schemas.microsoft.com/office/powerpoint/2010/main" val="3409692770"/>
+        <p14:creationId xmlns:p14="http://schemas.microsoft.com/office/powerpoint/2010/main" val="46941259"/>
       </p:ext>
     </p:extLst>
   </p:cSld>
@@ -7803,7 +7599,7 @@
           <a:p>
             <a:r>
               <a:rPr lang="en-GB" dirty="0"/>
-              <a:t>Lifetime IBM Champion</a:t>
+              <a:t>IBM Lifetime Champion</a:t>
             </a:r>
           </a:p>
           <a:p>
@@ -8517,7 +8313,7 @@
           <p:cNvPr id="2" name="Title 1">
             <a:extLst>
               <a:ext uri="{FF2B5EF4-FFF2-40B4-BE49-F238E27FC236}">
-                <a16:creationId xmlns:a16="http://schemas.microsoft.com/office/drawing/2014/main" id="{701EB0D4-BE51-4EB9-95BA-1387E3008DA7}"/>
+                <a16:creationId xmlns:a16="http://schemas.microsoft.com/office/drawing/2014/main" id="{004A5E56-F513-4A94-A58F-4235E160341C}"/>
               </a:ext>
             </a:extLst>
           </p:cNvPr>
@@ -8535,7 +8331,7 @@
           <a:p>
             <a:r>
               <a:rPr lang="en-GB" dirty="0"/>
-              <a:t>testing</a:t>
+              <a:t>Platform Agnostic</a:t>
             </a:r>
           </a:p>
         </p:txBody>
@@ -8545,7 +8341,7 @@
           <p:cNvPr id="3" name="Content Placeholder 2">
             <a:extLst>
               <a:ext uri="{FF2B5EF4-FFF2-40B4-BE49-F238E27FC236}">
-                <a16:creationId xmlns:a16="http://schemas.microsoft.com/office/drawing/2014/main" id="{090C2521-717E-412B-B21A-03628179FB11}"/>
+                <a16:creationId xmlns:a16="http://schemas.microsoft.com/office/drawing/2014/main" id="{3FAAA951-B22E-4803-A2C0-9CF1E7E33F9E}"/>
               </a:ext>
             </a:extLst>
           </p:cNvPr>
@@ -8556,47 +8352,95 @@
             <p:ph idx="1"/>
           </p:nvPr>
         </p:nvSpPr>
-        <p:spPr/>
-        <p:txBody>
-          <a:bodyPr/>
-          <a:lstStyle/>
-          <a:p>
-            <a:r>
-              <a:rPr lang="en-GB" dirty="0"/>
-              <a:t>Various REST service tools are available</a:t>
-            </a:r>
-          </a:p>
+        <p:spPr>
+          <a:xfrm>
+            <a:off x="266699" y="1933349"/>
+            <a:ext cx="8121927" cy="4055469"/>
+          </a:xfrm>
+        </p:spPr>
+        <p:txBody>
+          <a:bodyPr>
+            <a:normAutofit/>
+          </a:bodyPr>
+          <a:lstStyle/>
           <a:p>
             <a:pPr marL="342900" indent="-342900">
-              <a:buFontTx/>
-              <a:buChar char="-"/>
+              <a:buFont typeface="Arial" charset="0"/>
+              <a:buChar char="•"/>
             </a:pPr>
             <a:r>
-              <a:rPr lang="en-GB" strike="sngStrike" dirty="0"/>
-              <a:t>Postman (Electron desktop app)</a:t>
+              <a:rPr lang="en-GB" dirty="0"/>
+              <a:t>React exists as a platform-agnostic solution</a:t>
             </a:r>
           </a:p>
           <a:p>
             <a:pPr marL="342900" indent="-342900">
-              <a:buFontTx/>
-              <a:buChar char="-"/>
+              <a:buFont typeface="Arial" charset="0"/>
+              <a:buChar char="•"/>
             </a:pPr>
             <a:r>
-              <a:rPr lang="en-GB" strike="sngStrike" dirty="0"/>
-              <a:t>RestClient plugin for Firefox</a:t>
+              <a:rPr lang="en-GB" dirty="0"/>
+              <a:t>Webpack and Babel compile React to a single JS file </a:t>
             </a:r>
           </a:p>
           <a:p>
             <a:pPr marL="342900" indent="-342900">
-              <a:buFontTx/>
-              <a:buChar char="-"/>
+              <a:buFont typeface="Arial" charset="0"/>
+              <a:buChar char="•"/>
             </a:pPr>
-            <a:endParaRPr lang="en-GB" b="1" dirty="0"/>
-          </a:p>
-          <a:p>
-            <a:r>
-              <a:rPr lang="en-GB" b="1" dirty="0"/>
-              <a:t>JUST USE NODE-RED!</a:t>
+            <a:r>
+              <a:rPr lang="en-GB" dirty="0"/>
+              <a:t>The ”create-react-app” module provides all required build tools</a:t>
+            </a:r>
+          </a:p>
+          <a:p>
+            <a:pPr marL="342900" indent="-342900">
+              <a:buFont typeface="Arial" charset="0"/>
+              <a:buChar char="•"/>
+            </a:pPr>
+            <a:r>
+              <a:rPr lang="en-GB" dirty="0"/>
+              <a:t>A typical React dev environment:</a:t>
+            </a:r>
+          </a:p>
+          <a:p>
+            <a:pPr marL="1028700" lvl="1" indent="-342900">
+              <a:buFont typeface="Arial" charset="0"/>
+              <a:buChar char="•"/>
+            </a:pPr>
+            <a:r>
+              <a:rPr lang="en-GB" dirty="0"/>
+              <a:t>Atom/VS Code (Editor)</a:t>
+            </a:r>
+          </a:p>
+          <a:p>
+            <a:pPr marL="1028700" lvl="1" indent="-342900">
+              <a:buFont typeface="Arial" charset="0"/>
+              <a:buChar char="•"/>
+            </a:pPr>
+            <a:r>
+              <a:rPr lang="en-GB" dirty="0"/>
+              <a:t>NodeJS</a:t>
+            </a:r>
+          </a:p>
+          <a:p>
+            <a:pPr marL="1028700" lvl="1" indent="-342900">
+              <a:buFont typeface="Arial" charset="0"/>
+              <a:buChar char="•"/>
+            </a:pPr>
+            <a:r>
+              <a:rPr lang="en-GB" dirty="0"/>
+              <a:t>ExpressJS</a:t>
+            </a:r>
+          </a:p>
+          <a:p>
+            <a:pPr marL="1028700" lvl="1" indent="-342900">
+              <a:buFont typeface="Arial" charset="0"/>
+              <a:buChar char="•"/>
+            </a:pPr>
+            <a:r>
+              <a:rPr lang="en-GB" dirty="0"/>
+              <a:t>Webpack</a:t>
             </a:r>
           </a:p>
         </p:txBody>
@@ -8604,7 +8448,7 @@
     </p:spTree>
     <p:extLst>
       <p:ext uri="{BB962C8B-B14F-4D97-AF65-F5344CB8AC3E}">
-        <p14:creationId xmlns:p14="http://schemas.microsoft.com/office/powerpoint/2010/main" val="1453544228"/>
+        <p14:creationId xmlns:p14="http://schemas.microsoft.com/office/powerpoint/2010/main" val="3971490633"/>
       </p:ext>
     </p:extLst>
   </p:cSld>
@@ -8633,10 +8477,10 @@
       </p:grpSpPr>
       <p:sp>
         <p:nvSpPr>
-          <p:cNvPr id="2" name="Title 1">
+          <p:cNvPr id="4" name="Title 3">
             <a:extLst>
               <a:ext uri="{FF2B5EF4-FFF2-40B4-BE49-F238E27FC236}">
-                <a16:creationId xmlns:a16="http://schemas.microsoft.com/office/drawing/2014/main" id="{28D4950E-C911-48D5-B236-0A6C79E2A3E6}"/>
+                <a16:creationId xmlns:a16="http://schemas.microsoft.com/office/drawing/2014/main" id="{642A4954-D8E0-4C0D-B4A7-23E696B306FD}"/>
               </a:ext>
             </a:extLst>
           </p:cNvPr>
@@ -8644,85 +8488,19 @@
             <a:spLocks noGrp="1"/>
           </p:cNvSpPr>
           <p:nvPr>
-            <p:ph type="title"/>
+            <p:ph type="ctrTitle"/>
           </p:nvPr>
         </p:nvSpPr>
         <p:spPr/>
         <p:txBody>
-          <a:bodyPr/>
-          <a:lstStyle/>
-          <a:p>
-            <a:r>
-              <a:rPr lang="en-GB" dirty="0"/>
-              <a:t>http Request Types</a:t>
-            </a:r>
-          </a:p>
-        </p:txBody>
-      </p:sp>
-      <p:sp>
-        <p:nvSpPr>
-          <p:cNvPr id="3" name="Content Placeholder 2">
-            <a:extLst>
-              <a:ext uri="{FF2B5EF4-FFF2-40B4-BE49-F238E27FC236}">
-                <a16:creationId xmlns:a16="http://schemas.microsoft.com/office/drawing/2014/main" id="{D2C3A57F-87ED-48C2-9CAC-38FA5FE319DC}"/>
-              </a:ext>
-            </a:extLst>
-          </p:cNvPr>
-          <p:cNvSpPr>
-            <a:spLocks noGrp="1"/>
-          </p:cNvSpPr>
-          <p:nvPr>
-            <p:ph idx="1"/>
-          </p:nvPr>
-        </p:nvSpPr>
-        <p:spPr/>
-        <p:txBody>
           <a:bodyPr>
-            <a:normAutofit/>
+            <a:normAutofit fontScale="90000"/>
           </a:bodyPr>
           <a:lstStyle/>
           <a:p>
             <a:r>
               <a:rPr lang="en-GB" dirty="0"/>
-              <a:t>GET </a:t>
-            </a:r>
-            <a:r>
-              <a:rPr lang="mr-IN" dirty="0"/>
-              <a:t>–</a:t>
-            </a:r>
-            <a:r>
-              <a:rPr lang="en-GB" dirty="0"/>
-              <a:t> Read data (No body data allowed)</a:t>
-            </a:r>
-          </a:p>
-          <a:p>
-            <a:r>
-              <a:rPr lang="en-GB" dirty="0"/>
-              <a:t>POST – Submit data (Read/Write)</a:t>
-            </a:r>
-          </a:p>
-          <a:p>
-            <a:r>
-              <a:rPr lang="en-GB" dirty="0"/>
-              <a:t>PUT – Replacing entire document data</a:t>
-            </a:r>
-          </a:p>
-          <a:p>
-            <a:r>
-              <a:rPr lang="en-GB" dirty="0"/>
-              <a:t>PATCH – Minor update to existing data</a:t>
-            </a:r>
-          </a:p>
-          <a:p>
-            <a:r>
-              <a:rPr lang="en-GB" dirty="0"/>
-              <a:t>	PATCH not enabled by default on Domino</a:t>
-            </a:r>
-          </a:p>
-          <a:p>
-            <a:r>
-              <a:rPr lang="en-GB" dirty="0"/>
-              <a:t>DELETE – Deleting Records (No body data allowed)</a:t>
+              <a:t>Domino as a  datastore and api gateway</a:t>
             </a:r>
           </a:p>
         </p:txBody>
@@ -8730,7 +8508,7 @@
     </p:spTree>
     <p:extLst>
       <p:ext uri="{BB962C8B-B14F-4D97-AF65-F5344CB8AC3E}">
-        <p14:creationId xmlns:p14="http://schemas.microsoft.com/office/powerpoint/2010/main" val="397643937"/>
+        <p14:creationId xmlns:p14="http://schemas.microsoft.com/office/powerpoint/2010/main" val="1219390215"/>
       </p:ext>
     </p:extLst>
   </p:cSld>
@@ -8762,7 +8540,7 @@
           <p:cNvPr id="2" name="Title 1">
             <a:extLst>
               <a:ext uri="{FF2B5EF4-FFF2-40B4-BE49-F238E27FC236}">
-                <a16:creationId xmlns:a16="http://schemas.microsoft.com/office/drawing/2014/main" id="{BDDECFA5-674E-480C-9B09-ECB6EAFBCFD0}"/>
+                <a16:creationId xmlns:a16="http://schemas.microsoft.com/office/drawing/2014/main" id="{1A530216-0158-4426-8CAF-8D17A505629F}"/>
               </a:ext>
             </a:extLst>
           </p:cNvPr>
@@ -8780,7 +8558,7 @@
           <a:p>
             <a:r>
               <a:rPr lang="en-GB" dirty="0"/>
-              <a:t>HTTP status codes</a:t>
+              <a:t>Domino rest options</a:t>
             </a:r>
           </a:p>
         </p:txBody>
@@ -8790,7 +8568,7 @@
           <p:cNvPr id="3" name="Content Placeholder 2">
             <a:extLst>
               <a:ext uri="{FF2B5EF4-FFF2-40B4-BE49-F238E27FC236}">
-                <a16:creationId xmlns:a16="http://schemas.microsoft.com/office/drawing/2014/main" id="{7E62BE25-35A8-46F0-8E50-33C5CC9893D2}"/>
+                <a16:creationId xmlns:a16="http://schemas.microsoft.com/office/drawing/2014/main" id="{117770BD-8CC0-4139-A505-25D8CA68B2CB}"/>
               </a:ext>
             </a:extLst>
           </p:cNvPr>
@@ -8801,62 +8579,158 @@
             <p:ph idx="1"/>
           </p:nvPr>
         </p:nvSpPr>
-        <p:spPr/>
-        <p:txBody>
-          <a:bodyPr/>
-          <a:lstStyle/>
-          <a:p>
-            <a:r>
-              <a:rPr lang="en-GB" dirty="0"/>
-              <a:t>1xx – Received and understood, stand by…</a:t>
-            </a:r>
-          </a:p>
-          <a:p>
-            <a:r>
-              <a:rPr lang="en-GB" dirty="0"/>
-              <a:t>2xx – Received, understood and accepted</a:t>
-            </a:r>
-          </a:p>
-          <a:p>
-            <a:r>
-              <a:rPr lang="en-GB" dirty="0"/>
-              <a:t>3xx – Redirecting</a:t>
-            </a:r>
-          </a:p>
-          <a:p>
-            <a:r>
-              <a:rPr lang="en-GB" dirty="0"/>
-              <a:t>4xx – You did something wrong!</a:t>
-            </a:r>
-          </a:p>
-          <a:p>
-            <a:r>
-              <a:rPr lang="en-GB" dirty="0"/>
-              <a:t>5xx – We did something wrong!</a:t>
-            </a:r>
-          </a:p>
-          <a:p>
+        <p:spPr>
+          <a:xfrm>
+            <a:off x="266699" y="1536493"/>
+            <a:ext cx="8229601" cy="4461537"/>
+          </a:xfrm>
+        </p:spPr>
+        <p:txBody>
+          <a:bodyPr>
+            <a:normAutofit fontScale="70000" lnSpcReduction="20000"/>
+          </a:bodyPr>
+          <a:lstStyle/>
+          <a:p>
+            <a:r>
+              <a:rPr lang="en-GB" dirty="0"/>
+              <a:t>DAS (Domino Access Services)</a:t>
+            </a:r>
+          </a:p>
+          <a:p>
+            <a:r>
+              <a:rPr lang="en-GB" dirty="0"/>
+              <a:t>	validation / visibility concerns – REST, not API Gateway</a:t>
+            </a:r>
+          </a:p>
+          <a:p>
+            <a:r>
+              <a:rPr lang="en-GB" dirty="0"/>
+              <a:t>XAgents</a:t>
+            </a:r>
+          </a:p>
+          <a:p>
+            <a:r>
+              <a:rPr lang="en-GB" dirty="0">
+                <a:latin typeface="Courier New" panose="02070309020205020404" pitchFamily="49" charset="0"/>
+                <a:cs typeface="Courier New" panose="02070309020205020404" pitchFamily="49" charset="0"/>
+              </a:rPr>
+              <a:t>	viewState=“</a:t>
+            </a:r>
+            <a:r>
+              <a:rPr lang="en-GB" dirty="0" err="1">
+                <a:latin typeface="Courier New" panose="02070309020205020404" pitchFamily="49" charset="0"/>
+                <a:cs typeface="Courier New" panose="02070309020205020404" pitchFamily="49" charset="0"/>
+              </a:rPr>
+              <a:t>nostate</a:t>
+            </a:r>
+            <a:r>
+              <a:rPr lang="en-GB" dirty="0">
+                <a:latin typeface="Courier New" panose="02070309020205020404" pitchFamily="49" charset="0"/>
+                <a:cs typeface="Courier New" panose="02070309020205020404" pitchFamily="49" charset="0"/>
+              </a:rPr>
+              <a:t>”</a:t>
+            </a:r>
+          </a:p>
+          <a:p>
+            <a:r>
+              <a:rPr lang="en-GB" dirty="0">
+                <a:latin typeface="Courier New" panose="02070309020205020404" pitchFamily="49" charset="0"/>
+                <a:cs typeface="Courier New" panose="02070309020205020404" pitchFamily="49" charset="0"/>
+              </a:rPr>
+              <a:t>	a</a:t>
+            </a:r>
+            <a:r>
+              <a:rPr lang="en-GB" dirty="0">
+                <a:cs typeface="Courier New" panose="02070309020205020404" pitchFamily="49" charset="0"/>
+              </a:rPr>
+              <a:t>llows caching in </a:t>
+            </a:r>
+            <a:r>
+              <a:rPr lang="en-GB" dirty="0" err="1">
+                <a:cs typeface="Courier New" panose="02070309020205020404" pitchFamily="49" charset="0"/>
+              </a:rPr>
+              <a:t>applicationScope</a:t>
+            </a:r>
+            <a:endParaRPr lang="en-GB" dirty="0">
+              <a:cs typeface="Courier New" panose="02070309020205020404" pitchFamily="49" charset="0"/>
+            </a:endParaRPr>
+          </a:p>
+          <a:p>
+            <a:r>
+              <a:rPr lang="en-GB" dirty="0"/>
+              <a:t>SmartNSF</a:t>
+            </a:r>
+          </a:p>
+          <a:p>
+            <a:r>
+              <a:rPr lang="en-GB" dirty="0"/>
+              <a:t>	written using Domain Specific Language</a:t>
+            </a:r>
+          </a:p>
+          <a:p>
+            <a:r>
+              <a:rPr lang="en-GB" b="1" i="1" dirty="0"/>
+              <a:t>ODA Starter Servlet</a:t>
+            </a:r>
+          </a:p>
+          <a:p>
+            <a:r>
+              <a:rPr lang="en-GB" dirty="0"/>
+              <a:t>	develop in Eclipse, local Domino server</a:t>
+            </a:r>
+          </a:p>
+          <a:p>
+            <a:r>
+              <a:rPr lang="en-GB" dirty="0"/>
+              <a:t>	development and deployment </a:t>
+            </a:r>
+            <a:r>
+              <a:rPr lang="en-GB" b="1" i="1" dirty="0"/>
+              <a:t>without Domino Designer</a:t>
+            </a:r>
             <a:endParaRPr lang="en-GB" dirty="0"/>
           </a:p>
           <a:p>
             <a:r>
-              <a:rPr lang="en-GB" dirty="0"/>
-              <a:t>See </a:t>
-            </a:r>
-            <a:r>
               <a:rPr lang="en-GB" dirty="0">
-                <a:hlinkClick r:id="rId2"/>
+                <a:cs typeface="Courier New" panose="02070309020205020404" pitchFamily="49" charset="0"/>
               </a:rPr>
-              <a:t>Wikipedia</a:t>
+              <a:t>	allows powerful caching for better performance</a:t>
             </a:r>
             <a:endParaRPr lang="en-GB" dirty="0"/>
+          </a:p>
+          <a:p>
+            <a:endParaRPr lang="en-GB" dirty="0"/>
+          </a:p>
+          <a:p>
+            <a:pPr algn="ctr"/>
+            <a:r>
+              <a:rPr lang="en-GB" sz="3200" b="1" i="1" dirty="0"/>
+              <a:t>Newsflash: Domino10 brings NodeJS, </a:t>
+            </a:r>
+            <a:r>
+              <a:rPr lang="en-GB" sz="3200" b="1" i="1" dirty="0" err="1"/>
+              <a:t>dominoDB</a:t>
+            </a:r>
+            <a:r>
+              <a:rPr lang="en-GB" sz="3200" b="1" i="1" dirty="0"/>
+              <a:t>, </a:t>
+            </a:r>
+            <a:r>
+              <a:rPr lang="en-GB" sz="3200" b="1" i="1" dirty="0" err="1"/>
+              <a:t>LoopBack</a:t>
+            </a:r>
+            <a:r>
+              <a:rPr lang="en-GB" sz="3200" b="1" i="1" dirty="0"/>
+              <a:t>, (Node-RED)</a:t>
+            </a:r>
           </a:p>
         </p:txBody>
       </p:sp>
     </p:spTree>
     <p:extLst>
       <p:ext uri="{BB962C8B-B14F-4D97-AF65-F5344CB8AC3E}">
-        <p14:creationId xmlns:p14="http://schemas.microsoft.com/office/powerpoint/2010/main" val="2800926257"/>
+        <p14:creationId xmlns:p14="http://schemas.microsoft.com/office/powerpoint/2010/main" val="2249062884"/>
       </p:ext>
     </p:extLst>
   </p:cSld>
@@ -8888,7 +8762,7 @@
           <p:cNvPr id="2" name="Title 1">
             <a:extLst>
               <a:ext uri="{FF2B5EF4-FFF2-40B4-BE49-F238E27FC236}">
-                <a16:creationId xmlns:a16="http://schemas.microsoft.com/office/drawing/2014/main" id="{28D4950E-C911-48D5-B236-0A6C79E2A3E6}"/>
+                <a16:creationId xmlns:a16="http://schemas.microsoft.com/office/drawing/2014/main" id="{DA325B3B-EB04-4DFE-AF62-DA7694510789}"/>
               </a:ext>
             </a:extLst>
           </p:cNvPr>
@@ -8906,7 +8780,7 @@
           <a:p>
             <a:r>
               <a:rPr lang="en-GB" dirty="0"/>
-              <a:t>http status codes CONT.</a:t>
+              <a:t>REST VS API</a:t>
             </a:r>
           </a:p>
         </p:txBody>
@@ -8916,7 +8790,7 @@
           <p:cNvPr id="3" name="Content Placeholder 2">
             <a:extLst>
               <a:ext uri="{FF2B5EF4-FFF2-40B4-BE49-F238E27FC236}">
-                <a16:creationId xmlns:a16="http://schemas.microsoft.com/office/drawing/2014/main" id="{D2C3A57F-87ED-48C2-9CAC-38FA5FE319DC}"/>
+                <a16:creationId xmlns:a16="http://schemas.microsoft.com/office/drawing/2014/main" id="{7348DDCC-5EBE-4C1F-B496-7D6BA1B7A59F}"/>
               </a:ext>
             </a:extLst>
           </p:cNvPr>
@@ -8927,64 +8801,122 @@
             <p:ph idx="1"/>
           </p:nvPr>
         </p:nvSpPr>
-        <p:spPr/>
+        <p:spPr>
+          <a:xfrm>
+            <a:off x="266699" y="1933349"/>
+            <a:ext cx="8509001" cy="4097337"/>
+          </a:xfrm>
+        </p:spPr>
         <p:txBody>
           <a:bodyPr>
-            <a:normAutofit lnSpcReduction="10000"/>
+            <a:normAutofit fontScale="92500" lnSpcReduction="20000"/>
           </a:bodyPr>
           <a:lstStyle/>
           <a:p>
             <a:r>
               <a:rPr lang="en-GB" dirty="0"/>
-              <a:t>200 – OK</a:t>
-            </a:r>
-          </a:p>
-          <a:p>
-            <a:r>
-              <a:rPr lang="en-GB" dirty="0"/>
-              <a:t>202 – Accepted for processing</a:t>
-            </a:r>
-          </a:p>
-          <a:p>
-            <a:r>
-              <a:rPr lang="en-GB" dirty="0"/>
-              <a:t>302 – URL found but server is redirecting</a:t>
-            </a:r>
-          </a:p>
-          <a:p>
-            <a:r>
-              <a:rPr lang="en-GB" dirty="0"/>
-              <a:t>400 – Bad request</a:t>
-            </a:r>
-          </a:p>
-          <a:p>
-            <a:r>
-              <a:rPr lang="en-GB" dirty="0"/>
-              <a:t>401 – Unauthorised</a:t>
-            </a:r>
-          </a:p>
-          <a:p>
-            <a:r>
-              <a:rPr lang="en-GB" dirty="0"/>
-              <a:t>403 – Forbidden</a:t>
-            </a:r>
-          </a:p>
-          <a:p>
-            <a:r>
-              <a:rPr lang="en-GB" dirty="0"/>
-              <a:t>404 – Not found</a:t>
-            </a:r>
-          </a:p>
-          <a:p>
-            <a:r>
-              <a:rPr lang="en-GB" dirty="0"/>
-              <a:t>405 – Method not allowed</a:t>
-            </a:r>
-          </a:p>
-          <a:p>
-            <a:r>
-              <a:rPr lang="en-GB" dirty="0"/>
-              <a:t>500 – Internal server error</a:t>
+              <a:t>API-first approach means</a:t>
+            </a:r>
+          </a:p>
+          <a:p>
+            <a:pPr marL="342900" indent="-342900">
+              <a:buFontTx/>
+              <a:buChar char="-"/>
+            </a:pPr>
+            <a:r>
+              <a:rPr lang="en-GB" dirty="0"/>
+              <a:t>Greater control</a:t>
+            </a:r>
+          </a:p>
+          <a:p>
+            <a:pPr marL="342900" indent="-342900">
+              <a:buFontTx/>
+              <a:buChar char="-"/>
+            </a:pPr>
+            <a:r>
+              <a:rPr lang="en-GB" dirty="0"/>
+              <a:t>More planning up-front</a:t>
+            </a:r>
+          </a:p>
+          <a:p>
+            <a:pPr marL="342900" indent="-342900">
+              <a:buFontTx/>
+              <a:buChar char="-"/>
+            </a:pPr>
+            <a:r>
+              <a:rPr lang="en-GB" dirty="0"/>
+              <a:t>Longer </a:t>
+            </a:r>
+            <a:r>
+              <a:rPr lang="en-GB" i="1" dirty="0"/>
+              <a:t>initial</a:t>
+            </a:r>
+            <a:r>
+              <a:rPr lang="en-GB" dirty="0"/>
+              <a:t> development lifecycle</a:t>
+            </a:r>
+          </a:p>
+          <a:p>
+            <a:pPr marL="342900" indent="-342900">
+              <a:buFontTx/>
+              <a:buChar char="-"/>
+            </a:pPr>
+            <a:r>
+              <a:rPr lang="en-GB" dirty="0"/>
+              <a:t>Increased portability</a:t>
+            </a:r>
+          </a:p>
+          <a:p>
+            <a:pPr marL="342900" indent="-342900">
+              <a:buFontTx/>
+              <a:buChar char="-"/>
+            </a:pPr>
+            <a:r>
+              <a:rPr lang="en-GB" dirty="0"/>
+              <a:t>Better separation between database and interface</a:t>
+            </a:r>
+          </a:p>
+          <a:p>
+            <a:pPr marL="342900" indent="-342900">
+              <a:buFontTx/>
+              <a:buChar char="-"/>
+            </a:pPr>
+            <a:r>
+              <a:rPr lang="en-GB" dirty="0"/>
+              <a:t>Easier extensibility into other systems</a:t>
+            </a:r>
+          </a:p>
+          <a:p>
+            <a:pPr marL="342900" indent="-342900">
+              <a:buFontTx/>
+              <a:buChar char="-"/>
+            </a:pPr>
+            <a:endParaRPr lang="en-GB" dirty="0"/>
+          </a:p>
+          <a:p>
+            <a:r>
+              <a:rPr lang="en-GB" dirty="0"/>
+              <a:t>Code for failure and “bad data” – ON BOTH SIDES</a:t>
+            </a:r>
+          </a:p>
+          <a:p>
+            <a:pPr marL="342900" indent="-342900">
+              <a:buFontTx/>
+              <a:buChar char="-"/>
+            </a:pPr>
+            <a:r>
+              <a:rPr lang="en-GB" dirty="0"/>
+              <a:t>Missing parameters</a:t>
+            </a:r>
+          </a:p>
+          <a:p>
+            <a:pPr marL="342900" indent="-342900">
+              <a:buFontTx/>
+              <a:buChar char="-"/>
+            </a:pPr>
+            <a:r>
+              <a:rPr lang="en-GB" dirty="0"/>
+              <a:t>Invalid enums</a:t>
             </a:r>
           </a:p>
         </p:txBody>
@@ -8992,7 +8924,7 @@
     </p:spTree>
     <p:extLst>
       <p:ext uri="{BB962C8B-B14F-4D97-AF65-F5344CB8AC3E}">
-        <p14:creationId xmlns:p14="http://schemas.microsoft.com/office/powerpoint/2010/main" val="1049136580"/>
+        <p14:creationId xmlns:p14="http://schemas.microsoft.com/office/powerpoint/2010/main" val="776067444"/>
       </p:ext>
     </p:extLst>
   </p:cSld>
@@ -9021,10 +8953,10 @@
       </p:grpSpPr>
       <p:sp>
         <p:nvSpPr>
-          <p:cNvPr id="4" name="Title 3">
+          <p:cNvPr id="2" name="Title 1">
             <a:extLst>
               <a:ext uri="{FF2B5EF4-FFF2-40B4-BE49-F238E27FC236}">
-                <a16:creationId xmlns:a16="http://schemas.microsoft.com/office/drawing/2014/main" id="{380905A8-B705-4037-8A33-724430522F63}"/>
+                <a16:creationId xmlns:a16="http://schemas.microsoft.com/office/drawing/2014/main" id="{DA325B3B-EB04-4DFE-AF62-DA7694510789}"/>
               </a:ext>
             </a:extLst>
           </p:cNvPr>
@@ -9032,7 +8964,7 @@
             <a:spLocks noGrp="1"/>
           </p:cNvSpPr>
           <p:nvPr>
-            <p:ph type="ctrTitle"/>
+            <p:ph type="title"/>
           </p:nvPr>
         </p:nvSpPr>
         <p:spPr/>
@@ -9042,7 +8974,106 @@
           <a:p>
             <a:r>
               <a:rPr lang="en-GB" dirty="0"/>
-              <a:t>What about scheduled tasks?</a:t>
+              <a:t>REST VS API CONT.</a:t>
+            </a:r>
+          </a:p>
+        </p:txBody>
+      </p:sp>
+      <p:sp>
+        <p:nvSpPr>
+          <p:cNvPr id="3" name="Content Placeholder 2">
+            <a:extLst>
+              <a:ext uri="{FF2B5EF4-FFF2-40B4-BE49-F238E27FC236}">
+                <a16:creationId xmlns:a16="http://schemas.microsoft.com/office/drawing/2014/main" id="{7348DDCC-5EBE-4C1F-B496-7D6BA1B7A59F}"/>
+              </a:ext>
+            </a:extLst>
+          </p:cNvPr>
+          <p:cNvSpPr>
+            <a:spLocks noGrp="1"/>
+          </p:cNvSpPr>
+          <p:nvPr>
+            <p:ph idx="1"/>
+          </p:nvPr>
+        </p:nvSpPr>
+        <p:spPr/>
+        <p:txBody>
+          <a:bodyPr>
+            <a:normAutofit lnSpcReduction="10000"/>
+          </a:bodyPr>
+          <a:lstStyle/>
+          <a:p>
+            <a:r>
+              <a:rPr lang="en-GB" dirty="0"/>
+              <a:t>Security considerations</a:t>
+            </a:r>
+          </a:p>
+          <a:p>
+            <a:pPr marL="342900" indent="-342900">
+              <a:buFontTx/>
+              <a:buChar char="-"/>
+            </a:pPr>
+            <a:r>
+              <a:rPr lang="en-GB" dirty="0"/>
+              <a:t>How to restrict access to apps: API key, OAuth?</a:t>
+            </a:r>
+          </a:p>
+          <a:p>
+            <a:pPr marL="342900" indent="-342900">
+              <a:buFontTx/>
+              <a:buChar char="-"/>
+            </a:pPr>
+            <a:r>
+              <a:rPr lang="en-GB" dirty="0"/>
+              <a:t>Use header / query params correctly</a:t>
+            </a:r>
+          </a:p>
+          <a:p>
+            <a:pPr marL="342900" indent="-342900">
+              <a:buFontTx/>
+              <a:buChar char="-"/>
+            </a:pPr>
+            <a:r>
+              <a:rPr lang="en-GB" dirty="0"/>
+              <a:t>Secure e.g. scheduled endpoints differently</a:t>
+            </a:r>
+          </a:p>
+          <a:p>
+            <a:pPr marL="342900" indent="-342900">
+              <a:buFontTx/>
+              <a:buChar char="-"/>
+            </a:pPr>
+            <a:r>
+              <a:rPr lang="en-GB" dirty="0"/>
+              <a:t>Additional logging of transactions?</a:t>
+            </a:r>
+          </a:p>
+          <a:p>
+            <a:endParaRPr lang="en-GB" dirty="0"/>
+          </a:p>
+          <a:p>
+            <a:r>
+              <a:rPr lang="en-GB" dirty="0"/>
+              <a:t>Be careful what you expose</a:t>
+            </a:r>
+          </a:p>
+          <a:p>
+            <a:pPr marL="342900" indent="-342900">
+              <a:buFontTx/>
+              <a:buChar char="-"/>
+            </a:pPr>
+            <a:r>
+              <a:rPr lang="en-GB" dirty="0"/>
+              <a:t>Should your “status” field be editable</a:t>
+            </a:r>
+          </a:p>
+          <a:p>
+            <a:pPr marL="342900" indent="-342900">
+              <a:buFontTx/>
+              <a:buChar char="-"/>
+            </a:pPr>
+            <a:r>
+              <a:rPr lang="en-GB" dirty="0"/>
+              <a:t>Or just set via workflow methods</a:t>
             </a:r>
           </a:p>
         </p:txBody>
@@ -9050,7 +9081,7 @@
     </p:spTree>
     <p:extLst>
       <p:ext uri="{BB962C8B-B14F-4D97-AF65-F5344CB8AC3E}">
-        <p14:creationId xmlns:p14="http://schemas.microsoft.com/office/powerpoint/2010/main" val="508418059"/>
+        <p14:creationId xmlns:p14="http://schemas.microsoft.com/office/powerpoint/2010/main" val="3630630439"/>
       </p:ext>
     </p:extLst>
   </p:cSld>
@@ -9079,10 +9110,10 @@
       </p:grpSpPr>
       <p:sp>
         <p:nvSpPr>
-          <p:cNvPr id="4" name="Title 3">
+          <p:cNvPr id="2" name="Title 1">
             <a:extLst>
               <a:ext uri="{FF2B5EF4-FFF2-40B4-BE49-F238E27FC236}">
-                <a16:creationId xmlns:a16="http://schemas.microsoft.com/office/drawing/2014/main" id="{5F661A78-1620-4819-8674-16466DDEA36A}"/>
+                <a16:creationId xmlns:a16="http://schemas.microsoft.com/office/drawing/2014/main" id="{C0FEB5B7-C670-424B-B482-EF2362D0EFA4}"/>
               </a:ext>
             </a:extLst>
           </p:cNvPr>
@@ -9100,17 +9131,17 @@
           <a:p>
             <a:r>
               <a:rPr lang="en-GB" dirty="0"/>
-              <a:t>Scheduled tasks</a:t>
-            </a:r>
-          </a:p>
-        </p:txBody>
-      </p:sp>
-      <p:sp>
-        <p:nvSpPr>
-          <p:cNvPr id="5" name="Content Placeholder 4">
+              <a:t>REST PERFORMANCE</a:t>
+            </a:r>
+          </a:p>
+        </p:txBody>
+      </p:sp>
+      <p:sp>
+        <p:nvSpPr>
+          <p:cNvPr id="3" name="Content Placeholder 2">
             <a:extLst>
               <a:ext uri="{FF2B5EF4-FFF2-40B4-BE49-F238E27FC236}">
-                <a16:creationId xmlns:a16="http://schemas.microsoft.com/office/drawing/2014/main" id="{D8951B21-ADD7-4D86-B572-B18845D6A0F7}"/>
+                <a16:creationId xmlns:a16="http://schemas.microsoft.com/office/drawing/2014/main" id="{BD8E8734-736E-4B6A-B60C-D67BA853ACC2}"/>
               </a:ext>
             </a:extLst>
           </p:cNvPr>
@@ -9128,35 +9159,86 @@
           <a:p>
             <a:r>
               <a:rPr lang="en-GB" dirty="0"/>
-              <a:t>Scheduled Agents</a:t>
-            </a:r>
-          </a:p>
-          <a:p>
-            <a:r>
-              <a:rPr lang="en-GB" dirty="0"/>
-              <a:t>	NSF only, language constraints (LS or Painful 	Java)</a:t>
-            </a:r>
-          </a:p>
-          <a:p>
-            <a:r>
-              <a:rPr lang="en-GB" dirty="0"/>
-              <a:t>DOTS</a:t>
-            </a:r>
-          </a:p>
-          <a:p>
-            <a:r>
-              <a:rPr lang="en-GB" dirty="0"/>
-              <a:t>	Server only, deployment constraints</a:t>
+              <a:t>REST = state</a:t>
+            </a:r>
+            <a:r>
+              <a:rPr lang="en-GB" i="1" dirty="0"/>
+              <a:t>less</a:t>
+            </a:r>
+            <a:r>
+              <a:rPr lang="en-GB" dirty="0"/>
+              <a:t>, servlet = state</a:t>
+            </a:r>
+            <a:r>
+              <a:rPr lang="en-GB" i="1" dirty="0"/>
+              <a:t>ful</a:t>
             </a:r>
           </a:p>
           <a:p>
             <a:endParaRPr lang="en-GB" dirty="0"/>
           </a:p>
           <a:p>
-            <a:pPr algn="ctr"/>
-            <a:r>
-              <a:rPr lang="en-GB" b="1" dirty="0"/>
-              <a:t>How about a different approach?</a:t>
+            <a:r>
+              <a:rPr lang="en-GB" dirty="0"/>
+              <a:t>Cache with…</a:t>
+            </a:r>
+          </a:p>
+          <a:p>
+            <a:pPr marL="342900" indent="-342900">
+              <a:buFontTx/>
+              <a:buChar char="-"/>
+            </a:pPr>
+            <a:r>
+              <a:rPr lang="en-GB" dirty="0" err="1"/>
+              <a:t>ConcurrentHashMap</a:t>
+            </a:r>
+            <a:r>
+              <a:rPr lang="en-GB" dirty="0"/>
+              <a:t> (think </a:t>
+            </a:r>
+            <a:r>
+              <a:rPr lang="en-GB" dirty="0" err="1"/>
+              <a:t>applicationScope</a:t>
+            </a:r>
+            <a:r>
+              <a:rPr lang="en-GB" dirty="0"/>
+              <a:t>)</a:t>
+            </a:r>
+          </a:p>
+          <a:p>
+            <a:pPr marL="342900" indent="-342900">
+              <a:buFontTx/>
+              <a:buChar char="-"/>
+            </a:pPr>
+            <a:r>
+              <a:rPr lang="en-GB" dirty="0"/>
+              <a:t>Google Guava Caches (better management)</a:t>
+            </a:r>
+          </a:p>
+          <a:p>
+            <a:pPr marL="342900" indent="-342900">
+              <a:buFontTx/>
+              <a:buChar char="-"/>
+            </a:pPr>
+            <a:r>
+              <a:rPr lang="en-GB" dirty="0"/>
+              <a:t>Cache Server (e.g. </a:t>
+            </a:r>
+            <a:r>
+              <a:rPr lang="en-GB" dirty="0" err="1"/>
+              <a:t>memcache</a:t>
+            </a:r>
+            <a:r>
+              <a:rPr lang="en-GB" dirty="0"/>
+              <a:t>, </a:t>
+            </a:r>
+            <a:r>
+              <a:rPr lang="en-GB" dirty="0" err="1"/>
+              <a:t>Ehcache</a:t>
+            </a:r>
+            <a:r>
+              <a:rPr lang="en-GB" dirty="0"/>
+              <a:t>)</a:t>
             </a:r>
           </a:p>
         </p:txBody>
@@ -9164,7 +9246,7 @@
     </p:spTree>
     <p:extLst>
       <p:ext uri="{BB962C8B-B14F-4D97-AF65-F5344CB8AC3E}">
-        <p14:creationId xmlns:p14="http://schemas.microsoft.com/office/powerpoint/2010/main" val="1206375528"/>
+        <p14:creationId xmlns:p14="http://schemas.microsoft.com/office/powerpoint/2010/main" val="1520573763"/>
       </p:ext>
     </p:extLst>
   </p:cSld>
@@ -9196,7 +9278,7 @@
           <p:cNvPr id="2" name="Title 1">
             <a:extLst>
               <a:ext uri="{FF2B5EF4-FFF2-40B4-BE49-F238E27FC236}">
-                <a16:creationId xmlns:a16="http://schemas.microsoft.com/office/drawing/2014/main" id="{004A5E56-F513-4A94-A58F-4235E160341C}"/>
+                <a16:creationId xmlns:a16="http://schemas.microsoft.com/office/drawing/2014/main" id="{11F888B0-6184-4E49-BE67-5D21583FAA29}"/>
               </a:ext>
             </a:extLst>
           </p:cNvPr>
@@ -9214,7 +9296,7 @@
           <a:p>
             <a:r>
               <a:rPr lang="en-GB" dirty="0"/>
-              <a:t>API + node-red = flexibility</a:t>
+              <a:t>documentation</a:t>
             </a:r>
           </a:p>
         </p:txBody>
@@ -9224,7 +9306,7 @@
           <p:cNvPr id="3" name="Content Placeholder 2">
             <a:extLst>
               <a:ext uri="{FF2B5EF4-FFF2-40B4-BE49-F238E27FC236}">
-                <a16:creationId xmlns:a16="http://schemas.microsoft.com/office/drawing/2014/main" id="{3FAAA951-B22E-4803-A2C0-9CF1E7E33F9E}"/>
+                <a16:creationId xmlns:a16="http://schemas.microsoft.com/office/drawing/2014/main" id="{5D0BF05F-CB19-4169-8628-60F81EFBE59E}"/>
               </a:ext>
             </a:extLst>
           </p:cNvPr>
@@ -9235,63 +9317,108 @@
             <p:ph idx="1"/>
           </p:nvPr>
         </p:nvSpPr>
-        <p:spPr>
-          <a:xfrm>
-            <a:off x="266699" y="1933349"/>
-            <a:ext cx="8694421" cy="4055469"/>
-          </a:xfrm>
-        </p:spPr>
+        <p:spPr/>
         <p:txBody>
           <a:bodyPr>
-            <a:normAutofit/>
+            <a:normAutofit lnSpcReduction="10000"/>
           </a:bodyPr>
           <a:lstStyle/>
           <a:p>
             <a:r>
               <a:rPr lang="en-GB" dirty="0"/>
-              <a:t>API</a:t>
-            </a:r>
-          </a:p>
-          <a:p>
-            <a:r>
-              <a:rPr lang="en-GB" dirty="0"/>
-              <a:t>	XAgent / SmartNSF / or REST endpoint</a:t>
-            </a:r>
-          </a:p>
-          <a:p>
-            <a:r>
-              <a:rPr lang="en-GB" dirty="0"/>
-              <a:t>	Use Xots for background processing</a:t>
-            </a:r>
-          </a:p>
-          <a:p>
-            <a:r>
-              <a:rPr lang="en-GB" dirty="0"/>
-              <a:t>	Utility methods added to ODA to boilerplate 	code</a:t>
-            </a:r>
-          </a:p>
-          <a:p>
-            <a:r>
-              <a:rPr lang="en-GB" dirty="0"/>
-              <a:t>Node-RED – </a:t>
-            </a:r>
-            <a:r>
-              <a:rPr lang="en-GB" b="1" dirty="0"/>
-              <a:t>Installable alongside Domino with NodeJS</a:t>
-            </a:r>
-            <a:endParaRPr lang="en-GB" dirty="0"/>
-          </a:p>
-          <a:p>
-            <a:r>
-              <a:rPr lang="en-GB" dirty="0"/>
-              <a:t>	Scheduling of flows that includes Web APIs</a:t>
-            </a:r>
-          </a:p>
-          <a:p>
-            <a:pPr marL="901700" indent="-901700"/>
-            <a:r>
-              <a:rPr lang="en-GB" dirty="0"/>
-              <a:t>	Other schedulers would work, as long as they can call a Web API</a:t>
+              <a:t>Swagger / Open API Specification is standard</a:t>
+            </a:r>
+          </a:p>
+          <a:p>
+            <a:r>
+              <a:rPr lang="en-GB" dirty="0"/>
+              <a:t>Swagger Editor </a:t>
+            </a:r>
+            <a:r>
+              <a:rPr lang="en-GB" dirty="0">
+                <a:hlinkClick r:id="rId2"/>
+              </a:rPr>
+              <a:t>online</a:t>
+            </a:r>
+            <a:r>
+              <a:rPr lang="en-GB" dirty="0"/>
+              <a:t>, local node.js app or Docker</a:t>
+            </a:r>
+          </a:p>
+          <a:p>
+            <a:r>
+              <a:rPr lang="en-GB" dirty="0">
+                <a:hlinkClick r:id="rId3"/>
+              </a:rPr>
+              <a:t>OpenAPI 3.0</a:t>
+            </a:r>
+            <a:r>
+              <a:rPr lang="en-GB" dirty="0"/>
+              <a:t> released July 2017</a:t>
+            </a:r>
+          </a:p>
+          <a:p>
+            <a:r>
+              <a:rPr lang="en-GB" dirty="0"/>
+              <a:t>	Samples not yet updated</a:t>
+            </a:r>
+          </a:p>
+          <a:p>
+            <a:r>
+              <a:rPr lang="en-GB" dirty="0">
+                <a:hlinkClick r:id="rId4"/>
+              </a:rPr>
+              <a:t>Swagger 2.0</a:t>
+            </a:r>
+            <a:r>
+              <a:rPr lang="en-GB" dirty="0"/>
+              <a:t> has many examples</a:t>
+            </a:r>
+          </a:p>
+          <a:p>
+            <a:r>
+              <a:rPr lang="en-GB" dirty="0">
+                <a:hlinkClick r:id="rId5"/>
+              </a:rPr>
+              <a:t>Swagger Hub</a:t>
+            </a:r>
+            <a:r>
+              <a:rPr lang="en-GB" dirty="0"/>
+              <a:t> or tools like </a:t>
+            </a:r>
+            <a:r>
+              <a:rPr lang="en-GB" dirty="0">
+                <a:hlinkClick r:id="rId6"/>
+              </a:rPr>
+              <a:t>Mermade</a:t>
+            </a:r>
+            <a:r>
+              <a:rPr lang="en-GB" dirty="0"/>
+              <a:t> will convert (between the 2)</a:t>
+            </a:r>
+          </a:p>
+          <a:p>
+            <a:r>
+              <a:rPr lang="en-GB" dirty="0">
+                <a:hlinkClick r:id="rId7"/>
+              </a:rPr>
+              <a:t>Swagger UI</a:t>
+            </a:r>
+            <a:r>
+              <a:rPr lang="en-GB" dirty="0"/>
+              <a:t> allows testing against actual server</a:t>
+            </a:r>
+          </a:p>
+          <a:p>
+            <a:r>
+              <a:rPr lang="en-GB" dirty="0">
+                <a:hlinkClick r:id="rId8"/>
+              </a:rPr>
+              <a:t>Swagger mock server</a:t>
+            </a:r>
+            <a:r>
+              <a:rPr lang="en-GB" dirty="0"/>
+              <a:t> can be created for UI dev</a:t>
             </a:r>
           </a:p>
         </p:txBody>
@@ -9299,7 +9426,7 @@
     </p:spTree>
     <p:extLst>
       <p:ext uri="{BB962C8B-B14F-4D97-AF65-F5344CB8AC3E}">
-        <p14:creationId xmlns:p14="http://schemas.microsoft.com/office/powerpoint/2010/main" val="3690183967"/>
+        <p14:creationId xmlns:p14="http://schemas.microsoft.com/office/powerpoint/2010/main" val="3390775355"/>
       </p:ext>
     </p:extLst>
   </p:cSld>
@@ -9331,7 +9458,7 @@
           <p:cNvPr id="2" name="Title 1">
             <a:extLst>
               <a:ext uri="{FF2B5EF4-FFF2-40B4-BE49-F238E27FC236}">
-                <a16:creationId xmlns:a16="http://schemas.microsoft.com/office/drawing/2014/main" id="{C6E669E2-BE11-4459-8C18-5C4763A43502}"/>
+                <a16:creationId xmlns:a16="http://schemas.microsoft.com/office/drawing/2014/main" id="{05AAFF9C-9D60-456C-9619-912E3CFE5A22}"/>
               </a:ext>
             </a:extLst>
           </p:cNvPr>
@@ -9348,9 +9475,10 @@
           <a:lstStyle/>
           <a:p>
             <a:r>
-              <a:rPr lang="en-GB" dirty="0"/>
-              <a:t>Node-red</a:t>
-            </a:r>
+              <a:rPr lang="en-GB" sz="4400" dirty="0"/>
+              <a:t>Creating a swagger definition</a:t>
+            </a:r>
+            <a:endParaRPr lang="en-GB" dirty="0"/>
           </a:p>
         </p:txBody>
       </p:sp>
@@ -9359,7 +9487,7 @@
           <p:cNvPr id="3" name="Content Placeholder 2">
             <a:extLst>
               <a:ext uri="{FF2B5EF4-FFF2-40B4-BE49-F238E27FC236}">
-                <a16:creationId xmlns:a16="http://schemas.microsoft.com/office/drawing/2014/main" id="{04E0A162-6297-49FF-BA4C-61E31142ED8B}"/>
+                <a16:creationId xmlns:a16="http://schemas.microsoft.com/office/drawing/2014/main" id="{C94BB55B-6C89-4F4B-A953-BD358C4216B6}"/>
               </a:ext>
             </a:extLst>
           </p:cNvPr>
@@ -9370,12 +9498,7 @@
             <p:ph idx="1"/>
           </p:nvPr>
         </p:nvSpPr>
-        <p:spPr>
-          <a:xfrm>
-            <a:off x="266699" y="1933349"/>
-            <a:ext cx="8293101" cy="4044541"/>
-          </a:xfrm>
-        </p:spPr>
+        <p:spPr/>
         <p:txBody>
           <a:bodyPr>
             <a:normAutofit lnSpcReduction="10000"/>
@@ -9384,58 +9507,60 @@
           <a:p>
             <a:r>
               <a:rPr lang="en-GB" dirty="0"/>
-              <a:t>An integration tool for wiring together APIs and online services</a:t>
-            </a:r>
-          </a:p>
-          <a:p>
-            <a:r>
-              <a:rPr lang="en-GB" dirty="0"/>
-              <a:t>Available on IBM Cloud, local node.js app or Docker</a:t>
+              <a:t>Write as YAML or JSON</a:t>
             </a:r>
           </a:p>
           <a:p>
             <a:pPr marL="901700" indent="-901700"/>
             <a:r>
               <a:rPr lang="en-GB" dirty="0"/>
-              <a:t>	Note: Docker containers not aware of host’s “localhost” or other containers</a:t>
-            </a:r>
-          </a:p>
-          <a:p>
-            <a:r>
-              <a:rPr lang="en-GB" dirty="0"/>
-              <a:t>Schedule tasks via Inject node (or Big Timer)</a:t>
-            </a:r>
-          </a:p>
-          <a:p>
-            <a:r>
-              <a:rPr lang="en-GB" dirty="0"/>
-              <a:t>Additional nodes for e.g. Watson Services</a:t>
-            </a:r>
-          </a:p>
-          <a:p>
-            <a:r>
-              <a:rPr lang="en-GB" dirty="0"/>
-              <a:t>Basic authentication can be set</a:t>
-            </a:r>
-          </a:p>
-          <a:p>
-            <a:r>
-              <a:rPr lang="en-GB" dirty="0"/>
-              <a:t>Flows can be imported / exported as JSON</a:t>
-            </a:r>
-          </a:p>
-          <a:p>
-            <a:r>
-              <a:rPr lang="en-GB" dirty="0"/>
-              <a:t>DASHBOARDS</a:t>
-            </a:r>
+              <a:t>	YAML – no quotes around strings, no commas, no curly braces</a:t>
+            </a:r>
+          </a:p>
+          <a:p>
+            <a:r>
+              <a:rPr lang="en-GB" dirty="0"/>
+              <a:t>operationIds can be added</a:t>
+            </a:r>
+          </a:p>
+          <a:p>
+            <a:r>
+              <a:rPr lang="en-GB" dirty="0"/>
+              <a:t>	If used, required on all for that path</a:t>
+            </a:r>
+          </a:p>
+          <a:p>
+            <a:r>
+              <a:rPr lang="en-GB" dirty="0"/>
+              <a:t>Use enums for options</a:t>
+            </a:r>
+          </a:p>
+          <a:p>
+            <a:r>
+              <a:rPr lang="en-GB" dirty="0"/>
+              <a:t>OpenAPI 3.0 allows examples, but </a:t>
+            </a:r>
+            <a:r>
+              <a:rPr lang="en-GB" b="1" dirty="0"/>
+              <a:t>clarify and add value</a:t>
+            </a:r>
+          </a:p>
+          <a:p>
+            <a:r>
+              <a:rPr lang="en-GB" dirty="0"/>
+              <a:t>“Framework for good documentation”, does not guarantee good documentation</a:t>
+            </a:r>
+            <a:endParaRPr lang="en-GB" b="1" dirty="0"/>
+          </a:p>
+          <a:p>
+            <a:endParaRPr lang="en-GB" dirty="0"/>
           </a:p>
         </p:txBody>
       </p:sp>
     </p:spTree>
     <p:extLst>
       <p:ext uri="{BB962C8B-B14F-4D97-AF65-F5344CB8AC3E}">
-        <p14:creationId xmlns:p14="http://schemas.microsoft.com/office/powerpoint/2010/main" val="1913848587"/>
+        <p14:creationId xmlns:p14="http://schemas.microsoft.com/office/powerpoint/2010/main" val="3409692770"/>
       </p:ext>
     </p:extLst>
   </p:cSld>
@@ -9467,7 +9592,7 @@
           <p:cNvPr id="2" name="Title 1">
             <a:extLst>
               <a:ext uri="{FF2B5EF4-FFF2-40B4-BE49-F238E27FC236}">
-                <a16:creationId xmlns:a16="http://schemas.microsoft.com/office/drawing/2014/main" id="{BAD95756-30F2-4F38-B406-1C6C78CB70D0}"/>
+                <a16:creationId xmlns:a16="http://schemas.microsoft.com/office/drawing/2014/main" id="{701EB0D4-BE51-4EB9-95BA-1387E3008DA7}"/>
               </a:ext>
             </a:extLst>
           </p:cNvPr>
@@ -9485,7 +9610,7 @@
           <a:p>
             <a:r>
               <a:rPr lang="en-GB" dirty="0"/>
-              <a:t>Integrating private / public</a:t>
+              <a:t>testing</a:t>
             </a:r>
           </a:p>
         </p:txBody>
@@ -9495,7 +9620,7 @@
           <p:cNvPr id="3" name="Content Placeholder 2">
             <a:extLst>
               <a:ext uri="{FF2B5EF4-FFF2-40B4-BE49-F238E27FC236}">
-                <a16:creationId xmlns:a16="http://schemas.microsoft.com/office/drawing/2014/main" id="{FC80F034-E016-44D5-B815-A5E0F3FD05FE}"/>
+                <a16:creationId xmlns:a16="http://schemas.microsoft.com/office/drawing/2014/main" id="{090C2521-717E-412B-B21A-03628179FB11}"/>
               </a:ext>
             </a:extLst>
           </p:cNvPr>
@@ -9513,72 +9638,48 @@
           <a:p>
             <a:r>
               <a:rPr lang="en-GB" dirty="0"/>
-              <a:t>“Private” needs to be made “public”</a:t>
-            </a:r>
-          </a:p>
-          <a:p>
-            <a:r>
-              <a:rPr lang="en-GB" dirty="0">
-                <a:hlinkClick r:id="rId3"/>
-              </a:rPr>
-              <a:t>ngrok</a:t>
-            </a:r>
-            <a:r>
-              <a:rPr lang="en-GB"/>
-              <a:t> provides secure tunnels</a:t>
-            </a:r>
-          </a:p>
-          <a:p>
-            <a:r>
-              <a:rPr lang="en-GB" dirty="0">
-                <a:hlinkClick r:id="rId4"/>
-              </a:rPr>
-              <a:t>cmder</a:t>
-            </a:r>
-            <a:r>
-              <a:rPr lang="en-GB"/>
-              <a:t> is a good console emulator for Windows</a:t>
-            </a:r>
-          </a:p>
-          <a:p>
-            <a:endParaRPr lang="en-GB" dirty="0"/>
-          </a:p>
-        </p:txBody>
-      </p:sp>
-      <p:pic>
-        <p:nvPicPr>
-          <p:cNvPr id="4" name="Picture 3">
-            <a:extLst>
-              <a:ext uri="{FF2B5EF4-FFF2-40B4-BE49-F238E27FC236}">
-                <a16:creationId xmlns:a16="http://schemas.microsoft.com/office/drawing/2014/main" id="{98A35C8F-A351-43A9-9D73-DA5810CA9FAE}"/>
-              </a:ext>
-            </a:extLst>
-          </p:cNvPr>
-          <p:cNvPicPr>
-            <a:picLocks noChangeAspect="1"/>
-          </p:cNvPicPr>
-          <p:nvPr/>
-        </p:nvPicPr>
-        <p:blipFill>
-          <a:blip r:embed="rId5"/>
-          <a:stretch>
-            <a:fillRect/>
-          </a:stretch>
-        </p:blipFill>
-        <p:spPr>
-          <a:xfrm>
-            <a:off x="2070101" y="3304991"/>
-            <a:ext cx="4864100" cy="2679448"/>
-          </a:xfrm>
-          <a:prstGeom prst="rect">
-            <a:avLst/>
-          </a:prstGeom>
-        </p:spPr>
-      </p:pic>
+              <a:t>Various REST service tools are available</a:t>
+            </a:r>
+          </a:p>
+          <a:p>
+            <a:pPr marL="342900" indent="-342900">
+              <a:buFontTx/>
+              <a:buChar char="-"/>
+            </a:pPr>
+            <a:r>
+              <a:rPr lang="en-GB" strike="sngStrike" dirty="0"/>
+              <a:t>Postman (Electron desktop app)</a:t>
+            </a:r>
+          </a:p>
+          <a:p>
+            <a:pPr marL="342900" indent="-342900">
+              <a:buFontTx/>
+              <a:buChar char="-"/>
+            </a:pPr>
+            <a:r>
+              <a:rPr lang="en-GB" strike="sngStrike" dirty="0"/>
+              <a:t>RestClient plugin for Firefox</a:t>
+            </a:r>
+          </a:p>
+          <a:p>
+            <a:pPr marL="342900" indent="-342900">
+              <a:buFontTx/>
+              <a:buChar char="-"/>
+            </a:pPr>
+            <a:endParaRPr lang="en-GB" b="1" dirty="0"/>
+          </a:p>
+          <a:p>
+            <a:r>
+              <a:rPr lang="en-GB" b="1" dirty="0"/>
+              <a:t>JUST USE NODE-RED!</a:t>
+            </a:r>
+          </a:p>
+        </p:txBody>
+      </p:sp>
     </p:spTree>
     <p:extLst>
       <p:ext uri="{BB962C8B-B14F-4D97-AF65-F5344CB8AC3E}">
-        <p14:creationId xmlns:p14="http://schemas.microsoft.com/office/powerpoint/2010/main" val="2859864890"/>
+        <p14:creationId xmlns:p14="http://schemas.microsoft.com/office/powerpoint/2010/main" val="1453544228"/>
       </p:ext>
     </p:extLst>
   </p:cSld>
@@ -9607,10 +9708,10 @@
       </p:grpSpPr>
       <p:sp>
         <p:nvSpPr>
-          <p:cNvPr id="4" name="Title 3">
+          <p:cNvPr id="2" name="Title 1">
             <a:extLst>
               <a:ext uri="{FF2B5EF4-FFF2-40B4-BE49-F238E27FC236}">
-                <a16:creationId xmlns:a16="http://schemas.microsoft.com/office/drawing/2014/main" id="{D691CD7C-405A-4343-A99A-F7317A35A1A1}"/>
+                <a16:creationId xmlns:a16="http://schemas.microsoft.com/office/drawing/2014/main" id="{28D4950E-C911-48D5-B236-0A6C79E2A3E6}"/>
               </a:ext>
             </a:extLst>
           </p:cNvPr>
@@ -9618,7 +9719,7 @@
             <a:spLocks noGrp="1"/>
           </p:cNvSpPr>
           <p:nvPr>
-            <p:ph type="ctrTitle"/>
+            <p:ph type="title"/>
           </p:nvPr>
         </p:nvSpPr>
         <p:spPr/>
@@ -9628,7 +9729,75 @@
           <a:p>
             <a:r>
               <a:rPr lang="en-GB" dirty="0"/>
-              <a:t>Microservices For Domino</a:t>
+              <a:t>http Request Types</a:t>
+            </a:r>
+          </a:p>
+        </p:txBody>
+      </p:sp>
+      <p:sp>
+        <p:nvSpPr>
+          <p:cNvPr id="3" name="Content Placeholder 2">
+            <a:extLst>
+              <a:ext uri="{FF2B5EF4-FFF2-40B4-BE49-F238E27FC236}">
+                <a16:creationId xmlns:a16="http://schemas.microsoft.com/office/drawing/2014/main" id="{D2C3A57F-87ED-48C2-9CAC-38FA5FE319DC}"/>
+              </a:ext>
+            </a:extLst>
+          </p:cNvPr>
+          <p:cNvSpPr>
+            <a:spLocks noGrp="1"/>
+          </p:cNvSpPr>
+          <p:nvPr>
+            <p:ph idx="1"/>
+          </p:nvPr>
+        </p:nvSpPr>
+        <p:spPr/>
+        <p:txBody>
+          <a:bodyPr>
+            <a:normAutofit/>
+          </a:bodyPr>
+          <a:lstStyle/>
+          <a:p>
+            <a:r>
+              <a:rPr lang="en-GB" dirty="0"/>
+              <a:t>GET </a:t>
+            </a:r>
+            <a:r>
+              <a:rPr lang="mr-IN" dirty="0"/>
+              <a:t>–</a:t>
+            </a:r>
+            <a:r>
+              <a:rPr lang="en-GB" dirty="0"/>
+              <a:t> Read data (No body data allowed)</a:t>
+            </a:r>
+          </a:p>
+          <a:p>
+            <a:r>
+              <a:rPr lang="en-GB" dirty="0"/>
+              <a:t>POST – Submit data (Read/Write)</a:t>
+            </a:r>
+          </a:p>
+          <a:p>
+            <a:r>
+              <a:rPr lang="en-GB" dirty="0"/>
+              <a:t>PUT – Replacing entire document data</a:t>
+            </a:r>
+          </a:p>
+          <a:p>
+            <a:r>
+              <a:rPr lang="en-GB" dirty="0"/>
+              <a:t>PATCH – Minor update to existing data</a:t>
+            </a:r>
+          </a:p>
+          <a:p>
+            <a:r>
+              <a:rPr lang="en-GB" dirty="0"/>
+              <a:t>	PATCH not enabled by default on Domino</a:t>
+            </a:r>
+          </a:p>
+          <a:p>
+            <a:r>
+              <a:rPr lang="en-GB" dirty="0"/>
+              <a:t>DELETE – Deleting Records (No body data allowed)</a:t>
             </a:r>
           </a:p>
         </p:txBody>
@@ -9636,7 +9805,7 @@
     </p:spTree>
     <p:extLst>
       <p:ext uri="{BB962C8B-B14F-4D97-AF65-F5344CB8AC3E}">
-        <p14:creationId xmlns:p14="http://schemas.microsoft.com/office/powerpoint/2010/main" val="1883388647"/>
+        <p14:creationId xmlns:p14="http://schemas.microsoft.com/office/powerpoint/2010/main" val="397643937"/>
       </p:ext>
     </p:extLst>
   </p:cSld>
@@ -10474,7 +10643,7 @@
           <p:cNvPr id="2" name="Title 1">
             <a:extLst>
               <a:ext uri="{FF2B5EF4-FFF2-40B4-BE49-F238E27FC236}">
-                <a16:creationId xmlns:a16="http://schemas.microsoft.com/office/drawing/2014/main" id="{004A5E56-F513-4A94-A58F-4235E160341C}"/>
+                <a16:creationId xmlns:a16="http://schemas.microsoft.com/office/drawing/2014/main" id="{BDDECFA5-674E-480C-9B09-ECB6EAFBCFD0}"/>
               </a:ext>
             </a:extLst>
           </p:cNvPr>
@@ -10492,7 +10661,7 @@
           <a:p>
             <a:r>
               <a:rPr lang="en-GB" dirty="0"/>
-              <a:t>Microservice Patterns</a:t>
+              <a:t>HTTP status codes</a:t>
             </a:r>
           </a:p>
         </p:txBody>
@@ -10502,7 +10671,7 @@
           <p:cNvPr id="3" name="Content Placeholder 2">
             <a:extLst>
               <a:ext uri="{FF2B5EF4-FFF2-40B4-BE49-F238E27FC236}">
-                <a16:creationId xmlns:a16="http://schemas.microsoft.com/office/drawing/2014/main" id="{3FAAA951-B22E-4803-A2C0-9CF1E7E33F9E}"/>
+                <a16:creationId xmlns:a16="http://schemas.microsoft.com/office/drawing/2014/main" id="{7E62BE25-35A8-46F0-8E50-33C5CC9893D2}"/>
               </a:ext>
             </a:extLst>
           </p:cNvPr>
@@ -10515,76 +10684,60 @@
         </p:nvSpPr>
         <p:spPr/>
         <p:txBody>
-          <a:bodyPr>
-            <a:normAutofit lnSpcReduction="10000"/>
-          </a:bodyPr>
-          <a:lstStyle/>
-          <a:p>
-            <a:pPr marL="342900" indent="-342900">
-              <a:buFont typeface="Arial" charset="0"/>
-              <a:buChar char="•"/>
-            </a:pPr>
-            <a:r>
-              <a:rPr lang="en-GB" dirty="0"/>
-              <a:t>Micro-Functions</a:t>
-            </a:r>
-          </a:p>
-          <a:p>
-            <a:pPr marL="342900" indent="-342900">
-              <a:buFont typeface="Arial" charset="0"/>
-              <a:buChar char="•"/>
-            </a:pPr>
-            <a:r>
-              <a:rPr lang="en-GB" dirty="0"/>
-              <a:t>	Breakdown functions into re-usable/modular 	code blocks</a:t>
-            </a:r>
-          </a:p>
-          <a:p>
-            <a:pPr marL="342900" indent="-342900">
-              <a:buFont typeface="Arial" charset="0"/>
-              <a:buChar char="•"/>
-            </a:pPr>
-            <a:r>
-              <a:rPr lang="en-GB" dirty="0"/>
-              <a:t>	Each function should do one thing and do it 	well</a:t>
-            </a:r>
-          </a:p>
-          <a:p>
-            <a:pPr marL="342900" indent="-342900">
-              <a:buFont typeface="Arial" charset="0"/>
-              <a:buChar char="•"/>
-            </a:pPr>
-            <a:r>
-              <a:rPr lang="en-GB" dirty="0"/>
-              <a:t>	Simplify and optimize the code within each 	function</a:t>
-            </a:r>
-          </a:p>
-          <a:p>
-            <a:pPr marL="342900" indent="-342900">
-              <a:buFont typeface="Arial" charset="0"/>
-              <a:buChar char="•"/>
-            </a:pPr>
-            <a:r>
-              <a:rPr lang="en-GB" dirty="0"/>
-              <a:t>	A function shouldn’t contain more than 80-	100 lines of code</a:t>
-            </a:r>
-          </a:p>
-          <a:p>
-            <a:pPr marL="901700" indent="-901700">
-              <a:buFont typeface="Arial" charset="0"/>
-              <a:buChar char="•"/>
-            </a:pPr>
-            <a:r>
-              <a:rPr lang="en-GB" dirty="0"/>
-              <a:t>	Develop ”Pure Functions” whenever possible</a:t>
-            </a:r>
+          <a:bodyPr/>
+          <a:lstStyle/>
+          <a:p>
+            <a:r>
+              <a:rPr lang="en-GB" dirty="0"/>
+              <a:t>1xx – Received and understood, stand by…</a:t>
+            </a:r>
+          </a:p>
+          <a:p>
+            <a:r>
+              <a:rPr lang="en-GB" dirty="0"/>
+              <a:t>2xx – Received, understood and accepted</a:t>
+            </a:r>
+          </a:p>
+          <a:p>
+            <a:r>
+              <a:rPr lang="en-GB" dirty="0"/>
+              <a:t>3xx – Redirecting</a:t>
+            </a:r>
+          </a:p>
+          <a:p>
+            <a:r>
+              <a:rPr lang="en-GB" dirty="0"/>
+              <a:t>4xx – You did something wrong!</a:t>
+            </a:r>
+          </a:p>
+          <a:p>
+            <a:r>
+              <a:rPr lang="en-GB" dirty="0"/>
+              <a:t>5xx – We did something wrong!</a:t>
+            </a:r>
+          </a:p>
+          <a:p>
+            <a:endParaRPr lang="en-GB" dirty="0"/>
+          </a:p>
+          <a:p>
+            <a:r>
+              <a:rPr lang="en-GB" dirty="0"/>
+              <a:t>See </a:t>
+            </a:r>
+            <a:r>
+              <a:rPr lang="en-GB" dirty="0">
+                <a:hlinkClick r:id="rId2"/>
+              </a:rPr>
+              <a:t>Wikipedia</a:t>
+            </a:r>
+            <a:endParaRPr lang="en-GB" dirty="0"/>
           </a:p>
         </p:txBody>
       </p:sp>
     </p:spTree>
     <p:extLst>
       <p:ext uri="{BB962C8B-B14F-4D97-AF65-F5344CB8AC3E}">
-        <p14:creationId xmlns:p14="http://schemas.microsoft.com/office/powerpoint/2010/main" val="241729178"/>
+        <p14:creationId xmlns:p14="http://schemas.microsoft.com/office/powerpoint/2010/main" val="2800926257"/>
       </p:ext>
     </p:extLst>
   </p:cSld>
@@ -10616,7 +10769,7 @@
           <p:cNvPr id="2" name="Title 1">
             <a:extLst>
               <a:ext uri="{FF2B5EF4-FFF2-40B4-BE49-F238E27FC236}">
-                <a16:creationId xmlns:a16="http://schemas.microsoft.com/office/drawing/2014/main" id="{004A5E56-F513-4A94-A58F-4235E160341C}"/>
+                <a16:creationId xmlns:a16="http://schemas.microsoft.com/office/drawing/2014/main" id="{28D4950E-C911-48D5-B236-0A6C79E2A3E6}"/>
               </a:ext>
             </a:extLst>
           </p:cNvPr>
@@ -10634,7 +10787,7 @@
           <a:p>
             <a:r>
               <a:rPr lang="en-GB" dirty="0"/>
-              <a:t>Microservice Patterns Cont.</a:t>
+              <a:t>http status codes CONT.</a:t>
             </a:r>
           </a:p>
         </p:txBody>
@@ -10644,7 +10797,7 @@
           <p:cNvPr id="3" name="Content Placeholder 2">
             <a:extLst>
               <a:ext uri="{FF2B5EF4-FFF2-40B4-BE49-F238E27FC236}">
-                <a16:creationId xmlns:a16="http://schemas.microsoft.com/office/drawing/2014/main" id="{3FAAA951-B22E-4803-A2C0-9CF1E7E33F9E}"/>
+                <a16:creationId xmlns:a16="http://schemas.microsoft.com/office/drawing/2014/main" id="{D2C3A57F-87ED-48C2-9CAC-38FA5FE319DC}"/>
               </a:ext>
             </a:extLst>
           </p:cNvPr>
@@ -10658,63 +10811,61 @@
         <p:spPr/>
         <p:txBody>
           <a:bodyPr>
-            <a:normAutofit/>
+            <a:normAutofit lnSpcReduction="10000"/>
           </a:bodyPr>
           <a:lstStyle/>
           <a:p>
-            <a:pPr marL="342900" indent="-342900">
-              <a:buFont typeface="Arial" charset="0"/>
-              <a:buChar char="•"/>
-            </a:pPr>
-            <a:r>
-              <a:rPr lang="en-GB" dirty="0"/>
-              <a:t>Micro-Services</a:t>
-            </a:r>
-          </a:p>
-          <a:p>
-            <a:pPr marL="342900" indent="-342900">
-              <a:buFont typeface="Arial" charset="0"/>
-              <a:buChar char="•"/>
-            </a:pPr>
-            <a:r>
-              <a:rPr lang="en-GB" dirty="0"/>
-              <a:t>	Define which micro-functions can become 	services to 3</a:t>
-            </a:r>
-            <a:r>
-              <a:rPr lang="en-GB" baseline="30000" dirty="0"/>
-              <a:t>rd</a:t>
-            </a:r>
-            <a:r>
-              <a:rPr lang="en-GB" dirty="0"/>
-              <a:t> party platforms and 	applications</a:t>
-            </a:r>
-          </a:p>
-          <a:p>
-            <a:pPr marL="342900" indent="-342900">
-              <a:buFont typeface="Arial" charset="0"/>
-              <a:buChar char="•"/>
-            </a:pPr>
-            <a:r>
-              <a:rPr lang="en-GB" dirty="0"/>
-              <a:t>	Create API Endpoints that trigger your micro-	functions</a:t>
-            </a:r>
-          </a:p>
-          <a:p>
-            <a:pPr marL="342900" indent="-342900">
-              <a:buFont typeface="Arial" charset="0"/>
-              <a:buChar char="•"/>
-            </a:pPr>
-            <a:r>
-              <a:rPr lang="en-GB" dirty="0"/>
-              <a:t>	Ensure a strong security layer for 3</a:t>
-            </a:r>
-            <a:r>
-              <a:rPr lang="en-GB" baseline="30000" dirty="0"/>
-              <a:t>rd</a:t>
-            </a:r>
-            <a:r>
-              <a:rPr lang="en-GB" dirty="0"/>
-              <a:t> parties to 	interface with before triggering your services</a:t>
+            <a:r>
+              <a:rPr lang="en-GB" dirty="0"/>
+              <a:t>200 – OK</a:t>
+            </a:r>
+          </a:p>
+          <a:p>
+            <a:r>
+              <a:rPr lang="en-GB" dirty="0"/>
+              <a:t>202 – Accepted for processing</a:t>
+            </a:r>
+          </a:p>
+          <a:p>
+            <a:r>
+              <a:rPr lang="en-GB" dirty="0"/>
+              <a:t>302 – URL found but server is redirecting</a:t>
+            </a:r>
+          </a:p>
+          <a:p>
+            <a:r>
+              <a:rPr lang="en-GB" dirty="0"/>
+              <a:t>400 – Bad request</a:t>
+            </a:r>
+          </a:p>
+          <a:p>
+            <a:r>
+              <a:rPr lang="en-GB" dirty="0"/>
+              <a:t>401 – Unauthorised</a:t>
+            </a:r>
+          </a:p>
+          <a:p>
+            <a:r>
+              <a:rPr lang="en-GB" dirty="0"/>
+              <a:t>403 – Forbidden</a:t>
+            </a:r>
+          </a:p>
+          <a:p>
+            <a:r>
+              <a:rPr lang="en-GB" dirty="0"/>
+              <a:t>404 – Not found</a:t>
+            </a:r>
+          </a:p>
+          <a:p>
+            <a:r>
+              <a:rPr lang="en-GB" dirty="0"/>
+              <a:t>405 – Method not allowed</a:t>
+            </a:r>
+          </a:p>
+          <a:p>
+            <a:r>
+              <a:rPr lang="en-GB" dirty="0"/>
+              <a:t>500 – Internal server error</a:t>
             </a:r>
           </a:p>
         </p:txBody>
@@ -10722,7 +10873,7 @@
     </p:spTree>
     <p:extLst>
       <p:ext uri="{BB962C8B-B14F-4D97-AF65-F5344CB8AC3E}">
-        <p14:creationId xmlns:p14="http://schemas.microsoft.com/office/powerpoint/2010/main" val="1635627779"/>
+        <p14:creationId xmlns:p14="http://schemas.microsoft.com/office/powerpoint/2010/main" val="1049136580"/>
       </p:ext>
     </p:extLst>
   </p:cSld>
@@ -10751,10 +10902,10 @@
       </p:grpSpPr>
       <p:sp>
         <p:nvSpPr>
-          <p:cNvPr id="2" name="Title 1">
+          <p:cNvPr id="4" name="Title 3">
             <a:extLst>
               <a:ext uri="{FF2B5EF4-FFF2-40B4-BE49-F238E27FC236}">
-                <a16:creationId xmlns:a16="http://schemas.microsoft.com/office/drawing/2014/main" id="{004A5E56-F513-4A94-A58F-4235E160341C}"/>
+                <a16:creationId xmlns:a16="http://schemas.microsoft.com/office/drawing/2014/main" id="{380905A8-B705-4037-8A33-724430522F63}"/>
               </a:ext>
             </a:extLst>
           </p:cNvPr>
@@ -10762,7 +10913,7 @@
             <a:spLocks noGrp="1"/>
           </p:cNvSpPr>
           <p:nvPr>
-            <p:ph type="title"/>
+            <p:ph type="ctrTitle"/>
           </p:nvPr>
         </p:nvSpPr>
         <p:spPr/>
@@ -10772,90 +10923,15 @@
           <a:p>
             <a:r>
               <a:rPr lang="en-GB" dirty="0"/>
-              <a:t>A Different Approach</a:t>
-            </a:r>
-          </a:p>
-        </p:txBody>
-      </p:sp>
-      <p:sp>
-        <p:nvSpPr>
-          <p:cNvPr id="3" name="Content Placeholder 2">
-            <a:extLst>
-              <a:ext uri="{FF2B5EF4-FFF2-40B4-BE49-F238E27FC236}">
-                <a16:creationId xmlns:a16="http://schemas.microsoft.com/office/drawing/2014/main" id="{3FAAA951-B22E-4803-A2C0-9CF1E7E33F9E}"/>
-              </a:ext>
-            </a:extLst>
-          </p:cNvPr>
-          <p:cNvSpPr>
-            <a:spLocks noGrp="1"/>
-          </p:cNvSpPr>
-          <p:nvPr>
-            <p:ph idx="1"/>
-          </p:nvPr>
-        </p:nvSpPr>
-        <p:spPr/>
-        <p:txBody>
-          <a:bodyPr>
-            <a:normAutofit/>
-          </a:bodyPr>
-          <a:lstStyle/>
-          <a:p>
-            <a:pPr marL="342900" indent="-342900">
-              <a:buFont typeface="Arial" charset="0"/>
-              <a:buChar char="•"/>
-            </a:pPr>
-            <a:r>
-              <a:rPr lang="en-GB" dirty="0"/>
-              <a:t>Don’t build 3</a:t>
-            </a:r>
-            <a:r>
-              <a:rPr lang="en-GB" baseline="30000" dirty="0"/>
-              <a:t>rd</a:t>
-            </a:r>
-            <a:r>
-              <a:rPr lang="en-GB" dirty="0"/>
-              <a:t> party technologies into Domino</a:t>
-            </a:r>
-          </a:p>
-          <a:p>
-            <a:pPr marL="342900" indent="-342900">
-              <a:buFont typeface="Arial" charset="0"/>
-              <a:buChar char="•"/>
-            </a:pPr>
-            <a:r>
-              <a:rPr lang="en-GB" dirty="0"/>
-              <a:t>Have these technologies exist as a sidecar to a Domino environment</a:t>
-            </a:r>
-          </a:p>
-          <a:p>
-            <a:pPr marL="342900" indent="-342900">
-              <a:buFont typeface="Arial" charset="0"/>
-              <a:buChar char="•"/>
-            </a:pPr>
-            <a:r>
-              <a:rPr lang="en-GB" dirty="0"/>
-              <a:t>Each technology or service existing independently as a container</a:t>
-            </a:r>
-          </a:p>
-          <a:p>
-            <a:pPr marL="342900" indent="-342900">
-              <a:buFont typeface="Arial" charset="0"/>
-              <a:buChar char="•"/>
-            </a:pPr>
-            <a:r>
-              <a:rPr lang="en-GB" dirty="0"/>
-              <a:t>All communication occurs using APIs</a:t>
-            </a:r>
-          </a:p>
-          <a:p>
-            <a:endParaRPr lang="en-GB" dirty="0"/>
+              <a:t>What about scheduled tasks?</a:t>
+            </a:r>
           </a:p>
         </p:txBody>
       </p:sp>
     </p:spTree>
     <p:extLst>
       <p:ext uri="{BB962C8B-B14F-4D97-AF65-F5344CB8AC3E}">
-        <p14:creationId xmlns:p14="http://schemas.microsoft.com/office/powerpoint/2010/main" val="1358255903"/>
+        <p14:creationId xmlns:p14="http://schemas.microsoft.com/office/powerpoint/2010/main" val="508418059"/>
       </p:ext>
     </p:extLst>
   </p:cSld>
@@ -10884,10 +10960,10 @@
       </p:grpSpPr>
       <p:sp>
         <p:nvSpPr>
-          <p:cNvPr id="2" name="Title 1">
+          <p:cNvPr id="4" name="Title 3">
             <a:extLst>
               <a:ext uri="{FF2B5EF4-FFF2-40B4-BE49-F238E27FC236}">
-                <a16:creationId xmlns:a16="http://schemas.microsoft.com/office/drawing/2014/main" id="{004A5E56-F513-4A94-A58F-4235E160341C}"/>
+                <a16:creationId xmlns:a16="http://schemas.microsoft.com/office/drawing/2014/main" id="{5F661A78-1620-4819-8674-16466DDEA36A}"/>
               </a:ext>
             </a:extLst>
           </p:cNvPr>
@@ -10905,17 +10981,17 @@
           <a:p>
             <a:r>
               <a:rPr lang="en-GB" dirty="0"/>
-              <a:t>A Different Approach Cont.</a:t>
-            </a:r>
-          </a:p>
-        </p:txBody>
-      </p:sp>
-      <p:sp>
-        <p:nvSpPr>
-          <p:cNvPr id="3" name="Content Placeholder 2">
+              <a:t>Scheduled tasks</a:t>
+            </a:r>
+          </a:p>
+        </p:txBody>
+      </p:sp>
+      <p:sp>
+        <p:nvSpPr>
+          <p:cNvPr id="5" name="Content Placeholder 4">
             <a:extLst>
               <a:ext uri="{FF2B5EF4-FFF2-40B4-BE49-F238E27FC236}">
-                <a16:creationId xmlns:a16="http://schemas.microsoft.com/office/drawing/2014/main" id="{3FAAA951-B22E-4803-A2C0-9CF1E7E33F9E}"/>
+                <a16:creationId xmlns:a16="http://schemas.microsoft.com/office/drawing/2014/main" id="{D8951B21-ADD7-4D86-B572-B18845D6A0F7}"/>
               </a:ext>
             </a:extLst>
           </p:cNvPr>
@@ -10928,109 +11004,48 @@
         </p:nvSpPr>
         <p:spPr/>
         <p:txBody>
-          <a:bodyPr>
-            <a:normAutofit lnSpcReduction="10000"/>
-          </a:bodyPr>
-          <a:lstStyle/>
-          <a:p>
-            <a:pPr marL="342900" indent="-342900">
-              <a:buFont typeface="Arial" charset="0"/>
-              <a:buChar char="•"/>
-            </a:pPr>
-            <a:r>
-              <a:rPr lang="en-GB" dirty="0"/>
-              <a:t>Example 1: ReactJS User Interface</a:t>
-            </a:r>
-          </a:p>
-          <a:p>
-            <a:pPr marL="1028700" lvl="1" indent="-342900">
-              <a:buFont typeface="Arial" charset="0"/>
-              <a:buChar char="•"/>
-            </a:pPr>
-            <a:r>
-              <a:rPr lang="en-GB" dirty="0"/>
-              <a:t>Develop React UI using NodeJS and Webpack</a:t>
-            </a:r>
-          </a:p>
-          <a:p>
-            <a:pPr marL="1028700" lvl="1" indent="-342900">
-              <a:buFont typeface="Arial" charset="0"/>
-              <a:buChar char="•"/>
-            </a:pPr>
-            <a:r>
-              <a:rPr lang="en-GB" dirty="0"/>
-              <a:t>In Domino, create API Endpoints for all relevant calls or use DAS</a:t>
-            </a:r>
-          </a:p>
-          <a:p>
-            <a:pPr marL="1028700" lvl="1" indent="-342900">
-              <a:buFont typeface="Arial" charset="0"/>
-              <a:buChar char="•"/>
-            </a:pPr>
-            <a:r>
-              <a:rPr lang="en-GB" dirty="0"/>
-              <a:t>Deploy React App as a standalone container</a:t>
-            </a:r>
-          </a:p>
-          <a:p>
-            <a:pPr marL="342900" indent="-342900">
-              <a:buFont typeface="Arial" charset="0"/>
-              <a:buChar char="•"/>
-            </a:pPr>
-            <a:r>
-              <a:rPr lang="en-GB" dirty="0"/>
-              <a:t>Example 2: Web Socket Server</a:t>
-            </a:r>
-          </a:p>
-          <a:p>
-            <a:pPr marL="1028700" lvl="1" indent="-342900">
-              <a:buFont typeface="Arial" charset="0"/>
-              <a:buChar char="•"/>
-            </a:pPr>
-            <a:r>
-              <a:rPr lang="en-GB" dirty="0"/>
-              <a:t>Create Web Socket Server using socket.io and NodeJS</a:t>
-            </a:r>
-          </a:p>
-          <a:p>
-            <a:pPr marL="1028700" lvl="1" indent="-342900">
-              <a:buFont typeface="Arial" charset="0"/>
-              <a:buChar char="•"/>
-            </a:pPr>
-            <a:r>
-              <a:rPr lang="en-GB" dirty="0"/>
-              <a:t>In Domino, include socket.io for client-side communication</a:t>
-            </a:r>
-          </a:p>
-          <a:p>
-            <a:pPr marL="1028700" lvl="1" indent="-342900">
-              <a:buFont typeface="Arial" charset="0"/>
-              <a:buChar char="•"/>
-            </a:pPr>
-            <a:r>
-              <a:rPr lang="en-GB" dirty="0"/>
-              <a:t>Create Web Socket events for all relevant communication</a:t>
-            </a:r>
-          </a:p>
-          <a:p>
-            <a:pPr marL="1028700" lvl="1" indent="-342900">
-              <a:buFont typeface="Arial" charset="0"/>
-              <a:buChar char="•"/>
-            </a:pPr>
-            <a:r>
-              <a:rPr lang="en-GB" dirty="0"/>
-              <a:t>Deploy Web Socket Server as standalone container</a:t>
+          <a:bodyPr/>
+          <a:lstStyle/>
+          <a:p>
+            <a:r>
+              <a:rPr lang="en-GB" dirty="0"/>
+              <a:t>Scheduled Agents</a:t>
+            </a:r>
+          </a:p>
+          <a:p>
+            <a:r>
+              <a:rPr lang="en-GB" dirty="0"/>
+              <a:t>	NSF only, language constraints (LS or Painful 	Java)</a:t>
+            </a:r>
+          </a:p>
+          <a:p>
+            <a:r>
+              <a:rPr lang="en-GB" dirty="0"/>
+              <a:t>DOTS</a:t>
+            </a:r>
+          </a:p>
+          <a:p>
+            <a:r>
+              <a:rPr lang="en-GB" dirty="0"/>
+              <a:t>	Server only, deployment constraints</a:t>
             </a:r>
           </a:p>
           <a:p>
             <a:endParaRPr lang="en-GB" dirty="0"/>
+          </a:p>
+          <a:p>
+            <a:pPr algn="ctr"/>
+            <a:r>
+              <a:rPr lang="en-GB" b="1" dirty="0"/>
+              <a:t>How about a different approach?</a:t>
+            </a:r>
           </a:p>
         </p:txBody>
       </p:sp>
     </p:spTree>
     <p:extLst>
       <p:ext uri="{BB962C8B-B14F-4D97-AF65-F5344CB8AC3E}">
-        <p14:creationId xmlns:p14="http://schemas.microsoft.com/office/powerpoint/2010/main" val="1294269516"/>
+        <p14:creationId xmlns:p14="http://schemas.microsoft.com/office/powerpoint/2010/main" val="1206375528"/>
       </p:ext>
     </p:extLst>
   </p:cSld>
@@ -11059,10 +11074,10 @@
       </p:grpSpPr>
       <p:sp>
         <p:nvSpPr>
-          <p:cNvPr id="4" name="Title 3">
+          <p:cNvPr id="2" name="Title 1">
             <a:extLst>
               <a:ext uri="{FF2B5EF4-FFF2-40B4-BE49-F238E27FC236}">
-                <a16:creationId xmlns:a16="http://schemas.microsoft.com/office/drawing/2014/main" id="{D691CD7C-405A-4343-A99A-F7317A35A1A1}"/>
+                <a16:creationId xmlns:a16="http://schemas.microsoft.com/office/drawing/2014/main" id="{004A5E56-F513-4A94-A58F-4235E160341C}"/>
               </a:ext>
             </a:extLst>
           </p:cNvPr>
@@ -11070,7 +11085,7 @@
             <a:spLocks noGrp="1"/>
           </p:cNvSpPr>
           <p:nvPr>
-            <p:ph type="ctrTitle"/>
+            <p:ph type="title"/>
           </p:nvPr>
         </p:nvSpPr>
         <p:spPr/>
@@ -11080,7 +11095,78 @@
           <a:p>
             <a:r>
               <a:rPr lang="en-GB" dirty="0"/>
-              <a:t>Container Clustering</a:t>
+              <a:t>API + node-red = flexibility</a:t>
+            </a:r>
+          </a:p>
+        </p:txBody>
+      </p:sp>
+      <p:sp>
+        <p:nvSpPr>
+          <p:cNvPr id="3" name="Content Placeholder 2">
+            <a:extLst>
+              <a:ext uri="{FF2B5EF4-FFF2-40B4-BE49-F238E27FC236}">
+                <a16:creationId xmlns:a16="http://schemas.microsoft.com/office/drawing/2014/main" id="{3FAAA951-B22E-4803-A2C0-9CF1E7E33F9E}"/>
+              </a:ext>
+            </a:extLst>
+          </p:cNvPr>
+          <p:cNvSpPr>
+            <a:spLocks noGrp="1"/>
+          </p:cNvSpPr>
+          <p:nvPr>
+            <p:ph idx="1"/>
+          </p:nvPr>
+        </p:nvSpPr>
+        <p:spPr>
+          <a:xfrm>
+            <a:off x="266699" y="1933349"/>
+            <a:ext cx="8694421" cy="4055469"/>
+          </a:xfrm>
+        </p:spPr>
+        <p:txBody>
+          <a:bodyPr>
+            <a:normAutofit/>
+          </a:bodyPr>
+          <a:lstStyle/>
+          <a:p>
+            <a:r>
+              <a:rPr lang="en-GB" dirty="0"/>
+              <a:t>API</a:t>
+            </a:r>
+          </a:p>
+          <a:p>
+            <a:r>
+              <a:rPr lang="en-GB" dirty="0"/>
+              <a:t>	XAgent / SmartNSF / or REST endpoint</a:t>
+            </a:r>
+          </a:p>
+          <a:p>
+            <a:r>
+              <a:rPr lang="en-GB" dirty="0"/>
+              <a:t>	Use Xots for background processing</a:t>
+            </a:r>
+          </a:p>
+          <a:p>
+            <a:r>
+              <a:rPr lang="en-GB" dirty="0"/>
+              <a:t>Node-RED – </a:t>
+            </a:r>
+            <a:r>
+              <a:rPr lang="en-GB" b="1" dirty="0"/>
+              <a:t>Installable alongside Domino with NodeJS</a:t>
+            </a:r>
+            <a:endParaRPr lang="en-GB" dirty="0"/>
+          </a:p>
+          <a:p>
+            <a:r>
+              <a:rPr lang="en-GB" dirty="0"/>
+              <a:t>	Scheduling of flows that includes Web APIs</a:t>
+            </a:r>
+          </a:p>
+          <a:p>
+            <a:pPr marL="901700" indent="-901700"/>
+            <a:r>
+              <a:rPr lang="en-GB" dirty="0"/>
+              <a:t>	Other schedulers would work, as long as they can call a Web API</a:t>
             </a:r>
           </a:p>
         </p:txBody>
@@ -11088,7 +11174,7 @@
     </p:spTree>
     <p:extLst>
       <p:ext uri="{BB962C8B-B14F-4D97-AF65-F5344CB8AC3E}">
-        <p14:creationId xmlns:p14="http://schemas.microsoft.com/office/powerpoint/2010/main" val="376630796"/>
+        <p14:creationId xmlns:p14="http://schemas.microsoft.com/office/powerpoint/2010/main" val="3690183967"/>
       </p:ext>
     </p:extLst>
   </p:cSld>
@@ -11120,7 +11206,7 @@
           <p:cNvPr id="2" name="Title 1">
             <a:extLst>
               <a:ext uri="{FF2B5EF4-FFF2-40B4-BE49-F238E27FC236}">
-                <a16:creationId xmlns:a16="http://schemas.microsoft.com/office/drawing/2014/main" id="{004A5E56-F513-4A94-A58F-4235E160341C}"/>
+                <a16:creationId xmlns:a16="http://schemas.microsoft.com/office/drawing/2014/main" id="{C6E669E2-BE11-4459-8C18-5C4763A43502}"/>
               </a:ext>
             </a:extLst>
           </p:cNvPr>
@@ -11138,7 +11224,7 @@
           <a:p>
             <a:r>
               <a:rPr lang="en-GB" dirty="0"/>
-              <a:t>Container Clustering</a:t>
+              <a:t>Node-red</a:t>
             </a:r>
           </a:p>
         </p:txBody>
@@ -11148,7 +11234,7 @@
           <p:cNvPr id="3" name="Content Placeholder 2">
             <a:extLst>
               <a:ext uri="{FF2B5EF4-FFF2-40B4-BE49-F238E27FC236}">
-                <a16:creationId xmlns:a16="http://schemas.microsoft.com/office/drawing/2014/main" id="{3FAAA951-B22E-4803-A2C0-9CF1E7E33F9E}"/>
+                <a16:creationId xmlns:a16="http://schemas.microsoft.com/office/drawing/2014/main" id="{04E0A162-6297-49FF-BA4C-61E31142ED8B}"/>
               </a:ext>
             </a:extLst>
           </p:cNvPr>
@@ -11159,78 +11245,71 @@
             <p:ph idx="1"/>
           </p:nvPr>
         </p:nvSpPr>
-        <p:spPr/>
+        <p:spPr>
+          <a:xfrm>
+            <a:off x="266699" y="1933349"/>
+            <a:ext cx="9146242" cy="4044541"/>
+          </a:xfrm>
+        </p:spPr>
         <p:txBody>
           <a:bodyPr>
-            <a:normAutofit fontScale="92500" lnSpcReduction="10000"/>
+            <a:normAutofit/>
           </a:bodyPr>
           <a:lstStyle/>
           <a:p>
-            <a:pPr marL="342900" indent="-342900">
-              <a:buFont typeface="Arial" charset="0"/>
-              <a:buChar char="•"/>
-            </a:pPr>
-            <a:r>
-              <a:rPr lang="en-GB" dirty="0"/>
-              <a:t>Cluster all relevant containers using Kubernetes</a:t>
-            </a:r>
-          </a:p>
-          <a:p>
-            <a:pPr marL="342900" indent="-342900">
-              <a:buFont typeface="Arial" charset="0"/>
-              <a:buChar char="•"/>
-            </a:pPr>
-            <a:r>
-              <a:rPr lang="en-GB" dirty="0"/>
-              <a:t>Run Kubernetes as a sidecar to your Domino environment</a:t>
-            </a:r>
-          </a:p>
-          <a:p>
-            <a:pPr marL="342900" indent="-342900">
-              <a:buFont typeface="Arial" charset="0"/>
-              <a:buChar char="•"/>
-            </a:pPr>
-            <a:r>
-              <a:rPr lang="en-GB" dirty="0"/>
-              <a:t>IBM Cloud Private provides enterprise-level container management using Kubernetes</a:t>
-            </a:r>
-          </a:p>
-          <a:p>
-            <a:pPr marL="342900" indent="-342900">
-              <a:buFont typeface="Arial" charset="0"/>
-              <a:buChar char="•"/>
-            </a:pPr>
-            <a:r>
-              <a:rPr lang="en-GB" dirty="0"/>
-              <a:t>Minikube can be used for development and testing environments (low availability)</a:t>
-            </a:r>
-          </a:p>
-          <a:p>
-            <a:pPr marL="342900" indent="-342900">
-              <a:buFont typeface="Arial" charset="0"/>
-              <a:buChar char="•"/>
-            </a:pPr>
-            <a:r>
-              <a:rPr lang="en-GB" dirty="0"/>
-              <a:t>Inject new services and containers into cluster as and when needed</a:t>
-            </a:r>
-          </a:p>
-          <a:p>
-            <a:pPr marL="342900" indent="-342900">
-              <a:buFont typeface="Arial" charset="0"/>
-              <a:buChar char="•"/>
-            </a:pPr>
-            <a:r>
-              <a:rPr lang="en-GB" dirty="0"/>
-              <a:t>Manage integration, security, testing and more with Istio</a:t>
-            </a:r>
+            <a:r>
+              <a:rPr lang="en-GB" dirty="0"/>
+              <a:t>An integration tool for wiring together APIs and online services</a:t>
+            </a:r>
+          </a:p>
+          <a:p>
+            <a:r>
+              <a:rPr lang="en-GB" dirty="0"/>
+              <a:t>Available on IBM Cloud, local node.js app or Docker</a:t>
+            </a:r>
+          </a:p>
+          <a:p>
+            <a:pPr marL="901700" indent="-901700"/>
+            <a:r>
+              <a:rPr lang="en-GB" dirty="0"/>
+              <a:t>	Note: Docker containers not aware of host’s “localhost” or other containers</a:t>
+            </a:r>
+          </a:p>
+          <a:p>
+            <a:r>
+              <a:rPr lang="en-GB" dirty="0"/>
+              <a:t>Schedule tasks via Inject node (or Big Timer)</a:t>
+            </a:r>
+          </a:p>
+          <a:p>
+            <a:r>
+              <a:rPr lang="en-GB" dirty="0"/>
+              <a:t>Additional nodes for e.g. Watson Services, Connections</a:t>
+            </a:r>
+          </a:p>
+          <a:p>
+            <a:r>
+              <a:rPr lang="en-GB" dirty="0"/>
+              <a:t>Basic authentication can be set</a:t>
+            </a:r>
+          </a:p>
+          <a:p>
+            <a:r>
+              <a:rPr lang="en-GB" dirty="0"/>
+              <a:t>Flows can be imported / exported </a:t>
+            </a:r>
+            <a:r>
+              <a:rPr lang="en-GB"/>
+              <a:t>as JSON</a:t>
+            </a:r>
+            <a:endParaRPr lang="en-GB" dirty="0"/>
           </a:p>
         </p:txBody>
       </p:sp>
     </p:spTree>
     <p:extLst>
       <p:ext uri="{BB962C8B-B14F-4D97-AF65-F5344CB8AC3E}">
-        <p14:creationId xmlns:p14="http://schemas.microsoft.com/office/powerpoint/2010/main" val="1970659718"/>
+        <p14:creationId xmlns:p14="http://schemas.microsoft.com/office/powerpoint/2010/main" val="1913848587"/>
       </p:ext>
     </p:extLst>
   </p:cSld>
@@ -11262,7 +11341,7 @@
           <p:cNvPr id="2" name="Title 1">
             <a:extLst>
               <a:ext uri="{FF2B5EF4-FFF2-40B4-BE49-F238E27FC236}">
-                <a16:creationId xmlns:a16="http://schemas.microsoft.com/office/drawing/2014/main" id="{004A5E56-F513-4A94-A58F-4235E160341C}"/>
+                <a16:creationId xmlns:a16="http://schemas.microsoft.com/office/drawing/2014/main" id="{BAD95756-30F2-4F38-B406-1C6C78CB70D0}"/>
               </a:ext>
             </a:extLst>
           </p:cNvPr>
@@ -11280,7 +11359,7 @@
           <a:p>
             <a:r>
               <a:rPr lang="en-GB" dirty="0"/>
-              <a:t>Benefits of Container Clustering </a:t>
+              <a:t>Integrating private / public</a:t>
             </a:r>
           </a:p>
         </p:txBody>
@@ -11290,7 +11369,7 @@
           <p:cNvPr id="3" name="Content Placeholder 2">
             <a:extLst>
               <a:ext uri="{FF2B5EF4-FFF2-40B4-BE49-F238E27FC236}">
-                <a16:creationId xmlns:a16="http://schemas.microsoft.com/office/drawing/2014/main" id="{3FAAA951-B22E-4803-A2C0-9CF1E7E33F9E}"/>
+                <a16:creationId xmlns:a16="http://schemas.microsoft.com/office/drawing/2014/main" id="{FC80F034-E016-44D5-B815-A5E0F3FD05FE}"/>
               </a:ext>
             </a:extLst>
           </p:cNvPr>
@@ -11303,83 +11382,77 @@
         </p:nvSpPr>
         <p:spPr/>
         <p:txBody>
-          <a:bodyPr>
-            <a:normAutofit/>
-          </a:bodyPr>
-          <a:lstStyle/>
-          <a:p>
-            <a:pPr marL="342900" indent="-342900">
-              <a:buFont typeface="Arial" charset="0"/>
-              <a:buChar char="•"/>
-            </a:pPr>
-            <a:r>
-              <a:rPr lang="en-GB" dirty="0"/>
-              <a:t>High availability</a:t>
-            </a:r>
-          </a:p>
-          <a:p>
-            <a:pPr marL="342900" indent="-342900">
-              <a:buFont typeface="Arial" charset="0"/>
-              <a:buChar char="•"/>
-            </a:pPr>
-            <a:r>
-              <a:rPr lang="en-GB" dirty="0"/>
-              <a:t>Seamless disaster recovery</a:t>
-            </a:r>
-          </a:p>
-          <a:p>
-            <a:pPr marL="342900" indent="-342900">
-              <a:buFont typeface="Arial" charset="0"/>
-              <a:buChar char="•"/>
-            </a:pPr>
-            <a:r>
-              <a:rPr lang="en-GB" dirty="0"/>
-              <a:t>Horizontal and vertical scaling</a:t>
-            </a:r>
-          </a:p>
-          <a:p>
-            <a:pPr marL="342900" indent="-342900">
-              <a:buFont typeface="Arial" charset="0"/>
-              <a:buChar char="•"/>
-            </a:pPr>
-            <a:r>
-              <a:rPr lang="en-GB" dirty="0"/>
-              <a:t>Continuous delivery</a:t>
-            </a:r>
-          </a:p>
-          <a:p>
-            <a:pPr marL="342900" indent="-342900">
-              <a:buFont typeface="Arial" charset="0"/>
-              <a:buChar char="•"/>
-            </a:pPr>
-            <a:r>
-              <a:rPr lang="en-GB" dirty="0"/>
-              <a:t>No downtime during updates and upgrades</a:t>
-            </a:r>
-          </a:p>
-          <a:p>
-            <a:pPr marL="342900" indent="-342900">
-              <a:buFont typeface="Arial" charset="0"/>
-              <a:buChar char="•"/>
-            </a:pPr>
-            <a:r>
-              <a:rPr lang="en-GB" dirty="0"/>
-              <a:t>CPU and Memory can be assigned and managed per container/container group</a:t>
-            </a:r>
-          </a:p>
-          <a:p>
-            <a:pPr marL="342900" indent="-342900">
-              <a:buFont typeface="Arial" charset="0"/>
-              <a:buChar char="•"/>
-            </a:pPr>
+          <a:bodyPr/>
+          <a:lstStyle/>
+          <a:p>
+            <a:r>
+              <a:rPr lang="en-GB" dirty="0"/>
+              <a:t>“Private” needs to be made “public”</a:t>
+            </a:r>
+          </a:p>
+          <a:p>
+            <a:r>
+              <a:rPr lang="en-GB" dirty="0">
+                <a:hlinkClick r:id="rId3"/>
+              </a:rPr>
+              <a:t>ngrok</a:t>
+            </a:r>
+            <a:r>
+              <a:rPr lang="en-GB"/>
+              <a:t> provides secure tunnels</a:t>
+            </a:r>
+          </a:p>
+          <a:p>
+            <a:r>
+              <a:rPr lang="en-GB" dirty="0">
+                <a:hlinkClick r:id="rId4"/>
+              </a:rPr>
+              <a:t>cmder</a:t>
+            </a:r>
+            <a:r>
+              <a:rPr lang="en-GB"/>
+              <a:t> is a good console emulator for Windows</a:t>
+            </a:r>
+          </a:p>
+          <a:p>
             <a:endParaRPr lang="en-GB" dirty="0"/>
           </a:p>
         </p:txBody>
       </p:sp>
+      <p:pic>
+        <p:nvPicPr>
+          <p:cNvPr id="4" name="Picture 3">
+            <a:extLst>
+              <a:ext uri="{FF2B5EF4-FFF2-40B4-BE49-F238E27FC236}">
+                <a16:creationId xmlns:a16="http://schemas.microsoft.com/office/drawing/2014/main" id="{98A35C8F-A351-43A9-9D73-DA5810CA9FAE}"/>
+              </a:ext>
+            </a:extLst>
+          </p:cNvPr>
+          <p:cNvPicPr>
+            <a:picLocks noChangeAspect="1"/>
+          </p:cNvPicPr>
+          <p:nvPr/>
+        </p:nvPicPr>
+        <p:blipFill>
+          <a:blip r:embed="rId5"/>
+          <a:stretch>
+            <a:fillRect/>
+          </a:stretch>
+        </p:blipFill>
+        <p:spPr>
+          <a:xfrm>
+            <a:off x="2070101" y="3304991"/>
+            <a:ext cx="4864100" cy="2679448"/>
+          </a:xfrm>
+          <a:prstGeom prst="rect">
+            <a:avLst/>
+          </a:prstGeom>
+        </p:spPr>
+      </p:pic>
     </p:spTree>
     <p:extLst>
       <p:ext uri="{BB962C8B-B14F-4D97-AF65-F5344CB8AC3E}">
-        <p14:creationId xmlns:p14="http://schemas.microsoft.com/office/powerpoint/2010/main" val="1759284094"/>
+        <p14:creationId xmlns:p14="http://schemas.microsoft.com/office/powerpoint/2010/main" val="2859864890"/>
       </p:ext>
     </p:extLst>
   </p:cSld>
@@ -11429,7 +11502,7 @@
           <a:p>
             <a:r>
               <a:rPr lang="en-GB" dirty="0"/>
-              <a:t>ReactJS</a:t>
+              <a:t>Microservices For Domino</a:t>
             </a:r>
           </a:p>
         </p:txBody>
@@ -11437,7 +11510,7 @@
     </p:spTree>
     <p:extLst>
       <p:ext uri="{BB962C8B-B14F-4D97-AF65-F5344CB8AC3E}">
-        <p14:creationId xmlns:p14="http://schemas.microsoft.com/office/powerpoint/2010/main" val="2008480614"/>
+        <p14:creationId xmlns:p14="http://schemas.microsoft.com/office/powerpoint/2010/main" val="1883388647"/>
       </p:ext>
     </p:extLst>
   </p:cSld>
@@ -11487,13 +11560,8 @@
           <a:p>
             <a:r>
               <a:rPr lang="en-GB" dirty="0"/>
-              <a:t>What is </a:t>
-            </a:r>
-            <a:r>
-              <a:rPr lang="en-GB" dirty="0" err="1"/>
-              <a:t>reactJS</a:t>
-            </a:r>
-            <a:endParaRPr lang="en-GB" dirty="0"/>
+              <a:t>Microservice Patterns</a:t>
+            </a:r>
           </a:p>
         </p:txBody>
       </p:sp>
@@ -11513,15 +11581,10 @@
             <p:ph idx="1"/>
           </p:nvPr>
         </p:nvSpPr>
-        <p:spPr>
-          <a:xfrm>
-            <a:off x="266699" y="1933349"/>
-            <a:ext cx="8121927" cy="4055469"/>
-          </a:xfrm>
-        </p:spPr>
+        <p:spPr/>
         <p:txBody>
           <a:bodyPr>
-            <a:normAutofit/>
+            <a:normAutofit fontScale="92500" lnSpcReduction="10000"/>
           </a:bodyPr>
           <a:lstStyle/>
           <a:p>
@@ -11531,7 +11594,7 @@
             </a:pPr>
             <a:r>
               <a:rPr lang="en-GB" dirty="0"/>
-              <a:t>A JavaScript library for building user interfaces</a:t>
+              <a:t>Micro-Functions</a:t>
             </a:r>
           </a:p>
           <a:p>
@@ -11541,7 +11604,7 @@
             </a:pPr>
             <a:r>
               <a:rPr lang="en-GB" dirty="0"/>
-              <a:t>React is NOT a framework</a:t>
+              <a:t>	Breakdown functions into re-usable/modular 	code blocks</a:t>
             </a:r>
           </a:p>
           <a:p>
@@ -11551,7 +11614,7 @@
             </a:pPr>
             <a:r>
               <a:rPr lang="en-GB" dirty="0"/>
-              <a:t>React is the “V” of MVC (Model/View/Controller)</a:t>
+              <a:t>	Each function should do one thing and do it 	well</a:t>
             </a:r>
           </a:p>
           <a:p>
@@ -11561,27 +11624,37 @@
             </a:pPr>
             <a:r>
               <a:rPr lang="en-GB" dirty="0"/>
-              <a:t>HTML is placed in JavaScript classes to create Web Components</a:t>
-            </a:r>
-          </a:p>
-          <a:p>
-            <a:pPr marL="1028700" lvl="1" indent="-342900">
+              <a:t>	Simplify and optimize the code within each 	function</a:t>
+            </a:r>
+          </a:p>
+          <a:p>
+            <a:pPr marL="901700" indent="-901700">
               <a:buFont typeface="Arial" charset="0"/>
               <a:buChar char="•"/>
             </a:pPr>
             <a:r>
               <a:rPr lang="en-GB" dirty="0"/>
-              <a:t>This is similar to Custom Controls in XPages</a:t>
-            </a:r>
-          </a:p>
-          <a:p>
-            <a:pPr marL="342900" indent="-342900">
+              <a:t>	A function shouldn’t contain more than 80-100 lines of code</a:t>
+            </a:r>
+          </a:p>
+          <a:p>
+            <a:pPr marL="901700" indent="-901700">
               <a:buFont typeface="Arial" charset="0"/>
               <a:buChar char="•"/>
             </a:pPr>
             <a:r>
               <a:rPr lang="en-GB" dirty="0"/>
-              <a:t>React makes use of a Virtual DOM and Diffing</a:t>
+              <a:t>	Develop ”Pure Functions” whenever possible</a:t>
+            </a:r>
+          </a:p>
+          <a:p>
+            <a:pPr marL="901700" indent="-901700">
+              <a:buFont typeface="Arial" charset="0"/>
+              <a:buChar char="•"/>
+            </a:pPr>
+            <a:r>
+              <a:rPr lang="en-GB" dirty="0"/>
+              <a:t>Easier to test for “code coverage”</a:t>
             </a:r>
           </a:p>
         </p:txBody>
@@ -11589,7 +11662,7 @@
     </p:spTree>
     <p:extLst>
       <p:ext uri="{BB962C8B-B14F-4D97-AF65-F5344CB8AC3E}">
-        <p14:creationId xmlns:p14="http://schemas.microsoft.com/office/powerpoint/2010/main" val="46941259"/>
+        <p14:creationId xmlns:p14="http://schemas.microsoft.com/office/powerpoint/2010/main" val="241729178"/>
       </p:ext>
     </p:extLst>
   </p:cSld>
@@ -11639,7 +11712,7 @@
           <a:p>
             <a:r>
               <a:rPr lang="en-GB" dirty="0"/>
-              <a:t>Platform Agnostic</a:t>
+              <a:t>Microservice Patterns Cont.</a:t>
             </a:r>
           </a:p>
         </p:txBody>
@@ -11660,12 +11733,7 @@
             <p:ph idx="1"/>
           </p:nvPr>
         </p:nvSpPr>
-        <p:spPr>
-          <a:xfrm>
-            <a:off x="266699" y="1933349"/>
-            <a:ext cx="8121927" cy="4055469"/>
-          </a:xfrm>
-        </p:spPr>
+        <p:spPr/>
         <p:txBody>
           <a:bodyPr>
             <a:normAutofit/>
@@ -11678,7 +11746,7 @@
             </a:pPr>
             <a:r>
               <a:rPr lang="en-GB" dirty="0"/>
-              <a:t>React exists as a platform-agnostic solution</a:t>
+              <a:t>Micro-Services</a:t>
             </a:r>
           </a:p>
           <a:p>
@@ -11688,7 +11756,15 @@
             </a:pPr>
             <a:r>
               <a:rPr lang="en-GB" dirty="0"/>
-              <a:t>Webpack and Babel compile React to a single JS file </a:t>
+              <a:t>	Define which micro-functions can become 	services to 3</a:t>
+            </a:r>
+            <a:r>
+              <a:rPr lang="en-GB" baseline="30000" dirty="0"/>
+              <a:t>rd</a:t>
+            </a:r>
+            <a:r>
+              <a:rPr lang="en-GB" dirty="0"/>
+              <a:t> party platforms and 	applications</a:t>
             </a:r>
           </a:p>
           <a:p>
@@ -11698,7 +11774,7 @@
             </a:pPr>
             <a:r>
               <a:rPr lang="en-GB" dirty="0"/>
-              <a:t>The ”create-react-app” module provides all required build tools</a:t>
+              <a:t>	Create API Endpoints that trigger your micro-	functions</a:t>
             </a:r>
           </a:p>
           <a:p>
@@ -11708,47 +11784,15 @@
             </a:pPr>
             <a:r>
               <a:rPr lang="en-GB" dirty="0"/>
-              <a:t>A typical React dev environment:</a:t>
-            </a:r>
-          </a:p>
-          <a:p>
-            <a:pPr marL="1028700" lvl="1" indent="-342900">
-              <a:buFont typeface="Arial" charset="0"/>
-              <a:buChar char="•"/>
-            </a:pPr>
-            <a:r>
-              <a:rPr lang="en-GB" dirty="0"/>
-              <a:t>Atom/VS Code (Editor)</a:t>
-            </a:r>
-          </a:p>
-          <a:p>
-            <a:pPr marL="1028700" lvl="1" indent="-342900">
-              <a:buFont typeface="Arial" charset="0"/>
-              <a:buChar char="•"/>
-            </a:pPr>
-            <a:r>
-              <a:rPr lang="en-GB" dirty="0"/>
-              <a:t>NodeJS</a:t>
-            </a:r>
-          </a:p>
-          <a:p>
-            <a:pPr marL="1028700" lvl="1" indent="-342900">
-              <a:buFont typeface="Arial" charset="0"/>
-              <a:buChar char="•"/>
-            </a:pPr>
-            <a:r>
-              <a:rPr lang="en-GB" dirty="0"/>
-              <a:t>ExpressJS</a:t>
-            </a:r>
-          </a:p>
-          <a:p>
-            <a:pPr marL="1028700" lvl="1" indent="-342900">
-              <a:buFont typeface="Arial" charset="0"/>
-              <a:buChar char="•"/>
-            </a:pPr>
-            <a:r>
-              <a:rPr lang="en-GB" dirty="0"/>
-              <a:t>Webpack</a:t>
+              <a:t>	Ensure a strong security layer for 3</a:t>
+            </a:r>
+            <a:r>
+              <a:rPr lang="en-GB" baseline="30000" dirty="0"/>
+              <a:t>rd</a:t>
+            </a:r>
+            <a:r>
+              <a:rPr lang="en-GB" dirty="0"/>
+              <a:t> parties to 	interface with before triggering your services</a:t>
             </a:r>
           </a:p>
         </p:txBody>
@@ -11756,7 +11800,7 @@
     </p:spTree>
     <p:extLst>
       <p:ext uri="{BB962C8B-B14F-4D97-AF65-F5344CB8AC3E}">
-        <p14:creationId xmlns:p14="http://schemas.microsoft.com/office/powerpoint/2010/main" val="3971490633"/>
+        <p14:creationId xmlns:p14="http://schemas.microsoft.com/office/powerpoint/2010/main" val="1635627779"/>
       </p:ext>
     </p:extLst>
   </p:cSld>
@@ -11848,7 +11892,7 @@
             </a:pPr>
             <a:r>
               <a:rPr lang="en-GB" dirty="0"/>
-              <a:t>Domino as a datastore and API Gateway</a:t>
+              <a:t>Container Clustering</a:t>
             </a:r>
           </a:p>
           <a:p>
@@ -11858,7 +11902,7 @@
             </a:pPr>
             <a:r>
               <a:rPr lang="en-GB" dirty="0"/>
-              <a:t>What about scheduled tasks?</a:t>
+              <a:t>ReactJS</a:t>
             </a:r>
           </a:p>
           <a:p>
@@ -11868,7 +11912,7 @@
             </a:pPr>
             <a:r>
               <a:rPr lang="en-GB" dirty="0"/>
-              <a:t>Microservices For Domino</a:t>
+              <a:t>Domino as a datastore and API Gateway</a:t>
             </a:r>
           </a:p>
           <a:p>
@@ -11878,7 +11922,11 @@
             </a:pPr>
             <a:r>
               <a:rPr lang="en-GB" dirty="0"/>
-              <a:t>Container Clustering</a:t>
+              <a:t>What about scheduled tasks</a:t>
+            </a:r>
+            <a:r>
+              <a:rPr lang="en-GB"/>
+              <a:t>? </a:t>
             </a:r>
           </a:p>
           <a:p>
@@ -11887,9 +11935,20 @@
               <a:buChar char="-"/>
             </a:pPr>
             <a:r>
-              <a:rPr lang="en-GB" dirty="0"/>
-              <a:t>ReactJS</a:t>
-            </a:r>
+              <a:rPr lang="en-GB"/>
+              <a:t>Microservices </a:t>
+            </a:r>
+            <a:r>
+              <a:rPr lang="en-GB" dirty="0"/>
+              <a:t>For Domino</a:t>
+            </a:r>
+          </a:p>
+          <a:p>
+            <a:pPr marL="342900" indent="-342900">
+              <a:buFontTx/>
+              <a:buChar char="-"/>
+            </a:pPr>
+            <a:endParaRPr lang="en-GB" dirty="0"/>
           </a:p>
           <a:p>
             <a:pPr marL="342900" indent="-342900">
@@ -12640,7 +12699,7 @@
           <a:p>
             <a:r>
               <a:rPr lang="en-GB" dirty="0"/>
-              <a:t>Domino languages for workflow (LS / SSJS / Java) </a:t>
+              <a:t>Domino languages for workflow (LS / SSJS) </a:t>
             </a:r>
           </a:p>
           <a:p>
@@ -12754,7 +12813,7 @@
         <p:spPr/>
         <p:txBody>
           <a:bodyPr>
-            <a:normAutofit lnSpcReduction="10000"/>
+            <a:normAutofit fontScale="92500" lnSpcReduction="10000"/>
           </a:bodyPr>
           <a:lstStyle/>
           <a:p>
@@ -12797,6 +12856,20 @@
             <a:r>
               <a:rPr lang="en-GB" dirty="0"/>
               <a:t>Lotus Workflow for BPM</a:t>
+            </a:r>
+          </a:p>
+          <a:p>
+            <a:r>
+              <a:rPr lang="en-GB" dirty="0"/>
+              <a:t>LEI / </a:t>
+            </a:r>
+            <a:r>
+              <a:rPr lang="en-GB" dirty="0" err="1"/>
+              <a:t>Notrix</a:t>
+            </a:r>
+            <a:r>
+              <a:rPr lang="en-GB" dirty="0"/>
+              <a:t> for scheduling</a:t>
             </a:r>
           </a:p>
           <a:p>

</xml_diff>